<commit_message>
[WR 3] slide implementazione mancante
</commit_message>
<xml_diff>
--- a/Presentazione/Atsilo3/Atsilo_H_PresentazioneFinale.pptx
+++ b/Presentazione/Atsilo3/Atsilo_H_PresentazioneFinale.pptx
@@ -5,7 +5,7 @@
     <p:sldMasterId id="2147483684" r:id="rId1"/>
   </p:sldMasterIdLst>
   <p:notesMasterIdLst>
-    <p:notesMasterId r:id="rId40"/>
+    <p:notesMasterId r:id="rId41"/>
   </p:notesMasterIdLst>
   <p:sldIdLst>
     <p:sldId id="256" r:id="rId2"/>
@@ -31,21 +31,22 @@
     <p:sldId id="289" r:id="rId22"/>
     <p:sldId id="290" r:id="rId23"/>
     <p:sldId id="291" r:id="rId24"/>
-    <p:sldId id="260" r:id="rId25"/>
-    <p:sldId id="261" r:id="rId26"/>
-    <p:sldId id="262" r:id="rId27"/>
-    <p:sldId id="265" r:id="rId28"/>
-    <p:sldId id="263" r:id="rId29"/>
-    <p:sldId id="264" r:id="rId30"/>
-    <p:sldId id="266" r:id="rId31"/>
-    <p:sldId id="267" r:id="rId32"/>
-    <p:sldId id="268" r:id="rId33"/>
-    <p:sldId id="269" r:id="rId34"/>
-    <p:sldId id="270" r:id="rId35"/>
-    <p:sldId id="292" r:id="rId36"/>
-    <p:sldId id="293" r:id="rId37"/>
-    <p:sldId id="294" r:id="rId38"/>
-    <p:sldId id="295" r:id="rId39"/>
+    <p:sldId id="296" r:id="rId25"/>
+    <p:sldId id="260" r:id="rId26"/>
+    <p:sldId id="261" r:id="rId27"/>
+    <p:sldId id="262" r:id="rId28"/>
+    <p:sldId id="265" r:id="rId29"/>
+    <p:sldId id="263" r:id="rId30"/>
+    <p:sldId id="264" r:id="rId31"/>
+    <p:sldId id="266" r:id="rId32"/>
+    <p:sldId id="267" r:id="rId33"/>
+    <p:sldId id="268" r:id="rId34"/>
+    <p:sldId id="269" r:id="rId35"/>
+    <p:sldId id="270" r:id="rId36"/>
+    <p:sldId id="292" r:id="rId37"/>
+    <p:sldId id="293" r:id="rId38"/>
+    <p:sldId id="294" r:id="rId39"/>
+    <p:sldId id="295" r:id="rId40"/>
   </p:sldIdLst>
   <p:sldSz cx="9144000" cy="6858000" type="screen4x3"/>
   <p:notesSz cx="6858000" cy="9144000"/>
@@ -399,7 +400,7 @@
     </p:spTree>
     <p:extLst>
       <p:ext uri="{BB962C8B-B14F-4D97-AF65-F5344CB8AC3E}">
-        <p14:creationId xmlns="" xmlns:p14="http://schemas.microsoft.com/office/powerpoint/2010/main" val="2126419590"/>
+        <p14:creationId xmlns:p14="http://schemas.microsoft.com/office/powerpoint/2010/main" xmlns="" val="2126419590"/>
       </p:ext>
     </p:extLst>
   </p:cSld>
@@ -4427,7 +4428,7 @@
           <a:blip r:embed="rId2">
             <a:extLst>
               <a:ext uri="{28A0092B-C50C-407E-A947-70E740481C1C}">
-                <a14:useLocalDpi xmlns="" xmlns:a14="http://schemas.microsoft.com/office/drawing/2010/main" val="0"/>
+                <a14:useLocalDpi xmlns:a14="http://schemas.microsoft.com/office/drawing/2010/main" xmlns="" val="0"/>
               </a:ext>
             </a:extLst>
           </a:blip>
@@ -4451,14 +4452,14 @@
           <a:effectLst/>
           <a:extLst>
             <a:ext uri="{909E8E84-426E-40DD-AFC4-6F175D3DCCD1}">
-              <a14:hiddenFill xmlns="" xmlns:a14="http://schemas.microsoft.com/office/drawing/2010/main">
+              <a14:hiddenFill xmlns:a14="http://schemas.microsoft.com/office/drawing/2010/main" xmlns="">
                 <a:solidFill>
                   <a:schemeClr val="accent1"/>
                 </a:solidFill>
               </a14:hiddenFill>
             </a:ext>
             <a:ext uri="{91240B29-F687-4F45-9708-019B960494DF}">
-              <a14:hiddenLine xmlns="" xmlns:a14="http://schemas.microsoft.com/office/drawing/2010/main" w="9525">
+              <a14:hiddenLine xmlns:a14="http://schemas.microsoft.com/office/drawing/2010/main" xmlns="" w="9525">
                 <a:solidFill>
                   <a:schemeClr val="tx1"/>
                 </a:solidFill>
@@ -4468,7 +4469,7 @@
               </a14:hiddenLine>
             </a:ext>
             <a:ext uri="{AF507438-7753-43E0-B8FC-AC1667EBCBE1}">
-              <a14:hiddenEffects xmlns="" xmlns:a14="http://schemas.microsoft.com/office/drawing/2010/main">
+              <a14:hiddenEffects xmlns:a14="http://schemas.microsoft.com/office/drawing/2010/main" xmlns="">
                 <a:effectLst>
                   <a:outerShdw dist="35921" dir="2700000" algn="ctr" rotWithShape="0">
                     <a:schemeClr val="bg2"/>
@@ -4488,7 +4489,7 @@
           <p:nvPr>
             <p:extLst>
               <p:ext uri="{D42A27DB-BD31-4B8C-83A1-F6EECF244321}">
-                <p14:modId xmlns="" xmlns:p14="http://schemas.microsoft.com/office/powerpoint/2010/main" val="669990601"/>
+                <p14:modId xmlns:p14="http://schemas.microsoft.com/office/powerpoint/2010/main" xmlns="" val="669990601"/>
               </p:ext>
             </p:extLst>
           </p:nvPr>
@@ -4665,7 +4666,7 @@
           <p:nvPr>
             <p:extLst>
               <p:ext uri="{D42A27DB-BD31-4B8C-83A1-F6EECF244321}">
-                <p14:modId xmlns="" xmlns:p14="http://schemas.microsoft.com/office/powerpoint/2010/main" val="3027425847"/>
+                <p14:modId xmlns:p14="http://schemas.microsoft.com/office/powerpoint/2010/main" xmlns="" val="3027425847"/>
               </p:ext>
             </p:extLst>
           </p:nvPr>
@@ -4746,7 +4747,7 @@
     </p:spTree>
     <p:extLst>
       <p:ext uri="{BB962C8B-B14F-4D97-AF65-F5344CB8AC3E}">
-        <p14:creationId xmlns="" xmlns:p14="http://schemas.microsoft.com/office/powerpoint/2010/main" val="4165334171"/>
+        <p14:creationId xmlns:p14="http://schemas.microsoft.com/office/powerpoint/2010/main" xmlns="" val="4165334171"/>
       </p:ext>
     </p:extLst>
   </p:cSld>
@@ -4809,9 +4810,6 @@
               </a:rPr>
               <a:t>Sequence Diagram – Inserimento Evento</a:t>
             </a:r>
-            <a:endParaRPr lang="it-IT" sz="3400" b="1" dirty="0" smtClean="0">
-              <a:latin typeface="+mj-lt"/>
-            </a:endParaRPr>
           </a:p>
           <a:p>
             <a:pPr algn="ctr"/>
@@ -4908,9 +4906,6 @@
               </a:rPr>
               <a:t>Tracciabilità</a:t>
             </a:r>
-            <a:endParaRPr lang="it-IT" sz="4800" b="1" dirty="0" smtClean="0">
-              <a:latin typeface="+mj-lt"/>
-            </a:endParaRPr>
           </a:p>
           <a:p>
             <a:pPr algn="ctr"/>
@@ -4974,9 +4969,6 @@
               </a:rPr>
               <a:t>Difetti del RAD</a:t>
             </a:r>
-            <a:endParaRPr lang="it-IT" sz="4800" b="1" dirty="0" smtClean="0">
-              <a:latin typeface="+mj-lt"/>
-            </a:endParaRPr>
           </a:p>
           <a:p>
             <a:pPr algn="ctr"/>
@@ -5040,9 +5032,6 @@
               </a:rPr>
               <a:t>Obiettivi di Design</a:t>
             </a:r>
-            <a:endParaRPr lang="it-IT" sz="5400" b="1" dirty="0" smtClean="0">
-              <a:latin typeface="+mj-lt"/>
-            </a:endParaRPr>
           </a:p>
           <a:p>
             <a:pPr algn="ctr"/>
@@ -5080,11 +5069,7 @@
             </a:pPr>
             <a:r>
               <a:rPr lang="it-IT" sz="2800" dirty="0" smtClean="0"/>
-              <a:t>Adattabilità e </a:t>
-            </a:r>
-            <a:r>
-              <a:rPr lang="it-IT" sz="2800" dirty="0" smtClean="0"/>
-              <a:t>Portabilità</a:t>
+              <a:t>Adattabilità e Portabilità</a:t>
             </a:r>
           </a:p>
           <a:p>
@@ -5138,7 +5123,6 @@
               <a:rPr lang="it-IT" sz="2800" dirty="0" smtClean="0"/>
               <a:t>Facilità di apprendimento</a:t>
             </a:r>
-            <a:endParaRPr lang="it-IT" sz="2800" dirty="0" smtClean="0"/>
           </a:p>
         </p:txBody>
       </p:sp>
@@ -5196,9 +5180,6 @@
               </a:rPr>
               <a:t>Trade-Off</a:t>
             </a:r>
-            <a:endParaRPr lang="it-IT" sz="4800" b="1" dirty="0" smtClean="0">
-              <a:latin typeface="+mj-lt"/>
-            </a:endParaRPr>
           </a:p>
           <a:p>
             <a:pPr algn="ctr"/>
@@ -5390,11 +5371,16 @@
           <a:p>
             <a:r>
               <a:rPr lang="it-IT" i="1" dirty="0" smtClean="0"/>
-              <a:t>Interfaccia vs </a:t>
+              <a:t>Interfaccia vs Usabilità</a:t>
             </a:r>
+          </a:p>
+          <a:p>
+            <a:endParaRPr lang="it-IT" i="1" dirty="0" smtClean="0"/>
+          </a:p>
+          <a:p>
             <a:r>
               <a:rPr lang="it-IT" i="1" dirty="0" smtClean="0"/>
-              <a:t>Usabilità</a:t>
+              <a:t> Comprensibilità vs Tempo</a:t>
             </a:r>
           </a:p>
           <a:p>
@@ -5403,41 +5389,16 @@
           <a:p>
             <a:r>
               <a:rPr lang="it-IT" i="1" dirty="0" smtClean="0"/>
-              <a:t> Comprensibilità vs </a:t>
+              <a:t> Build vs Buy</a:t>
             </a:r>
+          </a:p>
+          <a:p>
+            <a:endParaRPr lang="it-IT" i="1" dirty="0" smtClean="0"/>
+          </a:p>
+          <a:p>
             <a:r>
               <a:rPr lang="it-IT" i="1" dirty="0" smtClean="0"/>
-              <a:t>Tempo</a:t>
-            </a:r>
-          </a:p>
-          <a:p>
-            <a:endParaRPr lang="it-IT" i="1" dirty="0" smtClean="0"/>
-          </a:p>
-          <a:p>
-            <a:r>
-              <a:rPr lang="it-IT" i="1" dirty="0" smtClean="0"/>
-              <a:t> Build vs </a:t>
-            </a:r>
-            <a:r>
-              <a:rPr lang="it-IT" i="1" dirty="0" smtClean="0"/>
-              <a:t>Buy</a:t>
-            </a:r>
-          </a:p>
-          <a:p>
-            <a:endParaRPr lang="it-IT" i="1" dirty="0" smtClean="0"/>
-          </a:p>
-          <a:p>
-            <a:r>
-              <a:rPr lang="it-IT" i="1" dirty="0" smtClean="0"/>
-              <a:t> Spazio di </a:t>
-            </a:r>
-            <a:r>
-              <a:rPr lang="it-IT" i="1" dirty="0" smtClean="0"/>
-              <a:t>memoria </a:t>
-            </a:r>
-            <a:r>
-              <a:rPr lang="it-IT" i="1" dirty="0" smtClean="0"/>
-              <a:t>vs Velocità</a:t>
+              <a:t> Spazio di memoria vs Velocità</a:t>
             </a:r>
             <a:endParaRPr lang="en-US" dirty="0"/>
           </a:p>
@@ -5446,7 +5407,7 @@
     </p:spTree>
     <p:extLst>
       <p:ext uri="{BB962C8B-B14F-4D97-AF65-F5344CB8AC3E}">
-        <p14:creationId xmlns="" xmlns:p14="http://schemas.microsoft.com/office/powerpoint/2010/main" val="155874689"/>
+        <p14:creationId xmlns:p14="http://schemas.microsoft.com/office/powerpoint/2010/main" xmlns="" val="155874689"/>
       </p:ext>
     </p:extLst>
   </p:cSld>
@@ -5454,7 +5415,7 @@
     <a:masterClrMapping/>
   </p:clrMapOvr>
   <mc:AlternateContent xmlns:mc="http://schemas.openxmlformats.org/markup-compatibility/2006">
-    <mc:Choice xmlns="" xmlns:p14="http://schemas.microsoft.com/office/powerpoint/2010/main" Requires="p14">
+    <mc:Choice xmlns:p14="http://schemas.microsoft.com/office/powerpoint/2010/main" xmlns="" Requires="p14">
       <p:transition spd="slow" p14:dur="2000"/>
     </mc:Choice>
     <mc:Fallback>
@@ -5988,9 +5949,6 @@
               </a:rPr>
               <a:t>Divisione in sottosistemi</a:t>
             </a:r>
-            <a:endParaRPr lang="it-IT" sz="4800" b="1" dirty="0" smtClean="0">
-              <a:latin typeface="+mj-lt"/>
-            </a:endParaRPr>
           </a:p>
           <a:p>
             <a:pPr algn="ctr"/>
@@ -6187,7 +6145,7 @@
     </p:spTree>
     <p:extLst>
       <p:ext uri="{BB962C8B-B14F-4D97-AF65-F5344CB8AC3E}">
-        <p14:creationId xmlns="" xmlns:p14="http://schemas.microsoft.com/office/powerpoint/2010/main" val="155874689"/>
+        <p14:creationId xmlns:p14="http://schemas.microsoft.com/office/powerpoint/2010/main" xmlns="" val="155874689"/>
       </p:ext>
     </p:extLst>
   </p:cSld>
@@ -6195,7 +6153,7 @@
     <a:masterClrMapping/>
   </p:clrMapOvr>
   <mc:AlternateContent xmlns:mc="http://schemas.openxmlformats.org/markup-compatibility/2006">
-    <mc:Choice xmlns="" xmlns:p14="http://schemas.microsoft.com/office/powerpoint/2010/main" Requires="p14">
+    <mc:Choice xmlns:p14="http://schemas.microsoft.com/office/powerpoint/2010/main" xmlns="" Requires="p14">
       <p:transition spd="slow" p14:dur="2000"/>
     </mc:Choice>
     <mc:Fallback>
@@ -6291,9 +6249,6 @@
               </a:rPr>
               <a:t>Component Diagram</a:t>
             </a:r>
-            <a:endParaRPr lang="it-IT" sz="4800" b="1" dirty="0" smtClean="0">
-              <a:latin typeface="+mj-lt"/>
-            </a:endParaRPr>
           </a:p>
           <a:p>
             <a:pPr algn="ctr"/>
@@ -6490,7 +6445,7 @@
     </p:spTree>
     <p:extLst>
       <p:ext uri="{BB962C8B-B14F-4D97-AF65-F5344CB8AC3E}">
-        <p14:creationId xmlns="" xmlns:p14="http://schemas.microsoft.com/office/powerpoint/2010/main" val="155874689"/>
+        <p14:creationId xmlns:p14="http://schemas.microsoft.com/office/powerpoint/2010/main" xmlns="" val="155874689"/>
       </p:ext>
     </p:extLst>
   </p:cSld>
@@ -6498,7 +6453,7 @@
     <a:masterClrMapping/>
   </p:clrMapOvr>
   <mc:AlternateContent xmlns:mc="http://schemas.openxmlformats.org/markup-compatibility/2006">
-    <mc:Choice xmlns="" xmlns:p14="http://schemas.microsoft.com/office/powerpoint/2010/main" Requires="p14">
+    <mc:Choice xmlns:p14="http://schemas.microsoft.com/office/powerpoint/2010/main" xmlns="" Requires="p14">
       <p:transition spd="slow" p14:dur="2000"/>
     </mc:Choice>
     <mc:Fallback>
@@ -6561,9 +6516,6 @@
               </a:rPr>
               <a:t>Gestione dei dati persistenti</a:t>
             </a:r>
-            <a:endParaRPr lang="it-IT" sz="4800" b="1" dirty="0" smtClean="0">
-              <a:latin typeface="+mj-lt"/>
-            </a:endParaRPr>
           </a:p>
           <a:p>
             <a:pPr algn="ctr"/>
@@ -6758,13 +6710,8 @@
             </a:pPr>
             <a:r>
               <a:rPr lang="it-IT" dirty="0" smtClean="0"/>
-              <a:t>Il sistema @silo usa, per la gestione dei dati </a:t>
+              <a:t>Il sistema @silo usa, per la gestione dei dati persistenti, un Database relazionale. Il DBMS scelto è MySql.</a:t>
             </a:r>
-            <a:r>
-              <a:rPr lang="it-IT" dirty="0" smtClean="0"/>
-              <a:t>persistenti, un Database relazionale. Il DBMS scelto è MySql.</a:t>
-            </a:r>
-            <a:endParaRPr lang="it-IT" dirty="0" smtClean="0"/>
           </a:p>
           <a:p>
             <a:endParaRPr lang="it-IT" dirty="0" smtClean="0"/>
@@ -6775,13 +6722,8 @@
             </a:pPr>
             <a:r>
               <a:rPr lang="it-IT" dirty="0" smtClean="0"/>
-              <a:t>L'utilizzo di MySQL ha facilitato l'integrazione del sistema col database anche grazie a componenti esistenti come </a:t>
+              <a:t>L'utilizzo di MySQL ha facilitato l'integrazione del sistema col database anche grazie a componenti esistenti come JDBC.</a:t>
             </a:r>
-            <a:r>
-              <a:rPr lang="it-IT" dirty="0" smtClean="0"/>
-              <a:t>JDBC.</a:t>
-            </a:r>
-            <a:endParaRPr lang="it-IT" dirty="0" smtClean="0"/>
           </a:p>
         </p:txBody>
       </p:sp>
@@ -6821,7 +6763,7 @@
     </p:spTree>
     <p:extLst>
       <p:ext uri="{BB962C8B-B14F-4D97-AF65-F5344CB8AC3E}">
-        <p14:creationId xmlns="" xmlns:p14="http://schemas.microsoft.com/office/powerpoint/2010/main" val="155874689"/>
+        <p14:creationId xmlns:p14="http://schemas.microsoft.com/office/powerpoint/2010/main" xmlns="" val="155874689"/>
       </p:ext>
     </p:extLst>
   </p:cSld>
@@ -6829,7 +6771,7 @@
     <a:masterClrMapping/>
   </p:clrMapOvr>
   <mc:AlternateContent xmlns:mc="http://schemas.openxmlformats.org/markup-compatibility/2006">
-    <mc:Choice xmlns="" xmlns:p14="http://schemas.microsoft.com/office/powerpoint/2010/main" Requires="p14">
+    <mc:Choice xmlns:p14="http://schemas.microsoft.com/office/powerpoint/2010/main" xmlns="" Requires="p14">
       <p:transition spd="slow" p14:dur="2000"/>
     </mc:Choice>
     <mc:Fallback>
@@ -7182,9 +7124,6 @@
               </a:rPr>
               <a:t>Difetti del SDD</a:t>
             </a:r>
-            <a:endParaRPr lang="it-IT" sz="4800" b="1" dirty="0" smtClean="0">
-              <a:latin typeface="+mj-lt"/>
-            </a:endParaRPr>
           </a:p>
           <a:p>
             <a:pPr algn="ctr"/>
@@ -7523,7 +7462,7 @@
     </p:spTree>
     <p:extLst>
       <p:ext uri="{BB962C8B-B14F-4D97-AF65-F5344CB8AC3E}">
-        <p14:creationId xmlns="" xmlns:p14="http://schemas.microsoft.com/office/powerpoint/2010/main" val="155874689"/>
+        <p14:creationId xmlns:p14="http://schemas.microsoft.com/office/powerpoint/2010/main" xmlns="" val="155874689"/>
       </p:ext>
     </p:extLst>
   </p:cSld>
@@ -7531,7 +7470,7 @@
     <a:masterClrMapping/>
   </p:clrMapOvr>
   <mc:AlternateContent xmlns:mc="http://schemas.openxmlformats.org/markup-compatibility/2006">
-    <mc:Choice xmlns="" xmlns:p14="http://schemas.microsoft.com/office/powerpoint/2010/main" Requires="p14">
+    <mc:Choice xmlns:p14="http://schemas.microsoft.com/office/powerpoint/2010/main" xmlns="" Requires="p14">
       <p:transition spd="slow" p14:dur="2000"/>
     </mc:Choice>
     <mc:Fallback>
@@ -7594,9 +7533,6 @@
               </a:rPr>
               <a:t>Riuso – Design Pattern</a:t>
             </a:r>
-            <a:endParaRPr lang="it-IT" sz="4800" b="1" dirty="0" smtClean="0">
-              <a:latin typeface="+mj-lt"/>
-            </a:endParaRPr>
           </a:p>
           <a:p>
             <a:pPr algn="ctr"/>
@@ -7791,37 +7727,8 @@
             </a:pPr>
             <a:r>
               <a:rPr lang="it-IT" dirty="0" smtClean="0"/>
-              <a:t>    Per </a:t>
+              <a:t>    Per l'implementazione del sistema è stato usato il design pattern Adapter per integrare con il sistema @silo la componente esterna: il Forum phpbb.  </a:t>
             </a:r>
-            <a:r>
-              <a:rPr lang="it-IT" dirty="0" smtClean="0"/>
-              <a:t>l'implementazione del sistema è stato usato il design pattern Adapter per integrare </a:t>
-            </a:r>
-            <a:r>
-              <a:rPr lang="it-IT" dirty="0" smtClean="0"/>
-              <a:t>con il </a:t>
-            </a:r>
-            <a:r>
-              <a:rPr lang="it-IT" dirty="0" smtClean="0"/>
-              <a:t>sistema @silo </a:t>
-            </a:r>
-            <a:r>
-              <a:rPr lang="it-IT" dirty="0" smtClean="0"/>
-              <a:t>la </a:t>
-            </a:r>
-            <a:r>
-              <a:rPr lang="it-IT" dirty="0" smtClean="0"/>
-              <a:t>c</a:t>
-            </a:r>
-            <a:r>
-              <a:rPr lang="it-IT" dirty="0" smtClean="0"/>
-              <a:t>omponente esterna: il Forum </a:t>
-            </a:r>
-            <a:r>
-              <a:rPr lang="it-IT" dirty="0" smtClean="0"/>
-              <a:t>phpbb.  </a:t>
-            </a:r>
-            <a:endParaRPr lang="it-IT" dirty="0" smtClean="0"/>
           </a:p>
         </p:txBody>
       </p:sp>
@@ -8081,9 +7988,6 @@
               </a:rPr>
               <a:t>Riuso – Design Pattern</a:t>
             </a:r>
-            <a:endParaRPr lang="it-IT" sz="4800" b="1" dirty="0" smtClean="0">
-              <a:latin typeface="+mj-lt"/>
-            </a:endParaRPr>
           </a:p>
           <a:p>
             <a:pPr algn="ctr"/>
@@ -8278,17 +8182,8 @@
             </a:pPr>
             <a:r>
               <a:rPr lang="it-IT" dirty="0" smtClean="0"/>
-              <a:t>    Per </a:t>
+              <a:t>    Per l'implementazione dello strato Application si è ricorsi al design patter Singleton.</a:t>
             </a:r>
-            <a:r>
-              <a:rPr lang="it-IT" dirty="0" smtClean="0"/>
-              <a:t>l'implementazione </a:t>
-            </a:r>
-            <a:r>
-              <a:rPr lang="it-IT" dirty="0" smtClean="0"/>
-              <a:t>dello strato Application si è ricorsi al design patter Singleton.</a:t>
-            </a:r>
-            <a:endParaRPr lang="it-IT" dirty="0" smtClean="0"/>
           </a:p>
         </p:txBody>
       </p:sp>
@@ -8482,9 +8377,6 @@
               </a:rPr>
               <a:t>Componenti Off-The-Shelf</a:t>
             </a:r>
-            <a:endParaRPr lang="it-IT" sz="4800" b="1" dirty="0" smtClean="0">
-              <a:latin typeface="+mj-lt"/>
-            </a:endParaRPr>
           </a:p>
           <a:p>
             <a:pPr algn="ctr"/>
@@ -9050,9 +8942,6 @@
               </a:rPr>
               <a:t>Difetti del ODD</a:t>
             </a:r>
-            <a:endParaRPr lang="it-IT" sz="4800" b="1" dirty="0" smtClean="0">
-              <a:latin typeface="+mj-lt"/>
-            </a:endParaRPr>
           </a:p>
           <a:p>
             <a:pPr algn="ctr"/>
@@ -9071,6 +8960,466 @@
 </file>
 
 <file path=ppt/slides/slide24.xml><?xml version="1.0" encoding="utf-8"?>
+<p:sld xmlns:a="http://schemas.openxmlformats.org/drawingml/2006/main" xmlns:r="http://schemas.openxmlformats.org/officeDocument/2006/relationships" xmlns:p="http://schemas.openxmlformats.org/presentationml/2006/main">
+  <p:cSld>
+    <p:spTree>
+      <p:nvGrpSpPr>
+        <p:cNvPr id="1" name=""/>
+        <p:cNvGrpSpPr/>
+        <p:nvPr/>
+      </p:nvGrpSpPr>
+      <p:grpSpPr>
+        <a:xfrm>
+          <a:off x="0" y="0"/>
+          <a:ext cx="0" cy="0"/>
+          <a:chOff x="0" y="0"/>
+          <a:chExt cx="0" cy="0"/>
+        </a:xfrm>
+      </p:grpSpPr>
+      <p:sp>
+        <p:nvSpPr>
+          <p:cNvPr id="2" name="CasellaDiTesto 1"/>
+          <p:cNvSpPr txBox="1"/>
+          <p:nvPr/>
+        </p:nvSpPr>
+        <p:spPr>
+          <a:xfrm>
+            <a:off x="285720" y="2143116"/>
+            <a:ext cx="7072313" cy="800219"/>
+          </a:xfrm>
+          <a:prstGeom prst="rect">
+            <a:avLst/>
+          </a:prstGeom>
+          <a:noFill/>
+        </p:spPr>
+        <p:txBody>
+          <a:bodyPr>
+            <a:spAutoFit/>
+          </a:bodyPr>
+          <a:lstStyle/>
+          <a:p>
+            <a:pPr fontAlgn="auto">
+              <a:spcBef>
+                <a:spcPts val="0"/>
+              </a:spcBef>
+              <a:spcAft>
+                <a:spcPts val="0"/>
+              </a:spcAft>
+              <a:defRPr/>
+            </a:pPr>
+            <a:r>
+              <a:rPr lang="it-IT" sz="2800" b="1" dirty="0">
+                <a:latin typeface="+mj-lt"/>
+                <a:cs typeface="+mn-cs"/>
+              </a:rPr>
+              <a:t>Obiettivi del </a:t>
+            </a:r>
+            <a:r>
+              <a:rPr lang="it-IT" sz="2800" b="1" dirty="0" smtClean="0">
+                <a:latin typeface="+mj-lt"/>
+                <a:cs typeface="+mn-cs"/>
+              </a:rPr>
+              <a:t>sottosistema Questionari:</a:t>
+            </a:r>
+            <a:endParaRPr lang="it-IT" sz="2800" b="1" dirty="0">
+              <a:latin typeface="+mj-lt"/>
+              <a:cs typeface="+mn-cs"/>
+            </a:endParaRPr>
+          </a:p>
+          <a:p>
+            <a:pPr algn="ctr" fontAlgn="auto">
+              <a:spcBef>
+                <a:spcPts val="0"/>
+              </a:spcBef>
+              <a:spcAft>
+                <a:spcPts val="0"/>
+              </a:spcAft>
+              <a:defRPr/>
+            </a:pPr>
+            <a:endParaRPr lang="it-IT" dirty="0">
+              <a:latin typeface="+mj-lt"/>
+              <a:cs typeface="+mn-cs"/>
+            </a:endParaRPr>
+          </a:p>
+        </p:txBody>
+      </p:sp>
+      <p:sp>
+        <p:nvSpPr>
+          <p:cNvPr id="10" name="Content Placeholder 3"/>
+          <p:cNvSpPr txBox="1">
+            <a:spLocks/>
+          </p:cNvSpPr>
+          <p:nvPr/>
+        </p:nvSpPr>
+        <p:spPr bwMode="auto">
+          <a:xfrm>
+            <a:off x="714375" y="3214686"/>
+            <a:ext cx="8429625" cy="2357454"/>
+          </a:xfrm>
+          <a:prstGeom prst="rect">
+            <a:avLst/>
+          </a:prstGeom>
+          <a:noFill/>
+          <a:ln w="9525">
+            <a:noFill/>
+            <a:miter lim="800000"/>
+            <a:headEnd/>
+            <a:tailEnd/>
+          </a:ln>
+        </p:spPr>
+        <p:txBody>
+          <a:bodyPr tIns="0"/>
+          <a:lstStyle/>
+          <a:p>
+            <a:pPr>
+              <a:spcBef>
+                <a:spcPct val="20000"/>
+              </a:spcBef>
+              <a:buSzPct val="95000"/>
+              <a:buFont typeface="Wingdings" pitchFamily="2" charset="2"/>
+              <a:buChar char="v"/>
+            </a:pPr>
+            <a:r>
+              <a:rPr lang="it-IT" sz="2800" dirty="0">
+                <a:latin typeface="Calibri" pitchFamily="34" charset="0"/>
+              </a:rPr>
+              <a:t>Accrescere la conoscenza sul soddisfacimento avuto dai servizi offerti a bambini e genitori.</a:t>
+            </a:r>
+          </a:p>
+          <a:p>
+            <a:pPr>
+              <a:spcBef>
+                <a:spcPct val="20000"/>
+              </a:spcBef>
+              <a:buSzPct val="95000"/>
+              <a:buFont typeface="Wingdings" pitchFamily="2" charset="2"/>
+              <a:buNone/>
+            </a:pPr>
+            <a:endParaRPr lang="it-IT" sz="2800" dirty="0">
+              <a:latin typeface="Calibri" pitchFamily="34" charset="0"/>
+            </a:endParaRPr>
+          </a:p>
+          <a:p>
+            <a:pPr>
+              <a:spcBef>
+                <a:spcPct val="20000"/>
+              </a:spcBef>
+              <a:buSzPct val="95000"/>
+              <a:buFont typeface="Wingdings" pitchFamily="2" charset="2"/>
+              <a:buChar char="v"/>
+            </a:pPr>
+            <a:r>
+              <a:rPr lang="it-IT" sz="2800" dirty="0">
+                <a:latin typeface="Calibri" pitchFamily="34" charset="0"/>
+              </a:rPr>
+              <a:t>Raccogliere feedback</a:t>
+            </a:r>
+          </a:p>
+          <a:p>
+            <a:pPr>
+              <a:spcBef>
+                <a:spcPct val="20000"/>
+              </a:spcBef>
+              <a:buSzPct val="95000"/>
+              <a:buFont typeface="Wingdings" pitchFamily="2" charset="2"/>
+              <a:buNone/>
+            </a:pPr>
+            <a:endParaRPr lang="en-US" sz="2800" dirty="0">
+              <a:latin typeface="Calibri" pitchFamily="34" charset="0"/>
+            </a:endParaRPr>
+          </a:p>
+        </p:txBody>
+      </p:sp>
+      <p:sp>
+        <p:nvSpPr>
+          <p:cNvPr id="4" name="CasellaDiTesto 1"/>
+          <p:cNvSpPr txBox="1"/>
+          <p:nvPr/>
+        </p:nvSpPr>
+        <p:spPr>
+          <a:xfrm>
+            <a:off x="0" y="428604"/>
+            <a:ext cx="9144000" cy="1107996"/>
+          </a:xfrm>
+          <a:prstGeom prst="rect">
+            <a:avLst/>
+          </a:prstGeom>
+          <a:noFill/>
+        </p:spPr>
+        <p:txBody>
+          <a:bodyPr wrap="square" rtlCol="0">
+            <a:spAutoFit/>
+          </a:bodyPr>
+          <a:lstStyle/>
+          <a:p>
+            <a:pPr algn="ctr"/>
+            <a:r>
+              <a:rPr lang="it-IT" sz="4800" b="1" dirty="0" smtClean="0">
+                <a:latin typeface="+mj-lt"/>
+              </a:rPr>
+              <a:t>Implementazione</a:t>
+            </a:r>
+            <a:endParaRPr lang="it-IT" sz="4800" b="1" dirty="0" smtClean="0">
+              <a:latin typeface="+mj-lt"/>
+            </a:endParaRPr>
+          </a:p>
+          <a:p>
+            <a:pPr algn="ctr"/>
+            <a:endParaRPr lang="it-IT" dirty="0">
+              <a:latin typeface="+mj-lt"/>
+            </a:endParaRPr>
+          </a:p>
+        </p:txBody>
+      </p:sp>
+    </p:spTree>
+  </p:cSld>
+  <p:clrMapOvr>
+    <a:masterClrMapping/>
+  </p:clrMapOvr>
+  <p:transition spd="slow"/>
+  <p:timing>
+    <p:tnLst>
+      <p:par>
+        <p:cTn id="1" dur="indefinite" restart="never" nodeType="tmRoot">
+          <p:childTnLst>
+            <p:seq concurrent="1" nextAc="seek">
+              <p:cTn id="2" dur="indefinite" nodeType="mainSeq">
+                <p:childTnLst>
+                  <p:par>
+                    <p:cTn id="3" fill="hold">
+                      <p:stCondLst>
+                        <p:cond delay="indefinite"/>
+                      </p:stCondLst>
+                      <p:childTnLst>
+                        <p:par>
+                          <p:cTn id="4" fill="hold">
+                            <p:stCondLst>
+                              <p:cond delay="0"/>
+                            </p:stCondLst>
+                            <p:childTnLst>
+                              <p:par>
+                                <p:cTn id="5" presetID="2" presetClass="entr" presetSubtype="4" fill="hold" grpId="0" nodeType="clickEffect">
+                                  <p:stCondLst>
+                                    <p:cond delay="0"/>
+                                  </p:stCondLst>
+                                  <p:childTnLst>
+                                    <p:set>
+                                      <p:cBhvr>
+                                        <p:cTn id="6" dur="1" fill="hold">
+                                          <p:stCondLst>
+                                            <p:cond delay="0"/>
+                                          </p:stCondLst>
+                                        </p:cTn>
+                                        <p:tgtEl>
+                                          <p:spTgt spid="10">
+                                            <p:txEl>
+                                              <p:pRg st="0" end="0"/>
+                                            </p:txEl>
+                                          </p:spTgt>
+                                        </p:tgtEl>
+                                        <p:attrNameLst>
+                                          <p:attrName>style.visibility</p:attrName>
+                                        </p:attrNameLst>
+                                      </p:cBhvr>
+                                      <p:to>
+                                        <p:strVal val="visible"/>
+                                      </p:to>
+                                    </p:set>
+                                    <p:anim calcmode="lin" valueType="num">
+                                      <p:cBhvr additive="base">
+                                        <p:cTn id="7" dur="500" fill="hold"/>
+                                        <p:tgtEl>
+                                          <p:spTgt spid="10">
+                                            <p:txEl>
+                                              <p:pRg st="0" end="0"/>
+                                            </p:txEl>
+                                          </p:spTgt>
+                                        </p:tgtEl>
+                                        <p:attrNameLst>
+                                          <p:attrName>ppt_x</p:attrName>
+                                        </p:attrNameLst>
+                                      </p:cBhvr>
+                                      <p:tavLst>
+                                        <p:tav tm="0">
+                                          <p:val>
+                                            <p:strVal val="#ppt_x"/>
+                                          </p:val>
+                                        </p:tav>
+                                        <p:tav tm="100000">
+                                          <p:val>
+                                            <p:strVal val="#ppt_x"/>
+                                          </p:val>
+                                        </p:tav>
+                                      </p:tavLst>
+                                    </p:anim>
+                                    <p:anim calcmode="lin" valueType="num">
+                                      <p:cBhvr additive="base">
+                                        <p:cTn id="8" dur="500" fill="hold"/>
+                                        <p:tgtEl>
+                                          <p:spTgt spid="10">
+                                            <p:txEl>
+                                              <p:pRg st="0" end="0"/>
+                                            </p:txEl>
+                                          </p:spTgt>
+                                        </p:tgtEl>
+                                        <p:attrNameLst>
+                                          <p:attrName>ppt_y</p:attrName>
+                                        </p:attrNameLst>
+                                      </p:cBhvr>
+                                      <p:tavLst>
+                                        <p:tav tm="0">
+                                          <p:val>
+                                            <p:strVal val="1+#ppt_h/2"/>
+                                          </p:val>
+                                        </p:tav>
+                                        <p:tav tm="100000">
+                                          <p:val>
+                                            <p:strVal val="#ppt_y"/>
+                                          </p:val>
+                                        </p:tav>
+                                      </p:tavLst>
+                                    </p:anim>
+                                  </p:childTnLst>
+                                </p:cTn>
+                              </p:par>
+                            </p:childTnLst>
+                          </p:cTn>
+                        </p:par>
+                      </p:childTnLst>
+                    </p:cTn>
+                  </p:par>
+                  <p:par>
+                    <p:cTn id="9" fill="hold">
+                      <p:stCondLst>
+                        <p:cond delay="indefinite"/>
+                      </p:stCondLst>
+                      <p:childTnLst>
+                        <p:par>
+                          <p:cTn id="10" fill="hold">
+                            <p:stCondLst>
+                              <p:cond delay="0"/>
+                            </p:stCondLst>
+                            <p:childTnLst>
+                              <p:par>
+                                <p:cTn id="11" presetID="2" presetClass="entr" presetSubtype="4" fill="hold" grpId="0" nodeType="clickEffect">
+                                  <p:stCondLst>
+                                    <p:cond delay="0"/>
+                                  </p:stCondLst>
+                                  <p:childTnLst>
+                                    <p:set>
+                                      <p:cBhvr>
+                                        <p:cTn id="12" dur="1" fill="hold">
+                                          <p:stCondLst>
+                                            <p:cond delay="0"/>
+                                          </p:stCondLst>
+                                        </p:cTn>
+                                        <p:tgtEl>
+                                          <p:spTgt spid="10">
+                                            <p:txEl>
+                                              <p:pRg st="2" end="2"/>
+                                            </p:txEl>
+                                          </p:spTgt>
+                                        </p:tgtEl>
+                                        <p:attrNameLst>
+                                          <p:attrName>style.visibility</p:attrName>
+                                        </p:attrNameLst>
+                                      </p:cBhvr>
+                                      <p:to>
+                                        <p:strVal val="visible"/>
+                                      </p:to>
+                                    </p:set>
+                                    <p:anim calcmode="lin" valueType="num">
+                                      <p:cBhvr additive="base">
+                                        <p:cTn id="13" dur="500" fill="hold"/>
+                                        <p:tgtEl>
+                                          <p:spTgt spid="10">
+                                            <p:txEl>
+                                              <p:pRg st="2" end="2"/>
+                                            </p:txEl>
+                                          </p:spTgt>
+                                        </p:tgtEl>
+                                        <p:attrNameLst>
+                                          <p:attrName>ppt_x</p:attrName>
+                                        </p:attrNameLst>
+                                      </p:cBhvr>
+                                      <p:tavLst>
+                                        <p:tav tm="0">
+                                          <p:val>
+                                            <p:strVal val="#ppt_x"/>
+                                          </p:val>
+                                        </p:tav>
+                                        <p:tav tm="100000">
+                                          <p:val>
+                                            <p:strVal val="#ppt_x"/>
+                                          </p:val>
+                                        </p:tav>
+                                      </p:tavLst>
+                                    </p:anim>
+                                    <p:anim calcmode="lin" valueType="num">
+                                      <p:cBhvr additive="base">
+                                        <p:cTn id="14" dur="500" fill="hold"/>
+                                        <p:tgtEl>
+                                          <p:spTgt spid="10">
+                                            <p:txEl>
+                                              <p:pRg st="2" end="2"/>
+                                            </p:txEl>
+                                          </p:spTgt>
+                                        </p:tgtEl>
+                                        <p:attrNameLst>
+                                          <p:attrName>ppt_y</p:attrName>
+                                        </p:attrNameLst>
+                                      </p:cBhvr>
+                                      <p:tavLst>
+                                        <p:tav tm="0">
+                                          <p:val>
+                                            <p:strVal val="1+#ppt_h/2"/>
+                                          </p:val>
+                                        </p:tav>
+                                        <p:tav tm="100000">
+                                          <p:val>
+                                            <p:strVal val="#ppt_y"/>
+                                          </p:val>
+                                        </p:tav>
+                                      </p:tavLst>
+                                    </p:anim>
+                                  </p:childTnLst>
+                                </p:cTn>
+                              </p:par>
+                            </p:childTnLst>
+                          </p:cTn>
+                        </p:par>
+                      </p:childTnLst>
+                    </p:cTn>
+                  </p:par>
+                </p:childTnLst>
+              </p:cTn>
+              <p:prevCondLst>
+                <p:cond evt="onPrev" delay="0">
+                  <p:tgtEl>
+                    <p:sldTgt/>
+                  </p:tgtEl>
+                </p:cond>
+              </p:prevCondLst>
+              <p:nextCondLst>
+                <p:cond evt="onNext" delay="0">
+                  <p:tgtEl>
+                    <p:sldTgt/>
+                  </p:tgtEl>
+                </p:cond>
+              </p:nextCondLst>
+            </p:seq>
+          </p:childTnLst>
+        </p:cTn>
+      </p:par>
+    </p:tnLst>
+    <p:bldLst>
+      <p:bldP spid="10" grpId="0" build="p"/>
+    </p:bldLst>
+  </p:timing>
+</p:sld>
+</file>
+
+<file path=ppt/slides/slide25.xml><?xml version="1.0" encoding="utf-8"?>
 <p:sld xmlns:a="http://schemas.openxmlformats.org/drawingml/2006/main" xmlns:r="http://schemas.openxmlformats.org/officeDocument/2006/relationships" xmlns:p="http://schemas.openxmlformats.org/presentationml/2006/main">
   <p:cSld>
     <p:spTree>
@@ -9591,7 +9940,7 @@
     </p:spTree>
     <p:extLst>
       <p:ext uri="{BB962C8B-B14F-4D97-AF65-F5344CB8AC3E}">
-        <p14:creationId xmlns="" xmlns:p14="http://schemas.microsoft.com/office/powerpoint/2010/main" val="155874689"/>
+        <p14:creationId xmlns:p14="http://schemas.microsoft.com/office/powerpoint/2010/main" xmlns="" val="155874689"/>
       </p:ext>
     </p:extLst>
   </p:cSld>
@@ -9599,7 +9948,7 @@
     <a:masterClrMapping/>
   </p:clrMapOvr>
   <mc:AlternateContent xmlns:mc="http://schemas.openxmlformats.org/markup-compatibility/2006">
-    <mc:Choice xmlns="" xmlns:p14="http://schemas.microsoft.com/office/powerpoint/2010/main" Requires="p14">
+    <mc:Choice xmlns:p14="http://schemas.microsoft.com/office/powerpoint/2010/main" xmlns="" Requires="p14">
       <p:transition spd="slow" p14:dur="2000"/>
     </mc:Choice>
     <mc:Fallback>
@@ -10060,7 +10409,7 @@
 </p:sld>
 </file>
 
-<file path=ppt/slides/slide25.xml><?xml version="1.0" encoding="utf-8"?>
+<file path=ppt/slides/slide26.xml><?xml version="1.0" encoding="utf-8"?>
 <p:sld xmlns:a="http://schemas.openxmlformats.org/drawingml/2006/main" xmlns:r="http://schemas.openxmlformats.org/officeDocument/2006/relationships" xmlns:p="http://schemas.openxmlformats.org/presentationml/2006/main">
   <p:cSld>
     <p:spTree>
@@ -10293,7 +10642,7 @@
     </p:spTree>
     <p:extLst>
       <p:ext uri="{BB962C8B-B14F-4D97-AF65-F5344CB8AC3E}">
-        <p14:creationId xmlns="" xmlns:p14="http://schemas.microsoft.com/office/powerpoint/2010/main" val="155874689"/>
+        <p14:creationId xmlns:p14="http://schemas.microsoft.com/office/powerpoint/2010/main" xmlns="" val="155874689"/>
       </p:ext>
     </p:extLst>
   </p:cSld>
@@ -10447,7 +10796,7 @@
 </p:sld>
 </file>
 
-<file path=ppt/slides/slide26.xml><?xml version="1.0" encoding="utf-8"?>
+<file path=ppt/slides/slide27.xml><?xml version="1.0" encoding="utf-8"?>
 <p:sld xmlns:a="http://schemas.openxmlformats.org/drawingml/2006/main" xmlns:r="http://schemas.openxmlformats.org/officeDocument/2006/relationships" xmlns:p="http://schemas.openxmlformats.org/presentationml/2006/main">
   <p:cSld>
     <p:spTree>
@@ -10736,7 +11085,7 @@
     </p:spTree>
     <p:extLst>
       <p:ext uri="{BB962C8B-B14F-4D97-AF65-F5344CB8AC3E}">
-        <p14:creationId xmlns="" xmlns:p14="http://schemas.microsoft.com/office/powerpoint/2010/main" val="155874689"/>
+        <p14:creationId xmlns:p14="http://schemas.microsoft.com/office/powerpoint/2010/main" xmlns="" val="155874689"/>
       </p:ext>
     </p:extLst>
   </p:cSld>
@@ -10744,7 +11093,7 @@
     <a:masterClrMapping/>
   </p:clrMapOvr>
   <mc:AlternateContent xmlns:mc="http://schemas.openxmlformats.org/markup-compatibility/2006">
-    <mc:Choice xmlns="" xmlns:p14="http://schemas.microsoft.com/office/powerpoint/2010/main" Requires="p14">
+    <mc:Choice xmlns:p14="http://schemas.microsoft.com/office/powerpoint/2010/main" xmlns="" Requires="p14">
       <p:transition spd="slow" p14:dur="2000"/>
     </mc:Choice>
     <mc:Fallback>
@@ -11302,7 +11651,7 @@
 </p:sld>
 </file>
 
-<file path=ppt/slides/slide27.xml><?xml version="1.0" encoding="utf-8"?>
+<file path=ppt/slides/slide28.xml><?xml version="1.0" encoding="utf-8"?>
 <p:sld xmlns:a="http://schemas.openxmlformats.org/drawingml/2006/main" xmlns:r="http://schemas.openxmlformats.org/officeDocument/2006/relationships" xmlns:p="http://schemas.openxmlformats.org/presentationml/2006/main">
   <p:cSld>
     <p:spTree>
@@ -11595,7 +11944,7 @@
     </p:spTree>
     <p:extLst>
       <p:ext uri="{BB962C8B-B14F-4D97-AF65-F5344CB8AC3E}">
-        <p14:creationId xmlns="" xmlns:p14="http://schemas.microsoft.com/office/powerpoint/2010/main" val="155874689"/>
+        <p14:creationId xmlns:p14="http://schemas.microsoft.com/office/powerpoint/2010/main" xmlns="" val="155874689"/>
       </p:ext>
     </p:extLst>
   </p:cSld>
@@ -11603,7 +11952,7 @@
     <a:masterClrMapping/>
   </p:clrMapOvr>
   <mc:AlternateContent xmlns:mc="http://schemas.openxmlformats.org/markup-compatibility/2006">
-    <mc:Choice xmlns="" xmlns:p14="http://schemas.microsoft.com/office/powerpoint/2010/main" Requires="p14">
+    <mc:Choice xmlns:p14="http://schemas.microsoft.com/office/powerpoint/2010/main" xmlns="" Requires="p14">
       <p:transition spd="slow" p14:dur="2000"/>
     </mc:Choice>
     <mc:Fallback>
@@ -12264,647 +12613,6 @@
 </p:sld>
 </file>
 
-<file path=ppt/slides/slide28.xml><?xml version="1.0" encoding="utf-8"?>
-<p:sld xmlns:a="http://schemas.openxmlformats.org/drawingml/2006/main" xmlns:r="http://schemas.openxmlformats.org/officeDocument/2006/relationships" xmlns:p="http://schemas.openxmlformats.org/presentationml/2006/main">
-  <p:cSld>
-    <p:spTree>
-      <p:nvGrpSpPr>
-        <p:cNvPr id="1" name=""/>
-        <p:cNvGrpSpPr/>
-        <p:nvPr/>
-      </p:nvGrpSpPr>
-      <p:grpSpPr>
-        <a:xfrm>
-          <a:off x="0" y="0"/>
-          <a:ext cx="0" cy="0"/>
-          <a:chOff x="0" y="0"/>
-          <a:chExt cx="0" cy="0"/>
-        </a:xfrm>
-      </p:grpSpPr>
-      <p:sp>
-        <p:nvSpPr>
-          <p:cNvPr id="2" name="CasellaDiTesto 1"/>
-          <p:cNvSpPr txBox="1"/>
-          <p:nvPr/>
-        </p:nvSpPr>
-        <p:spPr>
-          <a:xfrm>
-            <a:off x="1928794" y="428604"/>
-            <a:ext cx="5214974" cy="1107996"/>
-          </a:xfrm>
-          <a:prstGeom prst="rect">
-            <a:avLst/>
-          </a:prstGeom>
-          <a:noFill/>
-        </p:spPr>
-        <p:txBody>
-          <a:bodyPr wrap="square" rtlCol="0">
-            <a:spAutoFit/>
-          </a:bodyPr>
-          <a:lstStyle/>
-          <a:p>
-            <a:pPr algn="ctr"/>
-            <a:r>
-              <a:rPr lang="it-IT" sz="4800" b="1" dirty="0" smtClean="0">
-                <a:latin typeface="+mj-lt"/>
-              </a:rPr>
-              <a:t>Build VS Buy</a:t>
-            </a:r>
-            <a:endParaRPr lang="it-IT" sz="2800" b="1" dirty="0" smtClean="0">
-              <a:latin typeface="+mj-lt"/>
-            </a:endParaRPr>
-          </a:p>
-          <a:p>
-            <a:pPr algn="ctr"/>
-            <a:endParaRPr lang="it-IT" dirty="0">
-              <a:latin typeface="+mj-lt"/>
-            </a:endParaRPr>
-          </a:p>
-        </p:txBody>
-      </p:sp>
-      <p:sp>
-        <p:nvSpPr>
-          <p:cNvPr id="10" name="Content Placeholder 3"/>
-          <p:cNvSpPr txBox="1">
-            <a:spLocks/>
-          </p:cNvSpPr>
-          <p:nvPr/>
-        </p:nvSpPr>
-        <p:spPr>
-          <a:xfrm>
-            <a:off x="285720" y="2214554"/>
-            <a:ext cx="8429684" cy="3929090"/>
-          </a:xfrm>
-          <a:prstGeom prst="rect">
-            <a:avLst/>
-          </a:prstGeom>
-        </p:spPr>
-        <p:txBody>
-          <a:bodyPr tIns="0"/>
-          <a:lstStyle>
-            <a:lvl1pPr marL="274320" indent="-274320" algn="l" rtl="0" eaLnBrk="1" latinLnBrk="0" hangingPunct="1">
-              <a:spcBef>
-                <a:spcPct val="20000"/>
-              </a:spcBef>
-              <a:buClrTx/>
-              <a:buSzPct val="95000"/>
-              <a:buFont typeface="Wingdings" pitchFamily="2" charset="2"/>
-              <a:buChar char="v"/>
-              <a:defRPr kumimoji="0" sz="2800" kern="1200">
-                <a:solidFill>
-                  <a:schemeClr val="tx1"/>
-                </a:solidFill>
-                <a:latin typeface="+mn-lt"/>
-                <a:ea typeface="+mn-ea"/>
-                <a:cs typeface="+mn-cs"/>
-              </a:defRPr>
-            </a:lvl1pPr>
-            <a:lvl2pPr marL="640080" indent="-246888" algn="l" rtl="0" eaLnBrk="1" latinLnBrk="0" hangingPunct="1">
-              <a:spcBef>
-                <a:spcPct val="20000"/>
-              </a:spcBef>
-              <a:buClrTx/>
-              <a:buSzPct val="85000"/>
-              <a:buFont typeface="Courier New" pitchFamily="49" charset="0"/>
-              <a:buChar char="o"/>
-              <a:defRPr kumimoji="0" sz="2600" kern="1200">
-                <a:solidFill>
-                  <a:schemeClr val="tx1"/>
-                </a:solidFill>
-                <a:latin typeface="+mn-lt"/>
-                <a:ea typeface="+mn-ea"/>
-                <a:cs typeface="+mn-cs"/>
-              </a:defRPr>
-            </a:lvl2pPr>
-            <a:lvl3pPr marL="914400" indent="-246888" algn="l" rtl="0" eaLnBrk="1" latinLnBrk="0" hangingPunct="1">
-              <a:spcBef>
-                <a:spcPct val="20000"/>
-              </a:spcBef>
-              <a:buClrTx/>
-              <a:buSzPct val="70000"/>
-              <a:buFont typeface="Wingdings 2"/>
-              <a:buChar char=""/>
-              <a:defRPr kumimoji="0" sz="2400" kern="1200">
-                <a:solidFill>
-                  <a:schemeClr val="tx1"/>
-                </a:solidFill>
-                <a:latin typeface="+mn-lt"/>
-                <a:ea typeface="+mn-ea"/>
-                <a:cs typeface="+mn-cs"/>
-              </a:defRPr>
-            </a:lvl3pPr>
-            <a:lvl4pPr marL="1188720" indent="-210312" algn="l" rtl="0" eaLnBrk="1" latinLnBrk="0" hangingPunct="1">
-              <a:spcBef>
-                <a:spcPct val="20000"/>
-              </a:spcBef>
-              <a:buClrTx/>
-              <a:buSzPct val="65000"/>
-              <a:buFont typeface="Wingdings 2"/>
-              <a:buChar char=""/>
-              <a:defRPr kumimoji="0" sz="2000" kern="1200">
-                <a:solidFill>
-                  <a:schemeClr val="tx1"/>
-                </a:solidFill>
-                <a:latin typeface="+mn-lt"/>
-                <a:ea typeface="+mn-ea"/>
-                <a:cs typeface="+mn-cs"/>
-              </a:defRPr>
-            </a:lvl4pPr>
-            <a:lvl5pPr marL="1463040" indent="-210312" algn="l" rtl="0" eaLnBrk="1" latinLnBrk="0" hangingPunct="1">
-              <a:spcBef>
-                <a:spcPct val="20000"/>
-              </a:spcBef>
-              <a:buClrTx/>
-              <a:buSzPct val="65000"/>
-              <a:buFont typeface="Wingdings 2"/>
-              <a:buChar char=""/>
-              <a:defRPr kumimoji="0" sz="1800" kern="1200">
-                <a:solidFill>
-                  <a:schemeClr val="tx1"/>
-                </a:solidFill>
-                <a:latin typeface="+mn-lt"/>
-                <a:ea typeface="+mn-ea"/>
-                <a:cs typeface="+mn-cs"/>
-              </a:defRPr>
-            </a:lvl5pPr>
-            <a:lvl6pPr marL="1737360" indent="-210312" algn="l" rtl="0" eaLnBrk="1" latinLnBrk="0" hangingPunct="1">
-              <a:spcBef>
-                <a:spcPct val="20000"/>
-              </a:spcBef>
-              <a:buClr>
-                <a:schemeClr val="accent5"/>
-              </a:buClr>
-              <a:buSzPct val="80000"/>
-              <a:buFont typeface="Wingdings 2"/>
-              <a:buChar char=""/>
-              <a:defRPr kumimoji="0" sz="1800" kern="1200">
-                <a:solidFill>
-                  <a:schemeClr val="tx1"/>
-                </a:solidFill>
-                <a:latin typeface="+mn-lt"/>
-                <a:ea typeface="+mn-ea"/>
-                <a:cs typeface="+mn-cs"/>
-              </a:defRPr>
-            </a:lvl6pPr>
-            <a:lvl7pPr marL="1920240" indent="-182880" algn="l" rtl="0" eaLnBrk="1" latinLnBrk="0" hangingPunct="1">
-              <a:spcBef>
-                <a:spcPct val="20000"/>
-              </a:spcBef>
-              <a:buClr>
-                <a:schemeClr val="accent6"/>
-              </a:buClr>
-              <a:buSzPct val="80000"/>
-              <a:buFont typeface="Wingdings 2"/>
-              <a:buChar char=""/>
-              <a:defRPr kumimoji="0" sz="1600" kern="1200" baseline="0">
-                <a:solidFill>
-                  <a:schemeClr val="tx1"/>
-                </a:solidFill>
-                <a:latin typeface="+mn-lt"/>
-                <a:ea typeface="+mn-ea"/>
-                <a:cs typeface="+mn-cs"/>
-              </a:defRPr>
-            </a:lvl7pPr>
-            <a:lvl8pPr marL="2194560" indent="-182880" algn="l" rtl="0" eaLnBrk="1" latinLnBrk="0" hangingPunct="1">
-              <a:spcBef>
-                <a:spcPct val="20000"/>
-              </a:spcBef>
-              <a:buClr>
-                <a:schemeClr val="tx2"/>
-              </a:buClr>
-              <a:buChar char="•"/>
-              <a:defRPr kumimoji="0" sz="1600" kern="1200">
-                <a:solidFill>
-                  <a:schemeClr val="tx1"/>
-                </a:solidFill>
-                <a:latin typeface="+mn-lt"/>
-                <a:ea typeface="+mn-ea"/>
-                <a:cs typeface="+mn-cs"/>
-              </a:defRPr>
-            </a:lvl8pPr>
-            <a:lvl9pPr marL="2468880" indent="-182880" algn="l" rtl="0" eaLnBrk="1" latinLnBrk="0" hangingPunct="1">
-              <a:spcBef>
-                <a:spcPct val="20000"/>
-              </a:spcBef>
-              <a:buClr>
-                <a:schemeClr val="tx2"/>
-              </a:buClr>
-              <a:buFontTx/>
-              <a:buChar char="•"/>
-              <a:defRPr kumimoji="0" sz="1400" kern="1200" baseline="0">
-                <a:solidFill>
-                  <a:schemeClr val="tx1"/>
-                </a:solidFill>
-                <a:latin typeface="+mn-lt"/>
-                <a:ea typeface="+mn-ea"/>
-                <a:cs typeface="+mn-cs"/>
-              </a:defRPr>
-            </a:lvl9pPr>
-          </a:lstStyle>
-          <a:p>
-            <a:pPr marL="0" indent="0">
-              <a:buNone/>
-            </a:pPr>
-            <a:r>
-              <a:rPr lang="en-US" b="1" dirty="0" smtClean="0"/>
-              <a:t>Build</a:t>
-            </a:r>
-          </a:p>
-          <a:p>
-            <a:pPr marL="0" indent="0">
-              <a:buNone/>
-            </a:pPr>
-            <a:endParaRPr lang="en-US" b="1" dirty="0" smtClean="0"/>
-          </a:p>
-          <a:p>
-            <a:pPr marL="0" indent="0">
-              <a:buNone/>
-            </a:pPr>
-            <a:r>
-              <a:rPr lang="en-US" i="1" dirty="0" smtClean="0"/>
-              <a:t>PRO: progettazione e realizzazione ad hoc del sistema e dell’interfaccia.</a:t>
-            </a:r>
-          </a:p>
-          <a:p>
-            <a:pPr marL="0" indent="0">
-              <a:buNone/>
-            </a:pPr>
-            <a:endParaRPr lang="en-US" dirty="0" smtClean="0"/>
-          </a:p>
-          <a:p>
-            <a:pPr marL="0" indent="0">
-              <a:buNone/>
-            </a:pPr>
-            <a:r>
-              <a:rPr lang="en-US" i="1" dirty="0" smtClean="0"/>
-              <a:t>CONTRO: necessario spendere molte  risorse per la realizzazione. </a:t>
-            </a:r>
-          </a:p>
-        </p:txBody>
-      </p:sp>
-    </p:spTree>
-    <p:extLst>
-      <p:ext uri="{BB962C8B-B14F-4D97-AF65-F5344CB8AC3E}">
-        <p14:creationId xmlns="" xmlns:p14="http://schemas.microsoft.com/office/powerpoint/2010/main" val="155874689"/>
-      </p:ext>
-    </p:extLst>
-  </p:cSld>
-  <p:clrMapOvr>
-    <a:masterClrMapping/>
-  </p:clrMapOvr>
-  <mc:AlternateContent xmlns:mc="http://schemas.openxmlformats.org/markup-compatibility/2006">
-    <mc:Choice xmlns="" xmlns:p14="http://schemas.microsoft.com/office/powerpoint/2010/main" Requires="p14">
-      <p:transition spd="slow" p14:dur="2000"/>
-    </mc:Choice>
-    <mc:Fallback>
-      <p:transition spd="slow"/>
-    </mc:Fallback>
-  </mc:AlternateContent>
-  <p:timing>
-    <p:tnLst>
-      <p:par>
-        <p:cTn id="1" dur="indefinite" restart="never" nodeType="tmRoot">
-          <p:childTnLst>
-            <p:seq concurrent="1" nextAc="seek">
-              <p:cTn id="2" dur="indefinite" nodeType="mainSeq">
-                <p:childTnLst>
-                  <p:par>
-                    <p:cTn id="3" fill="hold">
-                      <p:stCondLst>
-                        <p:cond delay="indefinite"/>
-                      </p:stCondLst>
-                      <p:childTnLst>
-                        <p:par>
-                          <p:cTn id="4" fill="hold">
-                            <p:stCondLst>
-                              <p:cond delay="0"/>
-                            </p:stCondLst>
-                            <p:childTnLst>
-                              <p:par>
-                                <p:cTn id="5" presetID="2" presetClass="entr" presetSubtype="4" fill="hold" grpId="0" nodeType="clickEffect">
-                                  <p:stCondLst>
-                                    <p:cond delay="0"/>
-                                  </p:stCondLst>
-                                  <p:childTnLst>
-                                    <p:set>
-                                      <p:cBhvr>
-                                        <p:cTn id="6" dur="1" fill="hold">
-                                          <p:stCondLst>
-                                            <p:cond delay="0"/>
-                                          </p:stCondLst>
-                                        </p:cTn>
-                                        <p:tgtEl>
-                                          <p:spTgt spid="10">
-                                            <p:txEl>
-                                              <p:pRg st="0" end="0"/>
-                                            </p:txEl>
-                                          </p:spTgt>
-                                        </p:tgtEl>
-                                        <p:attrNameLst>
-                                          <p:attrName>style.visibility</p:attrName>
-                                        </p:attrNameLst>
-                                      </p:cBhvr>
-                                      <p:to>
-                                        <p:strVal val="visible"/>
-                                      </p:to>
-                                    </p:set>
-                                    <p:anim calcmode="lin" valueType="num">
-                                      <p:cBhvr additive="base">
-                                        <p:cTn id="7" dur="500" fill="hold"/>
-                                        <p:tgtEl>
-                                          <p:spTgt spid="10">
-                                            <p:txEl>
-                                              <p:pRg st="0" end="0"/>
-                                            </p:txEl>
-                                          </p:spTgt>
-                                        </p:tgtEl>
-                                        <p:attrNameLst>
-                                          <p:attrName>ppt_x</p:attrName>
-                                        </p:attrNameLst>
-                                      </p:cBhvr>
-                                      <p:tavLst>
-                                        <p:tav tm="0">
-                                          <p:val>
-                                            <p:strVal val="#ppt_x"/>
-                                          </p:val>
-                                        </p:tav>
-                                        <p:tav tm="100000">
-                                          <p:val>
-                                            <p:strVal val="#ppt_x"/>
-                                          </p:val>
-                                        </p:tav>
-                                      </p:tavLst>
-                                    </p:anim>
-                                    <p:anim calcmode="lin" valueType="num">
-                                      <p:cBhvr additive="base">
-                                        <p:cTn id="8" dur="500" fill="hold"/>
-                                        <p:tgtEl>
-                                          <p:spTgt spid="10">
-                                            <p:txEl>
-                                              <p:pRg st="0" end="0"/>
-                                            </p:txEl>
-                                          </p:spTgt>
-                                        </p:tgtEl>
-                                        <p:attrNameLst>
-                                          <p:attrName>ppt_y</p:attrName>
-                                        </p:attrNameLst>
-                                      </p:cBhvr>
-                                      <p:tavLst>
-                                        <p:tav tm="0">
-                                          <p:val>
-                                            <p:strVal val="1+#ppt_h/2"/>
-                                          </p:val>
-                                        </p:tav>
-                                        <p:tav tm="100000">
-                                          <p:val>
-                                            <p:strVal val="#ppt_y"/>
-                                          </p:val>
-                                        </p:tav>
-                                      </p:tavLst>
-                                    </p:anim>
-                                  </p:childTnLst>
-                                </p:cTn>
-                              </p:par>
-                            </p:childTnLst>
-                          </p:cTn>
-                        </p:par>
-                      </p:childTnLst>
-                    </p:cTn>
-                  </p:par>
-                  <p:par>
-                    <p:cTn id="9" fill="hold">
-                      <p:stCondLst>
-                        <p:cond delay="indefinite"/>
-                      </p:stCondLst>
-                      <p:childTnLst>
-                        <p:par>
-                          <p:cTn id="10" fill="hold">
-                            <p:stCondLst>
-                              <p:cond delay="0"/>
-                            </p:stCondLst>
-                            <p:childTnLst>
-                              <p:par>
-                                <p:cTn id="11" presetID="2" presetClass="entr" presetSubtype="4" fill="hold" grpId="0" nodeType="clickEffect">
-                                  <p:stCondLst>
-                                    <p:cond delay="0"/>
-                                  </p:stCondLst>
-                                  <p:childTnLst>
-                                    <p:set>
-                                      <p:cBhvr>
-                                        <p:cTn id="12" dur="1" fill="hold">
-                                          <p:stCondLst>
-                                            <p:cond delay="0"/>
-                                          </p:stCondLst>
-                                        </p:cTn>
-                                        <p:tgtEl>
-                                          <p:spTgt spid="10">
-                                            <p:txEl>
-                                              <p:pRg st="2" end="2"/>
-                                            </p:txEl>
-                                          </p:spTgt>
-                                        </p:tgtEl>
-                                        <p:attrNameLst>
-                                          <p:attrName>style.visibility</p:attrName>
-                                        </p:attrNameLst>
-                                      </p:cBhvr>
-                                      <p:to>
-                                        <p:strVal val="visible"/>
-                                      </p:to>
-                                    </p:set>
-                                    <p:anim calcmode="lin" valueType="num">
-                                      <p:cBhvr additive="base">
-                                        <p:cTn id="13" dur="500" fill="hold"/>
-                                        <p:tgtEl>
-                                          <p:spTgt spid="10">
-                                            <p:txEl>
-                                              <p:pRg st="2" end="2"/>
-                                            </p:txEl>
-                                          </p:spTgt>
-                                        </p:tgtEl>
-                                        <p:attrNameLst>
-                                          <p:attrName>ppt_x</p:attrName>
-                                        </p:attrNameLst>
-                                      </p:cBhvr>
-                                      <p:tavLst>
-                                        <p:tav tm="0">
-                                          <p:val>
-                                            <p:strVal val="#ppt_x"/>
-                                          </p:val>
-                                        </p:tav>
-                                        <p:tav tm="100000">
-                                          <p:val>
-                                            <p:strVal val="#ppt_x"/>
-                                          </p:val>
-                                        </p:tav>
-                                      </p:tavLst>
-                                    </p:anim>
-                                    <p:anim calcmode="lin" valueType="num">
-                                      <p:cBhvr additive="base">
-                                        <p:cTn id="14" dur="500" fill="hold"/>
-                                        <p:tgtEl>
-                                          <p:spTgt spid="10">
-                                            <p:txEl>
-                                              <p:pRg st="2" end="2"/>
-                                            </p:txEl>
-                                          </p:spTgt>
-                                        </p:tgtEl>
-                                        <p:attrNameLst>
-                                          <p:attrName>ppt_y</p:attrName>
-                                        </p:attrNameLst>
-                                      </p:cBhvr>
-                                      <p:tavLst>
-                                        <p:tav tm="0">
-                                          <p:val>
-                                            <p:strVal val="1+#ppt_h/2"/>
-                                          </p:val>
-                                        </p:tav>
-                                        <p:tav tm="100000">
-                                          <p:val>
-                                            <p:strVal val="#ppt_y"/>
-                                          </p:val>
-                                        </p:tav>
-                                      </p:tavLst>
-                                    </p:anim>
-                                  </p:childTnLst>
-                                </p:cTn>
-                              </p:par>
-                            </p:childTnLst>
-                          </p:cTn>
-                        </p:par>
-                      </p:childTnLst>
-                    </p:cTn>
-                  </p:par>
-                  <p:par>
-                    <p:cTn id="15" fill="hold">
-                      <p:stCondLst>
-                        <p:cond delay="indefinite"/>
-                      </p:stCondLst>
-                      <p:childTnLst>
-                        <p:par>
-                          <p:cTn id="16" fill="hold">
-                            <p:stCondLst>
-                              <p:cond delay="0"/>
-                            </p:stCondLst>
-                            <p:childTnLst>
-                              <p:par>
-                                <p:cTn id="17" presetID="2" presetClass="entr" presetSubtype="4" fill="hold" grpId="0" nodeType="clickEffect">
-                                  <p:stCondLst>
-                                    <p:cond delay="0"/>
-                                  </p:stCondLst>
-                                  <p:childTnLst>
-                                    <p:set>
-                                      <p:cBhvr>
-                                        <p:cTn id="18" dur="1" fill="hold">
-                                          <p:stCondLst>
-                                            <p:cond delay="0"/>
-                                          </p:stCondLst>
-                                        </p:cTn>
-                                        <p:tgtEl>
-                                          <p:spTgt spid="10">
-                                            <p:txEl>
-                                              <p:pRg st="4" end="4"/>
-                                            </p:txEl>
-                                          </p:spTgt>
-                                        </p:tgtEl>
-                                        <p:attrNameLst>
-                                          <p:attrName>style.visibility</p:attrName>
-                                        </p:attrNameLst>
-                                      </p:cBhvr>
-                                      <p:to>
-                                        <p:strVal val="visible"/>
-                                      </p:to>
-                                    </p:set>
-                                    <p:anim calcmode="lin" valueType="num">
-                                      <p:cBhvr additive="base">
-                                        <p:cTn id="19" dur="500" fill="hold"/>
-                                        <p:tgtEl>
-                                          <p:spTgt spid="10">
-                                            <p:txEl>
-                                              <p:pRg st="4" end="4"/>
-                                            </p:txEl>
-                                          </p:spTgt>
-                                        </p:tgtEl>
-                                        <p:attrNameLst>
-                                          <p:attrName>ppt_x</p:attrName>
-                                        </p:attrNameLst>
-                                      </p:cBhvr>
-                                      <p:tavLst>
-                                        <p:tav tm="0">
-                                          <p:val>
-                                            <p:strVal val="#ppt_x"/>
-                                          </p:val>
-                                        </p:tav>
-                                        <p:tav tm="100000">
-                                          <p:val>
-                                            <p:strVal val="#ppt_x"/>
-                                          </p:val>
-                                        </p:tav>
-                                      </p:tavLst>
-                                    </p:anim>
-                                    <p:anim calcmode="lin" valueType="num">
-                                      <p:cBhvr additive="base">
-                                        <p:cTn id="20" dur="500" fill="hold"/>
-                                        <p:tgtEl>
-                                          <p:spTgt spid="10">
-                                            <p:txEl>
-                                              <p:pRg st="4" end="4"/>
-                                            </p:txEl>
-                                          </p:spTgt>
-                                        </p:tgtEl>
-                                        <p:attrNameLst>
-                                          <p:attrName>ppt_y</p:attrName>
-                                        </p:attrNameLst>
-                                      </p:cBhvr>
-                                      <p:tavLst>
-                                        <p:tav tm="0">
-                                          <p:val>
-                                            <p:strVal val="1+#ppt_h/2"/>
-                                          </p:val>
-                                        </p:tav>
-                                        <p:tav tm="100000">
-                                          <p:val>
-                                            <p:strVal val="#ppt_y"/>
-                                          </p:val>
-                                        </p:tav>
-                                      </p:tavLst>
-                                    </p:anim>
-                                  </p:childTnLst>
-                                </p:cTn>
-                              </p:par>
-                            </p:childTnLst>
-                          </p:cTn>
-                        </p:par>
-                      </p:childTnLst>
-                    </p:cTn>
-                  </p:par>
-                </p:childTnLst>
-              </p:cTn>
-              <p:prevCondLst>
-                <p:cond evt="onPrev" delay="0">
-                  <p:tgtEl>
-                    <p:sldTgt/>
-                  </p:tgtEl>
-                </p:cond>
-              </p:prevCondLst>
-              <p:nextCondLst>
-                <p:cond evt="onNext" delay="0">
-                  <p:tgtEl>
-                    <p:sldTgt/>
-                  </p:tgtEl>
-                </p:cond>
-              </p:nextCondLst>
-            </p:seq>
-          </p:childTnLst>
-        </p:cTn>
-      </p:par>
-    </p:tnLst>
-    <p:bldLst>
-      <p:bldP spid="10" grpId="0" build="p"/>
-    </p:bldLst>
-  </p:timing>
-</p:sld>
-</file>
-
 <file path=ppt/slides/slide29.xml><?xml version="1.0" encoding="utf-8"?>
 <p:sld xmlns:a="http://schemas.openxmlformats.org/drawingml/2006/main" xmlns:r="http://schemas.openxmlformats.org/officeDocument/2006/relationships" xmlns:p="http://schemas.openxmlformats.org/presentationml/2006/main">
   <p:cSld>
@@ -13148,7 +12856,7 @@
             </a:pPr>
             <a:r>
               <a:rPr lang="en-US" b="1" dirty="0" smtClean="0"/>
-              <a:t>Buy</a:t>
+              <a:t>Build</a:t>
             </a:r>
           </a:p>
           <a:p>
@@ -13163,7 +12871,7 @@
             </a:pPr>
             <a:r>
               <a:rPr lang="en-US" i="1" dirty="0" smtClean="0"/>
-              <a:t>PRO: risultato immediato.</a:t>
+              <a:t>PRO: progettazione e realizzazione ad hoc del sistema e dell’interfaccia.</a:t>
             </a:r>
           </a:p>
           <a:p>
@@ -13178,7 +12886,7 @@
             </a:pPr>
             <a:r>
               <a:rPr lang="en-US" i="1" dirty="0" smtClean="0"/>
-              <a:t>CONTRO: poco personalizzabile, costi, usabilità.  </a:t>
+              <a:t>CONTRO: necessario spendere molte  risorse per la realizzazione. </a:t>
             </a:r>
           </a:p>
         </p:txBody>
@@ -13186,7 +12894,7 @@
     </p:spTree>
     <p:extLst>
       <p:ext uri="{BB962C8B-B14F-4D97-AF65-F5344CB8AC3E}">
-        <p14:creationId xmlns="" xmlns:p14="http://schemas.microsoft.com/office/powerpoint/2010/main" val="155874689"/>
+        <p14:creationId xmlns:p14="http://schemas.microsoft.com/office/powerpoint/2010/main" xmlns="" val="155874689"/>
       </p:ext>
     </p:extLst>
   </p:cSld>
@@ -13194,7 +12902,7 @@
     <a:masterClrMapping/>
   </p:clrMapOvr>
   <mc:AlternateContent xmlns:mc="http://schemas.openxmlformats.org/markup-compatibility/2006">
-    <mc:Choice xmlns="" xmlns:p14="http://schemas.microsoft.com/office/powerpoint/2010/main" Requires="p14">
+    <mc:Choice xmlns:p14="http://schemas.microsoft.com/office/powerpoint/2010/main" xmlns="" Requires="p14">
       <p:transition spd="slow" p14:dur="2000"/>
     </mc:Choice>
     <mc:Fallback>
@@ -13999,7 +13707,7 @@
     </p:spTree>
     <p:extLst>
       <p:ext uri="{BB962C8B-B14F-4D97-AF65-F5344CB8AC3E}">
-        <p14:creationId xmlns="" xmlns:p14="http://schemas.microsoft.com/office/powerpoint/2010/main" val="155874689"/>
+        <p14:creationId xmlns:p14="http://schemas.microsoft.com/office/powerpoint/2010/main" xmlns="" val="155874689"/>
       </p:ext>
     </p:extLst>
   </p:cSld>
@@ -14007,7 +13715,7 @@
     <a:masterClrMapping/>
   </p:clrMapOvr>
   <mc:AlternateContent xmlns:mc="http://schemas.openxmlformats.org/markup-compatibility/2006">
-    <mc:Choice xmlns="" xmlns:p14="http://schemas.microsoft.com/office/powerpoint/2010/main" Requires="p14">
+    <mc:Choice xmlns:p14="http://schemas.microsoft.com/office/powerpoint/2010/main" xmlns="" Requires="p14">
       <p:transition spd="slow" p14:dur="2000"/>
     </mc:Choice>
     <mc:Fallback>
@@ -14050,6 +13758,647 @@
         <p:spPr>
           <a:xfrm>
             <a:off x="1928794" y="428604"/>
+            <a:ext cx="5214974" cy="1107996"/>
+          </a:xfrm>
+          <a:prstGeom prst="rect">
+            <a:avLst/>
+          </a:prstGeom>
+          <a:noFill/>
+        </p:spPr>
+        <p:txBody>
+          <a:bodyPr wrap="square" rtlCol="0">
+            <a:spAutoFit/>
+          </a:bodyPr>
+          <a:lstStyle/>
+          <a:p>
+            <a:pPr algn="ctr"/>
+            <a:r>
+              <a:rPr lang="it-IT" sz="4800" b="1" dirty="0" smtClean="0">
+                <a:latin typeface="+mj-lt"/>
+              </a:rPr>
+              <a:t>Build VS Buy</a:t>
+            </a:r>
+            <a:endParaRPr lang="it-IT" sz="2800" b="1" dirty="0" smtClean="0">
+              <a:latin typeface="+mj-lt"/>
+            </a:endParaRPr>
+          </a:p>
+          <a:p>
+            <a:pPr algn="ctr"/>
+            <a:endParaRPr lang="it-IT" dirty="0">
+              <a:latin typeface="+mj-lt"/>
+            </a:endParaRPr>
+          </a:p>
+        </p:txBody>
+      </p:sp>
+      <p:sp>
+        <p:nvSpPr>
+          <p:cNvPr id="10" name="Content Placeholder 3"/>
+          <p:cNvSpPr txBox="1">
+            <a:spLocks/>
+          </p:cNvSpPr>
+          <p:nvPr/>
+        </p:nvSpPr>
+        <p:spPr>
+          <a:xfrm>
+            <a:off x="285720" y="2214554"/>
+            <a:ext cx="8429684" cy="3929090"/>
+          </a:xfrm>
+          <a:prstGeom prst="rect">
+            <a:avLst/>
+          </a:prstGeom>
+        </p:spPr>
+        <p:txBody>
+          <a:bodyPr tIns="0"/>
+          <a:lstStyle>
+            <a:lvl1pPr marL="274320" indent="-274320" algn="l" rtl="0" eaLnBrk="1" latinLnBrk="0" hangingPunct="1">
+              <a:spcBef>
+                <a:spcPct val="20000"/>
+              </a:spcBef>
+              <a:buClrTx/>
+              <a:buSzPct val="95000"/>
+              <a:buFont typeface="Wingdings" pitchFamily="2" charset="2"/>
+              <a:buChar char="v"/>
+              <a:defRPr kumimoji="0" sz="2800" kern="1200">
+                <a:solidFill>
+                  <a:schemeClr val="tx1"/>
+                </a:solidFill>
+                <a:latin typeface="+mn-lt"/>
+                <a:ea typeface="+mn-ea"/>
+                <a:cs typeface="+mn-cs"/>
+              </a:defRPr>
+            </a:lvl1pPr>
+            <a:lvl2pPr marL="640080" indent="-246888" algn="l" rtl="0" eaLnBrk="1" latinLnBrk="0" hangingPunct="1">
+              <a:spcBef>
+                <a:spcPct val="20000"/>
+              </a:spcBef>
+              <a:buClrTx/>
+              <a:buSzPct val="85000"/>
+              <a:buFont typeface="Courier New" pitchFamily="49" charset="0"/>
+              <a:buChar char="o"/>
+              <a:defRPr kumimoji="0" sz="2600" kern="1200">
+                <a:solidFill>
+                  <a:schemeClr val="tx1"/>
+                </a:solidFill>
+                <a:latin typeface="+mn-lt"/>
+                <a:ea typeface="+mn-ea"/>
+                <a:cs typeface="+mn-cs"/>
+              </a:defRPr>
+            </a:lvl2pPr>
+            <a:lvl3pPr marL="914400" indent="-246888" algn="l" rtl="0" eaLnBrk="1" latinLnBrk="0" hangingPunct="1">
+              <a:spcBef>
+                <a:spcPct val="20000"/>
+              </a:spcBef>
+              <a:buClrTx/>
+              <a:buSzPct val="70000"/>
+              <a:buFont typeface="Wingdings 2"/>
+              <a:buChar char=""/>
+              <a:defRPr kumimoji="0" sz="2400" kern="1200">
+                <a:solidFill>
+                  <a:schemeClr val="tx1"/>
+                </a:solidFill>
+                <a:latin typeface="+mn-lt"/>
+                <a:ea typeface="+mn-ea"/>
+                <a:cs typeface="+mn-cs"/>
+              </a:defRPr>
+            </a:lvl3pPr>
+            <a:lvl4pPr marL="1188720" indent="-210312" algn="l" rtl="0" eaLnBrk="1" latinLnBrk="0" hangingPunct="1">
+              <a:spcBef>
+                <a:spcPct val="20000"/>
+              </a:spcBef>
+              <a:buClrTx/>
+              <a:buSzPct val="65000"/>
+              <a:buFont typeface="Wingdings 2"/>
+              <a:buChar char=""/>
+              <a:defRPr kumimoji="0" sz="2000" kern="1200">
+                <a:solidFill>
+                  <a:schemeClr val="tx1"/>
+                </a:solidFill>
+                <a:latin typeface="+mn-lt"/>
+                <a:ea typeface="+mn-ea"/>
+                <a:cs typeface="+mn-cs"/>
+              </a:defRPr>
+            </a:lvl4pPr>
+            <a:lvl5pPr marL="1463040" indent="-210312" algn="l" rtl="0" eaLnBrk="1" latinLnBrk="0" hangingPunct="1">
+              <a:spcBef>
+                <a:spcPct val="20000"/>
+              </a:spcBef>
+              <a:buClrTx/>
+              <a:buSzPct val="65000"/>
+              <a:buFont typeface="Wingdings 2"/>
+              <a:buChar char=""/>
+              <a:defRPr kumimoji="0" sz="1800" kern="1200">
+                <a:solidFill>
+                  <a:schemeClr val="tx1"/>
+                </a:solidFill>
+                <a:latin typeface="+mn-lt"/>
+                <a:ea typeface="+mn-ea"/>
+                <a:cs typeface="+mn-cs"/>
+              </a:defRPr>
+            </a:lvl5pPr>
+            <a:lvl6pPr marL="1737360" indent="-210312" algn="l" rtl="0" eaLnBrk="1" latinLnBrk="0" hangingPunct="1">
+              <a:spcBef>
+                <a:spcPct val="20000"/>
+              </a:spcBef>
+              <a:buClr>
+                <a:schemeClr val="accent5"/>
+              </a:buClr>
+              <a:buSzPct val="80000"/>
+              <a:buFont typeface="Wingdings 2"/>
+              <a:buChar char=""/>
+              <a:defRPr kumimoji="0" sz="1800" kern="1200">
+                <a:solidFill>
+                  <a:schemeClr val="tx1"/>
+                </a:solidFill>
+                <a:latin typeface="+mn-lt"/>
+                <a:ea typeface="+mn-ea"/>
+                <a:cs typeface="+mn-cs"/>
+              </a:defRPr>
+            </a:lvl6pPr>
+            <a:lvl7pPr marL="1920240" indent="-182880" algn="l" rtl="0" eaLnBrk="1" latinLnBrk="0" hangingPunct="1">
+              <a:spcBef>
+                <a:spcPct val="20000"/>
+              </a:spcBef>
+              <a:buClr>
+                <a:schemeClr val="accent6"/>
+              </a:buClr>
+              <a:buSzPct val="80000"/>
+              <a:buFont typeface="Wingdings 2"/>
+              <a:buChar char=""/>
+              <a:defRPr kumimoji="0" sz="1600" kern="1200" baseline="0">
+                <a:solidFill>
+                  <a:schemeClr val="tx1"/>
+                </a:solidFill>
+                <a:latin typeface="+mn-lt"/>
+                <a:ea typeface="+mn-ea"/>
+                <a:cs typeface="+mn-cs"/>
+              </a:defRPr>
+            </a:lvl7pPr>
+            <a:lvl8pPr marL="2194560" indent="-182880" algn="l" rtl="0" eaLnBrk="1" latinLnBrk="0" hangingPunct="1">
+              <a:spcBef>
+                <a:spcPct val="20000"/>
+              </a:spcBef>
+              <a:buClr>
+                <a:schemeClr val="tx2"/>
+              </a:buClr>
+              <a:buChar char="•"/>
+              <a:defRPr kumimoji="0" sz="1600" kern="1200">
+                <a:solidFill>
+                  <a:schemeClr val="tx1"/>
+                </a:solidFill>
+                <a:latin typeface="+mn-lt"/>
+                <a:ea typeface="+mn-ea"/>
+                <a:cs typeface="+mn-cs"/>
+              </a:defRPr>
+            </a:lvl8pPr>
+            <a:lvl9pPr marL="2468880" indent="-182880" algn="l" rtl="0" eaLnBrk="1" latinLnBrk="0" hangingPunct="1">
+              <a:spcBef>
+                <a:spcPct val="20000"/>
+              </a:spcBef>
+              <a:buClr>
+                <a:schemeClr val="tx2"/>
+              </a:buClr>
+              <a:buFontTx/>
+              <a:buChar char="•"/>
+              <a:defRPr kumimoji="0" sz="1400" kern="1200" baseline="0">
+                <a:solidFill>
+                  <a:schemeClr val="tx1"/>
+                </a:solidFill>
+                <a:latin typeface="+mn-lt"/>
+                <a:ea typeface="+mn-ea"/>
+                <a:cs typeface="+mn-cs"/>
+              </a:defRPr>
+            </a:lvl9pPr>
+          </a:lstStyle>
+          <a:p>
+            <a:pPr marL="0" indent="0">
+              <a:buNone/>
+            </a:pPr>
+            <a:r>
+              <a:rPr lang="en-US" b="1" dirty="0" smtClean="0"/>
+              <a:t>Buy</a:t>
+            </a:r>
+          </a:p>
+          <a:p>
+            <a:pPr marL="0" indent="0">
+              <a:buNone/>
+            </a:pPr>
+            <a:endParaRPr lang="en-US" b="1" dirty="0" smtClean="0"/>
+          </a:p>
+          <a:p>
+            <a:pPr marL="0" indent="0">
+              <a:buNone/>
+            </a:pPr>
+            <a:r>
+              <a:rPr lang="en-US" i="1" dirty="0" smtClean="0"/>
+              <a:t>PRO: risultato immediato.</a:t>
+            </a:r>
+          </a:p>
+          <a:p>
+            <a:pPr marL="0" indent="0">
+              <a:buNone/>
+            </a:pPr>
+            <a:endParaRPr lang="en-US" dirty="0" smtClean="0"/>
+          </a:p>
+          <a:p>
+            <a:pPr marL="0" indent="0">
+              <a:buNone/>
+            </a:pPr>
+            <a:r>
+              <a:rPr lang="en-US" i="1" dirty="0" smtClean="0"/>
+              <a:t>CONTRO: poco personalizzabile, costi, usabilità.  </a:t>
+            </a:r>
+          </a:p>
+        </p:txBody>
+      </p:sp>
+    </p:spTree>
+    <p:extLst>
+      <p:ext uri="{BB962C8B-B14F-4D97-AF65-F5344CB8AC3E}">
+        <p14:creationId xmlns:p14="http://schemas.microsoft.com/office/powerpoint/2010/main" xmlns="" val="155874689"/>
+      </p:ext>
+    </p:extLst>
+  </p:cSld>
+  <p:clrMapOvr>
+    <a:masterClrMapping/>
+  </p:clrMapOvr>
+  <mc:AlternateContent xmlns:mc="http://schemas.openxmlformats.org/markup-compatibility/2006">
+    <mc:Choice xmlns:p14="http://schemas.microsoft.com/office/powerpoint/2010/main" xmlns="" Requires="p14">
+      <p:transition spd="slow" p14:dur="2000"/>
+    </mc:Choice>
+    <mc:Fallback>
+      <p:transition spd="slow"/>
+    </mc:Fallback>
+  </mc:AlternateContent>
+  <p:timing>
+    <p:tnLst>
+      <p:par>
+        <p:cTn id="1" dur="indefinite" restart="never" nodeType="tmRoot">
+          <p:childTnLst>
+            <p:seq concurrent="1" nextAc="seek">
+              <p:cTn id="2" dur="indefinite" nodeType="mainSeq">
+                <p:childTnLst>
+                  <p:par>
+                    <p:cTn id="3" fill="hold">
+                      <p:stCondLst>
+                        <p:cond delay="indefinite"/>
+                      </p:stCondLst>
+                      <p:childTnLst>
+                        <p:par>
+                          <p:cTn id="4" fill="hold">
+                            <p:stCondLst>
+                              <p:cond delay="0"/>
+                            </p:stCondLst>
+                            <p:childTnLst>
+                              <p:par>
+                                <p:cTn id="5" presetID="2" presetClass="entr" presetSubtype="4" fill="hold" grpId="0" nodeType="clickEffect">
+                                  <p:stCondLst>
+                                    <p:cond delay="0"/>
+                                  </p:stCondLst>
+                                  <p:childTnLst>
+                                    <p:set>
+                                      <p:cBhvr>
+                                        <p:cTn id="6" dur="1" fill="hold">
+                                          <p:stCondLst>
+                                            <p:cond delay="0"/>
+                                          </p:stCondLst>
+                                        </p:cTn>
+                                        <p:tgtEl>
+                                          <p:spTgt spid="10">
+                                            <p:txEl>
+                                              <p:pRg st="0" end="0"/>
+                                            </p:txEl>
+                                          </p:spTgt>
+                                        </p:tgtEl>
+                                        <p:attrNameLst>
+                                          <p:attrName>style.visibility</p:attrName>
+                                        </p:attrNameLst>
+                                      </p:cBhvr>
+                                      <p:to>
+                                        <p:strVal val="visible"/>
+                                      </p:to>
+                                    </p:set>
+                                    <p:anim calcmode="lin" valueType="num">
+                                      <p:cBhvr additive="base">
+                                        <p:cTn id="7" dur="500" fill="hold"/>
+                                        <p:tgtEl>
+                                          <p:spTgt spid="10">
+                                            <p:txEl>
+                                              <p:pRg st="0" end="0"/>
+                                            </p:txEl>
+                                          </p:spTgt>
+                                        </p:tgtEl>
+                                        <p:attrNameLst>
+                                          <p:attrName>ppt_x</p:attrName>
+                                        </p:attrNameLst>
+                                      </p:cBhvr>
+                                      <p:tavLst>
+                                        <p:tav tm="0">
+                                          <p:val>
+                                            <p:strVal val="#ppt_x"/>
+                                          </p:val>
+                                        </p:tav>
+                                        <p:tav tm="100000">
+                                          <p:val>
+                                            <p:strVal val="#ppt_x"/>
+                                          </p:val>
+                                        </p:tav>
+                                      </p:tavLst>
+                                    </p:anim>
+                                    <p:anim calcmode="lin" valueType="num">
+                                      <p:cBhvr additive="base">
+                                        <p:cTn id="8" dur="500" fill="hold"/>
+                                        <p:tgtEl>
+                                          <p:spTgt spid="10">
+                                            <p:txEl>
+                                              <p:pRg st="0" end="0"/>
+                                            </p:txEl>
+                                          </p:spTgt>
+                                        </p:tgtEl>
+                                        <p:attrNameLst>
+                                          <p:attrName>ppt_y</p:attrName>
+                                        </p:attrNameLst>
+                                      </p:cBhvr>
+                                      <p:tavLst>
+                                        <p:tav tm="0">
+                                          <p:val>
+                                            <p:strVal val="1+#ppt_h/2"/>
+                                          </p:val>
+                                        </p:tav>
+                                        <p:tav tm="100000">
+                                          <p:val>
+                                            <p:strVal val="#ppt_y"/>
+                                          </p:val>
+                                        </p:tav>
+                                      </p:tavLst>
+                                    </p:anim>
+                                  </p:childTnLst>
+                                </p:cTn>
+                              </p:par>
+                            </p:childTnLst>
+                          </p:cTn>
+                        </p:par>
+                      </p:childTnLst>
+                    </p:cTn>
+                  </p:par>
+                  <p:par>
+                    <p:cTn id="9" fill="hold">
+                      <p:stCondLst>
+                        <p:cond delay="indefinite"/>
+                      </p:stCondLst>
+                      <p:childTnLst>
+                        <p:par>
+                          <p:cTn id="10" fill="hold">
+                            <p:stCondLst>
+                              <p:cond delay="0"/>
+                            </p:stCondLst>
+                            <p:childTnLst>
+                              <p:par>
+                                <p:cTn id="11" presetID="2" presetClass="entr" presetSubtype="4" fill="hold" grpId="0" nodeType="clickEffect">
+                                  <p:stCondLst>
+                                    <p:cond delay="0"/>
+                                  </p:stCondLst>
+                                  <p:childTnLst>
+                                    <p:set>
+                                      <p:cBhvr>
+                                        <p:cTn id="12" dur="1" fill="hold">
+                                          <p:stCondLst>
+                                            <p:cond delay="0"/>
+                                          </p:stCondLst>
+                                        </p:cTn>
+                                        <p:tgtEl>
+                                          <p:spTgt spid="10">
+                                            <p:txEl>
+                                              <p:pRg st="2" end="2"/>
+                                            </p:txEl>
+                                          </p:spTgt>
+                                        </p:tgtEl>
+                                        <p:attrNameLst>
+                                          <p:attrName>style.visibility</p:attrName>
+                                        </p:attrNameLst>
+                                      </p:cBhvr>
+                                      <p:to>
+                                        <p:strVal val="visible"/>
+                                      </p:to>
+                                    </p:set>
+                                    <p:anim calcmode="lin" valueType="num">
+                                      <p:cBhvr additive="base">
+                                        <p:cTn id="13" dur="500" fill="hold"/>
+                                        <p:tgtEl>
+                                          <p:spTgt spid="10">
+                                            <p:txEl>
+                                              <p:pRg st="2" end="2"/>
+                                            </p:txEl>
+                                          </p:spTgt>
+                                        </p:tgtEl>
+                                        <p:attrNameLst>
+                                          <p:attrName>ppt_x</p:attrName>
+                                        </p:attrNameLst>
+                                      </p:cBhvr>
+                                      <p:tavLst>
+                                        <p:tav tm="0">
+                                          <p:val>
+                                            <p:strVal val="#ppt_x"/>
+                                          </p:val>
+                                        </p:tav>
+                                        <p:tav tm="100000">
+                                          <p:val>
+                                            <p:strVal val="#ppt_x"/>
+                                          </p:val>
+                                        </p:tav>
+                                      </p:tavLst>
+                                    </p:anim>
+                                    <p:anim calcmode="lin" valueType="num">
+                                      <p:cBhvr additive="base">
+                                        <p:cTn id="14" dur="500" fill="hold"/>
+                                        <p:tgtEl>
+                                          <p:spTgt spid="10">
+                                            <p:txEl>
+                                              <p:pRg st="2" end="2"/>
+                                            </p:txEl>
+                                          </p:spTgt>
+                                        </p:tgtEl>
+                                        <p:attrNameLst>
+                                          <p:attrName>ppt_y</p:attrName>
+                                        </p:attrNameLst>
+                                      </p:cBhvr>
+                                      <p:tavLst>
+                                        <p:tav tm="0">
+                                          <p:val>
+                                            <p:strVal val="1+#ppt_h/2"/>
+                                          </p:val>
+                                        </p:tav>
+                                        <p:tav tm="100000">
+                                          <p:val>
+                                            <p:strVal val="#ppt_y"/>
+                                          </p:val>
+                                        </p:tav>
+                                      </p:tavLst>
+                                    </p:anim>
+                                  </p:childTnLst>
+                                </p:cTn>
+                              </p:par>
+                            </p:childTnLst>
+                          </p:cTn>
+                        </p:par>
+                      </p:childTnLst>
+                    </p:cTn>
+                  </p:par>
+                  <p:par>
+                    <p:cTn id="15" fill="hold">
+                      <p:stCondLst>
+                        <p:cond delay="indefinite"/>
+                      </p:stCondLst>
+                      <p:childTnLst>
+                        <p:par>
+                          <p:cTn id="16" fill="hold">
+                            <p:stCondLst>
+                              <p:cond delay="0"/>
+                            </p:stCondLst>
+                            <p:childTnLst>
+                              <p:par>
+                                <p:cTn id="17" presetID="2" presetClass="entr" presetSubtype="4" fill="hold" grpId="0" nodeType="clickEffect">
+                                  <p:stCondLst>
+                                    <p:cond delay="0"/>
+                                  </p:stCondLst>
+                                  <p:childTnLst>
+                                    <p:set>
+                                      <p:cBhvr>
+                                        <p:cTn id="18" dur="1" fill="hold">
+                                          <p:stCondLst>
+                                            <p:cond delay="0"/>
+                                          </p:stCondLst>
+                                        </p:cTn>
+                                        <p:tgtEl>
+                                          <p:spTgt spid="10">
+                                            <p:txEl>
+                                              <p:pRg st="4" end="4"/>
+                                            </p:txEl>
+                                          </p:spTgt>
+                                        </p:tgtEl>
+                                        <p:attrNameLst>
+                                          <p:attrName>style.visibility</p:attrName>
+                                        </p:attrNameLst>
+                                      </p:cBhvr>
+                                      <p:to>
+                                        <p:strVal val="visible"/>
+                                      </p:to>
+                                    </p:set>
+                                    <p:anim calcmode="lin" valueType="num">
+                                      <p:cBhvr additive="base">
+                                        <p:cTn id="19" dur="500" fill="hold"/>
+                                        <p:tgtEl>
+                                          <p:spTgt spid="10">
+                                            <p:txEl>
+                                              <p:pRg st="4" end="4"/>
+                                            </p:txEl>
+                                          </p:spTgt>
+                                        </p:tgtEl>
+                                        <p:attrNameLst>
+                                          <p:attrName>ppt_x</p:attrName>
+                                        </p:attrNameLst>
+                                      </p:cBhvr>
+                                      <p:tavLst>
+                                        <p:tav tm="0">
+                                          <p:val>
+                                            <p:strVal val="#ppt_x"/>
+                                          </p:val>
+                                        </p:tav>
+                                        <p:tav tm="100000">
+                                          <p:val>
+                                            <p:strVal val="#ppt_x"/>
+                                          </p:val>
+                                        </p:tav>
+                                      </p:tavLst>
+                                    </p:anim>
+                                    <p:anim calcmode="lin" valueType="num">
+                                      <p:cBhvr additive="base">
+                                        <p:cTn id="20" dur="500" fill="hold"/>
+                                        <p:tgtEl>
+                                          <p:spTgt spid="10">
+                                            <p:txEl>
+                                              <p:pRg st="4" end="4"/>
+                                            </p:txEl>
+                                          </p:spTgt>
+                                        </p:tgtEl>
+                                        <p:attrNameLst>
+                                          <p:attrName>ppt_y</p:attrName>
+                                        </p:attrNameLst>
+                                      </p:cBhvr>
+                                      <p:tavLst>
+                                        <p:tav tm="0">
+                                          <p:val>
+                                            <p:strVal val="1+#ppt_h/2"/>
+                                          </p:val>
+                                        </p:tav>
+                                        <p:tav tm="100000">
+                                          <p:val>
+                                            <p:strVal val="#ppt_y"/>
+                                          </p:val>
+                                        </p:tav>
+                                      </p:tavLst>
+                                    </p:anim>
+                                  </p:childTnLst>
+                                </p:cTn>
+                              </p:par>
+                            </p:childTnLst>
+                          </p:cTn>
+                        </p:par>
+                      </p:childTnLst>
+                    </p:cTn>
+                  </p:par>
+                </p:childTnLst>
+              </p:cTn>
+              <p:prevCondLst>
+                <p:cond evt="onPrev" delay="0">
+                  <p:tgtEl>
+                    <p:sldTgt/>
+                  </p:tgtEl>
+                </p:cond>
+              </p:prevCondLst>
+              <p:nextCondLst>
+                <p:cond evt="onNext" delay="0">
+                  <p:tgtEl>
+                    <p:sldTgt/>
+                  </p:tgtEl>
+                </p:cond>
+              </p:nextCondLst>
+            </p:seq>
+          </p:childTnLst>
+        </p:cTn>
+      </p:par>
+    </p:tnLst>
+    <p:bldLst>
+      <p:bldP spid="10" grpId="0" build="p"/>
+    </p:bldLst>
+  </p:timing>
+</p:sld>
+</file>
+
+<file path=ppt/slides/slide31.xml><?xml version="1.0" encoding="utf-8"?>
+<p:sld xmlns:a="http://schemas.openxmlformats.org/drawingml/2006/main" xmlns:r="http://schemas.openxmlformats.org/officeDocument/2006/relationships" xmlns:p="http://schemas.openxmlformats.org/presentationml/2006/main">
+  <p:cSld>
+    <p:spTree>
+      <p:nvGrpSpPr>
+        <p:cNvPr id="1" name=""/>
+        <p:cNvGrpSpPr/>
+        <p:nvPr/>
+      </p:nvGrpSpPr>
+      <p:grpSpPr>
+        <a:xfrm>
+          <a:off x="0" y="0"/>
+          <a:ext cx="0" cy="0"/>
+          <a:chOff x="0" y="0"/>
+          <a:chExt cx="0" cy="0"/>
+        </a:xfrm>
+      </p:grpSpPr>
+      <p:sp>
+        <p:nvSpPr>
+          <p:cNvPr id="2" name="CasellaDiTesto 1"/>
+          <p:cNvSpPr txBox="1"/>
+          <p:nvPr/>
+        </p:nvSpPr>
+        <p:spPr>
+          <a:xfrm>
+            <a:off x="1928794" y="428604"/>
             <a:ext cx="6000792" cy="1107996"/>
           </a:xfrm>
           <a:prstGeom prst="rect">
@@ -14327,7 +14676,7 @@
     </p:spTree>
     <p:extLst>
       <p:ext uri="{BB962C8B-B14F-4D97-AF65-F5344CB8AC3E}">
-        <p14:creationId xmlns="" xmlns:p14="http://schemas.microsoft.com/office/powerpoint/2010/main" val="155874689"/>
+        <p14:creationId xmlns:p14="http://schemas.microsoft.com/office/powerpoint/2010/main" xmlns="" val="155874689"/>
       </p:ext>
     </p:extLst>
   </p:cSld>
@@ -14335,7 +14684,7 @@
     <a:masterClrMapping/>
   </p:clrMapOvr>
   <mc:AlternateContent xmlns:mc="http://schemas.openxmlformats.org/markup-compatibility/2006">
-    <mc:Choice xmlns="" xmlns:p14="http://schemas.microsoft.com/office/powerpoint/2010/main" Requires="p14">
+    <mc:Choice xmlns:p14="http://schemas.microsoft.com/office/powerpoint/2010/main" xmlns="" Requires="p14">
       <p:transition spd="slow" p14:dur="2000"/>
     </mc:Choice>
     <mc:Fallback>
@@ -14352,7 +14701,7 @@
 </p:sld>
 </file>
 
-<file path=ppt/slides/slide31.xml><?xml version="1.0" encoding="utf-8"?>
+<file path=ppt/slides/slide32.xml><?xml version="1.0" encoding="utf-8"?>
 <p:sld xmlns:a="http://schemas.openxmlformats.org/drawingml/2006/main" xmlns:r="http://schemas.openxmlformats.org/officeDocument/2006/relationships" xmlns:p="http://schemas.openxmlformats.org/presentationml/2006/main">
   <p:cSld>
     <p:spTree>
@@ -14851,79 +15200,6 @@
               <a:rPr lang="en-US" dirty="0" smtClean="0"/>
               <a:t> </a:t>
             </a:r>
-          </a:p>
-        </p:txBody>
-      </p:sp>
-    </p:spTree>
-  </p:cSld>
-  <p:clrMapOvr>
-    <a:masterClrMapping/>
-  </p:clrMapOvr>
-  <p:timing>
-    <p:tnLst>
-      <p:par>
-        <p:cTn id="1" dur="indefinite" restart="never" nodeType="tmRoot"/>
-      </p:par>
-    </p:tnLst>
-  </p:timing>
-</p:sld>
-</file>
-
-<file path=ppt/slides/slide32.xml><?xml version="1.0" encoding="utf-8"?>
-<p:sld xmlns:a="http://schemas.openxmlformats.org/drawingml/2006/main" xmlns:r="http://schemas.openxmlformats.org/officeDocument/2006/relationships" xmlns:p="http://schemas.openxmlformats.org/presentationml/2006/main">
-  <p:cSld>
-    <p:spTree>
-      <p:nvGrpSpPr>
-        <p:cNvPr id="1" name=""/>
-        <p:cNvGrpSpPr/>
-        <p:nvPr/>
-      </p:nvGrpSpPr>
-      <p:grpSpPr>
-        <a:xfrm>
-          <a:off x="0" y="0"/>
-          <a:ext cx="0" cy="0"/>
-          <a:chOff x="0" y="0"/>
-          <a:chExt cx="0" cy="0"/>
-        </a:xfrm>
-      </p:grpSpPr>
-      <p:sp>
-        <p:nvSpPr>
-          <p:cNvPr id="2" name="CasellaDiTesto 1"/>
-          <p:cNvSpPr txBox="1"/>
-          <p:nvPr/>
-        </p:nvSpPr>
-        <p:spPr>
-          <a:xfrm>
-            <a:off x="642910" y="428604"/>
-            <a:ext cx="7715304" cy="1107996"/>
-          </a:xfrm>
-          <a:prstGeom prst="rect">
-            <a:avLst/>
-          </a:prstGeom>
-          <a:noFill/>
-        </p:spPr>
-        <p:txBody>
-          <a:bodyPr wrap="square" rtlCol="0">
-            <a:spAutoFit/>
-          </a:bodyPr>
-          <a:lstStyle/>
-          <a:p>
-            <a:pPr algn="ctr"/>
-            <a:r>
-              <a:rPr lang="it-IT" sz="4800" b="1" dirty="0" smtClean="0">
-                <a:latin typeface="+mj-lt"/>
-              </a:rPr>
-              <a:t>DEMO</a:t>
-            </a:r>
-            <a:endParaRPr lang="it-IT" sz="2800" b="1" dirty="0" smtClean="0">
-              <a:latin typeface="+mj-lt"/>
-            </a:endParaRPr>
-          </a:p>
-          <a:p>
-            <a:pPr algn="ctr"/>
-            <a:endParaRPr lang="it-IT" dirty="0">
-              <a:latin typeface="+mj-lt"/>
-            </a:endParaRPr>
           </a:p>
         </p:txBody>
       </p:sp>
@@ -14986,6 +15262,79 @@
               <a:rPr lang="it-IT" sz="4800" b="1" dirty="0" smtClean="0">
                 <a:latin typeface="+mj-lt"/>
               </a:rPr>
+              <a:t>DEMO</a:t>
+            </a:r>
+            <a:endParaRPr lang="it-IT" sz="2800" b="1" dirty="0" smtClean="0">
+              <a:latin typeface="+mj-lt"/>
+            </a:endParaRPr>
+          </a:p>
+          <a:p>
+            <a:pPr algn="ctr"/>
+            <a:endParaRPr lang="it-IT" dirty="0">
+              <a:latin typeface="+mj-lt"/>
+            </a:endParaRPr>
+          </a:p>
+        </p:txBody>
+      </p:sp>
+    </p:spTree>
+  </p:cSld>
+  <p:clrMapOvr>
+    <a:masterClrMapping/>
+  </p:clrMapOvr>
+  <p:timing>
+    <p:tnLst>
+      <p:par>
+        <p:cTn id="1" dur="indefinite" restart="never" nodeType="tmRoot"/>
+      </p:par>
+    </p:tnLst>
+  </p:timing>
+</p:sld>
+</file>
+
+<file path=ppt/slides/slide34.xml><?xml version="1.0" encoding="utf-8"?>
+<p:sld xmlns:a="http://schemas.openxmlformats.org/drawingml/2006/main" xmlns:r="http://schemas.openxmlformats.org/officeDocument/2006/relationships" xmlns:p="http://schemas.openxmlformats.org/presentationml/2006/main">
+  <p:cSld>
+    <p:spTree>
+      <p:nvGrpSpPr>
+        <p:cNvPr id="1" name=""/>
+        <p:cNvGrpSpPr/>
+        <p:nvPr/>
+      </p:nvGrpSpPr>
+      <p:grpSpPr>
+        <a:xfrm>
+          <a:off x="0" y="0"/>
+          <a:ext cx="0" cy="0"/>
+          <a:chOff x="0" y="0"/>
+          <a:chExt cx="0" cy="0"/>
+        </a:xfrm>
+      </p:grpSpPr>
+      <p:sp>
+        <p:nvSpPr>
+          <p:cNvPr id="2" name="CasellaDiTesto 1"/>
+          <p:cNvSpPr txBox="1"/>
+          <p:nvPr/>
+        </p:nvSpPr>
+        <p:spPr>
+          <a:xfrm>
+            <a:off x="642910" y="428604"/>
+            <a:ext cx="7715304" cy="1107996"/>
+          </a:xfrm>
+          <a:prstGeom prst="rect">
+            <a:avLst/>
+          </a:prstGeom>
+          <a:noFill/>
+        </p:spPr>
+        <p:txBody>
+          <a:bodyPr wrap="square" rtlCol="0">
+            <a:spAutoFit/>
+          </a:bodyPr>
+          <a:lstStyle/>
+          <a:p>
+            <a:pPr algn="ctr"/>
+            <a:r>
+              <a:rPr lang="it-IT" sz="4800" b="1" dirty="0" smtClean="0">
+                <a:latin typeface="+mj-lt"/>
+              </a:rPr>
               <a:t>Testing di unità</a:t>
             </a:r>
             <a:endParaRPr lang="it-IT" sz="2800" b="1" dirty="0" smtClean="0">
@@ -15246,7 +15595,7 @@
 </p:sld>
 </file>
 
-<file path=ppt/slides/slide34.xml><?xml version="1.0" encoding="utf-8"?>
+<file path=ppt/slides/slide35.xml><?xml version="1.0" encoding="utf-8"?>
 <p:sld xmlns:a="http://schemas.openxmlformats.org/drawingml/2006/main" xmlns:r="http://schemas.openxmlformats.org/officeDocument/2006/relationships" xmlns:p="http://schemas.openxmlformats.org/presentationml/2006/main">
   <p:cSld>
     <p:spTree>
@@ -15500,327 +15849,6 @@
           </a:p>
         </p:txBody>
       </p:sp>
-    </p:spTree>
-  </p:cSld>
-  <p:clrMapOvr>
-    <a:masterClrMapping/>
-  </p:clrMapOvr>
-  <p:timing>
-    <p:tnLst>
-      <p:par>
-        <p:cTn id="1" dur="indefinite" restart="never" nodeType="tmRoot"/>
-      </p:par>
-    </p:tnLst>
-  </p:timing>
-</p:sld>
-</file>
-
-<file path=ppt/slides/slide35.xml><?xml version="1.0" encoding="utf-8"?>
-<p:sld xmlns:a="http://schemas.openxmlformats.org/drawingml/2006/main" xmlns:r="http://schemas.openxmlformats.org/officeDocument/2006/relationships" xmlns:p="http://schemas.openxmlformats.org/presentationml/2006/main">
-  <p:cSld>
-    <p:spTree>
-      <p:nvGrpSpPr>
-        <p:cNvPr id="1" name=""/>
-        <p:cNvGrpSpPr/>
-        <p:nvPr/>
-      </p:nvGrpSpPr>
-      <p:grpSpPr>
-        <a:xfrm>
-          <a:off x="0" y="0"/>
-          <a:ext cx="0" cy="0"/>
-          <a:chOff x="0" y="0"/>
-          <a:chExt cx="0" cy="0"/>
-        </a:xfrm>
-      </p:grpSpPr>
-      <p:sp>
-        <p:nvSpPr>
-          <p:cNvPr id="2" name="CasellaDiTesto 1"/>
-          <p:cNvSpPr txBox="1"/>
-          <p:nvPr/>
-        </p:nvSpPr>
-        <p:spPr>
-          <a:xfrm>
-            <a:off x="642910" y="428604"/>
-            <a:ext cx="7715304" cy="1107996"/>
-          </a:xfrm>
-          <a:prstGeom prst="rect">
-            <a:avLst/>
-          </a:prstGeom>
-          <a:noFill/>
-        </p:spPr>
-        <p:txBody>
-          <a:bodyPr wrap="square" rtlCol="0">
-            <a:spAutoFit/>
-          </a:bodyPr>
-          <a:lstStyle/>
-          <a:p>
-            <a:pPr algn="ctr"/>
-            <a:r>
-              <a:rPr lang="it-IT" sz="4800" b="1" dirty="0" smtClean="0">
-                <a:latin typeface="+mj-lt"/>
-              </a:rPr>
-              <a:t>Conclusioni</a:t>
-            </a:r>
-            <a:endParaRPr lang="it-IT" sz="2800" b="1" dirty="0" smtClean="0">
-              <a:latin typeface="+mj-lt"/>
-            </a:endParaRPr>
-          </a:p>
-          <a:p>
-            <a:pPr algn="ctr"/>
-            <a:endParaRPr lang="it-IT" dirty="0">
-              <a:latin typeface="+mj-lt"/>
-            </a:endParaRPr>
-          </a:p>
-        </p:txBody>
-      </p:sp>
-      <p:sp>
-        <p:nvSpPr>
-          <p:cNvPr id="3" name="Content Placeholder 3"/>
-          <p:cNvSpPr txBox="1">
-            <a:spLocks/>
-          </p:cNvSpPr>
-          <p:nvPr/>
-        </p:nvSpPr>
-        <p:spPr>
-          <a:xfrm>
-            <a:off x="357158" y="2500306"/>
-            <a:ext cx="8429684" cy="3286148"/>
-          </a:xfrm>
-          <a:prstGeom prst="rect">
-            <a:avLst/>
-          </a:prstGeom>
-        </p:spPr>
-        <p:txBody>
-          <a:bodyPr tIns="0"/>
-          <a:lstStyle>
-            <a:lvl1pPr marL="274320" indent="-274320" algn="l" rtl="0" eaLnBrk="1" latinLnBrk="0" hangingPunct="1">
-              <a:spcBef>
-                <a:spcPct val="20000"/>
-              </a:spcBef>
-              <a:buClrTx/>
-              <a:buSzPct val="95000"/>
-              <a:buFont typeface="Wingdings" pitchFamily="2" charset="2"/>
-              <a:buChar char="v"/>
-              <a:defRPr kumimoji="0" sz="2800" kern="1200">
-                <a:solidFill>
-                  <a:schemeClr val="tx1"/>
-                </a:solidFill>
-                <a:latin typeface="+mn-lt"/>
-                <a:ea typeface="+mn-ea"/>
-                <a:cs typeface="+mn-cs"/>
-              </a:defRPr>
-            </a:lvl1pPr>
-            <a:lvl2pPr marL="640080" indent="-246888" algn="l" rtl="0" eaLnBrk="1" latinLnBrk="0" hangingPunct="1">
-              <a:spcBef>
-                <a:spcPct val="20000"/>
-              </a:spcBef>
-              <a:buClrTx/>
-              <a:buSzPct val="85000"/>
-              <a:buFont typeface="Courier New" pitchFamily="49" charset="0"/>
-              <a:buChar char="o"/>
-              <a:defRPr kumimoji="0" sz="2600" kern="1200">
-                <a:solidFill>
-                  <a:schemeClr val="tx1"/>
-                </a:solidFill>
-                <a:latin typeface="+mn-lt"/>
-                <a:ea typeface="+mn-ea"/>
-                <a:cs typeface="+mn-cs"/>
-              </a:defRPr>
-            </a:lvl2pPr>
-            <a:lvl3pPr marL="914400" indent="-246888" algn="l" rtl="0" eaLnBrk="1" latinLnBrk="0" hangingPunct="1">
-              <a:spcBef>
-                <a:spcPct val="20000"/>
-              </a:spcBef>
-              <a:buClrTx/>
-              <a:buSzPct val="70000"/>
-              <a:buFont typeface="Wingdings 2"/>
-              <a:buChar char=""/>
-              <a:defRPr kumimoji="0" sz="2400" kern="1200">
-                <a:solidFill>
-                  <a:schemeClr val="tx1"/>
-                </a:solidFill>
-                <a:latin typeface="+mn-lt"/>
-                <a:ea typeface="+mn-ea"/>
-                <a:cs typeface="+mn-cs"/>
-              </a:defRPr>
-            </a:lvl3pPr>
-            <a:lvl4pPr marL="1188720" indent="-210312" algn="l" rtl="0" eaLnBrk="1" latinLnBrk="0" hangingPunct="1">
-              <a:spcBef>
-                <a:spcPct val="20000"/>
-              </a:spcBef>
-              <a:buClrTx/>
-              <a:buSzPct val="65000"/>
-              <a:buFont typeface="Wingdings 2"/>
-              <a:buChar char=""/>
-              <a:defRPr kumimoji="0" sz="2000" kern="1200">
-                <a:solidFill>
-                  <a:schemeClr val="tx1"/>
-                </a:solidFill>
-                <a:latin typeface="+mn-lt"/>
-                <a:ea typeface="+mn-ea"/>
-                <a:cs typeface="+mn-cs"/>
-              </a:defRPr>
-            </a:lvl4pPr>
-            <a:lvl5pPr marL="1463040" indent="-210312" algn="l" rtl="0" eaLnBrk="1" latinLnBrk="0" hangingPunct="1">
-              <a:spcBef>
-                <a:spcPct val="20000"/>
-              </a:spcBef>
-              <a:buClrTx/>
-              <a:buSzPct val="65000"/>
-              <a:buFont typeface="Wingdings 2"/>
-              <a:buChar char=""/>
-              <a:defRPr kumimoji="0" sz="1800" kern="1200">
-                <a:solidFill>
-                  <a:schemeClr val="tx1"/>
-                </a:solidFill>
-                <a:latin typeface="+mn-lt"/>
-                <a:ea typeface="+mn-ea"/>
-                <a:cs typeface="+mn-cs"/>
-              </a:defRPr>
-            </a:lvl5pPr>
-            <a:lvl6pPr marL="1737360" indent="-210312" algn="l" rtl="0" eaLnBrk="1" latinLnBrk="0" hangingPunct="1">
-              <a:spcBef>
-                <a:spcPct val="20000"/>
-              </a:spcBef>
-              <a:buClr>
-                <a:schemeClr val="accent5"/>
-              </a:buClr>
-              <a:buSzPct val="80000"/>
-              <a:buFont typeface="Wingdings 2"/>
-              <a:buChar char=""/>
-              <a:defRPr kumimoji="0" sz="1800" kern="1200">
-                <a:solidFill>
-                  <a:schemeClr val="tx1"/>
-                </a:solidFill>
-                <a:latin typeface="+mn-lt"/>
-                <a:ea typeface="+mn-ea"/>
-                <a:cs typeface="+mn-cs"/>
-              </a:defRPr>
-            </a:lvl6pPr>
-            <a:lvl7pPr marL="1920240" indent="-182880" algn="l" rtl="0" eaLnBrk="1" latinLnBrk="0" hangingPunct="1">
-              <a:spcBef>
-                <a:spcPct val="20000"/>
-              </a:spcBef>
-              <a:buClr>
-                <a:schemeClr val="accent6"/>
-              </a:buClr>
-              <a:buSzPct val="80000"/>
-              <a:buFont typeface="Wingdings 2"/>
-              <a:buChar char=""/>
-              <a:defRPr kumimoji="0" sz="1600" kern="1200" baseline="0">
-                <a:solidFill>
-                  <a:schemeClr val="tx1"/>
-                </a:solidFill>
-                <a:latin typeface="+mn-lt"/>
-                <a:ea typeface="+mn-ea"/>
-                <a:cs typeface="+mn-cs"/>
-              </a:defRPr>
-            </a:lvl7pPr>
-            <a:lvl8pPr marL="2194560" indent="-182880" algn="l" rtl="0" eaLnBrk="1" latinLnBrk="0" hangingPunct="1">
-              <a:spcBef>
-                <a:spcPct val="20000"/>
-              </a:spcBef>
-              <a:buClr>
-                <a:schemeClr val="tx2"/>
-              </a:buClr>
-              <a:buChar char="•"/>
-              <a:defRPr kumimoji="0" sz="1600" kern="1200">
-                <a:solidFill>
-                  <a:schemeClr val="tx1"/>
-                </a:solidFill>
-                <a:latin typeface="+mn-lt"/>
-                <a:ea typeface="+mn-ea"/>
-                <a:cs typeface="+mn-cs"/>
-              </a:defRPr>
-            </a:lvl8pPr>
-            <a:lvl9pPr marL="2468880" indent="-182880" algn="l" rtl="0" eaLnBrk="1" latinLnBrk="0" hangingPunct="1">
-              <a:spcBef>
-                <a:spcPct val="20000"/>
-              </a:spcBef>
-              <a:buClr>
-                <a:schemeClr val="tx2"/>
-              </a:buClr>
-              <a:buFontTx/>
-              <a:buChar char="•"/>
-              <a:defRPr kumimoji="0" sz="1400" kern="1200" baseline="0">
-                <a:solidFill>
-                  <a:schemeClr val="tx1"/>
-                </a:solidFill>
-                <a:latin typeface="+mn-lt"/>
-                <a:ea typeface="+mn-ea"/>
-                <a:cs typeface="+mn-cs"/>
-              </a:defRPr>
-            </a:lvl9pPr>
-          </a:lstStyle>
-          <a:p>
-            <a:pPr marL="365760" lvl="1" indent="0">
-              <a:buNone/>
-            </a:pPr>
-            <a:endParaRPr lang="en-US" dirty="0" smtClean="0"/>
-          </a:p>
-        </p:txBody>
-      </p:sp>
-      <p:sp>
-        <p:nvSpPr>
-          <p:cNvPr id="4" name="TextBox 3"/>
-          <p:cNvSpPr txBox="1"/>
-          <p:nvPr/>
-        </p:nvSpPr>
-        <p:spPr>
-          <a:xfrm>
-            <a:off x="214282" y="1928802"/>
-            <a:ext cx="5715040" cy="492443"/>
-          </a:xfrm>
-          <a:prstGeom prst="rect">
-            <a:avLst/>
-          </a:prstGeom>
-          <a:noFill/>
-        </p:spPr>
-        <p:txBody>
-          <a:bodyPr wrap="square" rtlCol="0">
-            <a:spAutoFit/>
-          </a:bodyPr>
-          <a:lstStyle/>
-          <a:p>
-            <a:r>
-              <a:rPr lang="it-IT" sz="2600" b="1" dirty="0" smtClean="0"/>
-              <a:t>Cosa è andato per il verso giusto </a:t>
-            </a:r>
-            <a:endParaRPr lang="it-IT" sz="2600" b="1" dirty="0"/>
-          </a:p>
-        </p:txBody>
-      </p:sp>
-      <p:pic>
-        <p:nvPicPr>
-          <p:cNvPr id="13314" name="Picture 2" descr="http://whywedoit.files.wordpress.com/2009/04/smile.jpg"/>
-          <p:cNvPicPr>
-            <a:picLocks noChangeAspect="1" noChangeArrowheads="1"/>
-          </p:cNvPicPr>
-          <p:nvPr/>
-        </p:nvPicPr>
-        <p:blipFill>
-          <a:blip r:embed="rId2" cstate="print"/>
-          <a:srcRect/>
-          <a:stretch>
-            <a:fillRect/>
-          </a:stretch>
-        </p:blipFill>
-        <p:spPr bwMode="auto">
-          <a:xfrm>
-            <a:off x="4643438" y="1500174"/>
-            <a:ext cx="1428760" cy="1071570"/>
-          </a:xfrm>
-          <a:prstGeom prst="rect">
-            <a:avLst/>
-          </a:prstGeom>
-          <a:ln>
-            <a:noFill/>
-          </a:ln>
-          <a:effectLst>
-            <a:softEdge rad="112500"/>
-          </a:effectLst>
-        </p:spPr>
-      </p:pic>
     </p:spTree>
   </p:cSld>
   <p:clrMapOvr>
@@ -16105,7 +16133,7 @@
           <a:p>
             <a:r>
               <a:rPr lang="it-IT" sz="2600" b="1" dirty="0" smtClean="0"/>
-              <a:t>Cosa è andato per il verso sbagliato </a:t>
+              <a:t>Cosa è andato per il verso giusto </a:t>
             </a:r>
             <a:endParaRPr lang="it-IT" sz="2600" b="1" dirty="0"/>
           </a:p>
@@ -16113,7 +16141,7 @@
       </p:sp>
       <p:pic>
         <p:nvPicPr>
-          <p:cNvPr id="50178" name="Picture 2" descr="http://newton.logg.it/files/2009/11/Emoticon-Sad-300x300.png"/>
+          <p:cNvPr id="13314" name="Picture 2" descr="http://whywedoit.files.wordpress.com/2009/04/smile.jpg"/>
           <p:cNvPicPr>
             <a:picLocks noChangeAspect="1" noChangeArrowheads="1"/>
           </p:cNvPicPr>
@@ -16128,13 +16156,18 @@
         </p:blipFill>
         <p:spPr bwMode="auto">
           <a:xfrm>
-            <a:off x="5286380" y="1571612"/>
-            <a:ext cx="857256" cy="857256"/>
+            <a:off x="4643438" y="1500174"/>
+            <a:ext cx="1428760" cy="1071570"/>
           </a:xfrm>
           <a:prstGeom prst="rect">
             <a:avLst/>
           </a:prstGeom>
-          <a:noFill/>
+          <a:ln>
+            <a:noFill/>
+          </a:ln>
+          <a:effectLst>
+            <a:softEdge rad="112500"/>
+          </a:effectLst>
         </p:spPr>
       </p:pic>
     </p:spTree>
@@ -16405,6 +16438,322 @@
         </p:nvSpPr>
         <p:spPr>
           <a:xfrm>
+            <a:off x="214282" y="1928802"/>
+            <a:ext cx="5715040" cy="492443"/>
+          </a:xfrm>
+          <a:prstGeom prst="rect">
+            <a:avLst/>
+          </a:prstGeom>
+          <a:noFill/>
+        </p:spPr>
+        <p:txBody>
+          <a:bodyPr wrap="square" rtlCol="0">
+            <a:spAutoFit/>
+          </a:bodyPr>
+          <a:lstStyle/>
+          <a:p>
+            <a:r>
+              <a:rPr lang="it-IT" sz="2600" b="1" dirty="0" smtClean="0"/>
+              <a:t>Cosa è andato per il verso sbagliato </a:t>
+            </a:r>
+            <a:endParaRPr lang="it-IT" sz="2600" b="1" dirty="0"/>
+          </a:p>
+        </p:txBody>
+      </p:sp>
+      <p:pic>
+        <p:nvPicPr>
+          <p:cNvPr id="50178" name="Picture 2" descr="http://newton.logg.it/files/2009/11/Emoticon-Sad-300x300.png"/>
+          <p:cNvPicPr>
+            <a:picLocks noChangeAspect="1" noChangeArrowheads="1"/>
+          </p:cNvPicPr>
+          <p:nvPr/>
+        </p:nvPicPr>
+        <p:blipFill>
+          <a:blip r:embed="rId2" cstate="print"/>
+          <a:srcRect/>
+          <a:stretch>
+            <a:fillRect/>
+          </a:stretch>
+        </p:blipFill>
+        <p:spPr bwMode="auto">
+          <a:xfrm>
+            <a:off x="5286380" y="1571612"/>
+            <a:ext cx="857256" cy="857256"/>
+          </a:xfrm>
+          <a:prstGeom prst="rect">
+            <a:avLst/>
+          </a:prstGeom>
+          <a:noFill/>
+        </p:spPr>
+      </p:pic>
+    </p:spTree>
+  </p:cSld>
+  <p:clrMapOvr>
+    <a:masterClrMapping/>
+  </p:clrMapOvr>
+  <p:timing>
+    <p:tnLst>
+      <p:par>
+        <p:cTn id="1" dur="indefinite" restart="never" nodeType="tmRoot"/>
+      </p:par>
+    </p:tnLst>
+  </p:timing>
+</p:sld>
+</file>
+
+<file path=ppt/slides/slide38.xml><?xml version="1.0" encoding="utf-8"?>
+<p:sld xmlns:a="http://schemas.openxmlformats.org/drawingml/2006/main" xmlns:r="http://schemas.openxmlformats.org/officeDocument/2006/relationships" xmlns:p="http://schemas.openxmlformats.org/presentationml/2006/main">
+  <p:cSld>
+    <p:spTree>
+      <p:nvGrpSpPr>
+        <p:cNvPr id="1" name=""/>
+        <p:cNvGrpSpPr/>
+        <p:nvPr/>
+      </p:nvGrpSpPr>
+      <p:grpSpPr>
+        <a:xfrm>
+          <a:off x="0" y="0"/>
+          <a:ext cx="0" cy="0"/>
+          <a:chOff x="0" y="0"/>
+          <a:chExt cx="0" cy="0"/>
+        </a:xfrm>
+      </p:grpSpPr>
+      <p:sp>
+        <p:nvSpPr>
+          <p:cNvPr id="2" name="CasellaDiTesto 1"/>
+          <p:cNvSpPr txBox="1"/>
+          <p:nvPr/>
+        </p:nvSpPr>
+        <p:spPr>
+          <a:xfrm>
+            <a:off x="642910" y="428604"/>
+            <a:ext cx="7715304" cy="1107996"/>
+          </a:xfrm>
+          <a:prstGeom prst="rect">
+            <a:avLst/>
+          </a:prstGeom>
+          <a:noFill/>
+        </p:spPr>
+        <p:txBody>
+          <a:bodyPr wrap="square" rtlCol="0">
+            <a:spAutoFit/>
+          </a:bodyPr>
+          <a:lstStyle/>
+          <a:p>
+            <a:pPr algn="ctr"/>
+            <a:r>
+              <a:rPr lang="it-IT" sz="4800" b="1" dirty="0" smtClean="0">
+                <a:latin typeface="+mj-lt"/>
+              </a:rPr>
+              <a:t>Conclusioni</a:t>
+            </a:r>
+            <a:endParaRPr lang="it-IT" sz="2800" b="1" dirty="0" smtClean="0">
+              <a:latin typeface="+mj-lt"/>
+            </a:endParaRPr>
+          </a:p>
+          <a:p>
+            <a:pPr algn="ctr"/>
+            <a:endParaRPr lang="it-IT" dirty="0">
+              <a:latin typeface="+mj-lt"/>
+            </a:endParaRPr>
+          </a:p>
+        </p:txBody>
+      </p:sp>
+      <p:sp>
+        <p:nvSpPr>
+          <p:cNvPr id="3" name="Content Placeholder 3"/>
+          <p:cNvSpPr txBox="1">
+            <a:spLocks/>
+          </p:cNvSpPr>
+          <p:nvPr/>
+        </p:nvSpPr>
+        <p:spPr>
+          <a:xfrm>
+            <a:off x="357158" y="2500306"/>
+            <a:ext cx="8429684" cy="3286148"/>
+          </a:xfrm>
+          <a:prstGeom prst="rect">
+            <a:avLst/>
+          </a:prstGeom>
+        </p:spPr>
+        <p:txBody>
+          <a:bodyPr tIns="0"/>
+          <a:lstStyle>
+            <a:lvl1pPr marL="274320" indent="-274320" algn="l" rtl="0" eaLnBrk="1" latinLnBrk="0" hangingPunct="1">
+              <a:spcBef>
+                <a:spcPct val="20000"/>
+              </a:spcBef>
+              <a:buClrTx/>
+              <a:buSzPct val="95000"/>
+              <a:buFont typeface="Wingdings" pitchFamily="2" charset="2"/>
+              <a:buChar char="v"/>
+              <a:defRPr kumimoji="0" sz="2800" kern="1200">
+                <a:solidFill>
+                  <a:schemeClr val="tx1"/>
+                </a:solidFill>
+                <a:latin typeface="+mn-lt"/>
+                <a:ea typeface="+mn-ea"/>
+                <a:cs typeface="+mn-cs"/>
+              </a:defRPr>
+            </a:lvl1pPr>
+            <a:lvl2pPr marL="640080" indent="-246888" algn="l" rtl="0" eaLnBrk="1" latinLnBrk="0" hangingPunct="1">
+              <a:spcBef>
+                <a:spcPct val="20000"/>
+              </a:spcBef>
+              <a:buClrTx/>
+              <a:buSzPct val="85000"/>
+              <a:buFont typeface="Courier New" pitchFamily="49" charset="0"/>
+              <a:buChar char="o"/>
+              <a:defRPr kumimoji="0" sz="2600" kern="1200">
+                <a:solidFill>
+                  <a:schemeClr val="tx1"/>
+                </a:solidFill>
+                <a:latin typeface="+mn-lt"/>
+                <a:ea typeface="+mn-ea"/>
+                <a:cs typeface="+mn-cs"/>
+              </a:defRPr>
+            </a:lvl2pPr>
+            <a:lvl3pPr marL="914400" indent="-246888" algn="l" rtl="0" eaLnBrk="1" latinLnBrk="0" hangingPunct="1">
+              <a:spcBef>
+                <a:spcPct val="20000"/>
+              </a:spcBef>
+              <a:buClrTx/>
+              <a:buSzPct val="70000"/>
+              <a:buFont typeface="Wingdings 2"/>
+              <a:buChar char=""/>
+              <a:defRPr kumimoji="0" sz="2400" kern="1200">
+                <a:solidFill>
+                  <a:schemeClr val="tx1"/>
+                </a:solidFill>
+                <a:latin typeface="+mn-lt"/>
+                <a:ea typeface="+mn-ea"/>
+                <a:cs typeface="+mn-cs"/>
+              </a:defRPr>
+            </a:lvl3pPr>
+            <a:lvl4pPr marL="1188720" indent="-210312" algn="l" rtl="0" eaLnBrk="1" latinLnBrk="0" hangingPunct="1">
+              <a:spcBef>
+                <a:spcPct val="20000"/>
+              </a:spcBef>
+              <a:buClrTx/>
+              <a:buSzPct val="65000"/>
+              <a:buFont typeface="Wingdings 2"/>
+              <a:buChar char=""/>
+              <a:defRPr kumimoji="0" sz="2000" kern="1200">
+                <a:solidFill>
+                  <a:schemeClr val="tx1"/>
+                </a:solidFill>
+                <a:latin typeface="+mn-lt"/>
+                <a:ea typeface="+mn-ea"/>
+                <a:cs typeface="+mn-cs"/>
+              </a:defRPr>
+            </a:lvl4pPr>
+            <a:lvl5pPr marL="1463040" indent="-210312" algn="l" rtl="0" eaLnBrk="1" latinLnBrk="0" hangingPunct="1">
+              <a:spcBef>
+                <a:spcPct val="20000"/>
+              </a:spcBef>
+              <a:buClrTx/>
+              <a:buSzPct val="65000"/>
+              <a:buFont typeface="Wingdings 2"/>
+              <a:buChar char=""/>
+              <a:defRPr kumimoji="0" sz="1800" kern="1200">
+                <a:solidFill>
+                  <a:schemeClr val="tx1"/>
+                </a:solidFill>
+                <a:latin typeface="+mn-lt"/>
+                <a:ea typeface="+mn-ea"/>
+                <a:cs typeface="+mn-cs"/>
+              </a:defRPr>
+            </a:lvl5pPr>
+            <a:lvl6pPr marL="1737360" indent="-210312" algn="l" rtl="0" eaLnBrk="1" latinLnBrk="0" hangingPunct="1">
+              <a:spcBef>
+                <a:spcPct val="20000"/>
+              </a:spcBef>
+              <a:buClr>
+                <a:schemeClr val="accent5"/>
+              </a:buClr>
+              <a:buSzPct val="80000"/>
+              <a:buFont typeface="Wingdings 2"/>
+              <a:buChar char=""/>
+              <a:defRPr kumimoji="0" sz="1800" kern="1200">
+                <a:solidFill>
+                  <a:schemeClr val="tx1"/>
+                </a:solidFill>
+                <a:latin typeface="+mn-lt"/>
+                <a:ea typeface="+mn-ea"/>
+                <a:cs typeface="+mn-cs"/>
+              </a:defRPr>
+            </a:lvl6pPr>
+            <a:lvl7pPr marL="1920240" indent="-182880" algn="l" rtl="0" eaLnBrk="1" latinLnBrk="0" hangingPunct="1">
+              <a:spcBef>
+                <a:spcPct val="20000"/>
+              </a:spcBef>
+              <a:buClr>
+                <a:schemeClr val="accent6"/>
+              </a:buClr>
+              <a:buSzPct val="80000"/>
+              <a:buFont typeface="Wingdings 2"/>
+              <a:buChar char=""/>
+              <a:defRPr kumimoji="0" sz="1600" kern="1200" baseline="0">
+                <a:solidFill>
+                  <a:schemeClr val="tx1"/>
+                </a:solidFill>
+                <a:latin typeface="+mn-lt"/>
+                <a:ea typeface="+mn-ea"/>
+                <a:cs typeface="+mn-cs"/>
+              </a:defRPr>
+            </a:lvl7pPr>
+            <a:lvl8pPr marL="2194560" indent="-182880" algn="l" rtl="0" eaLnBrk="1" latinLnBrk="0" hangingPunct="1">
+              <a:spcBef>
+                <a:spcPct val="20000"/>
+              </a:spcBef>
+              <a:buClr>
+                <a:schemeClr val="tx2"/>
+              </a:buClr>
+              <a:buChar char="•"/>
+              <a:defRPr kumimoji="0" sz="1600" kern="1200">
+                <a:solidFill>
+                  <a:schemeClr val="tx1"/>
+                </a:solidFill>
+                <a:latin typeface="+mn-lt"/>
+                <a:ea typeface="+mn-ea"/>
+                <a:cs typeface="+mn-cs"/>
+              </a:defRPr>
+            </a:lvl8pPr>
+            <a:lvl9pPr marL="2468880" indent="-182880" algn="l" rtl="0" eaLnBrk="1" latinLnBrk="0" hangingPunct="1">
+              <a:spcBef>
+                <a:spcPct val="20000"/>
+              </a:spcBef>
+              <a:buClr>
+                <a:schemeClr val="tx2"/>
+              </a:buClr>
+              <a:buFontTx/>
+              <a:buChar char="•"/>
+              <a:defRPr kumimoji="0" sz="1400" kern="1200" baseline="0">
+                <a:solidFill>
+                  <a:schemeClr val="tx1"/>
+                </a:solidFill>
+                <a:latin typeface="+mn-lt"/>
+                <a:ea typeface="+mn-ea"/>
+                <a:cs typeface="+mn-cs"/>
+              </a:defRPr>
+            </a:lvl9pPr>
+          </a:lstStyle>
+          <a:p>
+            <a:pPr marL="365760" lvl="1" indent="0">
+              <a:buNone/>
+            </a:pPr>
+            <a:endParaRPr lang="en-US" dirty="0" smtClean="0"/>
+          </a:p>
+        </p:txBody>
+      </p:sp>
+      <p:sp>
+        <p:nvSpPr>
+          <p:cNvPr id="4" name="TextBox 3"/>
+          <p:cNvSpPr txBox="1"/>
+          <p:nvPr/>
+        </p:nvSpPr>
+        <p:spPr>
+          <a:xfrm>
             <a:off x="357158" y="1714488"/>
             <a:ext cx="5715040" cy="892552"/>
           </a:xfrm>
@@ -16473,7 +16822,7 @@
 </p:sld>
 </file>
 
-<file path=ppt/slides/slide38.xml><?xml version="1.0" encoding="utf-8"?>
+<file path=ppt/slides/slide39.xml><?xml version="1.0" encoding="utf-8"?>
 <p:sld xmlns:a="http://schemas.openxmlformats.org/drawingml/2006/main" xmlns:r="http://schemas.openxmlformats.org/officeDocument/2006/relationships" xmlns:p="http://schemas.openxmlformats.org/presentationml/2006/main">
   <p:cSld>
     <p:spTree>
@@ -17581,9 +17930,6 @@
               </a:rPr>
               <a:t>Use Case identificativi del sistema 1.0</a:t>
             </a:r>
-            <a:endParaRPr lang="it-IT" sz="4000" b="1" dirty="0" smtClean="0">
-              <a:latin typeface="+mj-lt"/>
-            </a:endParaRPr>
           </a:p>
           <a:p>
             <a:pPr algn="ctr"/>
@@ -18444,9 +18790,6 @@
               </a:rPr>
               <a:t>Use Case identificativi del sistema 4.0</a:t>
             </a:r>
-            <a:endParaRPr lang="it-IT" sz="4000" b="1" dirty="0" smtClean="0">
-              <a:latin typeface="+mj-lt"/>
-            </a:endParaRPr>
           </a:p>
           <a:p>
             <a:pPr algn="ctr"/>
@@ -19351,9 +19694,6 @@
               </a:rPr>
               <a:t>Use Case Diagram Questionari – prima versione</a:t>
             </a:r>
-            <a:endParaRPr lang="it-IT" sz="3400" b="1" dirty="0" smtClean="0">
-              <a:latin typeface="+mj-lt"/>
-            </a:endParaRPr>
           </a:p>
           <a:p>
             <a:pPr algn="ctr"/>
@@ -19366,7 +19706,7 @@
     </p:spTree>
     <p:extLst>
       <p:ext uri="{BB962C8B-B14F-4D97-AF65-F5344CB8AC3E}">
-        <p14:creationId xmlns="" xmlns:p14="http://schemas.microsoft.com/office/powerpoint/2010/main" val="155874689"/>
+        <p14:creationId xmlns:p14="http://schemas.microsoft.com/office/powerpoint/2010/main" xmlns="" val="155874689"/>
       </p:ext>
     </p:extLst>
   </p:cSld>
@@ -19374,7 +19714,7 @@
     <a:masterClrMapping/>
   </p:clrMapOvr>
   <mc:AlternateContent xmlns:mc="http://schemas.openxmlformats.org/markup-compatibility/2006">
-    <mc:Choice xmlns="" xmlns:p14="http://schemas.microsoft.com/office/powerpoint/2010/main" Requires="p14">
+    <mc:Choice xmlns:p14="http://schemas.microsoft.com/office/powerpoint/2010/main" xmlns="" Requires="p14">
       <p:transition spd="slow" p14:dur="2000"/>
     </mc:Choice>
     <mc:Fallback>
@@ -19470,9 +19810,6 @@
               </a:rPr>
               <a:t>Use Case Diagram Questionari – prima versione</a:t>
             </a:r>
-            <a:endParaRPr lang="it-IT" sz="3400" b="1" dirty="0" smtClean="0">
-              <a:latin typeface="+mj-lt"/>
-            </a:endParaRPr>
           </a:p>
           <a:p>
             <a:pPr algn="ctr"/>
@@ -19485,7 +19822,7 @@
     </p:spTree>
     <p:extLst>
       <p:ext uri="{BB962C8B-B14F-4D97-AF65-F5344CB8AC3E}">
-        <p14:creationId xmlns="" xmlns:p14="http://schemas.microsoft.com/office/powerpoint/2010/main" val="155874689"/>
+        <p14:creationId xmlns:p14="http://schemas.microsoft.com/office/powerpoint/2010/main" xmlns="" val="155874689"/>
       </p:ext>
     </p:extLst>
   </p:cSld>
@@ -19493,7 +19830,7 @@
     <a:masterClrMapping/>
   </p:clrMapOvr>
   <mc:AlternateContent xmlns:mc="http://schemas.openxmlformats.org/markup-compatibility/2006">
-    <mc:Choice xmlns="" xmlns:p14="http://schemas.microsoft.com/office/powerpoint/2010/main" Requires="p14">
+    <mc:Choice xmlns:p14="http://schemas.microsoft.com/office/powerpoint/2010/main" xmlns="" Requires="p14">
       <p:transition spd="slow" p14:dur="2000"/>
     </mc:Choice>
     <mc:Fallback>

</xml_diff>

<commit_message>
[WR 3] slide con ER aggiornate
</commit_message>
<xml_diff>
--- a/Presentazione/Atsilo3/Atsilo_H_PresentazioneFinale.pptx
+++ b/Presentazione/Atsilo3/Atsilo_H_PresentazioneFinale.pptx
@@ -5,7 +5,7 @@
     <p:sldMasterId id="2147483684" r:id="rId1"/>
   </p:sldMasterIdLst>
   <p:notesMasterIdLst>
-    <p:notesMasterId r:id="rId39"/>
+    <p:notesMasterId r:id="rId40"/>
   </p:notesMasterIdLst>
   <p:sldIdLst>
     <p:sldId id="256" r:id="rId2"/>
@@ -22,29 +22,30 @@
     <p:sldId id="282" r:id="rId13"/>
     <p:sldId id="283" r:id="rId14"/>
     <p:sldId id="284" r:id="rId15"/>
-    <p:sldId id="287" r:id="rId16"/>
-    <p:sldId id="307" r:id="rId17"/>
-    <p:sldId id="308" r:id="rId18"/>
-    <p:sldId id="301" r:id="rId19"/>
-    <p:sldId id="311" r:id="rId20"/>
-    <p:sldId id="303" r:id="rId21"/>
-    <p:sldId id="304" r:id="rId22"/>
-    <p:sldId id="312" r:id="rId23"/>
-    <p:sldId id="315" r:id="rId24"/>
-    <p:sldId id="314" r:id="rId25"/>
-    <p:sldId id="316" r:id="rId26"/>
-    <p:sldId id="290" r:id="rId27"/>
-    <p:sldId id="288" r:id="rId28"/>
-    <p:sldId id="317" r:id="rId29"/>
-    <p:sldId id="291" r:id="rId30"/>
-    <p:sldId id="265" r:id="rId31"/>
-    <p:sldId id="268" r:id="rId32"/>
-    <p:sldId id="267" r:id="rId33"/>
-    <p:sldId id="270" r:id="rId34"/>
-    <p:sldId id="292" r:id="rId35"/>
-    <p:sldId id="293" r:id="rId36"/>
-    <p:sldId id="294" r:id="rId37"/>
-    <p:sldId id="295" r:id="rId38"/>
+    <p:sldId id="318" r:id="rId16"/>
+    <p:sldId id="287" r:id="rId17"/>
+    <p:sldId id="307" r:id="rId18"/>
+    <p:sldId id="308" r:id="rId19"/>
+    <p:sldId id="301" r:id="rId20"/>
+    <p:sldId id="311" r:id="rId21"/>
+    <p:sldId id="303" r:id="rId22"/>
+    <p:sldId id="304" r:id="rId23"/>
+    <p:sldId id="312" r:id="rId24"/>
+    <p:sldId id="315" r:id="rId25"/>
+    <p:sldId id="314" r:id="rId26"/>
+    <p:sldId id="316" r:id="rId27"/>
+    <p:sldId id="290" r:id="rId28"/>
+    <p:sldId id="288" r:id="rId29"/>
+    <p:sldId id="317" r:id="rId30"/>
+    <p:sldId id="291" r:id="rId31"/>
+    <p:sldId id="265" r:id="rId32"/>
+    <p:sldId id="268" r:id="rId33"/>
+    <p:sldId id="267" r:id="rId34"/>
+    <p:sldId id="270" r:id="rId35"/>
+    <p:sldId id="292" r:id="rId36"/>
+    <p:sldId id="293" r:id="rId37"/>
+    <p:sldId id="294" r:id="rId38"/>
+    <p:sldId id="295" r:id="rId39"/>
   </p:sldIdLst>
   <p:sldSz cx="9144000" cy="6858000" type="screen4x3"/>
   <p:notesSz cx="6858000" cy="9144000"/>
@@ -389,7 +390,7 @@
             <a:fld id="{D70604CA-7593-4640-8FA1-5523937B8510}" type="slidenum">
               <a:rPr lang="it-IT" smtClean="0"/>
               <a:pPr/>
-              <a:t>‹N›</a:t>
+              <a:t>‹#›</a:t>
             </a:fld>
             <a:endParaRPr lang="it-IT"/>
           </a:p>
@@ -398,7 +399,7 @@
     </p:spTree>
     <p:extLst>
       <p:ext uri="{BB962C8B-B14F-4D97-AF65-F5344CB8AC3E}">
-        <p14:creationId xmlns:p14="http://schemas.microsoft.com/office/powerpoint/2010/main" val="2126419590"/>
+        <p14:creationId xmlns:p14="http://schemas.microsoft.com/office/powerpoint/2010/main" xmlns="" val="2126419590"/>
       </p:ext>
     </p:extLst>
   </p:cSld>
@@ -573,7 +574,7 @@
     </p:spTree>
     <p:extLst>
       <p:ext uri="{BB962C8B-B14F-4D97-AF65-F5344CB8AC3E}">
-        <p14:creationId xmlns:p14="http://schemas.microsoft.com/office/powerpoint/2010/main" val="555626785"/>
+        <p14:creationId xmlns:p14="http://schemas.microsoft.com/office/powerpoint/2010/main" xmlns="" val="555626785"/>
       </p:ext>
     </p:extLst>
   </p:cSld>
@@ -657,7 +658,7 @@
             <a:fld id="{D70604CA-7593-4640-8FA1-5523937B8510}" type="slidenum">
               <a:rPr lang="it-IT" smtClean="0"/>
               <a:pPr/>
-              <a:t>24</a:t>
+              <a:t>25</a:t>
             </a:fld>
             <a:endParaRPr lang="it-IT"/>
           </a:p>
@@ -666,7 +667,7 @@
     </p:spTree>
     <p:extLst>
       <p:ext uri="{BB962C8B-B14F-4D97-AF65-F5344CB8AC3E}">
-        <p14:creationId xmlns:p14="http://schemas.microsoft.com/office/powerpoint/2010/main" val="2972088584"/>
+        <p14:creationId xmlns:p14="http://schemas.microsoft.com/office/powerpoint/2010/main" xmlns="" val="2972088584"/>
       </p:ext>
     </p:extLst>
   </p:cSld>
@@ -885,7 +886,7 @@
             <a:fld id="{F89AEA99-3E91-4C58-9AD4-045DB5619AC3}" type="slidenum">
               <a:rPr lang="it-IT" smtClean="0"/>
               <a:pPr/>
-              <a:t>‹N›</a:t>
+              <a:t>‹#›</a:t>
             </a:fld>
             <a:endParaRPr lang="it-IT"/>
           </a:p>
@@ -1067,7 +1068,7 @@
             <a:fld id="{F89AEA99-3E91-4C58-9AD4-045DB5619AC3}" type="slidenum">
               <a:rPr lang="it-IT" smtClean="0"/>
               <a:pPr/>
-              <a:t>‹N›</a:t>
+              <a:t>‹#›</a:t>
             </a:fld>
             <a:endParaRPr lang="it-IT"/>
           </a:p>
@@ -1259,7 +1260,7 @@
             <a:fld id="{F89AEA99-3E91-4C58-9AD4-045DB5619AC3}" type="slidenum">
               <a:rPr lang="it-IT" smtClean="0"/>
               <a:pPr/>
-              <a:t>‹N›</a:t>
+              <a:t>‹#›</a:t>
             </a:fld>
             <a:endParaRPr lang="it-IT"/>
           </a:p>
@@ -1441,7 +1442,7 @@
             <a:fld id="{F89AEA99-3E91-4C58-9AD4-045DB5619AC3}" type="slidenum">
               <a:rPr lang="it-IT" smtClean="0"/>
               <a:pPr/>
-              <a:t>‹N›</a:t>
+              <a:t>‹#›</a:t>
             </a:fld>
             <a:endParaRPr lang="it-IT"/>
           </a:p>
@@ -1684,7 +1685,7 @@
             <a:fld id="{F89AEA99-3E91-4C58-9AD4-045DB5619AC3}" type="slidenum">
               <a:rPr lang="it-IT" smtClean="0"/>
               <a:pPr/>
-              <a:t>‹N›</a:t>
+              <a:t>‹#›</a:t>
             </a:fld>
             <a:endParaRPr lang="it-IT"/>
           </a:p>
@@ -1965,7 +1966,7 @@
             <a:fld id="{F89AEA99-3E91-4C58-9AD4-045DB5619AC3}" type="slidenum">
               <a:rPr lang="it-IT" smtClean="0"/>
               <a:pPr/>
-              <a:t>‹N›</a:t>
+              <a:t>‹#›</a:t>
             </a:fld>
             <a:endParaRPr lang="it-IT"/>
           </a:p>
@@ -2356,7 +2357,7 @@
             <a:fld id="{F89AEA99-3E91-4C58-9AD4-045DB5619AC3}" type="slidenum">
               <a:rPr lang="it-IT" smtClean="0"/>
               <a:pPr/>
-              <a:t>‹N›</a:t>
+              <a:t>‹#›</a:t>
             </a:fld>
             <a:endParaRPr lang="it-IT"/>
           </a:p>
@@ -2515,7 +2516,7 @@
             <a:fld id="{F89AEA99-3E91-4C58-9AD4-045DB5619AC3}" type="slidenum">
               <a:rPr lang="it-IT" smtClean="0"/>
               <a:pPr/>
-              <a:t>‹N›</a:t>
+              <a:t>‹#›</a:t>
             </a:fld>
             <a:endParaRPr lang="it-IT"/>
           </a:p>
@@ -2614,7 +2615,7 @@
             <a:fld id="{F89AEA99-3E91-4C58-9AD4-045DB5619AC3}" type="slidenum">
               <a:rPr lang="it-IT" smtClean="0"/>
               <a:pPr/>
-              <a:t>‹N›</a:t>
+              <a:t>‹#›</a:t>
             </a:fld>
             <a:endParaRPr lang="it-IT"/>
           </a:p>
@@ -2884,7 +2885,7 @@
             <a:fld id="{F89AEA99-3E91-4C58-9AD4-045DB5619AC3}" type="slidenum">
               <a:rPr lang="it-IT" smtClean="0"/>
               <a:pPr/>
-              <a:t>‹N›</a:t>
+              <a:t>‹#›</a:t>
             </a:fld>
             <a:endParaRPr lang="it-IT"/>
           </a:p>
@@ -3186,7 +3187,7 @@
             <a:fld id="{F89AEA99-3E91-4C58-9AD4-045DB5619AC3}" type="slidenum">
               <a:rPr lang="it-IT" smtClean="0"/>
               <a:pPr/>
-              <a:t>‹N›</a:t>
+              <a:t>‹#›</a:t>
             </a:fld>
             <a:endParaRPr lang="it-IT"/>
           </a:p>
@@ -3997,7 +3998,7 @@
             <a:fld id="{F89AEA99-3E91-4C58-9AD4-045DB5619AC3}" type="slidenum">
               <a:rPr lang="it-IT" smtClean="0"/>
               <a:pPr/>
-              <a:t>‹N›</a:t>
+              <a:t>‹#›</a:t>
             </a:fld>
             <a:endParaRPr lang="it-IT"/>
           </a:p>
@@ -4604,7 +4605,7 @@
           <a:blip r:embed="rId2">
             <a:extLst>
               <a:ext uri="{28A0092B-C50C-407E-A947-70E740481C1C}">
-                <a14:useLocalDpi xmlns:a14="http://schemas.microsoft.com/office/drawing/2010/main" val="0"/>
+                <a14:useLocalDpi xmlns:a14="http://schemas.microsoft.com/office/drawing/2010/main" xmlns="" val="0"/>
               </a:ext>
             </a:extLst>
           </a:blip>
@@ -4628,14 +4629,14 @@
           <a:effectLst/>
           <a:extLst>
             <a:ext uri="{909E8E84-426E-40DD-AFC4-6F175D3DCCD1}">
-              <a14:hiddenFill xmlns:a14="http://schemas.microsoft.com/office/drawing/2010/main">
+              <a14:hiddenFill xmlns:a14="http://schemas.microsoft.com/office/drawing/2010/main" xmlns="">
                 <a:solidFill>
                   <a:schemeClr val="accent1"/>
                 </a:solidFill>
               </a14:hiddenFill>
             </a:ext>
             <a:ext uri="{91240B29-F687-4F45-9708-019B960494DF}">
-              <a14:hiddenLine xmlns:a14="http://schemas.microsoft.com/office/drawing/2010/main" w="9525">
+              <a14:hiddenLine xmlns:a14="http://schemas.microsoft.com/office/drawing/2010/main" xmlns="" w="9525">
                 <a:solidFill>
                   <a:schemeClr val="tx1"/>
                 </a:solidFill>
@@ -4645,7 +4646,7 @@
               </a14:hiddenLine>
             </a:ext>
             <a:ext uri="{AF507438-7753-43E0-B8FC-AC1667EBCBE1}">
-              <a14:hiddenEffects xmlns:a14="http://schemas.microsoft.com/office/drawing/2010/main">
+              <a14:hiddenEffects xmlns:a14="http://schemas.microsoft.com/office/drawing/2010/main" xmlns="">
                 <a:effectLst>
                   <a:outerShdw dist="35921" dir="2700000" algn="ctr" rotWithShape="0">
                     <a:schemeClr val="bg2"/>
@@ -4665,14 +4666,14 @@
           <p:nvPr>
             <p:extLst>
               <p:ext uri="{D42A27DB-BD31-4B8C-83A1-F6EECF244321}">
-                <p14:modId xmlns:p14="http://schemas.microsoft.com/office/powerpoint/2010/main" val="669990601"/>
+                <p14:modId xmlns:p14="http://schemas.microsoft.com/office/powerpoint/2010/main" xmlns="" val="669990601"/>
               </p:ext>
             </p:extLst>
           </p:nvPr>
         </p:nvGraphicFramePr>
         <p:xfrm>
           <a:off x="0" y="4876800"/>
-          <a:ext cx="2051720" cy="1981200"/>
+          <a:ext cx="2051720" cy="1815785"/>
         </p:xfrm>
         <a:graphic>
           <a:graphicData uri="http://schemas.openxmlformats.org/drawingml/2006/table">
@@ -4842,14 +4843,14 @@
           <p:nvPr>
             <p:extLst>
               <p:ext uri="{D42A27DB-BD31-4B8C-83A1-F6EECF244321}">
-                <p14:modId xmlns:p14="http://schemas.microsoft.com/office/powerpoint/2010/main" val="3027425847"/>
+                <p14:modId xmlns:p14="http://schemas.microsoft.com/office/powerpoint/2010/main" xmlns="" val="3027425847"/>
               </p:ext>
             </p:extLst>
           </p:nvPr>
         </p:nvGraphicFramePr>
         <p:xfrm>
           <a:off x="7092280" y="6060793"/>
-          <a:ext cx="2051720" cy="792480"/>
+          <a:ext cx="2051720" cy="726314"/>
         </p:xfrm>
         <a:graphic>
           <a:graphicData uri="http://schemas.openxmlformats.org/drawingml/2006/table">
@@ -4923,7 +4924,7 @@
     </p:spTree>
     <p:extLst>
       <p:ext uri="{BB962C8B-B14F-4D97-AF65-F5344CB8AC3E}">
-        <p14:creationId xmlns:p14="http://schemas.microsoft.com/office/powerpoint/2010/main" val="4165334171"/>
+        <p14:creationId xmlns:p14="http://schemas.microsoft.com/office/powerpoint/2010/main" xmlns="" val="4165334171"/>
       </p:ext>
     </p:extLst>
   </p:cSld>
@@ -4986,9 +4987,6 @@
               </a:rPr>
               <a:t>Divisione in Sottosistemi</a:t>
             </a:r>
-            <a:endParaRPr lang="it-IT" sz="4800" b="1" dirty="0" smtClean="0">
-              <a:latin typeface="+mj-lt"/>
-            </a:endParaRPr>
           </a:p>
           <a:p>
             <a:pPr algn="ctr"/>
@@ -5005,7 +5003,7 @@
     </p:spTree>
     <p:extLst>
       <p:ext uri="{BB962C8B-B14F-4D97-AF65-F5344CB8AC3E}">
-        <p14:creationId xmlns:p14="http://schemas.microsoft.com/office/powerpoint/2010/main" val="2769124218"/>
+        <p14:creationId xmlns:p14="http://schemas.microsoft.com/office/powerpoint/2010/main" xmlns="" val="2769124218"/>
       </p:ext>
     </p:extLst>
   </p:cSld>
@@ -5285,9 +5283,6 @@
               </a:rPr>
               <a:t>Divisione in Sottosistemi</a:t>
             </a:r>
-            <a:endParaRPr lang="it-IT" sz="4800" b="1" dirty="0" smtClean="0">
-              <a:latin typeface="+mj-lt"/>
-            </a:endParaRPr>
           </a:p>
           <a:p>
             <a:pPr algn="ctr"/>
@@ -5304,18 +5299,18 @@
     </p:spTree>
     <p:extLst>
       <p:ext uri="{BB962C8B-B14F-4D97-AF65-F5344CB8AC3E}">
-        <p14:creationId xmlns:p14="http://schemas.microsoft.com/office/powerpoint/2010/main" val="155874689"/>
+        <p14:creationId xmlns:p14="http://schemas.microsoft.com/office/powerpoint/2010/main" xmlns="" val="155874689"/>
       </p:ext>
     </p:extLst>
   </p:cSld>
   <p:clrMapOvr>
     <a:masterClrMapping/>
   </p:clrMapOvr>
-  <mc:AlternateContent xmlns:mc="http://schemas.openxmlformats.org/markup-compatibility/2006" xmlns:p14="http://schemas.microsoft.com/office/powerpoint/2010/main">
-    <mc:Choice Requires="p14">
+  <mc:AlternateContent xmlns:mc="http://schemas.openxmlformats.org/markup-compatibility/2006">
+    <mc:Choice xmlns:p14="http://schemas.microsoft.com/office/powerpoint/2010/main" xmlns="" Requires="p14">
       <p:transition spd="slow" p14:dur="2000"/>
     </mc:Choice>
-    <mc:Fallback xmlns="">
+    <mc:Fallback>
       <p:transition spd="slow"/>
     </mc:Fallback>
   </mc:AlternateContent>
@@ -5604,18 +5599,18 @@
     </p:spTree>
     <p:extLst>
       <p:ext uri="{BB962C8B-B14F-4D97-AF65-F5344CB8AC3E}">
-        <p14:creationId xmlns:p14="http://schemas.microsoft.com/office/powerpoint/2010/main" val="155874689"/>
+        <p14:creationId xmlns:p14="http://schemas.microsoft.com/office/powerpoint/2010/main" xmlns="" val="155874689"/>
       </p:ext>
     </p:extLst>
   </p:cSld>
   <p:clrMapOvr>
     <a:masterClrMapping/>
   </p:clrMapOvr>
-  <mc:AlternateContent xmlns:mc="http://schemas.openxmlformats.org/markup-compatibility/2006" xmlns:p14="http://schemas.microsoft.com/office/powerpoint/2010/main">
-    <mc:Choice Requires="p14">
+  <mc:AlternateContent xmlns:mc="http://schemas.openxmlformats.org/markup-compatibility/2006">
+    <mc:Choice xmlns:p14="http://schemas.microsoft.com/office/powerpoint/2010/main" xmlns="" Requires="p14">
       <p:transition spd="slow" p14:dur="2000"/>
     </mc:Choice>
-    <mc:Fallback xmlns="">
+    <mc:Fallback>
       <p:transition spd="slow"/>
     </mc:Fallback>
   </mc:AlternateContent>
@@ -5922,18 +5917,18 @@
     </p:spTree>
     <p:extLst>
       <p:ext uri="{BB962C8B-B14F-4D97-AF65-F5344CB8AC3E}">
-        <p14:creationId xmlns:p14="http://schemas.microsoft.com/office/powerpoint/2010/main" val="155874689"/>
+        <p14:creationId xmlns:p14="http://schemas.microsoft.com/office/powerpoint/2010/main" xmlns="" val="155874689"/>
       </p:ext>
     </p:extLst>
   </p:cSld>
   <p:clrMapOvr>
     <a:masterClrMapping/>
   </p:clrMapOvr>
-  <mc:AlternateContent xmlns:mc="http://schemas.openxmlformats.org/markup-compatibility/2006" xmlns:p14="http://schemas.microsoft.com/office/powerpoint/2010/main">
-    <mc:Choice Requires="p14">
+  <mc:AlternateContent xmlns:mc="http://schemas.openxmlformats.org/markup-compatibility/2006">
+    <mc:Choice xmlns:p14="http://schemas.microsoft.com/office/powerpoint/2010/main" xmlns="" Requires="p14">
       <p:transition spd="slow" p14:dur="2000"/>
     </mc:Choice>
-    <mc:Fallback xmlns="">
+    <mc:Fallback>
       <p:transition spd="slow"/>
     </mc:Fallback>
   </mc:AlternateContent>
@@ -6198,7 +6193,7 @@
       </p:grpSpPr>
       <p:pic>
         <p:nvPicPr>
-          <p:cNvPr id="9218" name="Picture 2"/>
+          <p:cNvPr id="1026" name="Picture 2" descr="D:\Tony\Unisa\IS\PROGETTO\atsilo\Presentazione\Atsilo3\ER_Questionari.png"/>
           <p:cNvPicPr>
             <a:picLocks noChangeAspect="1" noChangeArrowheads="1"/>
           </p:cNvPicPr>
@@ -6213,22 +6208,45 @@
         </p:blipFill>
         <p:spPr bwMode="auto">
           <a:xfrm>
-            <a:off x="755576" y="0"/>
-            <a:ext cx="7504058" cy="6858000"/>
+            <a:off x="0" y="2214554"/>
+            <a:ext cx="9144000" cy="3571900"/>
           </a:xfrm>
           <a:prstGeom prst="rect">
             <a:avLst/>
           </a:prstGeom>
           <a:noFill/>
-          <a:ln w="9525">
-            <a:noFill/>
-            <a:miter lim="800000"/>
-            <a:headEnd/>
-            <a:tailEnd/>
-          </a:ln>
-          <a:effectLst/>
         </p:spPr>
       </p:pic>
+      <p:sp>
+        <p:nvSpPr>
+          <p:cNvPr id="5" name="TextBox 4"/>
+          <p:cNvSpPr txBox="1"/>
+          <p:nvPr/>
+        </p:nvSpPr>
+        <p:spPr>
+          <a:xfrm>
+            <a:off x="2857488" y="642918"/>
+            <a:ext cx="3857652" cy="615553"/>
+          </a:xfrm>
+          <a:prstGeom prst="rect">
+            <a:avLst/>
+          </a:prstGeom>
+          <a:noFill/>
+        </p:spPr>
+        <p:txBody>
+          <a:bodyPr wrap="square" rtlCol="0">
+            <a:spAutoFit/>
+          </a:bodyPr>
+          <a:lstStyle/>
+          <a:p>
+            <a:r>
+              <a:rPr lang="it-IT" sz="3400" b="1" dirty="0" smtClean="0"/>
+              <a:t>ER Questionari</a:t>
+            </a:r>
+            <a:endParaRPr lang="it-IT" sz="3400" b="1" dirty="0"/>
+          </a:p>
+        </p:txBody>
+      </p:sp>
     </p:spTree>
   </p:cSld>
   <p:clrMapOvr>
@@ -6245,6 +6263,87 @@
 </file>
 
 <file path=ppt/slides/slide15.xml><?xml version="1.0" encoding="utf-8"?>
+<p:sld xmlns:a="http://schemas.openxmlformats.org/drawingml/2006/main" xmlns:r="http://schemas.openxmlformats.org/officeDocument/2006/relationships" xmlns:p="http://schemas.openxmlformats.org/presentationml/2006/main">
+  <p:cSld>
+    <p:spTree>
+      <p:nvGrpSpPr>
+        <p:cNvPr id="1" name=""/>
+        <p:cNvGrpSpPr/>
+        <p:nvPr/>
+      </p:nvGrpSpPr>
+      <p:grpSpPr>
+        <a:xfrm>
+          <a:off x="0" y="0"/>
+          <a:ext cx="0" cy="0"/>
+          <a:chOff x="0" y="0"/>
+          <a:chExt cx="0" cy="0"/>
+        </a:xfrm>
+      </p:grpSpPr>
+      <p:pic>
+        <p:nvPicPr>
+          <p:cNvPr id="2" name="Picture 3" descr="D:\Tony\Unisa\IS\PROGETTO\atsilo\Presentazione\Atsilo3\ER_Registro-Eventi.png"/>
+          <p:cNvPicPr>
+            <a:picLocks noChangeAspect="1" noChangeArrowheads="1"/>
+          </p:cNvPicPr>
+          <p:nvPr/>
+        </p:nvPicPr>
+        <p:blipFill>
+          <a:blip r:embed="rId2"/>
+          <a:srcRect/>
+          <a:stretch>
+            <a:fillRect/>
+          </a:stretch>
+        </p:blipFill>
+        <p:spPr bwMode="auto">
+          <a:xfrm>
+            <a:off x="285720" y="1500174"/>
+            <a:ext cx="8490984" cy="4572032"/>
+          </a:xfrm>
+          <a:prstGeom prst="rect">
+            <a:avLst/>
+          </a:prstGeom>
+          <a:noFill/>
+        </p:spPr>
+      </p:pic>
+      <p:sp>
+        <p:nvSpPr>
+          <p:cNvPr id="3" name="TextBox 2"/>
+          <p:cNvSpPr txBox="1"/>
+          <p:nvPr/>
+        </p:nvSpPr>
+        <p:spPr>
+          <a:xfrm>
+            <a:off x="2357422" y="642918"/>
+            <a:ext cx="4786378" cy="615553"/>
+          </a:xfrm>
+          <a:prstGeom prst="rect">
+            <a:avLst/>
+          </a:prstGeom>
+          <a:noFill/>
+        </p:spPr>
+        <p:txBody>
+          <a:bodyPr wrap="square" rtlCol="0">
+            <a:spAutoFit/>
+          </a:bodyPr>
+          <a:lstStyle/>
+          <a:p>
+            <a:r>
+              <a:rPr lang="it-IT" sz="3400" b="1" dirty="0" smtClean="0"/>
+              <a:t>ER Registro – Eventi </a:t>
+            </a:r>
+            <a:endParaRPr lang="it-IT" sz="3400" b="1" dirty="0"/>
+          </a:p>
+        </p:txBody>
+      </p:sp>
+    </p:spTree>
+  </p:cSld>
+  <p:clrMapOvr>
+    <a:masterClrMapping/>
+  </p:clrMapOvr>
+</p:sld>
+</file>
+
+<file path=ppt/slides/slide16.xml><?xml version="1.0" encoding="utf-8"?>
 <p:sld xmlns:a="http://schemas.openxmlformats.org/drawingml/2006/main" xmlns:r="http://schemas.openxmlformats.org/officeDocument/2006/relationships" xmlns:p="http://schemas.openxmlformats.org/presentationml/2006/main">
   <p:cSld>
     <p:spTree>
@@ -6288,13 +6387,7 @@
               <a:rPr lang="it-IT" sz="4800" b="1" dirty="0" smtClean="0">
                 <a:latin typeface="+mj-lt"/>
               </a:rPr>
-              <a:t>Pro\Contro </a:t>
-            </a:r>
-            <a:r>
-              <a:rPr lang="it-IT" sz="4800" b="1" dirty="0" smtClean="0">
-                <a:latin typeface="+mj-lt"/>
-              </a:rPr>
-              <a:t>SDD</a:t>
+              <a:t>Pro\Contro SDD</a:t>
             </a:r>
           </a:p>
           <a:p>
@@ -6320,7 +6413,7 @@
 </p:sld>
 </file>
 
-<file path=ppt/slides/slide16.xml><?xml version="1.0" encoding="utf-8"?>
+<file path=ppt/slides/slide17.xml><?xml version="1.0" encoding="utf-8"?>
 <p:sld xmlns:a="http://schemas.openxmlformats.org/drawingml/2006/main" xmlns:r="http://schemas.openxmlformats.org/officeDocument/2006/relationships" xmlns:p="http://schemas.openxmlformats.org/presentationml/2006/main">
   <p:cSld>
     <p:spTree>
@@ -6364,13 +6457,7 @@
               <a:rPr lang="it-IT" sz="4800" b="1" dirty="0" smtClean="0">
                 <a:latin typeface="+mj-lt"/>
               </a:rPr>
-              <a:t>Obiettivi di </a:t>
-            </a:r>
-            <a:r>
-              <a:rPr lang="it-IT" sz="4800" b="1" dirty="0" smtClean="0">
-                <a:latin typeface="+mj-lt"/>
-              </a:rPr>
-              <a:t>design</a:t>
+              <a:t>Obiettivi di design</a:t>
             </a:r>
           </a:p>
           <a:p>
@@ -6494,7 +6581,7 @@
           <a:blip r:embed="rId2">
             <a:extLst>
               <a:ext uri="{28A0092B-C50C-407E-A947-70E740481C1C}">
-                <a14:useLocalDpi xmlns:a14="http://schemas.microsoft.com/office/drawing/2010/main" val="0"/>
+                <a14:useLocalDpi xmlns:a14="http://schemas.microsoft.com/office/drawing/2010/main" xmlns="" val="0"/>
               </a:ext>
             </a:extLst>
           </a:blip>
@@ -6514,7 +6601,7 @@
           <a:noFill/>
           <a:extLst>
             <a:ext uri="{909E8E84-426E-40DD-AFC4-6F175D3DCCD1}">
-              <a14:hiddenFill xmlns:a14="http://schemas.microsoft.com/office/drawing/2010/main">
+              <a14:hiddenFill xmlns:a14="http://schemas.microsoft.com/office/drawing/2010/main" xmlns="">
                 <a:solidFill>
                   <a:srgbClr val="FFFFFF"/>
                 </a:solidFill>
@@ -6535,7 +6622,7 @@
           <a:blip r:embed="rId3">
             <a:extLst>
               <a:ext uri="{28A0092B-C50C-407E-A947-70E740481C1C}">
-                <a14:useLocalDpi xmlns:a14="http://schemas.microsoft.com/office/drawing/2010/main" val="0"/>
+                <a14:useLocalDpi xmlns:a14="http://schemas.microsoft.com/office/drawing/2010/main" xmlns="" val="0"/>
               </a:ext>
             </a:extLst>
           </a:blip>
@@ -6555,7 +6642,7 @@
           <a:noFill/>
           <a:extLst>
             <a:ext uri="{909E8E84-426E-40DD-AFC4-6F175D3DCCD1}">
-              <a14:hiddenFill xmlns:a14="http://schemas.microsoft.com/office/drawing/2010/main">
+              <a14:hiddenFill xmlns:a14="http://schemas.microsoft.com/office/drawing/2010/main" xmlns="">
                 <a:solidFill>
                   <a:srgbClr val="FFFFFF"/>
                 </a:solidFill>
@@ -6601,7 +6688,7 @@
     </p:spTree>
     <p:extLst>
       <p:ext uri="{BB962C8B-B14F-4D97-AF65-F5344CB8AC3E}">
-        <p14:creationId xmlns:p14="http://schemas.microsoft.com/office/powerpoint/2010/main" val="1277526579"/>
+        <p14:creationId xmlns:p14="http://schemas.microsoft.com/office/powerpoint/2010/main" xmlns="" val="1277526579"/>
       </p:ext>
     </p:extLst>
   </p:cSld>
@@ -6700,7 +6787,7 @@
 </p:sld>
 </file>
 
-<file path=ppt/slides/slide17.xml><?xml version="1.0" encoding="utf-8"?>
+<file path=ppt/slides/slide18.xml><?xml version="1.0" encoding="utf-8"?>
 <p:sld xmlns:a="http://schemas.openxmlformats.org/drawingml/2006/main" xmlns:r="http://schemas.openxmlformats.org/officeDocument/2006/relationships" xmlns:p="http://schemas.openxmlformats.org/presentationml/2006/main">
   <p:cSld>
     <p:spTree>
@@ -6744,13 +6831,7 @@
               <a:rPr lang="it-IT" sz="4800" b="1" dirty="0" smtClean="0">
                 <a:latin typeface="+mj-lt"/>
               </a:rPr>
-              <a:t>Obiettivi di </a:t>
-            </a:r>
-            <a:r>
-              <a:rPr lang="it-IT" sz="4800" b="1" dirty="0" smtClean="0">
-                <a:latin typeface="+mj-lt"/>
-              </a:rPr>
-              <a:t>design</a:t>
+              <a:t>Obiettivi di design</a:t>
             </a:r>
           </a:p>
           <a:p>
@@ -6795,7 +6876,6 @@
               <a:rPr lang="it-IT" dirty="0" smtClean="0"/>
               <a:t>Garantendo:</a:t>
             </a:r>
-            <a:endParaRPr lang="it-IT" dirty="0" smtClean="0"/>
           </a:p>
         </p:txBody>
       </p:sp>
@@ -6811,7 +6891,7 @@
           <a:blip r:embed="rId2">
             <a:extLst>
               <a:ext uri="{28A0092B-C50C-407E-A947-70E740481C1C}">
-                <a14:useLocalDpi xmlns:a14="http://schemas.microsoft.com/office/drawing/2010/main" val="0"/>
+                <a14:useLocalDpi xmlns:a14="http://schemas.microsoft.com/office/drawing/2010/main" xmlns="" val="0"/>
               </a:ext>
             </a:extLst>
           </a:blip>
@@ -6831,7 +6911,7 @@
           <a:noFill/>
           <a:extLst>
             <a:ext uri="{909E8E84-426E-40DD-AFC4-6F175D3DCCD1}">
-              <a14:hiddenFill xmlns:a14="http://schemas.microsoft.com/office/drawing/2010/main">
+              <a14:hiddenFill xmlns:a14="http://schemas.microsoft.com/office/drawing/2010/main" xmlns="">
                 <a:solidFill>
                   <a:srgbClr val="FFFFFF"/>
                 </a:solidFill>
@@ -6852,7 +6932,7 @@
           <a:blip r:embed="rId3" cstate="print">
             <a:extLst>
               <a:ext uri="{28A0092B-C50C-407E-A947-70E740481C1C}">
-                <a14:useLocalDpi xmlns:a14="http://schemas.microsoft.com/office/drawing/2010/main" val="0"/>
+                <a14:useLocalDpi xmlns:a14="http://schemas.microsoft.com/office/drawing/2010/main" xmlns="" val="0"/>
               </a:ext>
             </a:extLst>
           </a:blip>
@@ -6872,7 +6952,7 @@
           <a:noFill/>
           <a:extLst>
             <a:ext uri="{909E8E84-426E-40DD-AFC4-6F175D3DCCD1}">
-              <a14:hiddenFill xmlns:a14="http://schemas.microsoft.com/office/drawing/2010/main">
+              <a14:hiddenFill xmlns:a14="http://schemas.microsoft.com/office/drawing/2010/main" xmlns="">
                 <a:solidFill>
                   <a:srgbClr val="FFFFFF"/>
                 </a:solidFill>
@@ -6893,7 +6973,7 @@
           <a:blip r:embed="rId4">
             <a:extLst>
               <a:ext uri="{28A0092B-C50C-407E-A947-70E740481C1C}">
-                <a14:useLocalDpi xmlns:a14="http://schemas.microsoft.com/office/drawing/2010/main" val="0"/>
+                <a14:useLocalDpi xmlns:a14="http://schemas.microsoft.com/office/drawing/2010/main" xmlns="" val="0"/>
               </a:ext>
             </a:extLst>
           </a:blip>
@@ -6913,7 +6993,7 @@
           <a:noFill/>
           <a:extLst>
             <a:ext uri="{909E8E84-426E-40DD-AFC4-6F175D3DCCD1}">
-              <a14:hiddenFill xmlns:a14="http://schemas.microsoft.com/office/drawing/2010/main">
+              <a14:hiddenFill xmlns:a14="http://schemas.microsoft.com/office/drawing/2010/main" xmlns="">
                 <a:solidFill>
                   <a:srgbClr val="FFFFFF"/>
                 </a:solidFill>
@@ -7015,7 +7095,7 @@
     </p:spTree>
     <p:extLst>
       <p:ext uri="{BB962C8B-B14F-4D97-AF65-F5344CB8AC3E}">
-        <p14:creationId xmlns:p14="http://schemas.microsoft.com/office/powerpoint/2010/main" val="418107373"/>
+        <p14:creationId xmlns:p14="http://schemas.microsoft.com/office/powerpoint/2010/main" xmlns="" val="418107373"/>
       </p:ext>
     </p:extLst>
   </p:cSld>
@@ -7378,7 +7458,7 @@
 </p:sld>
 </file>
 
-<file path=ppt/slides/slide18.xml><?xml version="1.0" encoding="utf-8"?>
+<file path=ppt/slides/slide19.xml><?xml version="1.0" encoding="utf-8"?>
 <p:sld xmlns:a="http://schemas.openxmlformats.org/drawingml/2006/main" xmlns:r="http://schemas.openxmlformats.org/officeDocument/2006/relationships" xmlns:p="http://schemas.openxmlformats.org/presentationml/2006/main">
   <p:cSld>
     <p:spTree>
@@ -7621,13 +7701,7 @@
               <a:rPr lang="it-IT" sz="4800" b="1" dirty="0" smtClean="0">
                 <a:latin typeface="+mj-lt"/>
               </a:rPr>
-              <a:t>Obiettivi di </a:t>
-            </a:r>
-            <a:r>
-              <a:rPr lang="it-IT" sz="4800" b="1" dirty="0" smtClean="0">
-                <a:latin typeface="+mj-lt"/>
-              </a:rPr>
-              <a:t>design</a:t>
+              <a:t>Obiettivi di design</a:t>
             </a:r>
           </a:p>
           <a:p>
@@ -7660,7 +7734,7 @@
           <a:blip r:embed="rId2">
             <a:extLst>
               <a:ext uri="{28A0092B-C50C-407E-A947-70E740481C1C}">
-                <a14:useLocalDpi xmlns:a14="http://schemas.microsoft.com/office/drawing/2010/main" val="0"/>
+                <a14:useLocalDpi xmlns:a14="http://schemas.microsoft.com/office/drawing/2010/main" xmlns="" val="0"/>
               </a:ext>
             </a:extLst>
           </a:blip>
@@ -7680,7 +7754,7 @@
           <a:noFill/>
           <a:extLst>
             <a:ext uri="{909E8E84-426E-40DD-AFC4-6F175D3DCCD1}">
-              <a14:hiddenFill xmlns:a14="http://schemas.microsoft.com/office/drawing/2010/main">
+              <a14:hiddenFill xmlns:a14="http://schemas.microsoft.com/office/drawing/2010/main" xmlns="">
                 <a:solidFill>
                   <a:srgbClr val="FFFFFF"/>
                 </a:solidFill>
@@ -7701,7 +7775,7 @@
           <a:blip r:embed="rId3">
             <a:extLst>
               <a:ext uri="{28A0092B-C50C-407E-A947-70E740481C1C}">
-                <a14:useLocalDpi xmlns:a14="http://schemas.microsoft.com/office/drawing/2010/main" val="0"/>
+                <a14:useLocalDpi xmlns:a14="http://schemas.microsoft.com/office/drawing/2010/main" xmlns="" val="0"/>
               </a:ext>
             </a:extLst>
           </a:blip>
@@ -7721,7 +7795,7 @@
           <a:noFill/>
           <a:extLst>
             <a:ext uri="{909E8E84-426E-40DD-AFC4-6F175D3DCCD1}">
-              <a14:hiddenFill xmlns:a14="http://schemas.microsoft.com/office/drawing/2010/main">
+              <a14:hiddenFill xmlns:a14="http://schemas.microsoft.com/office/drawing/2010/main" xmlns="">
                 <a:solidFill>
                   <a:srgbClr val="FFFFFF"/>
                 </a:solidFill>
@@ -7969,18 +8043,18 @@
     </p:spTree>
     <p:extLst>
       <p:ext uri="{BB962C8B-B14F-4D97-AF65-F5344CB8AC3E}">
-        <p14:creationId xmlns:p14="http://schemas.microsoft.com/office/powerpoint/2010/main" val="2879521852"/>
+        <p14:creationId xmlns:p14="http://schemas.microsoft.com/office/powerpoint/2010/main" xmlns="" val="2879521852"/>
       </p:ext>
     </p:extLst>
   </p:cSld>
   <p:clrMapOvr>
     <a:masterClrMapping/>
   </p:clrMapOvr>
-  <mc:AlternateContent xmlns:mc="http://schemas.openxmlformats.org/markup-compatibility/2006" xmlns:p14="http://schemas.microsoft.com/office/powerpoint/2010/main">
-    <mc:Choice Requires="p14">
+  <mc:AlternateContent xmlns:mc="http://schemas.openxmlformats.org/markup-compatibility/2006">
+    <mc:Choice xmlns:p14="http://schemas.microsoft.com/office/powerpoint/2010/main" xmlns="" Requires="p14">
       <p:transition spd="slow" p14:dur="2000"/>
     </mc:Choice>
-    <mc:Fallback xmlns="">
+    <mc:Fallback>
       <p:transition spd="slow"/>
     </mc:Fallback>
   </mc:AlternateContent>
@@ -8307,7 +8381,576 @@
 </p:sld>
 </file>
 
-<file path=ppt/slides/slide19.xml><?xml version="1.0" encoding="utf-8"?>
+<file path=ppt/slides/slide2.xml><?xml version="1.0" encoding="utf-8"?>
+<p:sld xmlns:a="http://schemas.openxmlformats.org/drawingml/2006/main" xmlns:r="http://schemas.openxmlformats.org/officeDocument/2006/relationships" xmlns:p="http://schemas.openxmlformats.org/presentationml/2006/main">
+  <p:cSld>
+    <p:spTree>
+      <p:nvGrpSpPr>
+        <p:cNvPr id="1" name=""/>
+        <p:cNvGrpSpPr/>
+        <p:nvPr/>
+      </p:nvGrpSpPr>
+      <p:grpSpPr>
+        <a:xfrm>
+          <a:off x="0" y="0"/>
+          <a:ext cx="0" cy="0"/>
+          <a:chOff x="0" y="0"/>
+          <a:chExt cx="0" cy="0"/>
+        </a:xfrm>
+      </p:grpSpPr>
+      <p:pic>
+        <p:nvPicPr>
+          <p:cNvPr id="1026" name="Picture 2"/>
+          <p:cNvPicPr>
+            <a:picLocks noChangeAspect="1" noChangeArrowheads="1"/>
+          </p:cNvPicPr>
+          <p:nvPr/>
+        </p:nvPicPr>
+        <p:blipFill>
+          <a:blip r:embed="rId2"/>
+          <a:srcRect/>
+          <a:stretch>
+            <a:fillRect/>
+          </a:stretch>
+        </p:blipFill>
+        <p:spPr bwMode="auto">
+          <a:xfrm>
+            <a:off x="642911" y="1096963"/>
+            <a:ext cx="7072362" cy="5761037"/>
+          </a:xfrm>
+          <a:prstGeom prst="rect">
+            <a:avLst/>
+          </a:prstGeom>
+          <a:noFill/>
+          <a:ln w="9525">
+            <a:noFill/>
+            <a:miter lim="800000"/>
+            <a:headEnd/>
+            <a:tailEnd/>
+          </a:ln>
+          <a:effectLst/>
+        </p:spPr>
+      </p:pic>
+      <p:sp>
+        <p:nvSpPr>
+          <p:cNvPr id="2" name="CasellaDiTesto 1"/>
+          <p:cNvSpPr txBox="1"/>
+          <p:nvPr/>
+        </p:nvSpPr>
+        <p:spPr>
+          <a:xfrm>
+            <a:off x="1071538" y="500042"/>
+            <a:ext cx="7072362" cy="1107996"/>
+          </a:xfrm>
+          <a:prstGeom prst="rect">
+            <a:avLst/>
+          </a:prstGeom>
+          <a:noFill/>
+        </p:spPr>
+        <p:txBody>
+          <a:bodyPr wrap="square" rtlCol="0">
+            <a:spAutoFit/>
+          </a:bodyPr>
+          <a:lstStyle/>
+          <a:p>
+            <a:pPr algn="ctr"/>
+            <a:r>
+              <a:rPr lang="it-IT" sz="4800" b="1" dirty="0" smtClean="0">
+                <a:latin typeface="+mj-lt"/>
+              </a:rPr>
+              <a:t>Gli attori del sistema</a:t>
+            </a:r>
+          </a:p>
+          <a:p>
+            <a:pPr algn="ctr"/>
+            <a:endParaRPr lang="it-IT" dirty="0">
+              <a:latin typeface="+mj-lt"/>
+            </a:endParaRPr>
+          </a:p>
+        </p:txBody>
+      </p:sp>
+      <p:sp>
+        <p:nvSpPr>
+          <p:cNvPr id="5" name="Oval 4"/>
+          <p:cNvSpPr/>
+          <p:nvPr/>
+        </p:nvSpPr>
+        <p:spPr>
+          <a:xfrm>
+            <a:off x="1035819" y="1500174"/>
+            <a:ext cx="1571636" cy="642942"/>
+          </a:xfrm>
+          <a:prstGeom prst="ellipse">
+            <a:avLst/>
+          </a:prstGeom>
+          <a:noFill/>
+          <a:ln>
+            <a:solidFill>
+              <a:srgbClr val="FF0000"/>
+            </a:solidFill>
+          </a:ln>
+        </p:spPr>
+        <p:style>
+          <a:lnRef idx="2">
+            <a:schemeClr val="accent1">
+              <a:shade val="50000"/>
+            </a:schemeClr>
+          </a:lnRef>
+          <a:fillRef idx="1">
+            <a:schemeClr val="accent1"/>
+          </a:fillRef>
+          <a:effectRef idx="0">
+            <a:schemeClr val="accent1"/>
+          </a:effectRef>
+          <a:fontRef idx="minor">
+            <a:schemeClr val="lt1"/>
+          </a:fontRef>
+        </p:style>
+        <p:txBody>
+          <a:bodyPr rtlCol="0" anchor="ctr"/>
+          <a:lstStyle/>
+          <a:p>
+            <a:pPr algn="ctr"/>
+            <a:endParaRPr lang="it-IT"/>
+          </a:p>
+        </p:txBody>
+      </p:sp>
+      <p:sp>
+        <p:nvSpPr>
+          <p:cNvPr id="6" name="Oval 5"/>
+          <p:cNvSpPr/>
+          <p:nvPr/>
+        </p:nvSpPr>
+        <p:spPr>
+          <a:xfrm>
+            <a:off x="1714480" y="4143380"/>
+            <a:ext cx="2071702" cy="642942"/>
+          </a:xfrm>
+          <a:prstGeom prst="ellipse">
+            <a:avLst/>
+          </a:prstGeom>
+          <a:noFill/>
+          <a:ln>
+            <a:solidFill>
+              <a:srgbClr val="FF0000"/>
+            </a:solidFill>
+          </a:ln>
+        </p:spPr>
+        <p:style>
+          <a:lnRef idx="2">
+            <a:schemeClr val="accent1">
+              <a:shade val="50000"/>
+            </a:schemeClr>
+          </a:lnRef>
+          <a:fillRef idx="1">
+            <a:schemeClr val="accent1"/>
+          </a:fillRef>
+          <a:effectRef idx="0">
+            <a:schemeClr val="accent1"/>
+          </a:effectRef>
+          <a:fontRef idx="minor">
+            <a:schemeClr val="lt1"/>
+          </a:fontRef>
+        </p:style>
+        <p:txBody>
+          <a:bodyPr rtlCol="0" anchor="ctr"/>
+          <a:lstStyle/>
+          <a:p>
+            <a:pPr algn="ctr"/>
+            <a:endParaRPr lang="it-IT"/>
+          </a:p>
+        </p:txBody>
+      </p:sp>
+      <p:sp>
+        <p:nvSpPr>
+          <p:cNvPr id="7" name="Oval 6"/>
+          <p:cNvSpPr/>
+          <p:nvPr/>
+        </p:nvSpPr>
+        <p:spPr>
+          <a:xfrm>
+            <a:off x="2786050" y="3571876"/>
+            <a:ext cx="1571636" cy="642942"/>
+          </a:xfrm>
+          <a:prstGeom prst="ellipse">
+            <a:avLst/>
+          </a:prstGeom>
+          <a:noFill/>
+          <a:ln>
+            <a:solidFill>
+              <a:srgbClr val="FF0000"/>
+            </a:solidFill>
+          </a:ln>
+        </p:spPr>
+        <p:style>
+          <a:lnRef idx="2">
+            <a:schemeClr val="accent1">
+              <a:shade val="50000"/>
+            </a:schemeClr>
+          </a:lnRef>
+          <a:fillRef idx="1">
+            <a:schemeClr val="accent1"/>
+          </a:fillRef>
+          <a:effectRef idx="0">
+            <a:schemeClr val="accent1"/>
+          </a:effectRef>
+          <a:fontRef idx="minor">
+            <a:schemeClr val="lt1"/>
+          </a:fontRef>
+        </p:style>
+        <p:txBody>
+          <a:bodyPr rtlCol="0" anchor="ctr"/>
+          <a:lstStyle/>
+          <a:p>
+            <a:pPr algn="ctr"/>
+            <a:endParaRPr lang="it-IT"/>
+          </a:p>
+        </p:txBody>
+      </p:sp>
+      <p:sp>
+        <p:nvSpPr>
+          <p:cNvPr id="8" name="Oval 7"/>
+          <p:cNvSpPr/>
+          <p:nvPr/>
+        </p:nvSpPr>
+        <p:spPr>
+          <a:xfrm>
+            <a:off x="1714480" y="6215058"/>
+            <a:ext cx="1785950" cy="642942"/>
+          </a:xfrm>
+          <a:prstGeom prst="ellipse">
+            <a:avLst/>
+          </a:prstGeom>
+          <a:noFill/>
+          <a:ln>
+            <a:solidFill>
+              <a:srgbClr val="FF0000"/>
+            </a:solidFill>
+          </a:ln>
+        </p:spPr>
+        <p:style>
+          <a:lnRef idx="2">
+            <a:schemeClr val="accent1">
+              <a:shade val="50000"/>
+            </a:schemeClr>
+          </a:lnRef>
+          <a:fillRef idx="1">
+            <a:schemeClr val="accent1"/>
+          </a:fillRef>
+          <a:effectRef idx="0">
+            <a:schemeClr val="accent1"/>
+          </a:effectRef>
+          <a:fontRef idx="minor">
+            <a:schemeClr val="lt1"/>
+          </a:fontRef>
+        </p:style>
+        <p:txBody>
+          <a:bodyPr rtlCol="0" anchor="ctr"/>
+          <a:lstStyle/>
+          <a:p>
+            <a:pPr algn="ctr"/>
+            <a:endParaRPr lang="it-IT"/>
+          </a:p>
+        </p:txBody>
+      </p:sp>
+      <p:sp>
+        <p:nvSpPr>
+          <p:cNvPr id="9" name="Oval 8"/>
+          <p:cNvSpPr/>
+          <p:nvPr/>
+        </p:nvSpPr>
+        <p:spPr>
+          <a:xfrm>
+            <a:off x="1714480" y="5643578"/>
+            <a:ext cx="1785950" cy="571504"/>
+          </a:xfrm>
+          <a:prstGeom prst="ellipse">
+            <a:avLst/>
+          </a:prstGeom>
+          <a:noFill/>
+          <a:ln>
+            <a:solidFill>
+              <a:srgbClr val="FF0000"/>
+            </a:solidFill>
+          </a:ln>
+        </p:spPr>
+        <p:style>
+          <a:lnRef idx="2">
+            <a:schemeClr val="accent1">
+              <a:shade val="50000"/>
+            </a:schemeClr>
+          </a:lnRef>
+          <a:fillRef idx="1">
+            <a:schemeClr val="accent1"/>
+          </a:fillRef>
+          <a:effectRef idx="0">
+            <a:schemeClr val="accent1"/>
+          </a:effectRef>
+          <a:fontRef idx="minor">
+            <a:schemeClr val="lt1"/>
+          </a:fontRef>
+        </p:style>
+        <p:txBody>
+          <a:bodyPr rtlCol="0" anchor="ctr"/>
+          <a:lstStyle/>
+          <a:p>
+            <a:pPr algn="ctr"/>
+            <a:endParaRPr lang="it-IT"/>
+          </a:p>
+        </p:txBody>
+      </p:sp>
+    </p:spTree>
+    <p:extLst>
+      <p:ext uri="{BB962C8B-B14F-4D97-AF65-F5344CB8AC3E}">
+        <p14:creationId xmlns:p14="http://schemas.microsoft.com/office/powerpoint/2010/main" xmlns="" val="155874689"/>
+      </p:ext>
+    </p:extLst>
+  </p:cSld>
+  <p:clrMapOvr>
+    <a:masterClrMapping/>
+  </p:clrMapOvr>
+  <mc:AlternateContent xmlns:mc="http://schemas.openxmlformats.org/markup-compatibility/2006">
+    <mc:Choice xmlns:p14="http://schemas.microsoft.com/office/powerpoint/2010/main" xmlns="" Requires="p14">
+      <p:transition spd="slow" p14:dur="2000"/>
+    </mc:Choice>
+    <mc:Fallback>
+      <p:transition spd="slow"/>
+    </mc:Fallback>
+  </mc:AlternateContent>
+  <p:timing>
+    <p:tnLst>
+      <p:par>
+        <p:cTn id="1" dur="indefinite" restart="never" nodeType="tmRoot">
+          <p:childTnLst>
+            <p:seq concurrent="1" nextAc="seek">
+              <p:cTn id="2" dur="indefinite" nodeType="mainSeq">
+                <p:childTnLst>
+                  <p:par>
+                    <p:cTn id="3" fill="hold">
+                      <p:stCondLst>
+                        <p:cond delay="indefinite"/>
+                      </p:stCondLst>
+                      <p:childTnLst>
+                        <p:par>
+                          <p:cTn id="4" fill="hold">
+                            <p:stCondLst>
+                              <p:cond delay="0"/>
+                            </p:stCondLst>
+                            <p:childTnLst>
+                              <p:par>
+                                <p:cTn id="5" presetID="10" presetClass="entr" presetSubtype="0" fill="hold" grpId="0" nodeType="clickEffect">
+                                  <p:stCondLst>
+                                    <p:cond delay="0"/>
+                                  </p:stCondLst>
+                                  <p:childTnLst>
+                                    <p:set>
+                                      <p:cBhvr>
+                                        <p:cTn id="6" dur="1" fill="hold">
+                                          <p:stCondLst>
+                                            <p:cond delay="0"/>
+                                          </p:stCondLst>
+                                        </p:cTn>
+                                        <p:tgtEl>
+                                          <p:spTgt spid="5"/>
+                                        </p:tgtEl>
+                                        <p:attrNameLst>
+                                          <p:attrName>style.visibility</p:attrName>
+                                        </p:attrNameLst>
+                                      </p:cBhvr>
+                                      <p:to>
+                                        <p:strVal val="visible"/>
+                                      </p:to>
+                                    </p:set>
+                                    <p:animEffect transition="in" filter="fade">
+                                      <p:cBhvr>
+                                        <p:cTn id="7" dur="500"/>
+                                        <p:tgtEl>
+                                          <p:spTgt spid="5"/>
+                                        </p:tgtEl>
+                                      </p:cBhvr>
+                                    </p:animEffect>
+                                  </p:childTnLst>
+                                </p:cTn>
+                              </p:par>
+                              <p:par>
+                                <p:cTn id="8" presetID="10" presetClass="entr" presetSubtype="0" fill="hold" grpId="0" nodeType="withEffect">
+                                  <p:stCondLst>
+                                    <p:cond delay="0"/>
+                                  </p:stCondLst>
+                                  <p:childTnLst>
+                                    <p:set>
+                                      <p:cBhvr>
+                                        <p:cTn id="9" dur="1" fill="hold">
+                                          <p:stCondLst>
+                                            <p:cond delay="0"/>
+                                          </p:stCondLst>
+                                        </p:cTn>
+                                        <p:tgtEl>
+                                          <p:spTgt spid="7"/>
+                                        </p:tgtEl>
+                                        <p:attrNameLst>
+                                          <p:attrName>style.visibility</p:attrName>
+                                        </p:attrNameLst>
+                                      </p:cBhvr>
+                                      <p:to>
+                                        <p:strVal val="visible"/>
+                                      </p:to>
+                                    </p:set>
+                                    <p:animEffect transition="in" filter="fade">
+                                      <p:cBhvr>
+                                        <p:cTn id="10" dur="500"/>
+                                        <p:tgtEl>
+                                          <p:spTgt spid="7"/>
+                                        </p:tgtEl>
+                                      </p:cBhvr>
+                                    </p:animEffect>
+                                  </p:childTnLst>
+                                </p:cTn>
+                              </p:par>
+                              <p:par>
+                                <p:cTn id="11" presetID="10" presetClass="entr" presetSubtype="0" fill="hold" grpId="0" nodeType="withEffect">
+                                  <p:stCondLst>
+                                    <p:cond delay="0"/>
+                                  </p:stCondLst>
+                                  <p:childTnLst>
+                                    <p:set>
+                                      <p:cBhvr>
+                                        <p:cTn id="12" dur="1" fill="hold">
+                                          <p:stCondLst>
+                                            <p:cond delay="0"/>
+                                          </p:stCondLst>
+                                        </p:cTn>
+                                        <p:tgtEl>
+                                          <p:spTgt spid="6"/>
+                                        </p:tgtEl>
+                                        <p:attrNameLst>
+                                          <p:attrName>style.visibility</p:attrName>
+                                        </p:attrNameLst>
+                                      </p:cBhvr>
+                                      <p:to>
+                                        <p:strVal val="visible"/>
+                                      </p:to>
+                                    </p:set>
+                                    <p:animEffect transition="in" filter="fade">
+                                      <p:cBhvr>
+                                        <p:cTn id="13" dur="500"/>
+                                        <p:tgtEl>
+                                          <p:spTgt spid="6"/>
+                                        </p:tgtEl>
+                                      </p:cBhvr>
+                                    </p:animEffect>
+                                  </p:childTnLst>
+                                </p:cTn>
+                              </p:par>
+                              <p:par>
+                                <p:cTn id="14" presetID="10" presetClass="entr" presetSubtype="0" fill="hold" grpId="0" nodeType="withEffect">
+                                  <p:stCondLst>
+                                    <p:cond delay="0"/>
+                                  </p:stCondLst>
+                                  <p:childTnLst>
+                                    <p:set>
+                                      <p:cBhvr>
+                                        <p:cTn id="15" dur="1" fill="hold">
+                                          <p:stCondLst>
+                                            <p:cond delay="0"/>
+                                          </p:stCondLst>
+                                        </p:cTn>
+                                        <p:tgtEl>
+                                          <p:spTgt spid="9"/>
+                                        </p:tgtEl>
+                                        <p:attrNameLst>
+                                          <p:attrName>style.visibility</p:attrName>
+                                        </p:attrNameLst>
+                                      </p:cBhvr>
+                                      <p:to>
+                                        <p:strVal val="visible"/>
+                                      </p:to>
+                                    </p:set>
+                                    <p:animEffect transition="in" filter="fade">
+                                      <p:cBhvr>
+                                        <p:cTn id="16" dur="500"/>
+                                        <p:tgtEl>
+                                          <p:spTgt spid="9"/>
+                                        </p:tgtEl>
+                                      </p:cBhvr>
+                                    </p:animEffect>
+                                  </p:childTnLst>
+                                </p:cTn>
+                              </p:par>
+                              <p:par>
+                                <p:cTn id="17" presetID="10" presetClass="entr" presetSubtype="0" fill="hold" grpId="0" nodeType="withEffect">
+                                  <p:stCondLst>
+                                    <p:cond delay="0"/>
+                                  </p:stCondLst>
+                                  <p:childTnLst>
+                                    <p:set>
+                                      <p:cBhvr>
+                                        <p:cTn id="18" dur="1" fill="hold">
+                                          <p:stCondLst>
+                                            <p:cond delay="0"/>
+                                          </p:stCondLst>
+                                        </p:cTn>
+                                        <p:tgtEl>
+                                          <p:spTgt spid="8"/>
+                                        </p:tgtEl>
+                                        <p:attrNameLst>
+                                          <p:attrName>style.visibility</p:attrName>
+                                        </p:attrNameLst>
+                                      </p:cBhvr>
+                                      <p:to>
+                                        <p:strVal val="visible"/>
+                                      </p:to>
+                                    </p:set>
+                                    <p:animEffect transition="in" filter="fade">
+                                      <p:cBhvr>
+                                        <p:cTn id="19" dur="500"/>
+                                        <p:tgtEl>
+                                          <p:spTgt spid="8"/>
+                                        </p:tgtEl>
+                                      </p:cBhvr>
+                                    </p:animEffect>
+                                  </p:childTnLst>
+                                </p:cTn>
+                              </p:par>
+                            </p:childTnLst>
+                          </p:cTn>
+                        </p:par>
+                      </p:childTnLst>
+                    </p:cTn>
+                  </p:par>
+                </p:childTnLst>
+              </p:cTn>
+              <p:prevCondLst>
+                <p:cond evt="onPrev" delay="0">
+                  <p:tgtEl>
+                    <p:sldTgt/>
+                  </p:tgtEl>
+                </p:cond>
+              </p:prevCondLst>
+              <p:nextCondLst>
+                <p:cond evt="onNext" delay="0">
+                  <p:tgtEl>
+                    <p:sldTgt/>
+                  </p:tgtEl>
+                </p:cond>
+              </p:nextCondLst>
+            </p:seq>
+          </p:childTnLst>
+        </p:cTn>
+      </p:par>
+    </p:tnLst>
+    <p:bldLst>
+      <p:bldP spid="5" grpId="0" animBg="1"/>
+      <p:bldP spid="6" grpId="0" animBg="1"/>
+      <p:bldP spid="7" grpId="0" animBg="1"/>
+      <p:bldP spid="8" grpId="0" animBg="1"/>
+      <p:bldP spid="9" grpId="0" animBg="1"/>
+    </p:bldLst>
+  </p:timing>
+</p:sld>
+</file>
+
+<file path=ppt/slides/slide20.xml><?xml version="1.0" encoding="utf-8"?>
 <p:sld xmlns:a="http://schemas.openxmlformats.org/drawingml/2006/main" xmlns:r="http://schemas.openxmlformats.org/officeDocument/2006/relationships" xmlns:p="http://schemas.openxmlformats.org/presentationml/2006/main">
   <p:cSld>
     <p:spTree>
@@ -8336,7 +8979,7 @@
           <a:blip r:embed="rId2">
             <a:extLst>
               <a:ext uri="{28A0092B-C50C-407E-A947-70E740481C1C}">
-                <a14:useLocalDpi xmlns:a14="http://schemas.microsoft.com/office/drawing/2010/main" val="0"/>
+                <a14:useLocalDpi xmlns:a14="http://schemas.microsoft.com/office/drawing/2010/main" xmlns="" val="0"/>
               </a:ext>
             </a:extLst>
           </a:blip>
@@ -8356,7 +8999,7 @@
           <a:noFill/>
           <a:extLst>
             <a:ext uri="{909E8E84-426E-40DD-AFC4-6F175D3DCCD1}">
-              <a14:hiddenFill xmlns:a14="http://schemas.microsoft.com/office/drawing/2010/main">
+              <a14:hiddenFill xmlns:a14="http://schemas.microsoft.com/office/drawing/2010/main" xmlns="">
                 <a:solidFill>
                   <a:srgbClr val="FFFFFF"/>
                 </a:solidFill>
@@ -8377,7 +9020,7 @@
           <a:blip r:embed="rId3">
             <a:extLst>
               <a:ext uri="{28A0092B-C50C-407E-A947-70E740481C1C}">
-                <a14:useLocalDpi xmlns:a14="http://schemas.microsoft.com/office/drawing/2010/main" val="0"/>
+                <a14:useLocalDpi xmlns:a14="http://schemas.microsoft.com/office/drawing/2010/main" xmlns="" val="0"/>
               </a:ext>
             </a:extLst>
           </a:blip>
@@ -8397,7 +9040,7 @@
           <a:noFill/>
           <a:extLst>
             <a:ext uri="{909E8E84-426E-40DD-AFC4-6F175D3DCCD1}">
-              <a14:hiddenFill xmlns:a14="http://schemas.microsoft.com/office/drawing/2010/main">
+              <a14:hiddenFill xmlns:a14="http://schemas.microsoft.com/office/drawing/2010/main" xmlns="">
                 <a:solidFill>
                   <a:srgbClr val="FFFFFF"/>
                 </a:solidFill>
@@ -8632,13 +9275,7 @@
               <a:rPr lang="it-IT" sz="4800" b="1" dirty="0" smtClean="0">
                 <a:latin typeface="+mj-lt"/>
               </a:rPr>
-              <a:t>Obiettivi di </a:t>
-            </a:r>
-            <a:r>
-              <a:rPr lang="it-IT" sz="4800" b="1" dirty="0" smtClean="0">
-                <a:latin typeface="+mj-lt"/>
-              </a:rPr>
-              <a:t>design</a:t>
+              <a:t>Obiettivi di design</a:t>
             </a:r>
           </a:p>
           <a:p>
@@ -8898,18 +9535,18 @@
     </p:spTree>
     <p:extLst>
       <p:ext uri="{BB962C8B-B14F-4D97-AF65-F5344CB8AC3E}">
-        <p14:creationId xmlns:p14="http://schemas.microsoft.com/office/powerpoint/2010/main" val="202613363"/>
+        <p14:creationId xmlns:p14="http://schemas.microsoft.com/office/powerpoint/2010/main" xmlns="" val="202613363"/>
       </p:ext>
     </p:extLst>
   </p:cSld>
   <p:clrMapOvr>
     <a:masterClrMapping/>
   </p:clrMapOvr>
-  <mc:AlternateContent xmlns:mc="http://schemas.openxmlformats.org/markup-compatibility/2006" xmlns:p14="http://schemas.microsoft.com/office/powerpoint/2010/main">
-    <mc:Choice Requires="p14">
+  <mc:AlternateContent xmlns:mc="http://schemas.openxmlformats.org/markup-compatibility/2006">
+    <mc:Choice xmlns:p14="http://schemas.microsoft.com/office/powerpoint/2010/main" xmlns="" Requires="p14">
       <p:transition spd="slow" p14:dur="2000"/>
     </mc:Choice>
-    <mc:Fallback xmlns="">
+    <mc:Fallback>
       <p:transition spd="slow"/>
     </mc:Fallback>
   </mc:AlternateContent>
@@ -9217,576 +9854,7 @@
 </p:sld>
 </file>
 
-<file path=ppt/slides/slide2.xml><?xml version="1.0" encoding="utf-8"?>
-<p:sld xmlns:a="http://schemas.openxmlformats.org/drawingml/2006/main" xmlns:r="http://schemas.openxmlformats.org/officeDocument/2006/relationships" xmlns:p="http://schemas.openxmlformats.org/presentationml/2006/main">
-  <p:cSld>
-    <p:spTree>
-      <p:nvGrpSpPr>
-        <p:cNvPr id="1" name=""/>
-        <p:cNvGrpSpPr/>
-        <p:nvPr/>
-      </p:nvGrpSpPr>
-      <p:grpSpPr>
-        <a:xfrm>
-          <a:off x="0" y="0"/>
-          <a:ext cx="0" cy="0"/>
-          <a:chOff x="0" y="0"/>
-          <a:chExt cx="0" cy="0"/>
-        </a:xfrm>
-      </p:grpSpPr>
-      <p:pic>
-        <p:nvPicPr>
-          <p:cNvPr id="1026" name="Picture 2"/>
-          <p:cNvPicPr>
-            <a:picLocks noChangeAspect="1" noChangeArrowheads="1"/>
-          </p:cNvPicPr>
-          <p:nvPr/>
-        </p:nvPicPr>
-        <p:blipFill>
-          <a:blip r:embed="rId2"/>
-          <a:srcRect/>
-          <a:stretch>
-            <a:fillRect/>
-          </a:stretch>
-        </p:blipFill>
-        <p:spPr bwMode="auto">
-          <a:xfrm>
-            <a:off x="642911" y="1096963"/>
-            <a:ext cx="7072362" cy="5761037"/>
-          </a:xfrm>
-          <a:prstGeom prst="rect">
-            <a:avLst/>
-          </a:prstGeom>
-          <a:noFill/>
-          <a:ln w="9525">
-            <a:noFill/>
-            <a:miter lim="800000"/>
-            <a:headEnd/>
-            <a:tailEnd/>
-          </a:ln>
-          <a:effectLst/>
-        </p:spPr>
-      </p:pic>
-      <p:sp>
-        <p:nvSpPr>
-          <p:cNvPr id="2" name="CasellaDiTesto 1"/>
-          <p:cNvSpPr txBox="1"/>
-          <p:nvPr/>
-        </p:nvSpPr>
-        <p:spPr>
-          <a:xfrm>
-            <a:off x="1071538" y="500042"/>
-            <a:ext cx="7072362" cy="1107996"/>
-          </a:xfrm>
-          <a:prstGeom prst="rect">
-            <a:avLst/>
-          </a:prstGeom>
-          <a:noFill/>
-        </p:spPr>
-        <p:txBody>
-          <a:bodyPr wrap="square" rtlCol="0">
-            <a:spAutoFit/>
-          </a:bodyPr>
-          <a:lstStyle/>
-          <a:p>
-            <a:pPr algn="ctr"/>
-            <a:r>
-              <a:rPr lang="it-IT" sz="4800" b="1" dirty="0" smtClean="0">
-                <a:latin typeface="+mj-lt"/>
-              </a:rPr>
-              <a:t>Gli attori del sistema</a:t>
-            </a:r>
-          </a:p>
-          <a:p>
-            <a:pPr algn="ctr"/>
-            <a:endParaRPr lang="it-IT" dirty="0">
-              <a:latin typeface="+mj-lt"/>
-            </a:endParaRPr>
-          </a:p>
-        </p:txBody>
-      </p:sp>
-      <p:sp>
-        <p:nvSpPr>
-          <p:cNvPr id="5" name="Oval 4"/>
-          <p:cNvSpPr/>
-          <p:nvPr/>
-        </p:nvSpPr>
-        <p:spPr>
-          <a:xfrm>
-            <a:off x="1035819" y="1500174"/>
-            <a:ext cx="1571636" cy="642942"/>
-          </a:xfrm>
-          <a:prstGeom prst="ellipse">
-            <a:avLst/>
-          </a:prstGeom>
-          <a:noFill/>
-          <a:ln>
-            <a:solidFill>
-              <a:srgbClr val="FF0000"/>
-            </a:solidFill>
-          </a:ln>
-        </p:spPr>
-        <p:style>
-          <a:lnRef idx="2">
-            <a:schemeClr val="accent1">
-              <a:shade val="50000"/>
-            </a:schemeClr>
-          </a:lnRef>
-          <a:fillRef idx="1">
-            <a:schemeClr val="accent1"/>
-          </a:fillRef>
-          <a:effectRef idx="0">
-            <a:schemeClr val="accent1"/>
-          </a:effectRef>
-          <a:fontRef idx="minor">
-            <a:schemeClr val="lt1"/>
-          </a:fontRef>
-        </p:style>
-        <p:txBody>
-          <a:bodyPr rtlCol="0" anchor="ctr"/>
-          <a:lstStyle/>
-          <a:p>
-            <a:pPr algn="ctr"/>
-            <a:endParaRPr lang="it-IT"/>
-          </a:p>
-        </p:txBody>
-      </p:sp>
-      <p:sp>
-        <p:nvSpPr>
-          <p:cNvPr id="6" name="Oval 5"/>
-          <p:cNvSpPr/>
-          <p:nvPr/>
-        </p:nvSpPr>
-        <p:spPr>
-          <a:xfrm>
-            <a:off x="1714480" y="4143380"/>
-            <a:ext cx="2071702" cy="642942"/>
-          </a:xfrm>
-          <a:prstGeom prst="ellipse">
-            <a:avLst/>
-          </a:prstGeom>
-          <a:noFill/>
-          <a:ln>
-            <a:solidFill>
-              <a:srgbClr val="FF0000"/>
-            </a:solidFill>
-          </a:ln>
-        </p:spPr>
-        <p:style>
-          <a:lnRef idx="2">
-            <a:schemeClr val="accent1">
-              <a:shade val="50000"/>
-            </a:schemeClr>
-          </a:lnRef>
-          <a:fillRef idx="1">
-            <a:schemeClr val="accent1"/>
-          </a:fillRef>
-          <a:effectRef idx="0">
-            <a:schemeClr val="accent1"/>
-          </a:effectRef>
-          <a:fontRef idx="minor">
-            <a:schemeClr val="lt1"/>
-          </a:fontRef>
-        </p:style>
-        <p:txBody>
-          <a:bodyPr rtlCol="0" anchor="ctr"/>
-          <a:lstStyle/>
-          <a:p>
-            <a:pPr algn="ctr"/>
-            <a:endParaRPr lang="it-IT"/>
-          </a:p>
-        </p:txBody>
-      </p:sp>
-      <p:sp>
-        <p:nvSpPr>
-          <p:cNvPr id="7" name="Oval 6"/>
-          <p:cNvSpPr/>
-          <p:nvPr/>
-        </p:nvSpPr>
-        <p:spPr>
-          <a:xfrm>
-            <a:off x="2786050" y="3571876"/>
-            <a:ext cx="1571636" cy="642942"/>
-          </a:xfrm>
-          <a:prstGeom prst="ellipse">
-            <a:avLst/>
-          </a:prstGeom>
-          <a:noFill/>
-          <a:ln>
-            <a:solidFill>
-              <a:srgbClr val="FF0000"/>
-            </a:solidFill>
-          </a:ln>
-        </p:spPr>
-        <p:style>
-          <a:lnRef idx="2">
-            <a:schemeClr val="accent1">
-              <a:shade val="50000"/>
-            </a:schemeClr>
-          </a:lnRef>
-          <a:fillRef idx="1">
-            <a:schemeClr val="accent1"/>
-          </a:fillRef>
-          <a:effectRef idx="0">
-            <a:schemeClr val="accent1"/>
-          </a:effectRef>
-          <a:fontRef idx="minor">
-            <a:schemeClr val="lt1"/>
-          </a:fontRef>
-        </p:style>
-        <p:txBody>
-          <a:bodyPr rtlCol="0" anchor="ctr"/>
-          <a:lstStyle/>
-          <a:p>
-            <a:pPr algn="ctr"/>
-            <a:endParaRPr lang="it-IT"/>
-          </a:p>
-        </p:txBody>
-      </p:sp>
-      <p:sp>
-        <p:nvSpPr>
-          <p:cNvPr id="8" name="Oval 7"/>
-          <p:cNvSpPr/>
-          <p:nvPr/>
-        </p:nvSpPr>
-        <p:spPr>
-          <a:xfrm>
-            <a:off x="1714480" y="6215058"/>
-            <a:ext cx="1785950" cy="642942"/>
-          </a:xfrm>
-          <a:prstGeom prst="ellipse">
-            <a:avLst/>
-          </a:prstGeom>
-          <a:noFill/>
-          <a:ln>
-            <a:solidFill>
-              <a:srgbClr val="FF0000"/>
-            </a:solidFill>
-          </a:ln>
-        </p:spPr>
-        <p:style>
-          <a:lnRef idx="2">
-            <a:schemeClr val="accent1">
-              <a:shade val="50000"/>
-            </a:schemeClr>
-          </a:lnRef>
-          <a:fillRef idx="1">
-            <a:schemeClr val="accent1"/>
-          </a:fillRef>
-          <a:effectRef idx="0">
-            <a:schemeClr val="accent1"/>
-          </a:effectRef>
-          <a:fontRef idx="minor">
-            <a:schemeClr val="lt1"/>
-          </a:fontRef>
-        </p:style>
-        <p:txBody>
-          <a:bodyPr rtlCol="0" anchor="ctr"/>
-          <a:lstStyle/>
-          <a:p>
-            <a:pPr algn="ctr"/>
-            <a:endParaRPr lang="it-IT"/>
-          </a:p>
-        </p:txBody>
-      </p:sp>
-      <p:sp>
-        <p:nvSpPr>
-          <p:cNvPr id="9" name="Oval 8"/>
-          <p:cNvSpPr/>
-          <p:nvPr/>
-        </p:nvSpPr>
-        <p:spPr>
-          <a:xfrm>
-            <a:off x="1714480" y="5643578"/>
-            <a:ext cx="1785950" cy="571504"/>
-          </a:xfrm>
-          <a:prstGeom prst="ellipse">
-            <a:avLst/>
-          </a:prstGeom>
-          <a:noFill/>
-          <a:ln>
-            <a:solidFill>
-              <a:srgbClr val="FF0000"/>
-            </a:solidFill>
-          </a:ln>
-        </p:spPr>
-        <p:style>
-          <a:lnRef idx="2">
-            <a:schemeClr val="accent1">
-              <a:shade val="50000"/>
-            </a:schemeClr>
-          </a:lnRef>
-          <a:fillRef idx="1">
-            <a:schemeClr val="accent1"/>
-          </a:fillRef>
-          <a:effectRef idx="0">
-            <a:schemeClr val="accent1"/>
-          </a:effectRef>
-          <a:fontRef idx="minor">
-            <a:schemeClr val="lt1"/>
-          </a:fontRef>
-        </p:style>
-        <p:txBody>
-          <a:bodyPr rtlCol="0" anchor="ctr"/>
-          <a:lstStyle/>
-          <a:p>
-            <a:pPr algn="ctr"/>
-            <a:endParaRPr lang="it-IT"/>
-          </a:p>
-        </p:txBody>
-      </p:sp>
-    </p:spTree>
-    <p:extLst>
-      <p:ext uri="{BB962C8B-B14F-4D97-AF65-F5344CB8AC3E}">
-        <p14:creationId xmlns:p14="http://schemas.microsoft.com/office/powerpoint/2010/main" val="155874689"/>
-      </p:ext>
-    </p:extLst>
-  </p:cSld>
-  <p:clrMapOvr>
-    <a:masterClrMapping/>
-  </p:clrMapOvr>
-  <mc:AlternateContent xmlns:mc="http://schemas.openxmlformats.org/markup-compatibility/2006" xmlns:p14="http://schemas.microsoft.com/office/powerpoint/2010/main">
-    <mc:Choice Requires="p14">
-      <p:transition spd="slow" p14:dur="2000"/>
-    </mc:Choice>
-    <mc:Fallback xmlns="">
-      <p:transition spd="slow"/>
-    </mc:Fallback>
-  </mc:AlternateContent>
-  <p:timing>
-    <p:tnLst>
-      <p:par>
-        <p:cTn id="1" dur="indefinite" restart="never" nodeType="tmRoot">
-          <p:childTnLst>
-            <p:seq concurrent="1" nextAc="seek">
-              <p:cTn id="2" dur="indefinite" nodeType="mainSeq">
-                <p:childTnLst>
-                  <p:par>
-                    <p:cTn id="3" fill="hold">
-                      <p:stCondLst>
-                        <p:cond delay="indefinite"/>
-                      </p:stCondLst>
-                      <p:childTnLst>
-                        <p:par>
-                          <p:cTn id="4" fill="hold">
-                            <p:stCondLst>
-                              <p:cond delay="0"/>
-                            </p:stCondLst>
-                            <p:childTnLst>
-                              <p:par>
-                                <p:cTn id="5" presetID="10" presetClass="entr" presetSubtype="0" fill="hold" grpId="0" nodeType="clickEffect">
-                                  <p:stCondLst>
-                                    <p:cond delay="0"/>
-                                  </p:stCondLst>
-                                  <p:childTnLst>
-                                    <p:set>
-                                      <p:cBhvr>
-                                        <p:cTn id="6" dur="1" fill="hold">
-                                          <p:stCondLst>
-                                            <p:cond delay="0"/>
-                                          </p:stCondLst>
-                                        </p:cTn>
-                                        <p:tgtEl>
-                                          <p:spTgt spid="5"/>
-                                        </p:tgtEl>
-                                        <p:attrNameLst>
-                                          <p:attrName>style.visibility</p:attrName>
-                                        </p:attrNameLst>
-                                      </p:cBhvr>
-                                      <p:to>
-                                        <p:strVal val="visible"/>
-                                      </p:to>
-                                    </p:set>
-                                    <p:animEffect transition="in" filter="fade">
-                                      <p:cBhvr>
-                                        <p:cTn id="7" dur="500"/>
-                                        <p:tgtEl>
-                                          <p:spTgt spid="5"/>
-                                        </p:tgtEl>
-                                      </p:cBhvr>
-                                    </p:animEffect>
-                                  </p:childTnLst>
-                                </p:cTn>
-                              </p:par>
-                              <p:par>
-                                <p:cTn id="8" presetID="10" presetClass="entr" presetSubtype="0" fill="hold" grpId="0" nodeType="withEffect">
-                                  <p:stCondLst>
-                                    <p:cond delay="0"/>
-                                  </p:stCondLst>
-                                  <p:childTnLst>
-                                    <p:set>
-                                      <p:cBhvr>
-                                        <p:cTn id="9" dur="1" fill="hold">
-                                          <p:stCondLst>
-                                            <p:cond delay="0"/>
-                                          </p:stCondLst>
-                                        </p:cTn>
-                                        <p:tgtEl>
-                                          <p:spTgt spid="7"/>
-                                        </p:tgtEl>
-                                        <p:attrNameLst>
-                                          <p:attrName>style.visibility</p:attrName>
-                                        </p:attrNameLst>
-                                      </p:cBhvr>
-                                      <p:to>
-                                        <p:strVal val="visible"/>
-                                      </p:to>
-                                    </p:set>
-                                    <p:animEffect transition="in" filter="fade">
-                                      <p:cBhvr>
-                                        <p:cTn id="10" dur="500"/>
-                                        <p:tgtEl>
-                                          <p:spTgt spid="7"/>
-                                        </p:tgtEl>
-                                      </p:cBhvr>
-                                    </p:animEffect>
-                                  </p:childTnLst>
-                                </p:cTn>
-                              </p:par>
-                              <p:par>
-                                <p:cTn id="11" presetID="10" presetClass="entr" presetSubtype="0" fill="hold" grpId="0" nodeType="withEffect">
-                                  <p:stCondLst>
-                                    <p:cond delay="0"/>
-                                  </p:stCondLst>
-                                  <p:childTnLst>
-                                    <p:set>
-                                      <p:cBhvr>
-                                        <p:cTn id="12" dur="1" fill="hold">
-                                          <p:stCondLst>
-                                            <p:cond delay="0"/>
-                                          </p:stCondLst>
-                                        </p:cTn>
-                                        <p:tgtEl>
-                                          <p:spTgt spid="6"/>
-                                        </p:tgtEl>
-                                        <p:attrNameLst>
-                                          <p:attrName>style.visibility</p:attrName>
-                                        </p:attrNameLst>
-                                      </p:cBhvr>
-                                      <p:to>
-                                        <p:strVal val="visible"/>
-                                      </p:to>
-                                    </p:set>
-                                    <p:animEffect transition="in" filter="fade">
-                                      <p:cBhvr>
-                                        <p:cTn id="13" dur="500"/>
-                                        <p:tgtEl>
-                                          <p:spTgt spid="6"/>
-                                        </p:tgtEl>
-                                      </p:cBhvr>
-                                    </p:animEffect>
-                                  </p:childTnLst>
-                                </p:cTn>
-                              </p:par>
-                              <p:par>
-                                <p:cTn id="14" presetID="10" presetClass="entr" presetSubtype="0" fill="hold" grpId="0" nodeType="withEffect">
-                                  <p:stCondLst>
-                                    <p:cond delay="0"/>
-                                  </p:stCondLst>
-                                  <p:childTnLst>
-                                    <p:set>
-                                      <p:cBhvr>
-                                        <p:cTn id="15" dur="1" fill="hold">
-                                          <p:stCondLst>
-                                            <p:cond delay="0"/>
-                                          </p:stCondLst>
-                                        </p:cTn>
-                                        <p:tgtEl>
-                                          <p:spTgt spid="9"/>
-                                        </p:tgtEl>
-                                        <p:attrNameLst>
-                                          <p:attrName>style.visibility</p:attrName>
-                                        </p:attrNameLst>
-                                      </p:cBhvr>
-                                      <p:to>
-                                        <p:strVal val="visible"/>
-                                      </p:to>
-                                    </p:set>
-                                    <p:animEffect transition="in" filter="fade">
-                                      <p:cBhvr>
-                                        <p:cTn id="16" dur="500"/>
-                                        <p:tgtEl>
-                                          <p:spTgt spid="9"/>
-                                        </p:tgtEl>
-                                      </p:cBhvr>
-                                    </p:animEffect>
-                                  </p:childTnLst>
-                                </p:cTn>
-                              </p:par>
-                              <p:par>
-                                <p:cTn id="17" presetID="10" presetClass="entr" presetSubtype="0" fill="hold" grpId="0" nodeType="withEffect">
-                                  <p:stCondLst>
-                                    <p:cond delay="0"/>
-                                  </p:stCondLst>
-                                  <p:childTnLst>
-                                    <p:set>
-                                      <p:cBhvr>
-                                        <p:cTn id="18" dur="1" fill="hold">
-                                          <p:stCondLst>
-                                            <p:cond delay="0"/>
-                                          </p:stCondLst>
-                                        </p:cTn>
-                                        <p:tgtEl>
-                                          <p:spTgt spid="8"/>
-                                        </p:tgtEl>
-                                        <p:attrNameLst>
-                                          <p:attrName>style.visibility</p:attrName>
-                                        </p:attrNameLst>
-                                      </p:cBhvr>
-                                      <p:to>
-                                        <p:strVal val="visible"/>
-                                      </p:to>
-                                    </p:set>
-                                    <p:animEffect transition="in" filter="fade">
-                                      <p:cBhvr>
-                                        <p:cTn id="19" dur="500"/>
-                                        <p:tgtEl>
-                                          <p:spTgt spid="8"/>
-                                        </p:tgtEl>
-                                      </p:cBhvr>
-                                    </p:animEffect>
-                                  </p:childTnLst>
-                                </p:cTn>
-                              </p:par>
-                            </p:childTnLst>
-                          </p:cTn>
-                        </p:par>
-                      </p:childTnLst>
-                    </p:cTn>
-                  </p:par>
-                </p:childTnLst>
-              </p:cTn>
-              <p:prevCondLst>
-                <p:cond evt="onPrev" delay="0">
-                  <p:tgtEl>
-                    <p:sldTgt/>
-                  </p:tgtEl>
-                </p:cond>
-              </p:prevCondLst>
-              <p:nextCondLst>
-                <p:cond evt="onNext" delay="0">
-                  <p:tgtEl>
-                    <p:sldTgt/>
-                  </p:tgtEl>
-                </p:cond>
-              </p:nextCondLst>
-            </p:seq>
-          </p:childTnLst>
-        </p:cTn>
-      </p:par>
-    </p:tnLst>
-    <p:bldLst>
-      <p:bldP spid="5" grpId="0" animBg="1"/>
-      <p:bldP spid="6" grpId="0" animBg="1"/>
-      <p:bldP spid="7" grpId="0" animBg="1"/>
-      <p:bldP spid="8" grpId="0" animBg="1"/>
-      <p:bldP spid="9" grpId="0" animBg="1"/>
-    </p:bldLst>
-  </p:timing>
-</p:sld>
-</file>
-
-<file path=ppt/slides/slide20.xml><?xml version="1.0" encoding="utf-8"?>
+<file path=ppt/slides/slide21.xml><?xml version="1.0" encoding="utf-8"?>
 <p:sld xmlns:a="http://schemas.openxmlformats.org/drawingml/2006/main" xmlns:r="http://schemas.openxmlformats.org/officeDocument/2006/relationships" xmlns:p="http://schemas.openxmlformats.org/presentationml/2006/main">
   <p:cSld>
     <p:spTree>
@@ -9815,7 +9883,7 @@
           <a:blip r:embed="rId2">
             <a:extLst>
               <a:ext uri="{28A0092B-C50C-407E-A947-70E740481C1C}">
-                <a14:useLocalDpi xmlns:a14="http://schemas.microsoft.com/office/drawing/2010/main" val="0"/>
+                <a14:useLocalDpi xmlns:a14="http://schemas.microsoft.com/office/drawing/2010/main" xmlns="" val="0"/>
               </a:ext>
             </a:extLst>
           </a:blip>
@@ -9835,7 +9903,7 @@
           <a:noFill/>
           <a:extLst>
             <a:ext uri="{909E8E84-426E-40DD-AFC4-6F175D3DCCD1}">
-              <a14:hiddenFill xmlns:a14="http://schemas.microsoft.com/office/drawing/2010/main">
+              <a14:hiddenFill xmlns:a14="http://schemas.microsoft.com/office/drawing/2010/main" xmlns="">
                 <a:solidFill>
                   <a:srgbClr val="FFFFFF"/>
                 </a:solidFill>
@@ -9856,7 +9924,7 @@
           <a:blip r:embed="rId3">
             <a:extLst>
               <a:ext uri="{28A0092B-C50C-407E-A947-70E740481C1C}">
-                <a14:useLocalDpi xmlns:a14="http://schemas.microsoft.com/office/drawing/2010/main" val="0"/>
+                <a14:useLocalDpi xmlns:a14="http://schemas.microsoft.com/office/drawing/2010/main" xmlns="" val="0"/>
               </a:ext>
             </a:extLst>
           </a:blip>
@@ -9876,7 +9944,7 @@
           <a:noFill/>
           <a:extLst>
             <a:ext uri="{909E8E84-426E-40DD-AFC4-6F175D3DCCD1}">
-              <a14:hiddenFill xmlns:a14="http://schemas.microsoft.com/office/drawing/2010/main">
+              <a14:hiddenFill xmlns:a14="http://schemas.microsoft.com/office/drawing/2010/main" xmlns="">
                 <a:solidFill>
                   <a:srgbClr val="FFFFFF"/>
                 </a:solidFill>
@@ -10085,11 +10153,7 @@
             </a:r>
             <a:r>
               <a:rPr lang="en-US" i="1" dirty="0" smtClean="0"/>
-              <a:t> </a:t>
-            </a:r>
-            <a:r>
-              <a:rPr lang="en-US" i="1" dirty="0" smtClean="0"/>
-              <a:t>e realizzazione ad hoc </a:t>
+              <a:t> e realizzazione ad hoc </a:t>
             </a:r>
             <a:endParaRPr lang="en-US" dirty="0" smtClean="0"/>
           </a:p>
@@ -10126,7 +10190,6 @@
               <a:rPr lang="en-US" i="1" dirty="0" smtClean="0"/>
               <a:t>	</a:t>
             </a:r>
-            <a:endParaRPr lang="en-US" i="1" dirty="0" smtClean="0"/>
           </a:p>
         </p:txBody>
       </p:sp>
@@ -10157,13 +10220,7 @@
               <a:rPr lang="it-IT" sz="4800" b="1" dirty="0" smtClean="0">
                 <a:latin typeface="+mj-lt"/>
               </a:rPr>
-              <a:t>Obiettivi di </a:t>
-            </a:r>
-            <a:r>
-              <a:rPr lang="it-IT" sz="4800" b="1" dirty="0" smtClean="0">
-                <a:latin typeface="+mj-lt"/>
-              </a:rPr>
-              <a:t>design</a:t>
+              <a:t>Obiettivi di design</a:t>
             </a:r>
           </a:p>
           <a:p>
@@ -10211,18 +10268,18 @@
     </p:spTree>
     <p:extLst>
       <p:ext uri="{BB962C8B-B14F-4D97-AF65-F5344CB8AC3E}">
-        <p14:creationId xmlns:p14="http://schemas.microsoft.com/office/powerpoint/2010/main" val="1197112555"/>
+        <p14:creationId xmlns:p14="http://schemas.microsoft.com/office/powerpoint/2010/main" xmlns="" val="1197112555"/>
       </p:ext>
     </p:extLst>
   </p:cSld>
   <p:clrMapOvr>
     <a:masterClrMapping/>
   </p:clrMapOvr>
-  <mc:AlternateContent xmlns:mc="http://schemas.openxmlformats.org/markup-compatibility/2006" xmlns:p14="http://schemas.microsoft.com/office/powerpoint/2010/main">
-    <mc:Choice Requires="p14">
+  <mc:AlternateContent xmlns:mc="http://schemas.openxmlformats.org/markup-compatibility/2006">
+    <mc:Choice xmlns:p14="http://schemas.microsoft.com/office/powerpoint/2010/main" xmlns="" Requires="p14">
       <p:transition spd="slow" p14:dur="2000"/>
     </mc:Choice>
-    <mc:Fallback xmlns="">
+    <mc:Fallback>
       <p:transition spd="slow"/>
     </mc:Fallback>
   </mc:AlternateContent>
@@ -10236,7 +10293,7 @@
 </p:sld>
 </file>
 
-<file path=ppt/slides/slide21.xml><?xml version="1.0" encoding="utf-8"?>
+<file path=ppt/slides/slide22.xml><?xml version="1.0" encoding="utf-8"?>
 <p:sld xmlns:a="http://schemas.openxmlformats.org/drawingml/2006/main" xmlns:r="http://schemas.openxmlformats.org/officeDocument/2006/relationships" xmlns:p="http://schemas.openxmlformats.org/presentationml/2006/main">
   <p:cSld>
     <p:spTree>
@@ -10437,7 +10494,6 @@
               <a:rPr lang="en-US" b="1" dirty="0" smtClean="0"/>
               <a:t>Buy</a:t>
             </a:r>
-            <a:endParaRPr lang="en-US" b="1" dirty="0" smtClean="0"/>
           </a:p>
           <a:p>
             <a:pPr marL="822960" lvl="1" indent="-457200"/>
@@ -10546,13 +10602,7 @@
               <a:rPr lang="it-IT" sz="4800" b="1" dirty="0" smtClean="0">
                 <a:latin typeface="+mj-lt"/>
               </a:rPr>
-              <a:t>Obiettivi di </a:t>
-            </a:r>
-            <a:r>
-              <a:rPr lang="it-IT" sz="4800" b="1" dirty="0" smtClean="0">
-                <a:latin typeface="+mj-lt"/>
-              </a:rPr>
-              <a:t>design</a:t>
+              <a:t>Obiettivi di design</a:t>
             </a:r>
           </a:p>
           <a:p>
@@ -10615,7 +10665,7 @@
           <a:blip r:embed="rId2">
             <a:extLst>
               <a:ext uri="{28A0092B-C50C-407E-A947-70E740481C1C}">
-                <a14:useLocalDpi xmlns:a14="http://schemas.microsoft.com/office/drawing/2010/main" val="0"/>
+                <a14:useLocalDpi xmlns:a14="http://schemas.microsoft.com/office/drawing/2010/main" xmlns="" val="0"/>
               </a:ext>
             </a:extLst>
           </a:blip>
@@ -10635,7 +10685,7 @@
           <a:noFill/>
           <a:extLst>
             <a:ext uri="{909E8E84-426E-40DD-AFC4-6F175D3DCCD1}">
-              <a14:hiddenFill xmlns:a14="http://schemas.microsoft.com/office/drawing/2010/main">
+              <a14:hiddenFill xmlns:a14="http://schemas.microsoft.com/office/drawing/2010/main" xmlns="">
                 <a:solidFill>
                   <a:srgbClr val="FFFFFF"/>
                 </a:solidFill>
@@ -10656,7 +10706,7 @@
           <a:blip r:embed="rId3">
             <a:extLst>
               <a:ext uri="{28A0092B-C50C-407E-A947-70E740481C1C}">
-                <a14:useLocalDpi xmlns:a14="http://schemas.microsoft.com/office/drawing/2010/main" val="0"/>
+                <a14:useLocalDpi xmlns:a14="http://schemas.microsoft.com/office/drawing/2010/main" xmlns="" val="0"/>
               </a:ext>
             </a:extLst>
           </a:blip>
@@ -10676,7 +10726,7 @@
           <a:noFill/>
           <a:extLst>
             <a:ext uri="{909E8E84-426E-40DD-AFC4-6F175D3DCCD1}">
-              <a14:hiddenFill xmlns:a14="http://schemas.microsoft.com/office/drawing/2010/main">
+              <a14:hiddenFill xmlns:a14="http://schemas.microsoft.com/office/drawing/2010/main" xmlns="">
                 <a:solidFill>
                   <a:srgbClr val="FFFFFF"/>
                 </a:solidFill>
@@ -10697,7 +10747,7 @@
           <a:blip r:embed="rId4">
             <a:extLst>
               <a:ext uri="{28A0092B-C50C-407E-A947-70E740481C1C}">
-                <a14:useLocalDpi xmlns:a14="http://schemas.microsoft.com/office/drawing/2010/main" val="0"/>
+                <a14:useLocalDpi xmlns:a14="http://schemas.microsoft.com/office/drawing/2010/main" xmlns="" val="0"/>
               </a:ext>
             </a:extLst>
           </a:blip>
@@ -10726,7 +10776,7 @@
           </a:effectLst>
           <a:extLst>
             <a:ext uri="{909E8E84-426E-40DD-AFC4-6F175D3DCCD1}">
-              <a14:hiddenFill xmlns:a14="http://schemas.microsoft.com/office/drawing/2010/main">
+              <a14:hiddenFill xmlns:a14="http://schemas.microsoft.com/office/drawing/2010/main" xmlns="">
                 <a:solidFill>
                   <a:srgbClr val="FFFFFF"/>
                 </a:solidFill>
@@ -10738,18 +10788,18 @@
     </p:spTree>
     <p:extLst>
       <p:ext uri="{BB962C8B-B14F-4D97-AF65-F5344CB8AC3E}">
-        <p14:creationId xmlns:p14="http://schemas.microsoft.com/office/powerpoint/2010/main" val="700353664"/>
+        <p14:creationId xmlns:p14="http://schemas.microsoft.com/office/powerpoint/2010/main" xmlns="" val="700353664"/>
       </p:ext>
     </p:extLst>
   </p:cSld>
   <p:clrMapOvr>
     <a:masterClrMapping/>
   </p:clrMapOvr>
-  <mc:AlternateContent xmlns:mc="http://schemas.openxmlformats.org/markup-compatibility/2006" xmlns:p14="http://schemas.microsoft.com/office/powerpoint/2010/main">
-    <mc:Choice Requires="p14">
+  <mc:AlternateContent xmlns:mc="http://schemas.openxmlformats.org/markup-compatibility/2006">
+    <mc:Choice xmlns:p14="http://schemas.microsoft.com/office/powerpoint/2010/main" xmlns="" Requires="p14">
       <p:transition spd="slow" p14:dur="2000"/>
     </mc:Choice>
-    <mc:Fallback xmlns="">
+    <mc:Fallback>
       <p:transition spd="slow"/>
     </mc:Fallback>
   </mc:AlternateContent>
@@ -10763,7 +10813,7 @@
 </p:sld>
 </file>
 
-<file path=ppt/slides/slide22.xml><?xml version="1.0" encoding="utf-8"?>
+<file path=ppt/slides/slide23.xml><?xml version="1.0" encoding="utf-8"?>
 <p:sld xmlns:a="http://schemas.openxmlformats.org/drawingml/2006/main" xmlns:r="http://schemas.openxmlformats.org/officeDocument/2006/relationships" xmlns:p="http://schemas.openxmlformats.org/presentationml/2006/main">
   <p:cSld>
     <p:spTree>
@@ -10807,13 +10857,7 @@
               <a:rPr lang="it-IT" sz="4800" b="1" dirty="0" smtClean="0">
                 <a:latin typeface="+mj-lt"/>
               </a:rPr>
-              <a:t>Obiettivi di </a:t>
-            </a:r>
-            <a:r>
-              <a:rPr lang="it-IT" sz="4800" b="1" dirty="0" smtClean="0">
-                <a:latin typeface="+mj-lt"/>
-              </a:rPr>
-              <a:t>design</a:t>
+              <a:t>Obiettivi di design</a:t>
             </a:r>
           </a:p>
           <a:p>
@@ -10899,7 +10943,7 @@
           <a:blip r:embed="rId2">
             <a:extLst>
               <a:ext uri="{28A0092B-C50C-407E-A947-70E740481C1C}">
-                <a14:useLocalDpi xmlns:a14="http://schemas.microsoft.com/office/drawing/2010/main" val="0"/>
+                <a14:useLocalDpi xmlns:a14="http://schemas.microsoft.com/office/drawing/2010/main" xmlns="" val="0"/>
               </a:ext>
             </a:extLst>
           </a:blip>
@@ -10919,7 +10963,7 @@
           <a:noFill/>
           <a:extLst>
             <a:ext uri="{909E8E84-426E-40DD-AFC4-6F175D3DCCD1}">
-              <a14:hiddenFill xmlns:a14="http://schemas.microsoft.com/office/drawing/2010/main">
+              <a14:hiddenFill xmlns:a14="http://schemas.microsoft.com/office/drawing/2010/main" xmlns="">
                 <a:solidFill>
                   <a:srgbClr val="FFFFFF"/>
                 </a:solidFill>
@@ -10974,7 +11018,7 @@
           <a:blip r:embed="rId3">
             <a:extLst>
               <a:ext uri="{28A0092B-C50C-407E-A947-70E740481C1C}">
-                <a14:useLocalDpi xmlns:a14="http://schemas.microsoft.com/office/drawing/2010/main" val="0"/>
+                <a14:useLocalDpi xmlns:a14="http://schemas.microsoft.com/office/drawing/2010/main" xmlns="" val="0"/>
               </a:ext>
             </a:extLst>
           </a:blip>
@@ -10994,7 +11038,7 @@
           <a:noFill/>
           <a:extLst>
             <a:ext uri="{909E8E84-426E-40DD-AFC4-6F175D3DCCD1}">
-              <a14:hiddenFill xmlns:a14="http://schemas.microsoft.com/office/drawing/2010/main">
+              <a14:hiddenFill xmlns:a14="http://schemas.microsoft.com/office/drawing/2010/main" xmlns="">
                 <a:solidFill>
                   <a:srgbClr val="FFFFFF"/>
                 </a:solidFill>
@@ -11006,7 +11050,7 @@
     </p:spTree>
     <p:extLst>
       <p:ext uri="{BB962C8B-B14F-4D97-AF65-F5344CB8AC3E}">
-        <p14:creationId xmlns:p14="http://schemas.microsoft.com/office/powerpoint/2010/main" val="2947224754"/>
+        <p14:creationId xmlns:p14="http://schemas.microsoft.com/office/powerpoint/2010/main" xmlns="" val="2947224754"/>
       </p:ext>
     </p:extLst>
   </p:cSld>
@@ -11187,7 +11231,7 @@
 </p:sld>
 </file>
 
-<file path=ppt/slides/slide23.xml><?xml version="1.0" encoding="utf-8"?>
+<file path=ppt/slides/slide24.xml><?xml version="1.0" encoding="utf-8"?>
 <p:sld xmlns:a="http://schemas.openxmlformats.org/drawingml/2006/main" xmlns:r="http://schemas.openxmlformats.org/officeDocument/2006/relationships" xmlns:p="http://schemas.openxmlformats.org/presentationml/2006/main">
   <p:cSld>
     <p:spTree>
@@ -11216,7 +11260,7 @@
           <a:blip r:embed="rId2">
             <a:extLst>
               <a:ext uri="{28A0092B-C50C-407E-A947-70E740481C1C}">
-                <a14:useLocalDpi xmlns:a14="http://schemas.microsoft.com/office/drawing/2010/main" val="0"/>
+                <a14:useLocalDpi xmlns:a14="http://schemas.microsoft.com/office/drawing/2010/main" xmlns="" val="0"/>
               </a:ext>
             </a:extLst>
           </a:blip>
@@ -11236,7 +11280,7 @@
           <a:noFill/>
           <a:extLst>
             <a:ext uri="{909E8E84-426E-40DD-AFC4-6F175D3DCCD1}">
-              <a14:hiddenFill xmlns:a14="http://schemas.microsoft.com/office/drawing/2010/main">
+              <a14:hiddenFill xmlns:a14="http://schemas.microsoft.com/office/drawing/2010/main" xmlns="">
                 <a:solidFill>
                   <a:srgbClr val="FFFFFF"/>
                 </a:solidFill>
@@ -11257,7 +11301,7 @@
           <a:blip r:embed="rId3">
             <a:extLst>
               <a:ext uri="{28A0092B-C50C-407E-A947-70E740481C1C}">
-                <a14:useLocalDpi xmlns:a14="http://schemas.microsoft.com/office/drawing/2010/main" val="0"/>
+                <a14:useLocalDpi xmlns:a14="http://schemas.microsoft.com/office/drawing/2010/main" xmlns="" val="0"/>
               </a:ext>
             </a:extLst>
           </a:blip>
@@ -11277,7 +11321,7 @@
           <a:noFill/>
           <a:extLst>
             <a:ext uri="{909E8E84-426E-40DD-AFC4-6F175D3DCCD1}">
-              <a14:hiddenFill xmlns:a14="http://schemas.microsoft.com/office/drawing/2010/main">
+              <a14:hiddenFill xmlns:a14="http://schemas.microsoft.com/office/drawing/2010/main" xmlns="">
                 <a:solidFill>
                   <a:srgbClr val="FFFFFF"/>
                 </a:solidFill>
@@ -11512,13 +11556,7 @@
               <a:rPr lang="it-IT" sz="4800" b="1" dirty="0" smtClean="0">
                 <a:latin typeface="+mj-lt"/>
               </a:rPr>
-              <a:t>Obiettivi di </a:t>
-            </a:r>
-            <a:r>
-              <a:rPr lang="it-IT" sz="4800" b="1" dirty="0" smtClean="0">
-                <a:latin typeface="+mj-lt"/>
-              </a:rPr>
-              <a:t>design</a:t>
+              <a:t>Obiettivi di design</a:t>
             </a:r>
           </a:p>
           <a:p>
@@ -11812,18 +11850,18 @@
     </p:spTree>
     <p:extLst>
       <p:ext uri="{BB962C8B-B14F-4D97-AF65-F5344CB8AC3E}">
-        <p14:creationId xmlns:p14="http://schemas.microsoft.com/office/powerpoint/2010/main" val="1111877724"/>
+        <p14:creationId xmlns:p14="http://schemas.microsoft.com/office/powerpoint/2010/main" xmlns="" val="1111877724"/>
       </p:ext>
     </p:extLst>
   </p:cSld>
   <p:clrMapOvr>
     <a:masterClrMapping/>
   </p:clrMapOvr>
-  <mc:AlternateContent xmlns:mc="http://schemas.openxmlformats.org/markup-compatibility/2006" xmlns:p14="http://schemas.microsoft.com/office/powerpoint/2010/main">
-    <mc:Choice Requires="p14">
+  <mc:AlternateContent xmlns:mc="http://schemas.openxmlformats.org/markup-compatibility/2006">
+    <mc:Choice xmlns:p14="http://schemas.microsoft.com/office/powerpoint/2010/main" xmlns="" Requires="p14">
       <p:transition spd="slow" p14:dur="2000"/>
     </mc:Choice>
-    <mc:Fallback xmlns="">
+    <mc:Fallback>
       <p:transition spd="slow"/>
     </mc:Fallback>
   </mc:AlternateContent>
@@ -12131,7 +12169,7 @@
 </p:sld>
 </file>
 
-<file path=ppt/slides/slide24.xml><?xml version="1.0" encoding="utf-8"?>
+<file path=ppt/slides/slide25.xml><?xml version="1.0" encoding="utf-8"?>
 <p:sld xmlns:a="http://schemas.openxmlformats.org/drawingml/2006/main" xmlns:r="http://schemas.openxmlformats.org/officeDocument/2006/relationships" xmlns:p="http://schemas.openxmlformats.org/presentationml/2006/main">
   <p:cSld>
     <p:spTree>
@@ -12175,13 +12213,7 @@
               <a:rPr lang="it-IT" sz="4800" b="1" dirty="0" smtClean="0">
                 <a:latin typeface="+mj-lt"/>
               </a:rPr>
-              <a:t>Obiettivi di </a:t>
-            </a:r>
-            <a:r>
-              <a:rPr lang="it-IT" sz="4800" b="1" dirty="0" smtClean="0">
-                <a:latin typeface="+mj-lt"/>
-              </a:rPr>
-              <a:t>design</a:t>
+              <a:t>Obiettivi di design</a:t>
             </a:r>
           </a:p>
           <a:p>
@@ -12190,19 +12222,7 @@
               <a:rPr lang="it-IT" sz="2800" b="1" dirty="0" smtClean="0">
                 <a:latin typeface="+mj-lt"/>
               </a:rPr>
-              <a:t>Funzionalità </a:t>
-            </a:r>
-            <a:r>
-              <a:rPr lang="it-IT" sz="2800" b="1" dirty="0" smtClean="0">
-                <a:latin typeface="+mj-lt"/>
-              </a:rPr>
-              <a:t>COTS </a:t>
-            </a:r>
-            <a:r>
-              <a:rPr lang="it-IT" sz="2800" b="1" dirty="0" smtClean="0">
-                <a:latin typeface="+mj-lt"/>
-              </a:rPr>
-              <a:t>Forum</a:t>
+              <a:t>Funzionalità COTS Forum</a:t>
             </a:r>
             <a:endParaRPr lang="it-IT" b="1" dirty="0"/>
           </a:p>
@@ -12217,7 +12237,7 @@
           <p:nvPr>
             <p:extLst>
               <p:ext uri="{D42A27DB-BD31-4B8C-83A1-F6EECF244321}">
-                <p14:modId xmlns:p14="http://schemas.microsoft.com/office/powerpoint/2010/main" val="2643884637"/>
+                <p14:modId xmlns:p14="http://schemas.microsoft.com/office/powerpoint/2010/main" xmlns="" val="2643884637"/>
               </p:ext>
             </p:extLst>
           </p:nvPr>
@@ -12658,14 +12678,14 @@
           <a:effectLst/>
           <a:extLst>
             <a:ext uri="{909E8E84-426E-40DD-AFC4-6F175D3DCCD1}">
-              <a14:hiddenFill xmlns:a14="http://schemas.microsoft.com/office/drawing/2010/main">
+              <a14:hiddenFill xmlns:a14="http://schemas.microsoft.com/office/drawing/2010/main" xmlns="">
                 <a:solidFill>
                   <a:schemeClr val="accent1"/>
                 </a:solidFill>
               </a14:hiddenFill>
             </a:ext>
             <a:ext uri="{91240B29-F687-4F45-9708-019B960494DF}">
-              <a14:hiddenLine xmlns:a14="http://schemas.microsoft.com/office/drawing/2010/main" w="9525">
+              <a14:hiddenLine xmlns:a14="http://schemas.microsoft.com/office/drawing/2010/main" xmlns="" w="9525">
                 <a:solidFill>
                   <a:schemeClr val="tx1"/>
                 </a:solidFill>
@@ -12675,7 +12695,7 @@
               </a14:hiddenLine>
             </a:ext>
             <a:ext uri="{AF507438-7753-43E0-B8FC-AC1667EBCBE1}">
-              <a14:hiddenEffects xmlns:a14="http://schemas.microsoft.com/office/drawing/2010/main">
+              <a14:hiddenEffects xmlns:a14="http://schemas.microsoft.com/office/drawing/2010/main" xmlns="">
                 <a:effectLst>
                   <a:outerShdw dist="35921" dir="2700000" algn="ctr" rotWithShape="0">
                     <a:schemeClr val="bg2"/>
@@ -12756,7 +12776,7 @@
     </p:spTree>
     <p:extLst>
       <p:ext uri="{BB962C8B-B14F-4D97-AF65-F5344CB8AC3E}">
-        <p14:creationId xmlns:p14="http://schemas.microsoft.com/office/powerpoint/2010/main" val="503117530"/>
+        <p14:creationId xmlns:p14="http://schemas.microsoft.com/office/powerpoint/2010/main" xmlns="" val="503117530"/>
       </p:ext>
     </p:extLst>
   </p:cSld>
@@ -12773,7 +12793,7 @@
 </p:sld>
 </file>
 
-<file path=ppt/slides/slide25.xml><?xml version="1.0" encoding="utf-8"?>
+<file path=ppt/slides/slide26.xml><?xml version="1.0" encoding="utf-8"?>
 <p:sld xmlns:a="http://schemas.openxmlformats.org/drawingml/2006/main" xmlns:r="http://schemas.openxmlformats.org/officeDocument/2006/relationships" xmlns:p="http://schemas.openxmlformats.org/presentationml/2006/main">
   <p:cSld>
     <p:spTree>
@@ -12817,13 +12837,7 @@
               <a:rPr lang="it-IT" sz="4800" b="1" dirty="0" smtClean="0">
                 <a:latin typeface="+mj-lt"/>
               </a:rPr>
-              <a:t>Obiettivi di </a:t>
-            </a:r>
-            <a:r>
-              <a:rPr lang="it-IT" sz="4800" b="1" dirty="0" smtClean="0">
-                <a:latin typeface="+mj-lt"/>
-              </a:rPr>
-              <a:t>design</a:t>
+              <a:t>Obiettivi di design</a:t>
             </a:r>
           </a:p>
           <a:p>
@@ -12832,19 +12846,7 @@
               <a:rPr lang="it-IT" sz="2800" b="1" dirty="0" smtClean="0">
                 <a:latin typeface="+mj-lt"/>
               </a:rPr>
-              <a:t>Funzionalità </a:t>
-            </a:r>
-            <a:r>
-              <a:rPr lang="it-IT" sz="2800" b="1" dirty="0" smtClean="0">
-                <a:latin typeface="+mj-lt"/>
-              </a:rPr>
-              <a:t>COTS </a:t>
-            </a:r>
-            <a:r>
-              <a:rPr lang="it-IT" sz="2800" b="1" dirty="0" smtClean="0">
-                <a:latin typeface="+mj-lt"/>
-              </a:rPr>
-              <a:t>Forum (2)</a:t>
+              <a:t>Funzionalità COTS Forum (2)</a:t>
             </a:r>
             <a:endParaRPr lang="it-IT" b="1" dirty="0"/>
           </a:p>
@@ -12859,7 +12861,7 @@
           <p:nvPr>
             <p:extLst>
               <p:ext uri="{D42A27DB-BD31-4B8C-83A1-F6EECF244321}">
-                <p14:modId xmlns:p14="http://schemas.microsoft.com/office/powerpoint/2010/main" val="722892891"/>
+                <p14:modId xmlns:p14="http://schemas.microsoft.com/office/powerpoint/2010/main" xmlns="" val="722892891"/>
               </p:ext>
             </p:extLst>
           </p:nvPr>
@@ -13841,7 +13843,7 @@
     </p:spTree>
     <p:extLst>
       <p:ext uri="{BB962C8B-B14F-4D97-AF65-F5344CB8AC3E}">
-        <p14:creationId xmlns:p14="http://schemas.microsoft.com/office/powerpoint/2010/main" val="2473970557"/>
+        <p14:creationId xmlns:p14="http://schemas.microsoft.com/office/powerpoint/2010/main" xmlns="" val="2473970557"/>
       </p:ext>
     </p:extLst>
   </p:cSld>
@@ -13858,7 +13860,7 @@
 </p:sld>
 </file>
 
-<file path=ppt/slides/slide26.xml><?xml version="1.0" encoding="utf-8"?>
+<file path=ppt/slides/slide27.xml><?xml version="1.0" encoding="utf-8"?>
 <p:sld xmlns:a="http://schemas.openxmlformats.org/drawingml/2006/main" xmlns:r="http://schemas.openxmlformats.org/officeDocument/2006/relationships" xmlns:p="http://schemas.openxmlformats.org/presentationml/2006/main">
   <p:cSld>
     <p:spTree>
@@ -13887,7 +13889,7 @@
           <a:blip r:embed="rId2">
             <a:extLst>
               <a:ext uri="{28A0092B-C50C-407E-A947-70E740481C1C}">
-                <a14:useLocalDpi xmlns:a14="http://schemas.microsoft.com/office/drawing/2010/main" val="0"/>
+                <a14:useLocalDpi xmlns:a14="http://schemas.microsoft.com/office/drawing/2010/main" xmlns="" val="0"/>
               </a:ext>
             </a:extLst>
           </a:blip>
@@ -13930,7 +13932,7 @@
           </a:sp3d>
           <a:extLst>
             <a:ext uri="{909E8E84-426E-40DD-AFC4-6F175D3DCCD1}">
-              <a14:hiddenFill xmlns:a14="http://schemas.microsoft.com/office/drawing/2010/main">
+              <a14:hiddenFill xmlns:a14="http://schemas.microsoft.com/office/drawing/2010/main" xmlns="">
                 <a:solidFill>
                   <a:srgbClr val="FFFFFF"/>
                 </a:solidFill>
@@ -14055,13 +14057,7 @@
               <a:rPr lang="it-IT" sz="4800" b="1" dirty="0" smtClean="0">
                 <a:latin typeface="+mj-lt"/>
               </a:rPr>
-              <a:t>Obiettivi di </a:t>
-            </a:r>
-            <a:r>
-              <a:rPr lang="it-IT" sz="4800" b="1" dirty="0" smtClean="0">
-                <a:latin typeface="+mj-lt"/>
-              </a:rPr>
-              <a:t>design</a:t>
+              <a:t>Obiettivi di design</a:t>
             </a:r>
           </a:p>
           <a:p>
@@ -14070,19 +14066,7 @@
               <a:rPr lang="it-IT" sz="2800" b="1" dirty="0" smtClean="0">
                 <a:latin typeface="+mj-lt"/>
               </a:rPr>
-              <a:t>Funzionalità </a:t>
-            </a:r>
-            <a:r>
-              <a:rPr lang="it-IT" sz="2800" b="1" dirty="0" smtClean="0">
-                <a:latin typeface="+mj-lt"/>
-              </a:rPr>
-              <a:t>COTS </a:t>
-            </a:r>
-            <a:r>
-              <a:rPr lang="it-IT" sz="2800" b="1" dirty="0" smtClean="0">
-                <a:latin typeface="+mj-lt"/>
-              </a:rPr>
-              <a:t>Forum (3)</a:t>
+              <a:t>Funzionalità COTS Forum (3)</a:t>
             </a:r>
             <a:endParaRPr lang="it-IT" b="1" dirty="0"/>
           </a:p>
@@ -14103,7 +14087,7 @@
 </p:sld>
 </file>
 
-<file path=ppt/slides/slide27.xml><?xml version="1.0" encoding="utf-8"?>
+<file path=ppt/slides/slide28.xml><?xml version="1.0" encoding="utf-8"?>
 <p:sld xmlns:a="http://schemas.openxmlformats.org/drawingml/2006/main" xmlns:r="http://schemas.openxmlformats.org/officeDocument/2006/relationships" xmlns:p="http://schemas.openxmlformats.org/presentationml/2006/main">
   <p:cSld>
     <p:spTree>
@@ -14176,7 +14160,7 @@
           <a:blip r:embed="rId2">
             <a:extLst>
               <a:ext uri="{28A0092B-C50C-407E-A947-70E740481C1C}">
-                <a14:useLocalDpi xmlns:a14="http://schemas.microsoft.com/office/drawing/2010/main" val="0"/>
+                <a14:useLocalDpi xmlns:a14="http://schemas.microsoft.com/office/drawing/2010/main" xmlns="" val="0"/>
               </a:ext>
             </a:extLst>
           </a:blip>
@@ -14200,14 +14184,14 @@
           <a:effectLst/>
           <a:extLst>
             <a:ext uri="{909E8E84-426E-40DD-AFC4-6F175D3DCCD1}">
-              <a14:hiddenFill xmlns:a14="http://schemas.microsoft.com/office/drawing/2010/main">
+              <a14:hiddenFill xmlns:a14="http://schemas.microsoft.com/office/drawing/2010/main" xmlns="">
                 <a:solidFill>
                   <a:schemeClr val="accent1"/>
                 </a:solidFill>
               </a14:hiddenFill>
             </a:ext>
             <a:ext uri="{91240B29-F687-4F45-9708-019B960494DF}">
-              <a14:hiddenLine xmlns:a14="http://schemas.microsoft.com/office/drawing/2010/main" w="9525">
+              <a14:hiddenLine xmlns:a14="http://schemas.microsoft.com/office/drawing/2010/main" xmlns="" w="9525">
                 <a:solidFill>
                   <a:schemeClr val="tx1"/>
                 </a:solidFill>
@@ -14217,7 +14201,7 @@
               </a14:hiddenLine>
             </a:ext>
             <a:ext uri="{AF507438-7753-43E0-B8FC-AC1667EBCBE1}">
-              <a14:hiddenEffects xmlns:a14="http://schemas.microsoft.com/office/drawing/2010/main">
+              <a14:hiddenEffects xmlns:a14="http://schemas.microsoft.com/office/drawing/2010/main" xmlns="">
                 <a:effectLst>
                   <a:outerShdw dist="35921" dir="2700000" algn="ctr" rotWithShape="0">
                     <a:schemeClr val="bg2"/>
@@ -14243,7 +14227,7 @@
 </p:sld>
 </file>
 
-<file path=ppt/slides/slide28.xml><?xml version="1.0" encoding="utf-8"?>
+<file path=ppt/slides/slide29.xml><?xml version="1.0" encoding="utf-8"?>
 <p:sld xmlns:a="http://schemas.openxmlformats.org/drawingml/2006/main" xmlns:r="http://schemas.openxmlformats.org/officeDocument/2006/relationships" xmlns:p="http://schemas.openxmlformats.org/presentationml/2006/main">
   <p:cSld>
     <p:spTree>
@@ -14318,14 +14302,14 @@
           <a:effectLst/>
           <a:extLst>
             <a:ext uri="{909E8E84-426E-40DD-AFC4-6F175D3DCCD1}">
-              <a14:hiddenFill xmlns:a14="http://schemas.microsoft.com/office/drawing/2010/main">
+              <a14:hiddenFill xmlns:a14="http://schemas.microsoft.com/office/drawing/2010/main" xmlns="">
                 <a:solidFill>
                   <a:schemeClr val="accent1"/>
                 </a:solidFill>
               </a14:hiddenFill>
             </a:ext>
             <a:ext uri="{91240B29-F687-4F45-9708-019B960494DF}">
-              <a14:hiddenLine xmlns:a14="http://schemas.microsoft.com/office/drawing/2010/main" w="9525">
+              <a14:hiddenLine xmlns:a14="http://schemas.microsoft.com/office/drawing/2010/main" xmlns="" w="9525">
                 <a:solidFill>
                   <a:schemeClr val="tx1"/>
                 </a:solidFill>
@@ -14335,7 +14319,7 @@
               </a14:hiddenLine>
             </a:ext>
             <a:ext uri="{AF507438-7753-43E0-B8FC-AC1667EBCBE1}">
-              <a14:hiddenEffects xmlns:a14="http://schemas.microsoft.com/office/drawing/2010/main">
+              <a14:hiddenEffects xmlns:a14="http://schemas.microsoft.com/office/drawing/2010/main" xmlns="">
                 <a:effectLst>
                   <a:outerShdw dist="35921" dir="2700000" algn="ctr" rotWithShape="0">
                     <a:schemeClr val="bg2"/>
@@ -14651,95 +14635,46 @@
                 <a:latin typeface="+mj-lt"/>
                 <a:cs typeface="Arial" pitchFamily="34" charset="0"/>
               </a:rPr>
-              <a:t>Non </a:t>
-            </a:r>
+              <a:t>Non sono state controllate le invarianti</a:t>
+            </a:r>
+          </a:p>
+          <a:p>
+            <a:pPr marL="742950" lvl="1" indent="-285750">
+              <a:buFont typeface="Courier New" pitchFamily="49" charset="0"/>
+              <a:buChar char="o"/>
+            </a:pPr>
             <a:r>
               <a:rPr lang="it-IT" dirty="0" smtClean="0">
                 <a:latin typeface="+mj-lt"/>
                 <a:cs typeface="Arial" pitchFamily="34" charset="0"/>
               </a:rPr>
-              <a:t>sono state controllate </a:t>
-            </a:r>
+              <a:t>Non avrebbe Individuato molti bug perché:</a:t>
+            </a:r>
+          </a:p>
+          <a:p>
+            <a:pPr marL="1200150" lvl="2" indent="-285750">
+              <a:buFont typeface="Arial" pitchFamily="34" charset="0"/>
+              <a:buChar char="•"/>
+            </a:pPr>
             <a:r>
               <a:rPr lang="it-IT" dirty="0" smtClean="0">
                 <a:latin typeface="+mj-lt"/>
                 <a:cs typeface="Arial" pitchFamily="34" charset="0"/>
               </a:rPr>
-              <a:t>le invarianti</a:t>
-            </a:r>
-          </a:p>
-          <a:p>
-            <a:pPr marL="742950" lvl="1" indent="-285750">
-              <a:buFont typeface="Courier New" pitchFamily="49" charset="0"/>
-              <a:buChar char="o"/>
+              <a:t>Il testing di unità è stato eseguito dallo sviluppatore stesso</a:t>
+            </a:r>
+          </a:p>
+          <a:p>
+            <a:pPr marL="1200150" lvl="2" indent="-285750">
+              <a:buFont typeface="Arial" pitchFamily="34" charset="0"/>
+              <a:buChar char="•"/>
             </a:pPr>
             <a:r>
               <a:rPr lang="it-IT" dirty="0" smtClean="0">
                 <a:latin typeface="+mj-lt"/>
                 <a:cs typeface="Arial" pitchFamily="34" charset="0"/>
               </a:rPr>
-              <a:t>Non </a:t>
-            </a:r>
-            <a:r>
-              <a:rPr lang="it-IT" dirty="0" smtClean="0">
-                <a:latin typeface="+mj-lt"/>
-                <a:cs typeface="Arial" pitchFamily="34" charset="0"/>
-              </a:rPr>
-              <a:t>avrebbe Individuato molti </a:t>
-            </a:r>
-            <a:r>
-              <a:rPr lang="it-IT" dirty="0" smtClean="0">
-                <a:latin typeface="+mj-lt"/>
-                <a:cs typeface="Arial" pitchFamily="34" charset="0"/>
-              </a:rPr>
-              <a:t>bug perché:</a:t>
-            </a:r>
-          </a:p>
-          <a:p>
-            <a:pPr marL="1200150" lvl="2" indent="-285750">
-              <a:buFont typeface="Arial" pitchFamily="34" charset="0"/>
-              <a:buChar char="•"/>
-            </a:pPr>
-            <a:r>
-              <a:rPr lang="it-IT" dirty="0" smtClean="0">
-                <a:latin typeface="+mj-lt"/>
-                <a:cs typeface="Arial" pitchFamily="34" charset="0"/>
-              </a:rPr>
-              <a:t>Il </a:t>
-            </a:r>
-            <a:r>
-              <a:rPr lang="it-IT" dirty="0" smtClean="0">
-                <a:latin typeface="+mj-lt"/>
-                <a:cs typeface="Arial" pitchFamily="34" charset="0"/>
-              </a:rPr>
-              <a:t>testing di unità è stato eseguito dallo sviluppatore </a:t>
-            </a:r>
-            <a:r>
-              <a:rPr lang="it-IT" dirty="0" smtClean="0">
-                <a:latin typeface="+mj-lt"/>
-                <a:cs typeface="Arial" pitchFamily="34" charset="0"/>
-              </a:rPr>
-              <a:t>stesso</a:t>
-            </a:r>
-          </a:p>
-          <a:p>
-            <a:pPr marL="1200150" lvl="2" indent="-285750">
-              <a:buFont typeface="Arial" pitchFamily="34" charset="0"/>
-              <a:buChar char="•"/>
-            </a:pPr>
-            <a:r>
-              <a:rPr lang="it-IT" dirty="0" smtClean="0">
-                <a:latin typeface="+mj-lt"/>
-                <a:cs typeface="Arial" pitchFamily="34" charset="0"/>
-              </a:rPr>
-              <a:t>Molto </a:t>
-            </a:r>
-            <a:r>
-              <a:rPr lang="it-IT" dirty="0" smtClean="0">
-                <a:latin typeface="+mj-lt"/>
-                <a:cs typeface="Arial" pitchFamily="34" charset="0"/>
-              </a:rPr>
-              <a:t>ridondate</a:t>
+              <a:t>Molto ridondate</a:t>
             </a:r>
             <a:r>
               <a:rPr lang="it-IT" dirty="0" smtClean="0">
@@ -14832,85 +14767,9 @@
     </p:spTree>
     <p:extLst>
       <p:ext uri="{BB962C8B-B14F-4D97-AF65-F5344CB8AC3E}">
-        <p14:creationId xmlns:p14="http://schemas.microsoft.com/office/powerpoint/2010/main" val="3312797979"/>
+        <p14:creationId xmlns:p14="http://schemas.microsoft.com/office/powerpoint/2010/main" xmlns="" val="3312797979"/>
       </p:ext>
     </p:extLst>
-  </p:cSld>
-  <p:clrMapOvr>
-    <a:masterClrMapping/>
-  </p:clrMapOvr>
-  <p:timing>
-    <p:tnLst>
-      <p:par>
-        <p:cTn id="1" dur="indefinite" restart="never" nodeType="tmRoot"/>
-      </p:par>
-    </p:tnLst>
-  </p:timing>
-</p:sld>
-</file>
-
-<file path=ppt/slides/slide29.xml><?xml version="1.0" encoding="utf-8"?>
-<p:sld xmlns:a="http://schemas.openxmlformats.org/drawingml/2006/main" xmlns:r="http://schemas.openxmlformats.org/officeDocument/2006/relationships" xmlns:p="http://schemas.openxmlformats.org/presentationml/2006/main">
-  <p:cSld>
-    <p:spTree>
-      <p:nvGrpSpPr>
-        <p:cNvPr id="1" name=""/>
-        <p:cNvGrpSpPr/>
-        <p:nvPr/>
-      </p:nvGrpSpPr>
-      <p:grpSpPr>
-        <a:xfrm>
-          <a:off x="0" y="0"/>
-          <a:ext cx="0" cy="0"/>
-          <a:chOff x="0" y="0"/>
-          <a:chExt cx="0" cy="0"/>
-        </a:xfrm>
-      </p:grpSpPr>
-      <p:sp>
-        <p:nvSpPr>
-          <p:cNvPr id="2" name="CasellaDiTesto 1"/>
-          <p:cNvSpPr txBox="1"/>
-          <p:nvPr/>
-        </p:nvSpPr>
-        <p:spPr>
-          <a:xfrm>
-            <a:off x="0" y="428604"/>
-            <a:ext cx="9144000" cy="1107996"/>
-          </a:xfrm>
-          <a:prstGeom prst="rect">
-            <a:avLst/>
-          </a:prstGeom>
-          <a:noFill/>
-        </p:spPr>
-        <p:txBody>
-          <a:bodyPr wrap="square" rtlCol="0">
-            <a:spAutoFit/>
-          </a:bodyPr>
-          <a:lstStyle/>
-          <a:p>
-            <a:pPr algn="ctr"/>
-            <a:r>
-              <a:rPr lang="it-IT" sz="4800" b="1" dirty="0" smtClean="0">
-                <a:latin typeface="+mj-lt"/>
-              </a:rPr>
-              <a:t>Pro\Contro </a:t>
-            </a:r>
-            <a:r>
-              <a:rPr lang="it-IT" sz="4800" b="1" dirty="0" smtClean="0">
-                <a:latin typeface="+mj-lt"/>
-              </a:rPr>
-              <a:t>del ODD</a:t>
-            </a:r>
-          </a:p>
-          <a:p>
-            <a:pPr algn="ctr"/>
-            <a:endParaRPr lang="it-IT" dirty="0">
-              <a:latin typeface="+mj-lt"/>
-            </a:endParaRPr>
-          </a:p>
-        </p:txBody>
-      </p:sp>
-    </p:spTree>
   </p:cSld>
   <p:clrMapOvr>
     <a:masterClrMapping/>
@@ -15378,18 +15237,18 @@
     </p:spTree>
     <p:extLst>
       <p:ext uri="{BB962C8B-B14F-4D97-AF65-F5344CB8AC3E}">
-        <p14:creationId xmlns:p14="http://schemas.microsoft.com/office/powerpoint/2010/main" val="155874689"/>
+        <p14:creationId xmlns:p14="http://schemas.microsoft.com/office/powerpoint/2010/main" xmlns="" val="155874689"/>
       </p:ext>
     </p:extLst>
   </p:cSld>
   <p:clrMapOvr>
     <a:masterClrMapping/>
   </p:clrMapOvr>
-  <mc:AlternateContent xmlns:mc="http://schemas.openxmlformats.org/markup-compatibility/2006" xmlns:p14="http://schemas.microsoft.com/office/powerpoint/2010/main">
-    <mc:Choice Requires="p14">
+  <mc:AlternateContent xmlns:mc="http://schemas.openxmlformats.org/markup-compatibility/2006">
+    <mc:Choice xmlns:p14="http://schemas.microsoft.com/office/powerpoint/2010/main" xmlns="" Requires="p14">
       <p:transition spd="slow" p14:dur="2000"/>
     </mc:Choice>
-    <mc:Fallback xmlns="">
+    <mc:Fallback>
       <p:transition spd="slow"/>
     </mc:Fallback>
   </mc:AlternateContent>
@@ -15428,6 +15287,76 @@
         </p:nvSpPr>
         <p:spPr>
           <a:xfrm>
+            <a:off x="0" y="428604"/>
+            <a:ext cx="9144000" cy="1107996"/>
+          </a:xfrm>
+          <a:prstGeom prst="rect">
+            <a:avLst/>
+          </a:prstGeom>
+          <a:noFill/>
+        </p:spPr>
+        <p:txBody>
+          <a:bodyPr wrap="square" rtlCol="0">
+            <a:spAutoFit/>
+          </a:bodyPr>
+          <a:lstStyle/>
+          <a:p>
+            <a:pPr algn="ctr"/>
+            <a:r>
+              <a:rPr lang="it-IT" sz="4800" b="1" dirty="0" smtClean="0">
+                <a:latin typeface="+mj-lt"/>
+              </a:rPr>
+              <a:t>Pro\Contro del ODD</a:t>
+            </a:r>
+          </a:p>
+          <a:p>
+            <a:pPr algn="ctr"/>
+            <a:endParaRPr lang="it-IT" dirty="0">
+              <a:latin typeface="+mj-lt"/>
+            </a:endParaRPr>
+          </a:p>
+        </p:txBody>
+      </p:sp>
+    </p:spTree>
+  </p:cSld>
+  <p:clrMapOvr>
+    <a:masterClrMapping/>
+  </p:clrMapOvr>
+  <p:timing>
+    <p:tnLst>
+      <p:par>
+        <p:cTn id="1" dur="indefinite" restart="never" nodeType="tmRoot"/>
+      </p:par>
+    </p:tnLst>
+  </p:timing>
+</p:sld>
+</file>
+
+<file path=ppt/slides/slide31.xml><?xml version="1.0" encoding="utf-8"?>
+<p:sld xmlns:a="http://schemas.openxmlformats.org/drawingml/2006/main" xmlns:r="http://schemas.openxmlformats.org/officeDocument/2006/relationships" xmlns:p="http://schemas.openxmlformats.org/presentationml/2006/main">
+  <p:cSld>
+    <p:spTree>
+      <p:nvGrpSpPr>
+        <p:cNvPr id="1" name=""/>
+        <p:cNvGrpSpPr/>
+        <p:nvPr/>
+      </p:nvGrpSpPr>
+      <p:grpSpPr>
+        <a:xfrm>
+          <a:off x="0" y="0"/>
+          <a:ext cx="0" cy="0"/>
+          <a:chOff x="0" y="0"/>
+          <a:chExt cx="0" cy="0"/>
+        </a:xfrm>
+      </p:grpSpPr>
+      <p:sp>
+        <p:nvSpPr>
+          <p:cNvPr id="2" name="CasellaDiTesto 1"/>
+          <p:cNvSpPr txBox="1"/>
+          <p:nvPr/>
+        </p:nvSpPr>
+        <p:spPr>
+          <a:xfrm>
             <a:off x="1928794" y="428604"/>
             <a:ext cx="5214974" cy="1846659"/>
           </a:xfrm>
@@ -15447,13 +15376,7 @@
               <a:rPr lang="it-IT" sz="4800" b="1" dirty="0" smtClean="0">
                 <a:latin typeface="+mj-lt"/>
               </a:rPr>
-              <a:t>Obiettivi di </a:t>
-            </a:r>
-            <a:r>
-              <a:rPr lang="it-IT" sz="4800" b="1" dirty="0" smtClean="0">
-                <a:latin typeface="+mj-lt"/>
-              </a:rPr>
-              <a:t>Implementazione</a:t>
+              <a:t>Obiettivi di Implementazione</a:t>
             </a:r>
             <a:endParaRPr lang="it-IT" sz="2800" b="1" dirty="0" smtClean="0">
               <a:latin typeface="+mj-lt"/>
@@ -15669,18 +15592,18 @@
     </p:spTree>
     <p:extLst>
       <p:ext uri="{BB962C8B-B14F-4D97-AF65-F5344CB8AC3E}">
-        <p14:creationId xmlns:p14="http://schemas.microsoft.com/office/powerpoint/2010/main" val="155874689"/>
+        <p14:creationId xmlns:p14="http://schemas.microsoft.com/office/powerpoint/2010/main" xmlns="" val="155874689"/>
       </p:ext>
     </p:extLst>
   </p:cSld>
   <p:clrMapOvr>
     <a:masterClrMapping/>
   </p:clrMapOvr>
-  <mc:AlternateContent xmlns:mc="http://schemas.openxmlformats.org/markup-compatibility/2006" xmlns:p14="http://schemas.microsoft.com/office/powerpoint/2010/main">
-    <mc:Choice Requires="p14">
+  <mc:AlternateContent xmlns:mc="http://schemas.openxmlformats.org/markup-compatibility/2006">
+    <mc:Choice xmlns:p14="http://schemas.microsoft.com/office/powerpoint/2010/main" xmlns="" Requires="p14">
       <p:transition spd="slow" p14:dur="2000"/>
     </mc:Choice>
-    <mc:Fallback xmlns="">
+    <mc:Fallback>
       <p:transition spd="slow"/>
     </mc:Fallback>
   </mc:AlternateContent>
@@ -15694,7 +15617,7 @@
 </p:sld>
 </file>
 
-<file path=ppt/slides/slide31.xml><?xml version="1.0" encoding="utf-8"?>
+<file path=ppt/slides/slide32.xml><?xml version="1.0" encoding="utf-8"?>
 <p:sld xmlns:a="http://schemas.openxmlformats.org/drawingml/2006/main" xmlns:r="http://schemas.openxmlformats.org/officeDocument/2006/relationships" xmlns:p="http://schemas.openxmlformats.org/presentationml/2006/main">
   <p:cSld>
     <p:spTree>
@@ -15749,523 +15672,6 @@
             <a:endParaRPr lang="it-IT" dirty="0">
               <a:latin typeface="+mj-lt"/>
             </a:endParaRPr>
-          </a:p>
-        </p:txBody>
-      </p:sp>
-    </p:spTree>
-  </p:cSld>
-  <p:clrMapOvr>
-    <a:masterClrMapping/>
-  </p:clrMapOvr>
-  <p:timing>
-    <p:tnLst>
-      <p:par>
-        <p:cTn id="1" dur="indefinite" restart="never" nodeType="tmRoot"/>
-      </p:par>
-    </p:tnLst>
-  </p:timing>
-</p:sld>
-</file>
-
-<file path=ppt/slides/slide32.xml><?xml version="1.0" encoding="utf-8"?>
-<p:sld xmlns:a="http://schemas.openxmlformats.org/drawingml/2006/main" xmlns:r="http://schemas.openxmlformats.org/officeDocument/2006/relationships" xmlns:p="http://schemas.openxmlformats.org/presentationml/2006/main">
-  <p:cSld>
-    <p:spTree>
-      <p:nvGrpSpPr>
-        <p:cNvPr id="1" name=""/>
-        <p:cNvGrpSpPr/>
-        <p:nvPr/>
-      </p:nvGrpSpPr>
-      <p:grpSpPr>
-        <a:xfrm>
-          <a:off x="0" y="0"/>
-          <a:ext cx="0" cy="0"/>
-          <a:chOff x="0" y="0"/>
-          <a:chExt cx="0" cy="0"/>
-        </a:xfrm>
-      </p:grpSpPr>
-      <p:sp>
-        <p:nvSpPr>
-          <p:cNvPr id="2" name="CasellaDiTesto 1"/>
-          <p:cNvSpPr txBox="1"/>
-          <p:nvPr/>
-        </p:nvSpPr>
-        <p:spPr>
-          <a:xfrm>
-            <a:off x="1071538" y="428604"/>
-            <a:ext cx="7715304" cy="1107996"/>
-          </a:xfrm>
-          <a:prstGeom prst="rect">
-            <a:avLst/>
-          </a:prstGeom>
-          <a:noFill/>
-        </p:spPr>
-        <p:txBody>
-          <a:bodyPr wrap="square" rtlCol="0">
-            <a:spAutoFit/>
-          </a:bodyPr>
-          <a:lstStyle/>
-          <a:p>
-            <a:pPr algn="ctr"/>
-            <a:r>
-              <a:rPr lang="it-IT" sz="4800" b="1" dirty="0" smtClean="0">
-                <a:latin typeface="+mj-lt"/>
-              </a:rPr>
-              <a:t>Pro\Contro implementazione</a:t>
-            </a:r>
-            <a:endParaRPr lang="it-IT" sz="2800" b="1" dirty="0" smtClean="0">
-              <a:latin typeface="+mj-lt"/>
-            </a:endParaRPr>
-          </a:p>
-          <a:p>
-            <a:pPr algn="ctr"/>
-            <a:endParaRPr lang="it-IT" dirty="0">
-              <a:latin typeface="+mj-lt"/>
-            </a:endParaRPr>
-          </a:p>
-        </p:txBody>
-      </p:sp>
-      <p:sp>
-        <p:nvSpPr>
-          <p:cNvPr id="3" name="Content Placeholder 3"/>
-          <p:cNvSpPr txBox="1">
-            <a:spLocks/>
-          </p:cNvSpPr>
-          <p:nvPr/>
-        </p:nvSpPr>
-        <p:spPr>
-          <a:xfrm>
-            <a:off x="285720" y="1785926"/>
-            <a:ext cx="8429684" cy="2000264"/>
-          </a:xfrm>
-          <a:prstGeom prst="rect">
-            <a:avLst/>
-          </a:prstGeom>
-        </p:spPr>
-        <p:txBody>
-          <a:bodyPr tIns="0"/>
-          <a:lstStyle>
-            <a:lvl1pPr marL="274320" indent="-274320" algn="l" rtl="0" eaLnBrk="1" latinLnBrk="0" hangingPunct="1">
-              <a:spcBef>
-                <a:spcPct val="20000"/>
-              </a:spcBef>
-              <a:buClrTx/>
-              <a:buSzPct val="95000"/>
-              <a:buFont typeface="Wingdings" pitchFamily="2" charset="2"/>
-              <a:buChar char="v"/>
-              <a:defRPr kumimoji="0" sz="2800" kern="1200">
-                <a:solidFill>
-                  <a:schemeClr val="tx1"/>
-                </a:solidFill>
-                <a:latin typeface="+mn-lt"/>
-                <a:ea typeface="+mn-ea"/>
-                <a:cs typeface="+mn-cs"/>
-              </a:defRPr>
-            </a:lvl1pPr>
-            <a:lvl2pPr marL="640080" indent="-246888" algn="l" rtl="0" eaLnBrk="1" latinLnBrk="0" hangingPunct="1">
-              <a:spcBef>
-                <a:spcPct val="20000"/>
-              </a:spcBef>
-              <a:buClrTx/>
-              <a:buSzPct val="85000"/>
-              <a:buFont typeface="Courier New" pitchFamily="49" charset="0"/>
-              <a:buChar char="o"/>
-              <a:defRPr kumimoji="0" sz="2600" kern="1200">
-                <a:solidFill>
-                  <a:schemeClr val="tx1"/>
-                </a:solidFill>
-                <a:latin typeface="+mn-lt"/>
-                <a:ea typeface="+mn-ea"/>
-                <a:cs typeface="+mn-cs"/>
-              </a:defRPr>
-            </a:lvl2pPr>
-            <a:lvl3pPr marL="914400" indent="-246888" algn="l" rtl="0" eaLnBrk="1" latinLnBrk="0" hangingPunct="1">
-              <a:spcBef>
-                <a:spcPct val="20000"/>
-              </a:spcBef>
-              <a:buClrTx/>
-              <a:buSzPct val="70000"/>
-              <a:buFont typeface="Wingdings 2"/>
-              <a:buChar char=""/>
-              <a:defRPr kumimoji="0" sz="2400" kern="1200">
-                <a:solidFill>
-                  <a:schemeClr val="tx1"/>
-                </a:solidFill>
-                <a:latin typeface="+mn-lt"/>
-                <a:ea typeface="+mn-ea"/>
-                <a:cs typeface="+mn-cs"/>
-              </a:defRPr>
-            </a:lvl3pPr>
-            <a:lvl4pPr marL="1188720" indent="-210312" algn="l" rtl="0" eaLnBrk="1" latinLnBrk="0" hangingPunct="1">
-              <a:spcBef>
-                <a:spcPct val="20000"/>
-              </a:spcBef>
-              <a:buClrTx/>
-              <a:buSzPct val="65000"/>
-              <a:buFont typeface="Wingdings 2"/>
-              <a:buChar char=""/>
-              <a:defRPr kumimoji="0" sz="2000" kern="1200">
-                <a:solidFill>
-                  <a:schemeClr val="tx1"/>
-                </a:solidFill>
-                <a:latin typeface="+mn-lt"/>
-                <a:ea typeface="+mn-ea"/>
-                <a:cs typeface="+mn-cs"/>
-              </a:defRPr>
-            </a:lvl4pPr>
-            <a:lvl5pPr marL="1463040" indent="-210312" algn="l" rtl="0" eaLnBrk="1" latinLnBrk="0" hangingPunct="1">
-              <a:spcBef>
-                <a:spcPct val="20000"/>
-              </a:spcBef>
-              <a:buClrTx/>
-              <a:buSzPct val="65000"/>
-              <a:buFont typeface="Wingdings 2"/>
-              <a:buChar char=""/>
-              <a:defRPr kumimoji="0" sz="1800" kern="1200">
-                <a:solidFill>
-                  <a:schemeClr val="tx1"/>
-                </a:solidFill>
-                <a:latin typeface="+mn-lt"/>
-                <a:ea typeface="+mn-ea"/>
-                <a:cs typeface="+mn-cs"/>
-              </a:defRPr>
-            </a:lvl5pPr>
-            <a:lvl6pPr marL="1737360" indent="-210312" algn="l" rtl="0" eaLnBrk="1" latinLnBrk="0" hangingPunct="1">
-              <a:spcBef>
-                <a:spcPct val="20000"/>
-              </a:spcBef>
-              <a:buClr>
-                <a:schemeClr val="accent5"/>
-              </a:buClr>
-              <a:buSzPct val="80000"/>
-              <a:buFont typeface="Wingdings 2"/>
-              <a:buChar char=""/>
-              <a:defRPr kumimoji="0" sz="1800" kern="1200">
-                <a:solidFill>
-                  <a:schemeClr val="tx1"/>
-                </a:solidFill>
-                <a:latin typeface="+mn-lt"/>
-                <a:ea typeface="+mn-ea"/>
-                <a:cs typeface="+mn-cs"/>
-              </a:defRPr>
-            </a:lvl6pPr>
-            <a:lvl7pPr marL="1920240" indent="-182880" algn="l" rtl="0" eaLnBrk="1" latinLnBrk="0" hangingPunct="1">
-              <a:spcBef>
-                <a:spcPct val="20000"/>
-              </a:spcBef>
-              <a:buClr>
-                <a:schemeClr val="accent6"/>
-              </a:buClr>
-              <a:buSzPct val="80000"/>
-              <a:buFont typeface="Wingdings 2"/>
-              <a:buChar char=""/>
-              <a:defRPr kumimoji="0" sz="1600" kern="1200" baseline="0">
-                <a:solidFill>
-                  <a:schemeClr val="tx1"/>
-                </a:solidFill>
-                <a:latin typeface="+mn-lt"/>
-                <a:ea typeface="+mn-ea"/>
-                <a:cs typeface="+mn-cs"/>
-              </a:defRPr>
-            </a:lvl7pPr>
-            <a:lvl8pPr marL="2194560" indent="-182880" algn="l" rtl="0" eaLnBrk="1" latinLnBrk="0" hangingPunct="1">
-              <a:spcBef>
-                <a:spcPct val="20000"/>
-              </a:spcBef>
-              <a:buClr>
-                <a:schemeClr val="tx2"/>
-              </a:buClr>
-              <a:buChar char="•"/>
-              <a:defRPr kumimoji="0" sz="1600" kern="1200">
-                <a:solidFill>
-                  <a:schemeClr val="tx1"/>
-                </a:solidFill>
-                <a:latin typeface="+mn-lt"/>
-                <a:ea typeface="+mn-ea"/>
-                <a:cs typeface="+mn-cs"/>
-              </a:defRPr>
-            </a:lvl8pPr>
-            <a:lvl9pPr marL="2468880" indent="-182880" algn="l" rtl="0" eaLnBrk="1" latinLnBrk="0" hangingPunct="1">
-              <a:spcBef>
-                <a:spcPct val="20000"/>
-              </a:spcBef>
-              <a:buClr>
-                <a:schemeClr val="tx2"/>
-              </a:buClr>
-              <a:buFontTx/>
-              <a:buChar char="•"/>
-              <a:defRPr kumimoji="0" sz="1400" kern="1200" baseline="0">
-                <a:solidFill>
-                  <a:schemeClr val="tx1"/>
-                </a:solidFill>
-                <a:latin typeface="+mn-lt"/>
-                <a:ea typeface="+mn-ea"/>
-                <a:cs typeface="+mn-cs"/>
-              </a:defRPr>
-            </a:lvl9pPr>
-          </a:lstStyle>
-          <a:p>
-            <a:pPr marL="365760" lvl="1" indent="0">
-              <a:buFont typeface="Wingdings" pitchFamily="2" charset="2"/>
-              <a:buChar char="v"/>
-            </a:pPr>
-            <a:r>
-              <a:rPr lang="en-US" sz="3000" dirty="0" smtClean="0"/>
-              <a:t>Elevata complessità</a:t>
-            </a:r>
-          </a:p>
-          <a:p>
-            <a:pPr marL="365760" lvl="1" indent="0">
-              <a:buFont typeface="Wingdings" pitchFamily="2" charset="2"/>
-              <a:buChar char="v"/>
-            </a:pPr>
-            <a:r>
-              <a:rPr lang="en-US" sz="3000" dirty="0" smtClean="0"/>
-              <a:t>Porzioni di codice poco commentate</a:t>
-            </a:r>
-          </a:p>
-          <a:p>
-            <a:pPr marL="365760" lvl="1" indent="0">
-              <a:buFont typeface="Wingdings" pitchFamily="2" charset="2"/>
-              <a:buChar char="v"/>
-            </a:pPr>
-            <a:r>
-              <a:rPr lang="en-US" dirty="0" smtClean="0"/>
-              <a:t>I sottosistemi con priorità medio/bassa non sono stati implementati</a:t>
-            </a:r>
-          </a:p>
-          <a:p>
-            <a:pPr marL="365760" lvl="1" indent="0">
-              <a:buNone/>
-            </a:pPr>
-            <a:endParaRPr lang="en-US" dirty="0" smtClean="0"/>
-          </a:p>
-          <a:p>
-            <a:pPr marL="365760" lvl="1" indent="0">
-              <a:buNone/>
-            </a:pPr>
-            <a:endParaRPr lang="en-US" dirty="0" smtClean="0"/>
-          </a:p>
-          <a:p>
-            <a:pPr marL="365760" lvl="1" indent="0">
-              <a:buNone/>
-            </a:pPr>
-            <a:r>
-              <a:rPr lang="en-US" dirty="0" smtClean="0"/>
-              <a:t> </a:t>
-            </a:r>
-          </a:p>
-        </p:txBody>
-      </p:sp>
-      <p:sp>
-        <p:nvSpPr>
-          <p:cNvPr id="4" name="Content Placeholder 3"/>
-          <p:cNvSpPr txBox="1">
-            <a:spLocks/>
-          </p:cNvSpPr>
-          <p:nvPr/>
-        </p:nvSpPr>
-        <p:spPr>
-          <a:xfrm>
-            <a:off x="357158" y="4214818"/>
-            <a:ext cx="8429684" cy="2000264"/>
-          </a:xfrm>
-          <a:prstGeom prst="rect">
-            <a:avLst/>
-          </a:prstGeom>
-        </p:spPr>
-        <p:txBody>
-          <a:bodyPr tIns="0"/>
-          <a:lstStyle>
-            <a:lvl1pPr marL="274320" indent="-274320" algn="l" rtl="0" eaLnBrk="1" latinLnBrk="0" hangingPunct="1">
-              <a:spcBef>
-                <a:spcPct val="20000"/>
-              </a:spcBef>
-              <a:buClrTx/>
-              <a:buSzPct val="95000"/>
-              <a:buFont typeface="Wingdings" pitchFamily="2" charset="2"/>
-              <a:buChar char="v"/>
-              <a:defRPr kumimoji="0" sz="2800" kern="1200">
-                <a:solidFill>
-                  <a:schemeClr val="tx1"/>
-                </a:solidFill>
-                <a:latin typeface="+mn-lt"/>
-                <a:ea typeface="+mn-ea"/>
-                <a:cs typeface="+mn-cs"/>
-              </a:defRPr>
-            </a:lvl1pPr>
-            <a:lvl2pPr marL="640080" indent="-246888" algn="l" rtl="0" eaLnBrk="1" latinLnBrk="0" hangingPunct="1">
-              <a:spcBef>
-                <a:spcPct val="20000"/>
-              </a:spcBef>
-              <a:buClrTx/>
-              <a:buSzPct val="85000"/>
-              <a:buFont typeface="Courier New" pitchFamily="49" charset="0"/>
-              <a:buChar char="o"/>
-              <a:defRPr kumimoji="0" sz="2600" kern="1200">
-                <a:solidFill>
-                  <a:schemeClr val="tx1"/>
-                </a:solidFill>
-                <a:latin typeface="+mn-lt"/>
-                <a:ea typeface="+mn-ea"/>
-                <a:cs typeface="+mn-cs"/>
-              </a:defRPr>
-            </a:lvl2pPr>
-            <a:lvl3pPr marL="914400" indent="-246888" algn="l" rtl="0" eaLnBrk="1" latinLnBrk="0" hangingPunct="1">
-              <a:spcBef>
-                <a:spcPct val="20000"/>
-              </a:spcBef>
-              <a:buClrTx/>
-              <a:buSzPct val="70000"/>
-              <a:buFont typeface="Wingdings 2"/>
-              <a:buChar char=""/>
-              <a:defRPr kumimoji="0" sz="2400" kern="1200">
-                <a:solidFill>
-                  <a:schemeClr val="tx1"/>
-                </a:solidFill>
-                <a:latin typeface="+mn-lt"/>
-                <a:ea typeface="+mn-ea"/>
-                <a:cs typeface="+mn-cs"/>
-              </a:defRPr>
-            </a:lvl3pPr>
-            <a:lvl4pPr marL="1188720" indent="-210312" algn="l" rtl="0" eaLnBrk="1" latinLnBrk="0" hangingPunct="1">
-              <a:spcBef>
-                <a:spcPct val="20000"/>
-              </a:spcBef>
-              <a:buClrTx/>
-              <a:buSzPct val="65000"/>
-              <a:buFont typeface="Wingdings 2"/>
-              <a:buChar char=""/>
-              <a:defRPr kumimoji="0" sz="2000" kern="1200">
-                <a:solidFill>
-                  <a:schemeClr val="tx1"/>
-                </a:solidFill>
-                <a:latin typeface="+mn-lt"/>
-                <a:ea typeface="+mn-ea"/>
-                <a:cs typeface="+mn-cs"/>
-              </a:defRPr>
-            </a:lvl4pPr>
-            <a:lvl5pPr marL="1463040" indent="-210312" algn="l" rtl="0" eaLnBrk="1" latinLnBrk="0" hangingPunct="1">
-              <a:spcBef>
-                <a:spcPct val="20000"/>
-              </a:spcBef>
-              <a:buClrTx/>
-              <a:buSzPct val="65000"/>
-              <a:buFont typeface="Wingdings 2"/>
-              <a:buChar char=""/>
-              <a:defRPr kumimoji="0" sz="1800" kern="1200">
-                <a:solidFill>
-                  <a:schemeClr val="tx1"/>
-                </a:solidFill>
-                <a:latin typeface="+mn-lt"/>
-                <a:ea typeface="+mn-ea"/>
-                <a:cs typeface="+mn-cs"/>
-              </a:defRPr>
-            </a:lvl5pPr>
-            <a:lvl6pPr marL="1737360" indent="-210312" algn="l" rtl="0" eaLnBrk="1" latinLnBrk="0" hangingPunct="1">
-              <a:spcBef>
-                <a:spcPct val="20000"/>
-              </a:spcBef>
-              <a:buClr>
-                <a:schemeClr val="accent5"/>
-              </a:buClr>
-              <a:buSzPct val="80000"/>
-              <a:buFont typeface="Wingdings 2"/>
-              <a:buChar char=""/>
-              <a:defRPr kumimoji="0" sz="1800" kern="1200">
-                <a:solidFill>
-                  <a:schemeClr val="tx1"/>
-                </a:solidFill>
-                <a:latin typeface="+mn-lt"/>
-                <a:ea typeface="+mn-ea"/>
-                <a:cs typeface="+mn-cs"/>
-              </a:defRPr>
-            </a:lvl6pPr>
-            <a:lvl7pPr marL="1920240" indent="-182880" algn="l" rtl="0" eaLnBrk="1" latinLnBrk="0" hangingPunct="1">
-              <a:spcBef>
-                <a:spcPct val="20000"/>
-              </a:spcBef>
-              <a:buClr>
-                <a:schemeClr val="accent6"/>
-              </a:buClr>
-              <a:buSzPct val="80000"/>
-              <a:buFont typeface="Wingdings 2"/>
-              <a:buChar char=""/>
-              <a:defRPr kumimoji="0" sz="1600" kern="1200" baseline="0">
-                <a:solidFill>
-                  <a:schemeClr val="tx1"/>
-                </a:solidFill>
-                <a:latin typeface="+mn-lt"/>
-                <a:ea typeface="+mn-ea"/>
-                <a:cs typeface="+mn-cs"/>
-              </a:defRPr>
-            </a:lvl7pPr>
-            <a:lvl8pPr marL="2194560" indent="-182880" algn="l" rtl="0" eaLnBrk="1" latinLnBrk="0" hangingPunct="1">
-              <a:spcBef>
-                <a:spcPct val="20000"/>
-              </a:spcBef>
-              <a:buClr>
-                <a:schemeClr val="tx2"/>
-              </a:buClr>
-              <a:buChar char="•"/>
-              <a:defRPr kumimoji="0" sz="1600" kern="1200">
-                <a:solidFill>
-                  <a:schemeClr val="tx1"/>
-                </a:solidFill>
-                <a:latin typeface="+mn-lt"/>
-                <a:ea typeface="+mn-ea"/>
-                <a:cs typeface="+mn-cs"/>
-              </a:defRPr>
-            </a:lvl8pPr>
-            <a:lvl9pPr marL="2468880" indent="-182880" algn="l" rtl="0" eaLnBrk="1" latinLnBrk="0" hangingPunct="1">
-              <a:spcBef>
-                <a:spcPct val="20000"/>
-              </a:spcBef>
-              <a:buClr>
-                <a:schemeClr val="tx2"/>
-              </a:buClr>
-              <a:buFontTx/>
-              <a:buChar char="•"/>
-              <a:defRPr kumimoji="0" sz="1400" kern="1200" baseline="0">
-                <a:solidFill>
-                  <a:schemeClr val="tx1"/>
-                </a:solidFill>
-                <a:latin typeface="+mn-lt"/>
-                <a:ea typeface="+mn-ea"/>
-                <a:cs typeface="+mn-cs"/>
-              </a:defRPr>
-            </a:lvl9pPr>
-          </a:lstStyle>
-          <a:p>
-            <a:pPr marL="365760" lvl="1" indent="0">
-              <a:buNone/>
-            </a:pPr>
-            <a:r>
-              <a:rPr lang="en-US" sz="3000" dirty="0" smtClean="0"/>
-              <a:t>E’ possibile migliorare il sistema con ulteriori operazioni di refactoring, per migliorarne la leggibilità e la complessità. </a:t>
-            </a:r>
-            <a:endParaRPr lang="en-US" dirty="0" smtClean="0"/>
-          </a:p>
-          <a:p>
-            <a:pPr marL="365760" lvl="1" indent="0">
-              <a:buNone/>
-            </a:pPr>
-            <a:endParaRPr lang="en-US" dirty="0" smtClean="0"/>
-          </a:p>
-          <a:p>
-            <a:pPr marL="365760" lvl="1" indent="0">
-              <a:buNone/>
-            </a:pPr>
-            <a:endParaRPr lang="en-US" dirty="0" smtClean="0"/>
-          </a:p>
-          <a:p>
-            <a:pPr marL="365760" lvl="1" indent="0">
-              <a:buNone/>
-            </a:pPr>
-            <a:r>
-              <a:rPr lang="en-US" dirty="0" smtClean="0"/>
-              <a:t> </a:t>
-            </a:r>
           </a:p>
         </p:txBody>
       </p:sp>
@@ -16309,8 +15715,8 @@
         </p:nvSpPr>
         <p:spPr>
           <a:xfrm>
-            <a:off x="642910" y="428604"/>
-            <a:ext cx="7715304" cy="1846659"/>
+            <a:off x="1071538" y="428604"/>
+            <a:ext cx="7715304" cy="1107996"/>
           </a:xfrm>
           <a:prstGeom prst="rect">
             <a:avLst/>
@@ -16328,16 +15734,7 @@
               <a:rPr lang="it-IT" sz="4800" b="1" dirty="0" smtClean="0">
                 <a:latin typeface="+mj-lt"/>
               </a:rPr>
-              <a:t>Testing di integrazione</a:t>
-            </a:r>
-          </a:p>
-          <a:p>
-            <a:pPr algn="ctr"/>
-            <a:r>
-              <a:rPr lang="it-IT" sz="4800" b="1" dirty="0" smtClean="0">
-                <a:latin typeface="+mj-lt"/>
-              </a:rPr>
-              <a:t>sul sistema Kids</a:t>
+              <a:t>Pro\Contro implementazione</a:t>
             </a:r>
             <a:endParaRPr lang="it-IT" sz="2800" b="1" dirty="0" smtClean="0">
               <a:latin typeface="+mj-lt"/>
@@ -16361,8 +15758,8 @@
         </p:nvSpPr>
         <p:spPr>
           <a:xfrm>
-            <a:off x="357158" y="2500306"/>
-            <a:ext cx="8429684" cy="3286148"/>
+            <a:off x="285720" y="1785926"/>
+            <a:ext cx="8429684" cy="2000264"/>
           </a:xfrm>
           <a:prstGeom prst="rect">
             <a:avLst/>
@@ -16532,9 +15929,266 @@
           </a:lstStyle>
           <a:p>
             <a:pPr marL="365760" lvl="1" indent="0">
+              <a:buFont typeface="Wingdings" pitchFamily="2" charset="2"/>
+              <a:buChar char="v"/>
+            </a:pPr>
+            <a:r>
+              <a:rPr lang="en-US" sz="3000" dirty="0" smtClean="0"/>
+              <a:t>Elevata complessità</a:t>
+            </a:r>
+          </a:p>
+          <a:p>
+            <a:pPr marL="365760" lvl="1" indent="0">
+              <a:buFont typeface="Wingdings" pitchFamily="2" charset="2"/>
+              <a:buChar char="v"/>
+            </a:pPr>
+            <a:r>
+              <a:rPr lang="en-US" sz="3000" dirty="0" smtClean="0"/>
+              <a:t>Porzioni di codice poco commentate</a:t>
+            </a:r>
+          </a:p>
+          <a:p>
+            <a:pPr marL="365760" lvl="1" indent="0">
+              <a:buFont typeface="Wingdings" pitchFamily="2" charset="2"/>
+              <a:buChar char="v"/>
+            </a:pPr>
+            <a:r>
+              <a:rPr lang="en-US" dirty="0" smtClean="0"/>
+              <a:t>I sottosistemi con priorità medio/bassa non sono stati implementati</a:t>
+            </a:r>
+          </a:p>
+          <a:p>
+            <a:pPr marL="365760" lvl="1" indent="0">
               <a:buNone/>
             </a:pPr>
             <a:endParaRPr lang="en-US" dirty="0" smtClean="0"/>
+          </a:p>
+          <a:p>
+            <a:pPr marL="365760" lvl="1" indent="0">
+              <a:buNone/>
+            </a:pPr>
+            <a:endParaRPr lang="en-US" dirty="0" smtClean="0"/>
+          </a:p>
+          <a:p>
+            <a:pPr marL="365760" lvl="1" indent="0">
+              <a:buNone/>
+            </a:pPr>
+            <a:r>
+              <a:rPr lang="en-US" dirty="0" smtClean="0"/>
+              <a:t> </a:t>
+            </a:r>
+          </a:p>
+        </p:txBody>
+      </p:sp>
+      <p:sp>
+        <p:nvSpPr>
+          <p:cNvPr id="4" name="Content Placeholder 3"/>
+          <p:cNvSpPr txBox="1">
+            <a:spLocks/>
+          </p:cNvSpPr>
+          <p:nvPr/>
+        </p:nvSpPr>
+        <p:spPr>
+          <a:xfrm>
+            <a:off x="357158" y="4214818"/>
+            <a:ext cx="8429684" cy="2000264"/>
+          </a:xfrm>
+          <a:prstGeom prst="rect">
+            <a:avLst/>
+          </a:prstGeom>
+        </p:spPr>
+        <p:txBody>
+          <a:bodyPr tIns="0"/>
+          <a:lstStyle>
+            <a:lvl1pPr marL="274320" indent="-274320" algn="l" rtl="0" eaLnBrk="1" latinLnBrk="0" hangingPunct="1">
+              <a:spcBef>
+                <a:spcPct val="20000"/>
+              </a:spcBef>
+              <a:buClrTx/>
+              <a:buSzPct val="95000"/>
+              <a:buFont typeface="Wingdings" pitchFamily="2" charset="2"/>
+              <a:buChar char="v"/>
+              <a:defRPr kumimoji="0" sz="2800" kern="1200">
+                <a:solidFill>
+                  <a:schemeClr val="tx1"/>
+                </a:solidFill>
+                <a:latin typeface="+mn-lt"/>
+                <a:ea typeface="+mn-ea"/>
+                <a:cs typeface="+mn-cs"/>
+              </a:defRPr>
+            </a:lvl1pPr>
+            <a:lvl2pPr marL="640080" indent="-246888" algn="l" rtl="0" eaLnBrk="1" latinLnBrk="0" hangingPunct="1">
+              <a:spcBef>
+                <a:spcPct val="20000"/>
+              </a:spcBef>
+              <a:buClrTx/>
+              <a:buSzPct val="85000"/>
+              <a:buFont typeface="Courier New" pitchFamily="49" charset="0"/>
+              <a:buChar char="o"/>
+              <a:defRPr kumimoji="0" sz="2600" kern="1200">
+                <a:solidFill>
+                  <a:schemeClr val="tx1"/>
+                </a:solidFill>
+                <a:latin typeface="+mn-lt"/>
+                <a:ea typeface="+mn-ea"/>
+                <a:cs typeface="+mn-cs"/>
+              </a:defRPr>
+            </a:lvl2pPr>
+            <a:lvl3pPr marL="914400" indent="-246888" algn="l" rtl="0" eaLnBrk="1" latinLnBrk="0" hangingPunct="1">
+              <a:spcBef>
+                <a:spcPct val="20000"/>
+              </a:spcBef>
+              <a:buClrTx/>
+              <a:buSzPct val="70000"/>
+              <a:buFont typeface="Wingdings 2"/>
+              <a:buChar char=""/>
+              <a:defRPr kumimoji="0" sz="2400" kern="1200">
+                <a:solidFill>
+                  <a:schemeClr val="tx1"/>
+                </a:solidFill>
+                <a:latin typeface="+mn-lt"/>
+                <a:ea typeface="+mn-ea"/>
+                <a:cs typeface="+mn-cs"/>
+              </a:defRPr>
+            </a:lvl3pPr>
+            <a:lvl4pPr marL="1188720" indent="-210312" algn="l" rtl="0" eaLnBrk="1" latinLnBrk="0" hangingPunct="1">
+              <a:spcBef>
+                <a:spcPct val="20000"/>
+              </a:spcBef>
+              <a:buClrTx/>
+              <a:buSzPct val="65000"/>
+              <a:buFont typeface="Wingdings 2"/>
+              <a:buChar char=""/>
+              <a:defRPr kumimoji="0" sz="2000" kern="1200">
+                <a:solidFill>
+                  <a:schemeClr val="tx1"/>
+                </a:solidFill>
+                <a:latin typeface="+mn-lt"/>
+                <a:ea typeface="+mn-ea"/>
+                <a:cs typeface="+mn-cs"/>
+              </a:defRPr>
+            </a:lvl4pPr>
+            <a:lvl5pPr marL="1463040" indent="-210312" algn="l" rtl="0" eaLnBrk="1" latinLnBrk="0" hangingPunct="1">
+              <a:spcBef>
+                <a:spcPct val="20000"/>
+              </a:spcBef>
+              <a:buClrTx/>
+              <a:buSzPct val="65000"/>
+              <a:buFont typeface="Wingdings 2"/>
+              <a:buChar char=""/>
+              <a:defRPr kumimoji="0" sz="1800" kern="1200">
+                <a:solidFill>
+                  <a:schemeClr val="tx1"/>
+                </a:solidFill>
+                <a:latin typeface="+mn-lt"/>
+                <a:ea typeface="+mn-ea"/>
+                <a:cs typeface="+mn-cs"/>
+              </a:defRPr>
+            </a:lvl5pPr>
+            <a:lvl6pPr marL="1737360" indent="-210312" algn="l" rtl="0" eaLnBrk="1" latinLnBrk="0" hangingPunct="1">
+              <a:spcBef>
+                <a:spcPct val="20000"/>
+              </a:spcBef>
+              <a:buClr>
+                <a:schemeClr val="accent5"/>
+              </a:buClr>
+              <a:buSzPct val="80000"/>
+              <a:buFont typeface="Wingdings 2"/>
+              <a:buChar char=""/>
+              <a:defRPr kumimoji="0" sz="1800" kern="1200">
+                <a:solidFill>
+                  <a:schemeClr val="tx1"/>
+                </a:solidFill>
+                <a:latin typeface="+mn-lt"/>
+                <a:ea typeface="+mn-ea"/>
+                <a:cs typeface="+mn-cs"/>
+              </a:defRPr>
+            </a:lvl6pPr>
+            <a:lvl7pPr marL="1920240" indent="-182880" algn="l" rtl="0" eaLnBrk="1" latinLnBrk="0" hangingPunct="1">
+              <a:spcBef>
+                <a:spcPct val="20000"/>
+              </a:spcBef>
+              <a:buClr>
+                <a:schemeClr val="accent6"/>
+              </a:buClr>
+              <a:buSzPct val="80000"/>
+              <a:buFont typeface="Wingdings 2"/>
+              <a:buChar char=""/>
+              <a:defRPr kumimoji="0" sz="1600" kern="1200" baseline="0">
+                <a:solidFill>
+                  <a:schemeClr val="tx1"/>
+                </a:solidFill>
+                <a:latin typeface="+mn-lt"/>
+                <a:ea typeface="+mn-ea"/>
+                <a:cs typeface="+mn-cs"/>
+              </a:defRPr>
+            </a:lvl7pPr>
+            <a:lvl8pPr marL="2194560" indent="-182880" algn="l" rtl="0" eaLnBrk="1" latinLnBrk="0" hangingPunct="1">
+              <a:spcBef>
+                <a:spcPct val="20000"/>
+              </a:spcBef>
+              <a:buClr>
+                <a:schemeClr val="tx2"/>
+              </a:buClr>
+              <a:buChar char="•"/>
+              <a:defRPr kumimoji="0" sz="1600" kern="1200">
+                <a:solidFill>
+                  <a:schemeClr val="tx1"/>
+                </a:solidFill>
+                <a:latin typeface="+mn-lt"/>
+                <a:ea typeface="+mn-ea"/>
+                <a:cs typeface="+mn-cs"/>
+              </a:defRPr>
+            </a:lvl8pPr>
+            <a:lvl9pPr marL="2468880" indent="-182880" algn="l" rtl="0" eaLnBrk="1" latinLnBrk="0" hangingPunct="1">
+              <a:spcBef>
+                <a:spcPct val="20000"/>
+              </a:spcBef>
+              <a:buClr>
+                <a:schemeClr val="tx2"/>
+              </a:buClr>
+              <a:buFontTx/>
+              <a:buChar char="•"/>
+              <a:defRPr kumimoji="0" sz="1400" kern="1200" baseline="0">
+                <a:solidFill>
+                  <a:schemeClr val="tx1"/>
+                </a:solidFill>
+                <a:latin typeface="+mn-lt"/>
+                <a:ea typeface="+mn-ea"/>
+                <a:cs typeface="+mn-cs"/>
+              </a:defRPr>
+            </a:lvl9pPr>
+          </a:lstStyle>
+          <a:p>
+            <a:pPr marL="365760" lvl="1" indent="0">
+              <a:buNone/>
+            </a:pPr>
+            <a:r>
+              <a:rPr lang="en-US" sz="3000" dirty="0" smtClean="0"/>
+              <a:t>E’ possibile migliorare il sistema con ulteriori operazioni di refactoring, per migliorarne la leggibilità e la complessità. </a:t>
+            </a:r>
+            <a:endParaRPr lang="en-US" dirty="0" smtClean="0"/>
+          </a:p>
+          <a:p>
+            <a:pPr marL="365760" lvl="1" indent="0">
+              <a:buNone/>
+            </a:pPr>
+            <a:endParaRPr lang="en-US" dirty="0" smtClean="0"/>
+          </a:p>
+          <a:p>
+            <a:pPr marL="365760" lvl="1" indent="0">
+              <a:buNone/>
+            </a:pPr>
+            <a:endParaRPr lang="en-US" dirty="0" smtClean="0"/>
+          </a:p>
+          <a:p>
+            <a:pPr marL="365760" lvl="1" indent="0">
+              <a:buNone/>
+            </a:pPr>
+            <a:r>
+              <a:rPr lang="en-US" dirty="0" smtClean="0"/>
+              <a:t> </a:t>
+            </a:r>
           </a:p>
         </p:txBody>
       </p:sp>
@@ -16579,7 +16233,7 @@
         <p:spPr>
           <a:xfrm>
             <a:off x="642910" y="428604"/>
-            <a:ext cx="7715304" cy="1107996"/>
+            <a:ext cx="7715304" cy="1846659"/>
           </a:xfrm>
           <a:prstGeom prst="rect">
             <a:avLst/>
@@ -16597,7 +16251,16 @@
               <a:rPr lang="it-IT" sz="4800" b="1" dirty="0" smtClean="0">
                 <a:latin typeface="+mj-lt"/>
               </a:rPr>
-              <a:t>Conclusioni</a:t>
+              <a:t>Testing di integrazione</a:t>
+            </a:r>
+          </a:p>
+          <a:p>
+            <a:pPr algn="ctr"/>
+            <a:r>
+              <a:rPr lang="it-IT" sz="4800" b="1" dirty="0" smtClean="0">
+                <a:latin typeface="+mj-lt"/>
+              </a:rPr>
+              <a:t>sul sistema Kids</a:t>
             </a:r>
             <a:endParaRPr lang="it-IT" sz="2800" b="1" dirty="0" smtClean="0">
               <a:latin typeface="+mj-lt"/>
@@ -16798,67 +16461,6 @@
           </a:p>
         </p:txBody>
       </p:sp>
-      <p:sp>
-        <p:nvSpPr>
-          <p:cNvPr id="4" name="TextBox 3"/>
-          <p:cNvSpPr txBox="1"/>
-          <p:nvPr/>
-        </p:nvSpPr>
-        <p:spPr>
-          <a:xfrm>
-            <a:off x="214282" y="1928802"/>
-            <a:ext cx="5715040" cy="492443"/>
-          </a:xfrm>
-          <a:prstGeom prst="rect">
-            <a:avLst/>
-          </a:prstGeom>
-          <a:noFill/>
-        </p:spPr>
-        <p:txBody>
-          <a:bodyPr wrap="square" rtlCol="0">
-            <a:spAutoFit/>
-          </a:bodyPr>
-          <a:lstStyle/>
-          <a:p>
-            <a:r>
-              <a:rPr lang="it-IT" sz="2600" b="1" dirty="0" smtClean="0"/>
-              <a:t>Cosa è andato per il verso giusto </a:t>
-            </a:r>
-            <a:endParaRPr lang="it-IT" sz="2600" b="1" dirty="0"/>
-          </a:p>
-        </p:txBody>
-      </p:sp>
-      <p:pic>
-        <p:nvPicPr>
-          <p:cNvPr id="13314" name="Picture 2" descr="http://whywedoit.files.wordpress.com/2009/04/smile.jpg"/>
-          <p:cNvPicPr>
-            <a:picLocks noChangeAspect="1" noChangeArrowheads="1"/>
-          </p:cNvPicPr>
-          <p:nvPr/>
-        </p:nvPicPr>
-        <p:blipFill>
-          <a:blip r:embed="rId2" cstate="print"/>
-          <a:srcRect/>
-          <a:stretch>
-            <a:fillRect/>
-          </a:stretch>
-        </p:blipFill>
-        <p:spPr bwMode="auto">
-          <a:xfrm>
-            <a:off x="4643438" y="1500174"/>
-            <a:ext cx="1428760" cy="1071570"/>
-          </a:xfrm>
-          <a:prstGeom prst="rect">
-            <a:avLst/>
-          </a:prstGeom>
-          <a:ln>
-            <a:noFill/>
-          </a:ln>
-          <a:effectLst>
-            <a:softEdge rad="112500"/>
-          </a:effectLst>
-        </p:spPr>
-      </p:pic>
     </p:spTree>
   </p:cSld>
   <p:clrMapOvr>
@@ -17143,7 +16745,7 @@
           <a:p>
             <a:r>
               <a:rPr lang="it-IT" sz="2600" b="1" dirty="0" smtClean="0"/>
-              <a:t>Cosa è andato per il verso sbagliato </a:t>
+              <a:t>Cosa è andato per il verso giusto </a:t>
             </a:r>
             <a:endParaRPr lang="it-IT" sz="2600" b="1" dirty="0"/>
           </a:p>
@@ -17151,7 +16753,7 @@
       </p:sp>
       <p:pic>
         <p:nvPicPr>
-          <p:cNvPr id="50178" name="Picture 2" descr="http://newton.logg.it/files/2009/11/Emoticon-Sad-300x300.png"/>
+          <p:cNvPr id="13314" name="Picture 2" descr="http://whywedoit.files.wordpress.com/2009/04/smile.jpg"/>
           <p:cNvPicPr>
             <a:picLocks noChangeAspect="1" noChangeArrowheads="1"/>
           </p:cNvPicPr>
@@ -17166,13 +16768,18 @@
         </p:blipFill>
         <p:spPr bwMode="auto">
           <a:xfrm>
-            <a:off x="5286380" y="1571612"/>
-            <a:ext cx="857256" cy="857256"/>
+            <a:off x="4643438" y="1500174"/>
+            <a:ext cx="1428760" cy="1071570"/>
           </a:xfrm>
           <a:prstGeom prst="rect">
             <a:avLst/>
           </a:prstGeom>
-          <a:noFill/>
+          <a:ln>
+            <a:noFill/>
+          </a:ln>
+          <a:effectLst>
+            <a:softEdge rad="112500"/>
+          </a:effectLst>
         </p:spPr>
       </p:pic>
     </p:spTree>
@@ -17443,6 +17050,322 @@
         </p:nvSpPr>
         <p:spPr>
           <a:xfrm>
+            <a:off x="214282" y="1928802"/>
+            <a:ext cx="5715040" cy="492443"/>
+          </a:xfrm>
+          <a:prstGeom prst="rect">
+            <a:avLst/>
+          </a:prstGeom>
+          <a:noFill/>
+        </p:spPr>
+        <p:txBody>
+          <a:bodyPr wrap="square" rtlCol="0">
+            <a:spAutoFit/>
+          </a:bodyPr>
+          <a:lstStyle/>
+          <a:p>
+            <a:r>
+              <a:rPr lang="it-IT" sz="2600" b="1" dirty="0" smtClean="0"/>
+              <a:t>Cosa è andato per il verso sbagliato </a:t>
+            </a:r>
+            <a:endParaRPr lang="it-IT" sz="2600" b="1" dirty="0"/>
+          </a:p>
+        </p:txBody>
+      </p:sp>
+      <p:pic>
+        <p:nvPicPr>
+          <p:cNvPr id="50178" name="Picture 2" descr="http://newton.logg.it/files/2009/11/Emoticon-Sad-300x300.png"/>
+          <p:cNvPicPr>
+            <a:picLocks noChangeAspect="1" noChangeArrowheads="1"/>
+          </p:cNvPicPr>
+          <p:nvPr/>
+        </p:nvPicPr>
+        <p:blipFill>
+          <a:blip r:embed="rId2" cstate="print"/>
+          <a:srcRect/>
+          <a:stretch>
+            <a:fillRect/>
+          </a:stretch>
+        </p:blipFill>
+        <p:spPr bwMode="auto">
+          <a:xfrm>
+            <a:off x="5286380" y="1571612"/>
+            <a:ext cx="857256" cy="857256"/>
+          </a:xfrm>
+          <a:prstGeom prst="rect">
+            <a:avLst/>
+          </a:prstGeom>
+          <a:noFill/>
+        </p:spPr>
+      </p:pic>
+    </p:spTree>
+  </p:cSld>
+  <p:clrMapOvr>
+    <a:masterClrMapping/>
+  </p:clrMapOvr>
+  <p:timing>
+    <p:tnLst>
+      <p:par>
+        <p:cTn id="1" dur="indefinite" restart="never" nodeType="tmRoot"/>
+      </p:par>
+    </p:tnLst>
+  </p:timing>
+</p:sld>
+</file>
+
+<file path=ppt/slides/slide37.xml><?xml version="1.0" encoding="utf-8"?>
+<p:sld xmlns:a="http://schemas.openxmlformats.org/drawingml/2006/main" xmlns:r="http://schemas.openxmlformats.org/officeDocument/2006/relationships" xmlns:p="http://schemas.openxmlformats.org/presentationml/2006/main">
+  <p:cSld>
+    <p:spTree>
+      <p:nvGrpSpPr>
+        <p:cNvPr id="1" name=""/>
+        <p:cNvGrpSpPr/>
+        <p:nvPr/>
+      </p:nvGrpSpPr>
+      <p:grpSpPr>
+        <a:xfrm>
+          <a:off x="0" y="0"/>
+          <a:ext cx="0" cy="0"/>
+          <a:chOff x="0" y="0"/>
+          <a:chExt cx="0" cy="0"/>
+        </a:xfrm>
+      </p:grpSpPr>
+      <p:sp>
+        <p:nvSpPr>
+          <p:cNvPr id="2" name="CasellaDiTesto 1"/>
+          <p:cNvSpPr txBox="1"/>
+          <p:nvPr/>
+        </p:nvSpPr>
+        <p:spPr>
+          <a:xfrm>
+            <a:off x="642910" y="428604"/>
+            <a:ext cx="7715304" cy="1107996"/>
+          </a:xfrm>
+          <a:prstGeom prst="rect">
+            <a:avLst/>
+          </a:prstGeom>
+          <a:noFill/>
+        </p:spPr>
+        <p:txBody>
+          <a:bodyPr wrap="square" rtlCol="0">
+            <a:spAutoFit/>
+          </a:bodyPr>
+          <a:lstStyle/>
+          <a:p>
+            <a:pPr algn="ctr"/>
+            <a:r>
+              <a:rPr lang="it-IT" sz="4800" b="1" dirty="0" smtClean="0">
+                <a:latin typeface="+mj-lt"/>
+              </a:rPr>
+              <a:t>Conclusioni</a:t>
+            </a:r>
+            <a:endParaRPr lang="it-IT" sz="2800" b="1" dirty="0" smtClean="0">
+              <a:latin typeface="+mj-lt"/>
+            </a:endParaRPr>
+          </a:p>
+          <a:p>
+            <a:pPr algn="ctr"/>
+            <a:endParaRPr lang="it-IT" dirty="0">
+              <a:latin typeface="+mj-lt"/>
+            </a:endParaRPr>
+          </a:p>
+        </p:txBody>
+      </p:sp>
+      <p:sp>
+        <p:nvSpPr>
+          <p:cNvPr id="3" name="Content Placeholder 3"/>
+          <p:cNvSpPr txBox="1">
+            <a:spLocks/>
+          </p:cNvSpPr>
+          <p:nvPr/>
+        </p:nvSpPr>
+        <p:spPr>
+          <a:xfrm>
+            <a:off x="357158" y="2500306"/>
+            <a:ext cx="8429684" cy="3286148"/>
+          </a:xfrm>
+          <a:prstGeom prst="rect">
+            <a:avLst/>
+          </a:prstGeom>
+        </p:spPr>
+        <p:txBody>
+          <a:bodyPr tIns="0"/>
+          <a:lstStyle>
+            <a:lvl1pPr marL="274320" indent="-274320" algn="l" rtl="0" eaLnBrk="1" latinLnBrk="0" hangingPunct="1">
+              <a:spcBef>
+                <a:spcPct val="20000"/>
+              </a:spcBef>
+              <a:buClrTx/>
+              <a:buSzPct val="95000"/>
+              <a:buFont typeface="Wingdings" pitchFamily="2" charset="2"/>
+              <a:buChar char="v"/>
+              <a:defRPr kumimoji="0" sz="2800" kern="1200">
+                <a:solidFill>
+                  <a:schemeClr val="tx1"/>
+                </a:solidFill>
+                <a:latin typeface="+mn-lt"/>
+                <a:ea typeface="+mn-ea"/>
+                <a:cs typeface="+mn-cs"/>
+              </a:defRPr>
+            </a:lvl1pPr>
+            <a:lvl2pPr marL="640080" indent="-246888" algn="l" rtl="0" eaLnBrk="1" latinLnBrk="0" hangingPunct="1">
+              <a:spcBef>
+                <a:spcPct val="20000"/>
+              </a:spcBef>
+              <a:buClrTx/>
+              <a:buSzPct val="85000"/>
+              <a:buFont typeface="Courier New" pitchFamily="49" charset="0"/>
+              <a:buChar char="o"/>
+              <a:defRPr kumimoji="0" sz="2600" kern="1200">
+                <a:solidFill>
+                  <a:schemeClr val="tx1"/>
+                </a:solidFill>
+                <a:latin typeface="+mn-lt"/>
+                <a:ea typeface="+mn-ea"/>
+                <a:cs typeface="+mn-cs"/>
+              </a:defRPr>
+            </a:lvl2pPr>
+            <a:lvl3pPr marL="914400" indent="-246888" algn="l" rtl="0" eaLnBrk="1" latinLnBrk="0" hangingPunct="1">
+              <a:spcBef>
+                <a:spcPct val="20000"/>
+              </a:spcBef>
+              <a:buClrTx/>
+              <a:buSzPct val="70000"/>
+              <a:buFont typeface="Wingdings 2"/>
+              <a:buChar char=""/>
+              <a:defRPr kumimoji="0" sz="2400" kern="1200">
+                <a:solidFill>
+                  <a:schemeClr val="tx1"/>
+                </a:solidFill>
+                <a:latin typeface="+mn-lt"/>
+                <a:ea typeface="+mn-ea"/>
+                <a:cs typeface="+mn-cs"/>
+              </a:defRPr>
+            </a:lvl3pPr>
+            <a:lvl4pPr marL="1188720" indent="-210312" algn="l" rtl="0" eaLnBrk="1" latinLnBrk="0" hangingPunct="1">
+              <a:spcBef>
+                <a:spcPct val="20000"/>
+              </a:spcBef>
+              <a:buClrTx/>
+              <a:buSzPct val="65000"/>
+              <a:buFont typeface="Wingdings 2"/>
+              <a:buChar char=""/>
+              <a:defRPr kumimoji="0" sz="2000" kern="1200">
+                <a:solidFill>
+                  <a:schemeClr val="tx1"/>
+                </a:solidFill>
+                <a:latin typeface="+mn-lt"/>
+                <a:ea typeface="+mn-ea"/>
+                <a:cs typeface="+mn-cs"/>
+              </a:defRPr>
+            </a:lvl4pPr>
+            <a:lvl5pPr marL="1463040" indent="-210312" algn="l" rtl="0" eaLnBrk="1" latinLnBrk="0" hangingPunct="1">
+              <a:spcBef>
+                <a:spcPct val="20000"/>
+              </a:spcBef>
+              <a:buClrTx/>
+              <a:buSzPct val="65000"/>
+              <a:buFont typeface="Wingdings 2"/>
+              <a:buChar char=""/>
+              <a:defRPr kumimoji="0" sz="1800" kern="1200">
+                <a:solidFill>
+                  <a:schemeClr val="tx1"/>
+                </a:solidFill>
+                <a:latin typeface="+mn-lt"/>
+                <a:ea typeface="+mn-ea"/>
+                <a:cs typeface="+mn-cs"/>
+              </a:defRPr>
+            </a:lvl5pPr>
+            <a:lvl6pPr marL="1737360" indent="-210312" algn="l" rtl="0" eaLnBrk="1" latinLnBrk="0" hangingPunct="1">
+              <a:spcBef>
+                <a:spcPct val="20000"/>
+              </a:spcBef>
+              <a:buClr>
+                <a:schemeClr val="accent5"/>
+              </a:buClr>
+              <a:buSzPct val="80000"/>
+              <a:buFont typeface="Wingdings 2"/>
+              <a:buChar char=""/>
+              <a:defRPr kumimoji="0" sz="1800" kern="1200">
+                <a:solidFill>
+                  <a:schemeClr val="tx1"/>
+                </a:solidFill>
+                <a:latin typeface="+mn-lt"/>
+                <a:ea typeface="+mn-ea"/>
+                <a:cs typeface="+mn-cs"/>
+              </a:defRPr>
+            </a:lvl6pPr>
+            <a:lvl7pPr marL="1920240" indent="-182880" algn="l" rtl="0" eaLnBrk="1" latinLnBrk="0" hangingPunct="1">
+              <a:spcBef>
+                <a:spcPct val="20000"/>
+              </a:spcBef>
+              <a:buClr>
+                <a:schemeClr val="accent6"/>
+              </a:buClr>
+              <a:buSzPct val="80000"/>
+              <a:buFont typeface="Wingdings 2"/>
+              <a:buChar char=""/>
+              <a:defRPr kumimoji="0" sz="1600" kern="1200" baseline="0">
+                <a:solidFill>
+                  <a:schemeClr val="tx1"/>
+                </a:solidFill>
+                <a:latin typeface="+mn-lt"/>
+                <a:ea typeface="+mn-ea"/>
+                <a:cs typeface="+mn-cs"/>
+              </a:defRPr>
+            </a:lvl7pPr>
+            <a:lvl8pPr marL="2194560" indent="-182880" algn="l" rtl="0" eaLnBrk="1" latinLnBrk="0" hangingPunct="1">
+              <a:spcBef>
+                <a:spcPct val="20000"/>
+              </a:spcBef>
+              <a:buClr>
+                <a:schemeClr val="tx2"/>
+              </a:buClr>
+              <a:buChar char="•"/>
+              <a:defRPr kumimoji="0" sz="1600" kern="1200">
+                <a:solidFill>
+                  <a:schemeClr val="tx1"/>
+                </a:solidFill>
+                <a:latin typeface="+mn-lt"/>
+                <a:ea typeface="+mn-ea"/>
+                <a:cs typeface="+mn-cs"/>
+              </a:defRPr>
+            </a:lvl8pPr>
+            <a:lvl9pPr marL="2468880" indent="-182880" algn="l" rtl="0" eaLnBrk="1" latinLnBrk="0" hangingPunct="1">
+              <a:spcBef>
+                <a:spcPct val="20000"/>
+              </a:spcBef>
+              <a:buClr>
+                <a:schemeClr val="tx2"/>
+              </a:buClr>
+              <a:buFontTx/>
+              <a:buChar char="•"/>
+              <a:defRPr kumimoji="0" sz="1400" kern="1200" baseline="0">
+                <a:solidFill>
+                  <a:schemeClr val="tx1"/>
+                </a:solidFill>
+                <a:latin typeface="+mn-lt"/>
+                <a:ea typeface="+mn-ea"/>
+                <a:cs typeface="+mn-cs"/>
+              </a:defRPr>
+            </a:lvl9pPr>
+          </a:lstStyle>
+          <a:p>
+            <a:pPr marL="365760" lvl="1" indent="0">
+              <a:buNone/>
+            </a:pPr>
+            <a:endParaRPr lang="en-US" dirty="0" smtClean="0"/>
+          </a:p>
+        </p:txBody>
+      </p:sp>
+      <p:sp>
+        <p:nvSpPr>
+          <p:cNvPr id="4" name="TextBox 3"/>
+          <p:cNvSpPr txBox="1"/>
+          <p:nvPr/>
+        </p:nvSpPr>
+        <p:spPr>
+          <a:xfrm>
             <a:off x="357158" y="1714488"/>
             <a:ext cx="5715040" cy="892552"/>
           </a:xfrm>
@@ -17511,7 +17434,7 @@
 </p:sld>
 </file>
 
-<file path=ppt/slides/slide37.xml><?xml version="1.0" encoding="utf-8"?>
+<file path=ppt/slides/slide38.xml><?xml version="1.0" encoding="utf-8"?>
 <p:sld xmlns:a="http://schemas.openxmlformats.org/drawingml/2006/main" xmlns:r="http://schemas.openxmlformats.org/officeDocument/2006/relationships" xmlns:p="http://schemas.openxmlformats.org/presentationml/2006/main">
   <p:cSld>
     <p:spTree>
@@ -17899,7 +17822,7 @@
           <p:nvPr>
             <p:extLst>
               <p:ext uri="{D42A27DB-BD31-4B8C-83A1-F6EECF244321}">
-                <p14:modId xmlns:p14="http://schemas.microsoft.com/office/powerpoint/2010/main" val="2486155450"/>
+                <p14:modId xmlns:p14="http://schemas.microsoft.com/office/powerpoint/2010/main" xmlns="" val="2486155450"/>
               </p:ext>
             </p:extLst>
           </p:nvPr>
@@ -17966,14 +17889,6 @@
                         </a:rPr>
                         <a:t>Compilazione Questionario</a:t>
                       </a:r>
-                      <a:endParaRPr kumimoji="0" lang="it-IT" sz="1800" b="0" kern="1200" dirty="0" smtClean="0">
-                        <a:solidFill>
-                          <a:schemeClr val="lt1"/>
-                        </a:solidFill>
-                        <a:latin typeface="+mn-lt"/>
-                        <a:ea typeface="+mn-ea"/>
-                        <a:cs typeface="+mn-cs"/>
-                      </a:endParaRPr>
                     </a:p>
                   </a:txBody>
                   <a:tcPr/>
@@ -18182,17 +18097,8 @@
               <a:rPr lang="it-IT" sz="3400" b="1" dirty="0" smtClean="0">
                 <a:latin typeface="+mj-lt"/>
               </a:rPr>
-              <a:t>Use Case Diagram Questionari – </a:t>
-            </a:r>
-            <a:r>
-              <a:rPr lang="it-IT" sz="3400" b="1" dirty="0" smtClean="0">
-                <a:latin typeface="+mj-lt"/>
-              </a:rPr>
-              <a:t>Prima Versione</a:t>
-            </a:r>
-            <a:endParaRPr lang="it-IT" sz="3400" b="1" dirty="0" smtClean="0">
-              <a:latin typeface="+mj-lt"/>
-            </a:endParaRPr>
+              <a:t>Use Case Diagram Questionari – Prima Versione</a:t>
+            </a:r>
           </a:p>
           <a:p>
             <a:pPr algn="ctr"/>
@@ -18205,18 +18111,18 @@
     </p:spTree>
     <p:extLst>
       <p:ext uri="{BB962C8B-B14F-4D97-AF65-F5344CB8AC3E}">
-        <p14:creationId xmlns:p14="http://schemas.microsoft.com/office/powerpoint/2010/main" val="3888432551"/>
+        <p14:creationId xmlns:p14="http://schemas.microsoft.com/office/powerpoint/2010/main" xmlns="" val="3888432551"/>
       </p:ext>
     </p:extLst>
   </p:cSld>
   <p:clrMapOvr>
     <a:masterClrMapping/>
   </p:clrMapOvr>
-  <mc:AlternateContent xmlns:mc="http://schemas.openxmlformats.org/markup-compatibility/2006" xmlns:p14="http://schemas.microsoft.com/office/powerpoint/2010/main">
-    <mc:Choice Requires="p14">
+  <mc:AlternateContent xmlns:mc="http://schemas.openxmlformats.org/markup-compatibility/2006">
+    <mc:Choice xmlns:p14="http://schemas.microsoft.com/office/powerpoint/2010/main" xmlns="" Requires="p14">
       <p:transition spd="slow" p14:dur="2000"/>
     </mc:Choice>
-    <mc:Fallback xmlns="">
+    <mc:Fallback>
       <p:transition spd="slow"/>
     </mc:Fallback>
   </mc:AlternateContent>
@@ -18307,13 +18213,7 @@
               <a:rPr lang="it-IT" sz="3400" b="1" dirty="0" smtClean="0">
                 <a:latin typeface="+mj-lt"/>
               </a:rPr>
-              <a:t>Use Case Diagram Questionari – </a:t>
-            </a:r>
-            <a:r>
-              <a:rPr lang="it-IT" sz="3400" b="1" dirty="0" smtClean="0">
-                <a:latin typeface="+mj-lt"/>
-              </a:rPr>
-              <a:t>Ultima </a:t>
+              <a:t>Use Case Diagram Questionari – Ultima </a:t>
             </a:r>
             <a:r>
               <a:rPr lang="it-IT" sz="3400" b="1" dirty="0" err="1" smtClean="0">
@@ -18336,18 +18236,18 @@
     </p:spTree>
     <p:extLst>
       <p:ext uri="{BB962C8B-B14F-4D97-AF65-F5344CB8AC3E}">
-        <p14:creationId xmlns:p14="http://schemas.microsoft.com/office/powerpoint/2010/main" val="2532338835"/>
+        <p14:creationId xmlns:p14="http://schemas.microsoft.com/office/powerpoint/2010/main" xmlns="" val="2532338835"/>
       </p:ext>
     </p:extLst>
   </p:cSld>
   <p:clrMapOvr>
     <a:masterClrMapping/>
   </p:clrMapOvr>
-  <mc:AlternateContent xmlns:mc="http://schemas.openxmlformats.org/markup-compatibility/2006" xmlns:p14="http://schemas.microsoft.com/office/powerpoint/2010/main">
-    <mc:Choice Requires="p14">
+  <mc:AlternateContent xmlns:mc="http://schemas.openxmlformats.org/markup-compatibility/2006">
+    <mc:Choice xmlns:p14="http://schemas.microsoft.com/office/powerpoint/2010/main" xmlns="" Requires="p14">
       <p:transition spd="slow" p14:dur="2000"/>
     </mc:Choice>
-    <mc:Fallback xmlns="">
+    <mc:Fallback>
       <p:transition spd="slow"/>
     </mc:Fallback>
   </mc:AlternateContent>
@@ -18425,7 +18325,7 @@
           <p:nvPr>
             <p:extLst>
               <p:ext uri="{D42A27DB-BD31-4B8C-83A1-F6EECF244321}">
-                <p14:modId xmlns:p14="http://schemas.microsoft.com/office/powerpoint/2010/main" val="4285816619"/>
+                <p14:modId xmlns:p14="http://schemas.microsoft.com/office/powerpoint/2010/main" xmlns="" val="4285816619"/>
               </p:ext>
             </p:extLst>
           </p:nvPr>
@@ -18492,14 +18392,6 @@
                         </a:rPr>
                         <a:t>Compilazione questionario</a:t>
                       </a:r>
-                      <a:endParaRPr kumimoji="0" lang="it-IT" sz="1700" b="0" kern="1200" dirty="0" smtClean="0">
-                        <a:solidFill>
-                          <a:schemeClr val="lt1"/>
-                        </a:solidFill>
-                        <a:latin typeface="+mn-lt"/>
-                        <a:ea typeface="+mn-ea"/>
-                        <a:cs typeface="+mn-cs"/>
-                      </a:endParaRPr>
                     </a:p>
                   </a:txBody>
                   <a:tcPr/>
@@ -18900,17 +18792,8 @@
               <a:rPr lang="it-IT" sz="4000" b="1" dirty="0" smtClean="0">
                 <a:latin typeface="+mj-lt"/>
               </a:rPr>
-              <a:t>Use Case identificativi del sistema </a:t>
-            </a:r>
-            <a:r>
-              <a:rPr lang="it-IT" sz="4000" b="1" dirty="0" smtClean="0">
-                <a:latin typeface="+mj-lt"/>
-              </a:rPr>
-              <a:t>4.0</a:t>
-            </a:r>
-            <a:endParaRPr lang="it-IT" sz="4000" b="1" dirty="0" smtClean="0">
-              <a:latin typeface="+mj-lt"/>
-            </a:endParaRPr>
+              <a:t>Use Case identificativi del sistema 4.0</a:t>
+            </a:r>
           </a:p>
           <a:p>
             <a:pPr algn="ctr"/>
@@ -18929,7 +18812,7 @@
           <p:nvPr>
             <p:extLst>
               <p:ext uri="{D42A27DB-BD31-4B8C-83A1-F6EECF244321}">
-                <p14:modId xmlns:p14="http://schemas.microsoft.com/office/powerpoint/2010/main" val="3225553551"/>
+                <p14:modId xmlns:p14="http://schemas.microsoft.com/office/powerpoint/2010/main" xmlns="" val="3225553551"/>
               </p:ext>
             </p:extLst>
           </p:nvPr>
@@ -18996,14 +18879,6 @@
                         </a:rPr>
                         <a:t>Compilazione questionario</a:t>
                       </a:r>
-                      <a:endParaRPr kumimoji="0" lang="it-IT" sz="1700" b="0" kern="1200" dirty="0" smtClean="0">
-                        <a:solidFill>
-                          <a:schemeClr val="lt1"/>
-                        </a:solidFill>
-                        <a:latin typeface="+mn-lt"/>
-                        <a:ea typeface="+mn-ea"/>
-                        <a:cs typeface="+mn-cs"/>
-                      </a:endParaRPr>
                     </a:p>
                   </a:txBody>
                   <a:tcPr/>
@@ -19348,7 +19223,7 @@
     </p:spTree>
     <p:extLst>
       <p:ext uri="{BB962C8B-B14F-4D97-AF65-F5344CB8AC3E}">
-        <p14:creationId xmlns:p14="http://schemas.microsoft.com/office/powerpoint/2010/main" val="1173458281"/>
+        <p14:creationId xmlns:p14="http://schemas.microsoft.com/office/powerpoint/2010/main" xmlns="" val="1173458281"/>
       </p:ext>
     </p:extLst>
   </p:cSld>
@@ -19409,13 +19284,7 @@
               <a:rPr lang="it-IT" sz="4800" b="1" dirty="0" smtClean="0">
                 <a:latin typeface="+mj-lt"/>
               </a:rPr>
-              <a:t>Pro\Contro </a:t>
-            </a:r>
-            <a:r>
-              <a:rPr lang="it-IT" sz="4800" b="1" dirty="0" smtClean="0">
-                <a:latin typeface="+mj-lt"/>
-              </a:rPr>
-              <a:t>del RAD</a:t>
+              <a:t>Pro\Contro del RAD</a:t>
             </a:r>
           </a:p>
           <a:p>

</xml_diff>

<commit_message>
[MT 3] riorganizzazione cartelle
</commit_message>
<xml_diff>
--- a/Presentazione/Atsilo3/Atsilo_H_PresentazioneFinale.pptx
+++ b/Presentazione/Atsilo3/Atsilo_H_PresentazioneFinale.pptx
@@ -1780,7 +1780,19 @@
             </a:r>
             <a:r>
               <a:rPr lang="it-IT" baseline="0" dirty="0" smtClean="0"/>
-              <a:t> potrebbe evitare di far vedere le 2 versioni degli attori, recuperiamo tempo è poco utile, fate vedere direttamente questa slide e discutete delle generalizzazioni e di cosa servono gli attori</a:t>
+              <a:t> potrebbe evitare di far vedere le 2 versioni degli attori, </a:t>
+            </a:r>
+            <a:r>
+              <a:rPr lang="it-IT" baseline="0" smtClean="0"/>
+              <a:t>recuperiamo </a:t>
+            </a:r>
+            <a:r>
+              <a:rPr lang="it-IT" baseline="0" smtClean="0"/>
+              <a:t>tempo, </a:t>
+            </a:r>
+            <a:r>
+              <a:rPr lang="it-IT" baseline="0" dirty="0" smtClean="0"/>
+              <a:t>fate vedere direttamente questa slide e discutete delle generalizzazioni e di cosa servono gli attori</a:t>
             </a:r>
             <a:endParaRPr lang="it-IT" dirty="0"/>
           </a:p>
@@ -21282,13 +21294,7 @@
               <a:rPr lang="it-IT" sz="2400" b="1" dirty="0" smtClean="0">
                 <a:latin typeface="+mj-lt"/>
               </a:rPr>
-              <a:t>Secondo Livello di </a:t>
-            </a:r>
-            <a:r>
-              <a:rPr lang="it-IT" sz="2400" b="1" dirty="0" smtClean="0">
-                <a:latin typeface="+mj-lt"/>
-              </a:rPr>
-              <a:t>Astrazione</a:t>
+              <a:t>Secondo Livello di Astrazione</a:t>
             </a:r>
             <a:endParaRPr lang="it-IT" dirty="0">
               <a:latin typeface="+mj-lt"/>
@@ -21368,13 +21374,7 @@
               <a:rPr lang="it-IT" sz="4000" b="1" dirty="0" smtClean="0">
                 <a:latin typeface="+mj-lt"/>
               </a:rPr>
-              <a:t>Use Case </a:t>
-            </a:r>
-            <a:r>
-              <a:rPr lang="it-IT" sz="4000" b="1" dirty="0" smtClean="0">
-                <a:latin typeface="+mj-lt"/>
-              </a:rPr>
-              <a:t>Compilazione Questionario</a:t>
+              <a:t>Use Case Compilazione Questionario</a:t>
             </a:r>
           </a:p>
           <a:p>
@@ -21385,9 +21385,6 @@
               </a:rPr>
               <a:t>Prima Versione</a:t>
             </a:r>
-            <a:endParaRPr lang="it-IT" sz="2800" b="1" dirty="0" smtClean="0">
-              <a:latin typeface="+mj-lt"/>
-            </a:endParaRPr>
           </a:p>
           <a:p>
             <a:pPr algn="ctr"/>

</xml_diff>

<commit_message>
[WR 3] revisioni parti mancanti
</commit_message>
<xml_diff>
--- a/Presentazione/Atsilo3/Atsilo_H_PresentazioneFinale.pptx
+++ b/Presentazione/Atsilo3/Atsilo_H_PresentazioneFinale.pptx
@@ -234,7 +234,7 @@
             <a:fld id="{38D78F4D-402C-46E0-A4BB-DF91EA86B14C}" type="datetimeFigureOut">
               <a:rPr lang="it-IT" smtClean="0"/>
               <a:pPr/>
-              <a:t>29/12/2012</a:t>
+              <a:t>30/12/2012</a:t>
             </a:fld>
             <a:endParaRPr lang="it-IT"/>
           </a:p>
@@ -394,7 +394,7 @@
             <a:fld id="{D70604CA-7593-4640-8FA1-5523937B8510}" type="slidenum">
               <a:rPr lang="it-IT" smtClean="0"/>
               <a:pPr/>
-              <a:t>‹N›</a:t>
+              <a:t>‹#›</a:t>
             </a:fld>
             <a:endParaRPr lang="it-IT"/>
           </a:p>
@@ -403,7 +403,7 @@
     </p:spTree>
     <p:extLst>
       <p:ext uri="{BB962C8B-B14F-4D97-AF65-F5344CB8AC3E}">
-        <p14:creationId xmlns:p14="http://schemas.microsoft.com/office/powerpoint/2010/main" val="2126419590"/>
+        <p14:creationId xmlns="" xmlns:p14="http://schemas.microsoft.com/office/powerpoint/2010/main" val="2126419590"/>
       </p:ext>
     </p:extLst>
   </p:cSld>
@@ -600,7 +600,7 @@
     </p:spTree>
     <p:extLst>
       <p:ext uri="{BB962C8B-B14F-4D97-AF65-F5344CB8AC3E}">
-        <p14:creationId xmlns:p14="http://schemas.microsoft.com/office/powerpoint/2010/main" val="963420841"/>
+        <p14:creationId xmlns="" xmlns:p14="http://schemas.microsoft.com/office/powerpoint/2010/main" val="963420841"/>
       </p:ext>
     </p:extLst>
   </p:cSld>
@@ -668,11 +668,7 @@
             </a:r>
             <a:r>
               <a:rPr lang="it-IT" baseline="0" dirty="0" smtClean="0"/>
-              <a:t> corrispettivo» basta </a:t>
-            </a:r>
-            <a:r>
-              <a:rPr lang="it-IT" baseline="0" dirty="0" smtClean="0"/>
-              <a:t>questo, si può togliere se non c’è tempo</a:t>
+              <a:t> corrispettivo» basta questo, si può togliere se non c’è tempo</a:t>
             </a:r>
           </a:p>
           <a:p>
@@ -711,7 +707,7 @@
     </p:spTree>
     <p:extLst>
       <p:ext uri="{BB962C8B-B14F-4D97-AF65-F5344CB8AC3E}">
-        <p14:creationId xmlns:p14="http://schemas.microsoft.com/office/powerpoint/2010/main" val="3361965342"/>
+        <p14:creationId xmlns="" xmlns:p14="http://schemas.microsoft.com/office/powerpoint/2010/main" val="3361965342"/>
       </p:ext>
     </p:extLst>
   </p:cSld>
@@ -854,7 +850,7 @@
     </p:spTree>
     <p:extLst>
       <p:ext uri="{BB962C8B-B14F-4D97-AF65-F5344CB8AC3E}">
-        <p14:creationId xmlns:p14="http://schemas.microsoft.com/office/powerpoint/2010/main" val="3314347345"/>
+        <p14:creationId xmlns="" xmlns:p14="http://schemas.microsoft.com/office/powerpoint/2010/main" val="3314347345"/>
       </p:ext>
     </p:extLst>
   </p:cSld>
@@ -991,7 +987,7 @@
     </p:spTree>
     <p:extLst>
       <p:ext uri="{BB962C8B-B14F-4D97-AF65-F5344CB8AC3E}">
-        <p14:creationId xmlns:p14="http://schemas.microsoft.com/office/powerpoint/2010/main" val="2265654022"/>
+        <p14:creationId xmlns="" xmlns:p14="http://schemas.microsoft.com/office/powerpoint/2010/main" val="2265654022"/>
       </p:ext>
     </p:extLst>
   </p:cSld>
@@ -1128,7 +1124,7 @@
     </p:spTree>
     <p:extLst>
       <p:ext uri="{BB962C8B-B14F-4D97-AF65-F5344CB8AC3E}">
-        <p14:creationId xmlns:p14="http://schemas.microsoft.com/office/powerpoint/2010/main" val="71143455"/>
+        <p14:creationId xmlns="" xmlns:p14="http://schemas.microsoft.com/office/powerpoint/2010/main" val="71143455"/>
       </p:ext>
     </p:extLst>
   </p:cSld>
@@ -1227,7 +1223,7 @@
     </p:spTree>
     <p:extLst>
       <p:ext uri="{BB962C8B-B14F-4D97-AF65-F5344CB8AC3E}">
-        <p14:creationId xmlns:p14="http://schemas.microsoft.com/office/powerpoint/2010/main" val="113696966"/>
+        <p14:creationId xmlns="" xmlns:p14="http://schemas.microsoft.com/office/powerpoint/2010/main" val="113696966"/>
       </p:ext>
     </p:extLst>
   </p:cSld>
@@ -1352,7 +1348,7 @@
     </p:spTree>
     <p:extLst>
       <p:ext uri="{BB962C8B-B14F-4D97-AF65-F5344CB8AC3E}">
-        <p14:creationId xmlns:p14="http://schemas.microsoft.com/office/powerpoint/2010/main" val="1063702567"/>
+        <p14:creationId xmlns="" xmlns:p14="http://schemas.microsoft.com/office/powerpoint/2010/main" val="1063702567"/>
       </p:ext>
     </p:extLst>
   </p:cSld>
@@ -1457,7 +1453,7 @@
     </p:spTree>
     <p:extLst>
       <p:ext uri="{BB962C8B-B14F-4D97-AF65-F5344CB8AC3E}">
-        <p14:creationId xmlns:p14="http://schemas.microsoft.com/office/powerpoint/2010/main" val="122959592"/>
+        <p14:creationId xmlns="" xmlns:p14="http://schemas.microsoft.com/office/powerpoint/2010/main" val="122959592"/>
       </p:ext>
     </p:extLst>
   </p:cSld>
@@ -1572,7 +1568,7 @@
     </p:spTree>
     <p:extLst>
       <p:ext uri="{BB962C8B-B14F-4D97-AF65-F5344CB8AC3E}">
-        <p14:creationId xmlns:p14="http://schemas.microsoft.com/office/powerpoint/2010/main" val="780286428"/>
+        <p14:creationId xmlns="" xmlns:p14="http://schemas.microsoft.com/office/powerpoint/2010/main" val="780286428"/>
       </p:ext>
     </p:extLst>
   </p:cSld>
@@ -1673,7 +1669,7 @@
     </p:spTree>
     <p:extLst>
       <p:ext uri="{BB962C8B-B14F-4D97-AF65-F5344CB8AC3E}">
-        <p14:creationId xmlns:p14="http://schemas.microsoft.com/office/powerpoint/2010/main" val="2418012031"/>
+        <p14:creationId xmlns="" xmlns:p14="http://schemas.microsoft.com/office/powerpoint/2010/main" val="2418012031"/>
       </p:ext>
     </p:extLst>
   </p:cSld>
@@ -1774,7 +1770,7 @@
     </p:spTree>
     <p:extLst>
       <p:ext uri="{BB962C8B-B14F-4D97-AF65-F5344CB8AC3E}">
-        <p14:creationId xmlns:p14="http://schemas.microsoft.com/office/powerpoint/2010/main" val="778008281"/>
+        <p14:creationId xmlns="" xmlns:p14="http://schemas.microsoft.com/office/powerpoint/2010/main" val="778008281"/>
       </p:ext>
     </p:extLst>
   </p:cSld>
@@ -1846,11 +1842,7 @@
             </a:r>
             <a:r>
               <a:rPr lang="it-IT" baseline="0" dirty="0" smtClean="0"/>
-              <a:t> al nome del file e di perché si chiama </a:t>
-            </a:r>
-            <a:r>
-              <a:rPr lang="it-IT" baseline="0" dirty="0" smtClean="0"/>
-              <a:t>cosi.</a:t>
+              <a:t> al nome del file e di perché si chiama cosi.</a:t>
             </a:r>
           </a:p>
           <a:p>
@@ -1889,7 +1881,7 @@
     </p:spTree>
     <p:extLst>
       <p:ext uri="{BB962C8B-B14F-4D97-AF65-F5344CB8AC3E}">
-        <p14:creationId xmlns:p14="http://schemas.microsoft.com/office/powerpoint/2010/main" val="2781517378"/>
+        <p14:creationId xmlns="" xmlns:p14="http://schemas.microsoft.com/office/powerpoint/2010/main" val="2781517378"/>
       </p:ext>
     </p:extLst>
   </p:cSld>
@@ -1982,7 +1974,7 @@
     </p:spTree>
     <p:extLst>
       <p:ext uri="{BB962C8B-B14F-4D97-AF65-F5344CB8AC3E}">
-        <p14:creationId xmlns:p14="http://schemas.microsoft.com/office/powerpoint/2010/main" val="1377757052"/>
+        <p14:creationId xmlns="" xmlns:p14="http://schemas.microsoft.com/office/powerpoint/2010/main" val="1377757052"/>
       </p:ext>
     </p:extLst>
   </p:cSld>
@@ -2086,7 +2078,7 @@
     </p:spTree>
     <p:extLst>
       <p:ext uri="{BB962C8B-B14F-4D97-AF65-F5344CB8AC3E}">
-        <p14:creationId xmlns:p14="http://schemas.microsoft.com/office/powerpoint/2010/main" val="1394194668"/>
+        <p14:creationId xmlns="" xmlns:p14="http://schemas.microsoft.com/office/powerpoint/2010/main" val="1394194668"/>
       </p:ext>
     </p:extLst>
   </p:cSld>
@@ -2241,7 +2233,7 @@
     </p:spTree>
     <p:extLst>
       <p:ext uri="{BB962C8B-B14F-4D97-AF65-F5344CB8AC3E}">
-        <p14:creationId xmlns:p14="http://schemas.microsoft.com/office/powerpoint/2010/main" val="2972088584"/>
+        <p14:creationId xmlns="" xmlns:p14="http://schemas.microsoft.com/office/powerpoint/2010/main" val="2972088584"/>
       </p:ext>
     </p:extLst>
   </p:cSld>
@@ -2350,7 +2342,7 @@
     </p:spTree>
     <p:extLst>
       <p:ext uri="{BB962C8B-B14F-4D97-AF65-F5344CB8AC3E}">
-        <p14:creationId xmlns:p14="http://schemas.microsoft.com/office/powerpoint/2010/main" val="1417320036"/>
+        <p14:creationId xmlns="" xmlns:p14="http://schemas.microsoft.com/office/powerpoint/2010/main" val="1417320036"/>
       </p:ext>
     </p:extLst>
   </p:cSld>
@@ -2459,7 +2451,7 @@
     </p:spTree>
     <p:extLst>
       <p:ext uri="{BB962C8B-B14F-4D97-AF65-F5344CB8AC3E}">
-        <p14:creationId xmlns:p14="http://schemas.microsoft.com/office/powerpoint/2010/main" val="2176874561"/>
+        <p14:creationId xmlns="" xmlns:p14="http://schemas.microsoft.com/office/powerpoint/2010/main" val="2176874561"/>
       </p:ext>
     </p:extLst>
   </p:cSld>
@@ -2560,7 +2552,7 @@
     </p:spTree>
     <p:extLst>
       <p:ext uri="{BB962C8B-B14F-4D97-AF65-F5344CB8AC3E}">
-        <p14:creationId xmlns:p14="http://schemas.microsoft.com/office/powerpoint/2010/main" val="2428745919"/>
+        <p14:creationId xmlns="" xmlns:p14="http://schemas.microsoft.com/office/powerpoint/2010/main" val="2428745919"/>
       </p:ext>
     </p:extLst>
   </p:cSld>
@@ -2657,7 +2649,7 @@
     </p:spTree>
     <p:extLst>
       <p:ext uri="{BB962C8B-B14F-4D97-AF65-F5344CB8AC3E}">
-        <p14:creationId xmlns:p14="http://schemas.microsoft.com/office/powerpoint/2010/main" val="899854441"/>
+        <p14:creationId xmlns="" xmlns:p14="http://schemas.microsoft.com/office/powerpoint/2010/main" val="899854441"/>
       </p:ext>
     </p:extLst>
   </p:cSld>
@@ -2734,11 +2726,7 @@
             </a:r>
             <a:r>
               <a:rPr lang="it-IT" baseline="0" dirty="0" smtClean="0"/>
-              <a:t> del ODD secondo voi, siate specifici sulla nostra parte anche di cose che non sono questionario o forum (solo qui potete farlo</a:t>
-            </a:r>
-            <a:r>
-              <a:rPr lang="it-IT" baseline="0" dirty="0" smtClean="0"/>
-              <a:t>)</a:t>
+              <a:t> del ODD secondo voi, siate specifici sulla nostra parte anche di cose che non sono questionario o forum (solo qui potete farlo)</a:t>
             </a:r>
           </a:p>
           <a:p>
@@ -2817,7 +2805,7 @@
     </p:spTree>
     <p:extLst>
       <p:ext uri="{BB962C8B-B14F-4D97-AF65-F5344CB8AC3E}">
-        <p14:creationId xmlns:p14="http://schemas.microsoft.com/office/powerpoint/2010/main" val="1218324987"/>
+        <p14:creationId xmlns="" xmlns:p14="http://schemas.microsoft.com/office/powerpoint/2010/main" val="1218324987"/>
       </p:ext>
     </p:extLst>
   </p:cSld>
@@ -2910,7 +2898,7 @@
     </p:spTree>
     <p:extLst>
       <p:ext uri="{BB962C8B-B14F-4D97-AF65-F5344CB8AC3E}">
-        <p14:creationId xmlns:p14="http://schemas.microsoft.com/office/powerpoint/2010/main" val="3928439017"/>
+        <p14:creationId xmlns="" xmlns:p14="http://schemas.microsoft.com/office/powerpoint/2010/main" val="3928439017"/>
       </p:ext>
     </p:extLst>
   </p:cSld>
@@ -2999,7 +2987,7 @@
     </p:spTree>
     <p:extLst>
       <p:ext uri="{BB962C8B-B14F-4D97-AF65-F5344CB8AC3E}">
-        <p14:creationId xmlns:p14="http://schemas.microsoft.com/office/powerpoint/2010/main" val="4040687285"/>
+        <p14:creationId xmlns="" xmlns:p14="http://schemas.microsoft.com/office/powerpoint/2010/main" val="4040687285"/>
       </p:ext>
     </p:extLst>
   </p:cSld>
@@ -3098,7 +3086,7 @@
     </p:spTree>
     <p:extLst>
       <p:ext uri="{BB962C8B-B14F-4D97-AF65-F5344CB8AC3E}">
-        <p14:creationId xmlns:p14="http://schemas.microsoft.com/office/powerpoint/2010/main" val="1025718114"/>
+        <p14:creationId xmlns="" xmlns:p14="http://schemas.microsoft.com/office/powerpoint/2010/main" val="1025718114"/>
       </p:ext>
     </p:extLst>
   </p:cSld>
@@ -3262,7 +3250,7 @@
     </p:spTree>
     <p:extLst>
       <p:ext uri="{BB962C8B-B14F-4D97-AF65-F5344CB8AC3E}">
-        <p14:creationId xmlns:p14="http://schemas.microsoft.com/office/powerpoint/2010/main" val="1047033234"/>
+        <p14:creationId xmlns="" xmlns:p14="http://schemas.microsoft.com/office/powerpoint/2010/main" val="1047033234"/>
       </p:ext>
     </p:extLst>
   </p:cSld>
@@ -3351,7 +3339,7 @@
     </p:spTree>
     <p:extLst>
       <p:ext uri="{BB962C8B-B14F-4D97-AF65-F5344CB8AC3E}">
-        <p14:creationId xmlns:p14="http://schemas.microsoft.com/office/powerpoint/2010/main" val="1047033234"/>
+        <p14:creationId xmlns="" xmlns:p14="http://schemas.microsoft.com/office/powerpoint/2010/main" val="1047033234"/>
       </p:ext>
     </p:extLst>
   </p:cSld>
@@ -3436,7 +3424,7 @@
     </p:spTree>
     <p:extLst>
       <p:ext uri="{BB962C8B-B14F-4D97-AF65-F5344CB8AC3E}">
-        <p14:creationId xmlns:p14="http://schemas.microsoft.com/office/powerpoint/2010/main" val="742716072"/>
+        <p14:creationId xmlns="" xmlns:p14="http://schemas.microsoft.com/office/powerpoint/2010/main" val="742716072"/>
       </p:ext>
     </p:extLst>
   </p:cSld>
@@ -3525,7 +3513,7 @@
     </p:spTree>
     <p:extLst>
       <p:ext uri="{BB962C8B-B14F-4D97-AF65-F5344CB8AC3E}">
-        <p14:creationId xmlns:p14="http://schemas.microsoft.com/office/powerpoint/2010/main" val="1425725903"/>
+        <p14:creationId xmlns="" xmlns:p14="http://schemas.microsoft.com/office/powerpoint/2010/main" val="1425725903"/>
       </p:ext>
     </p:extLst>
   </p:cSld>
@@ -3634,7 +3622,7 @@
     </p:spTree>
     <p:extLst>
       <p:ext uri="{BB962C8B-B14F-4D97-AF65-F5344CB8AC3E}">
-        <p14:creationId xmlns:p14="http://schemas.microsoft.com/office/powerpoint/2010/main" val="880674728"/>
+        <p14:creationId xmlns="" xmlns:p14="http://schemas.microsoft.com/office/powerpoint/2010/main" val="880674728"/>
       </p:ext>
     </p:extLst>
   </p:cSld>
@@ -3743,7 +3731,7 @@
     </p:spTree>
     <p:extLst>
       <p:ext uri="{BB962C8B-B14F-4D97-AF65-F5344CB8AC3E}">
-        <p14:creationId xmlns:p14="http://schemas.microsoft.com/office/powerpoint/2010/main" val="346945336"/>
+        <p14:creationId xmlns="" xmlns:p14="http://schemas.microsoft.com/office/powerpoint/2010/main" val="346945336"/>
       </p:ext>
     </p:extLst>
   </p:cSld>
@@ -3852,7 +3840,7 @@
     </p:spTree>
     <p:extLst>
       <p:ext uri="{BB962C8B-B14F-4D97-AF65-F5344CB8AC3E}">
-        <p14:creationId xmlns:p14="http://schemas.microsoft.com/office/powerpoint/2010/main" val="1778546328"/>
+        <p14:creationId xmlns="" xmlns:p14="http://schemas.microsoft.com/office/powerpoint/2010/main" val="1778546328"/>
       </p:ext>
     </p:extLst>
   </p:cSld>
@@ -3961,7 +3949,7 @@
     </p:spTree>
     <p:extLst>
       <p:ext uri="{BB962C8B-B14F-4D97-AF65-F5344CB8AC3E}">
-        <p14:creationId xmlns:p14="http://schemas.microsoft.com/office/powerpoint/2010/main" val="604861763"/>
+        <p14:creationId xmlns="" xmlns:p14="http://schemas.microsoft.com/office/powerpoint/2010/main" val="604861763"/>
       </p:ext>
     </p:extLst>
   </p:cSld>
@@ -4050,7 +4038,7 @@
     </p:spTree>
     <p:extLst>
       <p:ext uri="{BB962C8B-B14F-4D97-AF65-F5344CB8AC3E}">
-        <p14:creationId xmlns:p14="http://schemas.microsoft.com/office/powerpoint/2010/main" val="1357369038"/>
+        <p14:creationId xmlns="" xmlns:p14="http://schemas.microsoft.com/office/powerpoint/2010/main" val="1357369038"/>
       </p:ext>
     </p:extLst>
   </p:cSld>
@@ -4164,7 +4152,7 @@
     </p:spTree>
     <p:extLst>
       <p:ext uri="{BB962C8B-B14F-4D97-AF65-F5344CB8AC3E}">
-        <p14:creationId xmlns:p14="http://schemas.microsoft.com/office/powerpoint/2010/main" val="3780346060"/>
+        <p14:creationId xmlns="" xmlns:p14="http://schemas.microsoft.com/office/powerpoint/2010/main" val="3780346060"/>
       </p:ext>
     </p:extLst>
   </p:cSld>
@@ -4269,7 +4257,7 @@
     </p:spTree>
     <p:extLst>
       <p:ext uri="{BB962C8B-B14F-4D97-AF65-F5344CB8AC3E}">
-        <p14:creationId xmlns:p14="http://schemas.microsoft.com/office/powerpoint/2010/main" val="41796055"/>
+        <p14:creationId xmlns="" xmlns:p14="http://schemas.microsoft.com/office/powerpoint/2010/main" val="41796055"/>
       </p:ext>
     </p:extLst>
   </p:cSld>
@@ -4333,11 +4321,7 @@
             </a:r>
             <a:r>
               <a:rPr lang="it-IT" baseline="0" dirty="0" smtClean="0"/>
-              <a:t>dopo la realizzazione di un prototipo nella fase di system design e, dopo alcuni colloqui con il cliente, abbiamo individuato alcune problematiche nel rad quali requisiti funzionali non correttamente individuati e relativi </a:t>
-            </a:r>
-            <a:r>
-              <a:rPr lang="it-IT" baseline="0" dirty="0" smtClean="0"/>
-              <a:t>attori</a:t>
+              <a:t>dopo la realizzazione di un prototipo nella fase di system design e, dopo alcuni colloqui con il cliente, abbiamo individuato alcune problematiche nel rad quali requisiti funzionali non correttamente individuati e relativi attori</a:t>
             </a:r>
           </a:p>
           <a:p>
@@ -4396,7 +4380,7 @@
     </p:spTree>
     <p:extLst>
       <p:ext uri="{BB962C8B-B14F-4D97-AF65-F5344CB8AC3E}">
-        <p14:creationId xmlns:p14="http://schemas.microsoft.com/office/powerpoint/2010/main" val="555626785"/>
+        <p14:creationId xmlns="" xmlns:p14="http://schemas.microsoft.com/office/powerpoint/2010/main" val="555626785"/>
       </p:ext>
     </p:extLst>
   </p:cSld>
@@ -4489,7 +4473,7 @@
     </p:spTree>
     <p:extLst>
       <p:ext uri="{BB962C8B-B14F-4D97-AF65-F5344CB8AC3E}">
-        <p14:creationId xmlns:p14="http://schemas.microsoft.com/office/powerpoint/2010/main" val="855395126"/>
+        <p14:creationId xmlns="" xmlns:p14="http://schemas.microsoft.com/office/powerpoint/2010/main" val="855395126"/>
       </p:ext>
     </p:extLst>
   </p:cSld>
@@ -4602,7 +4586,7 @@
     </p:spTree>
     <p:extLst>
       <p:ext uri="{BB962C8B-B14F-4D97-AF65-F5344CB8AC3E}">
-        <p14:creationId xmlns:p14="http://schemas.microsoft.com/office/powerpoint/2010/main" val="802928497"/>
+        <p14:creationId xmlns="" xmlns:p14="http://schemas.microsoft.com/office/powerpoint/2010/main" val="802928497"/>
       </p:ext>
     </p:extLst>
   </p:cSld>
@@ -4778,7 +4762,7 @@
             <a:fld id="{63CABBC0-75E4-43BB-A6A6-84C2A96BDB82}" type="datetimeFigureOut">
               <a:rPr lang="it-IT" smtClean="0"/>
               <a:pPr/>
-              <a:t>29/12/2012</a:t>
+              <a:t>30/12/2012</a:t>
             </a:fld>
             <a:endParaRPr lang="it-IT"/>
           </a:p>
@@ -4821,7 +4805,7 @@
             <a:fld id="{F89AEA99-3E91-4C58-9AD4-045DB5619AC3}" type="slidenum">
               <a:rPr lang="it-IT" smtClean="0"/>
               <a:pPr/>
-              <a:t>‹N›</a:t>
+              <a:t>‹#›</a:t>
             </a:fld>
             <a:endParaRPr lang="it-IT"/>
           </a:p>
@@ -4960,7 +4944,7 @@
             <a:fld id="{63CABBC0-75E4-43BB-A6A6-84C2A96BDB82}" type="datetimeFigureOut">
               <a:rPr lang="it-IT" smtClean="0"/>
               <a:pPr/>
-              <a:t>29/12/2012</a:t>
+              <a:t>30/12/2012</a:t>
             </a:fld>
             <a:endParaRPr lang="it-IT"/>
           </a:p>
@@ -5003,7 +4987,7 @@
             <a:fld id="{F89AEA99-3E91-4C58-9AD4-045DB5619AC3}" type="slidenum">
               <a:rPr lang="it-IT" smtClean="0"/>
               <a:pPr/>
-              <a:t>‹N›</a:t>
+              <a:t>‹#›</a:t>
             </a:fld>
             <a:endParaRPr lang="it-IT"/>
           </a:p>
@@ -5152,7 +5136,7 @@
             <a:fld id="{63CABBC0-75E4-43BB-A6A6-84C2A96BDB82}" type="datetimeFigureOut">
               <a:rPr lang="it-IT" smtClean="0"/>
               <a:pPr/>
-              <a:t>29/12/2012</a:t>
+              <a:t>30/12/2012</a:t>
             </a:fld>
             <a:endParaRPr lang="it-IT"/>
           </a:p>
@@ -5195,7 +5179,7 @@
             <a:fld id="{F89AEA99-3E91-4C58-9AD4-045DB5619AC3}" type="slidenum">
               <a:rPr lang="it-IT" smtClean="0"/>
               <a:pPr/>
-              <a:t>‹N›</a:t>
+              <a:t>‹#›</a:t>
             </a:fld>
             <a:endParaRPr lang="it-IT"/>
           </a:p>
@@ -5334,7 +5318,7 @@
             <a:fld id="{63CABBC0-75E4-43BB-A6A6-84C2A96BDB82}" type="datetimeFigureOut">
               <a:rPr lang="it-IT" smtClean="0"/>
               <a:pPr/>
-              <a:t>29/12/2012</a:t>
+              <a:t>30/12/2012</a:t>
             </a:fld>
             <a:endParaRPr lang="it-IT"/>
           </a:p>
@@ -5377,7 +5361,7 @@
             <a:fld id="{F89AEA99-3E91-4C58-9AD4-045DB5619AC3}" type="slidenum">
               <a:rPr lang="it-IT" smtClean="0"/>
               <a:pPr/>
-              <a:t>‹N›</a:t>
+              <a:t>‹#›</a:t>
             </a:fld>
             <a:endParaRPr lang="it-IT"/>
           </a:p>
@@ -5577,7 +5561,7 @@
             <a:fld id="{63CABBC0-75E4-43BB-A6A6-84C2A96BDB82}" type="datetimeFigureOut">
               <a:rPr lang="it-IT" smtClean="0"/>
               <a:pPr/>
-              <a:t>29/12/2012</a:t>
+              <a:t>30/12/2012</a:t>
             </a:fld>
             <a:endParaRPr lang="it-IT"/>
           </a:p>
@@ -5620,7 +5604,7 @@
             <a:fld id="{F89AEA99-3E91-4C58-9AD4-045DB5619AC3}" type="slidenum">
               <a:rPr lang="it-IT" smtClean="0"/>
               <a:pPr/>
-              <a:t>‹N›</a:t>
+              <a:t>‹#›</a:t>
             </a:fld>
             <a:endParaRPr lang="it-IT"/>
           </a:p>
@@ -5858,7 +5842,7 @@
             <a:fld id="{63CABBC0-75E4-43BB-A6A6-84C2A96BDB82}" type="datetimeFigureOut">
               <a:rPr lang="it-IT" smtClean="0"/>
               <a:pPr/>
-              <a:t>29/12/2012</a:t>
+              <a:t>30/12/2012</a:t>
             </a:fld>
             <a:endParaRPr lang="it-IT"/>
           </a:p>
@@ -5901,7 +5885,7 @@
             <a:fld id="{F89AEA99-3E91-4C58-9AD4-045DB5619AC3}" type="slidenum">
               <a:rPr lang="it-IT" smtClean="0"/>
               <a:pPr/>
-              <a:t>‹N›</a:t>
+              <a:t>‹#›</a:t>
             </a:fld>
             <a:endParaRPr lang="it-IT"/>
           </a:p>
@@ -6249,7 +6233,7 @@
             <a:fld id="{63CABBC0-75E4-43BB-A6A6-84C2A96BDB82}" type="datetimeFigureOut">
               <a:rPr lang="it-IT" smtClean="0"/>
               <a:pPr/>
-              <a:t>29/12/2012</a:t>
+              <a:t>30/12/2012</a:t>
             </a:fld>
             <a:endParaRPr lang="it-IT"/>
           </a:p>
@@ -6292,7 +6276,7 @@
             <a:fld id="{F89AEA99-3E91-4C58-9AD4-045DB5619AC3}" type="slidenum">
               <a:rPr lang="it-IT" smtClean="0"/>
               <a:pPr/>
-              <a:t>‹N›</a:t>
+              <a:t>‹#›</a:t>
             </a:fld>
             <a:endParaRPr lang="it-IT"/>
           </a:p>
@@ -6408,7 +6392,7 @@
             <a:fld id="{63CABBC0-75E4-43BB-A6A6-84C2A96BDB82}" type="datetimeFigureOut">
               <a:rPr lang="it-IT" smtClean="0"/>
               <a:pPr/>
-              <a:t>29/12/2012</a:t>
+              <a:t>30/12/2012</a:t>
             </a:fld>
             <a:endParaRPr lang="it-IT"/>
           </a:p>
@@ -6451,7 +6435,7 @@
             <a:fld id="{F89AEA99-3E91-4C58-9AD4-045DB5619AC3}" type="slidenum">
               <a:rPr lang="it-IT" smtClean="0"/>
               <a:pPr/>
-              <a:t>‹N›</a:t>
+              <a:t>‹#›</a:t>
             </a:fld>
             <a:endParaRPr lang="it-IT"/>
           </a:p>
@@ -6507,7 +6491,7 @@
             <a:fld id="{63CABBC0-75E4-43BB-A6A6-84C2A96BDB82}" type="datetimeFigureOut">
               <a:rPr lang="it-IT" smtClean="0"/>
               <a:pPr/>
-              <a:t>29/12/2012</a:t>
+              <a:t>30/12/2012</a:t>
             </a:fld>
             <a:endParaRPr lang="it-IT"/>
           </a:p>
@@ -6550,7 +6534,7 @@
             <a:fld id="{F89AEA99-3E91-4C58-9AD4-045DB5619AC3}" type="slidenum">
               <a:rPr lang="it-IT" smtClean="0"/>
               <a:pPr/>
-              <a:t>‹N›</a:t>
+              <a:t>‹#›</a:t>
             </a:fld>
             <a:endParaRPr lang="it-IT"/>
           </a:p>
@@ -6777,7 +6761,7 @@
             <a:fld id="{63CABBC0-75E4-43BB-A6A6-84C2A96BDB82}" type="datetimeFigureOut">
               <a:rPr lang="it-IT" smtClean="0"/>
               <a:pPr/>
-              <a:t>29/12/2012</a:t>
+              <a:t>30/12/2012</a:t>
             </a:fld>
             <a:endParaRPr lang="it-IT"/>
           </a:p>
@@ -6820,7 +6804,7 @@
             <a:fld id="{F89AEA99-3E91-4C58-9AD4-045DB5619AC3}" type="slidenum">
               <a:rPr lang="it-IT" smtClean="0"/>
               <a:pPr/>
-              <a:t>‹N›</a:t>
+              <a:t>‹#›</a:t>
             </a:fld>
             <a:endParaRPr lang="it-IT"/>
           </a:p>
@@ -7074,7 +7058,7 @@
             <a:fld id="{63CABBC0-75E4-43BB-A6A6-84C2A96BDB82}" type="datetimeFigureOut">
               <a:rPr lang="it-IT" smtClean="0"/>
               <a:pPr/>
-              <a:t>29/12/2012</a:t>
+              <a:t>30/12/2012</a:t>
             </a:fld>
             <a:endParaRPr lang="it-IT"/>
           </a:p>
@@ -7122,7 +7106,7 @@
             <a:fld id="{F89AEA99-3E91-4C58-9AD4-045DB5619AC3}" type="slidenum">
               <a:rPr lang="it-IT" smtClean="0"/>
               <a:pPr/>
-              <a:t>‹N›</a:t>
+              <a:t>‹#›</a:t>
             </a:fld>
             <a:endParaRPr lang="it-IT"/>
           </a:p>
@@ -7854,7 +7838,7 @@
             <a:fld id="{63CABBC0-75E4-43BB-A6A6-84C2A96BDB82}" type="datetimeFigureOut">
               <a:rPr lang="it-IT" smtClean="0"/>
               <a:pPr/>
-              <a:t>29/12/2012</a:t>
+              <a:t>30/12/2012</a:t>
             </a:fld>
             <a:endParaRPr lang="it-IT"/>
           </a:p>
@@ -7933,7 +7917,7 @@
             <a:fld id="{F89AEA99-3E91-4C58-9AD4-045DB5619AC3}" type="slidenum">
               <a:rPr lang="it-IT" smtClean="0"/>
               <a:pPr/>
-              <a:t>‹N›</a:t>
+              <a:t>‹#›</a:t>
             </a:fld>
             <a:endParaRPr lang="it-IT"/>
           </a:p>
@@ -8540,7 +8524,7 @@
           <a:blip r:embed="rId2">
             <a:extLst>
               <a:ext uri="{28A0092B-C50C-407E-A947-70E740481C1C}">
-                <a14:useLocalDpi xmlns:a14="http://schemas.microsoft.com/office/drawing/2010/main" val="0"/>
+                <a14:useLocalDpi xmlns="" xmlns:a14="http://schemas.microsoft.com/office/drawing/2010/main" val="0"/>
               </a:ext>
             </a:extLst>
           </a:blip>
@@ -8564,14 +8548,14 @@
           <a:effectLst/>
           <a:extLst>
             <a:ext uri="{909E8E84-426E-40DD-AFC4-6F175D3DCCD1}">
-              <a14:hiddenFill xmlns:a14="http://schemas.microsoft.com/office/drawing/2010/main">
+              <a14:hiddenFill xmlns="" xmlns:a14="http://schemas.microsoft.com/office/drawing/2010/main">
                 <a:solidFill>
                   <a:schemeClr val="accent1"/>
                 </a:solidFill>
               </a14:hiddenFill>
             </a:ext>
             <a:ext uri="{91240B29-F687-4F45-9708-019B960494DF}">
-              <a14:hiddenLine xmlns:a14="http://schemas.microsoft.com/office/drawing/2010/main" w="9525">
+              <a14:hiddenLine xmlns="" xmlns:a14="http://schemas.microsoft.com/office/drawing/2010/main" w="9525">
                 <a:solidFill>
                   <a:schemeClr val="tx1"/>
                 </a:solidFill>
@@ -8581,7 +8565,7 @@
               </a14:hiddenLine>
             </a:ext>
             <a:ext uri="{AF507438-7753-43E0-B8FC-AC1667EBCBE1}">
-              <a14:hiddenEffects xmlns:a14="http://schemas.microsoft.com/office/drawing/2010/main">
+              <a14:hiddenEffects xmlns="" xmlns:a14="http://schemas.microsoft.com/office/drawing/2010/main">
                 <a:effectLst>
                   <a:outerShdw dist="35921" dir="2700000" algn="ctr" rotWithShape="0">
                     <a:schemeClr val="bg2"/>
@@ -8601,7 +8585,7 @@
           <p:nvPr>
             <p:extLst>
               <p:ext uri="{D42A27DB-BD31-4B8C-83A1-F6EECF244321}">
-                <p14:modId xmlns:p14="http://schemas.microsoft.com/office/powerpoint/2010/main" val="669990601"/>
+                <p14:modId xmlns="" xmlns:p14="http://schemas.microsoft.com/office/powerpoint/2010/main" val="669990601"/>
               </p:ext>
             </p:extLst>
           </p:nvPr>
@@ -8778,14 +8762,14 @@
           <p:nvPr>
             <p:extLst>
               <p:ext uri="{D42A27DB-BD31-4B8C-83A1-F6EECF244321}">
-                <p14:modId xmlns:p14="http://schemas.microsoft.com/office/powerpoint/2010/main" val="1867475245"/>
+                <p14:modId xmlns="" xmlns:p14="http://schemas.microsoft.com/office/powerpoint/2010/main" val="1867475245"/>
               </p:ext>
             </p:extLst>
           </p:nvPr>
         </p:nvGraphicFramePr>
         <p:xfrm>
           <a:off x="7092280" y="5339206"/>
-          <a:ext cx="2051720" cy="1518794"/>
+          <a:ext cx="2051720" cy="1584960"/>
         </p:xfrm>
         <a:graphic>
           <a:graphicData uri="http://schemas.openxmlformats.org/drawingml/2006/table">
@@ -8909,7 +8893,7 @@
     </p:spTree>
     <p:extLst>
       <p:ext uri="{BB962C8B-B14F-4D97-AF65-F5344CB8AC3E}">
-        <p14:creationId xmlns:p14="http://schemas.microsoft.com/office/powerpoint/2010/main" val="4165334171"/>
+        <p14:creationId xmlns="" xmlns:p14="http://schemas.microsoft.com/office/powerpoint/2010/main" val="4165334171"/>
       </p:ext>
     </p:extLst>
   </p:cSld>
@@ -9205,18 +9189,18 @@
     </p:spTree>
     <p:extLst>
       <p:ext uri="{BB962C8B-B14F-4D97-AF65-F5344CB8AC3E}">
-        <p14:creationId xmlns:p14="http://schemas.microsoft.com/office/powerpoint/2010/main" val="155874689"/>
+        <p14:creationId xmlns="" xmlns:p14="http://schemas.microsoft.com/office/powerpoint/2010/main" val="155874689"/>
       </p:ext>
     </p:extLst>
   </p:cSld>
   <p:clrMapOvr>
     <a:masterClrMapping/>
   </p:clrMapOvr>
-  <mc:AlternateContent xmlns:mc="http://schemas.openxmlformats.org/markup-compatibility/2006" xmlns:p14="http://schemas.microsoft.com/office/powerpoint/2010/main">
-    <mc:Choice Requires="p14">
+  <mc:AlternateContent xmlns:mc="http://schemas.openxmlformats.org/markup-compatibility/2006">
+    <mc:Choice xmlns="" xmlns:p14="http://schemas.microsoft.com/office/powerpoint/2010/main" Requires="p14">
       <p:transition spd="slow" p14:dur="2000"/>
     </mc:Choice>
-    <mc:Fallback xmlns="">
+    <mc:Fallback>
       <p:transition spd="slow"/>
     </mc:Fallback>
   </mc:AlternateContent>
@@ -9719,18 +9703,18 @@
     </p:spTree>
     <p:extLst>
       <p:ext uri="{BB962C8B-B14F-4D97-AF65-F5344CB8AC3E}">
-        <p14:creationId xmlns:p14="http://schemas.microsoft.com/office/powerpoint/2010/main" val="155874689"/>
+        <p14:creationId xmlns="" xmlns:p14="http://schemas.microsoft.com/office/powerpoint/2010/main" val="155874689"/>
       </p:ext>
     </p:extLst>
   </p:cSld>
   <p:clrMapOvr>
     <a:masterClrMapping/>
   </p:clrMapOvr>
-  <mc:AlternateContent xmlns:mc="http://schemas.openxmlformats.org/markup-compatibility/2006" xmlns:p14="http://schemas.microsoft.com/office/powerpoint/2010/main">
-    <mc:Choice Requires="p14">
+  <mc:AlternateContent xmlns:mc="http://schemas.openxmlformats.org/markup-compatibility/2006">
+    <mc:Choice xmlns="" xmlns:p14="http://schemas.microsoft.com/office/powerpoint/2010/main" Requires="p14">
       <p:transition spd="slow" p14:dur="2000"/>
     </mc:Choice>
-    <mc:Fallback xmlns="">
+    <mc:Fallback>
       <p:transition spd="slow"/>
     </mc:Fallback>
   </mc:AlternateContent>
@@ -10224,18 +10208,18 @@
     </p:spTree>
     <p:extLst>
       <p:ext uri="{BB962C8B-B14F-4D97-AF65-F5344CB8AC3E}">
-        <p14:creationId xmlns:p14="http://schemas.microsoft.com/office/powerpoint/2010/main" val="155874689"/>
+        <p14:creationId xmlns="" xmlns:p14="http://schemas.microsoft.com/office/powerpoint/2010/main" val="155874689"/>
       </p:ext>
     </p:extLst>
   </p:cSld>
   <p:clrMapOvr>
     <a:masterClrMapping/>
   </p:clrMapOvr>
-  <mc:AlternateContent xmlns:mc="http://schemas.openxmlformats.org/markup-compatibility/2006" xmlns:p14="http://schemas.microsoft.com/office/powerpoint/2010/main">
-    <mc:Choice Requires="p14">
+  <mc:AlternateContent xmlns:mc="http://schemas.openxmlformats.org/markup-compatibility/2006">
+    <mc:Choice xmlns="" xmlns:p14="http://schemas.microsoft.com/office/powerpoint/2010/main" Requires="p14">
       <p:transition spd="slow" p14:dur="2000"/>
     </mc:Choice>
-    <mc:Fallback xmlns="">
+    <mc:Fallback>
       <p:transition spd="slow"/>
     </mc:Fallback>
   </mc:AlternateContent>
@@ -10551,13 +10535,7 @@
               <a:rPr lang="it-IT" sz="4800" b="1" dirty="0" smtClean="0">
                 <a:latin typeface="+mj-lt"/>
               </a:rPr>
-              <a:t>Gestione dei dati </a:t>
-            </a:r>
-            <a:r>
-              <a:rPr lang="it-IT" sz="4800" b="1" dirty="0" smtClean="0">
-                <a:latin typeface="+mj-lt"/>
-              </a:rPr>
-              <a:t>persistenti</a:t>
+              <a:t>Gestione dei dati persistenti</a:t>
             </a:r>
           </a:p>
           <a:p>
@@ -10568,9 +10546,6 @@
               </a:rPr>
               <a:t>ER Questionari</a:t>
             </a:r>
-            <a:endParaRPr lang="it-IT" sz="3600" b="1" dirty="0" smtClean="0">
-              <a:latin typeface="+mj-lt"/>
-            </a:endParaRPr>
           </a:p>
           <a:p>
             <a:pPr algn="ctr"/>
@@ -10741,13 +10716,7 @@
               <a:rPr lang="it-IT" sz="4800" b="1" dirty="0" smtClean="0">
                 <a:latin typeface="+mj-lt"/>
               </a:rPr>
-              <a:t>Pro\Contro </a:t>
-            </a:r>
-            <a:r>
-              <a:rPr lang="it-IT" sz="4800" b="1" dirty="0" smtClean="0">
-                <a:latin typeface="+mj-lt"/>
-              </a:rPr>
-              <a:t>SDD</a:t>
+              <a:t>Pro\Contro SDD</a:t>
             </a:r>
           </a:p>
           <a:p>
@@ -11178,6 +11147,13 @@
             </a:r>
           </a:p>
           <a:p>
+            <a:pPr lvl="2"/>
+            <a:r>
+              <a:rPr lang="it-IT" dirty="0" smtClean="0"/>
+              <a:t>Inconsistente in alcune parti</a:t>
+            </a:r>
+          </a:p>
+          <a:p>
             <a:pPr marL="667512" lvl="2" indent="0">
               <a:buNone/>
             </a:pPr>
@@ -11190,15 +11166,7 @@
                   <a:srgbClr val="00B050"/>
                 </a:solidFill>
               </a:rPr>
-              <a:t>Pro</a:t>
-            </a:r>
-            <a:r>
-              <a:rPr lang="it-IT" b="1" dirty="0" smtClean="0">
-                <a:solidFill>
-                  <a:srgbClr val="00B050"/>
-                </a:solidFill>
-              </a:rPr>
-              <a:t>:</a:t>
+              <a:t>Pro:</a:t>
             </a:r>
           </a:p>
           <a:p>
@@ -11241,6 +11209,32 @@
           </a:p>
         </p:txBody>
       </p:sp>
+      <p:pic>
+        <p:nvPicPr>
+          <p:cNvPr id="1026" name="Picture 2" descr="D:\Tony\Omini\omino_trivio.jpg"/>
+          <p:cNvPicPr>
+            <a:picLocks noChangeAspect="1" noChangeArrowheads="1"/>
+          </p:cNvPicPr>
+          <p:nvPr/>
+        </p:nvPicPr>
+        <p:blipFill>
+          <a:blip r:embed="rId4"/>
+          <a:srcRect/>
+          <a:stretch>
+            <a:fillRect/>
+          </a:stretch>
+        </p:blipFill>
+        <p:spPr bwMode="auto">
+          <a:xfrm>
+            <a:off x="7215206" y="1428736"/>
+            <a:ext cx="1524000" cy="1524000"/>
+          </a:xfrm>
+          <a:prstGeom prst="rect">
+            <a:avLst/>
+          </a:prstGeom>
+          <a:noFill/>
+        </p:spPr>
+      </p:pic>
     </p:spTree>
   </p:cSld>
   <p:clrMapOvr>
@@ -11884,33 +11878,15 @@
                                   </p:childTnLst>
                                 </p:cTn>
                               </p:par>
-                            </p:childTnLst>
-                          </p:cTn>
-                        </p:par>
-                      </p:childTnLst>
-                    </p:cTn>
-                  </p:par>
-                  <p:par>
-                    <p:cTn id="35" fill="hold">
-                      <p:stCondLst>
-                        <p:cond delay="indefinite"/>
-                      </p:stCondLst>
-                      <p:childTnLst>
-                        <p:par>
-                          <p:cTn id="36" fill="hold">
-                            <p:stCondLst>
-                              <p:cond delay="0"/>
-                            </p:stCondLst>
-                            <p:childTnLst>
                               <p:par>
-                                <p:cTn id="37" presetID="2" presetClass="entr" presetSubtype="4" fill="hold" grpId="0" nodeType="clickEffect">
+                                <p:cTn id="35" presetID="2" presetClass="entr" presetSubtype="4" fill="hold" grpId="0" nodeType="withEffect">
                                   <p:stCondLst>
                                     <p:cond delay="0"/>
                                   </p:stCondLst>
                                   <p:childTnLst>
                                     <p:set>
                                       <p:cBhvr>
-                                        <p:cTn id="38" dur="1" fill="hold">
+                                        <p:cTn id="36" dur="1" fill="hold">
                                           <p:stCondLst>
                                             <p:cond delay="0"/>
                                           </p:stCondLst>
@@ -11918,7 +11894,7 @@
                                         <p:tgtEl>
                                           <p:spTgt spid="5">
                                             <p:txEl>
-                                              <p:pRg st="7" end="7"/>
+                                              <p:pRg st="6" end="6"/>
                                             </p:txEl>
                                           </p:spTgt>
                                         </p:tgtEl>
@@ -11932,11 +11908,11 @@
                                     </p:set>
                                     <p:anim calcmode="lin" valueType="num">
                                       <p:cBhvr additive="base">
-                                        <p:cTn id="39" dur="500" fill="hold"/>
+                                        <p:cTn id="37" dur="500" fill="hold"/>
                                         <p:tgtEl>
                                           <p:spTgt spid="5">
                                             <p:txEl>
-                                              <p:pRg st="7" end="7"/>
+                                              <p:pRg st="6" end="6"/>
                                             </p:txEl>
                                           </p:spTgt>
                                         </p:tgtEl>
@@ -11959,11 +11935,149 @@
                                     </p:anim>
                                     <p:anim calcmode="lin" valueType="num">
                                       <p:cBhvr additive="base">
-                                        <p:cTn id="40" dur="500" fill="hold"/>
+                                        <p:cTn id="38" dur="500" fill="hold"/>
                                         <p:tgtEl>
                                           <p:spTgt spid="5">
                                             <p:txEl>
-                                              <p:pRg st="7" end="7"/>
+                                              <p:pRg st="6" end="6"/>
+                                            </p:txEl>
+                                          </p:spTgt>
+                                        </p:tgtEl>
+                                        <p:attrNameLst>
+                                          <p:attrName>ppt_y</p:attrName>
+                                        </p:attrNameLst>
+                                      </p:cBhvr>
+                                      <p:tavLst>
+                                        <p:tav tm="0">
+                                          <p:val>
+                                            <p:strVal val="1+#ppt_h/2"/>
+                                          </p:val>
+                                        </p:tav>
+                                        <p:tav tm="100000">
+                                          <p:val>
+                                            <p:strVal val="#ppt_y"/>
+                                          </p:val>
+                                        </p:tav>
+                                      </p:tavLst>
+                                    </p:anim>
+                                  </p:childTnLst>
+                                </p:cTn>
+                              </p:par>
+                              <p:par>
+                                <p:cTn id="39" presetID="22" presetClass="entr" presetSubtype="4" fill="hold" nodeType="withEffect">
+                                  <p:stCondLst>
+                                    <p:cond delay="0"/>
+                                  </p:stCondLst>
+                                  <p:childTnLst>
+                                    <p:set>
+                                      <p:cBhvr>
+                                        <p:cTn id="40" dur="1" fill="hold">
+                                          <p:stCondLst>
+                                            <p:cond delay="0"/>
+                                          </p:stCondLst>
+                                        </p:cTn>
+                                        <p:tgtEl>
+                                          <p:spTgt spid="1026"/>
+                                        </p:tgtEl>
+                                        <p:attrNameLst>
+                                          <p:attrName>style.visibility</p:attrName>
+                                        </p:attrNameLst>
+                                      </p:cBhvr>
+                                      <p:to>
+                                        <p:strVal val="visible"/>
+                                      </p:to>
+                                    </p:set>
+                                    <p:animEffect transition="in" filter="wipe(down)">
+                                      <p:cBhvr>
+                                        <p:cTn id="41" dur="500"/>
+                                        <p:tgtEl>
+                                          <p:spTgt spid="1026"/>
+                                        </p:tgtEl>
+                                      </p:cBhvr>
+                                    </p:animEffect>
+                                  </p:childTnLst>
+                                </p:cTn>
+                              </p:par>
+                            </p:childTnLst>
+                          </p:cTn>
+                        </p:par>
+                      </p:childTnLst>
+                    </p:cTn>
+                  </p:par>
+                  <p:par>
+                    <p:cTn id="42" fill="hold">
+                      <p:stCondLst>
+                        <p:cond delay="indefinite"/>
+                      </p:stCondLst>
+                      <p:childTnLst>
+                        <p:par>
+                          <p:cTn id="43" fill="hold">
+                            <p:stCondLst>
+                              <p:cond delay="0"/>
+                            </p:stCondLst>
+                            <p:childTnLst>
+                              <p:par>
+                                <p:cTn id="44" presetID="2" presetClass="entr" presetSubtype="4" fill="hold" grpId="0" nodeType="clickEffect">
+                                  <p:stCondLst>
+                                    <p:cond delay="0"/>
+                                  </p:stCondLst>
+                                  <p:childTnLst>
+                                    <p:set>
+                                      <p:cBhvr>
+                                        <p:cTn id="45" dur="1" fill="hold">
+                                          <p:stCondLst>
+                                            <p:cond delay="0"/>
+                                          </p:stCondLst>
+                                        </p:cTn>
+                                        <p:tgtEl>
+                                          <p:spTgt spid="5">
+                                            <p:txEl>
+                                              <p:pRg st="8" end="8"/>
+                                            </p:txEl>
+                                          </p:spTgt>
+                                        </p:tgtEl>
+                                        <p:attrNameLst>
+                                          <p:attrName>style.visibility</p:attrName>
+                                        </p:attrNameLst>
+                                      </p:cBhvr>
+                                      <p:to>
+                                        <p:strVal val="visible"/>
+                                      </p:to>
+                                    </p:set>
+                                    <p:anim calcmode="lin" valueType="num">
+                                      <p:cBhvr additive="base">
+                                        <p:cTn id="46" dur="500" fill="hold"/>
+                                        <p:tgtEl>
+                                          <p:spTgt spid="5">
+                                            <p:txEl>
+                                              <p:pRg st="8" end="8"/>
+                                            </p:txEl>
+                                          </p:spTgt>
+                                        </p:tgtEl>
+                                        <p:attrNameLst>
+                                          <p:attrName>ppt_x</p:attrName>
+                                        </p:attrNameLst>
+                                      </p:cBhvr>
+                                      <p:tavLst>
+                                        <p:tav tm="0">
+                                          <p:val>
+                                            <p:strVal val="#ppt_x"/>
+                                          </p:val>
+                                        </p:tav>
+                                        <p:tav tm="100000">
+                                          <p:val>
+                                            <p:strVal val="#ppt_x"/>
+                                          </p:val>
+                                        </p:tav>
+                                      </p:tavLst>
+                                    </p:anim>
+                                    <p:anim calcmode="lin" valueType="num">
+                                      <p:cBhvr additive="base">
+                                        <p:cTn id="47" dur="500" fill="hold"/>
+                                        <p:tgtEl>
+                                          <p:spTgt spid="5">
+                                            <p:txEl>
+                                              <p:pRg st="8" end="8"/>
                                             </p:txEl>
                                           </p:spTgt>
                                         </p:tgtEl>
@@ -11991,20 +12105,20 @@
                           </p:cTn>
                         </p:par>
                         <p:par>
-                          <p:cTn id="41" fill="hold">
+                          <p:cTn id="48" fill="hold">
                             <p:stCondLst>
                               <p:cond delay="500"/>
                             </p:stCondLst>
                             <p:childTnLst>
                               <p:par>
-                                <p:cTn id="42" presetID="22" presetClass="entr" presetSubtype="4" fill="hold" nodeType="afterEffect">
+                                <p:cTn id="49" presetID="22" presetClass="entr" presetSubtype="4" fill="hold" nodeType="afterEffect">
                                   <p:stCondLst>
                                     <p:cond delay="0"/>
                                   </p:stCondLst>
                                   <p:childTnLst>
                                     <p:set>
                                       <p:cBhvr>
-                                        <p:cTn id="43" dur="1" fill="hold">
+                                        <p:cTn id="50" dur="1" fill="hold">
                                           <p:stCondLst>
                                             <p:cond delay="0"/>
                                           </p:stCondLst>
@@ -12022,7 +12136,7 @@
                                     </p:set>
                                     <p:animEffect transition="in" filter="wipe(down)">
                                       <p:cBhvr>
-                                        <p:cTn id="44" dur="500"/>
+                                        <p:cTn id="51" dur="500"/>
                                         <p:tgtEl>
                                           <p:spTgt spid="4099"/>
                                         </p:tgtEl>
@@ -12035,20 +12149,20 @@
                           </p:cTn>
                         </p:par>
                         <p:par>
-                          <p:cTn id="45" fill="hold">
+                          <p:cTn id="52" fill="hold">
                             <p:stCondLst>
                               <p:cond delay="1000"/>
                             </p:stCondLst>
                             <p:childTnLst>
                               <p:par>
-                                <p:cTn id="46" presetID="22" presetClass="entr" presetSubtype="4" fill="hold" grpId="0" nodeType="afterEffect">
+                                <p:cTn id="53" presetID="22" presetClass="entr" presetSubtype="4" fill="hold" grpId="0" nodeType="afterEffect">
                                   <p:stCondLst>
                                     <p:cond delay="0"/>
                                   </p:stCondLst>
                                   <p:childTnLst>
                                     <p:set>
                                       <p:cBhvr>
-                                        <p:cTn id="47" dur="1" fill="hold">
+                                        <p:cTn id="54" dur="1" fill="hold">
                                           <p:stCondLst>
                                             <p:cond delay="0"/>
                                           </p:stCondLst>
@@ -12066,7 +12180,7 @@
                                     </p:set>
                                     <p:animEffect transition="in" filter="wipe(down)">
                                       <p:cBhvr>
-                                        <p:cTn id="48" dur="500"/>
+                                        <p:cTn id="55" dur="500"/>
                                         <p:tgtEl>
                                           <p:spTgt spid="8"/>
                                         </p:tgtEl>
@@ -12255,11 +12369,7 @@
             </a:pPr>
             <a:r>
               <a:rPr lang="it-IT" sz="2200" dirty="0" smtClean="0"/>
-              <a:t>Permettendo un’analisi oggettiva sulla qualità dei servizi </a:t>
-            </a:r>
-            <a:r>
-              <a:rPr lang="it-IT" sz="2200" dirty="0" smtClean="0"/>
-              <a:t>offerti</a:t>
+              <a:t>Permettendo un’analisi oggettiva sulla qualità dei servizi offerti</a:t>
             </a:r>
             <a:endParaRPr lang="it-IT" sz="2200" dirty="0"/>
           </a:p>
@@ -12280,7 +12390,7 @@
           <a:blip r:embed="rId3">
             <a:extLst>
               <a:ext uri="{28A0092B-C50C-407E-A947-70E740481C1C}">
-                <a14:useLocalDpi xmlns:a14="http://schemas.microsoft.com/office/drawing/2010/main" val="0"/>
+                <a14:useLocalDpi xmlns="" xmlns:a14="http://schemas.microsoft.com/office/drawing/2010/main" val="0"/>
               </a:ext>
             </a:extLst>
           </a:blip>
@@ -12300,7 +12410,7 @@
           <a:noFill/>
           <a:extLst>
             <a:ext uri="{909E8E84-426E-40DD-AFC4-6F175D3DCCD1}">
-              <a14:hiddenFill xmlns:a14="http://schemas.microsoft.com/office/drawing/2010/main">
+              <a14:hiddenFill xmlns="" xmlns:a14="http://schemas.microsoft.com/office/drawing/2010/main">
                 <a:solidFill>
                   <a:srgbClr val="FFFFFF"/>
                 </a:solidFill>
@@ -12321,7 +12431,7 @@
           <a:blip r:embed="rId4">
             <a:extLst>
               <a:ext uri="{28A0092B-C50C-407E-A947-70E740481C1C}">
-                <a14:useLocalDpi xmlns:a14="http://schemas.microsoft.com/office/drawing/2010/main" val="0"/>
+                <a14:useLocalDpi xmlns="" xmlns:a14="http://schemas.microsoft.com/office/drawing/2010/main" val="0"/>
               </a:ext>
             </a:extLst>
           </a:blip>
@@ -12341,7 +12451,7 @@
           <a:noFill/>
           <a:extLst>
             <a:ext uri="{909E8E84-426E-40DD-AFC4-6F175D3DCCD1}">
-              <a14:hiddenFill xmlns:a14="http://schemas.microsoft.com/office/drawing/2010/main">
+              <a14:hiddenFill xmlns="" xmlns:a14="http://schemas.microsoft.com/office/drawing/2010/main">
                 <a:solidFill>
                   <a:srgbClr val="FFFFFF"/>
                 </a:solidFill>
@@ -12387,7 +12497,7 @@
     </p:spTree>
     <p:extLst>
       <p:ext uri="{BB962C8B-B14F-4D97-AF65-F5344CB8AC3E}">
-        <p14:creationId xmlns:p14="http://schemas.microsoft.com/office/powerpoint/2010/main" val="1277526579"/>
+        <p14:creationId xmlns="" xmlns:p14="http://schemas.microsoft.com/office/powerpoint/2010/main" val="1277526579"/>
       </p:ext>
     </p:extLst>
   </p:cSld>
@@ -12695,7 +12805,7 @@
               <a:buChar char="v"/>
             </a:pPr>
             <a:r>
-              <a:rPr lang="it-IT" sz="2400" dirty="0" smtClean="0"/>
+              <a:rPr lang="it-IT" sz="2400" b="1" dirty="0" smtClean="0"/>
               <a:t>Garantendo</a:t>
             </a:r>
             <a:r>
@@ -12717,7 +12827,7 @@
           <a:blip r:embed="rId3">
             <a:extLst>
               <a:ext uri="{28A0092B-C50C-407E-A947-70E740481C1C}">
-                <a14:useLocalDpi xmlns:a14="http://schemas.microsoft.com/office/drawing/2010/main" val="0"/>
+                <a14:useLocalDpi xmlns="" xmlns:a14="http://schemas.microsoft.com/office/drawing/2010/main" val="0"/>
               </a:ext>
             </a:extLst>
           </a:blip>
@@ -12737,7 +12847,7 @@
           <a:noFill/>
           <a:extLst>
             <a:ext uri="{909E8E84-426E-40DD-AFC4-6F175D3DCCD1}">
-              <a14:hiddenFill xmlns:a14="http://schemas.microsoft.com/office/drawing/2010/main">
+              <a14:hiddenFill xmlns="" xmlns:a14="http://schemas.microsoft.com/office/drawing/2010/main">
                 <a:solidFill>
                   <a:srgbClr val="FFFFFF"/>
                 </a:solidFill>
@@ -12758,7 +12868,7 @@
           <a:blip r:embed="rId4" cstate="print">
             <a:extLst>
               <a:ext uri="{28A0092B-C50C-407E-A947-70E740481C1C}">
-                <a14:useLocalDpi xmlns:a14="http://schemas.microsoft.com/office/drawing/2010/main" val="0"/>
+                <a14:useLocalDpi xmlns="" xmlns:a14="http://schemas.microsoft.com/office/drawing/2010/main" val="0"/>
               </a:ext>
             </a:extLst>
           </a:blip>
@@ -12778,7 +12888,7 @@
           <a:noFill/>
           <a:extLst>
             <a:ext uri="{909E8E84-426E-40DD-AFC4-6F175D3DCCD1}">
-              <a14:hiddenFill xmlns:a14="http://schemas.microsoft.com/office/drawing/2010/main">
+              <a14:hiddenFill xmlns="" xmlns:a14="http://schemas.microsoft.com/office/drawing/2010/main">
                 <a:solidFill>
                   <a:srgbClr val="FFFFFF"/>
                 </a:solidFill>
@@ -12799,7 +12909,7 @@
           <a:blip r:embed="rId5">
             <a:extLst>
               <a:ext uri="{28A0092B-C50C-407E-A947-70E740481C1C}">
-                <a14:useLocalDpi xmlns:a14="http://schemas.microsoft.com/office/drawing/2010/main" val="0"/>
+                <a14:useLocalDpi xmlns="" xmlns:a14="http://schemas.microsoft.com/office/drawing/2010/main" val="0"/>
               </a:ext>
             </a:extLst>
           </a:blip>
@@ -12819,7 +12929,7 @@
           <a:noFill/>
           <a:extLst>
             <a:ext uri="{909E8E84-426E-40DD-AFC4-6F175D3DCCD1}">
-              <a14:hiddenFill xmlns:a14="http://schemas.microsoft.com/office/drawing/2010/main">
+              <a14:hiddenFill xmlns="" xmlns:a14="http://schemas.microsoft.com/office/drawing/2010/main">
                 <a:solidFill>
                   <a:srgbClr val="FFFFFF"/>
                 </a:solidFill>
@@ -12851,10 +12961,10 @@
           <a:lstStyle/>
           <a:p>
             <a:r>
-              <a:rPr lang="it-IT" sz="2200" dirty="0" smtClean="0"/>
+              <a:rPr lang="it-IT" sz="2200" i="1" dirty="0" smtClean="0"/>
               <a:t>Sicurezza</a:t>
             </a:r>
-            <a:endParaRPr lang="it-IT" sz="2200" dirty="0"/>
+            <a:endParaRPr lang="it-IT" sz="2200" i="1" dirty="0"/>
           </a:p>
         </p:txBody>
       </p:sp>
@@ -12867,7 +12977,7 @@
         <p:spPr>
           <a:xfrm>
             <a:off x="2000232" y="3000372"/>
-            <a:ext cx="1176669" cy="430887"/>
+            <a:ext cx="1190711" cy="430887"/>
           </a:xfrm>
           <a:prstGeom prst="rect">
             <a:avLst/>
@@ -12881,10 +12991,10 @@
           <a:lstStyle/>
           <a:p>
             <a:r>
-              <a:rPr lang="it-IT" sz="2200" dirty="0" smtClean="0"/>
+              <a:rPr lang="it-IT" sz="2200" i="1" dirty="0" smtClean="0"/>
               <a:t>Usabilità</a:t>
             </a:r>
-            <a:endParaRPr lang="it-IT" sz="2200" dirty="0"/>
+            <a:endParaRPr lang="it-IT" sz="2200" i="1" dirty="0"/>
           </a:p>
         </p:txBody>
       </p:sp>
@@ -12911,17 +13021,17 @@
           <a:lstStyle/>
           <a:p>
             <a:r>
-              <a:rPr lang="it-IT" sz="2200" dirty="0" smtClean="0"/>
+              <a:rPr lang="it-IT" sz="2200" i="1" dirty="0" smtClean="0"/>
               <a:t>Performance</a:t>
             </a:r>
-            <a:endParaRPr lang="it-IT" sz="2200" dirty="0"/>
+            <a:endParaRPr lang="it-IT" sz="2200" i="1" dirty="0"/>
           </a:p>
         </p:txBody>
       </p:sp>
     </p:spTree>
     <p:extLst>
       <p:ext uri="{BB962C8B-B14F-4D97-AF65-F5344CB8AC3E}">
-        <p14:creationId xmlns:p14="http://schemas.microsoft.com/office/powerpoint/2010/main" val="418107373"/>
+        <p14:creationId xmlns="" xmlns:p14="http://schemas.microsoft.com/office/powerpoint/2010/main" val="418107373"/>
       </p:ext>
     </p:extLst>
   </p:cSld>
@@ -13015,7 +13125,7 @@
                                           </p:stCondLst>
                                         </p:cTn>
                                         <p:tgtEl>
-                                          <p:spTgt spid="7"/>
+                                          <p:spTgt spid="8"/>
                                         </p:tgtEl>
                                         <p:attrNameLst>
                                           <p:attrName>style.visibility</p:attrName>
@@ -13029,7 +13139,7 @@
                                       <p:cBhvr>
                                         <p:cTn id="12" dur="500"/>
                                         <p:tgtEl>
-                                          <p:spTgt spid="7"/>
+                                          <p:spTgt spid="8"/>
                                         </p:tgtEl>
                                       </p:cBhvr>
                                     </p:animEffect>
@@ -13050,7 +13160,7 @@
                                           </p:stCondLst>
                                         </p:cTn>
                                         <p:tgtEl>
-                                          <p:spTgt spid="4"/>
+                                          <p:spTgt spid="5"/>
                                         </p:tgtEl>
                                         <p:attrNameLst>
                                           <p:attrName>style.visibility</p:attrName>
@@ -13064,7 +13174,7 @@
                                       <p:cBhvr>
                                         <p:cTn id="15" dur="500"/>
                                         <p:tgtEl>
-                                          <p:spTgt spid="4"/>
+                                          <p:spTgt spid="5"/>
                                         </p:tgtEl>
                                       </p:cBhvr>
                                     </p:animEffect>
@@ -13103,7 +13213,7 @@
                                           </p:stCondLst>
                                         </p:cTn>
                                         <p:tgtEl>
-                                          <p:spTgt spid="8"/>
+                                          <p:spTgt spid="7"/>
                                         </p:tgtEl>
                                         <p:attrNameLst>
                                           <p:attrName>style.visibility</p:attrName>
@@ -13117,7 +13227,7 @@
                                       <p:cBhvr>
                                         <p:cTn id="20" dur="500"/>
                                         <p:tgtEl>
-                                          <p:spTgt spid="8"/>
+                                          <p:spTgt spid="7"/>
                                         </p:tgtEl>
                                       </p:cBhvr>
                                     </p:animEffect>
@@ -13138,7 +13248,7 @@
                                           </p:stCondLst>
                                         </p:cTn>
                                         <p:tgtEl>
-                                          <p:spTgt spid="5"/>
+                                          <p:spTgt spid="4"/>
                                         </p:tgtEl>
                                         <p:attrNameLst>
                                           <p:attrName>style.visibility</p:attrName>
@@ -13152,7 +13262,7 @@
                                       <p:cBhvr>
                                         <p:cTn id="23" dur="500"/>
                                         <p:tgtEl>
-                                          <p:spTgt spid="5"/>
+                                          <p:spTgt spid="4"/>
                                         </p:tgtEl>
                                       </p:cBhvr>
                                     </p:animEffect>
@@ -13560,7 +13670,7 @@
           <a:blip r:embed="rId3">
             <a:extLst>
               <a:ext uri="{28A0092B-C50C-407E-A947-70E740481C1C}">
-                <a14:useLocalDpi xmlns:a14="http://schemas.microsoft.com/office/drawing/2010/main" val="0"/>
+                <a14:useLocalDpi xmlns="" xmlns:a14="http://schemas.microsoft.com/office/drawing/2010/main" val="0"/>
               </a:ext>
             </a:extLst>
           </a:blip>
@@ -13580,7 +13690,7 @@
           <a:noFill/>
           <a:extLst>
             <a:ext uri="{909E8E84-426E-40DD-AFC4-6F175D3DCCD1}">
-              <a14:hiddenFill xmlns:a14="http://schemas.microsoft.com/office/drawing/2010/main">
+              <a14:hiddenFill xmlns="" xmlns:a14="http://schemas.microsoft.com/office/drawing/2010/main">
                 <a:solidFill>
                   <a:srgbClr val="FFFFFF"/>
                 </a:solidFill>
@@ -13601,7 +13711,7 @@
           <a:blip r:embed="rId4">
             <a:extLst>
               <a:ext uri="{28A0092B-C50C-407E-A947-70E740481C1C}">
-                <a14:useLocalDpi xmlns:a14="http://schemas.microsoft.com/office/drawing/2010/main" val="0"/>
+                <a14:useLocalDpi xmlns="" xmlns:a14="http://schemas.microsoft.com/office/drawing/2010/main" val="0"/>
               </a:ext>
             </a:extLst>
           </a:blip>
@@ -13621,7 +13731,7 @@
           <a:noFill/>
           <a:extLst>
             <a:ext uri="{909E8E84-426E-40DD-AFC4-6F175D3DCCD1}">
-              <a14:hiddenFill xmlns:a14="http://schemas.microsoft.com/office/drawing/2010/main">
+              <a14:hiddenFill xmlns="" xmlns:a14="http://schemas.microsoft.com/office/drawing/2010/main">
                 <a:solidFill>
                   <a:srgbClr val="FFFFFF"/>
                 </a:solidFill>
@@ -13869,18 +13979,18 @@
     </p:spTree>
     <p:extLst>
       <p:ext uri="{BB962C8B-B14F-4D97-AF65-F5344CB8AC3E}">
-        <p14:creationId xmlns:p14="http://schemas.microsoft.com/office/powerpoint/2010/main" val="2879521852"/>
+        <p14:creationId xmlns="" xmlns:p14="http://schemas.microsoft.com/office/powerpoint/2010/main" val="2879521852"/>
       </p:ext>
     </p:extLst>
   </p:cSld>
   <p:clrMapOvr>
     <a:masterClrMapping/>
   </p:clrMapOvr>
-  <mc:AlternateContent xmlns:mc="http://schemas.openxmlformats.org/markup-compatibility/2006" xmlns:p14="http://schemas.microsoft.com/office/powerpoint/2010/main">
-    <mc:Choice Requires="p14">
+  <mc:AlternateContent xmlns:mc="http://schemas.openxmlformats.org/markup-compatibility/2006">
+    <mc:Choice xmlns="" xmlns:p14="http://schemas.microsoft.com/office/powerpoint/2010/main" Requires="p14">
       <p:transition spd="slow" p14:dur="2000"/>
     </mc:Choice>
-    <mc:Fallback xmlns="">
+    <mc:Fallback>
       <p:transition spd="slow"/>
     </mc:Fallback>
   </mc:AlternateContent>
@@ -14236,7 +14346,7 @@
           <a:blip r:embed="rId3">
             <a:extLst>
               <a:ext uri="{28A0092B-C50C-407E-A947-70E740481C1C}">
-                <a14:useLocalDpi xmlns:a14="http://schemas.microsoft.com/office/drawing/2010/main" val="0"/>
+                <a14:useLocalDpi xmlns="" xmlns:a14="http://schemas.microsoft.com/office/drawing/2010/main" val="0"/>
               </a:ext>
             </a:extLst>
           </a:blip>
@@ -14256,7 +14366,7 @@
           <a:noFill/>
           <a:extLst>
             <a:ext uri="{909E8E84-426E-40DD-AFC4-6F175D3DCCD1}">
-              <a14:hiddenFill xmlns:a14="http://schemas.microsoft.com/office/drawing/2010/main">
+              <a14:hiddenFill xmlns="" xmlns:a14="http://schemas.microsoft.com/office/drawing/2010/main">
                 <a:solidFill>
                   <a:srgbClr val="FFFFFF"/>
                 </a:solidFill>
@@ -14265,22 +14375,300 @@
           </a:extLst>
         </p:spPr>
       </p:pic>
+      <p:sp>
+        <p:nvSpPr>
+          <p:cNvPr id="5" name="CasellaDiTesto 4"/>
+          <p:cNvSpPr txBox="1"/>
+          <p:nvPr/>
+        </p:nvSpPr>
+        <p:spPr>
+          <a:xfrm>
+            <a:off x="1736131" y="-10060"/>
+            <a:ext cx="5720477" cy="1261884"/>
+          </a:xfrm>
+          <a:prstGeom prst="rect">
+            <a:avLst/>
+          </a:prstGeom>
+          <a:noFill/>
+        </p:spPr>
+        <p:txBody>
+          <a:bodyPr wrap="none" rtlCol="0">
+            <a:spAutoFit/>
+          </a:bodyPr>
+          <a:lstStyle/>
+          <a:p>
+            <a:pPr algn="ctr"/>
+            <a:r>
+              <a:rPr lang="it-IT" sz="4800" b="1" dirty="0" smtClean="0">
+                <a:latin typeface="+mj-lt"/>
+              </a:rPr>
+              <a:t>Obiettivi di design</a:t>
+            </a:r>
+          </a:p>
+          <a:p>
+            <a:pPr algn="ctr"/>
+            <a:r>
+              <a:rPr lang="it-IT" sz="2800" b="1" dirty="0" smtClean="0">
+                <a:latin typeface="+mj-lt"/>
+              </a:rPr>
+              <a:t>Funzionalità Questionario, Trade </a:t>
+            </a:r>
+            <a:r>
+              <a:rPr lang="it-IT" sz="2800" b="1" dirty="0" err="1" smtClean="0">
+                <a:latin typeface="+mj-lt"/>
+              </a:rPr>
+              <a:t>Offs</a:t>
+            </a:r>
+            <a:endParaRPr lang="it-IT" b="1" dirty="0"/>
+          </a:p>
+        </p:txBody>
+      </p:sp>
+      <p:sp>
+        <p:nvSpPr>
+          <p:cNvPr id="2" name="Rettangolo 1"/>
+          <p:cNvSpPr/>
+          <p:nvPr/>
+        </p:nvSpPr>
+        <p:spPr>
+          <a:xfrm>
+            <a:off x="7446477" y="3632192"/>
+            <a:ext cx="744114" cy="523220"/>
+          </a:xfrm>
+          <a:prstGeom prst="rect">
+            <a:avLst/>
+          </a:prstGeom>
+        </p:spPr>
+        <p:txBody>
+          <a:bodyPr wrap="none">
+            <a:spAutoFit/>
+          </a:bodyPr>
+          <a:lstStyle/>
+          <a:p>
+            <a:r>
+              <a:rPr lang="it-IT" sz="2800" b="1" i="1" dirty="0" err="1" smtClean="0">
+                <a:solidFill>
+                  <a:srgbClr val="B48900"/>
+                </a:solidFill>
+              </a:rPr>
+              <a:t>Buy</a:t>
+            </a:r>
+            <a:endParaRPr lang="en-US" sz="2800" b="1" dirty="0">
+              <a:solidFill>
+                <a:srgbClr val="B48900"/>
+              </a:solidFill>
+            </a:endParaRPr>
+          </a:p>
+        </p:txBody>
+      </p:sp>
+      <p:sp>
+        <p:nvSpPr>
+          <p:cNvPr id="11" name="Content Placeholder 3"/>
+          <p:cNvSpPr txBox="1">
+            <a:spLocks/>
+          </p:cNvSpPr>
+          <p:nvPr/>
+        </p:nvSpPr>
+        <p:spPr>
+          <a:xfrm>
+            <a:off x="3846372" y="2920866"/>
+            <a:ext cx="1550546" cy="492656"/>
+          </a:xfrm>
+          <a:prstGeom prst="rect">
+            <a:avLst/>
+          </a:prstGeom>
+        </p:spPr>
+        <p:txBody>
+          <a:bodyPr tIns="0"/>
+          <a:lstStyle>
+            <a:lvl1pPr marL="274320" indent="-274320" algn="l" rtl="0" eaLnBrk="1" latinLnBrk="0" hangingPunct="1">
+              <a:spcBef>
+                <a:spcPct val="20000"/>
+              </a:spcBef>
+              <a:buClrTx/>
+              <a:buSzPct val="95000"/>
+              <a:buFont typeface="Wingdings" pitchFamily="2" charset="2"/>
+              <a:buChar char="v"/>
+              <a:defRPr kumimoji="0" sz="2800" kern="1200">
+                <a:solidFill>
+                  <a:schemeClr val="tx1"/>
+                </a:solidFill>
+                <a:latin typeface="+mn-lt"/>
+                <a:ea typeface="+mn-ea"/>
+                <a:cs typeface="+mn-cs"/>
+              </a:defRPr>
+            </a:lvl1pPr>
+            <a:lvl2pPr marL="640080" indent="-246888" algn="l" rtl="0" eaLnBrk="1" latinLnBrk="0" hangingPunct="1">
+              <a:spcBef>
+                <a:spcPct val="20000"/>
+              </a:spcBef>
+              <a:buClrTx/>
+              <a:buSzPct val="85000"/>
+              <a:buFont typeface="Courier New" pitchFamily="49" charset="0"/>
+              <a:buChar char="o"/>
+              <a:defRPr kumimoji="0" sz="2600" kern="1200">
+                <a:solidFill>
+                  <a:schemeClr val="tx1"/>
+                </a:solidFill>
+                <a:latin typeface="+mn-lt"/>
+                <a:ea typeface="+mn-ea"/>
+                <a:cs typeface="+mn-cs"/>
+              </a:defRPr>
+            </a:lvl2pPr>
+            <a:lvl3pPr marL="914400" indent="-246888" algn="l" rtl="0" eaLnBrk="1" latinLnBrk="0" hangingPunct="1">
+              <a:spcBef>
+                <a:spcPct val="20000"/>
+              </a:spcBef>
+              <a:buClrTx/>
+              <a:buSzPct val="70000"/>
+              <a:buFont typeface="Wingdings 2"/>
+              <a:buChar char=""/>
+              <a:defRPr kumimoji="0" sz="2400" kern="1200">
+                <a:solidFill>
+                  <a:schemeClr val="tx1"/>
+                </a:solidFill>
+                <a:latin typeface="+mn-lt"/>
+                <a:ea typeface="+mn-ea"/>
+                <a:cs typeface="+mn-cs"/>
+              </a:defRPr>
+            </a:lvl3pPr>
+            <a:lvl4pPr marL="1188720" indent="-210312" algn="l" rtl="0" eaLnBrk="1" latinLnBrk="0" hangingPunct="1">
+              <a:spcBef>
+                <a:spcPct val="20000"/>
+              </a:spcBef>
+              <a:buClrTx/>
+              <a:buSzPct val="65000"/>
+              <a:buFont typeface="Wingdings 2"/>
+              <a:buChar char=""/>
+              <a:defRPr kumimoji="0" sz="2000" kern="1200">
+                <a:solidFill>
+                  <a:schemeClr val="tx1"/>
+                </a:solidFill>
+                <a:latin typeface="+mn-lt"/>
+                <a:ea typeface="+mn-ea"/>
+                <a:cs typeface="+mn-cs"/>
+              </a:defRPr>
+            </a:lvl4pPr>
+            <a:lvl5pPr marL="1463040" indent="-210312" algn="l" rtl="0" eaLnBrk="1" latinLnBrk="0" hangingPunct="1">
+              <a:spcBef>
+                <a:spcPct val="20000"/>
+              </a:spcBef>
+              <a:buClrTx/>
+              <a:buSzPct val="65000"/>
+              <a:buFont typeface="Wingdings 2"/>
+              <a:buChar char=""/>
+              <a:defRPr kumimoji="0" sz="1800" kern="1200">
+                <a:solidFill>
+                  <a:schemeClr val="tx1"/>
+                </a:solidFill>
+                <a:latin typeface="+mn-lt"/>
+                <a:ea typeface="+mn-ea"/>
+                <a:cs typeface="+mn-cs"/>
+              </a:defRPr>
+            </a:lvl5pPr>
+            <a:lvl6pPr marL="1737360" indent="-210312" algn="l" rtl="0" eaLnBrk="1" latinLnBrk="0" hangingPunct="1">
+              <a:spcBef>
+                <a:spcPct val="20000"/>
+              </a:spcBef>
+              <a:buClr>
+                <a:schemeClr val="accent5"/>
+              </a:buClr>
+              <a:buSzPct val="80000"/>
+              <a:buFont typeface="Wingdings 2"/>
+              <a:buChar char=""/>
+              <a:defRPr kumimoji="0" sz="1800" kern="1200">
+                <a:solidFill>
+                  <a:schemeClr val="tx1"/>
+                </a:solidFill>
+                <a:latin typeface="+mn-lt"/>
+                <a:ea typeface="+mn-ea"/>
+                <a:cs typeface="+mn-cs"/>
+              </a:defRPr>
+            </a:lvl6pPr>
+            <a:lvl7pPr marL="1920240" indent="-182880" algn="l" rtl="0" eaLnBrk="1" latinLnBrk="0" hangingPunct="1">
+              <a:spcBef>
+                <a:spcPct val="20000"/>
+              </a:spcBef>
+              <a:buClr>
+                <a:schemeClr val="accent6"/>
+              </a:buClr>
+              <a:buSzPct val="80000"/>
+              <a:buFont typeface="Wingdings 2"/>
+              <a:buChar char=""/>
+              <a:defRPr kumimoji="0" sz="1600" kern="1200" baseline="0">
+                <a:solidFill>
+                  <a:schemeClr val="tx1"/>
+                </a:solidFill>
+                <a:latin typeface="+mn-lt"/>
+                <a:ea typeface="+mn-ea"/>
+                <a:cs typeface="+mn-cs"/>
+              </a:defRPr>
+            </a:lvl7pPr>
+            <a:lvl8pPr marL="2194560" indent="-182880" algn="l" rtl="0" eaLnBrk="1" latinLnBrk="0" hangingPunct="1">
+              <a:spcBef>
+                <a:spcPct val="20000"/>
+              </a:spcBef>
+              <a:buClr>
+                <a:schemeClr val="tx2"/>
+              </a:buClr>
+              <a:buChar char="•"/>
+              <a:defRPr kumimoji="0" sz="1600" kern="1200">
+                <a:solidFill>
+                  <a:schemeClr val="tx1"/>
+                </a:solidFill>
+                <a:latin typeface="+mn-lt"/>
+                <a:ea typeface="+mn-ea"/>
+                <a:cs typeface="+mn-cs"/>
+              </a:defRPr>
+            </a:lvl8pPr>
+            <a:lvl9pPr marL="2468880" indent="-182880" algn="l" rtl="0" eaLnBrk="1" latinLnBrk="0" hangingPunct="1">
+              <a:spcBef>
+                <a:spcPct val="20000"/>
+              </a:spcBef>
+              <a:buClr>
+                <a:schemeClr val="tx2"/>
+              </a:buClr>
+              <a:buFontTx/>
+              <a:buChar char="•"/>
+              <a:defRPr kumimoji="0" sz="1400" kern="1200" baseline="0">
+                <a:solidFill>
+                  <a:schemeClr val="tx1"/>
+                </a:solidFill>
+                <a:latin typeface="+mn-lt"/>
+                <a:ea typeface="+mn-ea"/>
+                <a:cs typeface="+mn-cs"/>
+              </a:defRPr>
+            </a:lvl9pPr>
+          </a:lstStyle>
+          <a:p>
+            <a:pPr marL="0" indent="0">
+              <a:buNone/>
+            </a:pPr>
+            <a:r>
+              <a:rPr lang="it-IT" sz="3600" b="1" i="1" dirty="0" smtClean="0">
+                <a:solidFill>
+                  <a:srgbClr val="FF0000"/>
+                </a:solidFill>
+              </a:rPr>
+              <a:t>VS</a:t>
+            </a:r>
+            <a:endParaRPr lang="en-US" sz="3600" b="1" dirty="0">
+              <a:solidFill>
+                <a:srgbClr val="FF0000"/>
+              </a:solidFill>
+            </a:endParaRPr>
+          </a:p>
+        </p:txBody>
+      </p:sp>
       <p:pic>
         <p:nvPicPr>
-          <p:cNvPr id="3074" name="Picture 2" descr="C:\linda\uni\esami_da_svolgere\gps\progetto_gps\Atsilo\Presentazione\Atsilo3\9669552-3d-lavoratore-uomo-isolato-su-sfondo-bianco.jpg"/>
+          <p:cNvPr id="2050" name="Picture 2" descr="D:\Tony\Omini\omino_tool.jpg"/>
           <p:cNvPicPr>
             <a:picLocks noChangeAspect="1" noChangeArrowheads="1"/>
           </p:cNvPicPr>
           <p:nvPr/>
         </p:nvPicPr>
         <p:blipFill>
-          <a:blip r:embed="rId4">
-            <a:extLst>
-              <a:ext uri="{28A0092B-C50C-407E-A947-70E740481C1C}">
-                <a14:useLocalDpi xmlns:a14="http://schemas.microsoft.com/office/drawing/2010/main" val="0"/>
-              </a:ext>
-            </a:extLst>
-          </a:blip>
+          <a:blip r:embed="rId4"/>
           <a:srcRect/>
           <a:stretch>
             <a:fillRect/>
@@ -14288,22 +14676,13 @@
         </p:blipFill>
         <p:spPr bwMode="auto">
           <a:xfrm>
-            <a:off x="1547664" y="1961678"/>
-            <a:ext cx="2411032" cy="2411032"/>
+            <a:off x="1500166" y="2357430"/>
+            <a:ext cx="2143125" cy="2143125"/>
           </a:xfrm>
           <a:prstGeom prst="rect">
             <a:avLst/>
           </a:prstGeom>
           <a:noFill/>
-          <a:extLst>
-            <a:ext uri="{909E8E84-426E-40DD-AFC4-6F175D3DCCD1}">
-              <a14:hiddenFill xmlns:a14="http://schemas.microsoft.com/office/drawing/2010/main">
-                <a:solidFill>
-                  <a:srgbClr val="FFFFFF"/>
-                </a:solidFill>
-              </a14:hiddenFill>
-            </a:ext>
-          </a:extLst>
         </p:spPr>
       </p:pic>
       <p:sp>
@@ -14505,305 +14884,21 @@
           </a:p>
         </p:txBody>
       </p:sp>
-      <p:sp>
-        <p:nvSpPr>
-          <p:cNvPr id="5" name="CasellaDiTesto 4"/>
-          <p:cNvSpPr txBox="1"/>
-          <p:nvPr/>
-        </p:nvSpPr>
-        <p:spPr>
-          <a:xfrm>
-            <a:off x="1736131" y="-10060"/>
-            <a:ext cx="5720477" cy="1261884"/>
-          </a:xfrm>
-          <a:prstGeom prst="rect">
-            <a:avLst/>
-          </a:prstGeom>
-          <a:noFill/>
-        </p:spPr>
-        <p:txBody>
-          <a:bodyPr wrap="none" rtlCol="0">
-            <a:spAutoFit/>
-          </a:bodyPr>
-          <a:lstStyle/>
-          <a:p>
-            <a:pPr algn="ctr"/>
-            <a:r>
-              <a:rPr lang="it-IT" sz="4800" b="1" dirty="0" smtClean="0">
-                <a:latin typeface="+mj-lt"/>
-              </a:rPr>
-              <a:t>Obiettivi di design</a:t>
-            </a:r>
-          </a:p>
-          <a:p>
-            <a:pPr algn="ctr"/>
-            <a:r>
-              <a:rPr lang="it-IT" sz="2800" b="1" dirty="0" smtClean="0">
-                <a:latin typeface="+mj-lt"/>
-              </a:rPr>
-              <a:t>Funzionalità Questionario, Trade </a:t>
-            </a:r>
-            <a:r>
-              <a:rPr lang="it-IT" sz="2800" b="1" dirty="0" err="1" smtClean="0">
-                <a:latin typeface="+mj-lt"/>
-              </a:rPr>
-              <a:t>Offs</a:t>
-            </a:r>
-            <a:endParaRPr lang="it-IT" b="1" dirty="0"/>
-          </a:p>
-        </p:txBody>
-      </p:sp>
-      <p:sp>
-        <p:nvSpPr>
-          <p:cNvPr id="2" name="Rettangolo 1"/>
-          <p:cNvSpPr/>
-          <p:nvPr/>
-        </p:nvSpPr>
-        <p:spPr>
-          <a:xfrm>
-            <a:off x="7446477" y="3632192"/>
-            <a:ext cx="744114" cy="523220"/>
-          </a:xfrm>
-          <a:prstGeom prst="rect">
-            <a:avLst/>
-          </a:prstGeom>
-        </p:spPr>
-        <p:txBody>
-          <a:bodyPr wrap="none">
-            <a:spAutoFit/>
-          </a:bodyPr>
-          <a:lstStyle/>
-          <a:p>
-            <a:r>
-              <a:rPr lang="it-IT" sz="2800" b="1" i="1" dirty="0" err="1" smtClean="0">
-                <a:solidFill>
-                  <a:srgbClr val="B48900"/>
-                </a:solidFill>
-              </a:rPr>
-              <a:t>Buy</a:t>
-            </a:r>
-            <a:endParaRPr lang="en-US" sz="2800" b="1" dirty="0">
-              <a:solidFill>
-                <a:srgbClr val="B48900"/>
-              </a:solidFill>
-            </a:endParaRPr>
-          </a:p>
-        </p:txBody>
-      </p:sp>
-      <p:sp>
-        <p:nvSpPr>
-          <p:cNvPr id="11" name="Content Placeholder 3"/>
-          <p:cNvSpPr txBox="1">
-            <a:spLocks/>
-          </p:cNvSpPr>
-          <p:nvPr/>
-        </p:nvSpPr>
-        <p:spPr>
-          <a:xfrm>
-            <a:off x="3846372" y="2920866"/>
-            <a:ext cx="1550546" cy="492656"/>
-          </a:xfrm>
-          <a:prstGeom prst="rect">
-            <a:avLst/>
-          </a:prstGeom>
-        </p:spPr>
-        <p:txBody>
-          <a:bodyPr tIns="0"/>
-          <a:lstStyle>
-            <a:lvl1pPr marL="274320" indent="-274320" algn="l" rtl="0" eaLnBrk="1" latinLnBrk="0" hangingPunct="1">
-              <a:spcBef>
-                <a:spcPct val="20000"/>
-              </a:spcBef>
-              <a:buClrTx/>
-              <a:buSzPct val="95000"/>
-              <a:buFont typeface="Wingdings" pitchFamily="2" charset="2"/>
-              <a:buChar char="v"/>
-              <a:defRPr kumimoji="0" sz="2800" kern="1200">
-                <a:solidFill>
-                  <a:schemeClr val="tx1"/>
-                </a:solidFill>
-                <a:latin typeface="+mn-lt"/>
-                <a:ea typeface="+mn-ea"/>
-                <a:cs typeface="+mn-cs"/>
-              </a:defRPr>
-            </a:lvl1pPr>
-            <a:lvl2pPr marL="640080" indent="-246888" algn="l" rtl="0" eaLnBrk="1" latinLnBrk="0" hangingPunct="1">
-              <a:spcBef>
-                <a:spcPct val="20000"/>
-              </a:spcBef>
-              <a:buClrTx/>
-              <a:buSzPct val="85000"/>
-              <a:buFont typeface="Courier New" pitchFamily="49" charset="0"/>
-              <a:buChar char="o"/>
-              <a:defRPr kumimoji="0" sz="2600" kern="1200">
-                <a:solidFill>
-                  <a:schemeClr val="tx1"/>
-                </a:solidFill>
-                <a:latin typeface="+mn-lt"/>
-                <a:ea typeface="+mn-ea"/>
-                <a:cs typeface="+mn-cs"/>
-              </a:defRPr>
-            </a:lvl2pPr>
-            <a:lvl3pPr marL="914400" indent="-246888" algn="l" rtl="0" eaLnBrk="1" latinLnBrk="0" hangingPunct="1">
-              <a:spcBef>
-                <a:spcPct val="20000"/>
-              </a:spcBef>
-              <a:buClrTx/>
-              <a:buSzPct val="70000"/>
-              <a:buFont typeface="Wingdings 2"/>
-              <a:buChar char=""/>
-              <a:defRPr kumimoji="0" sz="2400" kern="1200">
-                <a:solidFill>
-                  <a:schemeClr val="tx1"/>
-                </a:solidFill>
-                <a:latin typeface="+mn-lt"/>
-                <a:ea typeface="+mn-ea"/>
-                <a:cs typeface="+mn-cs"/>
-              </a:defRPr>
-            </a:lvl3pPr>
-            <a:lvl4pPr marL="1188720" indent="-210312" algn="l" rtl="0" eaLnBrk="1" latinLnBrk="0" hangingPunct="1">
-              <a:spcBef>
-                <a:spcPct val="20000"/>
-              </a:spcBef>
-              <a:buClrTx/>
-              <a:buSzPct val="65000"/>
-              <a:buFont typeface="Wingdings 2"/>
-              <a:buChar char=""/>
-              <a:defRPr kumimoji="0" sz="2000" kern="1200">
-                <a:solidFill>
-                  <a:schemeClr val="tx1"/>
-                </a:solidFill>
-                <a:latin typeface="+mn-lt"/>
-                <a:ea typeface="+mn-ea"/>
-                <a:cs typeface="+mn-cs"/>
-              </a:defRPr>
-            </a:lvl4pPr>
-            <a:lvl5pPr marL="1463040" indent="-210312" algn="l" rtl="0" eaLnBrk="1" latinLnBrk="0" hangingPunct="1">
-              <a:spcBef>
-                <a:spcPct val="20000"/>
-              </a:spcBef>
-              <a:buClrTx/>
-              <a:buSzPct val="65000"/>
-              <a:buFont typeface="Wingdings 2"/>
-              <a:buChar char=""/>
-              <a:defRPr kumimoji="0" sz="1800" kern="1200">
-                <a:solidFill>
-                  <a:schemeClr val="tx1"/>
-                </a:solidFill>
-                <a:latin typeface="+mn-lt"/>
-                <a:ea typeface="+mn-ea"/>
-                <a:cs typeface="+mn-cs"/>
-              </a:defRPr>
-            </a:lvl5pPr>
-            <a:lvl6pPr marL="1737360" indent="-210312" algn="l" rtl="0" eaLnBrk="1" latinLnBrk="0" hangingPunct="1">
-              <a:spcBef>
-                <a:spcPct val="20000"/>
-              </a:spcBef>
-              <a:buClr>
-                <a:schemeClr val="accent5"/>
-              </a:buClr>
-              <a:buSzPct val="80000"/>
-              <a:buFont typeface="Wingdings 2"/>
-              <a:buChar char=""/>
-              <a:defRPr kumimoji="0" sz="1800" kern="1200">
-                <a:solidFill>
-                  <a:schemeClr val="tx1"/>
-                </a:solidFill>
-                <a:latin typeface="+mn-lt"/>
-                <a:ea typeface="+mn-ea"/>
-                <a:cs typeface="+mn-cs"/>
-              </a:defRPr>
-            </a:lvl6pPr>
-            <a:lvl7pPr marL="1920240" indent="-182880" algn="l" rtl="0" eaLnBrk="1" latinLnBrk="0" hangingPunct="1">
-              <a:spcBef>
-                <a:spcPct val="20000"/>
-              </a:spcBef>
-              <a:buClr>
-                <a:schemeClr val="accent6"/>
-              </a:buClr>
-              <a:buSzPct val="80000"/>
-              <a:buFont typeface="Wingdings 2"/>
-              <a:buChar char=""/>
-              <a:defRPr kumimoji="0" sz="1600" kern="1200" baseline="0">
-                <a:solidFill>
-                  <a:schemeClr val="tx1"/>
-                </a:solidFill>
-                <a:latin typeface="+mn-lt"/>
-                <a:ea typeface="+mn-ea"/>
-                <a:cs typeface="+mn-cs"/>
-              </a:defRPr>
-            </a:lvl7pPr>
-            <a:lvl8pPr marL="2194560" indent="-182880" algn="l" rtl="0" eaLnBrk="1" latinLnBrk="0" hangingPunct="1">
-              <a:spcBef>
-                <a:spcPct val="20000"/>
-              </a:spcBef>
-              <a:buClr>
-                <a:schemeClr val="tx2"/>
-              </a:buClr>
-              <a:buChar char="•"/>
-              <a:defRPr kumimoji="0" sz="1600" kern="1200">
-                <a:solidFill>
-                  <a:schemeClr val="tx1"/>
-                </a:solidFill>
-                <a:latin typeface="+mn-lt"/>
-                <a:ea typeface="+mn-ea"/>
-                <a:cs typeface="+mn-cs"/>
-              </a:defRPr>
-            </a:lvl8pPr>
-            <a:lvl9pPr marL="2468880" indent="-182880" algn="l" rtl="0" eaLnBrk="1" latinLnBrk="0" hangingPunct="1">
-              <a:spcBef>
-                <a:spcPct val="20000"/>
-              </a:spcBef>
-              <a:buClr>
-                <a:schemeClr val="tx2"/>
-              </a:buClr>
-              <a:buFontTx/>
-              <a:buChar char="•"/>
-              <a:defRPr kumimoji="0" sz="1400" kern="1200" baseline="0">
-                <a:solidFill>
-                  <a:schemeClr val="tx1"/>
-                </a:solidFill>
-                <a:latin typeface="+mn-lt"/>
-                <a:ea typeface="+mn-ea"/>
-                <a:cs typeface="+mn-cs"/>
-              </a:defRPr>
-            </a:lvl9pPr>
-          </a:lstStyle>
-          <a:p>
-            <a:pPr marL="0" indent="0">
-              <a:buNone/>
-            </a:pPr>
-            <a:r>
-              <a:rPr lang="it-IT" sz="3600" b="1" i="1" dirty="0" smtClean="0">
-                <a:solidFill>
-                  <a:srgbClr val="FF0000"/>
-                </a:solidFill>
-              </a:rPr>
-              <a:t>VS</a:t>
-            </a:r>
-            <a:endParaRPr lang="en-US" sz="3600" b="1" dirty="0">
-              <a:solidFill>
-                <a:srgbClr val="FF0000"/>
-              </a:solidFill>
-            </a:endParaRPr>
-          </a:p>
-        </p:txBody>
-      </p:sp>
     </p:spTree>
     <p:extLst>
       <p:ext uri="{BB962C8B-B14F-4D97-AF65-F5344CB8AC3E}">
-        <p14:creationId xmlns:p14="http://schemas.microsoft.com/office/powerpoint/2010/main" val="202613363"/>
+        <p14:creationId xmlns="" xmlns:p14="http://schemas.microsoft.com/office/powerpoint/2010/main" val="202613363"/>
       </p:ext>
     </p:extLst>
   </p:cSld>
   <p:clrMapOvr>
     <a:masterClrMapping/>
   </p:clrMapOvr>
-  <mc:AlternateContent xmlns:mc="http://schemas.openxmlformats.org/markup-compatibility/2006" xmlns:p14="http://schemas.microsoft.com/office/powerpoint/2010/main">
-    <mc:Choice Requires="p14">
+  <mc:AlternateContent xmlns:mc="http://schemas.openxmlformats.org/markup-compatibility/2006">
+    <mc:Choice xmlns="" xmlns:p14="http://schemas.microsoft.com/office/powerpoint/2010/main" Requires="p14">
       <p:transition spd="slow" p14:dur="2000"/>
     </mc:Choice>
-    <mc:Fallback xmlns="">
+    <mc:Fallback>
       <p:transition spd="slow"/>
     </mc:Fallback>
   </mc:AlternateContent>
@@ -14819,6 +14914,9 @@
                     <p:cTn id="3" fill="hold">
                       <p:stCondLst>
                         <p:cond delay="indefinite"/>
+                        <p:cond evt="onBegin" delay="0">
+                          <p:tn val="2"/>
+                        </p:cond>
                       </p:stCondLst>
                       <p:childTnLst>
                         <p:par>
@@ -14828,7 +14926,7 @@
                             </p:stCondLst>
                             <p:childTnLst>
                               <p:par>
-                                <p:cTn id="5" presetID="10" presetClass="entr" presetSubtype="0" fill="hold" grpId="0" nodeType="clickEffect">
+                                <p:cTn id="5" presetID="10" presetClass="entr" presetSubtype="0" fill="hold" grpId="0" nodeType="withEffect">
                                   <p:stCondLst>
                                     <p:cond delay="0"/>
                                   </p:stCondLst>
@@ -14876,7 +14974,7 @@
                                           </p:stCondLst>
                                         </p:cTn>
                                         <p:tgtEl>
-                                          <p:spTgt spid="3074"/>
+                                          <p:spTgt spid="2050"/>
                                         </p:tgtEl>
                                         <p:attrNameLst>
                                           <p:attrName>style.visibility</p:attrName>
@@ -14890,7 +14988,7 @@
                                       <p:cBhvr>
                                         <p:cTn id="10" dur="500"/>
                                         <p:tgtEl>
-                                          <p:spTgt spid="3074"/>
+                                          <p:spTgt spid="2050"/>
                                         </p:tgtEl>
                                       </p:cBhvr>
                                     </p:animEffect>
@@ -15038,33 +15136,15 @@
                                   </p:childTnLst>
                                 </p:cTn>
                               </p:par>
-                            </p:childTnLst>
-                          </p:cTn>
-                        </p:par>
-                      </p:childTnLst>
-                    </p:cTn>
-                  </p:par>
-                  <p:par>
-                    <p:cTn id="24" fill="hold">
-                      <p:stCondLst>
-                        <p:cond delay="indefinite"/>
-                      </p:stCondLst>
-                      <p:childTnLst>
-                        <p:par>
-                          <p:cTn id="25" fill="hold">
-                            <p:stCondLst>
-                              <p:cond delay="0"/>
-                            </p:stCondLst>
-                            <p:childTnLst>
                               <p:par>
-                                <p:cTn id="26" presetID="6" presetClass="emph" presetSubtype="0" fill="hold" grpId="1" nodeType="clickEffect">
+                                <p:cTn id="24" presetID="6" presetClass="emph" presetSubtype="0" fill="hold" grpId="1" nodeType="withEffect">
                                   <p:stCondLst>
                                     <p:cond delay="0"/>
                                   </p:stCondLst>
                                   <p:childTnLst>
                                     <p:animScale>
                                       <p:cBhvr>
-                                        <p:cTn id="27" dur="2000" fill="hold"/>
+                                        <p:cTn id="25" dur="2000" fill="hold"/>
                                         <p:tgtEl>
                                           <p:spTgt spid="10"/>
                                         </p:tgtEl>
@@ -15102,10 +15182,10 @@
       </p:par>
     </p:tnLst>
     <p:bldLst>
+      <p:bldP spid="2" grpId="0"/>
+      <p:bldP spid="11" grpId="0"/>
       <p:bldP spid="10" grpId="0"/>
       <p:bldP spid="10" grpId="1"/>
-      <p:bldP spid="2" grpId="0"/>
-      <p:bldP spid="11" grpId="0"/>
     </p:bldLst>
   </p:timing>
 </p:sld>
@@ -15140,7 +15220,7 @@
           <a:blip r:embed="rId3">
             <a:extLst>
               <a:ext uri="{28A0092B-C50C-407E-A947-70E740481C1C}">
-                <a14:useLocalDpi xmlns:a14="http://schemas.microsoft.com/office/drawing/2010/main" val="0"/>
+                <a14:useLocalDpi xmlns="" xmlns:a14="http://schemas.microsoft.com/office/drawing/2010/main" val="0"/>
               </a:ext>
             </a:extLst>
           </a:blip>
@@ -15160,7 +15240,7 @@
           <a:noFill/>
           <a:extLst>
             <a:ext uri="{909E8E84-426E-40DD-AFC4-6F175D3DCCD1}">
-              <a14:hiddenFill xmlns:a14="http://schemas.microsoft.com/office/drawing/2010/main">
+              <a14:hiddenFill xmlns="" xmlns:a14="http://schemas.microsoft.com/office/drawing/2010/main">
                 <a:solidFill>
                   <a:srgbClr val="FFFFFF"/>
                 </a:solidFill>
@@ -15181,7 +15261,7 @@
           <a:blip r:embed="rId4">
             <a:extLst>
               <a:ext uri="{28A0092B-C50C-407E-A947-70E740481C1C}">
-                <a14:useLocalDpi xmlns:a14="http://schemas.microsoft.com/office/drawing/2010/main" val="0"/>
+                <a14:useLocalDpi xmlns="" xmlns:a14="http://schemas.microsoft.com/office/drawing/2010/main" val="0"/>
               </a:ext>
             </a:extLst>
           </a:blip>
@@ -15201,7 +15281,7 @@
           <a:noFill/>
           <a:extLst>
             <a:ext uri="{909E8E84-426E-40DD-AFC4-6F175D3DCCD1}">
-              <a14:hiddenFill xmlns:a14="http://schemas.microsoft.com/office/drawing/2010/main">
+              <a14:hiddenFill xmlns="" xmlns:a14="http://schemas.microsoft.com/office/drawing/2010/main">
                 <a:solidFill>
                   <a:srgbClr val="FFFFFF"/>
                 </a:solidFill>
@@ -15525,18 +15605,18 @@
     </p:spTree>
     <p:extLst>
       <p:ext uri="{BB962C8B-B14F-4D97-AF65-F5344CB8AC3E}">
-        <p14:creationId xmlns:p14="http://schemas.microsoft.com/office/powerpoint/2010/main" val="1197112555"/>
+        <p14:creationId xmlns="" xmlns:p14="http://schemas.microsoft.com/office/powerpoint/2010/main" val="1197112555"/>
       </p:ext>
     </p:extLst>
   </p:cSld>
   <p:clrMapOvr>
     <a:masterClrMapping/>
   </p:clrMapOvr>
-  <mc:AlternateContent xmlns:mc="http://schemas.openxmlformats.org/markup-compatibility/2006" xmlns:p14="http://schemas.microsoft.com/office/powerpoint/2010/main">
-    <mc:Choice Requires="p14">
+  <mc:AlternateContent xmlns:mc="http://schemas.openxmlformats.org/markup-compatibility/2006">
+    <mc:Choice xmlns="" xmlns:p14="http://schemas.microsoft.com/office/powerpoint/2010/main" Requires="p14">
       <p:transition spd="slow" p14:dur="2000"/>
     </mc:Choice>
-    <mc:Fallback xmlns="">
+    <mc:Fallback>
       <p:transition spd="slow"/>
     </mc:Fallback>
   </mc:AlternateContent>
@@ -16620,18 +16700,18 @@
     </p:spTree>
     <p:extLst>
       <p:ext uri="{BB962C8B-B14F-4D97-AF65-F5344CB8AC3E}">
-        <p14:creationId xmlns:p14="http://schemas.microsoft.com/office/powerpoint/2010/main" val="155874689"/>
+        <p14:creationId xmlns="" xmlns:p14="http://schemas.microsoft.com/office/powerpoint/2010/main" val="155874689"/>
       </p:ext>
     </p:extLst>
   </p:cSld>
   <p:clrMapOvr>
     <a:masterClrMapping/>
   </p:clrMapOvr>
-  <mc:AlternateContent xmlns:mc="http://schemas.openxmlformats.org/markup-compatibility/2006" xmlns:p14="http://schemas.microsoft.com/office/powerpoint/2010/main">
-    <mc:Choice Requires="p14">
+  <mc:AlternateContent xmlns:mc="http://schemas.openxmlformats.org/markup-compatibility/2006">
+    <mc:Choice xmlns="" xmlns:p14="http://schemas.microsoft.com/office/powerpoint/2010/main" Requires="p14">
       <p:transition spd="slow" p14:dur="2000"/>
     </mc:Choice>
-    <mc:Fallback xmlns="">
+    <mc:Fallback>
       <p:transition spd="slow"/>
     </mc:Fallback>
   </mc:AlternateContent>
@@ -16982,7 +17062,7 @@
       </p:sp>
       <p:pic>
         <p:nvPicPr>
-          <p:cNvPr id="6" name="Picture 3" descr="C:\linda\uni\esami_da_svolgere\gps\progetto_gps\Atsilo\Presentazione\Atsilo3\OminoEuro.jpg"/>
+          <p:cNvPr id="4098" name="Picture 2" descr="C:\linda\uni\esami_da_svolgere\gps\progetto_gps\Atsilo\Presentazione\Atsilo3\google-drive1-468x312.jpg"/>
           <p:cNvPicPr>
             <a:picLocks noChangeAspect="1" noChangeArrowheads="1"/>
           </p:cNvPicPr>
@@ -16992,48 +17072,7 @@
           <a:blip r:embed="rId3">
             <a:extLst>
               <a:ext uri="{28A0092B-C50C-407E-A947-70E740481C1C}">
-                <a14:useLocalDpi xmlns:a14="http://schemas.microsoft.com/office/drawing/2010/main" val="0"/>
-              </a:ext>
-            </a:extLst>
-          </a:blip>
-          <a:srcRect/>
-          <a:stretch>
-            <a:fillRect/>
-          </a:stretch>
-        </p:blipFill>
-        <p:spPr bwMode="auto">
-          <a:xfrm>
-            <a:off x="6804248" y="4674206"/>
-            <a:ext cx="2194768" cy="2183794"/>
-          </a:xfrm>
-          <a:prstGeom prst="rect">
-            <a:avLst/>
-          </a:prstGeom>
-          <a:noFill/>
-          <a:extLst>
-            <a:ext uri="{909E8E84-426E-40DD-AFC4-6F175D3DCCD1}">
-              <a14:hiddenFill xmlns:a14="http://schemas.microsoft.com/office/drawing/2010/main">
-                <a:solidFill>
-                  <a:srgbClr val="FFFFFF"/>
-                </a:solidFill>
-              </a14:hiddenFill>
-            </a:ext>
-          </a:extLst>
-        </p:spPr>
-      </p:pic>
-      <p:pic>
-        <p:nvPicPr>
-          <p:cNvPr id="4098" name="Picture 2" descr="C:\linda\uni\esami_da_svolgere\gps\progetto_gps\Atsilo\Presentazione\Atsilo3\google-drive1-468x312.jpg"/>
-          <p:cNvPicPr>
-            <a:picLocks noChangeAspect="1" noChangeArrowheads="1"/>
-          </p:cNvPicPr>
-          <p:nvPr/>
-        </p:nvPicPr>
-        <p:blipFill>
-          <a:blip r:embed="rId4">
-            <a:extLst>
-              <a:ext uri="{28A0092B-C50C-407E-A947-70E740481C1C}">
-                <a14:useLocalDpi xmlns:a14="http://schemas.microsoft.com/office/drawing/2010/main" val="0"/>
+                <a14:useLocalDpi xmlns="" xmlns:a14="http://schemas.microsoft.com/office/drawing/2010/main" val="0"/>
               </a:ext>
             </a:extLst>
           </a:blip>
@@ -17053,7 +17092,7 @@
           <a:noFill/>
           <a:extLst>
             <a:ext uri="{909E8E84-426E-40DD-AFC4-6F175D3DCCD1}">
-              <a14:hiddenFill xmlns:a14="http://schemas.microsoft.com/office/drawing/2010/main">
+              <a14:hiddenFill xmlns="" xmlns:a14="http://schemas.microsoft.com/office/drawing/2010/main">
                 <a:solidFill>
                   <a:srgbClr val="FFFFFF"/>
                 </a:solidFill>
@@ -17071,10 +17110,10 @@
           <p:nvPr/>
         </p:nvPicPr>
         <p:blipFill>
-          <a:blip r:embed="rId5">
+          <a:blip r:embed="rId4">
             <a:extLst>
               <a:ext uri="{28A0092B-C50C-407E-A947-70E740481C1C}">
-                <a14:useLocalDpi xmlns:a14="http://schemas.microsoft.com/office/drawing/2010/main" val="0"/>
+                <a14:useLocalDpi xmlns="" xmlns:a14="http://schemas.microsoft.com/office/drawing/2010/main" val="0"/>
               </a:ext>
             </a:extLst>
           </a:blip>
@@ -17103,7 +17142,7 @@
           </a:effectLst>
           <a:extLst>
             <a:ext uri="{909E8E84-426E-40DD-AFC4-6F175D3DCCD1}">
-              <a14:hiddenFill xmlns:a14="http://schemas.microsoft.com/office/drawing/2010/main">
+              <a14:hiddenFill xmlns="" xmlns:a14="http://schemas.microsoft.com/office/drawing/2010/main">
                 <a:solidFill>
                   <a:srgbClr val="FFFFFF"/>
                 </a:solidFill>
@@ -17112,21 +17151,47 @@
           </a:extLst>
         </p:spPr>
       </p:pic>
+      <p:pic>
+        <p:nvPicPr>
+          <p:cNvPr id="3074" name="Picture 2" descr="D:\Tony\Omini\omino_soldi.jpg"/>
+          <p:cNvPicPr>
+            <a:picLocks noChangeAspect="1" noChangeArrowheads="1"/>
+          </p:cNvPicPr>
+          <p:nvPr/>
+        </p:nvPicPr>
+        <p:blipFill>
+          <a:blip r:embed="rId5"/>
+          <a:srcRect/>
+          <a:stretch>
+            <a:fillRect/>
+          </a:stretch>
+        </p:blipFill>
+        <p:spPr bwMode="auto">
+          <a:xfrm>
+            <a:off x="6715140" y="4286256"/>
+            <a:ext cx="2071702" cy="2118520"/>
+          </a:xfrm>
+          <a:prstGeom prst="rect">
+            <a:avLst/>
+          </a:prstGeom>
+          <a:noFill/>
+        </p:spPr>
+      </p:pic>
     </p:spTree>
     <p:extLst>
       <p:ext uri="{BB962C8B-B14F-4D97-AF65-F5344CB8AC3E}">
-        <p14:creationId xmlns:p14="http://schemas.microsoft.com/office/powerpoint/2010/main" val="700353664"/>
+        <p14:creationId xmlns="" xmlns:p14="http://schemas.microsoft.com/office/powerpoint/2010/main" val="700353664"/>
       </p:ext>
     </p:extLst>
   </p:cSld>
   <p:clrMapOvr>
     <a:masterClrMapping/>
   </p:clrMapOvr>
-  <mc:AlternateContent xmlns:mc="http://schemas.openxmlformats.org/markup-compatibility/2006" xmlns:p14="http://schemas.microsoft.com/office/powerpoint/2010/main">
-    <mc:Choice Requires="p14">
+  <mc:AlternateContent xmlns:mc="http://schemas.openxmlformats.org/markup-compatibility/2006">
+    <mc:Choice xmlns="" xmlns:p14="http://schemas.microsoft.com/office/powerpoint/2010/main" Requires="p14">
       <p:transition spd="slow" p14:dur="2000"/>
     </mc:Choice>
-    <mc:Fallback xmlns="">
+    <mc:Fallback>
       <p:transition spd="slow"/>
     </mc:Fallback>
   </mc:AlternateContent>
@@ -17451,21 +17516,39 @@
                                   </p:childTnLst>
                                 </p:cTn>
                               </p:par>
+                            </p:childTnLst>
+                          </p:cTn>
+                        </p:par>
+                      </p:childTnLst>
+                    </p:cTn>
+                  </p:par>
+                  <p:par>
+                    <p:cTn id="26" fill="hold">
+                      <p:stCondLst>
+                        <p:cond delay="indefinite"/>
+                      </p:stCondLst>
+                      <p:childTnLst>
+                        <p:par>
+                          <p:cTn id="27" fill="hold">
+                            <p:stCondLst>
+                              <p:cond delay="0"/>
+                            </p:stCondLst>
+                            <p:childTnLst>
                               <p:par>
-                                <p:cTn id="26" presetID="10" presetClass="entr" presetSubtype="0" fill="hold" nodeType="withEffect">
+                                <p:cTn id="28" presetID="2" presetClass="entr" presetSubtype="4" fill="hold" nodeType="clickEffect">
                                   <p:stCondLst>
                                     <p:cond delay="0"/>
                                   </p:stCondLst>
                                   <p:childTnLst>
                                     <p:set>
                                       <p:cBhvr>
-                                        <p:cTn id="27" dur="1" fill="hold">
+                                        <p:cTn id="29" dur="1" fill="hold">
                                           <p:stCondLst>
                                             <p:cond delay="0"/>
                                           </p:stCondLst>
                                         </p:cTn>
                                         <p:tgtEl>
-                                          <p:spTgt spid="6"/>
+                                          <p:spTgt spid="3074"/>
                                         </p:tgtEl>
                                         <p:attrNameLst>
                                           <p:attrName>style.visibility</p:attrName>
@@ -17475,14 +17558,52 @@
                                         <p:strVal val="visible"/>
                                       </p:to>
                                     </p:set>
-                                    <p:animEffect transition="in" filter="fade">
-                                      <p:cBhvr>
-                                        <p:cTn id="28" dur="2000"/>
+                                    <p:anim calcmode="lin" valueType="num">
+                                      <p:cBhvr additive="base">
+                                        <p:cTn id="30" dur="500" fill="hold"/>
                                         <p:tgtEl>
-                                          <p:spTgt spid="6"/>
+                                          <p:spTgt spid="3074"/>
                                         </p:tgtEl>
+                                        <p:attrNameLst>
+                                          <p:attrName>ppt_x</p:attrName>
+                                        </p:attrNameLst>
                                       </p:cBhvr>
-                                    </p:animEffect>
+                                      <p:tavLst>
+                                        <p:tav tm="0">
+                                          <p:val>
+                                            <p:strVal val="#ppt_x"/>
+                                          </p:val>
+                                        </p:tav>
+                                        <p:tav tm="100000">
+                                          <p:val>
+                                            <p:strVal val="#ppt_x"/>
+                                          </p:val>
+                                        </p:tav>
+                                      </p:tavLst>
+                                    </p:anim>
+                                    <p:anim calcmode="lin" valueType="num">
+                                      <p:cBhvr additive="base">
+                                        <p:cTn id="31" dur="500" fill="hold"/>
+                                        <p:tgtEl>
+                                          <p:spTgt spid="3074"/>
+                                        </p:tgtEl>
+                                        <p:attrNameLst>
+                                          <p:attrName>ppt_y</p:attrName>
+                                        </p:attrNameLst>
+                                      </p:cBhvr>
+                                      <p:tavLst>
+                                        <p:tav tm="0">
+                                          <p:val>
+                                            <p:strVal val="1+#ppt_h/2"/>
+                                          </p:val>
+                                        </p:tav>
+                                        <p:tav tm="100000">
+                                          <p:val>
+                                            <p:strVal val="#ppt_y"/>
+                                          </p:val>
+                                        </p:tav>
+                                      </p:tavLst>
+                                    </p:anim>
                                   </p:childTnLst>
                                 </p:cTn>
                               </p:par>
@@ -17493,26 +17614,26 @@
                     </p:cTn>
                   </p:par>
                   <p:par>
-                    <p:cTn id="29" fill="hold">
+                    <p:cTn id="32" fill="hold">
                       <p:stCondLst>
                         <p:cond delay="indefinite"/>
                       </p:stCondLst>
                       <p:childTnLst>
                         <p:par>
-                          <p:cTn id="30" fill="hold">
+                          <p:cTn id="33" fill="hold">
                             <p:stCondLst>
                               <p:cond delay="0"/>
                             </p:stCondLst>
                             <p:childTnLst>
                               <p:par>
-                                <p:cTn id="31" presetID="2" presetClass="entr" presetSubtype="4" fill="hold" nodeType="clickEffect">
+                                <p:cTn id="34" presetID="2" presetClass="entr" presetSubtype="4" fill="hold" nodeType="clickEffect">
                                   <p:stCondLst>
                                     <p:cond delay="0"/>
                                   </p:stCondLst>
                                   <p:childTnLst>
                                     <p:set>
                                       <p:cBhvr>
-                                        <p:cTn id="32" dur="1" fill="hold">
+                                        <p:cTn id="35" dur="1" fill="hold">
                                           <p:stCondLst>
                                             <p:cond delay="0"/>
                                           </p:stCondLst>
@@ -17530,7 +17651,7 @@
                                     </p:set>
                                     <p:anim calcmode="lin" valueType="num">
                                       <p:cBhvr additive="base">
-                                        <p:cTn id="33" dur="500" fill="hold"/>
+                                        <p:cTn id="36" dur="500" fill="hold"/>
                                         <p:tgtEl>
                                           <p:spTgt spid="4100"/>
                                         </p:tgtEl>
@@ -17553,7 +17674,7 @@
                                     </p:anim>
                                     <p:anim calcmode="lin" valueType="num">
                                       <p:cBhvr additive="base">
-                                        <p:cTn id="34" dur="500" fill="hold"/>
+                                        <p:cTn id="37" dur="500" fill="hold"/>
                                         <p:tgtEl>
                                           <p:spTgt spid="4100"/>
                                         </p:tgtEl>
@@ -17578,14 +17699,14 @@
                                 </p:cTn>
                               </p:par>
                               <p:par>
-                                <p:cTn id="35" presetID="2" presetClass="entr" presetSubtype="4" fill="hold" nodeType="withEffect">
+                                <p:cTn id="38" presetID="2" presetClass="entr" presetSubtype="4" fill="hold" nodeType="withEffect">
                                   <p:stCondLst>
                                     <p:cond delay="0"/>
                                   </p:stCondLst>
                                   <p:childTnLst>
                                     <p:set>
                                       <p:cBhvr>
-                                        <p:cTn id="36" dur="1" fill="hold">
+                                        <p:cTn id="39" dur="1" fill="hold">
                                           <p:stCondLst>
                                             <p:cond delay="0"/>
                                           </p:stCondLst>
@@ -17603,7 +17724,7 @@
                                     </p:set>
                                     <p:anim calcmode="lin" valueType="num">
                                       <p:cBhvr additive="base">
-                                        <p:cTn id="37" dur="500" fill="hold"/>
+                                        <p:cTn id="40" dur="500" fill="hold"/>
                                         <p:tgtEl>
                                           <p:spTgt spid="4098"/>
                                         </p:tgtEl>
@@ -17626,7 +17747,7 @@
                                     </p:anim>
                                     <p:anim calcmode="lin" valueType="num">
                                       <p:cBhvr additive="base">
-                                        <p:cTn id="38" dur="500" fill="hold"/>
+                                        <p:cTn id="41" dur="500" fill="hold"/>
                                         <p:tgtEl>
                                           <p:spTgt spid="4098"/>
                                         </p:tgtEl>
@@ -17814,7 +17935,7 @@
           <a:blip r:embed="rId3">
             <a:extLst>
               <a:ext uri="{28A0092B-C50C-407E-A947-70E740481C1C}">
-                <a14:useLocalDpi xmlns:a14="http://schemas.microsoft.com/office/drawing/2010/main" val="0"/>
+                <a14:useLocalDpi xmlns="" xmlns:a14="http://schemas.microsoft.com/office/drawing/2010/main" val="0"/>
               </a:ext>
             </a:extLst>
           </a:blip>
@@ -17839,7 +17960,7 @@
           </a:effectLst>
           <a:extLst>
             <a:ext uri="{909E8E84-426E-40DD-AFC4-6F175D3DCCD1}">
-              <a14:hiddenFill xmlns:a14="http://schemas.microsoft.com/office/drawing/2010/main">
+              <a14:hiddenFill xmlns="" xmlns:a14="http://schemas.microsoft.com/office/drawing/2010/main">
                 <a:solidFill>
                   <a:srgbClr val="FFFFFF"/>
                 </a:solidFill>
@@ -17860,7 +17981,7 @@
           <a:blip r:embed="rId4">
             <a:extLst>
               <a:ext uri="{28A0092B-C50C-407E-A947-70E740481C1C}">
-                <a14:useLocalDpi xmlns:a14="http://schemas.microsoft.com/office/drawing/2010/main" val="0"/>
+                <a14:useLocalDpi xmlns="" xmlns:a14="http://schemas.microsoft.com/office/drawing/2010/main" val="0"/>
               </a:ext>
             </a:extLst>
           </a:blip>
@@ -17880,7 +18001,7 @@
           <a:noFill/>
           <a:extLst>
             <a:ext uri="{909E8E84-426E-40DD-AFC4-6F175D3DCCD1}">
-              <a14:hiddenFill xmlns:a14="http://schemas.microsoft.com/office/drawing/2010/main">
+              <a14:hiddenFill xmlns="" xmlns:a14="http://schemas.microsoft.com/office/drawing/2010/main">
                 <a:solidFill>
                   <a:srgbClr val="FFFFFF"/>
                 </a:solidFill>
@@ -17926,7 +18047,7 @@
     </p:spTree>
     <p:extLst>
       <p:ext uri="{BB962C8B-B14F-4D97-AF65-F5344CB8AC3E}">
-        <p14:creationId xmlns:p14="http://schemas.microsoft.com/office/powerpoint/2010/main" val="2947224754"/>
+        <p14:creationId xmlns="" xmlns:p14="http://schemas.microsoft.com/office/powerpoint/2010/main" val="2947224754"/>
       </p:ext>
     </p:extLst>
   </p:cSld>
@@ -18243,7 +18364,7 @@
           <a:blip r:embed="rId3">
             <a:extLst>
               <a:ext uri="{28A0092B-C50C-407E-A947-70E740481C1C}">
-                <a14:useLocalDpi xmlns:a14="http://schemas.microsoft.com/office/drawing/2010/main" val="0"/>
+                <a14:useLocalDpi xmlns="" xmlns:a14="http://schemas.microsoft.com/office/drawing/2010/main" val="0"/>
               </a:ext>
             </a:extLst>
           </a:blip>
@@ -18263,7 +18384,7 @@
           <a:noFill/>
           <a:extLst>
             <a:ext uri="{909E8E84-426E-40DD-AFC4-6F175D3DCCD1}">
-              <a14:hiddenFill xmlns:a14="http://schemas.microsoft.com/office/drawing/2010/main">
+              <a14:hiddenFill xmlns="" xmlns:a14="http://schemas.microsoft.com/office/drawing/2010/main">
                 <a:solidFill>
                   <a:srgbClr val="FFFFFF"/>
                 </a:solidFill>
@@ -18272,246 +18393,6 @@
           </a:extLst>
         </p:spPr>
       </p:pic>
-      <p:pic>
-        <p:nvPicPr>
-          <p:cNvPr id="3074" name="Picture 2" descr="C:\linda\uni\esami_da_svolgere\gps\progetto_gps\Atsilo\Presentazione\Atsilo3\9669552-3d-lavoratore-uomo-isolato-su-sfondo-bianco.jpg"/>
-          <p:cNvPicPr>
-            <a:picLocks noChangeAspect="1" noChangeArrowheads="1"/>
-          </p:cNvPicPr>
-          <p:nvPr/>
-        </p:nvPicPr>
-        <p:blipFill>
-          <a:blip r:embed="rId4">
-            <a:extLst>
-              <a:ext uri="{28A0092B-C50C-407E-A947-70E740481C1C}">
-                <a14:useLocalDpi xmlns:a14="http://schemas.microsoft.com/office/drawing/2010/main" val="0"/>
-              </a:ext>
-            </a:extLst>
-          </a:blip>
-          <a:srcRect/>
-          <a:stretch>
-            <a:fillRect/>
-          </a:stretch>
-        </p:blipFill>
-        <p:spPr bwMode="auto">
-          <a:xfrm>
-            <a:off x="1544836" y="2822742"/>
-            <a:ext cx="2411032" cy="2411032"/>
-          </a:xfrm>
-          <a:prstGeom prst="rect">
-            <a:avLst/>
-          </a:prstGeom>
-          <a:noFill/>
-          <a:extLst>
-            <a:ext uri="{909E8E84-426E-40DD-AFC4-6F175D3DCCD1}">
-              <a14:hiddenFill xmlns:a14="http://schemas.microsoft.com/office/drawing/2010/main">
-                <a:solidFill>
-                  <a:srgbClr val="FFFFFF"/>
-                </a:solidFill>
-              </a14:hiddenFill>
-            </a:ext>
-          </a:extLst>
-        </p:spPr>
-      </p:pic>
-      <p:sp>
-        <p:nvSpPr>
-          <p:cNvPr id="10" name="Content Placeholder 3"/>
-          <p:cNvSpPr txBox="1">
-            <a:spLocks/>
-          </p:cNvSpPr>
-          <p:nvPr/>
-        </p:nvSpPr>
-        <p:spPr>
-          <a:xfrm>
-            <a:off x="680740" y="3294563"/>
-            <a:ext cx="1550546" cy="492656"/>
-          </a:xfrm>
-          <a:prstGeom prst="rect">
-            <a:avLst/>
-          </a:prstGeom>
-        </p:spPr>
-        <p:txBody>
-          <a:bodyPr tIns="0"/>
-          <a:lstStyle>
-            <a:lvl1pPr marL="274320" indent="-274320" algn="l" rtl="0" eaLnBrk="1" latinLnBrk="0" hangingPunct="1">
-              <a:spcBef>
-                <a:spcPct val="20000"/>
-              </a:spcBef>
-              <a:buClrTx/>
-              <a:buSzPct val="95000"/>
-              <a:buFont typeface="Wingdings" pitchFamily="2" charset="2"/>
-              <a:buChar char="v"/>
-              <a:defRPr kumimoji="0" sz="2800" kern="1200">
-                <a:solidFill>
-                  <a:schemeClr val="tx1"/>
-                </a:solidFill>
-                <a:latin typeface="+mn-lt"/>
-                <a:ea typeface="+mn-ea"/>
-                <a:cs typeface="+mn-cs"/>
-              </a:defRPr>
-            </a:lvl1pPr>
-            <a:lvl2pPr marL="640080" indent="-246888" algn="l" rtl="0" eaLnBrk="1" latinLnBrk="0" hangingPunct="1">
-              <a:spcBef>
-                <a:spcPct val="20000"/>
-              </a:spcBef>
-              <a:buClrTx/>
-              <a:buSzPct val="85000"/>
-              <a:buFont typeface="Courier New" pitchFamily="49" charset="0"/>
-              <a:buChar char="o"/>
-              <a:defRPr kumimoji="0" sz="2600" kern="1200">
-                <a:solidFill>
-                  <a:schemeClr val="tx1"/>
-                </a:solidFill>
-                <a:latin typeface="+mn-lt"/>
-                <a:ea typeface="+mn-ea"/>
-                <a:cs typeface="+mn-cs"/>
-              </a:defRPr>
-            </a:lvl2pPr>
-            <a:lvl3pPr marL="914400" indent="-246888" algn="l" rtl="0" eaLnBrk="1" latinLnBrk="0" hangingPunct="1">
-              <a:spcBef>
-                <a:spcPct val="20000"/>
-              </a:spcBef>
-              <a:buClrTx/>
-              <a:buSzPct val="70000"/>
-              <a:buFont typeface="Wingdings 2"/>
-              <a:buChar char=""/>
-              <a:defRPr kumimoji="0" sz="2400" kern="1200">
-                <a:solidFill>
-                  <a:schemeClr val="tx1"/>
-                </a:solidFill>
-                <a:latin typeface="+mn-lt"/>
-                <a:ea typeface="+mn-ea"/>
-                <a:cs typeface="+mn-cs"/>
-              </a:defRPr>
-            </a:lvl3pPr>
-            <a:lvl4pPr marL="1188720" indent="-210312" algn="l" rtl="0" eaLnBrk="1" latinLnBrk="0" hangingPunct="1">
-              <a:spcBef>
-                <a:spcPct val="20000"/>
-              </a:spcBef>
-              <a:buClrTx/>
-              <a:buSzPct val="65000"/>
-              <a:buFont typeface="Wingdings 2"/>
-              <a:buChar char=""/>
-              <a:defRPr kumimoji="0" sz="2000" kern="1200">
-                <a:solidFill>
-                  <a:schemeClr val="tx1"/>
-                </a:solidFill>
-                <a:latin typeface="+mn-lt"/>
-                <a:ea typeface="+mn-ea"/>
-                <a:cs typeface="+mn-cs"/>
-              </a:defRPr>
-            </a:lvl4pPr>
-            <a:lvl5pPr marL="1463040" indent="-210312" algn="l" rtl="0" eaLnBrk="1" latinLnBrk="0" hangingPunct="1">
-              <a:spcBef>
-                <a:spcPct val="20000"/>
-              </a:spcBef>
-              <a:buClrTx/>
-              <a:buSzPct val="65000"/>
-              <a:buFont typeface="Wingdings 2"/>
-              <a:buChar char=""/>
-              <a:defRPr kumimoji="0" sz="1800" kern="1200">
-                <a:solidFill>
-                  <a:schemeClr val="tx1"/>
-                </a:solidFill>
-                <a:latin typeface="+mn-lt"/>
-                <a:ea typeface="+mn-ea"/>
-                <a:cs typeface="+mn-cs"/>
-              </a:defRPr>
-            </a:lvl5pPr>
-            <a:lvl6pPr marL="1737360" indent="-210312" algn="l" rtl="0" eaLnBrk="1" latinLnBrk="0" hangingPunct="1">
-              <a:spcBef>
-                <a:spcPct val="20000"/>
-              </a:spcBef>
-              <a:buClr>
-                <a:schemeClr val="accent5"/>
-              </a:buClr>
-              <a:buSzPct val="80000"/>
-              <a:buFont typeface="Wingdings 2"/>
-              <a:buChar char=""/>
-              <a:defRPr kumimoji="0" sz="1800" kern="1200">
-                <a:solidFill>
-                  <a:schemeClr val="tx1"/>
-                </a:solidFill>
-                <a:latin typeface="+mn-lt"/>
-                <a:ea typeface="+mn-ea"/>
-                <a:cs typeface="+mn-cs"/>
-              </a:defRPr>
-            </a:lvl6pPr>
-            <a:lvl7pPr marL="1920240" indent="-182880" algn="l" rtl="0" eaLnBrk="1" latinLnBrk="0" hangingPunct="1">
-              <a:spcBef>
-                <a:spcPct val="20000"/>
-              </a:spcBef>
-              <a:buClr>
-                <a:schemeClr val="accent6"/>
-              </a:buClr>
-              <a:buSzPct val="80000"/>
-              <a:buFont typeface="Wingdings 2"/>
-              <a:buChar char=""/>
-              <a:defRPr kumimoji="0" sz="1600" kern="1200" baseline="0">
-                <a:solidFill>
-                  <a:schemeClr val="tx1"/>
-                </a:solidFill>
-                <a:latin typeface="+mn-lt"/>
-                <a:ea typeface="+mn-ea"/>
-                <a:cs typeface="+mn-cs"/>
-              </a:defRPr>
-            </a:lvl7pPr>
-            <a:lvl8pPr marL="2194560" indent="-182880" algn="l" rtl="0" eaLnBrk="1" latinLnBrk="0" hangingPunct="1">
-              <a:spcBef>
-                <a:spcPct val="20000"/>
-              </a:spcBef>
-              <a:buClr>
-                <a:schemeClr val="tx2"/>
-              </a:buClr>
-              <a:buChar char="•"/>
-              <a:defRPr kumimoji="0" sz="1600" kern="1200">
-                <a:solidFill>
-                  <a:schemeClr val="tx1"/>
-                </a:solidFill>
-                <a:latin typeface="+mn-lt"/>
-                <a:ea typeface="+mn-ea"/>
-                <a:cs typeface="+mn-cs"/>
-              </a:defRPr>
-            </a:lvl8pPr>
-            <a:lvl9pPr marL="2468880" indent="-182880" algn="l" rtl="0" eaLnBrk="1" latinLnBrk="0" hangingPunct="1">
-              <a:spcBef>
-                <a:spcPct val="20000"/>
-              </a:spcBef>
-              <a:buClr>
-                <a:schemeClr val="tx2"/>
-              </a:buClr>
-              <a:buFontTx/>
-              <a:buChar char="•"/>
-              <a:defRPr kumimoji="0" sz="1400" kern="1200" baseline="0">
-                <a:solidFill>
-                  <a:schemeClr val="tx1"/>
-                </a:solidFill>
-                <a:latin typeface="+mn-lt"/>
-                <a:ea typeface="+mn-ea"/>
-                <a:cs typeface="+mn-cs"/>
-              </a:defRPr>
-            </a:lvl9pPr>
-          </a:lstStyle>
-          <a:p>
-            <a:pPr marL="0" indent="0">
-              <a:buNone/>
-            </a:pPr>
-            <a:r>
-              <a:rPr lang="it-IT" b="1" i="1" dirty="0" err="1" smtClean="0">
-                <a:solidFill>
-                  <a:srgbClr val="0070C0"/>
-                </a:solidFill>
-              </a:rPr>
-              <a:t>Build</a:t>
-            </a:r>
-            <a:endParaRPr lang="en-US" b="1" dirty="0">
-              <a:solidFill>
-                <a:srgbClr val="B48900"/>
-              </a:solidFill>
-            </a:endParaRPr>
-          </a:p>
-        </p:txBody>
-      </p:sp>
       <p:sp>
         <p:nvSpPr>
           <p:cNvPr id="5" name="CasellaDiTesto 4"/>
@@ -18830,21 +18711,246 @@
           </a:p>
         </p:txBody>
       </p:sp>
+      <p:pic>
+        <p:nvPicPr>
+          <p:cNvPr id="4098" name="Picture 2" descr="D:\Tony\Omini\omino_tool.jpg"/>
+          <p:cNvPicPr>
+            <a:picLocks noChangeAspect="1" noChangeArrowheads="1"/>
+          </p:cNvPicPr>
+          <p:nvPr/>
+        </p:nvPicPr>
+        <p:blipFill>
+          <a:blip r:embed="rId4"/>
+          <a:srcRect/>
+          <a:stretch>
+            <a:fillRect/>
+          </a:stretch>
+        </p:blipFill>
+        <p:spPr bwMode="auto">
+          <a:xfrm>
+            <a:off x="1643042" y="3500438"/>
+            <a:ext cx="2143125" cy="2143125"/>
+          </a:xfrm>
+          <a:prstGeom prst="rect">
+            <a:avLst/>
+          </a:prstGeom>
+          <a:noFill/>
+        </p:spPr>
+      </p:pic>
+      <p:sp>
+        <p:nvSpPr>
+          <p:cNvPr id="10" name="Content Placeholder 3"/>
+          <p:cNvSpPr txBox="1">
+            <a:spLocks/>
+          </p:cNvSpPr>
+          <p:nvPr/>
+        </p:nvSpPr>
+        <p:spPr>
+          <a:xfrm>
+            <a:off x="1142976" y="3357562"/>
+            <a:ext cx="1550546" cy="492656"/>
+          </a:xfrm>
+          <a:prstGeom prst="rect">
+            <a:avLst/>
+          </a:prstGeom>
+        </p:spPr>
+        <p:txBody>
+          <a:bodyPr tIns="0"/>
+          <a:lstStyle>
+            <a:lvl1pPr marL="274320" indent="-274320" algn="l" rtl="0" eaLnBrk="1" latinLnBrk="0" hangingPunct="1">
+              <a:spcBef>
+                <a:spcPct val="20000"/>
+              </a:spcBef>
+              <a:buClrTx/>
+              <a:buSzPct val="95000"/>
+              <a:buFont typeface="Wingdings" pitchFamily="2" charset="2"/>
+              <a:buChar char="v"/>
+              <a:defRPr kumimoji="0" sz="2800" kern="1200">
+                <a:solidFill>
+                  <a:schemeClr val="tx1"/>
+                </a:solidFill>
+                <a:latin typeface="+mn-lt"/>
+                <a:ea typeface="+mn-ea"/>
+                <a:cs typeface="+mn-cs"/>
+              </a:defRPr>
+            </a:lvl1pPr>
+            <a:lvl2pPr marL="640080" indent="-246888" algn="l" rtl="0" eaLnBrk="1" latinLnBrk="0" hangingPunct="1">
+              <a:spcBef>
+                <a:spcPct val="20000"/>
+              </a:spcBef>
+              <a:buClrTx/>
+              <a:buSzPct val="85000"/>
+              <a:buFont typeface="Courier New" pitchFamily="49" charset="0"/>
+              <a:buChar char="o"/>
+              <a:defRPr kumimoji="0" sz="2600" kern="1200">
+                <a:solidFill>
+                  <a:schemeClr val="tx1"/>
+                </a:solidFill>
+                <a:latin typeface="+mn-lt"/>
+                <a:ea typeface="+mn-ea"/>
+                <a:cs typeface="+mn-cs"/>
+              </a:defRPr>
+            </a:lvl2pPr>
+            <a:lvl3pPr marL="914400" indent="-246888" algn="l" rtl="0" eaLnBrk="1" latinLnBrk="0" hangingPunct="1">
+              <a:spcBef>
+                <a:spcPct val="20000"/>
+              </a:spcBef>
+              <a:buClrTx/>
+              <a:buSzPct val="70000"/>
+              <a:buFont typeface="Wingdings 2"/>
+              <a:buChar char=""/>
+              <a:defRPr kumimoji="0" sz="2400" kern="1200">
+                <a:solidFill>
+                  <a:schemeClr val="tx1"/>
+                </a:solidFill>
+                <a:latin typeface="+mn-lt"/>
+                <a:ea typeface="+mn-ea"/>
+                <a:cs typeface="+mn-cs"/>
+              </a:defRPr>
+            </a:lvl3pPr>
+            <a:lvl4pPr marL="1188720" indent="-210312" algn="l" rtl="0" eaLnBrk="1" latinLnBrk="0" hangingPunct="1">
+              <a:spcBef>
+                <a:spcPct val="20000"/>
+              </a:spcBef>
+              <a:buClrTx/>
+              <a:buSzPct val="65000"/>
+              <a:buFont typeface="Wingdings 2"/>
+              <a:buChar char=""/>
+              <a:defRPr kumimoji="0" sz="2000" kern="1200">
+                <a:solidFill>
+                  <a:schemeClr val="tx1"/>
+                </a:solidFill>
+                <a:latin typeface="+mn-lt"/>
+                <a:ea typeface="+mn-ea"/>
+                <a:cs typeface="+mn-cs"/>
+              </a:defRPr>
+            </a:lvl4pPr>
+            <a:lvl5pPr marL="1463040" indent="-210312" algn="l" rtl="0" eaLnBrk="1" latinLnBrk="0" hangingPunct="1">
+              <a:spcBef>
+                <a:spcPct val="20000"/>
+              </a:spcBef>
+              <a:buClrTx/>
+              <a:buSzPct val="65000"/>
+              <a:buFont typeface="Wingdings 2"/>
+              <a:buChar char=""/>
+              <a:defRPr kumimoji="0" sz="1800" kern="1200">
+                <a:solidFill>
+                  <a:schemeClr val="tx1"/>
+                </a:solidFill>
+                <a:latin typeface="+mn-lt"/>
+                <a:ea typeface="+mn-ea"/>
+                <a:cs typeface="+mn-cs"/>
+              </a:defRPr>
+            </a:lvl5pPr>
+            <a:lvl6pPr marL="1737360" indent="-210312" algn="l" rtl="0" eaLnBrk="1" latinLnBrk="0" hangingPunct="1">
+              <a:spcBef>
+                <a:spcPct val="20000"/>
+              </a:spcBef>
+              <a:buClr>
+                <a:schemeClr val="accent5"/>
+              </a:buClr>
+              <a:buSzPct val="80000"/>
+              <a:buFont typeface="Wingdings 2"/>
+              <a:buChar char=""/>
+              <a:defRPr kumimoji="0" sz="1800" kern="1200">
+                <a:solidFill>
+                  <a:schemeClr val="tx1"/>
+                </a:solidFill>
+                <a:latin typeface="+mn-lt"/>
+                <a:ea typeface="+mn-ea"/>
+                <a:cs typeface="+mn-cs"/>
+              </a:defRPr>
+            </a:lvl6pPr>
+            <a:lvl7pPr marL="1920240" indent="-182880" algn="l" rtl="0" eaLnBrk="1" latinLnBrk="0" hangingPunct="1">
+              <a:spcBef>
+                <a:spcPct val="20000"/>
+              </a:spcBef>
+              <a:buClr>
+                <a:schemeClr val="accent6"/>
+              </a:buClr>
+              <a:buSzPct val="80000"/>
+              <a:buFont typeface="Wingdings 2"/>
+              <a:buChar char=""/>
+              <a:defRPr kumimoji="0" sz="1600" kern="1200" baseline="0">
+                <a:solidFill>
+                  <a:schemeClr val="tx1"/>
+                </a:solidFill>
+                <a:latin typeface="+mn-lt"/>
+                <a:ea typeface="+mn-ea"/>
+                <a:cs typeface="+mn-cs"/>
+              </a:defRPr>
+            </a:lvl7pPr>
+            <a:lvl8pPr marL="2194560" indent="-182880" algn="l" rtl="0" eaLnBrk="1" latinLnBrk="0" hangingPunct="1">
+              <a:spcBef>
+                <a:spcPct val="20000"/>
+              </a:spcBef>
+              <a:buClr>
+                <a:schemeClr val="tx2"/>
+              </a:buClr>
+              <a:buChar char="•"/>
+              <a:defRPr kumimoji="0" sz="1600" kern="1200">
+                <a:solidFill>
+                  <a:schemeClr val="tx1"/>
+                </a:solidFill>
+                <a:latin typeface="+mn-lt"/>
+                <a:ea typeface="+mn-ea"/>
+                <a:cs typeface="+mn-cs"/>
+              </a:defRPr>
+            </a:lvl8pPr>
+            <a:lvl9pPr marL="2468880" indent="-182880" algn="l" rtl="0" eaLnBrk="1" latinLnBrk="0" hangingPunct="1">
+              <a:spcBef>
+                <a:spcPct val="20000"/>
+              </a:spcBef>
+              <a:buClr>
+                <a:schemeClr val="tx2"/>
+              </a:buClr>
+              <a:buFontTx/>
+              <a:buChar char="•"/>
+              <a:defRPr kumimoji="0" sz="1400" kern="1200" baseline="0">
+                <a:solidFill>
+                  <a:schemeClr val="tx1"/>
+                </a:solidFill>
+                <a:latin typeface="+mn-lt"/>
+                <a:ea typeface="+mn-ea"/>
+                <a:cs typeface="+mn-cs"/>
+              </a:defRPr>
+            </a:lvl9pPr>
+          </a:lstStyle>
+          <a:p>
+            <a:pPr marL="0" indent="0">
+              <a:buNone/>
+            </a:pPr>
+            <a:r>
+              <a:rPr lang="it-IT" b="1" i="1" dirty="0" err="1" smtClean="0">
+                <a:solidFill>
+                  <a:srgbClr val="0070C0"/>
+                </a:solidFill>
+              </a:rPr>
+              <a:t>Build</a:t>
+            </a:r>
+            <a:endParaRPr lang="en-US" b="1" dirty="0">
+              <a:solidFill>
+                <a:srgbClr val="B48900"/>
+              </a:solidFill>
+            </a:endParaRPr>
+          </a:p>
+        </p:txBody>
+      </p:sp>
     </p:spTree>
     <p:extLst>
       <p:ext uri="{BB962C8B-B14F-4D97-AF65-F5344CB8AC3E}">
-        <p14:creationId xmlns:p14="http://schemas.microsoft.com/office/powerpoint/2010/main" val="1111877724"/>
+        <p14:creationId xmlns="" xmlns:p14="http://schemas.microsoft.com/office/powerpoint/2010/main" val="1111877724"/>
       </p:ext>
     </p:extLst>
   </p:cSld>
   <p:clrMapOvr>
     <a:masterClrMapping/>
   </p:clrMapOvr>
-  <mc:AlternateContent xmlns:mc="http://schemas.openxmlformats.org/markup-compatibility/2006" xmlns:p14="http://schemas.microsoft.com/office/powerpoint/2010/main">
-    <mc:Choice Requires="p14">
+  <mc:AlternateContent xmlns:mc="http://schemas.openxmlformats.org/markup-compatibility/2006">
+    <mc:Choice xmlns="" xmlns:p14="http://schemas.microsoft.com/office/powerpoint/2010/main" Requires="p14">
       <p:transition spd="slow" p14:dur="2000"/>
     </mc:Choice>
-    <mc:Fallback xmlns="">
+    <mc:Fallback>
       <p:transition spd="slow"/>
     </mc:Fallback>
   </mc:AlternateContent>
@@ -18860,6 +18966,9 @@
                     <p:cTn id="3" fill="hold">
                       <p:stCondLst>
                         <p:cond delay="indefinite"/>
+                        <p:cond evt="onBegin" delay="0">
+                          <p:tn val="2"/>
+                        </p:cond>
                       </p:stCondLst>
                       <p:childTnLst>
                         <p:par>
@@ -18869,7 +18978,7 @@
                             </p:stCondLst>
                             <p:childTnLst>
                               <p:par>
-                                <p:cTn id="5" presetID="10" presetClass="entr" presetSubtype="0" fill="hold" grpId="0" nodeType="clickEffect">
+                                <p:cTn id="5" presetID="10" presetClass="entr" presetSubtype="0" fill="hold" grpId="0" nodeType="withEffect">
                                   <p:stCondLst>
                                     <p:cond delay="0"/>
                                   </p:stCondLst>
@@ -18917,7 +19026,7 @@
                                           </p:stCondLst>
                                         </p:cTn>
                                         <p:tgtEl>
-                                          <p:spTgt spid="3074"/>
+                                          <p:spTgt spid="4098"/>
                                         </p:tgtEl>
                                         <p:attrNameLst>
                                           <p:attrName>style.visibility</p:attrName>
@@ -18931,7 +19040,7 @@
                                       <p:cBhvr>
                                         <p:cTn id="10" dur="500"/>
                                         <p:tgtEl>
-                                          <p:spTgt spid="3074"/>
+                                          <p:spTgt spid="4098"/>
                                         </p:tgtEl>
                                       </p:cBhvr>
                                     </p:animEffect>
@@ -19143,10 +19252,10 @@
       </p:par>
     </p:tnLst>
     <p:bldLst>
-      <p:bldP spid="10" grpId="0"/>
       <p:bldP spid="2" grpId="0"/>
       <p:bldP spid="2" grpId="1"/>
       <p:bldP spid="11" grpId="0"/>
+      <p:bldP spid="10" grpId="0"/>
     </p:bldLst>
   </p:timing>
 </p:sld>
@@ -19220,7 +19329,7 @@
           <p:nvPr>
             <p:extLst>
               <p:ext uri="{D42A27DB-BD31-4B8C-83A1-F6EECF244321}">
-                <p14:modId xmlns:p14="http://schemas.microsoft.com/office/powerpoint/2010/main" val="2643884637"/>
+                <p14:modId xmlns="" xmlns:p14="http://schemas.microsoft.com/office/powerpoint/2010/main" val="2643884637"/>
               </p:ext>
             </p:extLst>
           </p:nvPr>
@@ -19661,14 +19770,14 @@
           <a:effectLst/>
           <a:extLst>
             <a:ext uri="{909E8E84-426E-40DD-AFC4-6F175D3DCCD1}">
-              <a14:hiddenFill xmlns:a14="http://schemas.microsoft.com/office/drawing/2010/main">
+              <a14:hiddenFill xmlns="" xmlns:a14="http://schemas.microsoft.com/office/drawing/2010/main">
                 <a:solidFill>
                   <a:schemeClr val="accent1"/>
                 </a:solidFill>
               </a14:hiddenFill>
             </a:ext>
             <a:ext uri="{91240B29-F687-4F45-9708-019B960494DF}">
-              <a14:hiddenLine xmlns:a14="http://schemas.microsoft.com/office/drawing/2010/main" w="9525">
+              <a14:hiddenLine xmlns="" xmlns:a14="http://schemas.microsoft.com/office/drawing/2010/main" w="9525">
                 <a:solidFill>
                   <a:schemeClr val="tx1"/>
                 </a:solidFill>
@@ -19678,7 +19787,7 @@
               </a14:hiddenLine>
             </a:ext>
             <a:ext uri="{AF507438-7753-43E0-B8FC-AC1667EBCBE1}">
-              <a14:hiddenEffects xmlns:a14="http://schemas.microsoft.com/office/drawing/2010/main">
+              <a14:hiddenEffects xmlns="" xmlns:a14="http://schemas.microsoft.com/office/drawing/2010/main">
                 <a:effectLst>
                   <a:outerShdw dist="35921" dir="2700000" algn="ctr" rotWithShape="0">
                     <a:schemeClr val="bg2"/>
@@ -19759,7 +19868,7 @@
     </p:spTree>
     <p:extLst>
       <p:ext uri="{BB962C8B-B14F-4D97-AF65-F5344CB8AC3E}">
-        <p14:creationId xmlns:p14="http://schemas.microsoft.com/office/powerpoint/2010/main" val="503117530"/>
+        <p14:creationId xmlns="" xmlns:p14="http://schemas.microsoft.com/office/powerpoint/2010/main" val="503117530"/>
       </p:ext>
     </p:extLst>
   </p:cSld>
@@ -19844,7 +19953,7 @@
           <p:nvPr>
             <p:extLst>
               <p:ext uri="{D42A27DB-BD31-4B8C-83A1-F6EECF244321}">
-                <p14:modId xmlns:p14="http://schemas.microsoft.com/office/powerpoint/2010/main" val="722892891"/>
+                <p14:modId xmlns="" xmlns:p14="http://schemas.microsoft.com/office/powerpoint/2010/main" val="722892891"/>
               </p:ext>
             </p:extLst>
           </p:nvPr>
@@ -20826,7 +20935,7 @@
     </p:spTree>
     <p:extLst>
       <p:ext uri="{BB962C8B-B14F-4D97-AF65-F5344CB8AC3E}">
-        <p14:creationId xmlns:p14="http://schemas.microsoft.com/office/powerpoint/2010/main" val="2473970557"/>
+        <p14:creationId xmlns="" xmlns:p14="http://schemas.microsoft.com/office/powerpoint/2010/main" val="2473970557"/>
       </p:ext>
     </p:extLst>
   </p:cSld>
@@ -20872,7 +20981,7 @@
           <a:blip r:embed="rId3">
             <a:extLst>
               <a:ext uri="{28A0092B-C50C-407E-A947-70E740481C1C}">
-                <a14:useLocalDpi xmlns:a14="http://schemas.microsoft.com/office/drawing/2010/main" val="0"/>
+                <a14:useLocalDpi xmlns="" xmlns:a14="http://schemas.microsoft.com/office/drawing/2010/main" val="0"/>
               </a:ext>
             </a:extLst>
           </a:blip>
@@ -20915,7 +21024,7 @@
           </a:sp3d>
           <a:extLst>
             <a:ext uri="{909E8E84-426E-40DD-AFC4-6F175D3DCCD1}">
-              <a14:hiddenFill xmlns:a14="http://schemas.microsoft.com/office/drawing/2010/main">
+              <a14:hiddenFill xmlns="" xmlns:a14="http://schemas.microsoft.com/office/drawing/2010/main">
                 <a:solidFill>
                   <a:srgbClr val="FFFFFF"/>
                 </a:solidFill>
@@ -21254,7 +21363,7 @@
           <a:blip r:embed="rId3">
             <a:extLst>
               <a:ext uri="{28A0092B-C50C-407E-A947-70E740481C1C}">
-                <a14:useLocalDpi xmlns:a14="http://schemas.microsoft.com/office/drawing/2010/main" val="0"/>
+                <a14:useLocalDpi xmlns="" xmlns:a14="http://schemas.microsoft.com/office/drawing/2010/main" val="0"/>
               </a:ext>
             </a:extLst>
           </a:blip>
@@ -21278,14 +21387,14 @@
           <a:effectLst/>
           <a:extLst>
             <a:ext uri="{909E8E84-426E-40DD-AFC4-6F175D3DCCD1}">
-              <a14:hiddenFill xmlns:a14="http://schemas.microsoft.com/office/drawing/2010/main">
+              <a14:hiddenFill xmlns="" xmlns:a14="http://schemas.microsoft.com/office/drawing/2010/main">
                 <a:solidFill>
                   <a:schemeClr val="accent1"/>
                 </a:solidFill>
               </a14:hiddenFill>
             </a:ext>
             <a:ext uri="{91240B29-F687-4F45-9708-019B960494DF}">
-              <a14:hiddenLine xmlns:a14="http://schemas.microsoft.com/office/drawing/2010/main" w="9525">
+              <a14:hiddenLine xmlns="" xmlns:a14="http://schemas.microsoft.com/office/drawing/2010/main" w="9525">
                 <a:solidFill>
                   <a:schemeClr val="tx1"/>
                 </a:solidFill>
@@ -21295,7 +21404,7 @@
               </a14:hiddenLine>
             </a:ext>
             <a:ext uri="{AF507438-7753-43E0-B8FC-AC1667EBCBE1}">
-              <a14:hiddenEffects xmlns:a14="http://schemas.microsoft.com/office/drawing/2010/main">
+              <a14:hiddenEffects xmlns="" xmlns:a14="http://schemas.microsoft.com/office/drawing/2010/main">
                 <a:effectLst>
                   <a:outerShdw dist="35921" dir="2700000" algn="ctr" rotWithShape="0">
                     <a:schemeClr val="bg2"/>
@@ -21396,14 +21505,14 @@
           <a:effectLst/>
           <a:extLst>
             <a:ext uri="{909E8E84-426E-40DD-AFC4-6F175D3DCCD1}">
-              <a14:hiddenFill xmlns:a14="http://schemas.microsoft.com/office/drawing/2010/main">
+              <a14:hiddenFill xmlns="" xmlns:a14="http://schemas.microsoft.com/office/drawing/2010/main">
                 <a:solidFill>
                   <a:schemeClr val="accent1"/>
                 </a:solidFill>
               </a14:hiddenFill>
             </a:ext>
             <a:ext uri="{91240B29-F687-4F45-9708-019B960494DF}">
-              <a14:hiddenLine xmlns:a14="http://schemas.microsoft.com/office/drawing/2010/main" w="9525">
+              <a14:hiddenLine xmlns="" xmlns:a14="http://schemas.microsoft.com/office/drawing/2010/main" w="9525">
                 <a:solidFill>
                   <a:schemeClr val="tx1"/>
                 </a:solidFill>
@@ -21413,7 +21522,7 @@
               </a14:hiddenLine>
             </a:ext>
             <a:ext uri="{AF507438-7753-43E0-B8FC-AC1667EBCBE1}">
-              <a14:hiddenEffects xmlns:a14="http://schemas.microsoft.com/office/drawing/2010/main">
+              <a14:hiddenEffects xmlns="" xmlns:a14="http://schemas.microsoft.com/office/drawing/2010/main">
                 <a:effectLst>
                   <a:outerShdw dist="35921" dir="2700000" algn="ctr" rotWithShape="0">
                     <a:schemeClr val="bg2"/>
@@ -21861,7 +21970,7 @@
     </p:spTree>
     <p:extLst>
       <p:ext uri="{BB962C8B-B14F-4D97-AF65-F5344CB8AC3E}">
-        <p14:creationId xmlns:p14="http://schemas.microsoft.com/office/powerpoint/2010/main" val="3312797979"/>
+        <p14:creationId xmlns="" xmlns:p14="http://schemas.microsoft.com/office/powerpoint/2010/main" val="3312797979"/>
       </p:ext>
     </p:extLst>
   </p:cSld>
@@ -21912,8 +22021,8 @@
         </p:blipFill>
         <p:spPr bwMode="auto">
           <a:xfrm>
-            <a:off x="6242027" y="4623456"/>
-            <a:ext cx="3021943" cy="2214554"/>
+            <a:off x="5781891" y="4286256"/>
+            <a:ext cx="3482080" cy="2551754"/>
           </a:xfrm>
           <a:prstGeom prst="rect">
             <a:avLst/>
@@ -21938,8 +22047,8 @@
         </p:blipFill>
         <p:spPr bwMode="auto">
           <a:xfrm>
-            <a:off x="7331040" y="1119972"/>
-            <a:ext cx="1361338" cy="1474783"/>
+            <a:off x="6824739" y="1119972"/>
+            <a:ext cx="1867639" cy="2023276"/>
           </a:xfrm>
           <a:prstGeom prst="rect">
             <a:avLst/>
@@ -23248,13 +23357,8 @@
             </a:r>
             <a:r>
               <a:rPr lang="en-US" dirty="0" smtClean="0"/>
-              <a:t> </a:t>
-            </a:r>
-            <a:r>
-              <a:rPr lang="en-US" dirty="0" smtClean="0"/>
-              <a:t>21/12/2012</a:t>
-            </a:r>
-            <a:endParaRPr lang="en-US" dirty="0" smtClean="0"/>
+              <a:t> 21/12/2012</a:t>
+            </a:r>
           </a:p>
           <a:p>
             <a:pPr marL="0" indent="0"/>
@@ -23262,21 +23366,52 @@
           </a:p>
         </p:txBody>
       </p:sp>
+      <p:pic>
+        <p:nvPicPr>
+          <p:cNvPr id="5122" name="Picture 2" descr="D:\Tony\Omini\omino_orologio5.jpg"/>
+          <p:cNvPicPr>
+            <a:picLocks noChangeAspect="1" noChangeArrowheads="1"/>
+          </p:cNvPicPr>
+          <p:nvPr/>
+        </p:nvPicPr>
+        <p:blipFill>
+          <a:blip r:embed="rId3"/>
+          <a:srcRect/>
+          <a:stretch>
+            <a:fillRect/>
+          </a:stretch>
+        </p:blipFill>
+        <p:spPr bwMode="auto">
+          <a:xfrm>
+            <a:off x="7429520" y="1495652"/>
+            <a:ext cx="1500198" cy="1466611"/>
+          </a:xfrm>
+          <a:prstGeom prst="rect">
+            <a:avLst/>
+          </a:prstGeom>
+          <a:ln>
+            <a:noFill/>
+          </a:ln>
+          <a:effectLst>
+            <a:softEdge rad="112500"/>
+          </a:effectLst>
+        </p:spPr>
+      </p:pic>
     </p:spTree>
     <p:extLst>
       <p:ext uri="{BB962C8B-B14F-4D97-AF65-F5344CB8AC3E}">
-        <p14:creationId xmlns:p14="http://schemas.microsoft.com/office/powerpoint/2010/main" val="155874689"/>
+        <p14:creationId xmlns="" xmlns:p14="http://schemas.microsoft.com/office/powerpoint/2010/main" val="155874689"/>
       </p:ext>
     </p:extLst>
   </p:cSld>
   <p:clrMapOvr>
     <a:masterClrMapping/>
   </p:clrMapOvr>
-  <mc:AlternateContent xmlns:mc="http://schemas.openxmlformats.org/markup-compatibility/2006" xmlns:p14="http://schemas.microsoft.com/office/powerpoint/2010/main">
-    <mc:Choice Requires="p14">
+  <mc:AlternateContent xmlns:mc="http://schemas.openxmlformats.org/markup-compatibility/2006">
+    <mc:Choice xmlns="" xmlns:p14="http://schemas.microsoft.com/office/powerpoint/2010/main" Requires="p14">
       <p:transition spd="slow" p14:dur="2000"/>
     </mc:Choice>
-    <mc:Fallback xmlns="">
+    <mc:Fallback>
       <p:transition spd="slow"/>
     </mc:Fallback>
   </mc:AlternateContent>
@@ -23880,7 +24015,7 @@
           <p:nvPr>
             <p:extLst>
               <p:ext uri="{D42A27DB-BD31-4B8C-83A1-F6EECF244321}">
-                <p14:modId xmlns:p14="http://schemas.microsoft.com/office/powerpoint/2010/main" val="3382119601"/>
+                <p14:modId xmlns="" xmlns:p14="http://schemas.microsoft.com/office/powerpoint/2010/main" val="3382119601"/>
               </p:ext>
             </p:extLst>
           </p:nvPr>
@@ -24282,15 +24417,7 @@
             </a:r>
             <a:r>
               <a:rPr lang="it-IT" b="1" dirty="0" smtClean="0"/>
-              <a:t>: </a:t>
-            </a:r>
-            <a:r>
-              <a:rPr lang="it-IT" b="1" dirty="0" smtClean="0"/>
-              <a:t>SC_H_49_Compilazione </a:t>
-            </a:r>
-            <a:r>
-              <a:rPr lang="it-IT" b="1" dirty="0" smtClean="0"/>
-              <a:t>questionario</a:t>
+              <a:t>: SC_H_49_Compilazione questionario</a:t>
             </a:r>
             <a:endParaRPr lang="it-IT" b="1" dirty="0"/>
           </a:p>
@@ -24693,11 +24820,7 @@
             </a:r>
             <a:r>
               <a:rPr lang="en-US" sz="3000" dirty="0" smtClean="0"/>
-              <a:t> </a:t>
-            </a:r>
-            <a:r>
-              <a:rPr lang="en-US" sz="3000" dirty="0" smtClean="0"/>
-              <a:t>commentate</a:t>
+              <a:t> commentate</a:t>
             </a:r>
           </a:p>
           <a:p>
@@ -24776,8 +24899,8 @@
         </p:blipFill>
         <p:spPr bwMode="auto">
           <a:xfrm>
-            <a:off x="7236296" y="3645024"/>
-            <a:ext cx="1039324" cy="1466847"/>
+            <a:off x="7236296" y="3528455"/>
+            <a:ext cx="1121918" cy="1583416"/>
           </a:xfrm>
           <a:prstGeom prst="rect">
             <a:avLst/>
@@ -25420,11 +25543,7 @@
             </a:r>
             <a:r>
               <a:rPr lang="en-US" sz="3000" dirty="0" smtClean="0"/>
-              <a:t> </a:t>
-            </a:r>
-            <a:r>
-              <a:rPr lang="en-US" sz="3000" dirty="0" smtClean="0"/>
-              <a:t>ai requisiti e </a:t>
+              <a:t> ai requisiti e </a:t>
             </a:r>
             <a:r>
               <a:rPr lang="en-US" sz="3000" dirty="0" err="1" smtClean="0"/>
@@ -25432,11 +25551,7 @@
             </a:r>
             <a:r>
               <a:rPr lang="en-US" sz="3000" dirty="0" smtClean="0"/>
-              <a:t> </a:t>
-            </a:r>
-            <a:r>
-              <a:rPr lang="en-US" sz="3000" dirty="0" smtClean="0"/>
-              <a:t>aspettative del </a:t>
+              <a:t> aspettative del </a:t>
             </a:r>
             <a:r>
               <a:rPr lang="en-US" sz="3000" dirty="0" err="1" smtClean="0"/>
@@ -26311,9 +26426,11 @@
             </a:lvl9pPr>
           </a:lstStyle>
           <a:p>
-            <a:pPr algn="just"/>
-            <a:r>
-              <a:rPr lang="it-IT" sz="1400" dirty="0" smtClean="0">
+            <a:pPr algn="just">
+              <a:buNone/>
+            </a:pPr>
+            <a:r>
+              <a:rPr lang="it-IT" sz="2200" dirty="0" smtClean="0">
                 <a:latin typeface="+mj-lt"/>
                 <a:cs typeface="Arial" pitchFamily="34" charset="0"/>
               </a:rPr>
@@ -26323,7 +26440,7 @@
           <a:p>
             <a:pPr algn="just"/>
             <a:r>
-              <a:rPr lang="it-IT" sz="1400" dirty="0" smtClean="0">
+              <a:rPr lang="it-IT" sz="1800" dirty="0" smtClean="0">
                 <a:latin typeface="+mj-lt"/>
                 <a:cs typeface="Arial" pitchFamily="34" charset="0"/>
               </a:rPr>
@@ -26336,21 +26453,21 @@
               <a:buChar char="-"/>
             </a:pPr>
             <a:r>
-              <a:rPr lang="it-IT" sz="1400" dirty="0" smtClean="0">
+              <a:rPr lang="it-IT" sz="1800" dirty="0" smtClean="0">
                 <a:latin typeface="+mj-lt"/>
                 <a:cs typeface="Arial" pitchFamily="34" charset="0"/>
               </a:rPr>
               <a:t>Classe: </a:t>
             </a:r>
             <a:r>
-              <a:rPr lang="it-IT" sz="1400" dirty="0" err="1" smtClean="0">
+              <a:rPr lang="it-IT" sz="1800" dirty="0" err="1" smtClean="0">
                 <a:latin typeface="+mj-lt"/>
                 <a:cs typeface="Arial" pitchFamily="34" charset="0"/>
               </a:rPr>
               <a:t>ControlQuestionari</a:t>
             </a:r>
             <a:r>
-              <a:rPr lang="it-IT" sz="1400" dirty="0" smtClean="0">
+              <a:rPr lang="it-IT" sz="1800" dirty="0" smtClean="0">
                 <a:latin typeface="+mj-lt"/>
                 <a:cs typeface="Arial" pitchFamily="34" charset="0"/>
               </a:rPr>
@@ -26363,22 +26480,32 @@
               <a:buChar char="-"/>
             </a:pPr>
             <a:r>
-              <a:rPr lang="it-IT" sz="1400" dirty="0" smtClean="0">
+              <a:rPr lang="it-IT" sz="1800" dirty="0" smtClean="0">
                 <a:latin typeface="+mj-lt"/>
                 <a:cs typeface="Arial" pitchFamily="34" charset="0"/>
               </a:rPr>
               <a:t>Metodo: </a:t>
             </a:r>
+            <a:endParaRPr lang="it-IT" sz="1800" b="1" dirty="0" smtClean="0">
+              <a:latin typeface="+mj-lt"/>
+              <a:cs typeface="Arial" pitchFamily="34" charset="0"/>
+            </a:endParaRPr>
           </a:p>
           <a:p>
             <a:pPr marL="285750" indent="-285750" algn="just">
               <a:buFontTx/>
               <a:buChar char="-"/>
             </a:pPr>
-            <a:endParaRPr lang="it-IT" sz="1400" dirty="0" smtClean="0">
-              <a:latin typeface="+mj-lt"/>
-              <a:cs typeface="Arial" pitchFamily="34" charset="0"/>
-            </a:endParaRPr>
+            <a:r>
+              <a:rPr lang="it-IT" sz="1800" b="1" dirty="0" smtClean="0">
+                <a:solidFill>
+                  <a:srgbClr val="0070C0"/>
+                </a:solidFill>
+                <a:latin typeface="+mj-lt"/>
+                <a:cs typeface="Arial" pitchFamily="34" charset="0"/>
+              </a:rPr>
+              <a:t>/**</a:t>
+            </a:r>
           </a:p>
           <a:p>
             <a:pPr marL="285750" indent="-285750" algn="just">
@@ -26386,11 +26513,34 @@
               <a:buChar char="-"/>
             </a:pPr>
             <a:r>
-              <a:rPr lang="it-IT" sz="1400" b="1" dirty="0" smtClean="0">
+              <a:rPr lang="it-IT" sz="1800" b="1" dirty="0" smtClean="0">
+                <a:solidFill>
+                  <a:srgbClr val="0070C0"/>
+                </a:solidFill>
                 <a:latin typeface="+mj-lt"/>
                 <a:cs typeface="Arial" pitchFamily="34" charset="0"/>
               </a:rPr>
-              <a:t>/**</a:t>
+              <a:t>* Metodo che controlla se il questionario è </a:t>
+            </a:r>
+            <a:r>
+              <a:rPr lang="it-IT" sz="1800" b="1" i="1" dirty="0" smtClean="0">
+                <a:solidFill>
+                  <a:srgbClr val="0070C0"/>
+                </a:solidFill>
+                <a:latin typeface="+mj-lt"/>
+                <a:cs typeface="Arial" pitchFamily="34" charset="0"/>
+              </a:rPr>
+              <a:t>editabile </a:t>
+            </a:r>
+            <a:r>
+              <a:rPr lang="it-IT" sz="1800" b="1" dirty="0" smtClean="0">
+                <a:solidFill>
+                  <a:srgbClr val="0070C0"/>
+                </a:solidFill>
+                <a:latin typeface="+mj-lt"/>
+                <a:cs typeface="Arial" pitchFamily="34" charset="0"/>
+              </a:rPr>
+              <a:t>(modificabile o cancellabile)</a:t>
             </a:r>
           </a:p>
           <a:p>
@@ -26399,32 +26549,14 @@
               <a:buChar char="-"/>
             </a:pPr>
             <a:r>
-              <a:rPr lang="it-IT" sz="1400" b="1" dirty="0" smtClean="0">
+              <a:rPr lang="it-IT" sz="1800" b="1" dirty="0" smtClean="0">
+                <a:solidFill>
+                  <a:srgbClr val="0070C0"/>
+                </a:solidFill>
                 <a:latin typeface="+mj-lt"/>
                 <a:cs typeface="Arial" pitchFamily="34" charset="0"/>
               </a:rPr>
-              <a:t>* </a:t>
-            </a:r>
-            <a:r>
-              <a:rPr lang="it-IT" sz="1400" dirty="0" smtClean="0">
-                <a:latin typeface="+mj-lt"/>
-                <a:cs typeface="Arial" pitchFamily="34" charset="0"/>
-              </a:rPr>
-              <a:t>metodo che controlla se il questionario è </a:t>
-            </a:r>
-            <a:r>
-              <a:rPr lang="it-IT" sz="1400" i="1" dirty="0" smtClean="0">
-                <a:latin typeface="+mj-lt"/>
-                <a:cs typeface="Arial" pitchFamily="34" charset="0"/>
-              </a:rPr>
-              <a:t>editabile </a:t>
-            </a:r>
-            <a:r>
-              <a:rPr lang="it-IT" sz="1400" dirty="0" smtClean="0">
-                <a:latin typeface="+mj-lt"/>
-                <a:cs typeface="Arial" pitchFamily="34" charset="0"/>
-              </a:rPr>
-              <a:t>(modificabile o cancellabile)</a:t>
+              <a:t>* un questionario è editabile se non è in vigore.</a:t>
             </a:r>
           </a:p>
           <a:p>
@@ -26433,18 +26565,14 @@
               <a:buChar char="-"/>
             </a:pPr>
             <a:r>
-              <a:rPr lang="it-IT" sz="1400" b="1" dirty="0" smtClean="0">
+              <a:rPr lang="it-IT" sz="1800" b="1" dirty="0" smtClean="0">
+                <a:solidFill>
+                  <a:srgbClr val="0070C0"/>
+                </a:solidFill>
                 <a:latin typeface="+mj-lt"/>
                 <a:cs typeface="Arial" pitchFamily="34" charset="0"/>
               </a:rPr>
-              <a:t>* </a:t>
-            </a:r>
-            <a:r>
-              <a:rPr lang="it-IT" sz="1400" dirty="0" smtClean="0">
-                <a:latin typeface="+mj-lt"/>
-                <a:cs typeface="Arial" pitchFamily="34" charset="0"/>
-              </a:rPr>
-              <a:t>un questionario è editabile se non è in vigore.</a:t>
+              <a:t>* Un questionario è in vigore se la data odierna è compresa tra la data di inizio del questionario e </a:t>
             </a:r>
           </a:p>
           <a:p>
@@ -26453,18 +26581,14 @@
               <a:buChar char="-"/>
             </a:pPr>
             <a:r>
-              <a:rPr lang="it-IT" sz="1400" b="1" dirty="0" smtClean="0">
+              <a:rPr lang="it-IT" sz="1800" b="1" dirty="0" smtClean="0">
+                <a:solidFill>
+                  <a:srgbClr val="0070C0"/>
+                </a:solidFill>
                 <a:latin typeface="+mj-lt"/>
                 <a:cs typeface="Arial" pitchFamily="34" charset="0"/>
               </a:rPr>
-              <a:t>* </a:t>
-            </a:r>
-            <a:r>
-              <a:rPr lang="it-IT" sz="1400" dirty="0" smtClean="0">
-                <a:latin typeface="+mj-lt"/>
-                <a:cs typeface="Arial" pitchFamily="34" charset="0"/>
-              </a:rPr>
-              <a:t>Un questionario è in vigore se la data odierna è compresa tra la data di inizio del questionario e la sua data * * di fine</a:t>
+              <a:t>* la sua data di fine</a:t>
             </a:r>
           </a:p>
           <a:p>
@@ -26473,32 +26597,14 @@
               <a:buChar char="-"/>
             </a:pPr>
             <a:r>
-              <a:rPr lang="it-IT" sz="1400" b="1" dirty="0" smtClean="0">
+              <a:rPr lang="it-IT" sz="1800" b="1" dirty="0" smtClean="0">
+                <a:solidFill>
+                  <a:srgbClr val="0070C0"/>
+                </a:solidFill>
                 <a:latin typeface="+mj-lt"/>
                 <a:cs typeface="Arial" pitchFamily="34" charset="0"/>
               </a:rPr>
-              <a:t>*</a:t>
-            </a:r>
-            <a:r>
-              <a:rPr lang="it-IT" sz="1400" dirty="0" smtClean="0">
-                <a:latin typeface="+mj-lt"/>
-                <a:cs typeface="Arial" pitchFamily="34" charset="0"/>
-              </a:rPr>
-              <a:t>@</a:t>
-            </a:r>
-            <a:r>
-              <a:rPr lang="it-IT" sz="1400" dirty="0" err="1" smtClean="0">
-                <a:latin typeface="+mj-lt"/>
-                <a:cs typeface="Arial" pitchFamily="34" charset="0"/>
-              </a:rPr>
-              <a:t>param</a:t>
-            </a:r>
-            <a:r>
-              <a:rPr lang="it-IT" sz="1400" dirty="0" smtClean="0">
-                <a:latin typeface="+mj-lt"/>
-                <a:cs typeface="Arial" pitchFamily="34" charset="0"/>
-              </a:rPr>
-              <a:t>: Questionario q </a:t>
+              <a:t>*@param questionario</a:t>
             </a:r>
           </a:p>
           <a:p>
@@ -26507,70 +26613,30 @@
               <a:buChar char="-"/>
             </a:pPr>
             <a:r>
-              <a:rPr lang="it-IT" sz="1400" b="1" dirty="0" smtClean="0">
+              <a:rPr lang="it-IT" sz="1800" b="1" dirty="0" smtClean="0">
+                <a:solidFill>
+                  <a:srgbClr val="0070C0"/>
+                </a:solidFill>
                 <a:latin typeface="+mj-lt"/>
                 <a:cs typeface="Arial" pitchFamily="34" charset="0"/>
               </a:rPr>
-              <a:t>* </a:t>
-            </a:r>
-            <a:r>
-              <a:rPr lang="it-IT" sz="1400" dirty="0" smtClean="0">
-                <a:latin typeface="+mj-lt"/>
-                <a:cs typeface="Arial" pitchFamily="34" charset="0"/>
-              </a:rPr>
-              <a:t>@</a:t>
-            </a:r>
-            <a:r>
-              <a:rPr lang="it-IT" sz="1400" dirty="0" err="1" smtClean="0">
-                <a:latin typeface="+mj-lt"/>
-                <a:cs typeface="Arial" pitchFamily="34" charset="0"/>
-              </a:rPr>
-              <a:t>return</a:t>
-            </a:r>
-            <a:r>
-              <a:rPr lang="it-IT" sz="1400" dirty="0" smtClean="0">
-                <a:latin typeface="+mj-lt"/>
-                <a:cs typeface="Arial" pitchFamily="34" charset="0"/>
-              </a:rPr>
-              <a:t> : </a:t>
-            </a:r>
-            <a:r>
-              <a:rPr lang="it-IT" sz="1400" dirty="0" err="1" smtClean="0">
-                <a:latin typeface="+mj-lt"/>
-                <a:cs typeface="Arial" pitchFamily="34" charset="0"/>
-              </a:rPr>
-              <a:t>boolean</a:t>
-            </a:r>
-            <a:r>
-              <a:rPr lang="it-IT" sz="1400" dirty="0" smtClean="0">
-                <a:latin typeface="+mj-lt"/>
-                <a:cs typeface="Arial" pitchFamily="34" charset="0"/>
-              </a:rPr>
-              <a:t> , </a:t>
-            </a:r>
-            <a:r>
-              <a:rPr lang="it-IT" sz="1400" dirty="0" err="1" smtClean="0">
-                <a:latin typeface="+mj-lt"/>
-                <a:cs typeface="Arial" pitchFamily="34" charset="0"/>
-              </a:rPr>
-              <a:t>true</a:t>
-            </a:r>
-            <a:r>
-              <a:rPr lang="it-IT" sz="1400" dirty="0" smtClean="0">
-                <a:latin typeface="+mj-lt"/>
-                <a:cs typeface="Arial" pitchFamily="34" charset="0"/>
-              </a:rPr>
-              <a:t> se il questionario è </a:t>
-            </a:r>
-            <a:r>
-              <a:rPr lang="it-IT" sz="1400" i="1" dirty="0" smtClean="0">
+              <a:t>* @return  boolean , true se il questionario è </a:t>
+            </a:r>
+            <a:r>
+              <a:rPr lang="it-IT" sz="1800" b="1" i="1" dirty="0" smtClean="0">
+                <a:solidFill>
+                  <a:srgbClr val="0070C0"/>
+                </a:solidFill>
                 <a:latin typeface="+mj-lt"/>
                 <a:cs typeface="Arial" pitchFamily="34" charset="0"/>
               </a:rPr>
               <a:t>editabile</a:t>
             </a:r>
             <a:r>
-              <a:rPr lang="it-IT" sz="1400" dirty="0" smtClean="0">
+              <a:rPr lang="it-IT" sz="1800" b="1" dirty="0" smtClean="0">
+                <a:solidFill>
+                  <a:srgbClr val="0070C0"/>
+                </a:solidFill>
                 <a:latin typeface="+mj-lt"/>
                 <a:cs typeface="Arial" pitchFamily="34" charset="0"/>
               </a:rPr>
@@ -26583,41 +26649,49 @@
               <a:buChar char="-"/>
             </a:pPr>
             <a:r>
-              <a:rPr lang="it-IT" sz="1400" b="1" dirty="0" smtClean="0">
+              <a:rPr lang="it-IT" sz="1800" b="1" dirty="0" smtClean="0">
+                <a:solidFill>
+                  <a:srgbClr val="0070C0"/>
+                </a:solidFill>
                 <a:latin typeface="+mj-lt"/>
                 <a:cs typeface="Arial" pitchFamily="34" charset="0"/>
               </a:rPr>
-              <a:t>* </a:t>
-            </a:r>
-            <a:r>
-              <a:rPr lang="it-IT" sz="1400" dirty="0" smtClean="0">
-                <a:latin typeface="+mj-lt"/>
-                <a:cs typeface="Arial" pitchFamily="34" charset="0"/>
-              </a:rPr>
-              <a:t>@</a:t>
-            </a:r>
-            <a:r>
-              <a:rPr lang="it-IT" sz="1400" dirty="0" err="1" smtClean="0">
+              <a:t>* @</a:t>
+            </a:r>
+            <a:r>
+              <a:rPr lang="it-IT" sz="1800" b="1" dirty="0" err="1" smtClean="0">
+                <a:solidFill>
+                  <a:srgbClr val="0070C0"/>
+                </a:solidFill>
                 <a:latin typeface="+mj-lt"/>
                 <a:cs typeface="Arial" pitchFamily="34" charset="0"/>
               </a:rPr>
               <a:t>pre</a:t>
             </a:r>
             <a:r>
-              <a:rPr lang="it-IT" sz="1400" dirty="0" smtClean="0">
+              <a:rPr lang="it-IT" sz="1800" b="1" dirty="0" smtClean="0">
+                <a:solidFill>
+                  <a:srgbClr val="0070C0"/>
+                </a:solidFill>
                 <a:latin typeface="+mj-lt"/>
                 <a:cs typeface="Arial" pitchFamily="34" charset="0"/>
               </a:rPr>
               <a:t> : q!=</a:t>
             </a:r>
             <a:r>
-              <a:rPr lang="it-IT" sz="1400" dirty="0" err="1" smtClean="0">
+              <a:rPr lang="it-IT" sz="1800" b="1" dirty="0" err="1" smtClean="0">
+                <a:solidFill>
+                  <a:srgbClr val="0070C0"/>
+                </a:solidFill>
                 <a:latin typeface="+mj-lt"/>
                 <a:cs typeface="Arial" pitchFamily="34" charset="0"/>
               </a:rPr>
               <a:t>null</a:t>
             </a:r>
-            <a:endParaRPr lang="it-IT" sz="1400" b="1" dirty="0" smtClean="0">
+            <a:endParaRPr lang="it-IT" sz="1800" b="1" dirty="0" smtClean="0">
+              <a:solidFill>
+                <a:srgbClr val="0070C0"/>
+              </a:solidFill>
               <a:latin typeface="+mj-lt"/>
               <a:cs typeface="Arial" pitchFamily="34" charset="0"/>
             </a:endParaRPr>
@@ -26628,7 +26702,10 @@
               <a:buChar char="-"/>
             </a:pPr>
             <a:r>
-              <a:rPr lang="it-IT" sz="1400" b="1" dirty="0" smtClean="0">
+              <a:rPr lang="it-IT" sz="1800" b="1" dirty="0" smtClean="0">
+                <a:solidFill>
+                  <a:srgbClr val="0070C0"/>
+                </a:solidFill>
                 <a:latin typeface="+mj-lt"/>
                 <a:cs typeface="Arial" pitchFamily="34" charset="0"/>
               </a:rPr>
@@ -26641,7 +26718,7 @@
               <a:buChar char="-"/>
             </a:pPr>
             <a:r>
-              <a:rPr lang="it-IT" sz="1400" b="1" dirty="0" smtClean="0">
+              <a:rPr lang="it-IT" sz="1800" b="1" dirty="0" smtClean="0">
                 <a:solidFill>
                   <a:schemeClr val="accent5">
                     <a:lumMod val="50000"/>
@@ -26649,53 +26726,9 @@
                 </a:solidFill>
                 <a:latin typeface="+mj-lt"/>
               </a:rPr>
-              <a:t>public </a:t>
-            </a:r>
-            <a:r>
-              <a:rPr lang="it-IT" sz="1400" b="1" dirty="0" err="1" smtClean="0">
-                <a:solidFill>
-                  <a:schemeClr val="accent5">
-                    <a:lumMod val="50000"/>
-                  </a:schemeClr>
-                </a:solidFill>
-                <a:latin typeface="+mj-lt"/>
-              </a:rPr>
-              <a:t>boolean</a:t>
-            </a:r>
-            <a:r>
-              <a:rPr lang="it-IT" sz="1400" b="1" dirty="0" smtClean="0">
-                <a:solidFill>
-                  <a:schemeClr val="accent5">
-                    <a:lumMod val="50000"/>
-                  </a:schemeClr>
-                </a:solidFill>
-                <a:latin typeface="+mj-lt"/>
-              </a:rPr>
-              <a:t> </a:t>
-            </a:r>
-            <a:r>
-              <a:rPr lang="it-IT" sz="1400" b="1" dirty="0" err="1" smtClean="0">
-                <a:solidFill>
-                  <a:schemeClr val="accent5">
-                    <a:lumMod val="50000"/>
-                  </a:schemeClr>
-                </a:solidFill>
-                <a:latin typeface="+mj-lt"/>
-              </a:rPr>
-              <a:t>isEditable</a:t>
-            </a:r>
-            <a:r>
-              <a:rPr lang="it-IT" sz="1400" b="1" dirty="0" smtClean="0">
-                <a:solidFill>
-                  <a:schemeClr val="accent5">
-                    <a:lumMod val="50000"/>
-                  </a:schemeClr>
-                </a:solidFill>
-                <a:latin typeface="+mj-lt"/>
-              </a:rPr>
-              <a:t>(Questionario q)</a:t>
-            </a:r>
-            <a:endParaRPr lang="it-IT" sz="1400" b="1" dirty="0" smtClean="0">
+              <a:t>public boolean isEditable(Questionario questionario)</a:t>
+            </a:r>
+            <a:endParaRPr lang="it-IT" sz="1800" b="1" dirty="0" smtClean="0">
               <a:latin typeface="+mj-lt"/>
             </a:endParaRPr>
           </a:p>
@@ -26726,13 +26759,20 @@
     </p:spTree>
     <p:extLst>
       <p:ext uri="{BB962C8B-B14F-4D97-AF65-F5344CB8AC3E}">
-        <p14:creationId xmlns:p14="http://schemas.microsoft.com/office/powerpoint/2010/main" val="134615909"/>
+        <p14:creationId xmlns="" xmlns:p14="http://schemas.microsoft.com/office/powerpoint/2010/main" val="134615909"/>
       </p:ext>
     </p:extLst>
   </p:cSld>
   <p:clrMapOvr>
     <a:masterClrMapping/>
   </p:clrMapOvr>
+  <p:timing>
+    <p:tnLst>
+      <p:par>
+        <p:cTn id="1" dur="indefinite" restart="never" nodeType="tmRoot"/>
+      </p:par>
+    </p:tnLst>
+  </p:timing>
 </p:sld>
 </file>
 
@@ -26812,14 +26852,14 @@
           <p:nvPr>
             <p:extLst>
               <p:ext uri="{D42A27DB-BD31-4B8C-83A1-F6EECF244321}">
-                <p14:modId xmlns:p14="http://schemas.microsoft.com/office/powerpoint/2010/main" val="1603526078"/>
+                <p14:modId xmlns="" xmlns:p14="http://schemas.microsoft.com/office/powerpoint/2010/main" val="1603526078"/>
               </p:ext>
             </p:extLst>
           </p:nvPr>
         </p:nvGraphicFramePr>
         <p:xfrm>
           <a:off x="1619672" y="2492896"/>
-          <a:ext cx="6096000" cy="1381760"/>
+          <a:ext cx="6096000" cy="1651000"/>
         </p:xfrm>
         <a:graphic>
           <a:graphicData uri="http://schemas.openxmlformats.org/drawingml/2006/table">
@@ -26837,6 +26877,7 @@
                     <a:bodyPr/>
                     <a:lstStyle/>
                     <a:p>
+                      <a:pPr algn="ctr"/>
                       <a:r>
                         <a:rPr lang="it-IT" dirty="0" smtClean="0"/>
                         <a:t>Caso di</a:t>
@@ -26855,6 +26896,7 @@
                     <a:bodyPr/>
                     <a:lstStyle/>
                     <a:p>
+                      <a:pPr algn="ctr"/>
                       <a:r>
                         <a:rPr lang="it-IT" dirty="0" smtClean="0"/>
                         <a:t>Output Atteso</a:t>
@@ -26877,8 +26919,14 @@
                       </a:r>
                       <a:r>
                         <a:rPr lang="it-IT" baseline="0" dirty="0" smtClean="0"/>
-                        <a:t> editabile</a:t>
+                        <a:t> </a:t>
                       </a:r>
+                      <a:r>
+                        <a:rPr lang="it-IT" baseline="0" dirty="0" smtClean="0"/>
+                        <a:t>editabile</a:t>
+                      </a:r>
+                    </a:p>
+                    <a:p>
                       <a:endParaRPr lang="it-IT" dirty="0"/>
                     </a:p>
                   </a:txBody>
@@ -26889,6 +26937,7 @@
                     <a:bodyPr/>
                     <a:lstStyle/>
                     <a:p>
+                      <a:pPr algn="ctr"/>
                       <a:r>
                         <a:rPr lang="it-IT" b="1" dirty="0" smtClean="0">
                           <a:solidFill>
@@ -26927,6 +26976,7 @@
                     <a:bodyPr/>
                     <a:lstStyle/>
                     <a:p>
+                      <a:pPr algn="ctr"/>
                       <a:r>
                         <a:rPr lang="it-IT" b="1" dirty="0" smtClean="0">
                           <a:solidFill>
@@ -26952,13 +27002,20 @@
     </p:spTree>
     <p:extLst>
       <p:ext uri="{BB962C8B-B14F-4D97-AF65-F5344CB8AC3E}">
-        <p14:creationId xmlns:p14="http://schemas.microsoft.com/office/powerpoint/2010/main" val="1428921569"/>
+        <p14:creationId xmlns="" xmlns:p14="http://schemas.microsoft.com/office/powerpoint/2010/main" val="1428921569"/>
       </p:ext>
     </p:extLst>
   </p:cSld>
   <p:clrMapOvr>
     <a:masterClrMapping/>
   </p:clrMapOvr>
+  <p:timing>
+    <p:tnLst>
+      <p:par>
+        <p:cTn id="1" dur="indefinite" restart="never" nodeType="tmRoot"/>
+      </p:par>
+    </p:tnLst>
+  </p:timing>
 </p:sld>
 </file>
 
@@ -27038,14 +27095,14 @@
           <p:nvPr>
             <p:extLst>
               <p:ext uri="{D42A27DB-BD31-4B8C-83A1-F6EECF244321}">
-                <p14:modId xmlns:p14="http://schemas.microsoft.com/office/powerpoint/2010/main" val="3377787449"/>
+                <p14:modId xmlns="" xmlns:p14="http://schemas.microsoft.com/office/powerpoint/2010/main" val="3377787449"/>
               </p:ext>
             </p:extLst>
           </p:nvPr>
         </p:nvGraphicFramePr>
         <p:xfrm>
-          <a:off x="1547664" y="2780928"/>
-          <a:ext cx="6096000" cy="1651000"/>
+          <a:off x="1142976" y="2786058"/>
+          <a:ext cx="7000755" cy="1651000"/>
         </p:xfrm>
         <a:graphic>
           <a:graphicData uri="http://schemas.openxmlformats.org/drawingml/2006/table">
@@ -27054,9 +27111,9 @@
                 <a:tableStyleId>{5C22544A-7EE6-4342-B048-85BDC9FD1C3A}</a:tableStyleId>
               </a:tblPr>
               <a:tblGrid>
-                <a:gridCol w="1588510"/>
-                <a:gridCol w="2253745"/>
-                <a:gridCol w="2253745"/>
+                <a:gridCol w="2286017"/>
+                <a:gridCol w="2126497"/>
+                <a:gridCol w="2588241"/>
               </a:tblGrid>
               <a:tr h="370840">
                 <a:tc>
@@ -27064,6 +27121,7 @@
                     <a:bodyPr/>
                     <a:lstStyle/>
                     <a:p>
+                      <a:pPr algn="ctr"/>
                       <a:r>
                         <a:rPr lang="it-IT" dirty="0" smtClean="0"/>
                         <a:t>Caso di</a:t>
@@ -27082,6 +27140,7 @@
                     <a:bodyPr/>
                     <a:lstStyle/>
                     <a:p>
+                      <a:pPr algn="ctr"/>
                       <a:r>
                         <a:rPr lang="it-IT" dirty="0" smtClean="0"/>
                         <a:t>Output Atteso</a:t>
@@ -27096,6 +27155,7 @@
                     <a:bodyPr/>
                     <a:lstStyle/>
                     <a:p>
+                      <a:pPr algn="ctr"/>
                       <a:r>
                         <a:rPr lang="it-IT" dirty="0" smtClean="0"/>
                         <a:t>Output</a:t>
@@ -27122,8 +27182,14 @@
                       </a:r>
                       <a:r>
                         <a:rPr lang="it-IT" baseline="0" dirty="0" smtClean="0"/>
-                        <a:t> editabile</a:t>
+                        <a:t> </a:t>
                       </a:r>
+                      <a:r>
+                        <a:rPr lang="it-IT" baseline="0" dirty="0" smtClean="0"/>
+                        <a:t>editabile</a:t>
+                      </a:r>
+                    </a:p>
+                    <a:p>
                       <a:endParaRPr lang="it-IT" dirty="0"/>
                     </a:p>
                   </a:txBody>
@@ -27134,6 +27200,7 @@
                     <a:bodyPr/>
                     <a:lstStyle/>
                     <a:p>
+                      <a:pPr algn="ctr"/>
                       <a:r>
                         <a:rPr lang="it-IT" b="1" dirty="0" smtClean="0">
                           <a:solidFill>
@@ -27156,6 +27223,7 @@
                     <a:bodyPr/>
                     <a:lstStyle/>
                     <a:p>
+                      <a:pPr algn="ctr"/>
                       <a:r>
                         <a:rPr lang="it-IT" b="1" dirty="0" smtClean="0">
                           <a:solidFill>
@@ -27194,6 +27262,7 @@
                     <a:bodyPr/>
                     <a:lstStyle/>
                     <a:p>
+                      <a:pPr algn="ctr"/>
                       <a:r>
                         <a:rPr lang="it-IT" b="1" dirty="0" smtClean="0">
                           <a:solidFill>
@@ -27216,6 +27285,7 @@
                     <a:bodyPr/>
                     <a:lstStyle/>
                     <a:p>
+                      <a:pPr algn="ctr"/>
                       <a:r>
                         <a:rPr lang="it-IT" b="1" dirty="0" smtClean="0">
                           <a:solidFill>
@@ -27241,13 +27311,20 @@
     </p:spTree>
     <p:extLst>
       <p:ext uri="{BB962C8B-B14F-4D97-AF65-F5344CB8AC3E}">
-        <p14:creationId xmlns:p14="http://schemas.microsoft.com/office/powerpoint/2010/main" val="521228686"/>
+        <p14:creationId xmlns="" xmlns:p14="http://schemas.microsoft.com/office/powerpoint/2010/main" val="521228686"/>
       </p:ext>
     </p:extLst>
   </p:cSld>
   <p:clrMapOvr>
     <a:masterClrMapping/>
   </p:clrMapOvr>
+  <p:timing>
+    <p:tnLst>
+      <p:par>
+        <p:cTn id="1" dur="indefinite" restart="never" nodeType="tmRoot"/>
+      </p:par>
+    </p:tnLst>
+  </p:timing>
 </p:sld>
 </file>
 
@@ -27321,7 +27398,7 @@
           <a:blip r:embed="rId2">
             <a:extLst>
               <a:ext uri="{28A0092B-C50C-407E-A947-70E740481C1C}">
-                <a14:useLocalDpi xmlns:a14="http://schemas.microsoft.com/office/drawing/2010/main" val="0"/>
+                <a14:useLocalDpi xmlns="" xmlns:a14="http://schemas.microsoft.com/office/drawing/2010/main" val="0"/>
               </a:ext>
             </a:extLst>
           </a:blip>
@@ -27341,7 +27418,7 @@
           <a:noFill/>
           <a:extLst>
             <a:ext uri="{909E8E84-426E-40DD-AFC4-6F175D3DCCD1}">
-              <a14:hiddenFill xmlns:a14="http://schemas.microsoft.com/office/drawing/2010/main">
+              <a14:hiddenFill xmlns="" xmlns:a14="http://schemas.microsoft.com/office/drawing/2010/main">
                 <a:solidFill>
                   <a:srgbClr val="FFFFFF"/>
                 </a:solidFill>
@@ -27357,9 +27434,9 @@
           <p:nvPr/>
         </p:nvCxnSpPr>
         <p:spPr>
-          <a:xfrm flipH="1">
-            <a:off x="4932040" y="3061121"/>
-            <a:ext cx="1604856" cy="0"/>
+          <a:xfrm rot="10800000">
+            <a:off x="5214942" y="3071810"/>
+            <a:ext cx="1285884" cy="142878"/>
           </a:xfrm>
           <a:prstGeom prst="straightConnector1">
             <a:avLst/>
@@ -27393,9 +27470,9 @@
           <p:nvPr/>
         </p:nvCxnSpPr>
         <p:spPr>
-          <a:xfrm flipH="1">
-            <a:off x="6123819" y="4077072"/>
-            <a:ext cx="1532848" cy="0"/>
+          <a:xfrm rot="10800000">
+            <a:off x="5715008" y="4286256"/>
+            <a:ext cx="785818" cy="357190"/>
           </a:xfrm>
           <a:prstGeom prst="straightConnector1">
             <a:avLst/>
@@ -27430,8 +27507,8 @@
         </p:nvSpPr>
         <p:spPr>
           <a:xfrm>
-            <a:off x="6374505" y="2839534"/>
-            <a:ext cx="1672253" cy="369332"/>
+            <a:off x="6429388" y="2714620"/>
+            <a:ext cx="2789097" cy="923330"/>
           </a:xfrm>
           <a:prstGeom prst="rect">
             <a:avLst/>
@@ -27446,7 +27523,23 @@
           <a:p>
             <a:r>
               <a:rPr lang="it-IT" dirty="0" smtClean="0"/>
-              <a:t>Descrizione bug</a:t>
+              <a:t>Questo costruttore crea </a:t>
+            </a:r>
+          </a:p>
+          <a:p>
+            <a:r>
+              <a:rPr lang="it-IT" dirty="0" smtClean="0"/>
+              <a:t>una d</a:t>
+            </a:r>
+            <a:r>
+              <a:rPr lang="it-IT" dirty="0" smtClean="0"/>
+              <a:t>ata con anno -1900 a </a:t>
+            </a:r>
+          </a:p>
+          <a:p>
+            <a:r>
+              <a:rPr lang="it-IT" dirty="0" smtClean="0"/>
+              <a:t>quello attuale</a:t>
             </a:r>
             <a:endParaRPr lang="it-IT" dirty="0"/>
           </a:p>
@@ -27460,8 +27553,8 @@
         </p:nvSpPr>
         <p:spPr>
           <a:xfrm>
-            <a:off x="7308304" y="4077072"/>
-            <a:ext cx="1672253" cy="369332"/>
+            <a:off x="6143636" y="4714884"/>
+            <a:ext cx="2819426" cy="1200329"/>
           </a:xfrm>
           <a:prstGeom prst="rect">
             <a:avLst/>
@@ -27476,22 +27569,55 @@
           <a:p>
             <a:r>
               <a:rPr lang="it-IT" dirty="0" smtClean="0"/>
-              <a:t>Descrizione bug</a:t>
-            </a:r>
-            <a:endParaRPr lang="it-IT" dirty="0"/>
+              <a:t>Essendo le date scorrette </a:t>
+            </a:r>
+          </a:p>
+          <a:p>
+            <a:r>
+              <a:rPr lang="it-IT" dirty="0" smtClean="0"/>
+              <a:t>(anno 112 ca) sempre </a:t>
+            </a:r>
+            <a:r>
+              <a:rPr lang="it-IT" b="1" dirty="0" smtClean="0"/>
+              <a:t>falsa</a:t>
+            </a:r>
+          </a:p>
+          <a:p>
+            <a:r>
+              <a:rPr lang="it-IT" dirty="0" smtClean="0"/>
+              <a:t>Quindi il flusso si sposta nel </a:t>
+            </a:r>
+          </a:p>
+          <a:p>
+            <a:r>
+              <a:rPr lang="it-IT" dirty="0" smtClean="0"/>
+              <a:t>costrutto </a:t>
+            </a:r>
+            <a:r>
+              <a:rPr lang="it-IT" i="1" dirty="0" smtClean="0"/>
+              <a:t>else</a:t>
+            </a:r>
+            <a:endParaRPr lang="it-IT" i="1" dirty="0"/>
           </a:p>
         </p:txBody>
       </p:sp>
     </p:spTree>
     <p:extLst>
       <p:ext uri="{BB962C8B-B14F-4D97-AF65-F5344CB8AC3E}">
-        <p14:creationId xmlns:p14="http://schemas.microsoft.com/office/powerpoint/2010/main" val="2138116938"/>
+        <p14:creationId xmlns="" xmlns:p14="http://schemas.microsoft.com/office/powerpoint/2010/main" val="2138116938"/>
       </p:ext>
     </p:extLst>
   </p:cSld>
   <p:clrMapOvr>
     <a:masterClrMapping/>
   </p:clrMapOvr>
+  <p:timing>
+    <p:tnLst>
+      <p:par>
+        <p:cTn id="1" dur="indefinite" restart="never" nodeType="tmRoot"/>
+      </p:par>
+    </p:tnLst>
+  </p:timing>
 </p:sld>
 </file>
 
@@ -27580,14 +27706,14 @@
           <p:nvPr>
             <p:extLst>
               <p:ext uri="{D42A27DB-BD31-4B8C-83A1-F6EECF244321}">
-                <p14:modId xmlns:p14="http://schemas.microsoft.com/office/powerpoint/2010/main" val="3745458434"/>
+                <p14:modId xmlns="" xmlns:p14="http://schemas.microsoft.com/office/powerpoint/2010/main" val="3745458434"/>
               </p:ext>
             </p:extLst>
           </p:nvPr>
         </p:nvGraphicFramePr>
         <p:xfrm>
-          <a:off x="1619672" y="2636912"/>
-          <a:ext cx="6096000" cy="1651000"/>
+          <a:off x="785786" y="2636912"/>
+          <a:ext cx="6929886" cy="1651000"/>
         </p:xfrm>
         <a:graphic>
           <a:graphicData uri="http://schemas.openxmlformats.org/drawingml/2006/table">
@@ -27596,9 +27722,9 @@
                 <a:tableStyleId>{5C22544A-7EE6-4342-B048-85BDC9FD1C3A}</a:tableStyleId>
               </a:tblPr>
               <a:tblGrid>
-                <a:gridCol w="1588510"/>
-                <a:gridCol w="2253745"/>
-                <a:gridCol w="2253745"/>
+                <a:gridCol w="2357454"/>
+                <a:gridCol w="2428892"/>
+                <a:gridCol w="2143540"/>
               </a:tblGrid>
               <a:tr h="370840">
                 <a:tc>
@@ -27606,6 +27732,7 @@
                     <a:bodyPr/>
                     <a:lstStyle/>
                     <a:p>
+                      <a:pPr algn="ctr"/>
                       <a:r>
                         <a:rPr lang="it-IT" dirty="0" smtClean="0"/>
                         <a:t>Caso di</a:t>
@@ -27624,6 +27751,7 @@
                     <a:bodyPr/>
                     <a:lstStyle/>
                     <a:p>
+                      <a:pPr algn="ctr"/>
                       <a:r>
                         <a:rPr lang="it-IT" dirty="0" smtClean="0"/>
                         <a:t>Output Atteso</a:t>
@@ -27638,6 +27766,7 @@
                     <a:bodyPr/>
                     <a:lstStyle/>
                     <a:p>
+                      <a:pPr algn="ctr"/>
                       <a:r>
                         <a:rPr lang="it-IT" dirty="0" smtClean="0"/>
                         <a:t>Output</a:t>
@@ -27664,8 +27793,14 @@
                       </a:r>
                       <a:r>
                         <a:rPr lang="it-IT" baseline="0" dirty="0" smtClean="0"/>
-                        <a:t> editabile</a:t>
+                        <a:t> </a:t>
                       </a:r>
+                      <a:r>
+                        <a:rPr lang="it-IT" baseline="0" dirty="0" smtClean="0"/>
+                        <a:t>editabile</a:t>
+                      </a:r>
+                    </a:p>
+                    <a:p>
                       <a:endParaRPr lang="it-IT" dirty="0"/>
                     </a:p>
                   </a:txBody>
@@ -27676,6 +27811,7 @@
                     <a:bodyPr/>
                     <a:lstStyle/>
                     <a:p>
+                      <a:pPr algn="ctr"/>
                       <a:r>
                         <a:rPr lang="it-IT" b="1" dirty="0" smtClean="0">
                           <a:solidFill>
@@ -27698,6 +27834,7 @@
                     <a:bodyPr/>
                     <a:lstStyle/>
                     <a:p>
+                      <a:pPr algn="ctr"/>
                       <a:r>
                         <a:rPr lang="it-IT" b="1" dirty="0" smtClean="0">
                           <a:solidFill>
@@ -27736,6 +27873,7 @@
                     <a:bodyPr/>
                     <a:lstStyle/>
                     <a:p>
+                      <a:pPr algn="ctr"/>
                       <a:r>
                         <a:rPr lang="it-IT" b="1" dirty="0" smtClean="0">
                           <a:solidFill>
@@ -27758,6 +27896,7 @@
                     <a:bodyPr/>
                     <a:lstStyle/>
                     <a:p>
+                      <a:pPr algn="ctr"/>
                       <a:r>
                         <a:rPr lang="it-IT" b="1" dirty="0" smtClean="0">
                           <a:solidFill>
@@ -27783,13 +27922,20 @@
     </p:spTree>
     <p:extLst>
       <p:ext uri="{BB962C8B-B14F-4D97-AF65-F5344CB8AC3E}">
-        <p14:creationId xmlns:p14="http://schemas.microsoft.com/office/powerpoint/2010/main" val="2476603813"/>
+        <p14:creationId xmlns="" xmlns:p14="http://schemas.microsoft.com/office/powerpoint/2010/main" val="2476603813"/>
       </p:ext>
     </p:extLst>
   </p:cSld>
   <p:clrMapOvr>
     <a:masterClrMapping/>
   </p:clrMapOvr>
+  <p:timing>
+    <p:tnLst>
+      <p:par>
+        <p:cTn id="1" dur="indefinite" restart="never" nodeType="tmRoot"/>
+      </p:par>
+    </p:tnLst>
+  </p:timing>
 </p:sld>
 </file>
 
@@ -27837,17 +27983,8 @@
               <a:rPr lang="it-IT" sz="4800" b="1" dirty="0" smtClean="0">
                 <a:latin typeface="+mj-lt"/>
               </a:rPr>
-              <a:t>Pro\Contro del </a:t>
-            </a:r>
-            <a:r>
-              <a:rPr lang="it-IT" sz="4800" b="1" dirty="0" smtClean="0">
-                <a:latin typeface="+mj-lt"/>
-              </a:rPr>
-              <a:t>Testing</a:t>
-            </a:r>
-            <a:endParaRPr lang="it-IT" sz="4800" b="1" dirty="0" smtClean="0">
-              <a:latin typeface="+mj-lt"/>
-            </a:endParaRPr>
+              <a:t>Pro\Contro del Testing</a:t>
+            </a:r>
           </a:p>
           <a:p>
             <a:pPr algn="ctr"/>
@@ -27860,13 +27997,20 @@
     </p:spTree>
     <p:extLst>
       <p:ext uri="{BB962C8B-B14F-4D97-AF65-F5344CB8AC3E}">
-        <p14:creationId xmlns:p14="http://schemas.microsoft.com/office/powerpoint/2010/main" val="3060381138"/>
+        <p14:creationId xmlns="" xmlns:p14="http://schemas.microsoft.com/office/powerpoint/2010/main" val="3060381138"/>
       </p:ext>
     </p:extLst>
   </p:cSld>
   <p:clrMapOvr>
     <a:masterClrMapping/>
   </p:clrMapOvr>
+  <p:timing>
+    <p:tnLst>
+      <p:par>
+        <p:cTn id="1" dur="indefinite" restart="never" nodeType="tmRoot"/>
+      </p:par>
+    </p:tnLst>
+  </p:timing>
 </p:sld>
 </file>
 
@@ -28378,7 +28522,7 @@
           <a:blip r:embed="rId3">
             <a:extLst>
               <a:ext uri="{28A0092B-C50C-407E-A947-70E740481C1C}">
-                <a14:useLocalDpi xmlns:a14="http://schemas.microsoft.com/office/drawing/2010/main" val="0"/>
+                <a14:useLocalDpi xmlns="" xmlns:a14="http://schemas.microsoft.com/office/drawing/2010/main" val="0"/>
               </a:ext>
             </a:extLst>
           </a:blip>
@@ -28398,7 +28542,7 @@
           <a:noFill/>
           <a:extLst>
             <a:ext uri="{909E8E84-426E-40DD-AFC4-6F175D3DCCD1}">
-              <a14:hiddenFill xmlns:a14="http://schemas.microsoft.com/office/drawing/2010/main">
+              <a14:hiddenFill xmlns="" xmlns:a14="http://schemas.microsoft.com/office/drawing/2010/main">
                 <a:solidFill>
                   <a:srgbClr val="FFFFFF"/>
                 </a:solidFill>
@@ -28548,7 +28692,7 @@
     </p:spTree>
     <p:extLst>
       <p:ext uri="{BB962C8B-B14F-4D97-AF65-F5344CB8AC3E}">
-        <p14:creationId xmlns:p14="http://schemas.microsoft.com/office/powerpoint/2010/main" val="1739081068"/>
+        <p14:creationId xmlns="" xmlns:p14="http://schemas.microsoft.com/office/powerpoint/2010/main" val="1739081068"/>
       </p:ext>
     </p:extLst>
   </p:cSld>
@@ -30255,18 +30399,18 @@
     </p:spTree>
     <p:extLst>
       <p:ext uri="{BB962C8B-B14F-4D97-AF65-F5344CB8AC3E}">
-        <p14:creationId xmlns:p14="http://schemas.microsoft.com/office/powerpoint/2010/main" val="2532338835"/>
+        <p14:creationId xmlns="" xmlns:p14="http://schemas.microsoft.com/office/powerpoint/2010/main" val="2532338835"/>
       </p:ext>
     </p:extLst>
   </p:cSld>
   <p:clrMapOvr>
     <a:masterClrMapping/>
   </p:clrMapOvr>
-  <mc:AlternateContent xmlns:mc="http://schemas.openxmlformats.org/markup-compatibility/2006" xmlns:p14="http://schemas.microsoft.com/office/powerpoint/2010/main">
-    <mc:Choice Requires="p14">
+  <mc:AlternateContent xmlns:mc="http://schemas.openxmlformats.org/markup-compatibility/2006">
+    <mc:Choice xmlns="" xmlns:p14="http://schemas.microsoft.com/office/powerpoint/2010/main" Requires="p14">
       <p:transition spd="slow" p14:dur="2000"/>
     </mc:Choice>
-    <mc:Fallback xmlns="">
+    <mc:Fallback>
       <p:transition spd="slow"/>
     </mc:Fallback>
   </mc:AlternateContent>
@@ -30353,7 +30497,7 @@
           <p:nvPr>
             <p:extLst>
               <p:ext uri="{D42A27DB-BD31-4B8C-83A1-F6EECF244321}">
-                <p14:modId xmlns:p14="http://schemas.microsoft.com/office/powerpoint/2010/main" val="4285816619"/>
+                <p14:modId xmlns="" xmlns:p14="http://schemas.microsoft.com/office/powerpoint/2010/main" val="4285816619"/>
               </p:ext>
             </p:extLst>
           </p:nvPr>
@@ -30998,11 +31142,7 @@
             </a:r>
             <a:r>
               <a:rPr lang="it-IT" b="1" dirty="0" smtClean="0"/>
-              <a:t>UC_H_49_Compilazione </a:t>
-            </a:r>
-            <a:r>
-              <a:rPr lang="it-IT" b="1" dirty="0" smtClean="0"/>
-              <a:t>questionario</a:t>
+              <a:t>UC_H_49_Compilazione questionario</a:t>
             </a:r>
             <a:endParaRPr lang="it-IT" b="1" dirty="0"/>
           </a:p>
@@ -31087,7 +31227,7 @@
           <p:nvPr>
             <p:extLst>
               <p:ext uri="{D42A27DB-BD31-4B8C-83A1-F6EECF244321}">
-                <p14:modId xmlns:p14="http://schemas.microsoft.com/office/powerpoint/2010/main" val="4159081582"/>
+                <p14:modId xmlns="" xmlns:p14="http://schemas.microsoft.com/office/powerpoint/2010/main" val="4159081582"/>
               </p:ext>
             </p:extLst>
           </p:nvPr>
@@ -31825,20 +31965,108 @@
             </a:r>
             <a:r>
               <a:rPr lang="it-IT" b="1" dirty="0" smtClean="0"/>
-              <a:t>UC_H_49_Compilazione </a:t>
-            </a:r>
-            <a:r>
-              <a:rPr lang="it-IT" b="1" dirty="0" smtClean="0"/>
-              <a:t>questionario</a:t>
+              <a:t>UC_H_49_Compilazione questionario</a:t>
             </a:r>
             <a:endParaRPr lang="it-IT" b="1" dirty="0"/>
+          </a:p>
+        </p:txBody>
+      </p:sp>
+      <p:sp>
+        <p:nvSpPr>
+          <p:cNvPr id="7" name="Oval 6"/>
+          <p:cNvSpPr/>
+          <p:nvPr/>
+        </p:nvSpPr>
+        <p:spPr>
+          <a:xfrm>
+            <a:off x="1785918" y="4214818"/>
+            <a:ext cx="6929486" cy="1357322"/>
+          </a:xfrm>
+          <a:prstGeom prst="ellipse">
+            <a:avLst/>
+          </a:prstGeom>
+          <a:noFill/>
+          <a:ln>
+            <a:solidFill>
+              <a:srgbClr val="0070C0"/>
+            </a:solidFill>
+          </a:ln>
+        </p:spPr>
+        <p:style>
+          <a:lnRef idx="2">
+            <a:schemeClr val="accent1">
+              <a:shade val="50000"/>
+            </a:schemeClr>
+          </a:lnRef>
+          <a:fillRef idx="1">
+            <a:schemeClr val="accent1"/>
+          </a:fillRef>
+          <a:effectRef idx="0">
+            <a:schemeClr val="accent1"/>
+          </a:effectRef>
+          <a:fontRef idx="minor">
+            <a:schemeClr val="lt1"/>
+          </a:fontRef>
+        </p:style>
+        <p:txBody>
+          <a:bodyPr rtlCol="0" anchor="ctr"/>
+          <a:lstStyle/>
+          <a:p>
+            <a:pPr algn="ctr"/>
+            <a:endParaRPr lang="it-IT"/>
+          </a:p>
+        </p:txBody>
+      </p:sp>
+      <p:sp>
+        <p:nvSpPr>
+          <p:cNvPr id="8" name="Oval 7"/>
+          <p:cNvSpPr/>
+          <p:nvPr/>
+        </p:nvSpPr>
+        <p:spPr>
+          <a:xfrm>
+            <a:off x="2357422" y="2071678"/>
+            <a:ext cx="4214842" cy="714380"/>
+          </a:xfrm>
+          <a:prstGeom prst="ellipse">
+            <a:avLst/>
+          </a:prstGeom>
+          <a:noFill/>
+          <a:ln>
+            <a:solidFill>
+              <a:srgbClr val="0070C0"/>
+            </a:solidFill>
+          </a:ln>
+        </p:spPr>
+        <p:style>
+          <a:lnRef idx="2">
+            <a:schemeClr val="accent1">
+              <a:shade val="50000"/>
+            </a:schemeClr>
+          </a:lnRef>
+          <a:fillRef idx="1">
+            <a:schemeClr val="accent1"/>
+          </a:fillRef>
+          <a:effectRef idx="0">
+            <a:schemeClr val="accent1"/>
+          </a:effectRef>
+          <a:fontRef idx="minor">
+            <a:schemeClr val="lt1"/>
+          </a:fontRef>
+        </p:style>
+        <p:txBody>
+          <a:bodyPr rtlCol="0" anchor="ctr"/>
+          <a:lstStyle/>
+          <a:p>
+            <a:pPr algn="ctr"/>
+            <a:endParaRPr lang="it-IT"/>
           </a:p>
         </p:txBody>
       </p:sp>
     </p:spTree>
     <p:extLst>
       <p:ext uri="{BB962C8B-B14F-4D97-AF65-F5344CB8AC3E}">
-        <p14:creationId xmlns:p14="http://schemas.microsoft.com/office/powerpoint/2010/main" val="1173458281"/>
+        <p14:creationId xmlns="" xmlns:p14="http://schemas.microsoft.com/office/powerpoint/2010/main" val="1173458281"/>
       </p:ext>
     </p:extLst>
   </p:cSld>
@@ -31848,9 +32076,127 @@
   <p:timing>
     <p:tnLst>
       <p:par>
-        <p:cTn id="1" dur="indefinite" restart="never" nodeType="tmRoot"/>
+        <p:cTn id="1" dur="indefinite" restart="never" nodeType="tmRoot">
+          <p:childTnLst>
+            <p:seq concurrent="1" nextAc="seek">
+              <p:cTn id="2" dur="indefinite" nodeType="mainSeq">
+                <p:childTnLst>
+                  <p:par>
+                    <p:cTn id="3" fill="hold">
+                      <p:stCondLst>
+                        <p:cond delay="indefinite"/>
+                        <p:cond evt="onBegin" delay="0">
+                          <p:tn val="2"/>
+                        </p:cond>
+                      </p:stCondLst>
+                      <p:childTnLst>
+                        <p:par>
+                          <p:cTn id="4" fill="hold">
+                            <p:stCondLst>
+                              <p:cond delay="0"/>
+                            </p:stCondLst>
+                            <p:childTnLst>
+                              <p:par>
+                                <p:cTn id="5" presetID="10" presetClass="entr" presetSubtype="0" fill="hold" grpId="0" nodeType="withEffect">
+                                  <p:stCondLst>
+                                    <p:cond delay="0"/>
+                                  </p:stCondLst>
+                                  <p:childTnLst>
+                                    <p:set>
+                                      <p:cBhvr>
+                                        <p:cTn id="6" dur="1" fill="hold">
+                                          <p:stCondLst>
+                                            <p:cond delay="0"/>
+                                          </p:stCondLst>
+                                        </p:cTn>
+                                        <p:tgtEl>
+                                          <p:spTgt spid="7"/>
+                                        </p:tgtEl>
+                                        <p:attrNameLst>
+                                          <p:attrName>style.visibility</p:attrName>
+                                        </p:attrNameLst>
+                                      </p:cBhvr>
+                                      <p:to>
+                                        <p:strVal val="visible"/>
+                                      </p:to>
+                                    </p:set>
+                                    <p:animEffect transition="in" filter="fade">
+                                      <p:cBhvr>
+                                        <p:cTn id="7" dur="500"/>
+                                        <p:tgtEl>
+                                          <p:spTgt spid="7"/>
+                                        </p:tgtEl>
+                                      </p:cBhvr>
+                                    </p:animEffect>
+                                  </p:childTnLst>
+                                </p:cTn>
+                              </p:par>
+                              <p:par>
+                                <p:cTn id="8" presetID="10" presetClass="entr" presetSubtype="0" fill="hold" grpId="0" nodeType="withEffect">
+                                  <p:stCondLst>
+                                    <p:cond delay="0"/>
+                                  </p:stCondLst>
+                                  <p:childTnLst>
+                                    <p:set>
+                                      <p:cBhvr>
+                                        <p:cTn id="9" dur="1" fill="hold">
+                                          <p:stCondLst>
+                                            <p:cond delay="0"/>
+                                          </p:stCondLst>
+                                        </p:cTn>
+                                        <p:tgtEl>
+                                          <p:spTgt spid="8"/>
+                                        </p:tgtEl>
+                                        <p:attrNameLst>
+                                          <p:attrName>style.visibility</p:attrName>
+                                        </p:attrNameLst>
+                                      </p:cBhvr>
+                                      <p:to>
+                                        <p:strVal val="visible"/>
+                                      </p:to>
+                                    </p:set>
+                                    <p:animEffect transition="in" filter="fade">
+                                      <p:cBhvr>
+                                        <p:cTn id="10" dur="500"/>
+                                        <p:tgtEl>
+                                          <p:spTgt spid="8"/>
+                                        </p:tgtEl>
+                                      </p:cBhvr>
+                                    </p:animEffect>
+                                  </p:childTnLst>
+                                </p:cTn>
+                              </p:par>
+                            </p:childTnLst>
+                          </p:cTn>
+                        </p:par>
+                      </p:childTnLst>
+                    </p:cTn>
+                  </p:par>
+                </p:childTnLst>
+              </p:cTn>
+              <p:prevCondLst>
+                <p:cond evt="onPrev" delay="0">
+                  <p:tgtEl>
+                    <p:sldTgt/>
+                  </p:tgtEl>
+                </p:cond>
+              </p:prevCondLst>
+              <p:nextCondLst>
+                <p:cond evt="onNext" delay="0">
+                  <p:tgtEl>
+                    <p:sldTgt/>
+                  </p:tgtEl>
+                </p:cond>
+              </p:nextCondLst>
+            </p:seq>
+          </p:childTnLst>
+        </p:cTn>
       </p:par>
     </p:tnLst>
+    <p:bldLst>
+      <p:bldP spid="7" grpId="0" animBg="1"/>
+      <p:bldP spid="8" grpId="0" animBg="1"/>
+    </p:bldLst>
   </p:timing>
 </p:sld>
 </file>
@@ -32129,31 +32475,14 @@
             <a:pPr lvl="1"/>
             <a:r>
               <a:rPr lang="it-IT" dirty="0" smtClean="0"/>
-              <a:t>Alcune </a:t>
-            </a:r>
+              <a:t>Alcune funzionalità non erano ben definite </a:t>
+            </a:r>
+          </a:p>
+          <a:p>
+            <a:pPr lvl="2"/>
             <a:r>
               <a:rPr lang="it-IT" dirty="0" smtClean="0"/>
-              <a:t>funzionalità non </a:t>
-            </a:r>
-            <a:r>
-              <a:rPr lang="it-IT" dirty="0" smtClean="0"/>
-              <a:t>erano ben definite</a:t>
-            </a:r>
-            <a:r>
-              <a:rPr lang="it-IT" dirty="0" smtClean="0"/>
-              <a:t> </a:t>
-            </a:r>
-            <a:endParaRPr lang="it-IT" dirty="0" smtClean="0"/>
-          </a:p>
-          <a:p>
-            <a:pPr lvl="2"/>
-            <a:r>
-              <a:rPr lang="it-IT" dirty="0" smtClean="0"/>
-              <a:t>Hanno portato ad un analisi complessa e </a:t>
-            </a:r>
-            <a:r>
-              <a:rPr lang="it-IT" dirty="0" smtClean="0"/>
-              <a:t>non coerente</a:t>
+              <a:t>Hanno portato ad un analisi complessa e non coerente</a:t>
             </a:r>
           </a:p>
           <a:p>
@@ -32175,15 +32504,7 @@
                   <a:srgbClr val="00B050"/>
                 </a:solidFill>
               </a:rPr>
-              <a:t>Pro</a:t>
-            </a:r>
-            <a:r>
-              <a:rPr lang="it-IT" b="1" dirty="0" smtClean="0">
-                <a:solidFill>
-                  <a:srgbClr val="00B050"/>
-                </a:solidFill>
-              </a:rPr>
-              <a:t>:</a:t>
+              <a:t>Pro:</a:t>
             </a:r>
           </a:p>
           <a:p>
@@ -33003,7 +33324,7 @@
     </p:spTree>
     <p:extLst>
       <p:ext uri="{BB962C8B-B14F-4D97-AF65-F5344CB8AC3E}">
-        <p14:creationId xmlns:p14="http://schemas.microsoft.com/office/powerpoint/2010/main" val="2769124218"/>
+        <p14:creationId xmlns="" xmlns:p14="http://schemas.microsoft.com/office/powerpoint/2010/main" val="2769124218"/>
       </p:ext>
     </p:extLst>
   </p:cSld>

</xml_diff>

<commit_message>
[WR 3] logo junit
</commit_message>
<xml_diff>
--- a/Presentazione/Atsilo3/Atsilo_H_PresentazioneFinale.pptx
+++ b/Presentazione/Atsilo3/Atsilo_H_PresentazioneFinale.pptx
@@ -403,7 +403,7 @@
     </p:spTree>
     <p:extLst>
       <p:ext uri="{BB962C8B-B14F-4D97-AF65-F5344CB8AC3E}">
-        <p14:creationId xmlns="" xmlns:p14="http://schemas.microsoft.com/office/powerpoint/2010/main" val="2126419590"/>
+        <p14:creationId xmlns:p14="http://schemas.microsoft.com/office/powerpoint/2010/main" xmlns="" val="2126419590"/>
       </p:ext>
     </p:extLst>
   </p:cSld>
@@ -600,7 +600,7 @@
     </p:spTree>
     <p:extLst>
       <p:ext uri="{BB962C8B-B14F-4D97-AF65-F5344CB8AC3E}">
-        <p14:creationId xmlns="" xmlns:p14="http://schemas.microsoft.com/office/powerpoint/2010/main" val="963420841"/>
+        <p14:creationId xmlns:p14="http://schemas.microsoft.com/office/powerpoint/2010/main" xmlns="" val="963420841"/>
       </p:ext>
     </p:extLst>
   </p:cSld>
@@ -707,7 +707,7 @@
     </p:spTree>
     <p:extLst>
       <p:ext uri="{BB962C8B-B14F-4D97-AF65-F5344CB8AC3E}">
-        <p14:creationId xmlns="" xmlns:p14="http://schemas.microsoft.com/office/powerpoint/2010/main" val="3361965342"/>
+        <p14:creationId xmlns:p14="http://schemas.microsoft.com/office/powerpoint/2010/main" xmlns="" val="3361965342"/>
       </p:ext>
     </p:extLst>
   </p:cSld>
@@ -850,7 +850,7 @@
     </p:spTree>
     <p:extLst>
       <p:ext uri="{BB962C8B-B14F-4D97-AF65-F5344CB8AC3E}">
-        <p14:creationId xmlns="" xmlns:p14="http://schemas.microsoft.com/office/powerpoint/2010/main" val="3314347345"/>
+        <p14:creationId xmlns:p14="http://schemas.microsoft.com/office/powerpoint/2010/main" xmlns="" val="3314347345"/>
       </p:ext>
     </p:extLst>
   </p:cSld>
@@ -987,7 +987,7 @@
     </p:spTree>
     <p:extLst>
       <p:ext uri="{BB962C8B-B14F-4D97-AF65-F5344CB8AC3E}">
-        <p14:creationId xmlns="" xmlns:p14="http://schemas.microsoft.com/office/powerpoint/2010/main" val="2265654022"/>
+        <p14:creationId xmlns:p14="http://schemas.microsoft.com/office/powerpoint/2010/main" xmlns="" val="2265654022"/>
       </p:ext>
     </p:extLst>
   </p:cSld>
@@ -1124,7 +1124,7 @@
     </p:spTree>
     <p:extLst>
       <p:ext uri="{BB962C8B-B14F-4D97-AF65-F5344CB8AC3E}">
-        <p14:creationId xmlns="" xmlns:p14="http://schemas.microsoft.com/office/powerpoint/2010/main" val="71143455"/>
+        <p14:creationId xmlns:p14="http://schemas.microsoft.com/office/powerpoint/2010/main" xmlns="" val="71143455"/>
       </p:ext>
     </p:extLst>
   </p:cSld>
@@ -1223,7 +1223,7 @@
     </p:spTree>
     <p:extLst>
       <p:ext uri="{BB962C8B-B14F-4D97-AF65-F5344CB8AC3E}">
-        <p14:creationId xmlns="" xmlns:p14="http://schemas.microsoft.com/office/powerpoint/2010/main" val="113696966"/>
+        <p14:creationId xmlns:p14="http://schemas.microsoft.com/office/powerpoint/2010/main" xmlns="" val="113696966"/>
       </p:ext>
     </p:extLst>
   </p:cSld>
@@ -1348,7 +1348,7 @@
     </p:spTree>
     <p:extLst>
       <p:ext uri="{BB962C8B-B14F-4D97-AF65-F5344CB8AC3E}">
-        <p14:creationId xmlns="" xmlns:p14="http://schemas.microsoft.com/office/powerpoint/2010/main" val="1063702567"/>
+        <p14:creationId xmlns:p14="http://schemas.microsoft.com/office/powerpoint/2010/main" xmlns="" val="1063702567"/>
       </p:ext>
     </p:extLst>
   </p:cSld>
@@ -1453,7 +1453,7 @@
     </p:spTree>
     <p:extLst>
       <p:ext uri="{BB962C8B-B14F-4D97-AF65-F5344CB8AC3E}">
-        <p14:creationId xmlns="" xmlns:p14="http://schemas.microsoft.com/office/powerpoint/2010/main" val="122959592"/>
+        <p14:creationId xmlns:p14="http://schemas.microsoft.com/office/powerpoint/2010/main" xmlns="" val="122959592"/>
       </p:ext>
     </p:extLst>
   </p:cSld>
@@ -1568,7 +1568,7 @@
     </p:spTree>
     <p:extLst>
       <p:ext uri="{BB962C8B-B14F-4D97-AF65-F5344CB8AC3E}">
-        <p14:creationId xmlns="" xmlns:p14="http://schemas.microsoft.com/office/powerpoint/2010/main" val="780286428"/>
+        <p14:creationId xmlns:p14="http://schemas.microsoft.com/office/powerpoint/2010/main" xmlns="" val="780286428"/>
       </p:ext>
     </p:extLst>
   </p:cSld>
@@ -1669,7 +1669,7 @@
     </p:spTree>
     <p:extLst>
       <p:ext uri="{BB962C8B-B14F-4D97-AF65-F5344CB8AC3E}">
-        <p14:creationId xmlns="" xmlns:p14="http://schemas.microsoft.com/office/powerpoint/2010/main" val="2418012031"/>
+        <p14:creationId xmlns:p14="http://schemas.microsoft.com/office/powerpoint/2010/main" xmlns="" val="2418012031"/>
       </p:ext>
     </p:extLst>
   </p:cSld>
@@ -1770,7 +1770,7 @@
     </p:spTree>
     <p:extLst>
       <p:ext uri="{BB962C8B-B14F-4D97-AF65-F5344CB8AC3E}">
-        <p14:creationId xmlns="" xmlns:p14="http://schemas.microsoft.com/office/powerpoint/2010/main" val="778008281"/>
+        <p14:creationId xmlns:p14="http://schemas.microsoft.com/office/powerpoint/2010/main" xmlns="" val="778008281"/>
       </p:ext>
     </p:extLst>
   </p:cSld>
@@ -1881,7 +1881,7 @@
     </p:spTree>
     <p:extLst>
       <p:ext uri="{BB962C8B-B14F-4D97-AF65-F5344CB8AC3E}">
-        <p14:creationId xmlns="" xmlns:p14="http://schemas.microsoft.com/office/powerpoint/2010/main" val="2781517378"/>
+        <p14:creationId xmlns:p14="http://schemas.microsoft.com/office/powerpoint/2010/main" xmlns="" val="2781517378"/>
       </p:ext>
     </p:extLst>
   </p:cSld>
@@ -1974,7 +1974,7 @@
     </p:spTree>
     <p:extLst>
       <p:ext uri="{BB962C8B-B14F-4D97-AF65-F5344CB8AC3E}">
-        <p14:creationId xmlns="" xmlns:p14="http://schemas.microsoft.com/office/powerpoint/2010/main" val="1377757052"/>
+        <p14:creationId xmlns:p14="http://schemas.microsoft.com/office/powerpoint/2010/main" xmlns="" val="1377757052"/>
       </p:ext>
     </p:extLst>
   </p:cSld>
@@ -2078,7 +2078,7 @@
     </p:spTree>
     <p:extLst>
       <p:ext uri="{BB962C8B-B14F-4D97-AF65-F5344CB8AC3E}">
-        <p14:creationId xmlns="" xmlns:p14="http://schemas.microsoft.com/office/powerpoint/2010/main" val="1394194668"/>
+        <p14:creationId xmlns:p14="http://schemas.microsoft.com/office/powerpoint/2010/main" xmlns="" val="1394194668"/>
       </p:ext>
     </p:extLst>
   </p:cSld>
@@ -2233,7 +2233,7 @@
     </p:spTree>
     <p:extLst>
       <p:ext uri="{BB962C8B-B14F-4D97-AF65-F5344CB8AC3E}">
-        <p14:creationId xmlns="" xmlns:p14="http://schemas.microsoft.com/office/powerpoint/2010/main" val="2972088584"/>
+        <p14:creationId xmlns:p14="http://schemas.microsoft.com/office/powerpoint/2010/main" xmlns="" val="2972088584"/>
       </p:ext>
     </p:extLst>
   </p:cSld>
@@ -2342,7 +2342,7 @@
     </p:spTree>
     <p:extLst>
       <p:ext uri="{BB962C8B-B14F-4D97-AF65-F5344CB8AC3E}">
-        <p14:creationId xmlns="" xmlns:p14="http://schemas.microsoft.com/office/powerpoint/2010/main" val="1417320036"/>
+        <p14:creationId xmlns:p14="http://schemas.microsoft.com/office/powerpoint/2010/main" xmlns="" val="1417320036"/>
       </p:ext>
     </p:extLst>
   </p:cSld>
@@ -2451,7 +2451,7 @@
     </p:spTree>
     <p:extLst>
       <p:ext uri="{BB962C8B-B14F-4D97-AF65-F5344CB8AC3E}">
-        <p14:creationId xmlns="" xmlns:p14="http://schemas.microsoft.com/office/powerpoint/2010/main" val="2176874561"/>
+        <p14:creationId xmlns:p14="http://schemas.microsoft.com/office/powerpoint/2010/main" xmlns="" val="2176874561"/>
       </p:ext>
     </p:extLst>
   </p:cSld>
@@ -2552,7 +2552,7 @@
     </p:spTree>
     <p:extLst>
       <p:ext uri="{BB962C8B-B14F-4D97-AF65-F5344CB8AC3E}">
-        <p14:creationId xmlns="" xmlns:p14="http://schemas.microsoft.com/office/powerpoint/2010/main" val="2428745919"/>
+        <p14:creationId xmlns:p14="http://schemas.microsoft.com/office/powerpoint/2010/main" xmlns="" val="2428745919"/>
       </p:ext>
     </p:extLst>
   </p:cSld>
@@ -2649,7 +2649,7 @@
     </p:spTree>
     <p:extLst>
       <p:ext uri="{BB962C8B-B14F-4D97-AF65-F5344CB8AC3E}">
-        <p14:creationId xmlns="" xmlns:p14="http://schemas.microsoft.com/office/powerpoint/2010/main" val="899854441"/>
+        <p14:creationId xmlns:p14="http://schemas.microsoft.com/office/powerpoint/2010/main" xmlns="" val="899854441"/>
       </p:ext>
     </p:extLst>
   </p:cSld>
@@ -2805,7 +2805,7 @@
     </p:spTree>
     <p:extLst>
       <p:ext uri="{BB962C8B-B14F-4D97-AF65-F5344CB8AC3E}">
-        <p14:creationId xmlns="" xmlns:p14="http://schemas.microsoft.com/office/powerpoint/2010/main" val="1218324987"/>
+        <p14:creationId xmlns:p14="http://schemas.microsoft.com/office/powerpoint/2010/main" xmlns="" val="1218324987"/>
       </p:ext>
     </p:extLst>
   </p:cSld>
@@ -2898,7 +2898,7 @@
     </p:spTree>
     <p:extLst>
       <p:ext uri="{BB962C8B-B14F-4D97-AF65-F5344CB8AC3E}">
-        <p14:creationId xmlns="" xmlns:p14="http://schemas.microsoft.com/office/powerpoint/2010/main" val="3928439017"/>
+        <p14:creationId xmlns:p14="http://schemas.microsoft.com/office/powerpoint/2010/main" xmlns="" val="3928439017"/>
       </p:ext>
     </p:extLst>
   </p:cSld>
@@ -2987,7 +2987,7 @@
     </p:spTree>
     <p:extLst>
       <p:ext uri="{BB962C8B-B14F-4D97-AF65-F5344CB8AC3E}">
-        <p14:creationId xmlns="" xmlns:p14="http://schemas.microsoft.com/office/powerpoint/2010/main" val="4040687285"/>
+        <p14:creationId xmlns:p14="http://schemas.microsoft.com/office/powerpoint/2010/main" xmlns="" val="4040687285"/>
       </p:ext>
     </p:extLst>
   </p:cSld>
@@ -3086,7 +3086,7 @@
     </p:spTree>
     <p:extLst>
       <p:ext uri="{BB962C8B-B14F-4D97-AF65-F5344CB8AC3E}">
-        <p14:creationId xmlns="" xmlns:p14="http://schemas.microsoft.com/office/powerpoint/2010/main" val="1025718114"/>
+        <p14:creationId xmlns:p14="http://schemas.microsoft.com/office/powerpoint/2010/main" xmlns="" val="1025718114"/>
       </p:ext>
     </p:extLst>
   </p:cSld>
@@ -3250,7 +3250,7 @@
     </p:spTree>
     <p:extLst>
       <p:ext uri="{BB962C8B-B14F-4D97-AF65-F5344CB8AC3E}">
-        <p14:creationId xmlns="" xmlns:p14="http://schemas.microsoft.com/office/powerpoint/2010/main" val="1047033234"/>
+        <p14:creationId xmlns:p14="http://schemas.microsoft.com/office/powerpoint/2010/main" xmlns="" val="1047033234"/>
       </p:ext>
     </p:extLst>
   </p:cSld>
@@ -3339,7 +3339,7 @@
     </p:spTree>
     <p:extLst>
       <p:ext uri="{BB962C8B-B14F-4D97-AF65-F5344CB8AC3E}">
-        <p14:creationId xmlns="" xmlns:p14="http://schemas.microsoft.com/office/powerpoint/2010/main" val="1047033234"/>
+        <p14:creationId xmlns:p14="http://schemas.microsoft.com/office/powerpoint/2010/main" xmlns="" val="1047033234"/>
       </p:ext>
     </p:extLst>
   </p:cSld>
@@ -3424,7 +3424,7 @@
     </p:spTree>
     <p:extLst>
       <p:ext uri="{BB962C8B-B14F-4D97-AF65-F5344CB8AC3E}">
-        <p14:creationId xmlns="" xmlns:p14="http://schemas.microsoft.com/office/powerpoint/2010/main" val="742716072"/>
+        <p14:creationId xmlns:p14="http://schemas.microsoft.com/office/powerpoint/2010/main" xmlns="" val="742716072"/>
       </p:ext>
     </p:extLst>
   </p:cSld>
@@ -3513,7 +3513,7 @@
     </p:spTree>
     <p:extLst>
       <p:ext uri="{BB962C8B-B14F-4D97-AF65-F5344CB8AC3E}">
-        <p14:creationId xmlns="" xmlns:p14="http://schemas.microsoft.com/office/powerpoint/2010/main" val="1425725903"/>
+        <p14:creationId xmlns:p14="http://schemas.microsoft.com/office/powerpoint/2010/main" xmlns="" val="1425725903"/>
       </p:ext>
     </p:extLst>
   </p:cSld>
@@ -3622,7 +3622,7 @@
     </p:spTree>
     <p:extLst>
       <p:ext uri="{BB962C8B-B14F-4D97-AF65-F5344CB8AC3E}">
-        <p14:creationId xmlns="" xmlns:p14="http://schemas.microsoft.com/office/powerpoint/2010/main" val="880674728"/>
+        <p14:creationId xmlns:p14="http://schemas.microsoft.com/office/powerpoint/2010/main" xmlns="" val="880674728"/>
       </p:ext>
     </p:extLst>
   </p:cSld>
@@ -3731,7 +3731,7 @@
     </p:spTree>
     <p:extLst>
       <p:ext uri="{BB962C8B-B14F-4D97-AF65-F5344CB8AC3E}">
-        <p14:creationId xmlns="" xmlns:p14="http://schemas.microsoft.com/office/powerpoint/2010/main" val="346945336"/>
+        <p14:creationId xmlns:p14="http://schemas.microsoft.com/office/powerpoint/2010/main" xmlns="" val="346945336"/>
       </p:ext>
     </p:extLst>
   </p:cSld>
@@ -3840,7 +3840,7 @@
     </p:spTree>
     <p:extLst>
       <p:ext uri="{BB962C8B-B14F-4D97-AF65-F5344CB8AC3E}">
-        <p14:creationId xmlns="" xmlns:p14="http://schemas.microsoft.com/office/powerpoint/2010/main" val="1778546328"/>
+        <p14:creationId xmlns:p14="http://schemas.microsoft.com/office/powerpoint/2010/main" xmlns="" val="1778546328"/>
       </p:ext>
     </p:extLst>
   </p:cSld>
@@ -3949,7 +3949,7 @@
     </p:spTree>
     <p:extLst>
       <p:ext uri="{BB962C8B-B14F-4D97-AF65-F5344CB8AC3E}">
-        <p14:creationId xmlns="" xmlns:p14="http://schemas.microsoft.com/office/powerpoint/2010/main" val="604861763"/>
+        <p14:creationId xmlns:p14="http://schemas.microsoft.com/office/powerpoint/2010/main" xmlns="" val="604861763"/>
       </p:ext>
     </p:extLst>
   </p:cSld>
@@ -4038,7 +4038,7 @@
     </p:spTree>
     <p:extLst>
       <p:ext uri="{BB962C8B-B14F-4D97-AF65-F5344CB8AC3E}">
-        <p14:creationId xmlns="" xmlns:p14="http://schemas.microsoft.com/office/powerpoint/2010/main" val="1357369038"/>
+        <p14:creationId xmlns:p14="http://schemas.microsoft.com/office/powerpoint/2010/main" xmlns="" val="1357369038"/>
       </p:ext>
     </p:extLst>
   </p:cSld>
@@ -4152,7 +4152,7 @@
     </p:spTree>
     <p:extLst>
       <p:ext uri="{BB962C8B-B14F-4D97-AF65-F5344CB8AC3E}">
-        <p14:creationId xmlns="" xmlns:p14="http://schemas.microsoft.com/office/powerpoint/2010/main" val="3780346060"/>
+        <p14:creationId xmlns:p14="http://schemas.microsoft.com/office/powerpoint/2010/main" xmlns="" val="3780346060"/>
       </p:ext>
     </p:extLst>
   </p:cSld>
@@ -4257,7 +4257,7 @@
     </p:spTree>
     <p:extLst>
       <p:ext uri="{BB962C8B-B14F-4D97-AF65-F5344CB8AC3E}">
-        <p14:creationId xmlns="" xmlns:p14="http://schemas.microsoft.com/office/powerpoint/2010/main" val="41796055"/>
+        <p14:creationId xmlns:p14="http://schemas.microsoft.com/office/powerpoint/2010/main" xmlns="" val="41796055"/>
       </p:ext>
     </p:extLst>
   </p:cSld>
@@ -4380,7 +4380,7 @@
     </p:spTree>
     <p:extLst>
       <p:ext uri="{BB962C8B-B14F-4D97-AF65-F5344CB8AC3E}">
-        <p14:creationId xmlns="" xmlns:p14="http://schemas.microsoft.com/office/powerpoint/2010/main" val="555626785"/>
+        <p14:creationId xmlns:p14="http://schemas.microsoft.com/office/powerpoint/2010/main" xmlns="" val="555626785"/>
       </p:ext>
     </p:extLst>
   </p:cSld>
@@ -4473,7 +4473,7 @@
     </p:spTree>
     <p:extLst>
       <p:ext uri="{BB962C8B-B14F-4D97-AF65-F5344CB8AC3E}">
-        <p14:creationId xmlns="" xmlns:p14="http://schemas.microsoft.com/office/powerpoint/2010/main" val="855395126"/>
+        <p14:creationId xmlns:p14="http://schemas.microsoft.com/office/powerpoint/2010/main" xmlns="" val="855395126"/>
       </p:ext>
     </p:extLst>
   </p:cSld>
@@ -4586,7 +4586,7 @@
     </p:spTree>
     <p:extLst>
       <p:ext uri="{BB962C8B-B14F-4D97-AF65-F5344CB8AC3E}">
-        <p14:creationId xmlns="" xmlns:p14="http://schemas.microsoft.com/office/powerpoint/2010/main" val="802928497"/>
+        <p14:creationId xmlns:p14="http://schemas.microsoft.com/office/powerpoint/2010/main" xmlns="" val="802928497"/>
       </p:ext>
     </p:extLst>
   </p:cSld>
@@ -8524,7 +8524,7 @@
           <a:blip r:embed="rId2">
             <a:extLst>
               <a:ext uri="{28A0092B-C50C-407E-A947-70E740481C1C}">
-                <a14:useLocalDpi xmlns="" xmlns:a14="http://schemas.microsoft.com/office/drawing/2010/main" val="0"/>
+                <a14:useLocalDpi xmlns:a14="http://schemas.microsoft.com/office/drawing/2010/main" xmlns="" val="0"/>
               </a:ext>
             </a:extLst>
           </a:blip>
@@ -8548,14 +8548,14 @@
           <a:effectLst/>
           <a:extLst>
             <a:ext uri="{909E8E84-426E-40DD-AFC4-6F175D3DCCD1}">
-              <a14:hiddenFill xmlns="" xmlns:a14="http://schemas.microsoft.com/office/drawing/2010/main">
+              <a14:hiddenFill xmlns:a14="http://schemas.microsoft.com/office/drawing/2010/main" xmlns="">
                 <a:solidFill>
                   <a:schemeClr val="accent1"/>
                 </a:solidFill>
               </a14:hiddenFill>
             </a:ext>
             <a:ext uri="{91240B29-F687-4F45-9708-019B960494DF}">
-              <a14:hiddenLine xmlns="" xmlns:a14="http://schemas.microsoft.com/office/drawing/2010/main" w="9525">
+              <a14:hiddenLine xmlns:a14="http://schemas.microsoft.com/office/drawing/2010/main" xmlns="" w="9525">
                 <a:solidFill>
                   <a:schemeClr val="tx1"/>
                 </a:solidFill>
@@ -8565,7 +8565,7 @@
               </a14:hiddenLine>
             </a:ext>
             <a:ext uri="{AF507438-7753-43E0-B8FC-AC1667EBCBE1}">
-              <a14:hiddenEffects xmlns="" xmlns:a14="http://schemas.microsoft.com/office/drawing/2010/main">
+              <a14:hiddenEffects xmlns:a14="http://schemas.microsoft.com/office/drawing/2010/main" xmlns="">
                 <a:effectLst>
                   <a:outerShdw dist="35921" dir="2700000" algn="ctr" rotWithShape="0">
                     <a:schemeClr val="bg2"/>
@@ -8585,7 +8585,7 @@
           <p:nvPr>
             <p:extLst>
               <p:ext uri="{D42A27DB-BD31-4B8C-83A1-F6EECF244321}">
-                <p14:modId xmlns="" xmlns:p14="http://schemas.microsoft.com/office/powerpoint/2010/main" val="669990601"/>
+                <p14:modId xmlns:p14="http://schemas.microsoft.com/office/powerpoint/2010/main" xmlns="" val="669990601"/>
               </p:ext>
             </p:extLst>
           </p:nvPr>
@@ -8762,7 +8762,7 @@
           <p:nvPr>
             <p:extLst>
               <p:ext uri="{D42A27DB-BD31-4B8C-83A1-F6EECF244321}">
-                <p14:modId xmlns="" xmlns:p14="http://schemas.microsoft.com/office/powerpoint/2010/main" val="1867475245"/>
+                <p14:modId xmlns:p14="http://schemas.microsoft.com/office/powerpoint/2010/main" xmlns="" val="1867475245"/>
               </p:ext>
             </p:extLst>
           </p:nvPr>
@@ -8893,7 +8893,7 @@
     </p:spTree>
     <p:extLst>
       <p:ext uri="{BB962C8B-B14F-4D97-AF65-F5344CB8AC3E}">
-        <p14:creationId xmlns="" xmlns:p14="http://schemas.microsoft.com/office/powerpoint/2010/main" val="4165334171"/>
+        <p14:creationId xmlns:p14="http://schemas.microsoft.com/office/powerpoint/2010/main" xmlns="" val="4165334171"/>
       </p:ext>
     </p:extLst>
   </p:cSld>
@@ -9189,7 +9189,7 @@
     </p:spTree>
     <p:extLst>
       <p:ext uri="{BB962C8B-B14F-4D97-AF65-F5344CB8AC3E}">
-        <p14:creationId xmlns="" xmlns:p14="http://schemas.microsoft.com/office/powerpoint/2010/main" val="155874689"/>
+        <p14:creationId xmlns:p14="http://schemas.microsoft.com/office/powerpoint/2010/main" xmlns="" val="155874689"/>
       </p:ext>
     </p:extLst>
   </p:cSld>
@@ -9197,7 +9197,7 @@
     <a:masterClrMapping/>
   </p:clrMapOvr>
   <mc:AlternateContent xmlns:mc="http://schemas.openxmlformats.org/markup-compatibility/2006">
-    <mc:Choice xmlns="" xmlns:p14="http://schemas.microsoft.com/office/powerpoint/2010/main" Requires="p14">
+    <mc:Choice xmlns:p14="http://schemas.microsoft.com/office/powerpoint/2010/main" xmlns="" Requires="p14">
       <p:transition spd="slow" p14:dur="2000"/>
     </mc:Choice>
     <mc:Fallback>
@@ -9703,7 +9703,7 @@
     </p:spTree>
     <p:extLst>
       <p:ext uri="{BB962C8B-B14F-4D97-AF65-F5344CB8AC3E}">
-        <p14:creationId xmlns="" xmlns:p14="http://schemas.microsoft.com/office/powerpoint/2010/main" val="155874689"/>
+        <p14:creationId xmlns:p14="http://schemas.microsoft.com/office/powerpoint/2010/main" xmlns="" val="155874689"/>
       </p:ext>
     </p:extLst>
   </p:cSld>
@@ -9711,7 +9711,7 @@
     <a:masterClrMapping/>
   </p:clrMapOvr>
   <mc:AlternateContent xmlns:mc="http://schemas.openxmlformats.org/markup-compatibility/2006">
-    <mc:Choice xmlns="" xmlns:p14="http://schemas.microsoft.com/office/powerpoint/2010/main" Requires="p14">
+    <mc:Choice xmlns:p14="http://schemas.microsoft.com/office/powerpoint/2010/main" xmlns="" Requires="p14">
       <p:transition spd="slow" p14:dur="2000"/>
     </mc:Choice>
     <mc:Fallback>
@@ -10208,7 +10208,7 @@
     </p:spTree>
     <p:extLst>
       <p:ext uri="{BB962C8B-B14F-4D97-AF65-F5344CB8AC3E}">
-        <p14:creationId xmlns="" xmlns:p14="http://schemas.microsoft.com/office/powerpoint/2010/main" val="155874689"/>
+        <p14:creationId xmlns:p14="http://schemas.microsoft.com/office/powerpoint/2010/main" xmlns="" val="155874689"/>
       </p:ext>
     </p:extLst>
   </p:cSld>
@@ -10216,7 +10216,7 @@
     <a:masterClrMapping/>
   </p:clrMapOvr>
   <mc:AlternateContent xmlns:mc="http://schemas.openxmlformats.org/markup-compatibility/2006">
-    <mc:Choice xmlns="" xmlns:p14="http://schemas.microsoft.com/office/powerpoint/2010/main" Requires="p14">
+    <mc:Choice xmlns:p14="http://schemas.microsoft.com/office/powerpoint/2010/main" xmlns="" Requires="p14">
       <p:transition spd="slow" p14:dur="2000"/>
     </mc:Choice>
     <mc:Fallback>
@@ -12390,7 +12390,7 @@
           <a:blip r:embed="rId3">
             <a:extLst>
               <a:ext uri="{28A0092B-C50C-407E-A947-70E740481C1C}">
-                <a14:useLocalDpi xmlns="" xmlns:a14="http://schemas.microsoft.com/office/drawing/2010/main" val="0"/>
+                <a14:useLocalDpi xmlns:a14="http://schemas.microsoft.com/office/drawing/2010/main" xmlns="" val="0"/>
               </a:ext>
             </a:extLst>
           </a:blip>
@@ -12410,7 +12410,7 @@
           <a:noFill/>
           <a:extLst>
             <a:ext uri="{909E8E84-426E-40DD-AFC4-6F175D3DCCD1}">
-              <a14:hiddenFill xmlns="" xmlns:a14="http://schemas.microsoft.com/office/drawing/2010/main">
+              <a14:hiddenFill xmlns:a14="http://schemas.microsoft.com/office/drawing/2010/main" xmlns="">
                 <a:solidFill>
                   <a:srgbClr val="FFFFFF"/>
                 </a:solidFill>
@@ -12431,7 +12431,7 @@
           <a:blip r:embed="rId4">
             <a:extLst>
               <a:ext uri="{28A0092B-C50C-407E-A947-70E740481C1C}">
-                <a14:useLocalDpi xmlns="" xmlns:a14="http://schemas.microsoft.com/office/drawing/2010/main" val="0"/>
+                <a14:useLocalDpi xmlns:a14="http://schemas.microsoft.com/office/drawing/2010/main" xmlns="" val="0"/>
               </a:ext>
             </a:extLst>
           </a:blip>
@@ -12451,7 +12451,7 @@
           <a:noFill/>
           <a:extLst>
             <a:ext uri="{909E8E84-426E-40DD-AFC4-6F175D3DCCD1}">
-              <a14:hiddenFill xmlns="" xmlns:a14="http://schemas.microsoft.com/office/drawing/2010/main">
+              <a14:hiddenFill xmlns:a14="http://schemas.microsoft.com/office/drawing/2010/main" xmlns="">
                 <a:solidFill>
                   <a:srgbClr val="FFFFFF"/>
                 </a:solidFill>
@@ -12497,7 +12497,7 @@
     </p:spTree>
     <p:extLst>
       <p:ext uri="{BB962C8B-B14F-4D97-AF65-F5344CB8AC3E}">
-        <p14:creationId xmlns="" xmlns:p14="http://schemas.microsoft.com/office/powerpoint/2010/main" val="1277526579"/>
+        <p14:creationId xmlns:p14="http://schemas.microsoft.com/office/powerpoint/2010/main" xmlns="" val="1277526579"/>
       </p:ext>
     </p:extLst>
   </p:cSld>
@@ -12827,7 +12827,7 @@
           <a:blip r:embed="rId3">
             <a:extLst>
               <a:ext uri="{28A0092B-C50C-407E-A947-70E740481C1C}">
-                <a14:useLocalDpi xmlns="" xmlns:a14="http://schemas.microsoft.com/office/drawing/2010/main" val="0"/>
+                <a14:useLocalDpi xmlns:a14="http://schemas.microsoft.com/office/drawing/2010/main" xmlns="" val="0"/>
               </a:ext>
             </a:extLst>
           </a:blip>
@@ -12847,7 +12847,7 @@
           <a:noFill/>
           <a:extLst>
             <a:ext uri="{909E8E84-426E-40DD-AFC4-6F175D3DCCD1}">
-              <a14:hiddenFill xmlns="" xmlns:a14="http://schemas.microsoft.com/office/drawing/2010/main">
+              <a14:hiddenFill xmlns:a14="http://schemas.microsoft.com/office/drawing/2010/main" xmlns="">
                 <a:solidFill>
                   <a:srgbClr val="FFFFFF"/>
                 </a:solidFill>
@@ -12868,7 +12868,7 @@
           <a:blip r:embed="rId4" cstate="print">
             <a:extLst>
               <a:ext uri="{28A0092B-C50C-407E-A947-70E740481C1C}">
-                <a14:useLocalDpi xmlns="" xmlns:a14="http://schemas.microsoft.com/office/drawing/2010/main" val="0"/>
+                <a14:useLocalDpi xmlns:a14="http://schemas.microsoft.com/office/drawing/2010/main" xmlns="" val="0"/>
               </a:ext>
             </a:extLst>
           </a:blip>
@@ -12888,7 +12888,7 @@
           <a:noFill/>
           <a:extLst>
             <a:ext uri="{909E8E84-426E-40DD-AFC4-6F175D3DCCD1}">
-              <a14:hiddenFill xmlns="" xmlns:a14="http://schemas.microsoft.com/office/drawing/2010/main">
+              <a14:hiddenFill xmlns:a14="http://schemas.microsoft.com/office/drawing/2010/main" xmlns="">
                 <a:solidFill>
                   <a:srgbClr val="FFFFFF"/>
                 </a:solidFill>
@@ -12909,7 +12909,7 @@
           <a:blip r:embed="rId5">
             <a:extLst>
               <a:ext uri="{28A0092B-C50C-407E-A947-70E740481C1C}">
-                <a14:useLocalDpi xmlns="" xmlns:a14="http://schemas.microsoft.com/office/drawing/2010/main" val="0"/>
+                <a14:useLocalDpi xmlns:a14="http://schemas.microsoft.com/office/drawing/2010/main" xmlns="" val="0"/>
               </a:ext>
             </a:extLst>
           </a:blip>
@@ -12929,7 +12929,7 @@
           <a:noFill/>
           <a:extLst>
             <a:ext uri="{909E8E84-426E-40DD-AFC4-6F175D3DCCD1}">
-              <a14:hiddenFill xmlns="" xmlns:a14="http://schemas.microsoft.com/office/drawing/2010/main">
+              <a14:hiddenFill xmlns:a14="http://schemas.microsoft.com/office/drawing/2010/main" xmlns="">
                 <a:solidFill>
                   <a:srgbClr val="FFFFFF"/>
                 </a:solidFill>
@@ -13031,7 +13031,7 @@
     </p:spTree>
     <p:extLst>
       <p:ext uri="{BB962C8B-B14F-4D97-AF65-F5344CB8AC3E}">
-        <p14:creationId xmlns="" xmlns:p14="http://schemas.microsoft.com/office/powerpoint/2010/main" val="418107373"/>
+        <p14:creationId xmlns:p14="http://schemas.microsoft.com/office/powerpoint/2010/main" xmlns="" val="418107373"/>
       </p:ext>
     </p:extLst>
   </p:cSld>
@@ -13670,7 +13670,7 @@
           <a:blip r:embed="rId3">
             <a:extLst>
               <a:ext uri="{28A0092B-C50C-407E-A947-70E740481C1C}">
-                <a14:useLocalDpi xmlns="" xmlns:a14="http://schemas.microsoft.com/office/drawing/2010/main" val="0"/>
+                <a14:useLocalDpi xmlns:a14="http://schemas.microsoft.com/office/drawing/2010/main" xmlns="" val="0"/>
               </a:ext>
             </a:extLst>
           </a:blip>
@@ -13690,7 +13690,7 @@
           <a:noFill/>
           <a:extLst>
             <a:ext uri="{909E8E84-426E-40DD-AFC4-6F175D3DCCD1}">
-              <a14:hiddenFill xmlns="" xmlns:a14="http://schemas.microsoft.com/office/drawing/2010/main">
+              <a14:hiddenFill xmlns:a14="http://schemas.microsoft.com/office/drawing/2010/main" xmlns="">
                 <a:solidFill>
                   <a:srgbClr val="FFFFFF"/>
                 </a:solidFill>
@@ -13711,7 +13711,7 @@
           <a:blip r:embed="rId4">
             <a:extLst>
               <a:ext uri="{28A0092B-C50C-407E-A947-70E740481C1C}">
-                <a14:useLocalDpi xmlns="" xmlns:a14="http://schemas.microsoft.com/office/drawing/2010/main" val="0"/>
+                <a14:useLocalDpi xmlns:a14="http://schemas.microsoft.com/office/drawing/2010/main" xmlns="" val="0"/>
               </a:ext>
             </a:extLst>
           </a:blip>
@@ -13731,7 +13731,7 @@
           <a:noFill/>
           <a:extLst>
             <a:ext uri="{909E8E84-426E-40DD-AFC4-6F175D3DCCD1}">
-              <a14:hiddenFill xmlns="" xmlns:a14="http://schemas.microsoft.com/office/drawing/2010/main">
+              <a14:hiddenFill xmlns:a14="http://schemas.microsoft.com/office/drawing/2010/main" xmlns="">
                 <a:solidFill>
                   <a:srgbClr val="FFFFFF"/>
                 </a:solidFill>
@@ -13979,7 +13979,7 @@
     </p:spTree>
     <p:extLst>
       <p:ext uri="{BB962C8B-B14F-4D97-AF65-F5344CB8AC3E}">
-        <p14:creationId xmlns="" xmlns:p14="http://schemas.microsoft.com/office/powerpoint/2010/main" val="2879521852"/>
+        <p14:creationId xmlns:p14="http://schemas.microsoft.com/office/powerpoint/2010/main" xmlns="" val="2879521852"/>
       </p:ext>
     </p:extLst>
   </p:cSld>
@@ -13987,7 +13987,7 @@
     <a:masterClrMapping/>
   </p:clrMapOvr>
   <mc:AlternateContent xmlns:mc="http://schemas.openxmlformats.org/markup-compatibility/2006">
-    <mc:Choice xmlns="" xmlns:p14="http://schemas.microsoft.com/office/powerpoint/2010/main" Requires="p14">
+    <mc:Choice xmlns:p14="http://schemas.microsoft.com/office/powerpoint/2010/main" xmlns="" Requires="p14">
       <p:transition spd="slow" p14:dur="2000"/>
     </mc:Choice>
     <mc:Fallback>
@@ -14346,7 +14346,7 @@
           <a:blip r:embed="rId3">
             <a:extLst>
               <a:ext uri="{28A0092B-C50C-407E-A947-70E740481C1C}">
-                <a14:useLocalDpi xmlns="" xmlns:a14="http://schemas.microsoft.com/office/drawing/2010/main" val="0"/>
+                <a14:useLocalDpi xmlns:a14="http://schemas.microsoft.com/office/drawing/2010/main" xmlns="" val="0"/>
               </a:ext>
             </a:extLst>
           </a:blip>
@@ -14366,7 +14366,7 @@
           <a:noFill/>
           <a:extLst>
             <a:ext uri="{909E8E84-426E-40DD-AFC4-6F175D3DCCD1}">
-              <a14:hiddenFill xmlns="" xmlns:a14="http://schemas.microsoft.com/office/drawing/2010/main">
+              <a14:hiddenFill xmlns:a14="http://schemas.microsoft.com/office/drawing/2010/main" xmlns="">
                 <a:solidFill>
                   <a:srgbClr val="FFFFFF"/>
                 </a:solidFill>
@@ -14887,7 +14887,7 @@
     </p:spTree>
     <p:extLst>
       <p:ext uri="{BB962C8B-B14F-4D97-AF65-F5344CB8AC3E}">
-        <p14:creationId xmlns="" xmlns:p14="http://schemas.microsoft.com/office/powerpoint/2010/main" val="202613363"/>
+        <p14:creationId xmlns:p14="http://schemas.microsoft.com/office/powerpoint/2010/main" xmlns="" val="202613363"/>
       </p:ext>
     </p:extLst>
   </p:cSld>
@@ -14895,7 +14895,7 @@
     <a:masterClrMapping/>
   </p:clrMapOvr>
   <mc:AlternateContent xmlns:mc="http://schemas.openxmlformats.org/markup-compatibility/2006">
-    <mc:Choice xmlns="" xmlns:p14="http://schemas.microsoft.com/office/powerpoint/2010/main" Requires="p14">
+    <mc:Choice xmlns:p14="http://schemas.microsoft.com/office/powerpoint/2010/main" xmlns="" Requires="p14">
       <p:transition spd="slow" p14:dur="2000"/>
     </mc:Choice>
     <mc:Fallback>
@@ -15220,7 +15220,7 @@
           <a:blip r:embed="rId3">
             <a:extLst>
               <a:ext uri="{28A0092B-C50C-407E-A947-70E740481C1C}">
-                <a14:useLocalDpi xmlns="" xmlns:a14="http://schemas.microsoft.com/office/drawing/2010/main" val="0"/>
+                <a14:useLocalDpi xmlns:a14="http://schemas.microsoft.com/office/drawing/2010/main" xmlns="" val="0"/>
               </a:ext>
             </a:extLst>
           </a:blip>
@@ -15240,7 +15240,7 @@
           <a:noFill/>
           <a:extLst>
             <a:ext uri="{909E8E84-426E-40DD-AFC4-6F175D3DCCD1}">
-              <a14:hiddenFill xmlns="" xmlns:a14="http://schemas.microsoft.com/office/drawing/2010/main">
+              <a14:hiddenFill xmlns:a14="http://schemas.microsoft.com/office/drawing/2010/main" xmlns="">
                 <a:solidFill>
                   <a:srgbClr val="FFFFFF"/>
                 </a:solidFill>
@@ -15261,7 +15261,7 @@
           <a:blip r:embed="rId4">
             <a:extLst>
               <a:ext uri="{28A0092B-C50C-407E-A947-70E740481C1C}">
-                <a14:useLocalDpi xmlns="" xmlns:a14="http://schemas.microsoft.com/office/drawing/2010/main" val="0"/>
+                <a14:useLocalDpi xmlns:a14="http://schemas.microsoft.com/office/drawing/2010/main" xmlns="" val="0"/>
               </a:ext>
             </a:extLst>
           </a:blip>
@@ -15281,7 +15281,7 @@
           <a:noFill/>
           <a:extLst>
             <a:ext uri="{909E8E84-426E-40DD-AFC4-6F175D3DCCD1}">
-              <a14:hiddenFill xmlns="" xmlns:a14="http://schemas.microsoft.com/office/drawing/2010/main">
+              <a14:hiddenFill xmlns:a14="http://schemas.microsoft.com/office/drawing/2010/main" xmlns="">
                 <a:solidFill>
                   <a:srgbClr val="FFFFFF"/>
                 </a:solidFill>
@@ -15605,7 +15605,7 @@
     </p:spTree>
     <p:extLst>
       <p:ext uri="{BB962C8B-B14F-4D97-AF65-F5344CB8AC3E}">
-        <p14:creationId xmlns="" xmlns:p14="http://schemas.microsoft.com/office/powerpoint/2010/main" val="1197112555"/>
+        <p14:creationId xmlns:p14="http://schemas.microsoft.com/office/powerpoint/2010/main" xmlns="" val="1197112555"/>
       </p:ext>
     </p:extLst>
   </p:cSld>
@@ -15613,7 +15613,7 @@
     <a:masterClrMapping/>
   </p:clrMapOvr>
   <mc:AlternateContent xmlns:mc="http://schemas.openxmlformats.org/markup-compatibility/2006">
-    <mc:Choice xmlns="" xmlns:p14="http://schemas.microsoft.com/office/powerpoint/2010/main" Requires="p14">
+    <mc:Choice xmlns:p14="http://schemas.microsoft.com/office/powerpoint/2010/main" xmlns="" Requires="p14">
       <p:transition spd="slow" p14:dur="2000"/>
     </mc:Choice>
     <mc:Fallback>
@@ -16700,7 +16700,7 @@
     </p:spTree>
     <p:extLst>
       <p:ext uri="{BB962C8B-B14F-4D97-AF65-F5344CB8AC3E}">
-        <p14:creationId xmlns="" xmlns:p14="http://schemas.microsoft.com/office/powerpoint/2010/main" val="155874689"/>
+        <p14:creationId xmlns:p14="http://schemas.microsoft.com/office/powerpoint/2010/main" xmlns="" val="155874689"/>
       </p:ext>
     </p:extLst>
   </p:cSld>
@@ -16708,7 +16708,7 @@
     <a:masterClrMapping/>
   </p:clrMapOvr>
   <mc:AlternateContent xmlns:mc="http://schemas.openxmlformats.org/markup-compatibility/2006">
-    <mc:Choice xmlns="" xmlns:p14="http://schemas.microsoft.com/office/powerpoint/2010/main" Requires="p14">
+    <mc:Choice xmlns:p14="http://schemas.microsoft.com/office/powerpoint/2010/main" xmlns="" Requires="p14">
       <p:transition spd="slow" p14:dur="2000"/>
     </mc:Choice>
     <mc:Fallback>
@@ -17072,7 +17072,7 @@
           <a:blip r:embed="rId3">
             <a:extLst>
               <a:ext uri="{28A0092B-C50C-407E-A947-70E740481C1C}">
-                <a14:useLocalDpi xmlns="" xmlns:a14="http://schemas.microsoft.com/office/drawing/2010/main" val="0"/>
+                <a14:useLocalDpi xmlns:a14="http://schemas.microsoft.com/office/drawing/2010/main" xmlns="" val="0"/>
               </a:ext>
             </a:extLst>
           </a:blip>
@@ -17092,7 +17092,7 @@
           <a:noFill/>
           <a:extLst>
             <a:ext uri="{909E8E84-426E-40DD-AFC4-6F175D3DCCD1}">
-              <a14:hiddenFill xmlns="" xmlns:a14="http://schemas.microsoft.com/office/drawing/2010/main">
+              <a14:hiddenFill xmlns:a14="http://schemas.microsoft.com/office/drawing/2010/main" xmlns="">
                 <a:solidFill>
                   <a:srgbClr val="FFFFFF"/>
                 </a:solidFill>
@@ -17113,7 +17113,7 @@
           <a:blip r:embed="rId4">
             <a:extLst>
               <a:ext uri="{28A0092B-C50C-407E-A947-70E740481C1C}">
-                <a14:useLocalDpi xmlns="" xmlns:a14="http://schemas.microsoft.com/office/drawing/2010/main" val="0"/>
+                <a14:useLocalDpi xmlns:a14="http://schemas.microsoft.com/office/drawing/2010/main" xmlns="" val="0"/>
               </a:ext>
             </a:extLst>
           </a:blip>
@@ -17142,7 +17142,7 @@
           </a:effectLst>
           <a:extLst>
             <a:ext uri="{909E8E84-426E-40DD-AFC4-6F175D3DCCD1}">
-              <a14:hiddenFill xmlns="" xmlns:a14="http://schemas.microsoft.com/office/drawing/2010/main">
+              <a14:hiddenFill xmlns:a14="http://schemas.microsoft.com/office/drawing/2010/main" xmlns="">
                 <a:solidFill>
                   <a:srgbClr val="FFFFFF"/>
                 </a:solidFill>
@@ -17180,7 +17180,7 @@
     </p:spTree>
     <p:extLst>
       <p:ext uri="{BB962C8B-B14F-4D97-AF65-F5344CB8AC3E}">
-        <p14:creationId xmlns="" xmlns:p14="http://schemas.microsoft.com/office/powerpoint/2010/main" val="700353664"/>
+        <p14:creationId xmlns:p14="http://schemas.microsoft.com/office/powerpoint/2010/main" xmlns="" val="700353664"/>
       </p:ext>
     </p:extLst>
   </p:cSld>
@@ -17188,7 +17188,7 @@
     <a:masterClrMapping/>
   </p:clrMapOvr>
   <mc:AlternateContent xmlns:mc="http://schemas.openxmlformats.org/markup-compatibility/2006">
-    <mc:Choice xmlns="" xmlns:p14="http://schemas.microsoft.com/office/powerpoint/2010/main" Requires="p14">
+    <mc:Choice xmlns:p14="http://schemas.microsoft.com/office/powerpoint/2010/main" xmlns="" Requires="p14">
       <p:transition spd="slow" p14:dur="2000"/>
     </mc:Choice>
     <mc:Fallback>
@@ -17935,7 +17935,7 @@
           <a:blip r:embed="rId3">
             <a:extLst>
               <a:ext uri="{28A0092B-C50C-407E-A947-70E740481C1C}">
-                <a14:useLocalDpi xmlns="" xmlns:a14="http://schemas.microsoft.com/office/drawing/2010/main" val="0"/>
+                <a14:useLocalDpi xmlns:a14="http://schemas.microsoft.com/office/drawing/2010/main" xmlns="" val="0"/>
               </a:ext>
             </a:extLst>
           </a:blip>
@@ -17960,7 +17960,7 @@
           </a:effectLst>
           <a:extLst>
             <a:ext uri="{909E8E84-426E-40DD-AFC4-6F175D3DCCD1}">
-              <a14:hiddenFill xmlns="" xmlns:a14="http://schemas.microsoft.com/office/drawing/2010/main">
+              <a14:hiddenFill xmlns:a14="http://schemas.microsoft.com/office/drawing/2010/main" xmlns="">
                 <a:solidFill>
                   <a:srgbClr val="FFFFFF"/>
                 </a:solidFill>
@@ -17981,7 +17981,7 @@
           <a:blip r:embed="rId4">
             <a:extLst>
               <a:ext uri="{28A0092B-C50C-407E-A947-70E740481C1C}">
-                <a14:useLocalDpi xmlns="" xmlns:a14="http://schemas.microsoft.com/office/drawing/2010/main" val="0"/>
+                <a14:useLocalDpi xmlns:a14="http://schemas.microsoft.com/office/drawing/2010/main" xmlns="" val="0"/>
               </a:ext>
             </a:extLst>
           </a:blip>
@@ -18001,7 +18001,7 @@
           <a:noFill/>
           <a:extLst>
             <a:ext uri="{909E8E84-426E-40DD-AFC4-6F175D3DCCD1}">
-              <a14:hiddenFill xmlns="" xmlns:a14="http://schemas.microsoft.com/office/drawing/2010/main">
+              <a14:hiddenFill xmlns:a14="http://schemas.microsoft.com/office/drawing/2010/main" xmlns="">
                 <a:solidFill>
                   <a:srgbClr val="FFFFFF"/>
                 </a:solidFill>
@@ -18047,7 +18047,7 @@
     </p:spTree>
     <p:extLst>
       <p:ext uri="{BB962C8B-B14F-4D97-AF65-F5344CB8AC3E}">
-        <p14:creationId xmlns="" xmlns:p14="http://schemas.microsoft.com/office/powerpoint/2010/main" val="2947224754"/>
+        <p14:creationId xmlns:p14="http://schemas.microsoft.com/office/powerpoint/2010/main" xmlns="" val="2947224754"/>
       </p:ext>
     </p:extLst>
   </p:cSld>
@@ -18364,7 +18364,7 @@
           <a:blip r:embed="rId3">
             <a:extLst>
               <a:ext uri="{28A0092B-C50C-407E-A947-70E740481C1C}">
-                <a14:useLocalDpi xmlns="" xmlns:a14="http://schemas.microsoft.com/office/drawing/2010/main" val="0"/>
+                <a14:useLocalDpi xmlns:a14="http://schemas.microsoft.com/office/drawing/2010/main" xmlns="" val="0"/>
               </a:ext>
             </a:extLst>
           </a:blip>
@@ -18384,7 +18384,7 @@
           <a:noFill/>
           <a:extLst>
             <a:ext uri="{909E8E84-426E-40DD-AFC4-6F175D3DCCD1}">
-              <a14:hiddenFill xmlns="" xmlns:a14="http://schemas.microsoft.com/office/drawing/2010/main">
+              <a14:hiddenFill xmlns:a14="http://schemas.microsoft.com/office/drawing/2010/main" xmlns="">
                 <a:solidFill>
                   <a:srgbClr val="FFFFFF"/>
                 </a:solidFill>
@@ -18939,7 +18939,7 @@
     </p:spTree>
     <p:extLst>
       <p:ext uri="{BB962C8B-B14F-4D97-AF65-F5344CB8AC3E}">
-        <p14:creationId xmlns="" xmlns:p14="http://schemas.microsoft.com/office/powerpoint/2010/main" val="1111877724"/>
+        <p14:creationId xmlns:p14="http://schemas.microsoft.com/office/powerpoint/2010/main" xmlns="" val="1111877724"/>
       </p:ext>
     </p:extLst>
   </p:cSld>
@@ -18947,7 +18947,7 @@
     <a:masterClrMapping/>
   </p:clrMapOvr>
   <mc:AlternateContent xmlns:mc="http://schemas.openxmlformats.org/markup-compatibility/2006">
-    <mc:Choice xmlns="" xmlns:p14="http://schemas.microsoft.com/office/powerpoint/2010/main" Requires="p14">
+    <mc:Choice xmlns:p14="http://schemas.microsoft.com/office/powerpoint/2010/main" xmlns="" Requires="p14">
       <p:transition spd="slow" p14:dur="2000"/>
     </mc:Choice>
     <mc:Fallback>
@@ -19329,7 +19329,7 @@
           <p:nvPr>
             <p:extLst>
               <p:ext uri="{D42A27DB-BD31-4B8C-83A1-F6EECF244321}">
-                <p14:modId xmlns="" xmlns:p14="http://schemas.microsoft.com/office/powerpoint/2010/main" val="2643884637"/>
+                <p14:modId xmlns:p14="http://schemas.microsoft.com/office/powerpoint/2010/main" xmlns="" val="2643884637"/>
               </p:ext>
             </p:extLst>
           </p:nvPr>
@@ -19770,14 +19770,14 @@
           <a:effectLst/>
           <a:extLst>
             <a:ext uri="{909E8E84-426E-40DD-AFC4-6F175D3DCCD1}">
-              <a14:hiddenFill xmlns="" xmlns:a14="http://schemas.microsoft.com/office/drawing/2010/main">
+              <a14:hiddenFill xmlns:a14="http://schemas.microsoft.com/office/drawing/2010/main" xmlns="">
                 <a:solidFill>
                   <a:schemeClr val="accent1"/>
                 </a:solidFill>
               </a14:hiddenFill>
             </a:ext>
             <a:ext uri="{91240B29-F687-4F45-9708-019B960494DF}">
-              <a14:hiddenLine xmlns="" xmlns:a14="http://schemas.microsoft.com/office/drawing/2010/main" w="9525">
+              <a14:hiddenLine xmlns:a14="http://schemas.microsoft.com/office/drawing/2010/main" xmlns="" w="9525">
                 <a:solidFill>
                   <a:schemeClr val="tx1"/>
                 </a:solidFill>
@@ -19787,7 +19787,7 @@
               </a14:hiddenLine>
             </a:ext>
             <a:ext uri="{AF507438-7753-43E0-B8FC-AC1667EBCBE1}">
-              <a14:hiddenEffects xmlns="" xmlns:a14="http://schemas.microsoft.com/office/drawing/2010/main">
+              <a14:hiddenEffects xmlns:a14="http://schemas.microsoft.com/office/drawing/2010/main" xmlns="">
                 <a:effectLst>
                   <a:outerShdw dist="35921" dir="2700000" algn="ctr" rotWithShape="0">
                     <a:schemeClr val="bg2"/>
@@ -19868,7 +19868,7 @@
     </p:spTree>
     <p:extLst>
       <p:ext uri="{BB962C8B-B14F-4D97-AF65-F5344CB8AC3E}">
-        <p14:creationId xmlns="" xmlns:p14="http://schemas.microsoft.com/office/powerpoint/2010/main" val="503117530"/>
+        <p14:creationId xmlns:p14="http://schemas.microsoft.com/office/powerpoint/2010/main" xmlns="" val="503117530"/>
       </p:ext>
     </p:extLst>
   </p:cSld>
@@ -19953,7 +19953,7 @@
           <p:nvPr>
             <p:extLst>
               <p:ext uri="{D42A27DB-BD31-4B8C-83A1-F6EECF244321}">
-                <p14:modId xmlns="" xmlns:p14="http://schemas.microsoft.com/office/powerpoint/2010/main" val="722892891"/>
+                <p14:modId xmlns:p14="http://schemas.microsoft.com/office/powerpoint/2010/main" xmlns="" val="722892891"/>
               </p:ext>
             </p:extLst>
           </p:nvPr>
@@ -20935,7 +20935,7 @@
     </p:spTree>
     <p:extLst>
       <p:ext uri="{BB962C8B-B14F-4D97-AF65-F5344CB8AC3E}">
-        <p14:creationId xmlns="" xmlns:p14="http://schemas.microsoft.com/office/powerpoint/2010/main" val="2473970557"/>
+        <p14:creationId xmlns:p14="http://schemas.microsoft.com/office/powerpoint/2010/main" xmlns="" val="2473970557"/>
       </p:ext>
     </p:extLst>
   </p:cSld>
@@ -20981,7 +20981,7 @@
           <a:blip r:embed="rId3">
             <a:extLst>
               <a:ext uri="{28A0092B-C50C-407E-A947-70E740481C1C}">
-                <a14:useLocalDpi xmlns="" xmlns:a14="http://schemas.microsoft.com/office/drawing/2010/main" val="0"/>
+                <a14:useLocalDpi xmlns:a14="http://schemas.microsoft.com/office/drawing/2010/main" xmlns="" val="0"/>
               </a:ext>
             </a:extLst>
           </a:blip>
@@ -21024,7 +21024,7 @@
           </a:sp3d>
           <a:extLst>
             <a:ext uri="{909E8E84-426E-40DD-AFC4-6F175D3DCCD1}">
-              <a14:hiddenFill xmlns="" xmlns:a14="http://schemas.microsoft.com/office/drawing/2010/main">
+              <a14:hiddenFill xmlns:a14="http://schemas.microsoft.com/office/drawing/2010/main" xmlns="">
                 <a:solidFill>
                   <a:srgbClr val="FFFFFF"/>
                 </a:solidFill>
@@ -21363,7 +21363,7 @@
           <a:blip r:embed="rId3">
             <a:extLst>
               <a:ext uri="{28A0092B-C50C-407E-A947-70E740481C1C}">
-                <a14:useLocalDpi xmlns="" xmlns:a14="http://schemas.microsoft.com/office/drawing/2010/main" val="0"/>
+                <a14:useLocalDpi xmlns:a14="http://schemas.microsoft.com/office/drawing/2010/main" xmlns="" val="0"/>
               </a:ext>
             </a:extLst>
           </a:blip>
@@ -21387,14 +21387,14 @@
           <a:effectLst/>
           <a:extLst>
             <a:ext uri="{909E8E84-426E-40DD-AFC4-6F175D3DCCD1}">
-              <a14:hiddenFill xmlns="" xmlns:a14="http://schemas.microsoft.com/office/drawing/2010/main">
+              <a14:hiddenFill xmlns:a14="http://schemas.microsoft.com/office/drawing/2010/main" xmlns="">
                 <a:solidFill>
                   <a:schemeClr val="accent1"/>
                 </a:solidFill>
               </a14:hiddenFill>
             </a:ext>
             <a:ext uri="{91240B29-F687-4F45-9708-019B960494DF}">
-              <a14:hiddenLine xmlns="" xmlns:a14="http://schemas.microsoft.com/office/drawing/2010/main" w="9525">
+              <a14:hiddenLine xmlns:a14="http://schemas.microsoft.com/office/drawing/2010/main" xmlns="" w="9525">
                 <a:solidFill>
                   <a:schemeClr val="tx1"/>
                 </a:solidFill>
@@ -21404,7 +21404,7 @@
               </a14:hiddenLine>
             </a:ext>
             <a:ext uri="{AF507438-7753-43E0-B8FC-AC1667EBCBE1}">
-              <a14:hiddenEffects xmlns="" xmlns:a14="http://schemas.microsoft.com/office/drawing/2010/main">
+              <a14:hiddenEffects xmlns:a14="http://schemas.microsoft.com/office/drawing/2010/main" xmlns="">
                 <a:effectLst>
                   <a:outerShdw dist="35921" dir="2700000" algn="ctr" rotWithShape="0">
                     <a:schemeClr val="bg2"/>
@@ -21505,14 +21505,14 @@
           <a:effectLst/>
           <a:extLst>
             <a:ext uri="{909E8E84-426E-40DD-AFC4-6F175D3DCCD1}">
-              <a14:hiddenFill xmlns="" xmlns:a14="http://schemas.microsoft.com/office/drawing/2010/main">
+              <a14:hiddenFill xmlns:a14="http://schemas.microsoft.com/office/drawing/2010/main" xmlns="">
                 <a:solidFill>
                   <a:schemeClr val="accent1"/>
                 </a:solidFill>
               </a14:hiddenFill>
             </a:ext>
             <a:ext uri="{91240B29-F687-4F45-9708-019B960494DF}">
-              <a14:hiddenLine xmlns="" xmlns:a14="http://schemas.microsoft.com/office/drawing/2010/main" w="9525">
+              <a14:hiddenLine xmlns:a14="http://schemas.microsoft.com/office/drawing/2010/main" xmlns="" w="9525">
                 <a:solidFill>
                   <a:schemeClr val="tx1"/>
                 </a:solidFill>
@@ -21522,7 +21522,7 @@
               </a14:hiddenLine>
             </a:ext>
             <a:ext uri="{AF507438-7753-43E0-B8FC-AC1667EBCBE1}">
-              <a14:hiddenEffects xmlns="" xmlns:a14="http://schemas.microsoft.com/office/drawing/2010/main">
+              <a14:hiddenEffects xmlns:a14="http://schemas.microsoft.com/office/drawing/2010/main" xmlns="">
                 <a:effectLst>
                   <a:outerShdw dist="35921" dir="2700000" algn="ctr" rotWithShape="0">
                     <a:schemeClr val="bg2"/>
@@ -21970,7 +21970,7 @@
     </p:spTree>
     <p:extLst>
       <p:ext uri="{BB962C8B-B14F-4D97-AF65-F5344CB8AC3E}">
-        <p14:creationId xmlns="" xmlns:p14="http://schemas.microsoft.com/office/powerpoint/2010/main" val="3312797979"/>
+        <p14:creationId xmlns:p14="http://schemas.microsoft.com/office/powerpoint/2010/main" xmlns="" val="3312797979"/>
       </p:ext>
     </p:extLst>
   </p:cSld>
@@ -23400,7 +23400,7 @@
     </p:spTree>
     <p:extLst>
       <p:ext uri="{BB962C8B-B14F-4D97-AF65-F5344CB8AC3E}">
-        <p14:creationId xmlns="" xmlns:p14="http://schemas.microsoft.com/office/powerpoint/2010/main" val="155874689"/>
+        <p14:creationId xmlns:p14="http://schemas.microsoft.com/office/powerpoint/2010/main" xmlns="" val="155874689"/>
       </p:ext>
     </p:extLst>
   </p:cSld>
@@ -23408,7 +23408,7 @@
     <a:masterClrMapping/>
   </p:clrMapOvr>
   <mc:AlternateContent xmlns:mc="http://schemas.openxmlformats.org/markup-compatibility/2006">
-    <mc:Choice xmlns="" xmlns:p14="http://schemas.microsoft.com/office/powerpoint/2010/main" Requires="p14">
+    <mc:Choice xmlns:p14="http://schemas.microsoft.com/office/powerpoint/2010/main" xmlns="" Requires="p14">
       <p:transition spd="slow" p14:dur="2000"/>
     </mc:Choice>
     <mc:Fallback>
@@ -24015,7 +24015,7 @@
           <p:nvPr>
             <p:extLst>
               <p:ext uri="{D42A27DB-BD31-4B8C-83A1-F6EECF244321}">
-                <p14:modId xmlns="" xmlns:p14="http://schemas.microsoft.com/office/powerpoint/2010/main" val="3382119601"/>
+                <p14:modId xmlns:p14="http://schemas.microsoft.com/office/powerpoint/2010/main" xmlns="" val="3382119601"/>
               </p:ext>
             </p:extLst>
           </p:nvPr>
@@ -26604,8 +26604,25 @@
                 <a:latin typeface="+mj-lt"/>
                 <a:cs typeface="Arial" pitchFamily="34" charset="0"/>
               </a:rPr>
-              <a:t>*@param questionario</a:t>
-            </a:r>
+              <a:t>*@param </a:t>
+            </a:r>
+            <a:r>
+              <a:rPr lang="it-IT" sz="1800" b="1" dirty="0" smtClean="0">
+                <a:solidFill>
+                  <a:srgbClr val="0070C0"/>
+                </a:solidFill>
+                <a:latin typeface="+mj-lt"/>
+                <a:cs typeface="Arial" pitchFamily="34" charset="0"/>
+              </a:rPr>
+              <a:t>questionario</a:t>
+            </a:r>
+            <a:endParaRPr lang="it-IT" sz="1800" b="1" dirty="0" smtClean="0">
+              <a:solidFill>
+                <a:srgbClr val="0070C0"/>
+              </a:solidFill>
+              <a:latin typeface="+mj-lt"/>
+              <a:cs typeface="Arial" pitchFamily="34" charset="0"/>
+            </a:endParaRPr>
           </a:p>
           <a:p>
             <a:pPr marL="285750" indent="-285750" algn="just">
@@ -26756,10 +26773,62 @@
           </a:p>
         </p:txBody>
       </p:sp>
+      <p:pic>
+        <p:nvPicPr>
+          <p:cNvPr id="16386" name="Picture 2" descr="http://oliviertech.com/wp-content/uploads/2012/12/junit.gif"/>
+          <p:cNvPicPr>
+            <a:picLocks noChangeAspect="1" noChangeArrowheads="1"/>
+          </p:cNvPicPr>
+          <p:nvPr/>
+        </p:nvPicPr>
+        <p:blipFill>
+          <a:blip r:embed="rId2"/>
+          <a:srcRect/>
+          <a:stretch>
+            <a:fillRect/>
+          </a:stretch>
+        </p:blipFill>
+        <p:spPr bwMode="auto">
+          <a:xfrm>
+            <a:off x="155575" y="-319088"/>
+            <a:ext cx="1276350" cy="676276"/>
+          </a:xfrm>
+          <a:prstGeom prst="rect">
+            <a:avLst/>
+          </a:prstGeom>
+          <a:noFill/>
+        </p:spPr>
+      </p:pic>
+      <p:pic>
+        <p:nvPicPr>
+          <p:cNvPr id="16388" name="Picture 4" descr="http://oliviertech.com/wp-content/uploads/2012/12/junit.gif"/>
+          <p:cNvPicPr>
+            <a:picLocks noChangeAspect="1" noChangeArrowheads="1"/>
+          </p:cNvPicPr>
+          <p:nvPr/>
+        </p:nvPicPr>
+        <p:blipFill>
+          <a:blip r:embed="rId2"/>
+          <a:srcRect/>
+          <a:stretch>
+            <a:fillRect/>
+          </a:stretch>
+        </p:blipFill>
+        <p:spPr bwMode="auto">
+          <a:xfrm>
+            <a:off x="7286644" y="5715016"/>
+            <a:ext cx="1276350" cy="676276"/>
+          </a:xfrm>
+          <a:prstGeom prst="rect">
+            <a:avLst/>
+          </a:prstGeom>
+          <a:noFill/>
+        </p:spPr>
+      </p:pic>
     </p:spTree>
     <p:extLst>
       <p:ext uri="{BB962C8B-B14F-4D97-AF65-F5344CB8AC3E}">
-        <p14:creationId xmlns="" xmlns:p14="http://schemas.microsoft.com/office/powerpoint/2010/main" val="134615909"/>
+        <p14:creationId xmlns:p14="http://schemas.microsoft.com/office/powerpoint/2010/main" xmlns="" val="134615909"/>
       </p:ext>
     </p:extLst>
   </p:cSld>
@@ -26852,7 +26921,7 @@
           <p:nvPr>
             <p:extLst>
               <p:ext uri="{D42A27DB-BD31-4B8C-83A1-F6EECF244321}">
-                <p14:modId xmlns="" xmlns:p14="http://schemas.microsoft.com/office/powerpoint/2010/main" val="1603526078"/>
+                <p14:modId xmlns:p14="http://schemas.microsoft.com/office/powerpoint/2010/main" xmlns="" val="1603526078"/>
               </p:ext>
             </p:extLst>
           </p:nvPr>
@@ -26919,11 +26988,7 @@
                       </a:r>
                       <a:r>
                         <a:rPr lang="it-IT" baseline="0" dirty="0" smtClean="0"/>
-                        <a:t> </a:t>
-                      </a:r>
-                      <a:r>
-                        <a:rPr lang="it-IT" baseline="0" dirty="0" smtClean="0"/>
-                        <a:t>editabile</a:t>
+                        <a:t> editabile</a:t>
                       </a:r>
                     </a:p>
                     <a:p>
@@ -27002,7 +27067,7 @@
     </p:spTree>
     <p:extLst>
       <p:ext uri="{BB962C8B-B14F-4D97-AF65-F5344CB8AC3E}">
-        <p14:creationId xmlns="" xmlns:p14="http://schemas.microsoft.com/office/powerpoint/2010/main" val="1428921569"/>
+        <p14:creationId xmlns:p14="http://schemas.microsoft.com/office/powerpoint/2010/main" xmlns="" val="1428921569"/>
       </p:ext>
     </p:extLst>
   </p:cSld>
@@ -27095,7 +27160,7 @@
           <p:nvPr>
             <p:extLst>
               <p:ext uri="{D42A27DB-BD31-4B8C-83A1-F6EECF244321}">
-                <p14:modId xmlns="" xmlns:p14="http://schemas.microsoft.com/office/powerpoint/2010/main" val="3377787449"/>
+                <p14:modId xmlns:p14="http://schemas.microsoft.com/office/powerpoint/2010/main" xmlns="" val="3377787449"/>
               </p:ext>
             </p:extLst>
           </p:nvPr>
@@ -27182,11 +27247,7 @@
                       </a:r>
                       <a:r>
                         <a:rPr lang="it-IT" baseline="0" dirty="0" smtClean="0"/>
-                        <a:t> </a:t>
-                      </a:r>
-                      <a:r>
-                        <a:rPr lang="it-IT" baseline="0" dirty="0" smtClean="0"/>
-                        <a:t>editabile</a:t>
+                        <a:t> editabile</a:t>
                       </a:r>
                     </a:p>
                     <a:p>
@@ -27311,7 +27372,7 @@
     </p:spTree>
     <p:extLst>
       <p:ext uri="{BB962C8B-B14F-4D97-AF65-F5344CB8AC3E}">
-        <p14:creationId xmlns="" xmlns:p14="http://schemas.microsoft.com/office/powerpoint/2010/main" val="521228686"/>
+        <p14:creationId xmlns:p14="http://schemas.microsoft.com/office/powerpoint/2010/main" xmlns="" val="521228686"/>
       </p:ext>
     </p:extLst>
   </p:cSld>
@@ -27398,7 +27459,7 @@
           <a:blip r:embed="rId2">
             <a:extLst>
               <a:ext uri="{28A0092B-C50C-407E-A947-70E740481C1C}">
-                <a14:useLocalDpi xmlns="" xmlns:a14="http://schemas.microsoft.com/office/drawing/2010/main" val="0"/>
+                <a14:useLocalDpi xmlns:a14="http://schemas.microsoft.com/office/drawing/2010/main" xmlns="" val="0"/>
               </a:ext>
             </a:extLst>
           </a:blip>
@@ -27418,7 +27479,7 @@
           <a:noFill/>
           <a:extLst>
             <a:ext uri="{909E8E84-426E-40DD-AFC4-6F175D3DCCD1}">
-              <a14:hiddenFill xmlns="" xmlns:a14="http://schemas.microsoft.com/office/drawing/2010/main">
+              <a14:hiddenFill xmlns:a14="http://schemas.microsoft.com/office/drawing/2010/main" xmlns="">
                 <a:solidFill>
                   <a:srgbClr val="FFFFFF"/>
                 </a:solidFill>
@@ -27529,11 +27590,7 @@
           <a:p>
             <a:r>
               <a:rPr lang="it-IT" dirty="0" smtClean="0"/>
-              <a:t>una d</a:t>
-            </a:r>
-            <a:r>
-              <a:rPr lang="it-IT" dirty="0" smtClean="0"/>
-              <a:t>ata con anno -1900 a </a:t>
+              <a:t>una data con anno -1900 a </a:t>
             </a:r>
           </a:p>
           <a:p>
@@ -27604,7 +27661,7 @@
     </p:spTree>
     <p:extLst>
       <p:ext uri="{BB962C8B-B14F-4D97-AF65-F5344CB8AC3E}">
-        <p14:creationId xmlns="" xmlns:p14="http://schemas.microsoft.com/office/powerpoint/2010/main" val="2138116938"/>
+        <p14:creationId xmlns:p14="http://schemas.microsoft.com/office/powerpoint/2010/main" xmlns="" val="2138116938"/>
       </p:ext>
     </p:extLst>
   </p:cSld>
@@ -27706,7 +27763,7 @@
           <p:nvPr>
             <p:extLst>
               <p:ext uri="{D42A27DB-BD31-4B8C-83A1-F6EECF244321}">
-                <p14:modId xmlns="" xmlns:p14="http://schemas.microsoft.com/office/powerpoint/2010/main" val="3745458434"/>
+                <p14:modId xmlns:p14="http://schemas.microsoft.com/office/powerpoint/2010/main" xmlns="" val="3745458434"/>
               </p:ext>
             </p:extLst>
           </p:nvPr>
@@ -27793,11 +27850,7 @@
                       </a:r>
                       <a:r>
                         <a:rPr lang="it-IT" baseline="0" dirty="0" smtClean="0"/>
-                        <a:t> </a:t>
-                      </a:r>
-                      <a:r>
-                        <a:rPr lang="it-IT" baseline="0" dirty="0" smtClean="0"/>
-                        <a:t>editabile</a:t>
+                        <a:t> editabile</a:t>
                       </a:r>
                     </a:p>
                     <a:p>
@@ -27922,7 +27975,7 @@
     </p:spTree>
     <p:extLst>
       <p:ext uri="{BB962C8B-B14F-4D97-AF65-F5344CB8AC3E}">
-        <p14:creationId xmlns="" xmlns:p14="http://schemas.microsoft.com/office/powerpoint/2010/main" val="2476603813"/>
+        <p14:creationId xmlns:p14="http://schemas.microsoft.com/office/powerpoint/2010/main" xmlns="" val="2476603813"/>
       </p:ext>
     </p:extLst>
   </p:cSld>
@@ -27997,7 +28050,7 @@
     </p:spTree>
     <p:extLst>
       <p:ext uri="{BB962C8B-B14F-4D97-AF65-F5344CB8AC3E}">
-        <p14:creationId xmlns="" xmlns:p14="http://schemas.microsoft.com/office/powerpoint/2010/main" val="3060381138"/>
+        <p14:creationId xmlns:p14="http://schemas.microsoft.com/office/powerpoint/2010/main" xmlns="" val="3060381138"/>
       </p:ext>
     </p:extLst>
   </p:cSld>
@@ -28522,7 +28575,7 @@
           <a:blip r:embed="rId3">
             <a:extLst>
               <a:ext uri="{28A0092B-C50C-407E-A947-70E740481C1C}">
-                <a14:useLocalDpi xmlns="" xmlns:a14="http://schemas.microsoft.com/office/drawing/2010/main" val="0"/>
+                <a14:useLocalDpi xmlns:a14="http://schemas.microsoft.com/office/drawing/2010/main" xmlns="" val="0"/>
               </a:ext>
             </a:extLst>
           </a:blip>
@@ -28542,7 +28595,7 @@
           <a:noFill/>
           <a:extLst>
             <a:ext uri="{909E8E84-426E-40DD-AFC4-6F175D3DCCD1}">
-              <a14:hiddenFill xmlns="" xmlns:a14="http://schemas.microsoft.com/office/drawing/2010/main">
+              <a14:hiddenFill xmlns:a14="http://schemas.microsoft.com/office/drawing/2010/main" xmlns="">
                 <a:solidFill>
                   <a:srgbClr val="FFFFFF"/>
                 </a:solidFill>
@@ -28692,7 +28745,7 @@
     </p:spTree>
     <p:extLst>
       <p:ext uri="{BB962C8B-B14F-4D97-AF65-F5344CB8AC3E}">
-        <p14:creationId xmlns="" xmlns:p14="http://schemas.microsoft.com/office/powerpoint/2010/main" val="1739081068"/>
+        <p14:creationId xmlns:p14="http://schemas.microsoft.com/office/powerpoint/2010/main" xmlns="" val="1739081068"/>
       </p:ext>
     </p:extLst>
   </p:cSld>
@@ -30399,7 +30452,7 @@
     </p:spTree>
     <p:extLst>
       <p:ext uri="{BB962C8B-B14F-4D97-AF65-F5344CB8AC3E}">
-        <p14:creationId xmlns="" xmlns:p14="http://schemas.microsoft.com/office/powerpoint/2010/main" val="2532338835"/>
+        <p14:creationId xmlns:p14="http://schemas.microsoft.com/office/powerpoint/2010/main" xmlns="" val="2532338835"/>
       </p:ext>
     </p:extLst>
   </p:cSld>
@@ -30407,7 +30460,7 @@
     <a:masterClrMapping/>
   </p:clrMapOvr>
   <mc:AlternateContent xmlns:mc="http://schemas.openxmlformats.org/markup-compatibility/2006">
-    <mc:Choice xmlns="" xmlns:p14="http://schemas.microsoft.com/office/powerpoint/2010/main" Requires="p14">
+    <mc:Choice xmlns:p14="http://schemas.microsoft.com/office/powerpoint/2010/main" xmlns="" Requires="p14">
       <p:transition spd="slow" p14:dur="2000"/>
     </mc:Choice>
     <mc:Fallback>
@@ -30497,7 +30550,7 @@
           <p:nvPr>
             <p:extLst>
               <p:ext uri="{D42A27DB-BD31-4B8C-83A1-F6EECF244321}">
-                <p14:modId xmlns="" xmlns:p14="http://schemas.microsoft.com/office/powerpoint/2010/main" val="4285816619"/>
+                <p14:modId xmlns:p14="http://schemas.microsoft.com/office/powerpoint/2010/main" xmlns="" val="4285816619"/>
               </p:ext>
             </p:extLst>
           </p:nvPr>
@@ -31227,7 +31280,7 @@
           <p:nvPr>
             <p:extLst>
               <p:ext uri="{D42A27DB-BD31-4B8C-83A1-F6EECF244321}">
-                <p14:modId xmlns="" xmlns:p14="http://schemas.microsoft.com/office/powerpoint/2010/main" val="4159081582"/>
+                <p14:modId xmlns:p14="http://schemas.microsoft.com/office/powerpoint/2010/main" xmlns="" val="4159081582"/>
               </p:ext>
             </p:extLst>
           </p:nvPr>
@@ -32066,7 +32119,7 @@
     </p:spTree>
     <p:extLst>
       <p:ext uri="{BB962C8B-B14F-4D97-AF65-F5344CB8AC3E}">
-        <p14:creationId xmlns="" xmlns:p14="http://schemas.microsoft.com/office/powerpoint/2010/main" val="1173458281"/>
+        <p14:creationId xmlns:p14="http://schemas.microsoft.com/office/powerpoint/2010/main" xmlns="" val="1173458281"/>
       </p:ext>
     </p:extLst>
   </p:cSld>
@@ -33324,7 +33377,7 @@
     </p:spTree>
     <p:extLst>
       <p:ext uri="{BB962C8B-B14F-4D97-AF65-F5344CB8AC3E}">
-        <p14:creationId xmlns="" xmlns:p14="http://schemas.microsoft.com/office/powerpoint/2010/main" val="2769124218"/>
+        <p14:creationId xmlns:p14="http://schemas.microsoft.com/office/powerpoint/2010/main" xmlns="" val="2769124218"/>
       </p:ext>
     </p:extLst>
   </p:cSld>

</xml_diff>

<commit_message>
[WR 3] pro/contro testing e revisione animazione
</commit_message>
<xml_diff>
--- a/Presentazione/Atsilo3/Atsilo_H_PresentazioneFinale.pptx
+++ b/Presentazione/Atsilo3/Atsilo_H_PresentazioneFinale.pptx
@@ -234,7 +234,7 @@
             <a:fld id="{38D78F4D-402C-46E0-A4BB-DF91EA86B14C}" type="datetimeFigureOut">
               <a:rPr lang="it-IT" smtClean="0"/>
               <a:pPr/>
-              <a:t>30/12/2012</a:t>
+              <a:t>31/12/2012</a:t>
             </a:fld>
             <a:endParaRPr lang="it-IT"/>
           </a:p>
@@ -403,7 +403,7 @@
     </p:spTree>
     <p:extLst>
       <p:ext uri="{BB962C8B-B14F-4D97-AF65-F5344CB8AC3E}">
-        <p14:creationId xmlns:p14="http://schemas.microsoft.com/office/powerpoint/2010/main" xmlns="" val="2126419590"/>
+        <p14:creationId xmlns="" xmlns:p14="http://schemas.microsoft.com/office/powerpoint/2010/main" val="2126419590"/>
       </p:ext>
     </p:extLst>
   </p:cSld>
@@ -600,7 +600,7 @@
     </p:spTree>
     <p:extLst>
       <p:ext uri="{BB962C8B-B14F-4D97-AF65-F5344CB8AC3E}">
-        <p14:creationId xmlns:p14="http://schemas.microsoft.com/office/powerpoint/2010/main" xmlns="" val="963420841"/>
+        <p14:creationId xmlns="" xmlns:p14="http://schemas.microsoft.com/office/powerpoint/2010/main" val="963420841"/>
       </p:ext>
     </p:extLst>
   </p:cSld>
@@ -707,7 +707,7 @@
     </p:spTree>
     <p:extLst>
       <p:ext uri="{BB962C8B-B14F-4D97-AF65-F5344CB8AC3E}">
-        <p14:creationId xmlns:p14="http://schemas.microsoft.com/office/powerpoint/2010/main" xmlns="" val="3361965342"/>
+        <p14:creationId xmlns="" xmlns:p14="http://schemas.microsoft.com/office/powerpoint/2010/main" val="3361965342"/>
       </p:ext>
     </p:extLst>
   </p:cSld>
@@ -850,7 +850,7 @@
     </p:spTree>
     <p:extLst>
       <p:ext uri="{BB962C8B-B14F-4D97-AF65-F5344CB8AC3E}">
-        <p14:creationId xmlns:p14="http://schemas.microsoft.com/office/powerpoint/2010/main" xmlns="" val="3314347345"/>
+        <p14:creationId xmlns="" xmlns:p14="http://schemas.microsoft.com/office/powerpoint/2010/main" val="3314347345"/>
       </p:ext>
     </p:extLst>
   </p:cSld>
@@ -987,7 +987,7 @@
     </p:spTree>
     <p:extLst>
       <p:ext uri="{BB962C8B-B14F-4D97-AF65-F5344CB8AC3E}">
-        <p14:creationId xmlns:p14="http://schemas.microsoft.com/office/powerpoint/2010/main" xmlns="" val="2265654022"/>
+        <p14:creationId xmlns="" xmlns:p14="http://schemas.microsoft.com/office/powerpoint/2010/main" val="2265654022"/>
       </p:ext>
     </p:extLst>
   </p:cSld>
@@ -1124,7 +1124,7 @@
     </p:spTree>
     <p:extLst>
       <p:ext uri="{BB962C8B-B14F-4D97-AF65-F5344CB8AC3E}">
-        <p14:creationId xmlns:p14="http://schemas.microsoft.com/office/powerpoint/2010/main" xmlns="" val="71143455"/>
+        <p14:creationId xmlns="" xmlns:p14="http://schemas.microsoft.com/office/powerpoint/2010/main" val="71143455"/>
       </p:ext>
     </p:extLst>
   </p:cSld>
@@ -1223,7 +1223,7 @@
     </p:spTree>
     <p:extLst>
       <p:ext uri="{BB962C8B-B14F-4D97-AF65-F5344CB8AC3E}">
-        <p14:creationId xmlns:p14="http://schemas.microsoft.com/office/powerpoint/2010/main" xmlns="" val="113696966"/>
+        <p14:creationId xmlns="" xmlns:p14="http://schemas.microsoft.com/office/powerpoint/2010/main" val="113696966"/>
       </p:ext>
     </p:extLst>
   </p:cSld>
@@ -1348,7 +1348,7 @@
     </p:spTree>
     <p:extLst>
       <p:ext uri="{BB962C8B-B14F-4D97-AF65-F5344CB8AC3E}">
-        <p14:creationId xmlns:p14="http://schemas.microsoft.com/office/powerpoint/2010/main" xmlns="" val="1063702567"/>
+        <p14:creationId xmlns="" xmlns:p14="http://schemas.microsoft.com/office/powerpoint/2010/main" val="1063702567"/>
       </p:ext>
     </p:extLst>
   </p:cSld>
@@ -1453,7 +1453,7 @@
     </p:spTree>
     <p:extLst>
       <p:ext uri="{BB962C8B-B14F-4D97-AF65-F5344CB8AC3E}">
-        <p14:creationId xmlns:p14="http://schemas.microsoft.com/office/powerpoint/2010/main" xmlns="" val="122959592"/>
+        <p14:creationId xmlns="" xmlns:p14="http://schemas.microsoft.com/office/powerpoint/2010/main" val="122959592"/>
       </p:ext>
     </p:extLst>
   </p:cSld>
@@ -1568,7 +1568,7 @@
     </p:spTree>
     <p:extLst>
       <p:ext uri="{BB962C8B-B14F-4D97-AF65-F5344CB8AC3E}">
-        <p14:creationId xmlns:p14="http://schemas.microsoft.com/office/powerpoint/2010/main" xmlns="" val="780286428"/>
+        <p14:creationId xmlns="" xmlns:p14="http://schemas.microsoft.com/office/powerpoint/2010/main" val="780286428"/>
       </p:ext>
     </p:extLst>
   </p:cSld>
@@ -1669,7 +1669,7 @@
     </p:spTree>
     <p:extLst>
       <p:ext uri="{BB962C8B-B14F-4D97-AF65-F5344CB8AC3E}">
-        <p14:creationId xmlns:p14="http://schemas.microsoft.com/office/powerpoint/2010/main" xmlns="" val="2418012031"/>
+        <p14:creationId xmlns="" xmlns:p14="http://schemas.microsoft.com/office/powerpoint/2010/main" val="2418012031"/>
       </p:ext>
     </p:extLst>
   </p:cSld>
@@ -1770,7 +1770,7 @@
     </p:spTree>
     <p:extLst>
       <p:ext uri="{BB962C8B-B14F-4D97-AF65-F5344CB8AC3E}">
-        <p14:creationId xmlns:p14="http://schemas.microsoft.com/office/powerpoint/2010/main" xmlns="" val="778008281"/>
+        <p14:creationId xmlns="" xmlns:p14="http://schemas.microsoft.com/office/powerpoint/2010/main" val="778008281"/>
       </p:ext>
     </p:extLst>
   </p:cSld>
@@ -1881,7 +1881,7 @@
     </p:spTree>
     <p:extLst>
       <p:ext uri="{BB962C8B-B14F-4D97-AF65-F5344CB8AC3E}">
-        <p14:creationId xmlns:p14="http://schemas.microsoft.com/office/powerpoint/2010/main" xmlns="" val="2781517378"/>
+        <p14:creationId xmlns="" xmlns:p14="http://schemas.microsoft.com/office/powerpoint/2010/main" val="2781517378"/>
       </p:ext>
     </p:extLst>
   </p:cSld>
@@ -1974,7 +1974,7 @@
     </p:spTree>
     <p:extLst>
       <p:ext uri="{BB962C8B-B14F-4D97-AF65-F5344CB8AC3E}">
-        <p14:creationId xmlns:p14="http://schemas.microsoft.com/office/powerpoint/2010/main" xmlns="" val="1377757052"/>
+        <p14:creationId xmlns="" xmlns:p14="http://schemas.microsoft.com/office/powerpoint/2010/main" val="1377757052"/>
       </p:ext>
     </p:extLst>
   </p:cSld>
@@ -2078,7 +2078,7 @@
     </p:spTree>
     <p:extLst>
       <p:ext uri="{BB962C8B-B14F-4D97-AF65-F5344CB8AC3E}">
-        <p14:creationId xmlns:p14="http://schemas.microsoft.com/office/powerpoint/2010/main" xmlns="" val="1394194668"/>
+        <p14:creationId xmlns="" xmlns:p14="http://schemas.microsoft.com/office/powerpoint/2010/main" val="1394194668"/>
       </p:ext>
     </p:extLst>
   </p:cSld>
@@ -2233,7 +2233,7 @@
     </p:spTree>
     <p:extLst>
       <p:ext uri="{BB962C8B-B14F-4D97-AF65-F5344CB8AC3E}">
-        <p14:creationId xmlns:p14="http://schemas.microsoft.com/office/powerpoint/2010/main" xmlns="" val="2972088584"/>
+        <p14:creationId xmlns="" xmlns:p14="http://schemas.microsoft.com/office/powerpoint/2010/main" val="2972088584"/>
       </p:ext>
     </p:extLst>
   </p:cSld>
@@ -2342,7 +2342,7 @@
     </p:spTree>
     <p:extLst>
       <p:ext uri="{BB962C8B-B14F-4D97-AF65-F5344CB8AC3E}">
-        <p14:creationId xmlns:p14="http://schemas.microsoft.com/office/powerpoint/2010/main" xmlns="" val="1417320036"/>
+        <p14:creationId xmlns="" xmlns:p14="http://schemas.microsoft.com/office/powerpoint/2010/main" val="1417320036"/>
       </p:ext>
     </p:extLst>
   </p:cSld>
@@ -2451,7 +2451,7 @@
     </p:spTree>
     <p:extLst>
       <p:ext uri="{BB962C8B-B14F-4D97-AF65-F5344CB8AC3E}">
-        <p14:creationId xmlns:p14="http://schemas.microsoft.com/office/powerpoint/2010/main" xmlns="" val="2176874561"/>
+        <p14:creationId xmlns="" xmlns:p14="http://schemas.microsoft.com/office/powerpoint/2010/main" val="2176874561"/>
       </p:ext>
     </p:extLst>
   </p:cSld>
@@ -2552,7 +2552,7 @@
     </p:spTree>
     <p:extLst>
       <p:ext uri="{BB962C8B-B14F-4D97-AF65-F5344CB8AC3E}">
-        <p14:creationId xmlns:p14="http://schemas.microsoft.com/office/powerpoint/2010/main" xmlns="" val="2428745919"/>
+        <p14:creationId xmlns="" xmlns:p14="http://schemas.microsoft.com/office/powerpoint/2010/main" val="2428745919"/>
       </p:ext>
     </p:extLst>
   </p:cSld>
@@ -2649,7 +2649,7 @@
     </p:spTree>
     <p:extLst>
       <p:ext uri="{BB962C8B-B14F-4D97-AF65-F5344CB8AC3E}">
-        <p14:creationId xmlns:p14="http://schemas.microsoft.com/office/powerpoint/2010/main" xmlns="" val="899854441"/>
+        <p14:creationId xmlns="" xmlns:p14="http://schemas.microsoft.com/office/powerpoint/2010/main" val="899854441"/>
       </p:ext>
     </p:extLst>
   </p:cSld>
@@ -2805,7 +2805,7 @@
     </p:spTree>
     <p:extLst>
       <p:ext uri="{BB962C8B-B14F-4D97-AF65-F5344CB8AC3E}">
-        <p14:creationId xmlns:p14="http://schemas.microsoft.com/office/powerpoint/2010/main" xmlns="" val="1218324987"/>
+        <p14:creationId xmlns="" xmlns:p14="http://schemas.microsoft.com/office/powerpoint/2010/main" val="1218324987"/>
       </p:ext>
     </p:extLst>
   </p:cSld>
@@ -2898,7 +2898,7 @@
     </p:spTree>
     <p:extLst>
       <p:ext uri="{BB962C8B-B14F-4D97-AF65-F5344CB8AC3E}">
-        <p14:creationId xmlns:p14="http://schemas.microsoft.com/office/powerpoint/2010/main" xmlns="" val="3928439017"/>
+        <p14:creationId xmlns="" xmlns:p14="http://schemas.microsoft.com/office/powerpoint/2010/main" val="3928439017"/>
       </p:ext>
     </p:extLst>
   </p:cSld>
@@ -2987,7 +2987,7 @@
     </p:spTree>
     <p:extLst>
       <p:ext uri="{BB962C8B-B14F-4D97-AF65-F5344CB8AC3E}">
-        <p14:creationId xmlns:p14="http://schemas.microsoft.com/office/powerpoint/2010/main" xmlns="" val="4040687285"/>
+        <p14:creationId xmlns="" xmlns:p14="http://schemas.microsoft.com/office/powerpoint/2010/main" val="4040687285"/>
       </p:ext>
     </p:extLst>
   </p:cSld>
@@ -3086,7 +3086,7 @@
     </p:spTree>
     <p:extLst>
       <p:ext uri="{BB962C8B-B14F-4D97-AF65-F5344CB8AC3E}">
-        <p14:creationId xmlns:p14="http://schemas.microsoft.com/office/powerpoint/2010/main" xmlns="" val="1025718114"/>
+        <p14:creationId xmlns="" xmlns:p14="http://schemas.microsoft.com/office/powerpoint/2010/main" val="1025718114"/>
       </p:ext>
     </p:extLst>
   </p:cSld>
@@ -3250,7 +3250,7 @@
     </p:spTree>
     <p:extLst>
       <p:ext uri="{BB962C8B-B14F-4D97-AF65-F5344CB8AC3E}">
-        <p14:creationId xmlns:p14="http://schemas.microsoft.com/office/powerpoint/2010/main" xmlns="" val="1047033234"/>
+        <p14:creationId xmlns="" xmlns:p14="http://schemas.microsoft.com/office/powerpoint/2010/main" val="1047033234"/>
       </p:ext>
     </p:extLst>
   </p:cSld>
@@ -3339,7 +3339,7 @@
     </p:spTree>
     <p:extLst>
       <p:ext uri="{BB962C8B-B14F-4D97-AF65-F5344CB8AC3E}">
-        <p14:creationId xmlns:p14="http://schemas.microsoft.com/office/powerpoint/2010/main" xmlns="" val="1047033234"/>
+        <p14:creationId xmlns="" xmlns:p14="http://schemas.microsoft.com/office/powerpoint/2010/main" val="1047033234"/>
       </p:ext>
     </p:extLst>
   </p:cSld>
@@ -3424,7 +3424,7 @@
     </p:spTree>
     <p:extLst>
       <p:ext uri="{BB962C8B-B14F-4D97-AF65-F5344CB8AC3E}">
-        <p14:creationId xmlns:p14="http://schemas.microsoft.com/office/powerpoint/2010/main" xmlns="" val="742716072"/>
+        <p14:creationId xmlns="" xmlns:p14="http://schemas.microsoft.com/office/powerpoint/2010/main" val="742716072"/>
       </p:ext>
     </p:extLst>
   </p:cSld>
@@ -3513,7 +3513,7 @@
     </p:spTree>
     <p:extLst>
       <p:ext uri="{BB962C8B-B14F-4D97-AF65-F5344CB8AC3E}">
-        <p14:creationId xmlns:p14="http://schemas.microsoft.com/office/powerpoint/2010/main" xmlns="" val="1425725903"/>
+        <p14:creationId xmlns="" xmlns:p14="http://schemas.microsoft.com/office/powerpoint/2010/main" val="1425725903"/>
       </p:ext>
     </p:extLst>
   </p:cSld>
@@ -3622,7 +3622,7 @@
     </p:spTree>
     <p:extLst>
       <p:ext uri="{BB962C8B-B14F-4D97-AF65-F5344CB8AC3E}">
-        <p14:creationId xmlns:p14="http://schemas.microsoft.com/office/powerpoint/2010/main" xmlns="" val="880674728"/>
+        <p14:creationId xmlns="" xmlns:p14="http://schemas.microsoft.com/office/powerpoint/2010/main" val="880674728"/>
       </p:ext>
     </p:extLst>
   </p:cSld>
@@ -3731,7 +3731,7 @@
     </p:spTree>
     <p:extLst>
       <p:ext uri="{BB962C8B-B14F-4D97-AF65-F5344CB8AC3E}">
-        <p14:creationId xmlns:p14="http://schemas.microsoft.com/office/powerpoint/2010/main" xmlns="" val="346945336"/>
+        <p14:creationId xmlns="" xmlns:p14="http://schemas.microsoft.com/office/powerpoint/2010/main" val="346945336"/>
       </p:ext>
     </p:extLst>
   </p:cSld>
@@ -3840,7 +3840,7 @@
     </p:spTree>
     <p:extLst>
       <p:ext uri="{BB962C8B-B14F-4D97-AF65-F5344CB8AC3E}">
-        <p14:creationId xmlns:p14="http://schemas.microsoft.com/office/powerpoint/2010/main" xmlns="" val="1778546328"/>
+        <p14:creationId xmlns="" xmlns:p14="http://schemas.microsoft.com/office/powerpoint/2010/main" val="1778546328"/>
       </p:ext>
     </p:extLst>
   </p:cSld>
@@ -3949,7 +3949,7 @@
     </p:spTree>
     <p:extLst>
       <p:ext uri="{BB962C8B-B14F-4D97-AF65-F5344CB8AC3E}">
-        <p14:creationId xmlns:p14="http://schemas.microsoft.com/office/powerpoint/2010/main" xmlns="" val="604861763"/>
+        <p14:creationId xmlns="" xmlns:p14="http://schemas.microsoft.com/office/powerpoint/2010/main" val="604861763"/>
       </p:ext>
     </p:extLst>
   </p:cSld>
@@ -4038,7 +4038,7 @@
     </p:spTree>
     <p:extLst>
       <p:ext uri="{BB962C8B-B14F-4D97-AF65-F5344CB8AC3E}">
-        <p14:creationId xmlns:p14="http://schemas.microsoft.com/office/powerpoint/2010/main" xmlns="" val="1357369038"/>
+        <p14:creationId xmlns="" xmlns:p14="http://schemas.microsoft.com/office/powerpoint/2010/main" val="1357369038"/>
       </p:ext>
     </p:extLst>
   </p:cSld>
@@ -4152,7 +4152,7 @@
     </p:spTree>
     <p:extLst>
       <p:ext uri="{BB962C8B-B14F-4D97-AF65-F5344CB8AC3E}">
-        <p14:creationId xmlns:p14="http://schemas.microsoft.com/office/powerpoint/2010/main" xmlns="" val="3780346060"/>
+        <p14:creationId xmlns="" xmlns:p14="http://schemas.microsoft.com/office/powerpoint/2010/main" val="3780346060"/>
       </p:ext>
     </p:extLst>
   </p:cSld>
@@ -4257,7 +4257,7 @@
     </p:spTree>
     <p:extLst>
       <p:ext uri="{BB962C8B-B14F-4D97-AF65-F5344CB8AC3E}">
-        <p14:creationId xmlns:p14="http://schemas.microsoft.com/office/powerpoint/2010/main" xmlns="" val="41796055"/>
+        <p14:creationId xmlns="" xmlns:p14="http://schemas.microsoft.com/office/powerpoint/2010/main" val="41796055"/>
       </p:ext>
     </p:extLst>
   </p:cSld>
@@ -4380,7 +4380,7 @@
     </p:spTree>
     <p:extLst>
       <p:ext uri="{BB962C8B-B14F-4D97-AF65-F5344CB8AC3E}">
-        <p14:creationId xmlns:p14="http://schemas.microsoft.com/office/powerpoint/2010/main" xmlns="" val="555626785"/>
+        <p14:creationId xmlns="" xmlns:p14="http://schemas.microsoft.com/office/powerpoint/2010/main" val="555626785"/>
       </p:ext>
     </p:extLst>
   </p:cSld>
@@ -4473,7 +4473,7 @@
     </p:spTree>
     <p:extLst>
       <p:ext uri="{BB962C8B-B14F-4D97-AF65-F5344CB8AC3E}">
-        <p14:creationId xmlns:p14="http://schemas.microsoft.com/office/powerpoint/2010/main" xmlns="" val="855395126"/>
+        <p14:creationId xmlns="" xmlns:p14="http://schemas.microsoft.com/office/powerpoint/2010/main" val="855395126"/>
       </p:ext>
     </p:extLst>
   </p:cSld>
@@ -4586,7 +4586,7 @@
     </p:spTree>
     <p:extLst>
       <p:ext uri="{BB962C8B-B14F-4D97-AF65-F5344CB8AC3E}">
-        <p14:creationId xmlns:p14="http://schemas.microsoft.com/office/powerpoint/2010/main" xmlns="" val="802928497"/>
+        <p14:creationId xmlns="" xmlns:p14="http://schemas.microsoft.com/office/powerpoint/2010/main" val="802928497"/>
       </p:ext>
     </p:extLst>
   </p:cSld>
@@ -4762,7 +4762,7 @@
             <a:fld id="{63CABBC0-75E4-43BB-A6A6-84C2A96BDB82}" type="datetimeFigureOut">
               <a:rPr lang="it-IT" smtClean="0"/>
               <a:pPr/>
-              <a:t>30/12/2012</a:t>
+              <a:t>31/12/2012</a:t>
             </a:fld>
             <a:endParaRPr lang="it-IT"/>
           </a:p>
@@ -4944,7 +4944,7 @@
             <a:fld id="{63CABBC0-75E4-43BB-A6A6-84C2A96BDB82}" type="datetimeFigureOut">
               <a:rPr lang="it-IT" smtClean="0"/>
               <a:pPr/>
-              <a:t>30/12/2012</a:t>
+              <a:t>31/12/2012</a:t>
             </a:fld>
             <a:endParaRPr lang="it-IT"/>
           </a:p>
@@ -5136,7 +5136,7 @@
             <a:fld id="{63CABBC0-75E4-43BB-A6A6-84C2A96BDB82}" type="datetimeFigureOut">
               <a:rPr lang="it-IT" smtClean="0"/>
               <a:pPr/>
-              <a:t>30/12/2012</a:t>
+              <a:t>31/12/2012</a:t>
             </a:fld>
             <a:endParaRPr lang="it-IT"/>
           </a:p>
@@ -5318,7 +5318,7 @@
             <a:fld id="{63CABBC0-75E4-43BB-A6A6-84C2A96BDB82}" type="datetimeFigureOut">
               <a:rPr lang="it-IT" smtClean="0"/>
               <a:pPr/>
-              <a:t>30/12/2012</a:t>
+              <a:t>31/12/2012</a:t>
             </a:fld>
             <a:endParaRPr lang="it-IT"/>
           </a:p>
@@ -5561,7 +5561,7 @@
             <a:fld id="{63CABBC0-75E4-43BB-A6A6-84C2A96BDB82}" type="datetimeFigureOut">
               <a:rPr lang="it-IT" smtClean="0"/>
               <a:pPr/>
-              <a:t>30/12/2012</a:t>
+              <a:t>31/12/2012</a:t>
             </a:fld>
             <a:endParaRPr lang="it-IT"/>
           </a:p>
@@ -5842,7 +5842,7 @@
             <a:fld id="{63CABBC0-75E4-43BB-A6A6-84C2A96BDB82}" type="datetimeFigureOut">
               <a:rPr lang="it-IT" smtClean="0"/>
               <a:pPr/>
-              <a:t>30/12/2012</a:t>
+              <a:t>31/12/2012</a:t>
             </a:fld>
             <a:endParaRPr lang="it-IT"/>
           </a:p>
@@ -6233,7 +6233,7 @@
             <a:fld id="{63CABBC0-75E4-43BB-A6A6-84C2A96BDB82}" type="datetimeFigureOut">
               <a:rPr lang="it-IT" smtClean="0"/>
               <a:pPr/>
-              <a:t>30/12/2012</a:t>
+              <a:t>31/12/2012</a:t>
             </a:fld>
             <a:endParaRPr lang="it-IT"/>
           </a:p>
@@ -6392,7 +6392,7 @@
             <a:fld id="{63CABBC0-75E4-43BB-A6A6-84C2A96BDB82}" type="datetimeFigureOut">
               <a:rPr lang="it-IT" smtClean="0"/>
               <a:pPr/>
-              <a:t>30/12/2012</a:t>
+              <a:t>31/12/2012</a:t>
             </a:fld>
             <a:endParaRPr lang="it-IT"/>
           </a:p>
@@ -6491,7 +6491,7 @@
             <a:fld id="{63CABBC0-75E4-43BB-A6A6-84C2A96BDB82}" type="datetimeFigureOut">
               <a:rPr lang="it-IT" smtClean="0"/>
               <a:pPr/>
-              <a:t>30/12/2012</a:t>
+              <a:t>31/12/2012</a:t>
             </a:fld>
             <a:endParaRPr lang="it-IT"/>
           </a:p>
@@ -6761,7 +6761,7 @@
             <a:fld id="{63CABBC0-75E4-43BB-A6A6-84C2A96BDB82}" type="datetimeFigureOut">
               <a:rPr lang="it-IT" smtClean="0"/>
               <a:pPr/>
-              <a:t>30/12/2012</a:t>
+              <a:t>31/12/2012</a:t>
             </a:fld>
             <a:endParaRPr lang="it-IT"/>
           </a:p>
@@ -7058,7 +7058,7 @@
             <a:fld id="{63CABBC0-75E4-43BB-A6A6-84C2A96BDB82}" type="datetimeFigureOut">
               <a:rPr lang="it-IT" smtClean="0"/>
               <a:pPr/>
-              <a:t>30/12/2012</a:t>
+              <a:t>31/12/2012</a:t>
             </a:fld>
             <a:endParaRPr lang="it-IT"/>
           </a:p>
@@ -7838,7 +7838,7 @@
             <a:fld id="{63CABBC0-75E4-43BB-A6A6-84C2A96BDB82}" type="datetimeFigureOut">
               <a:rPr lang="it-IT" smtClean="0"/>
               <a:pPr/>
-              <a:t>30/12/2012</a:t>
+              <a:t>31/12/2012</a:t>
             </a:fld>
             <a:endParaRPr lang="it-IT"/>
           </a:p>
@@ -8524,7 +8524,7 @@
           <a:blip r:embed="rId2">
             <a:extLst>
               <a:ext uri="{28A0092B-C50C-407E-A947-70E740481C1C}">
-                <a14:useLocalDpi xmlns:a14="http://schemas.microsoft.com/office/drawing/2010/main" xmlns="" val="0"/>
+                <a14:useLocalDpi xmlns="" xmlns:a14="http://schemas.microsoft.com/office/drawing/2010/main" val="0"/>
               </a:ext>
             </a:extLst>
           </a:blip>
@@ -8548,14 +8548,14 @@
           <a:effectLst/>
           <a:extLst>
             <a:ext uri="{909E8E84-426E-40DD-AFC4-6F175D3DCCD1}">
-              <a14:hiddenFill xmlns:a14="http://schemas.microsoft.com/office/drawing/2010/main" xmlns="">
+              <a14:hiddenFill xmlns="" xmlns:a14="http://schemas.microsoft.com/office/drawing/2010/main">
                 <a:solidFill>
                   <a:schemeClr val="accent1"/>
                 </a:solidFill>
               </a14:hiddenFill>
             </a:ext>
             <a:ext uri="{91240B29-F687-4F45-9708-019B960494DF}">
-              <a14:hiddenLine xmlns:a14="http://schemas.microsoft.com/office/drawing/2010/main" xmlns="" w="9525">
+              <a14:hiddenLine xmlns="" xmlns:a14="http://schemas.microsoft.com/office/drawing/2010/main" w="9525">
                 <a:solidFill>
                   <a:schemeClr val="tx1"/>
                 </a:solidFill>
@@ -8565,7 +8565,7 @@
               </a14:hiddenLine>
             </a:ext>
             <a:ext uri="{AF507438-7753-43E0-B8FC-AC1667EBCBE1}">
-              <a14:hiddenEffects xmlns:a14="http://schemas.microsoft.com/office/drawing/2010/main" xmlns="">
+              <a14:hiddenEffects xmlns="" xmlns:a14="http://schemas.microsoft.com/office/drawing/2010/main">
                 <a:effectLst>
                   <a:outerShdw dist="35921" dir="2700000" algn="ctr" rotWithShape="0">
                     <a:schemeClr val="bg2"/>
@@ -8585,7 +8585,7 @@
           <p:nvPr>
             <p:extLst>
               <p:ext uri="{D42A27DB-BD31-4B8C-83A1-F6EECF244321}">
-                <p14:modId xmlns:p14="http://schemas.microsoft.com/office/powerpoint/2010/main" xmlns="" val="669990601"/>
+                <p14:modId xmlns="" xmlns:p14="http://schemas.microsoft.com/office/powerpoint/2010/main" val="669990601"/>
               </p:ext>
             </p:extLst>
           </p:nvPr>
@@ -8762,13 +8762,13 @@
           <p:nvPr>
             <p:extLst>
               <p:ext uri="{D42A27DB-BD31-4B8C-83A1-F6EECF244321}">
-                <p14:modId xmlns:p14="http://schemas.microsoft.com/office/powerpoint/2010/main" xmlns="" val="1867475245"/>
+                <p14:modId xmlns="" xmlns:p14="http://schemas.microsoft.com/office/powerpoint/2010/main" val="1867475245"/>
               </p:ext>
             </p:extLst>
           </p:nvPr>
         </p:nvGraphicFramePr>
         <p:xfrm>
-          <a:off x="7092280" y="5339206"/>
+          <a:off x="7092280" y="5273040"/>
           <a:ext cx="2051720" cy="1584960"/>
         </p:xfrm>
         <a:graphic>
@@ -8893,7 +8893,7 @@
     </p:spTree>
     <p:extLst>
       <p:ext uri="{BB962C8B-B14F-4D97-AF65-F5344CB8AC3E}">
-        <p14:creationId xmlns:p14="http://schemas.microsoft.com/office/powerpoint/2010/main" xmlns="" val="4165334171"/>
+        <p14:creationId xmlns="" xmlns:p14="http://schemas.microsoft.com/office/powerpoint/2010/main" val="4165334171"/>
       </p:ext>
     </p:extLst>
   </p:cSld>
@@ -9189,7 +9189,7 @@
     </p:spTree>
     <p:extLst>
       <p:ext uri="{BB962C8B-B14F-4D97-AF65-F5344CB8AC3E}">
-        <p14:creationId xmlns:p14="http://schemas.microsoft.com/office/powerpoint/2010/main" xmlns="" val="155874689"/>
+        <p14:creationId xmlns="" xmlns:p14="http://schemas.microsoft.com/office/powerpoint/2010/main" val="155874689"/>
       </p:ext>
     </p:extLst>
   </p:cSld>
@@ -9197,7 +9197,7 @@
     <a:masterClrMapping/>
   </p:clrMapOvr>
   <mc:AlternateContent xmlns:mc="http://schemas.openxmlformats.org/markup-compatibility/2006">
-    <mc:Choice xmlns:p14="http://schemas.microsoft.com/office/powerpoint/2010/main" xmlns="" Requires="p14">
+    <mc:Choice xmlns="" xmlns:p14="http://schemas.microsoft.com/office/powerpoint/2010/main" Requires="p14">
       <p:transition spd="slow" p14:dur="2000"/>
     </mc:Choice>
     <mc:Fallback>
@@ -9703,7 +9703,7 @@
     </p:spTree>
     <p:extLst>
       <p:ext uri="{BB962C8B-B14F-4D97-AF65-F5344CB8AC3E}">
-        <p14:creationId xmlns:p14="http://schemas.microsoft.com/office/powerpoint/2010/main" xmlns="" val="155874689"/>
+        <p14:creationId xmlns="" xmlns:p14="http://schemas.microsoft.com/office/powerpoint/2010/main" val="155874689"/>
       </p:ext>
     </p:extLst>
   </p:cSld>
@@ -9711,7 +9711,7 @@
     <a:masterClrMapping/>
   </p:clrMapOvr>
   <mc:AlternateContent xmlns:mc="http://schemas.openxmlformats.org/markup-compatibility/2006">
-    <mc:Choice xmlns:p14="http://schemas.microsoft.com/office/powerpoint/2010/main" xmlns="" Requires="p14">
+    <mc:Choice xmlns="" xmlns:p14="http://schemas.microsoft.com/office/powerpoint/2010/main" Requires="p14">
       <p:transition spd="slow" p14:dur="2000"/>
     </mc:Choice>
     <mc:Fallback>
@@ -10208,7 +10208,7 @@
     </p:spTree>
     <p:extLst>
       <p:ext uri="{BB962C8B-B14F-4D97-AF65-F5344CB8AC3E}">
-        <p14:creationId xmlns:p14="http://schemas.microsoft.com/office/powerpoint/2010/main" xmlns="" val="155874689"/>
+        <p14:creationId xmlns="" xmlns:p14="http://schemas.microsoft.com/office/powerpoint/2010/main" val="155874689"/>
       </p:ext>
     </p:extLst>
   </p:cSld>
@@ -10216,7 +10216,7 @@
     <a:masterClrMapping/>
   </p:clrMapOvr>
   <mc:AlternateContent xmlns:mc="http://schemas.openxmlformats.org/markup-compatibility/2006">
-    <mc:Choice xmlns:p14="http://schemas.microsoft.com/office/powerpoint/2010/main" xmlns="" Requires="p14">
+    <mc:Choice xmlns="" xmlns:p14="http://schemas.microsoft.com/office/powerpoint/2010/main" Requires="p14">
       <p:transition spd="slow" p14:dur="2000"/>
     </mc:Choice>
     <mc:Fallback>
@@ -12390,7 +12390,7 @@
           <a:blip r:embed="rId3">
             <a:extLst>
               <a:ext uri="{28A0092B-C50C-407E-A947-70E740481C1C}">
-                <a14:useLocalDpi xmlns:a14="http://schemas.microsoft.com/office/drawing/2010/main" xmlns="" val="0"/>
+                <a14:useLocalDpi xmlns="" xmlns:a14="http://schemas.microsoft.com/office/drawing/2010/main" val="0"/>
               </a:ext>
             </a:extLst>
           </a:blip>
@@ -12410,7 +12410,7 @@
           <a:noFill/>
           <a:extLst>
             <a:ext uri="{909E8E84-426E-40DD-AFC4-6F175D3DCCD1}">
-              <a14:hiddenFill xmlns:a14="http://schemas.microsoft.com/office/drawing/2010/main" xmlns="">
+              <a14:hiddenFill xmlns="" xmlns:a14="http://schemas.microsoft.com/office/drawing/2010/main">
                 <a:solidFill>
                   <a:srgbClr val="FFFFFF"/>
                 </a:solidFill>
@@ -12431,7 +12431,7 @@
           <a:blip r:embed="rId4">
             <a:extLst>
               <a:ext uri="{28A0092B-C50C-407E-A947-70E740481C1C}">
-                <a14:useLocalDpi xmlns:a14="http://schemas.microsoft.com/office/drawing/2010/main" xmlns="" val="0"/>
+                <a14:useLocalDpi xmlns="" xmlns:a14="http://schemas.microsoft.com/office/drawing/2010/main" val="0"/>
               </a:ext>
             </a:extLst>
           </a:blip>
@@ -12451,7 +12451,7 @@
           <a:noFill/>
           <a:extLst>
             <a:ext uri="{909E8E84-426E-40DD-AFC4-6F175D3DCCD1}">
-              <a14:hiddenFill xmlns:a14="http://schemas.microsoft.com/office/drawing/2010/main" xmlns="">
+              <a14:hiddenFill xmlns="" xmlns:a14="http://schemas.microsoft.com/office/drawing/2010/main">
                 <a:solidFill>
                   <a:srgbClr val="FFFFFF"/>
                 </a:solidFill>
@@ -12497,7 +12497,7 @@
     </p:spTree>
     <p:extLst>
       <p:ext uri="{BB962C8B-B14F-4D97-AF65-F5344CB8AC3E}">
-        <p14:creationId xmlns:p14="http://schemas.microsoft.com/office/powerpoint/2010/main" xmlns="" val="1277526579"/>
+        <p14:creationId xmlns="" xmlns:p14="http://schemas.microsoft.com/office/powerpoint/2010/main" val="1277526579"/>
       </p:ext>
     </p:extLst>
   </p:cSld>
@@ -12827,7 +12827,7 @@
           <a:blip r:embed="rId3">
             <a:extLst>
               <a:ext uri="{28A0092B-C50C-407E-A947-70E740481C1C}">
-                <a14:useLocalDpi xmlns:a14="http://schemas.microsoft.com/office/drawing/2010/main" xmlns="" val="0"/>
+                <a14:useLocalDpi xmlns="" xmlns:a14="http://schemas.microsoft.com/office/drawing/2010/main" val="0"/>
               </a:ext>
             </a:extLst>
           </a:blip>
@@ -12847,7 +12847,7 @@
           <a:noFill/>
           <a:extLst>
             <a:ext uri="{909E8E84-426E-40DD-AFC4-6F175D3DCCD1}">
-              <a14:hiddenFill xmlns:a14="http://schemas.microsoft.com/office/drawing/2010/main" xmlns="">
+              <a14:hiddenFill xmlns="" xmlns:a14="http://schemas.microsoft.com/office/drawing/2010/main">
                 <a:solidFill>
                   <a:srgbClr val="FFFFFF"/>
                 </a:solidFill>
@@ -12868,7 +12868,7 @@
           <a:blip r:embed="rId4" cstate="print">
             <a:extLst>
               <a:ext uri="{28A0092B-C50C-407E-A947-70E740481C1C}">
-                <a14:useLocalDpi xmlns:a14="http://schemas.microsoft.com/office/drawing/2010/main" xmlns="" val="0"/>
+                <a14:useLocalDpi xmlns="" xmlns:a14="http://schemas.microsoft.com/office/drawing/2010/main" val="0"/>
               </a:ext>
             </a:extLst>
           </a:blip>
@@ -12888,7 +12888,7 @@
           <a:noFill/>
           <a:extLst>
             <a:ext uri="{909E8E84-426E-40DD-AFC4-6F175D3DCCD1}">
-              <a14:hiddenFill xmlns:a14="http://schemas.microsoft.com/office/drawing/2010/main" xmlns="">
+              <a14:hiddenFill xmlns="" xmlns:a14="http://schemas.microsoft.com/office/drawing/2010/main">
                 <a:solidFill>
                   <a:srgbClr val="FFFFFF"/>
                 </a:solidFill>
@@ -12909,7 +12909,7 @@
           <a:blip r:embed="rId5">
             <a:extLst>
               <a:ext uri="{28A0092B-C50C-407E-A947-70E740481C1C}">
-                <a14:useLocalDpi xmlns:a14="http://schemas.microsoft.com/office/drawing/2010/main" xmlns="" val="0"/>
+                <a14:useLocalDpi xmlns="" xmlns:a14="http://schemas.microsoft.com/office/drawing/2010/main" val="0"/>
               </a:ext>
             </a:extLst>
           </a:blip>
@@ -12929,7 +12929,7 @@
           <a:noFill/>
           <a:extLst>
             <a:ext uri="{909E8E84-426E-40DD-AFC4-6F175D3DCCD1}">
-              <a14:hiddenFill xmlns:a14="http://schemas.microsoft.com/office/drawing/2010/main" xmlns="">
+              <a14:hiddenFill xmlns="" xmlns:a14="http://schemas.microsoft.com/office/drawing/2010/main">
                 <a:solidFill>
                   <a:srgbClr val="FFFFFF"/>
                 </a:solidFill>
@@ -13031,7 +13031,7 @@
     </p:spTree>
     <p:extLst>
       <p:ext uri="{BB962C8B-B14F-4D97-AF65-F5344CB8AC3E}">
-        <p14:creationId xmlns:p14="http://schemas.microsoft.com/office/powerpoint/2010/main" xmlns="" val="418107373"/>
+        <p14:creationId xmlns="" xmlns:p14="http://schemas.microsoft.com/office/powerpoint/2010/main" val="418107373"/>
       </p:ext>
     </p:extLst>
   </p:cSld>
@@ -13670,7 +13670,7 @@
           <a:blip r:embed="rId3">
             <a:extLst>
               <a:ext uri="{28A0092B-C50C-407E-A947-70E740481C1C}">
-                <a14:useLocalDpi xmlns:a14="http://schemas.microsoft.com/office/drawing/2010/main" xmlns="" val="0"/>
+                <a14:useLocalDpi xmlns="" xmlns:a14="http://schemas.microsoft.com/office/drawing/2010/main" val="0"/>
               </a:ext>
             </a:extLst>
           </a:blip>
@@ -13690,7 +13690,7 @@
           <a:noFill/>
           <a:extLst>
             <a:ext uri="{909E8E84-426E-40DD-AFC4-6F175D3DCCD1}">
-              <a14:hiddenFill xmlns:a14="http://schemas.microsoft.com/office/drawing/2010/main" xmlns="">
+              <a14:hiddenFill xmlns="" xmlns:a14="http://schemas.microsoft.com/office/drawing/2010/main">
                 <a:solidFill>
                   <a:srgbClr val="FFFFFF"/>
                 </a:solidFill>
@@ -13711,7 +13711,7 @@
           <a:blip r:embed="rId4">
             <a:extLst>
               <a:ext uri="{28A0092B-C50C-407E-A947-70E740481C1C}">
-                <a14:useLocalDpi xmlns:a14="http://schemas.microsoft.com/office/drawing/2010/main" xmlns="" val="0"/>
+                <a14:useLocalDpi xmlns="" xmlns:a14="http://schemas.microsoft.com/office/drawing/2010/main" val="0"/>
               </a:ext>
             </a:extLst>
           </a:blip>
@@ -13731,7 +13731,7 @@
           <a:noFill/>
           <a:extLst>
             <a:ext uri="{909E8E84-426E-40DD-AFC4-6F175D3DCCD1}">
-              <a14:hiddenFill xmlns:a14="http://schemas.microsoft.com/office/drawing/2010/main" xmlns="">
+              <a14:hiddenFill xmlns="" xmlns:a14="http://schemas.microsoft.com/office/drawing/2010/main">
                 <a:solidFill>
                   <a:srgbClr val="FFFFFF"/>
                 </a:solidFill>
@@ -13979,7 +13979,7 @@
     </p:spTree>
     <p:extLst>
       <p:ext uri="{BB962C8B-B14F-4D97-AF65-F5344CB8AC3E}">
-        <p14:creationId xmlns:p14="http://schemas.microsoft.com/office/powerpoint/2010/main" xmlns="" val="2879521852"/>
+        <p14:creationId xmlns="" xmlns:p14="http://schemas.microsoft.com/office/powerpoint/2010/main" val="2879521852"/>
       </p:ext>
     </p:extLst>
   </p:cSld>
@@ -13987,7 +13987,7 @@
     <a:masterClrMapping/>
   </p:clrMapOvr>
   <mc:AlternateContent xmlns:mc="http://schemas.openxmlformats.org/markup-compatibility/2006">
-    <mc:Choice xmlns:p14="http://schemas.microsoft.com/office/powerpoint/2010/main" xmlns="" Requires="p14">
+    <mc:Choice xmlns="" xmlns:p14="http://schemas.microsoft.com/office/powerpoint/2010/main" Requires="p14">
       <p:transition spd="slow" p14:dur="2000"/>
     </mc:Choice>
     <mc:Fallback>
@@ -14346,7 +14346,7 @@
           <a:blip r:embed="rId3">
             <a:extLst>
               <a:ext uri="{28A0092B-C50C-407E-A947-70E740481C1C}">
-                <a14:useLocalDpi xmlns:a14="http://schemas.microsoft.com/office/drawing/2010/main" xmlns="" val="0"/>
+                <a14:useLocalDpi xmlns="" xmlns:a14="http://schemas.microsoft.com/office/drawing/2010/main" val="0"/>
               </a:ext>
             </a:extLst>
           </a:blip>
@@ -14366,7 +14366,7 @@
           <a:noFill/>
           <a:extLst>
             <a:ext uri="{909E8E84-426E-40DD-AFC4-6F175D3DCCD1}">
-              <a14:hiddenFill xmlns:a14="http://schemas.microsoft.com/office/drawing/2010/main" xmlns="">
+              <a14:hiddenFill xmlns="" xmlns:a14="http://schemas.microsoft.com/office/drawing/2010/main">
                 <a:solidFill>
                   <a:srgbClr val="FFFFFF"/>
                 </a:solidFill>
@@ -14887,7 +14887,7 @@
     </p:spTree>
     <p:extLst>
       <p:ext uri="{BB962C8B-B14F-4D97-AF65-F5344CB8AC3E}">
-        <p14:creationId xmlns:p14="http://schemas.microsoft.com/office/powerpoint/2010/main" xmlns="" val="202613363"/>
+        <p14:creationId xmlns="" xmlns:p14="http://schemas.microsoft.com/office/powerpoint/2010/main" val="202613363"/>
       </p:ext>
     </p:extLst>
   </p:cSld>
@@ -14895,7 +14895,7 @@
     <a:masterClrMapping/>
   </p:clrMapOvr>
   <mc:AlternateContent xmlns:mc="http://schemas.openxmlformats.org/markup-compatibility/2006">
-    <mc:Choice xmlns:p14="http://schemas.microsoft.com/office/powerpoint/2010/main" xmlns="" Requires="p14">
+    <mc:Choice xmlns="" xmlns:p14="http://schemas.microsoft.com/office/powerpoint/2010/main" Requires="p14">
       <p:transition spd="slow" p14:dur="2000"/>
     </mc:Choice>
     <mc:Fallback>
@@ -15220,7 +15220,7 @@
           <a:blip r:embed="rId3">
             <a:extLst>
               <a:ext uri="{28A0092B-C50C-407E-A947-70E740481C1C}">
-                <a14:useLocalDpi xmlns:a14="http://schemas.microsoft.com/office/drawing/2010/main" xmlns="" val="0"/>
+                <a14:useLocalDpi xmlns="" xmlns:a14="http://schemas.microsoft.com/office/drawing/2010/main" val="0"/>
               </a:ext>
             </a:extLst>
           </a:blip>
@@ -15240,7 +15240,7 @@
           <a:noFill/>
           <a:extLst>
             <a:ext uri="{909E8E84-426E-40DD-AFC4-6F175D3DCCD1}">
-              <a14:hiddenFill xmlns:a14="http://schemas.microsoft.com/office/drawing/2010/main" xmlns="">
+              <a14:hiddenFill xmlns="" xmlns:a14="http://schemas.microsoft.com/office/drawing/2010/main">
                 <a:solidFill>
                   <a:srgbClr val="FFFFFF"/>
                 </a:solidFill>
@@ -15261,7 +15261,7 @@
           <a:blip r:embed="rId4">
             <a:extLst>
               <a:ext uri="{28A0092B-C50C-407E-A947-70E740481C1C}">
-                <a14:useLocalDpi xmlns:a14="http://schemas.microsoft.com/office/drawing/2010/main" xmlns="" val="0"/>
+                <a14:useLocalDpi xmlns="" xmlns:a14="http://schemas.microsoft.com/office/drawing/2010/main" val="0"/>
               </a:ext>
             </a:extLst>
           </a:blip>
@@ -15281,7 +15281,7 @@
           <a:noFill/>
           <a:extLst>
             <a:ext uri="{909E8E84-426E-40DD-AFC4-6F175D3DCCD1}">
-              <a14:hiddenFill xmlns:a14="http://schemas.microsoft.com/office/drawing/2010/main" xmlns="">
+              <a14:hiddenFill xmlns="" xmlns:a14="http://schemas.microsoft.com/office/drawing/2010/main">
                 <a:solidFill>
                   <a:srgbClr val="FFFFFF"/>
                 </a:solidFill>
@@ -15605,7 +15605,7 @@
     </p:spTree>
     <p:extLst>
       <p:ext uri="{BB962C8B-B14F-4D97-AF65-F5344CB8AC3E}">
-        <p14:creationId xmlns:p14="http://schemas.microsoft.com/office/powerpoint/2010/main" xmlns="" val="1197112555"/>
+        <p14:creationId xmlns="" xmlns:p14="http://schemas.microsoft.com/office/powerpoint/2010/main" val="1197112555"/>
       </p:ext>
     </p:extLst>
   </p:cSld>
@@ -15613,7 +15613,7 @@
     <a:masterClrMapping/>
   </p:clrMapOvr>
   <mc:AlternateContent xmlns:mc="http://schemas.openxmlformats.org/markup-compatibility/2006">
-    <mc:Choice xmlns:p14="http://schemas.microsoft.com/office/powerpoint/2010/main" xmlns="" Requires="p14">
+    <mc:Choice xmlns="" xmlns:p14="http://schemas.microsoft.com/office/powerpoint/2010/main" Requires="p14">
       <p:transition spd="slow" p14:dur="2000"/>
     </mc:Choice>
     <mc:Fallback>
@@ -16700,7 +16700,7 @@
     </p:spTree>
     <p:extLst>
       <p:ext uri="{BB962C8B-B14F-4D97-AF65-F5344CB8AC3E}">
-        <p14:creationId xmlns:p14="http://schemas.microsoft.com/office/powerpoint/2010/main" xmlns="" val="155874689"/>
+        <p14:creationId xmlns="" xmlns:p14="http://schemas.microsoft.com/office/powerpoint/2010/main" val="155874689"/>
       </p:ext>
     </p:extLst>
   </p:cSld>
@@ -16708,7 +16708,7 @@
     <a:masterClrMapping/>
   </p:clrMapOvr>
   <mc:AlternateContent xmlns:mc="http://schemas.openxmlformats.org/markup-compatibility/2006">
-    <mc:Choice xmlns:p14="http://schemas.microsoft.com/office/powerpoint/2010/main" xmlns="" Requires="p14">
+    <mc:Choice xmlns="" xmlns:p14="http://schemas.microsoft.com/office/powerpoint/2010/main" Requires="p14">
       <p:transition spd="slow" p14:dur="2000"/>
     </mc:Choice>
     <mc:Fallback>
@@ -17072,7 +17072,7 @@
           <a:blip r:embed="rId3">
             <a:extLst>
               <a:ext uri="{28A0092B-C50C-407E-A947-70E740481C1C}">
-                <a14:useLocalDpi xmlns:a14="http://schemas.microsoft.com/office/drawing/2010/main" xmlns="" val="0"/>
+                <a14:useLocalDpi xmlns="" xmlns:a14="http://schemas.microsoft.com/office/drawing/2010/main" val="0"/>
               </a:ext>
             </a:extLst>
           </a:blip>
@@ -17092,7 +17092,7 @@
           <a:noFill/>
           <a:extLst>
             <a:ext uri="{909E8E84-426E-40DD-AFC4-6F175D3DCCD1}">
-              <a14:hiddenFill xmlns:a14="http://schemas.microsoft.com/office/drawing/2010/main" xmlns="">
+              <a14:hiddenFill xmlns="" xmlns:a14="http://schemas.microsoft.com/office/drawing/2010/main">
                 <a:solidFill>
                   <a:srgbClr val="FFFFFF"/>
                 </a:solidFill>
@@ -17113,7 +17113,7 @@
           <a:blip r:embed="rId4">
             <a:extLst>
               <a:ext uri="{28A0092B-C50C-407E-A947-70E740481C1C}">
-                <a14:useLocalDpi xmlns:a14="http://schemas.microsoft.com/office/drawing/2010/main" xmlns="" val="0"/>
+                <a14:useLocalDpi xmlns="" xmlns:a14="http://schemas.microsoft.com/office/drawing/2010/main" val="0"/>
               </a:ext>
             </a:extLst>
           </a:blip>
@@ -17142,7 +17142,7 @@
           </a:effectLst>
           <a:extLst>
             <a:ext uri="{909E8E84-426E-40DD-AFC4-6F175D3DCCD1}">
-              <a14:hiddenFill xmlns:a14="http://schemas.microsoft.com/office/drawing/2010/main" xmlns="">
+              <a14:hiddenFill xmlns="" xmlns:a14="http://schemas.microsoft.com/office/drawing/2010/main">
                 <a:solidFill>
                   <a:srgbClr val="FFFFFF"/>
                 </a:solidFill>
@@ -17180,7 +17180,7 @@
     </p:spTree>
     <p:extLst>
       <p:ext uri="{BB962C8B-B14F-4D97-AF65-F5344CB8AC3E}">
-        <p14:creationId xmlns:p14="http://schemas.microsoft.com/office/powerpoint/2010/main" xmlns="" val="700353664"/>
+        <p14:creationId xmlns="" xmlns:p14="http://schemas.microsoft.com/office/powerpoint/2010/main" val="700353664"/>
       </p:ext>
     </p:extLst>
   </p:cSld>
@@ -17188,7 +17188,7 @@
     <a:masterClrMapping/>
   </p:clrMapOvr>
   <mc:AlternateContent xmlns:mc="http://schemas.openxmlformats.org/markup-compatibility/2006">
-    <mc:Choice xmlns:p14="http://schemas.microsoft.com/office/powerpoint/2010/main" xmlns="" Requires="p14">
+    <mc:Choice xmlns="" xmlns:p14="http://schemas.microsoft.com/office/powerpoint/2010/main" Requires="p14">
       <p:transition spd="slow" p14:dur="2000"/>
     </mc:Choice>
     <mc:Fallback>
@@ -17935,7 +17935,7 @@
           <a:blip r:embed="rId3">
             <a:extLst>
               <a:ext uri="{28A0092B-C50C-407E-A947-70E740481C1C}">
-                <a14:useLocalDpi xmlns:a14="http://schemas.microsoft.com/office/drawing/2010/main" xmlns="" val="0"/>
+                <a14:useLocalDpi xmlns="" xmlns:a14="http://schemas.microsoft.com/office/drawing/2010/main" val="0"/>
               </a:ext>
             </a:extLst>
           </a:blip>
@@ -17960,7 +17960,7 @@
           </a:effectLst>
           <a:extLst>
             <a:ext uri="{909E8E84-426E-40DD-AFC4-6F175D3DCCD1}">
-              <a14:hiddenFill xmlns:a14="http://schemas.microsoft.com/office/drawing/2010/main" xmlns="">
+              <a14:hiddenFill xmlns="" xmlns:a14="http://schemas.microsoft.com/office/drawing/2010/main">
                 <a:solidFill>
                   <a:srgbClr val="FFFFFF"/>
                 </a:solidFill>
@@ -17981,7 +17981,7 @@
           <a:blip r:embed="rId4">
             <a:extLst>
               <a:ext uri="{28A0092B-C50C-407E-A947-70E740481C1C}">
-                <a14:useLocalDpi xmlns:a14="http://schemas.microsoft.com/office/drawing/2010/main" xmlns="" val="0"/>
+                <a14:useLocalDpi xmlns="" xmlns:a14="http://schemas.microsoft.com/office/drawing/2010/main" val="0"/>
               </a:ext>
             </a:extLst>
           </a:blip>
@@ -18001,7 +18001,7 @@
           <a:noFill/>
           <a:extLst>
             <a:ext uri="{909E8E84-426E-40DD-AFC4-6F175D3DCCD1}">
-              <a14:hiddenFill xmlns:a14="http://schemas.microsoft.com/office/drawing/2010/main" xmlns="">
+              <a14:hiddenFill xmlns="" xmlns:a14="http://schemas.microsoft.com/office/drawing/2010/main">
                 <a:solidFill>
                   <a:srgbClr val="FFFFFF"/>
                 </a:solidFill>
@@ -18047,7 +18047,7 @@
     </p:spTree>
     <p:extLst>
       <p:ext uri="{BB962C8B-B14F-4D97-AF65-F5344CB8AC3E}">
-        <p14:creationId xmlns:p14="http://schemas.microsoft.com/office/powerpoint/2010/main" xmlns="" val="2947224754"/>
+        <p14:creationId xmlns="" xmlns:p14="http://schemas.microsoft.com/office/powerpoint/2010/main" val="2947224754"/>
       </p:ext>
     </p:extLst>
   </p:cSld>
@@ -18364,7 +18364,7 @@
           <a:blip r:embed="rId3">
             <a:extLst>
               <a:ext uri="{28A0092B-C50C-407E-A947-70E740481C1C}">
-                <a14:useLocalDpi xmlns:a14="http://schemas.microsoft.com/office/drawing/2010/main" xmlns="" val="0"/>
+                <a14:useLocalDpi xmlns="" xmlns:a14="http://schemas.microsoft.com/office/drawing/2010/main" val="0"/>
               </a:ext>
             </a:extLst>
           </a:blip>
@@ -18384,7 +18384,7 @@
           <a:noFill/>
           <a:extLst>
             <a:ext uri="{909E8E84-426E-40DD-AFC4-6F175D3DCCD1}">
-              <a14:hiddenFill xmlns:a14="http://schemas.microsoft.com/office/drawing/2010/main" xmlns="">
+              <a14:hiddenFill xmlns="" xmlns:a14="http://schemas.microsoft.com/office/drawing/2010/main">
                 <a:solidFill>
                   <a:srgbClr val="FFFFFF"/>
                 </a:solidFill>
@@ -18939,7 +18939,7 @@
     </p:spTree>
     <p:extLst>
       <p:ext uri="{BB962C8B-B14F-4D97-AF65-F5344CB8AC3E}">
-        <p14:creationId xmlns:p14="http://schemas.microsoft.com/office/powerpoint/2010/main" xmlns="" val="1111877724"/>
+        <p14:creationId xmlns="" xmlns:p14="http://schemas.microsoft.com/office/powerpoint/2010/main" val="1111877724"/>
       </p:ext>
     </p:extLst>
   </p:cSld>
@@ -18947,7 +18947,7 @@
     <a:masterClrMapping/>
   </p:clrMapOvr>
   <mc:AlternateContent xmlns:mc="http://schemas.openxmlformats.org/markup-compatibility/2006">
-    <mc:Choice xmlns:p14="http://schemas.microsoft.com/office/powerpoint/2010/main" xmlns="" Requires="p14">
+    <mc:Choice xmlns="" xmlns:p14="http://schemas.microsoft.com/office/powerpoint/2010/main" Requires="p14">
       <p:transition spd="slow" p14:dur="2000"/>
     </mc:Choice>
     <mc:Fallback>
@@ -19329,7 +19329,7 @@
           <p:nvPr>
             <p:extLst>
               <p:ext uri="{D42A27DB-BD31-4B8C-83A1-F6EECF244321}">
-                <p14:modId xmlns:p14="http://schemas.microsoft.com/office/powerpoint/2010/main" xmlns="" val="2643884637"/>
+                <p14:modId xmlns="" xmlns:p14="http://schemas.microsoft.com/office/powerpoint/2010/main" val="2643884637"/>
               </p:ext>
             </p:extLst>
           </p:nvPr>
@@ -19770,14 +19770,14 @@
           <a:effectLst/>
           <a:extLst>
             <a:ext uri="{909E8E84-426E-40DD-AFC4-6F175D3DCCD1}">
-              <a14:hiddenFill xmlns:a14="http://schemas.microsoft.com/office/drawing/2010/main" xmlns="">
+              <a14:hiddenFill xmlns="" xmlns:a14="http://schemas.microsoft.com/office/drawing/2010/main">
                 <a:solidFill>
                   <a:schemeClr val="accent1"/>
                 </a:solidFill>
               </a14:hiddenFill>
             </a:ext>
             <a:ext uri="{91240B29-F687-4F45-9708-019B960494DF}">
-              <a14:hiddenLine xmlns:a14="http://schemas.microsoft.com/office/drawing/2010/main" xmlns="" w="9525">
+              <a14:hiddenLine xmlns="" xmlns:a14="http://schemas.microsoft.com/office/drawing/2010/main" w="9525">
                 <a:solidFill>
                   <a:schemeClr val="tx1"/>
                 </a:solidFill>
@@ -19787,7 +19787,7 @@
               </a14:hiddenLine>
             </a:ext>
             <a:ext uri="{AF507438-7753-43E0-B8FC-AC1667EBCBE1}">
-              <a14:hiddenEffects xmlns:a14="http://schemas.microsoft.com/office/drawing/2010/main" xmlns="">
+              <a14:hiddenEffects xmlns="" xmlns:a14="http://schemas.microsoft.com/office/drawing/2010/main">
                 <a:effectLst>
                   <a:outerShdw dist="35921" dir="2700000" algn="ctr" rotWithShape="0">
                     <a:schemeClr val="bg2"/>
@@ -19868,7 +19868,7 @@
     </p:spTree>
     <p:extLst>
       <p:ext uri="{BB962C8B-B14F-4D97-AF65-F5344CB8AC3E}">
-        <p14:creationId xmlns:p14="http://schemas.microsoft.com/office/powerpoint/2010/main" xmlns="" val="503117530"/>
+        <p14:creationId xmlns="" xmlns:p14="http://schemas.microsoft.com/office/powerpoint/2010/main" val="503117530"/>
       </p:ext>
     </p:extLst>
   </p:cSld>
@@ -19953,7 +19953,7 @@
           <p:nvPr>
             <p:extLst>
               <p:ext uri="{D42A27DB-BD31-4B8C-83A1-F6EECF244321}">
-                <p14:modId xmlns:p14="http://schemas.microsoft.com/office/powerpoint/2010/main" xmlns="" val="722892891"/>
+                <p14:modId xmlns="" xmlns:p14="http://schemas.microsoft.com/office/powerpoint/2010/main" val="722892891"/>
               </p:ext>
             </p:extLst>
           </p:nvPr>
@@ -20935,7 +20935,7 @@
     </p:spTree>
     <p:extLst>
       <p:ext uri="{BB962C8B-B14F-4D97-AF65-F5344CB8AC3E}">
-        <p14:creationId xmlns:p14="http://schemas.microsoft.com/office/powerpoint/2010/main" xmlns="" val="2473970557"/>
+        <p14:creationId xmlns="" xmlns:p14="http://schemas.microsoft.com/office/powerpoint/2010/main" val="2473970557"/>
       </p:ext>
     </p:extLst>
   </p:cSld>
@@ -20981,7 +20981,7 @@
           <a:blip r:embed="rId3">
             <a:extLst>
               <a:ext uri="{28A0092B-C50C-407E-A947-70E740481C1C}">
-                <a14:useLocalDpi xmlns:a14="http://schemas.microsoft.com/office/drawing/2010/main" xmlns="" val="0"/>
+                <a14:useLocalDpi xmlns="" xmlns:a14="http://schemas.microsoft.com/office/drawing/2010/main" val="0"/>
               </a:ext>
             </a:extLst>
           </a:blip>
@@ -21024,7 +21024,7 @@
           </a:sp3d>
           <a:extLst>
             <a:ext uri="{909E8E84-426E-40DD-AFC4-6F175D3DCCD1}">
-              <a14:hiddenFill xmlns:a14="http://schemas.microsoft.com/office/drawing/2010/main" xmlns="">
+              <a14:hiddenFill xmlns="" xmlns:a14="http://schemas.microsoft.com/office/drawing/2010/main">
                 <a:solidFill>
                   <a:srgbClr val="FFFFFF"/>
                 </a:solidFill>
@@ -21215,7 +21215,7 @@
                                     </p:set>
                                     <p:animEffect transition="in" filter="fade">
                                       <p:cBhvr>
-                                        <p:cTn id="7" dur="2000"/>
+                                        <p:cTn id="7" dur="500"/>
                                         <p:tgtEl>
                                           <p:spTgt spid="12290"/>
                                         </p:tgtEl>
@@ -21250,12 +21250,200 @@
                                     </p:set>
                                     <p:animEffect transition="in" filter="fade">
                                       <p:cBhvr>
-                                        <p:cTn id="10" dur="2000"/>
+                                        <p:cTn id="10" dur="500"/>
                                         <p:tgtEl>
                                           <p:spTgt spid="10"/>
                                         </p:tgtEl>
                                       </p:cBhvr>
                                     </p:animEffect>
+                                  </p:childTnLst>
+                                </p:cTn>
+                              </p:par>
+                            </p:childTnLst>
+                          </p:cTn>
+                        </p:par>
+                      </p:childTnLst>
+                    </p:cTn>
+                  </p:par>
+                  <p:par>
+                    <p:cTn id="11" fill="hold">
+                      <p:stCondLst>
+                        <p:cond delay="indefinite"/>
+                      </p:stCondLst>
+                      <p:childTnLst>
+                        <p:par>
+                          <p:cTn id="12" fill="hold">
+                            <p:stCondLst>
+                              <p:cond delay="0"/>
+                            </p:stCondLst>
+                            <p:childTnLst>
+                              <p:par>
+                                <p:cTn id="13" presetID="2" presetClass="entr" presetSubtype="4" fill="hold" grpId="0" nodeType="clickEffect">
+                                  <p:stCondLst>
+                                    <p:cond delay="0"/>
+                                  </p:stCondLst>
+                                  <p:childTnLst>
+                                    <p:set>
+                                      <p:cBhvr>
+                                        <p:cTn id="14" dur="1" fill="hold">
+                                          <p:stCondLst>
+                                            <p:cond delay="0"/>
+                                          </p:stCondLst>
+                                        </p:cTn>
+                                        <p:tgtEl>
+                                          <p:spTgt spid="2">
+                                            <p:txEl>
+                                              <p:pRg st="0" end="0"/>
+                                            </p:txEl>
+                                          </p:spTgt>
+                                        </p:tgtEl>
+                                        <p:attrNameLst>
+                                          <p:attrName>style.visibility</p:attrName>
+                                        </p:attrNameLst>
+                                      </p:cBhvr>
+                                      <p:to>
+                                        <p:strVal val="visible"/>
+                                      </p:to>
+                                    </p:set>
+                                    <p:anim calcmode="lin" valueType="num">
+                                      <p:cBhvr additive="base">
+                                        <p:cTn id="15" dur="500" fill="hold"/>
+                                        <p:tgtEl>
+                                          <p:spTgt spid="2">
+                                            <p:txEl>
+                                              <p:pRg st="0" end="0"/>
+                                            </p:txEl>
+                                          </p:spTgt>
+                                        </p:tgtEl>
+                                        <p:attrNameLst>
+                                          <p:attrName>ppt_x</p:attrName>
+                                        </p:attrNameLst>
+                                      </p:cBhvr>
+                                      <p:tavLst>
+                                        <p:tav tm="0">
+                                          <p:val>
+                                            <p:strVal val="#ppt_x"/>
+                                          </p:val>
+                                        </p:tav>
+                                        <p:tav tm="100000">
+                                          <p:val>
+                                            <p:strVal val="#ppt_x"/>
+                                          </p:val>
+                                        </p:tav>
+                                      </p:tavLst>
+                                    </p:anim>
+                                    <p:anim calcmode="lin" valueType="num">
+                                      <p:cBhvr additive="base">
+                                        <p:cTn id="16" dur="500" fill="hold"/>
+                                        <p:tgtEl>
+                                          <p:spTgt spid="2">
+                                            <p:txEl>
+                                              <p:pRg st="0" end="0"/>
+                                            </p:txEl>
+                                          </p:spTgt>
+                                        </p:tgtEl>
+                                        <p:attrNameLst>
+                                          <p:attrName>ppt_y</p:attrName>
+                                        </p:attrNameLst>
+                                      </p:cBhvr>
+                                      <p:tavLst>
+                                        <p:tav tm="0">
+                                          <p:val>
+                                            <p:strVal val="1+#ppt_h/2"/>
+                                          </p:val>
+                                        </p:tav>
+                                        <p:tav tm="100000">
+                                          <p:val>
+                                            <p:strVal val="#ppt_y"/>
+                                          </p:val>
+                                        </p:tav>
+                                      </p:tavLst>
+                                    </p:anim>
+                                  </p:childTnLst>
+                                </p:cTn>
+                              </p:par>
+                              <p:par>
+                                <p:cTn id="17" presetID="2" presetClass="entr" presetSubtype="4" fill="hold" grpId="0" nodeType="withEffect">
+                                  <p:stCondLst>
+                                    <p:cond delay="0"/>
+                                  </p:stCondLst>
+                                  <p:childTnLst>
+                                    <p:set>
+                                      <p:cBhvr>
+                                        <p:cTn id="18" dur="1" fill="hold">
+                                          <p:stCondLst>
+                                            <p:cond delay="0"/>
+                                          </p:stCondLst>
+                                        </p:cTn>
+                                        <p:tgtEl>
+                                          <p:spTgt spid="2">
+                                            <p:txEl>
+                                              <p:pRg st="1" end="1"/>
+                                            </p:txEl>
+                                          </p:spTgt>
+                                        </p:tgtEl>
+                                        <p:attrNameLst>
+                                          <p:attrName>style.visibility</p:attrName>
+                                        </p:attrNameLst>
+                                      </p:cBhvr>
+                                      <p:to>
+                                        <p:strVal val="visible"/>
+                                      </p:to>
+                                    </p:set>
+                                    <p:anim calcmode="lin" valueType="num">
+                                      <p:cBhvr additive="base">
+                                        <p:cTn id="19" dur="500" fill="hold"/>
+                                        <p:tgtEl>
+                                          <p:spTgt spid="2">
+                                            <p:txEl>
+                                              <p:pRg st="1" end="1"/>
+                                            </p:txEl>
+                                          </p:spTgt>
+                                        </p:tgtEl>
+                                        <p:attrNameLst>
+                                          <p:attrName>ppt_x</p:attrName>
+                                        </p:attrNameLst>
+                                      </p:cBhvr>
+                                      <p:tavLst>
+                                        <p:tav tm="0">
+                                          <p:val>
+                                            <p:strVal val="#ppt_x"/>
+                                          </p:val>
+                                        </p:tav>
+                                        <p:tav tm="100000">
+                                          <p:val>
+                                            <p:strVal val="#ppt_x"/>
+                                          </p:val>
+                                        </p:tav>
+                                      </p:tavLst>
+                                    </p:anim>
+                                    <p:anim calcmode="lin" valueType="num">
+                                      <p:cBhvr additive="base">
+                                        <p:cTn id="20" dur="500" fill="hold"/>
+                                        <p:tgtEl>
+                                          <p:spTgt spid="2">
+                                            <p:txEl>
+                                              <p:pRg st="1" end="1"/>
+                                            </p:txEl>
+                                          </p:spTgt>
+                                        </p:tgtEl>
+                                        <p:attrNameLst>
+                                          <p:attrName>ppt_y</p:attrName>
+                                        </p:attrNameLst>
+                                      </p:cBhvr>
+                                      <p:tavLst>
+                                        <p:tav tm="0">
+                                          <p:val>
+                                            <p:strVal val="1+#ppt_h/2"/>
+                                          </p:val>
+                                        </p:tav>
+                                        <p:tav tm="100000">
+                                          <p:val>
+                                            <p:strVal val="#ppt_y"/>
+                                          </p:val>
+                                        </p:tav>
+                                      </p:tavLst>
+                                    </p:anim>
                                   </p:childTnLst>
                                 </p:cTn>
                               </p:par>
@@ -21286,6 +21474,9 @@
         </p:cTn>
       </p:par>
     </p:tnLst>
+    <p:bldLst>
+      <p:bldP spid="2" grpId="0" build="allAtOnce"/>
+    </p:bldLst>
   </p:timing>
 </p:sld>
 </file>
@@ -21363,7 +21554,7 @@
           <a:blip r:embed="rId3">
             <a:extLst>
               <a:ext uri="{28A0092B-C50C-407E-A947-70E740481C1C}">
-                <a14:useLocalDpi xmlns:a14="http://schemas.microsoft.com/office/drawing/2010/main" xmlns="" val="0"/>
+                <a14:useLocalDpi xmlns="" xmlns:a14="http://schemas.microsoft.com/office/drawing/2010/main" val="0"/>
               </a:ext>
             </a:extLst>
           </a:blip>
@@ -21387,14 +21578,14 @@
           <a:effectLst/>
           <a:extLst>
             <a:ext uri="{909E8E84-426E-40DD-AFC4-6F175D3DCCD1}">
-              <a14:hiddenFill xmlns:a14="http://schemas.microsoft.com/office/drawing/2010/main" xmlns="">
+              <a14:hiddenFill xmlns="" xmlns:a14="http://schemas.microsoft.com/office/drawing/2010/main">
                 <a:solidFill>
                   <a:schemeClr val="accent1"/>
                 </a:solidFill>
               </a14:hiddenFill>
             </a:ext>
             <a:ext uri="{91240B29-F687-4F45-9708-019B960494DF}">
-              <a14:hiddenLine xmlns:a14="http://schemas.microsoft.com/office/drawing/2010/main" xmlns="" w="9525">
+              <a14:hiddenLine xmlns="" xmlns:a14="http://schemas.microsoft.com/office/drawing/2010/main" w="9525">
                 <a:solidFill>
                   <a:schemeClr val="tx1"/>
                 </a:solidFill>
@@ -21404,7 +21595,7 @@
               </a14:hiddenLine>
             </a:ext>
             <a:ext uri="{AF507438-7753-43E0-B8FC-AC1667EBCBE1}">
-              <a14:hiddenEffects xmlns:a14="http://schemas.microsoft.com/office/drawing/2010/main" xmlns="">
+              <a14:hiddenEffects xmlns="" xmlns:a14="http://schemas.microsoft.com/office/drawing/2010/main">
                 <a:effectLst>
                   <a:outerShdw dist="35921" dir="2700000" algn="ctr" rotWithShape="0">
                     <a:schemeClr val="bg2"/>
@@ -21505,14 +21696,14 @@
           <a:effectLst/>
           <a:extLst>
             <a:ext uri="{909E8E84-426E-40DD-AFC4-6F175D3DCCD1}">
-              <a14:hiddenFill xmlns:a14="http://schemas.microsoft.com/office/drawing/2010/main" xmlns="">
+              <a14:hiddenFill xmlns="" xmlns:a14="http://schemas.microsoft.com/office/drawing/2010/main">
                 <a:solidFill>
                   <a:schemeClr val="accent1"/>
                 </a:solidFill>
               </a14:hiddenFill>
             </a:ext>
             <a:ext uri="{91240B29-F687-4F45-9708-019B960494DF}">
-              <a14:hiddenLine xmlns:a14="http://schemas.microsoft.com/office/drawing/2010/main" xmlns="" w="9525">
+              <a14:hiddenLine xmlns="" xmlns:a14="http://schemas.microsoft.com/office/drawing/2010/main" w="9525">
                 <a:solidFill>
                   <a:schemeClr val="tx1"/>
                 </a:solidFill>
@@ -21522,7 +21713,7 @@
               </a14:hiddenLine>
             </a:ext>
             <a:ext uri="{AF507438-7753-43E0-B8FC-AC1667EBCBE1}">
-              <a14:hiddenEffects xmlns:a14="http://schemas.microsoft.com/office/drawing/2010/main" xmlns="">
+              <a14:hiddenEffects xmlns="" xmlns:a14="http://schemas.microsoft.com/office/drawing/2010/main">
                 <a:effectLst>
                   <a:outerShdw dist="35921" dir="2700000" algn="ctr" rotWithShape="0">
                     <a:schemeClr val="bg2"/>
@@ -21970,7 +22161,7 @@
     </p:spTree>
     <p:extLst>
       <p:ext uri="{BB962C8B-B14F-4D97-AF65-F5344CB8AC3E}">
-        <p14:creationId xmlns:p14="http://schemas.microsoft.com/office/powerpoint/2010/main" xmlns="" val="3312797979"/>
+        <p14:creationId xmlns="" xmlns:p14="http://schemas.microsoft.com/office/powerpoint/2010/main" val="3312797979"/>
       </p:ext>
     </p:extLst>
   </p:cSld>
@@ -23400,7 +23591,7 @@
     </p:spTree>
     <p:extLst>
       <p:ext uri="{BB962C8B-B14F-4D97-AF65-F5344CB8AC3E}">
-        <p14:creationId xmlns:p14="http://schemas.microsoft.com/office/powerpoint/2010/main" xmlns="" val="155874689"/>
+        <p14:creationId xmlns="" xmlns:p14="http://schemas.microsoft.com/office/powerpoint/2010/main" val="155874689"/>
       </p:ext>
     </p:extLst>
   </p:cSld>
@@ -23408,7 +23599,7 @@
     <a:masterClrMapping/>
   </p:clrMapOvr>
   <mc:AlternateContent xmlns:mc="http://schemas.openxmlformats.org/markup-compatibility/2006">
-    <mc:Choice xmlns:p14="http://schemas.microsoft.com/office/powerpoint/2010/main" xmlns="" Requires="p14">
+    <mc:Choice xmlns="" xmlns:p14="http://schemas.microsoft.com/office/powerpoint/2010/main" Requires="p14">
       <p:transition spd="slow" p14:dur="2000"/>
     </mc:Choice>
     <mc:Fallback>
@@ -24015,7 +24206,7 @@
           <p:nvPr>
             <p:extLst>
               <p:ext uri="{D42A27DB-BD31-4B8C-83A1-F6EECF244321}">
-                <p14:modId xmlns:p14="http://schemas.microsoft.com/office/powerpoint/2010/main" xmlns="" val="3382119601"/>
+                <p14:modId xmlns="" xmlns:p14="http://schemas.microsoft.com/office/powerpoint/2010/main" val="3382119601"/>
               </p:ext>
             </p:extLst>
           </p:nvPr>
@@ -24934,7 +25125,7 @@
                             </p:stCondLst>
                             <p:childTnLst>
                               <p:par>
-                                <p:cTn id="5" presetID="22" presetClass="entr" presetSubtype="4" fill="hold" grpId="0" nodeType="clickEffect">
+                                <p:cTn id="5" presetID="10" presetClass="entr" presetSubtype="0" fill="hold" nodeType="clickEffect">
                                   <p:stCondLst>
                                     <p:cond delay="0"/>
                                   </p:stCondLst>
@@ -24942,6 +25133,59 @@
                                     <p:set>
                                       <p:cBhvr>
                                         <p:cTn id="6" dur="1" fill="hold">
+                                          <p:stCondLst>
+                                            <p:cond delay="0"/>
+                                          </p:stCondLst>
+                                        </p:cTn>
+                                        <p:tgtEl>
+                                          <p:spTgt spid="6146"/>
+                                        </p:tgtEl>
+                                        <p:attrNameLst>
+                                          <p:attrName>style.visibility</p:attrName>
+                                        </p:attrNameLst>
+                                      </p:cBhvr>
+                                      <p:to>
+                                        <p:strVal val="visible"/>
+                                      </p:to>
+                                    </p:set>
+                                    <p:animEffect transition="in" filter="fade">
+                                      <p:cBhvr>
+                                        <p:cTn id="7" dur="500"/>
+                                        <p:tgtEl>
+                                          <p:spTgt spid="6146"/>
+                                        </p:tgtEl>
+                                      </p:cBhvr>
+                                    </p:animEffect>
+                                  </p:childTnLst>
+                                </p:cTn>
+                              </p:par>
+                            </p:childTnLst>
+                          </p:cTn>
+                        </p:par>
+                      </p:childTnLst>
+                    </p:cTn>
+                  </p:par>
+                  <p:par>
+                    <p:cTn id="8" fill="hold">
+                      <p:stCondLst>
+                        <p:cond delay="indefinite"/>
+                      </p:stCondLst>
+                      <p:childTnLst>
+                        <p:par>
+                          <p:cTn id="9" fill="hold">
+                            <p:stCondLst>
+                              <p:cond delay="0"/>
+                            </p:stCondLst>
+                            <p:childTnLst>
+                              <p:par>
+                                <p:cTn id="10" presetID="22" presetClass="entr" presetSubtype="4" fill="hold" grpId="0" nodeType="clickEffect">
+                                  <p:stCondLst>
+                                    <p:cond delay="0"/>
+                                  </p:stCondLst>
+                                  <p:childTnLst>
+                                    <p:set>
+                                      <p:cBhvr>
+                                        <p:cTn id="11" dur="1" fill="hold">
                                           <p:stCondLst>
                                             <p:cond delay="0"/>
                                           </p:stCondLst>
@@ -24963,7 +25207,7 @@
                                     </p:set>
                                     <p:animEffect transition="in" filter="wipe(down)">
                                       <p:cBhvr>
-                                        <p:cTn id="7" dur="500"/>
+                                        <p:cTn id="12" dur="500"/>
                                         <p:tgtEl>
                                           <p:spTgt spid="3">
                                             <p:txEl>
@@ -24977,14 +25221,14 @@
                                 </p:cTn>
                               </p:par>
                               <p:par>
-                                <p:cTn id="8" presetID="22" presetClass="entr" presetSubtype="4" fill="hold" grpId="0" nodeType="withEffect">
+                                <p:cTn id="13" presetID="22" presetClass="entr" presetSubtype="4" fill="hold" grpId="0" nodeType="withEffect">
                                   <p:stCondLst>
                                     <p:cond delay="0"/>
                                   </p:stCondLst>
                                   <p:childTnLst>
                                     <p:set>
                                       <p:cBhvr>
-                                        <p:cTn id="9" dur="1" fill="hold">
+                                        <p:cTn id="14" dur="1" fill="hold">
                                           <p:stCondLst>
                                             <p:cond delay="0"/>
                                           </p:stCondLst>
@@ -25006,7 +25250,7 @@
                                     </p:set>
                                     <p:animEffect transition="in" filter="wipe(down)">
                                       <p:cBhvr>
-                                        <p:cTn id="10" dur="500"/>
+                                        <p:cTn id="15" dur="500"/>
                                         <p:tgtEl>
                                           <p:spTgt spid="3">
                                             <p:txEl>
@@ -25019,15 +25263,33 @@
                                   </p:childTnLst>
                                 </p:cTn>
                               </p:par>
+                            </p:childTnLst>
+                          </p:cTn>
+                        </p:par>
+                      </p:childTnLst>
+                    </p:cTn>
+                  </p:par>
+                  <p:par>
+                    <p:cTn id="16" fill="hold">
+                      <p:stCondLst>
+                        <p:cond delay="indefinite"/>
+                      </p:stCondLst>
+                      <p:childTnLst>
+                        <p:par>
+                          <p:cTn id="17" fill="hold">
+                            <p:stCondLst>
+                              <p:cond delay="0"/>
+                            </p:stCondLst>
+                            <p:childTnLst>
                               <p:par>
-                                <p:cTn id="11" presetID="22" presetClass="entr" presetSubtype="4" fill="hold" grpId="0" nodeType="withEffect">
+                                <p:cTn id="18" presetID="22" presetClass="entr" presetSubtype="4" fill="hold" grpId="0" nodeType="clickEffect">
                                   <p:stCondLst>
                                     <p:cond delay="0"/>
                                   </p:stCondLst>
                                   <p:childTnLst>
                                     <p:set>
                                       <p:cBhvr>
-                                        <p:cTn id="12" dur="1" fill="hold">
+                                        <p:cTn id="19" dur="1" fill="hold">
                                           <p:stCondLst>
                                             <p:cond delay="0"/>
                                           </p:stCondLst>
@@ -25049,7 +25311,7 @@
                                     </p:set>
                                     <p:animEffect transition="in" filter="wipe(down)">
                                       <p:cBhvr>
-                                        <p:cTn id="13" dur="500"/>
+                                        <p:cTn id="20" dur="500"/>
                                         <p:tgtEl>
                                           <p:spTgt spid="3">
                                             <p:txEl>
@@ -25062,15 +25324,33 @@
                                   </p:childTnLst>
                                 </p:cTn>
                               </p:par>
+                            </p:childTnLst>
+                          </p:cTn>
+                        </p:par>
+                      </p:childTnLst>
+                    </p:cTn>
+                  </p:par>
+                  <p:par>
+                    <p:cTn id="21" fill="hold">
+                      <p:stCondLst>
+                        <p:cond delay="indefinite"/>
+                      </p:stCondLst>
+                      <p:childTnLst>
+                        <p:par>
+                          <p:cTn id="22" fill="hold">
+                            <p:stCondLst>
+                              <p:cond delay="0"/>
+                            </p:stCondLst>
+                            <p:childTnLst>
                               <p:par>
-                                <p:cTn id="14" presetID="22" presetClass="entr" presetSubtype="4" fill="hold" grpId="0" nodeType="withEffect">
+                                <p:cTn id="23" presetID="22" presetClass="entr" presetSubtype="4" fill="hold" grpId="0" nodeType="clickEffect">
                                   <p:stCondLst>
                                     <p:cond delay="0"/>
                                   </p:stCondLst>
                                   <p:childTnLst>
                                     <p:set>
                                       <p:cBhvr>
-                                        <p:cTn id="15" dur="1" fill="hold">
+                                        <p:cTn id="24" dur="1" fill="hold">
                                           <p:stCondLst>
                                             <p:cond delay="0"/>
                                           </p:stCondLst>
@@ -25092,7 +25372,7 @@
                                     </p:set>
                                     <p:animEffect transition="in" filter="wipe(down)">
                                       <p:cBhvr>
-                                        <p:cTn id="16" dur="500"/>
+                                        <p:cTn id="25" dur="500"/>
                                         <p:tgtEl>
                                           <p:spTgt spid="3">
                                             <p:txEl>
@@ -25106,14 +25386,14 @@
                                 </p:cTn>
                               </p:par>
                               <p:par>
-                                <p:cTn id="17" presetID="22" presetClass="entr" presetSubtype="4" fill="hold" grpId="0" nodeType="withEffect">
+                                <p:cTn id="26" presetID="22" presetClass="entr" presetSubtype="4" fill="hold" grpId="0" nodeType="withEffect">
                                   <p:stCondLst>
                                     <p:cond delay="0"/>
                                   </p:stCondLst>
                                   <p:childTnLst>
                                     <p:set>
                                       <p:cBhvr>
-                                        <p:cTn id="18" dur="1" fill="hold">
+                                        <p:cTn id="27" dur="1" fill="hold">
                                           <p:stCondLst>
                                             <p:cond delay="0"/>
                                           </p:stCondLst>
@@ -25135,7 +25415,7 @@
                                     </p:set>
                                     <p:animEffect transition="in" filter="wipe(down)">
                                       <p:cBhvr>
-                                        <p:cTn id="19" dur="500"/>
+                                        <p:cTn id="28" dur="500"/>
                                         <p:tgtEl>
                                           <p:spTgt spid="3">
                                             <p:txEl>
@@ -25149,14 +25429,14 @@
                                 </p:cTn>
                               </p:par>
                               <p:par>
-                                <p:cTn id="20" presetID="22" presetClass="entr" presetSubtype="4" fill="hold" grpId="0" nodeType="withEffect">
+                                <p:cTn id="29" presetID="22" presetClass="entr" presetSubtype="4" fill="hold" grpId="0" nodeType="withEffect">
                                   <p:stCondLst>
                                     <p:cond delay="0"/>
                                   </p:stCondLst>
                                   <p:childTnLst>
                                     <p:set>
                                       <p:cBhvr>
-                                        <p:cTn id="21" dur="1" fill="hold">
+                                        <p:cTn id="30" dur="1" fill="hold">
                                           <p:stCondLst>
                                             <p:cond delay="0"/>
                                           </p:stCondLst>
@@ -25178,66 +25458,13 @@
                                     </p:set>
                                     <p:animEffect transition="in" filter="wipe(down)">
                                       <p:cBhvr>
-                                        <p:cTn id="22" dur="500"/>
+                                        <p:cTn id="31" dur="500"/>
                                         <p:tgtEl>
                                           <p:spTgt spid="3">
                                             <p:txEl>
                                               <p:pRg st="9" end="9"/>
                                             </p:txEl>
                                           </p:spTgt>
-                                        </p:tgtEl>
-                                      </p:cBhvr>
-                                    </p:animEffect>
-                                  </p:childTnLst>
-                                </p:cTn>
-                              </p:par>
-                            </p:childTnLst>
-                          </p:cTn>
-                        </p:par>
-                      </p:childTnLst>
-                    </p:cTn>
-                  </p:par>
-                  <p:par>
-                    <p:cTn id="23" fill="hold">
-                      <p:stCondLst>
-                        <p:cond delay="indefinite"/>
-                      </p:stCondLst>
-                      <p:childTnLst>
-                        <p:par>
-                          <p:cTn id="24" fill="hold">
-                            <p:stCondLst>
-                              <p:cond delay="0"/>
-                            </p:stCondLst>
-                            <p:childTnLst>
-                              <p:par>
-                                <p:cTn id="25" presetID="10" presetClass="entr" presetSubtype="0" fill="hold" nodeType="clickEffect">
-                                  <p:stCondLst>
-                                    <p:cond delay="0"/>
-                                  </p:stCondLst>
-                                  <p:childTnLst>
-                                    <p:set>
-                                      <p:cBhvr>
-                                        <p:cTn id="26" dur="1" fill="hold">
-                                          <p:stCondLst>
-                                            <p:cond delay="0"/>
-                                          </p:stCondLst>
-                                        </p:cTn>
-                                        <p:tgtEl>
-                                          <p:spTgt spid="6146"/>
-                                        </p:tgtEl>
-                                        <p:attrNameLst>
-                                          <p:attrName>style.visibility</p:attrName>
-                                        </p:attrNameLst>
-                                      </p:cBhvr>
-                                      <p:to>
-                                        <p:strVal val="visible"/>
-                                      </p:to>
-                                    </p:set>
-                                    <p:animEffect transition="in" filter="fade">
-                                      <p:cBhvr>
-                                        <p:cTn id="27" dur="500"/>
-                                        <p:tgtEl>
-                                          <p:spTgt spid="6146"/>
                                         </p:tgtEl>
                                       </p:cBhvr>
                                     </p:animEffect>
@@ -25272,7 +25499,7 @@
       </p:par>
     </p:tnLst>
     <p:bldLst>
-      <p:bldP spid="3" grpId="0" build="allAtOnce"/>
+      <p:bldP spid="3" grpId="0" build="p"/>
     </p:bldLst>
   </p:timing>
 </p:sld>
@@ -25719,7 +25946,7 @@
                             </p:stCondLst>
                             <p:childTnLst>
                               <p:par>
-                                <p:cTn id="5" presetID="2" presetClass="entr" presetSubtype="4" fill="hold" grpId="0" nodeType="clickEffect">
+                                <p:cTn id="5" presetID="10" presetClass="entr" presetSubtype="0" fill="hold" nodeType="clickEffect">
                                   <p:stCondLst>
                                     <p:cond delay="0"/>
                                   </p:stCondLst>
@@ -25727,6 +25954,59 @@
                                     <p:set>
                                       <p:cBhvr>
                                         <p:cTn id="6" dur="1" fill="hold">
+                                          <p:stCondLst>
+                                            <p:cond delay="0"/>
+                                          </p:stCondLst>
+                                        </p:cTn>
+                                        <p:tgtEl>
+                                          <p:spTgt spid="7170"/>
+                                        </p:tgtEl>
+                                        <p:attrNameLst>
+                                          <p:attrName>style.visibility</p:attrName>
+                                        </p:attrNameLst>
+                                      </p:cBhvr>
+                                      <p:to>
+                                        <p:strVal val="visible"/>
+                                      </p:to>
+                                    </p:set>
+                                    <p:animEffect transition="in" filter="fade">
+                                      <p:cBhvr>
+                                        <p:cTn id="7" dur="500"/>
+                                        <p:tgtEl>
+                                          <p:spTgt spid="7170"/>
+                                        </p:tgtEl>
+                                      </p:cBhvr>
+                                    </p:animEffect>
+                                  </p:childTnLst>
+                                </p:cTn>
+                              </p:par>
+                            </p:childTnLst>
+                          </p:cTn>
+                        </p:par>
+                      </p:childTnLst>
+                    </p:cTn>
+                  </p:par>
+                  <p:par>
+                    <p:cTn id="8" fill="hold">
+                      <p:stCondLst>
+                        <p:cond delay="indefinite"/>
+                      </p:stCondLst>
+                      <p:childTnLst>
+                        <p:par>
+                          <p:cTn id="9" fill="hold">
+                            <p:stCondLst>
+                              <p:cond delay="0"/>
+                            </p:stCondLst>
+                            <p:childTnLst>
+                              <p:par>
+                                <p:cTn id="10" presetID="2" presetClass="entr" presetSubtype="4" fill="hold" grpId="0" nodeType="clickEffect">
+                                  <p:stCondLst>
+                                    <p:cond delay="0"/>
+                                  </p:stCondLst>
+                                  <p:childTnLst>
+                                    <p:set>
+                                      <p:cBhvr>
+                                        <p:cTn id="11" dur="1" fill="hold">
                                           <p:stCondLst>
                                             <p:cond delay="0"/>
                                           </p:stCondLst>
@@ -25748,7 +26028,7 @@
                                     </p:set>
                                     <p:anim calcmode="lin" valueType="num">
                                       <p:cBhvr additive="base">
-                                        <p:cTn id="7" dur="500" fill="hold"/>
+                                        <p:cTn id="12" dur="500" fill="hold"/>
                                         <p:tgtEl>
                                           <p:spTgt spid="3">
                                             <p:txEl>
@@ -25775,7 +26055,7 @@
                                     </p:anim>
                                     <p:anim calcmode="lin" valueType="num">
                                       <p:cBhvr additive="base">
-                                        <p:cTn id="8" dur="500" fill="hold"/>
+                                        <p:cTn id="13" dur="500" fill="hold"/>
                                         <p:tgtEl>
                                           <p:spTgt spid="3">
                                             <p:txEl>
@@ -25803,15 +26083,33 @@
                                   </p:childTnLst>
                                 </p:cTn>
                               </p:par>
+                            </p:childTnLst>
+                          </p:cTn>
+                        </p:par>
+                      </p:childTnLst>
+                    </p:cTn>
+                  </p:par>
+                  <p:par>
+                    <p:cTn id="14" fill="hold">
+                      <p:stCondLst>
+                        <p:cond delay="indefinite"/>
+                      </p:stCondLst>
+                      <p:childTnLst>
+                        <p:par>
+                          <p:cTn id="15" fill="hold">
+                            <p:stCondLst>
+                              <p:cond delay="0"/>
+                            </p:stCondLst>
+                            <p:childTnLst>
                               <p:par>
-                                <p:cTn id="9" presetID="2" presetClass="entr" presetSubtype="4" fill="hold" grpId="0" nodeType="withEffect">
+                                <p:cTn id="16" presetID="2" presetClass="entr" presetSubtype="4" fill="hold" grpId="0" nodeType="clickEffect">
                                   <p:stCondLst>
                                     <p:cond delay="0"/>
                                   </p:stCondLst>
                                   <p:childTnLst>
                                     <p:set>
                                       <p:cBhvr>
-                                        <p:cTn id="10" dur="1" fill="hold">
+                                        <p:cTn id="17" dur="1" fill="hold">
                                           <p:stCondLst>
                                             <p:cond delay="0"/>
                                           </p:stCondLst>
@@ -25833,7 +26131,7 @@
                                     </p:set>
                                     <p:anim calcmode="lin" valueType="num">
                                       <p:cBhvr additive="base">
-                                        <p:cTn id="11" dur="500" fill="hold"/>
+                                        <p:cTn id="18" dur="500" fill="hold"/>
                                         <p:tgtEl>
                                           <p:spTgt spid="3">
                                             <p:txEl>
@@ -25860,7 +26158,7 @@
                                     </p:anim>
                                     <p:anim calcmode="lin" valueType="num">
                                       <p:cBhvr additive="base">
-                                        <p:cTn id="12" dur="500" fill="hold"/>
+                                        <p:cTn id="19" dur="500" fill="hold"/>
                                         <p:tgtEl>
                                           <p:spTgt spid="3">
                                             <p:txEl>
@@ -25888,15 +26186,33 @@
                                   </p:childTnLst>
                                 </p:cTn>
                               </p:par>
+                            </p:childTnLst>
+                          </p:cTn>
+                        </p:par>
+                      </p:childTnLst>
+                    </p:cTn>
+                  </p:par>
+                  <p:par>
+                    <p:cTn id="20" fill="hold">
+                      <p:stCondLst>
+                        <p:cond delay="indefinite"/>
+                      </p:stCondLst>
+                      <p:childTnLst>
+                        <p:par>
+                          <p:cTn id="21" fill="hold">
+                            <p:stCondLst>
+                              <p:cond delay="0"/>
+                            </p:stCondLst>
+                            <p:childTnLst>
                               <p:par>
-                                <p:cTn id="13" presetID="2" presetClass="entr" presetSubtype="4" fill="hold" grpId="0" nodeType="withEffect">
+                                <p:cTn id="22" presetID="2" presetClass="entr" presetSubtype="4" fill="hold" grpId="0" nodeType="clickEffect">
                                   <p:stCondLst>
                                     <p:cond delay="0"/>
                                   </p:stCondLst>
                                   <p:childTnLst>
                                     <p:set>
                                       <p:cBhvr>
-                                        <p:cTn id="14" dur="1" fill="hold">
+                                        <p:cTn id="23" dur="1" fill="hold">
                                           <p:stCondLst>
                                             <p:cond delay="0"/>
                                           </p:stCondLst>
@@ -25918,7 +26234,7 @@
                                     </p:set>
                                     <p:anim calcmode="lin" valueType="num">
                                       <p:cBhvr additive="base">
-                                        <p:cTn id="15" dur="500" fill="hold"/>
+                                        <p:cTn id="24" dur="500" fill="hold"/>
                                         <p:tgtEl>
                                           <p:spTgt spid="3">
                                             <p:txEl>
@@ -25945,7 +26261,7 @@
                                     </p:anim>
                                     <p:anim calcmode="lin" valueType="num">
                                       <p:cBhvr additive="base">
-                                        <p:cTn id="16" dur="500" fill="hold"/>
+                                        <p:cTn id="25" dur="500" fill="hold"/>
                                         <p:tgtEl>
                                           <p:spTgt spid="3">
                                             <p:txEl>
@@ -25974,14 +26290,14 @@
                                 </p:cTn>
                               </p:par>
                               <p:par>
-                                <p:cTn id="17" presetID="2" presetClass="entr" presetSubtype="4" fill="hold" grpId="0" nodeType="withEffect">
+                                <p:cTn id="26" presetID="2" presetClass="entr" presetSubtype="4" fill="hold" grpId="0" nodeType="withEffect">
                                   <p:stCondLst>
                                     <p:cond delay="0"/>
                                   </p:stCondLst>
                                   <p:childTnLst>
                                     <p:set>
                                       <p:cBhvr>
-                                        <p:cTn id="18" dur="1" fill="hold">
+                                        <p:cTn id="27" dur="1" fill="hold">
                                           <p:stCondLst>
                                             <p:cond delay="0"/>
                                           </p:stCondLst>
@@ -26003,7 +26319,7 @@
                                     </p:set>
                                     <p:anim calcmode="lin" valueType="num">
                                       <p:cBhvr additive="base">
-                                        <p:cTn id="19" dur="500" fill="hold"/>
+                                        <p:cTn id="28" dur="500" fill="hold"/>
                                         <p:tgtEl>
                                           <p:spTgt spid="3">
                                             <p:txEl>
@@ -26030,7 +26346,7 @@
                                     </p:anim>
                                     <p:anim calcmode="lin" valueType="num">
                                       <p:cBhvr additive="base">
-                                        <p:cTn id="20" dur="500" fill="hold"/>
+                                        <p:cTn id="29" dur="500" fill="hold"/>
                                         <p:tgtEl>
                                           <p:spTgt spid="3">
                                             <p:txEl>
@@ -26064,59 +26380,6 @@
                       </p:childTnLst>
                     </p:cTn>
                   </p:par>
-                  <p:par>
-                    <p:cTn id="21" fill="hold">
-                      <p:stCondLst>
-                        <p:cond delay="indefinite"/>
-                      </p:stCondLst>
-                      <p:childTnLst>
-                        <p:par>
-                          <p:cTn id="22" fill="hold">
-                            <p:stCondLst>
-                              <p:cond delay="0"/>
-                            </p:stCondLst>
-                            <p:childTnLst>
-                              <p:par>
-                                <p:cTn id="23" presetID="10" presetClass="entr" presetSubtype="0" fill="hold" nodeType="clickEffect">
-                                  <p:stCondLst>
-                                    <p:cond delay="0"/>
-                                  </p:stCondLst>
-                                  <p:childTnLst>
-                                    <p:set>
-                                      <p:cBhvr>
-                                        <p:cTn id="24" dur="1" fill="hold">
-                                          <p:stCondLst>
-                                            <p:cond delay="0"/>
-                                          </p:stCondLst>
-                                        </p:cTn>
-                                        <p:tgtEl>
-                                          <p:spTgt spid="7170"/>
-                                        </p:tgtEl>
-                                        <p:attrNameLst>
-                                          <p:attrName>style.visibility</p:attrName>
-                                        </p:attrNameLst>
-                                      </p:cBhvr>
-                                      <p:to>
-                                        <p:strVal val="visible"/>
-                                      </p:to>
-                                    </p:set>
-                                    <p:animEffect transition="in" filter="fade">
-                                      <p:cBhvr>
-                                        <p:cTn id="25" dur="500"/>
-                                        <p:tgtEl>
-                                          <p:spTgt spid="7170"/>
-                                        </p:tgtEl>
-                                      </p:cBhvr>
-                                    </p:animEffect>
-                                  </p:childTnLst>
-                                </p:cTn>
-                              </p:par>
-                            </p:childTnLst>
-                          </p:cTn>
-                        </p:par>
-                      </p:childTnLst>
-                    </p:cTn>
-                  </p:par>
                 </p:childTnLst>
               </p:cTn>
               <p:prevCondLst>
@@ -26139,7 +26402,7 @@
       </p:par>
     </p:tnLst>
     <p:bldLst>
-      <p:bldP spid="3" grpId="0" build="allAtOnce"/>
+      <p:bldP spid="3" grpId="0" build="p"/>
     </p:bldLst>
   </p:timing>
 </p:sld>
@@ -26604,25 +26867,8 @@
                 <a:latin typeface="+mj-lt"/>
                 <a:cs typeface="Arial" pitchFamily="34" charset="0"/>
               </a:rPr>
-              <a:t>*@param </a:t>
-            </a:r>
-            <a:r>
-              <a:rPr lang="it-IT" sz="1800" b="1" dirty="0" smtClean="0">
-                <a:solidFill>
-                  <a:srgbClr val="0070C0"/>
-                </a:solidFill>
-                <a:latin typeface="+mj-lt"/>
-                <a:cs typeface="Arial" pitchFamily="34" charset="0"/>
-              </a:rPr>
-              <a:t>questionario</a:t>
-            </a:r>
-            <a:endParaRPr lang="it-IT" sz="1800" b="1" dirty="0" smtClean="0">
-              <a:solidFill>
-                <a:srgbClr val="0070C0"/>
-              </a:solidFill>
-              <a:latin typeface="+mj-lt"/>
-              <a:cs typeface="Arial" pitchFamily="34" charset="0"/>
-            </a:endParaRPr>
+              <a:t>*@param questionario</a:t>
+            </a:r>
           </a:p>
           <a:p>
             <a:pPr marL="285750" indent="-285750" algn="just">
@@ -26773,32 +27019,6 @@
           </a:p>
         </p:txBody>
       </p:sp>
-      <p:pic>
-        <p:nvPicPr>
-          <p:cNvPr id="16386" name="Picture 2" descr="http://oliviertech.com/wp-content/uploads/2012/12/junit.gif"/>
-          <p:cNvPicPr>
-            <a:picLocks noChangeAspect="1" noChangeArrowheads="1"/>
-          </p:cNvPicPr>
-          <p:nvPr/>
-        </p:nvPicPr>
-        <p:blipFill>
-          <a:blip r:embed="rId2"/>
-          <a:srcRect/>
-          <a:stretch>
-            <a:fillRect/>
-          </a:stretch>
-        </p:blipFill>
-        <p:spPr bwMode="auto">
-          <a:xfrm>
-            <a:off x="155575" y="-319088"/>
-            <a:ext cx="1276350" cy="676276"/>
-          </a:xfrm>
-          <a:prstGeom prst="rect">
-            <a:avLst/>
-          </a:prstGeom>
-          <a:noFill/>
-        </p:spPr>
-      </p:pic>
       <p:pic>
         <p:nvPicPr>
           <p:cNvPr id="16388" name="Picture 4" descr="http://oliviertech.com/wp-content/uploads/2012/12/junit.gif"/>
@@ -26828,7 +27048,7 @@
     </p:spTree>
     <p:extLst>
       <p:ext uri="{BB962C8B-B14F-4D97-AF65-F5344CB8AC3E}">
-        <p14:creationId xmlns:p14="http://schemas.microsoft.com/office/powerpoint/2010/main" xmlns="" val="134615909"/>
+        <p14:creationId xmlns="" xmlns:p14="http://schemas.microsoft.com/office/powerpoint/2010/main" val="134615909"/>
       </p:ext>
     </p:extLst>
   </p:cSld>
@@ -26838,9 +27058,690 @@
   <p:timing>
     <p:tnLst>
       <p:par>
-        <p:cTn id="1" dur="indefinite" restart="never" nodeType="tmRoot"/>
+        <p:cTn id="1" dur="indefinite" restart="never" nodeType="tmRoot">
+          <p:childTnLst>
+            <p:seq concurrent="1" nextAc="seek">
+              <p:cTn id="2" dur="indefinite" nodeType="mainSeq">
+                <p:childTnLst>
+                  <p:par>
+                    <p:cTn id="3" fill="hold">
+                      <p:stCondLst>
+                        <p:cond delay="indefinite"/>
+                      </p:stCondLst>
+                      <p:childTnLst>
+                        <p:par>
+                          <p:cTn id="4" fill="hold">
+                            <p:stCondLst>
+                              <p:cond delay="0"/>
+                            </p:stCondLst>
+                            <p:childTnLst>
+                              <p:par>
+                                <p:cTn id="5" presetID="22" presetClass="entr" presetSubtype="4" fill="hold" grpId="0" nodeType="clickEffect">
+                                  <p:stCondLst>
+                                    <p:cond delay="0"/>
+                                  </p:stCondLst>
+                                  <p:childTnLst>
+                                    <p:set>
+                                      <p:cBhvr>
+                                        <p:cTn id="6" dur="1" fill="hold">
+                                          <p:stCondLst>
+                                            <p:cond delay="0"/>
+                                          </p:stCondLst>
+                                        </p:cTn>
+                                        <p:tgtEl>
+                                          <p:spTgt spid="4">
+                                            <p:txEl>
+                                              <p:pRg st="0" end="0"/>
+                                            </p:txEl>
+                                          </p:spTgt>
+                                        </p:tgtEl>
+                                        <p:attrNameLst>
+                                          <p:attrName>style.visibility</p:attrName>
+                                        </p:attrNameLst>
+                                      </p:cBhvr>
+                                      <p:to>
+                                        <p:strVal val="visible"/>
+                                      </p:to>
+                                    </p:set>
+                                    <p:animEffect transition="in" filter="wipe(down)">
+                                      <p:cBhvr>
+                                        <p:cTn id="7" dur="500"/>
+                                        <p:tgtEl>
+                                          <p:spTgt spid="4">
+                                            <p:txEl>
+                                              <p:pRg st="0" end="0"/>
+                                            </p:txEl>
+                                          </p:spTgt>
+                                        </p:tgtEl>
+                                      </p:cBhvr>
+                                    </p:animEffect>
+                                  </p:childTnLst>
+                                </p:cTn>
+                              </p:par>
+                              <p:par>
+                                <p:cTn id="8" presetID="22" presetClass="entr" presetSubtype="4" fill="hold" grpId="0" nodeType="withEffect">
+                                  <p:stCondLst>
+                                    <p:cond delay="0"/>
+                                  </p:stCondLst>
+                                  <p:childTnLst>
+                                    <p:set>
+                                      <p:cBhvr>
+                                        <p:cTn id="9" dur="1" fill="hold">
+                                          <p:stCondLst>
+                                            <p:cond delay="0"/>
+                                          </p:stCondLst>
+                                        </p:cTn>
+                                        <p:tgtEl>
+                                          <p:spTgt spid="4">
+                                            <p:txEl>
+                                              <p:pRg st="1" end="1"/>
+                                            </p:txEl>
+                                          </p:spTgt>
+                                        </p:tgtEl>
+                                        <p:attrNameLst>
+                                          <p:attrName>style.visibility</p:attrName>
+                                        </p:attrNameLst>
+                                      </p:cBhvr>
+                                      <p:to>
+                                        <p:strVal val="visible"/>
+                                      </p:to>
+                                    </p:set>
+                                    <p:animEffect transition="in" filter="wipe(down)">
+                                      <p:cBhvr>
+                                        <p:cTn id="10" dur="500"/>
+                                        <p:tgtEl>
+                                          <p:spTgt spid="4">
+                                            <p:txEl>
+                                              <p:pRg st="1" end="1"/>
+                                            </p:txEl>
+                                          </p:spTgt>
+                                        </p:tgtEl>
+                                      </p:cBhvr>
+                                    </p:animEffect>
+                                  </p:childTnLst>
+                                </p:cTn>
+                              </p:par>
+                              <p:par>
+                                <p:cTn id="11" presetID="22" presetClass="entr" presetSubtype="4" fill="hold" grpId="0" nodeType="withEffect">
+                                  <p:stCondLst>
+                                    <p:cond delay="0"/>
+                                  </p:stCondLst>
+                                  <p:childTnLst>
+                                    <p:set>
+                                      <p:cBhvr>
+                                        <p:cTn id="12" dur="1" fill="hold">
+                                          <p:stCondLst>
+                                            <p:cond delay="0"/>
+                                          </p:stCondLst>
+                                        </p:cTn>
+                                        <p:tgtEl>
+                                          <p:spTgt spid="4">
+                                            <p:txEl>
+                                              <p:pRg st="2" end="2"/>
+                                            </p:txEl>
+                                          </p:spTgt>
+                                        </p:tgtEl>
+                                        <p:attrNameLst>
+                                          <p:attrName>style.visibility</p:attrName>
+                                        </p:attrNameLst>
+                                      </p:cBhvr>
+                                      <p:to>
+                                        <p:strVal val="visible"/>
+                                      </p:to>
+                                    </p:set>
+                                    <p:animEffect transition="in" filter="wipe(down)">
+                                      <p:cBhvr>
+                                        <p:cTn id="13" dur="500"/>
+                                        <p:tgtEl>
+                                          <p:spTgt spid="4">
+                                            <p:txEl>
+                                              <p:pRg st="2" end="2"/>
+                                            </p:txEl>
+                                          </p:spTgt>
+                                        </p:tgtEl>
+                                      </p:cBhvr>
+                                    </p:animEffect>
+                                  </p:childTnLst>
+                                </p:cTn>
+                              </p:par>
+                              <p:par>
+                                <p:cTn id="14" presetID="22" presetClass="entr" presetSubtype="4" fill="hold" grpId="0" nodeType="withEffect">
+                                  <p:stCondLst>
+                                    <p:cond delay="0"/>
+                                  </p:stCondLst>
+                                  <p:childTnLst>
+                                    <p:set>
+                                      <p:cBhvr>
+                                        <p:cTn id="15" dur="1" fill="hold">
+                                          <p:stCondLst>
+                                            <p:cond delay="0"/>
+                                          </p:stCondLst>
+                                        </p:cTn>
+                                        <p:tgtEl>
+                                          <p:spTgt spid="4">
+                                            <p:txEl>
+                                              <p:pRg st="3" end="3"/>
+                                            </p:txEl>
+                                          </p:spTgt>
+                                        </p:tgtEl>
+                                        <p:attrNameLst>
+                                          <p:attrName>style.visibility</p:attrName>
+                                        </p:attrNameLst>
+                                      </p:cBhvr>
+                                      <p:to>
+                                        <p:strVal val="visible"/>
+                                      </p:to>
+                                    </p:set>
+                                    <p:animEffect transition="in" filter="wipe(down)">
+                                      <p:cBhvr>
+                                        <p:cTn id="16" dur="500"/>
+                                        <p:tgtEl>
+                                          <p:spTgt spid="4">
+                                            <p:txEl>
+                                              <p:pRg st="3" end="3"/>
+                                            </p:txEl>
+                                          </p:spTgt>
+                                        </p:tgtEl>
+                                      </p:cBhvr>
+                                    </p:animEffect>
+                                  </p:childTnLst>
+                                </p:cTn>
+                              </p:par>
+                              <p:par>
+                                <p:cTn id="17" presetID="22" presetClass="entr" presetSubtype="4" fill="hold" grpId="0" nodeType="withEffect">
+                                  <p:stCondLst>
+                                    <p:cond delay="0"/>
+                                  </p:stCondLst>
+                                  <p:childTnLst>
+                                    <p:set>
+                                      <p:cBhvr>
+                                        <p:cTn id="18" dur="1" fill="hold">
+                                          <p:stCondLst>
+                                            <p:cond delay="0"/>
+                                          </p:stCondLst>
+                                        </p:cTn>
+                                        <p:tgtEl>
+                                          <p:spTgt spid="4">
+                                            <p:txEl>
+                                              <p:pRg st="4" end="4"/>
+                                            </p:txEl>
+                                          </p:spTgt>
+                                        </p:tgtEl>
+                                        <p:attrNameLst>
+                                          <p:attrName>style.visibility</p:attrName>
+                                        </p:attrNameLst>
+                                      </p:cBhvr>
+                                      <p:to>
+                                        <p:strVal val="visible"/>
+                                      </p:to>
+                                    </p:set>
+                                    <p:animEffect transition="in" filter="wipe(down)">
+                                      <p:cBhvr>
+                                        <p:cTn id="19" dur="500"/>
+                                        <p:tgtEl>
+                                          <p:spTgt spid="4">
+                                            <p:txEl>
+                                              <p:pRg st="4" end="4"/>
+                                            </p:txEl>
+                                          </p:spTgt>
+                                        </p:tgtEl>
+                                      </p:cBhvr>
+                                    </p:animEffect>
+                                  </p:childTnLst>
+                                </p:cTn>
+                              </p:par>
+                              <p:par>
+                                <p:cTn id="20" presetID="22" presetClass="entr" presetSubtype="4" fill="hold" grpId="0" nodeType="withEffect">
+                                  <p:stCondLst>
+                                    <p:cond delay="0"/>
+                                  </p:stCondLst>
+                                  <p:childTnLst>
+                                    <p:set>
+                                      <p:cBhvr>
+                                        <p:cTn id="21" dur="1" fill="hold">
+                                          <p:stCondLst>
+                                            <p:cond delay="0"/>
+                                          </p:stCondLst>
+                                        </p:cTn>
+                                        <p:tgtEl>
+                                          <p:spTgt spid="4">
+                                            <p:txEl>
+                                              <p:pRg st="5" end="5"/>
+                                            </p:txEl>
+                                          </p:spTgt>
+                                        </p:tgtEl>
+                                        <p:attrNameLst>
+                                          <p:attrName>style.visibility</p:attrName>
+                                        </p:attrNameLst>
+                                      </p:cBhvr>
+                                      <p:to>
+                                        <p:strVal val="visible"/>
+                                      </p:to>
+                                    </p:set>
+                                    <p:animEffect transition="in" filter="wipe(down)">
+                                      <p:cBhvr>
+                                        <p:cTn id="22" dur="500"/>
+                                        <p:tgtEl>
+                                          <p:spTgt spid="4">
+                                            <p:txEl>
+                                              <p:pRg st="5" end="5"/>
+                                            </p:txEl>
+                                          </p:spTgt>
+                                        </p:tgtEl>
+                                      </p:cBhvr>
+                                    </p:animEffect>
+                                  </p:childTnLst>
+                                </p:cTn>
+                              </p:par>
+                              <p:par>
+                                <p:cTn id="23" presetID="22" presetClass="entr" presetSubtype="4" fill="hold" grpId="0" nodeType="withEffect">
+                                  <p:stCondLst>
+                                    <p:cond delay="0"/>
+                                  </p:stCondLst>
+                                  <p:childTnLst>
+                                    <p:set>
+                                      <p:cBhvr>
+                                        <p:cTn id="24" dur="1" fill="hold">
+                                          <p:stCondLst>
+                                            <p:cond delay="0"/>
+                                          </p:stCondLst>
+                                        </p:cTn>
+                                        <p:tgtEl>
+                                          <p:spTgt spid="4">
+                                            <p:txEl>
+                                              <p:pRg st="6" end="6"/>
+                                            </p:txEl>
+                                          </p:spTgt>
+                                        </p:tgtEl>
+                                        <p:attrNameLst>
+                                          <p:attrName>style.visibility</p:attrName>
+                                        </p:attrNameLst>
+                                      </p:cBhvr>
+                                      <p:to>
+                                        <p:strVal val="visible"/>
+                                      </p:to>
+                                    </p:set>
+                                    <p:animEffect transition="in" filter="wipe(down)">
+                                      <p:cBhvr>
+                                        <p:cTn id="25" dur="500"/>
+                                        <p:tgtEl>
+                                          <p:spTgt spid="4">
+                                            <p:txEl>
+                                              <p:pRg st="6" end="6"/>
+                                            </p:txEl>
+                                          </p:spTgt>
+                                        </p:tgtEl>
+                                      </p:cBhvr>
+                                    </p:animEffect>
+                                  </p:childTnLst>
+                                </p:cTn>
+                              </p:par>
+                              <p:par>
+                                <p:cTn id="26" presetID="22" presetClass="entr" presetSubtype="4" fill="hold" grpId="0" nodeType="withEffect">
+                                  <p:stCondLst>
+                                    <p:cond delay="0"/>
+                                  </p:stCondLst>
+                                  <p:childTnLst>
+                                    <p:set>
+                                      <p:cBhvr>
+                                        <p:cTn id="27" dur="1" fill="hold">
+                                          <p:stCondLst>
+                                            <p:cond delay="0"/>
+                                          </p:stCondLst>
+                                        </p:cTn>
+                                        <p:tgtEl>
+                                          <p:spTgt spid="4">
+                                            <p:txEl>
+                                              <p:pRg st="7" end="7"/>
+                                            </p:txEl>
+                                          </p:spTgt>
+                                        </p:tgtEl>
+                                        <p:attrNameLst>
+                                          <p:attrName>style.visibility</p:attrName>
+                                        </p:attrNameLst>
+                                      </p:cBhvr>
+                                      <p:to>
+                                        <p:strVal val="visible"/>
+                                      </p:to>
+                                    </p:set>
+                                    <p:animEffect transition="in" filter="wipe(down)">
+                                      <p:cBhvr>
+                                        <p:cTn id="28" dur="500"/>
+                                        <p:tgtEl>
+                                          <p:spTgt spid="4">
+                                            <p:txEl>
+                                              <p:pRg st="7" end="7"/>
+                                            </p:txEl>
+                                          </p:spTgt>
+                                        </p:tgtEl>
+                                      </p:cBhvr>
+                                    </p:animEffect>
+                                  </p:childTnLst>
+                                </p:cTn>
+                              </p:par>
+                              <p:par>
+                                <p:cTn id="29" presetID="22" presetClass="entr" presetSubtype="4" fill="hold" grpId="0" nodeType="withEffect">
+                                  <p:stCondLst>
+                                    <p:cond delay="0"/>
+                                  </p:stCondLst>
+                                  <p:childTnLst>
+                                    <p:set>
+                                      <p:cBhvr>
+                                        <p:cTn id="30" dur="1" fill="hold">
+                                          <p:stCondLst>
+                                            <p:cond delay="0"/>
+                                          </p:stCondLst>
+                                        </p:cTn>
+                                        <p:tgtEl>
+                                          <p:spTgt spid="4">
+                                            <p:txEl>
+                                              <p:pRg st="8" end="8"/>
+                                            </p:txEl>
+                                          </p:spTgt>
+                                        </p:tgtEl>
+                                        <p:attrNameLst>
+                                          <p:attrName>style.visibility</p:attrName>
+                                        </p:attrNameLst>
+                                      </p:cBhvr>
+                                      <p:to>
+                                        <p:strVal val="visible"/>
+                                      </p:to>
+                                    </p:set>
+                                    <p:animEffect transition="in" filter="wipe(down)">
+                                      <p:cBhvr>
+                                        <p:cTn id="31" dur="500"/>
+                                        <p:tgtEl>
+                                          <p:spTgt spid="4">
+                                            <p:txEl>
+                                              <p:pRg st="8" end="8"/>
+                                            </p:txEl>
+                                          </p:spTgt>
+                                        </p:tgtEl>
+                                      </p:cBhvr>
+                                    </p:animEffect>
+                                  </p:childTnLst>
+                                </p:cTn>
+                              </p:par>
+                              <p:par>
+                                <p:cTn id="32" presetID="22" presetClass="entr" presetSubtype="4" fill="hold" grpId="0" nodeType="withEffect">
+                                  <p:stCondLst>
+                                    <p:cond delay="0"/>
+                                  </p:stCondLst>
+                                  <p:childTnLst>
+                                    <p:set>
+                                      <p:cBhvr>
+                                        <p:cTn id="33" dur="1" fill="hold">
+                                          <p:stCondLst>
+                                            <p:cond delay="0"/>
+                                          </p:stCondLst>
+                                        </p:cTn>
+                                        <p:tgtEl>
+                                          <p:spTgt spid="4">
+                                            <p:txEl>
+                                              <p:pRg st="9" end="9"/>
+                                            </p:txEl>
+                                          </p:spTgt>
+                                        </p:tgtEl>
+                                        <p:attrNameLst>
+                                          <p:attrName>style.visibility</p:attrName>
+                                        </p:attrNameLst>
+                                      </p:cBhvr>
+                                      <p:to>
+                                        <p:strVal val="visible"/>
+                                      </p:to>
+                                    </p:set>
+                                    <p:animEffect transition="in" filter="wipe(down)">
+                                      <p:cBhvr>
+                                        <p:cTn id="34" dur="500"/>
+                                        <p:tgtEl>
+                                          <p:spTgt spid="4">
+                                            <p:txEl>
+                                              <p:pRg st="9" end="9"/>
+                                            </p:txEl>
+                                          </p:spTgt>
+                                        </p:tgtEl>
+                                      </p:cBhvr>
+                                    </p:animEffect>
+                                  </p:childTnLst>
+                                </p:cTn>
+                              </p:par>
+                              <p:par>
+                                <p:cTn id="35" presetID="22" presetClass="entr" presetSubtype="4" fill="hold" grpId="0" nodeType="withEffect">
+                                  <p:stCondLst>
+                                    <p:cond delay="0"/>
+                                  </p:stCondLst>
+                                  <p:childTnLst>
+                                    <p:set>
+                                      <p:cBhvr>
+                                        <p:cTn id="36" dur="1" fill="hold">
+                                          <p:stCondLst>
+                                            <p:cond delay="0"/>
+                                          </p:stCondLst>
+                                        </p:cTn>
+                                        <p:tgtEl>
+                                          <p:spTgt spid="4">
+                                            <p:txEl>
+                                              <p:pRg st="10" end="10"/>
+                                            </p:txEl>
+                                          </p:spTgt>
+                                        </p:tgtEl>
+                                        <p:attrNameLst>
+                                          <p:attrName>style.visibility</p:attrName>
+                                        </p:attrNameLst>
+                                      </p:cBhvr>
+                                      <p:to>
+                                        <p:strVal val="visible"/>
+                                      </p:to>
+                                    </p:set>
+                                    <p:animEffect transition="in" filter="wipe(down)">
+                                      <p:cBhvr>
+                                        <p:cTn id="37" dur="500"/>
+                                        <p:tgtEl>
+                                          <p:spTgt spid="4">
+                                            <p:txEl>
+                                              <p:pRg st="10" end="10"/>
+                                            </p:txEl>
+                                          </p:spTgt>
+                                        </p:tgtEl>
+                                      </p:cBhvr>
+                                    </p:animEffect>
+                                  </p:childTnLst>
+                                </p:cTn>
+                              </p:par>
+                              <p:par>
+                                <p:cTn id="38" presetID="22" presetClass="entr" presetSubtype="4" fill="hold" grpId="0" nodeType="withEffect">
+                                  <p:stCondLst>
+                                    <p:cond delay="0"/>
+                                  </p:stCondLst>
+                                  <p:childTnLst>
+                                    <p:set>
+                                      <p:cBhvr>
+                                        <p:cTn id="39" dur="1" fill="hold">
+                                          <p:stCondLst>
+                                            <p:cond delay="0"/>
+                                          </p:stCondLst>
+                                        </p:cTn>
+                                        <p:tgtEl>
+                                          <p:spTgt spid="4">
+                                            <p:txEl>
+                                              <p:pRg st="11" end="11"/>
+                                            </p:txEl>
+                                          </p:spTgt>
+                                        </p:tgtEl>
+                                        <p:attrNameLst>
+                                          <p:attrName>style.visibility</p:attrName>
+                                        </p:attrNameLst>
+                                      </p:cBhvr>
+                                      <p:to>
+                                        <p:strVal val="visible"/>
+                                      </p:to>
+                                    </p:set>
+                                    <p:animEffect transition="in" filter="wipe(down)">
+                                      <p:cBhvr>
+                                        <p:cTn id="40" dur="500"/>
+                                        <p:tgtEl>
+                                          <p:spTgt spid="4">
+                                            <p:txEl>
+                                              <p:pRg st="11" end="11"/>
+                                            </p:txEl>
+                                          </p:spTgt>
+                                        </p:tgtEl>
+                                      </p:cBhvr>
+                                    </p:animEffect>
+                                  </p:childTnLst>
+                                </p:cTn>
+                              </p:par>
+                              <p:par>
+                                <p:cTn id="41" presetID="22" presetClass="entr" presetSubtype="4" fill="hold" grpId="0" nodeType="withEffect">
+                                  <p:stCondLst>
+                                    <p:cond delay="0"/>
+                                  </p:stCondLst>
+                                  <p:childTnLst>
+                                    <p:set>
+                                      <p:cBhvr>
+                                        <p:cTn id="42" dur="1" fill="hold">
+                                          <p:stCondLst>
+                                            <p:cond delay="0"/>
+                                          </p:stCondLst>
+                                        </p:cTn>
+                                        <p:tgtEl>
+                                          <p:spTgt spid="4">
+                                            <p:txEl>
+                                              <p:pRg st="12" end="12"/>
+                                            </p:txEl>
+                                          </p:spTgt>
+                                        </p:tgtEl>
+                                        <p:attrNameLst>
+                                          <p:attrName>style.visibility</p:attrName>
+                                        </p:attrNameLst>
+                                      </p:cBhvr>
+                                      <p:to>
+                                        <p:strVal val="visible"/>
+                                      </p:to>
+                                    </p:set>
+                                    <p:animEffect transition="in" filter="wipe(down)">
+                                      <p:cBhvr>
+                                        <p:cTn id="43" dur="500"/>
+                                        <p:tgtEl>
+                                          <p:spTgt spid="4">
+                                            <p:txEl>
+                                              <p:pRg st="12" end="12"/>
+                                            </p:txEl>
+                                          </p:spTgt>
+                                        </p:tgtEl>
+                                      </p:cBhvr>
+                                    </p:animEffect>
+                                  </p:childTnLst>
+                                </p:cTn>
+                              </p:par>
+                              <p:par>
+                                <p:cTn id="44" presetID="22" presetClass="entr" presetSubtype="4" fill="hold" grpId="0" nodeType="withEffect">
+                                  <p:stCondLst>
+                                    <p:cond delay="0"/>
+                                  </p:stCondLst>
+                                  <p:childTnLst>
+                                    <p:set>
+                                      <p:cBhvr>
+                                        <p:cTn id="45" dur="1" fill="hold">
+                                          <p:stCondLst>
+                                            <p:cond delay="0"/>
+                                          </p:stCondLst>
+                                        </p:cTn>
+                                        <p:tgtEl>
+                                          <p:spTgt spid="4">
+                                            <p:txEl>
+                                              <p:pRg st="13" end="13"/>
+                                            </p:txEl>
+                                          </p:spTgt>
+                                        </p:tgtEl>
+                                        <p:attrNameLst>
+                                          <p:attrName>style.visibility</p:attrName>
+                                        </p:attrNameLst>
+                                      </p:cBhvr>
+                                      <p:to>
+                                        <p:strVal val="visible"/>
+                                      </p:to>
+                                    </p:set>
+                                    <p:animEffect transition="in" filter="wipe(down)">
+                                      <p:cBhvr>
+                                        <p:cTn id="46" dur="500"/>
+                                        <p:tgtEl>
+                                          <p:spTgt spid="4">
+                                            <p:txEl>
+                                              <p:pRg st="13" end="13"/>
+                                            </p:txEl>
+                                          </p:spTgt>
+                                        </p:tgtEl>
+                                      </p:cBhvr>
+                                    </p:animEffect>
+                                  </p:childTnLst>
+                                </p:cTn>
+                              </p:par>
+                              <p:par>
+                                <p:cTn id="47" presetID="22" presetClass="entr" presetSubtype="4" fill="hold" nodeType="withEffect">
+                                  <p:stCondLst>
+                                    <p:cond delay="0"/>
+                                  </p:stCondLst>
+                                  <p:childTnLst>
+                                    <p:set>
+                                      <p:cBhvr>
+                                        <p:cTn id="48" dur="1" fill="hold">
+                                          <p:stCondLst>
+                                            <p:cond delay="0"/>
+                                          </p:stCondLst>
+                                        </p:cTn>
+                                        <p:tgtEl>
+                                          <p:spTgt spid="16388"/>
+                                        </p:tgtEl>
+                                        <p:attrNameLst>
+                                          <p:attrName>style.visibility</p:attrName>
+                                        </p:attrNameLst>
+                                      </p:cBhvr>
+                                      <p:to>
+                                        <p:strVal val="visible"/>
+                                      </p:to>
+                                    </p:set>
+                                    <p:animEffect transition="in" filter="wipe(down)">
+                                      <p:cBhvr>
+                                        <p:cTn id="49" dur="500"/>
+                                        <p:tgtEl>
+                                          <p:spTgt spid="16388"/>
+                                        </p:tgtEl>
+                                      </p:cBhvr>
+                                    </p:animEffect>
+                                  </p:childTnLst>
+                                </p:cTn>
+                              </p:par>
+                            </p:childTnLst>
+                          </p:cTn>
+                        </p:par>
+                      </p:childTnLst>
+                    </p:cTn>
+                  </p:par>
+                </p:childTnLst>
+              </p:cTn>
+              <p:prevCondLst>
+                <p:cond evt="onPrev" delay="0">
+                  <p:tgtEl>
+                    <p:sldTgt/>
+                  </p:tgtEl>
+                </p:cond>
+              </p:prevCondLst>
+              <p:nextCondLst>
+                <p:cond evt="onNext" delay="0">
+                  <p:tgtEl>
+                    <p:sldTgt/>
+                  </p:tgtEl>
+                </p:cond>
+              </p:nextCondLst>
+            </p:seq>
+          </p:childTnLst>
+        </p:cTn>
       </p:par>
     </p:tnLst>
+    <p:bldLst>
+      <p:bldP spid="4" grpId="0" build="allAtOnce"/>
+    </p:bldLst>
   </p:timing>
 </p:sld>
 </file>
@@ -26921,7 +27822,7 @@
           <p:nvPr>
             <p:extLst>
               <p:ext uri="{D42A27DB-BD31-4B8C-83A1-F6EECF244321}">
-                <p14:modId xmlns:p14="http://schemas.microsoft.com/office/powerpoint/2010/main" xmlns="" val="1603526078"/>
+                <p14:modId xmlns="" xmlns:p14="http://schemas.microsoft.com/office/powerpoint/2010/main" val="1603526078"/>
               </p:ext>
             </p:extLst>
           </p:nvPr>
@@ -27067,7 +27968,7 @@
     </p:spTree>
     <p:extLst>
       <p:ext uri="{BB962C8B-B14F-4D97-AF65-F5344CB8AC3E}">
-        <p14:creationId xmlns:p14="http://schemas.microsoft.com/office/powerpoint/2010/main" xmlns="" val="1428921569"/>
+        <p14:creationId xmlns="" xmlns:p14="http://schemas.microsoft.com/office/powerpoint/2010/main" val="1428921569"/>
       </p:ext>
     </p:extLst>
   </p:cSld>
@@ -27160,7 +28061,7 @@
           <p:nvPr>
             <p:extLst>
               <p:ext uri="{D42A27DB-BD31-4B8C-83A1-F6EECF244321}">
-                <p14:modId xmlns:p14="http://schemas.microsoft.com/office/powerpoint/2010/main" xmlns="" val="3377787449"/>
+                <p14:modId xmlns="" xmlns:p14="http://schemas.microsoft.com/office/powerpoint/2010/main" val="3377787449"/>
               </p:ext>
             </p:extLst>
           </p:nvPr>
@@ -27372,7 +28273,7 @@
     </p:spTree>
     <p:extLst>
       <p:ext uri="{BB962C8B-B14F-4D97-AF65-F5344CB8AC3E}">
-        <p14:creationId xmlns:p14="http://schemas.microsoft.com/office/powerpoint/2010/main" xmlns="" val="521228686"/>
+        <p14:creationId xmlns="" xmlns:p14="http://schemas.microsoft.com/office/powerpoint/2010/main" val="521228686"/>
       </p:ext>
     </p:extLst>
   </p:cSld>
@@ -27459,7 +28360,7 @@
           <a:blip r:embed="rId2">
             <a:extLst>
               <a:ext uri="{28A0092B-C50C-407E-A947-70E740481C1C}">
-                <a14:useLocalDpi xmlns:a14="http://schemas.microsoft.com/office/drawing/2010/main" xmlns="" val="0"/>
+                <a14:useLocalDpi xmlns="" xmlns:a14="http://schemas.microsoft.com/office/drawing/2010/main" val="0"/>
               </a:ext>
             </a:extLst>
           </a:blip>
@@ -27479,7 +28380,7 @@
           <a:noFill/>
           <a:extLst>
             <a:ext uri="{909E8E84-426E-40DD-AFC4-6F175D3DCCD1}">
-              <a14:hiddenFill xmlns:a14="http://schemas.microsoft.com/office/drawing/2010/main" xmlns="">
+              <a14:hiddenFill xmlns="" xmlns:a14="http://schemas.microsoft.com/office/drawing/2010/main">
                 <a:solidFill>
                   <a:srgbClr val="FFFFFF"/>
                 </a:solidFill>
@@ -27661,7 +28562,7 @@
     </p:spTree>
     <p:extLst>
       <p:ext uri="{BB962C8B-B14F-4D97-AF65-F5344CB8AC3E}">
-        <p14:creationId xmlns:p14="http://schemas.microsoft.com/office/powerpoint/2010/main" xmlns="" val="2138116938"/>
+        <p14:creationId xmlns="" xmlns:p14="http://schemas.microsoft.com/office/powerpoint/2010/main" val="2138116938"/>
       </p:ext>
     </p:extLst>
   </p:cSld>
@@ -27671,9 +28572,417 @@
   <p:timing>
     <p:tnLst>
       <p:par>
-        <p:cTn id="1" dur="indefinite" restart="never" nodeType="tmRoot"/>
+        <p:cTn id="1" dur="indefinite" restart="never" nodeType="tmRoot">
+          <p:childTnLst>
+            <p:seq concurrent="1" nextAc="seek">
+              <p:cTn id="2" dur="indefinite" nodeType="mainSeq">
+                <p:childTnLst>
+                  <p:par>
+                    <p:cTn id="3" fill="hold">
+                      <p:stCondLst>
+                        <p:cond delay="indefinite"/>
+                      </p:stCondLst>
+                      <p:childTnLst>
+                        <p:par>
+                          <p:cTn id="4" fill="hold">
+                            <p:stCondLst>
+                              <p:cond delay="0"/>
+                            </p:stCondLst>
+                            <p:childTnLst>
+                              <p:par>
+                                <p:cTn id="5" presetID="10" presetClass="entr" presetSubtype="0" fill="hold" nodeType="clickEffect">
+                                  <p:stCondLst>
+                                    <p:cond delay="0"/>
+                                  </p:stCondLst>
+                                  <p:childTnLst>
+                                    <p:set>
+                                      <p:cBhvr>
+                                        <p:cTn id="6" dur="1" fill="hold">
+                                          <p:stCondLst>
+                                            <p:cond delay="0"/>
+                                          </p:stCondLst>
+                                        </p:cTn>
+                                        <p:tgtEl>
+                                          <p:spTgt spid="3"/>
+                                        </p:tgtEl>
+                                        <p:attrNameLst>
+                                          <p:attrName>style.visibility</p:attrName>
+                                        </p:attrNameLst>
+                                      </p:cBhvr>
+                                      <p:to>
+                                        <p:strVal val="visible"/>
+                                      </p:to>
+                                    </p:set>
+                                    <p:animEffect transition="in" filter="fade">
+                                      <p:cBhvr>
+                                        <p:cTn id="7" dur="500"/>
+                                        <p:tgtEl>
+                                          <p:spTgt spid="3"/>
+                                        </p:tgtEl>
+                                      </p:cBhvr>
+                                    </p:animEffect>
+                                  </p:childTnLst>
+                                </p:cTn>
+                              </p:par>
+                            </p:childTnLst>
+                          </p:cTn>
+                        </p:par>
+                      </p:childTnLst>
+                    </p:cTn>
+                  </p:par>
+                  <p:par>
+                    <p:cTn id="8" fill="hold">
+                      <p:stCondLst>
+                        <p:cond delay="indefinite"/>
+                      </p:stCondLst>
+                      <p:childTnLst>
+                        <p:par>
+                          <p:cTn id="9" fill="hold">
+                            <p:stCondLst>
+                              <p:cond delay="0"/>
+                            </p:stCondLst>
+                            <p:childTnLst>
+                              <p:par>
+                                <p:cTn id="10" presetID="2" presetClass="entr" presetSubtype="4" fill="hold" nodeType="clickEffect">
+                                  <p:stCondLst>
+                                    <p:cond delay="0"/>
+                                  </p:stCondLst>
+                                  <p:childTnLst>
+                                    <p:set>
+                                      <p:cBhvr>
+                                        <p:cTn id="11" dur="1" fill="hold">
+                                          <p:stCondLst>
+                                            <p:cond delay="0"/>
+                                          </p:stCondLst>
+                                        </p:cTn>
+                                        <p:tgtEl>
+                                          <p:spTgt spid="4"/>
+                                        </p:tgtEl>
+                                        <p:attrNameLst>
+                                          <p:attrName>style.visibility</p:attrName>
+                                        </p:attrNameLst>
+                                      </p:cBhvr>
+                                      <p:to>
+                                        <p:strVal val="visible"/>
+                                      </p:to>
+                                    </p:set>
+                                    <p:anim calcmode="lin" valueType="num">
+                                      <p:cBhvr additive="base">
+                                        <p:cTn id="12" dur="500" fill="hold"/>
+                                        <p:tgtEl>
+                                          <p:spTgt spid="4"/>
+                                        </p:tgtEl>
+                                        <p:attrNameLst>
+                                          <p:attrName>ppt_x</p:attrName>
+                                        </p:attrNameLst>
+                                      </p:cBhvr>
+                                      <p:tavLst>
+                                        <p:tav tm="0">
+                                          <p:val>
+                                            <p:strVal val="#ppt_x"/>
+                                          </p:val>
+                                        </p:tav>
+                                        <p:tav tm="100000">
+                                          <p:val>
+                                            <p:strVal val="#ppt_x"/>
+                                          </p:val>
+                                        </p:tav>
+                                      </p:tavLst>
+                                    </p:anim>
+                                    <p:anim calcmode="lin" valueType="num">
+                                      <p:cBhvr additive="base">
+                                        <p:cTn id="13" dur="500" fill="hold"/>
+                                        <p:tgtEl>
+                                          <p:spTgt spid="4"/>
+                                        </p:tgtEl>
+                                        <p:attrNameLst>
+                                          <p:attrName>ppt_y</p:attrName>
+                                        </p:attrNameLst>
+                                      </p:cBhvr>
+                                      <p:tavLst>
+                                        <p:tav tm="0">
+                                          <p:val>
+                                            <p:strVal val="1+#ppt_h/2"/>
+                                          </p:val>
+                                        </p:tav>
+                                        <p:tav tm="100000">
+                                          <p:val>
+                                            <p:strVal val="#ppt_y"/>
+                                          </p:val>
+                                        </p:tav>
+                                      </p:tavLst>
+                                    </p:anim>
+                                  </p:childTnLst>
+                                </p:cTn>
+                              </p:par>
+                              <p:par>
+                                <p:cTn id="14" presetID="2" presetClass="entr" presetSubtype="4" fill="hold" grpId="0" nodeType="withEffect">
+                                  <p:stCondLst>
+                                    <p:cond delay="0"/>
+                                  </p:stCondLst>
+                                  <p:childTnLst>
+                                    <p:set>
+                                      <p:cBhvr>
+                                        <p:cTn id="15" dur="1" fill="hold">
+                                          <p:stCondLst>
+                                            <p:cond delay="0"/>
+                                          </p:stCondLst>
+                                        </p:cTn>
+                                        <p:tgtEl>
+                                          <p:spTgt spid="6"/>
+                                        </p:tgtEl>
+                                        <p:attrNameLst>
+                                          <p:attrName>style.visibility</p:attrName>
+                                        </p:attrNameLst>
+                                      </p:cBhvr>
+                                      <p:to>
+                                        <p:strVal val="visible"/>
+                                      </p:to>
+                                    </p:set>
+                                    <p:anim calcmode="lin" valueType="num">
+                                      <p:cBhvr additive="base">
+                                        <p:cTn id="16" dur="500" fill="hold"/>
+                                        <p:tgtEl>
+                                          <p:spTgt spid="6"/>
+                                        </p:tgtEl>
+                                        <p:attrNameLst>
+                                          <p:attrName>ppt_x</p:attrName>
+                                        </p:attrNameLst>
+                                      </p:cBhvr>
+                                      <p:tavLst>
+                                        <p:tav tm="0">
+                                          <p:val>
+                                            <p:strVal val="#ppt_x"/>
+                                          </p:val>
+                                        </p:tav>
+                                        <p:tav tm="100000">
+                                          <p:val>
+                                            <p:strVal val="#ppt_x"/>
+                                          </p:val>
+                                        </p:tav>
+                                      </p:tavLst>
+                                    </p:anim>
+                                    <p:anim calcmode="lin" valueType="num">
+                                      <p:cBhvr additive="base">
+                                        <p:cTn id="17" dur="500" fill="hold"/>
+                                        <p:tgtEl>
+                                          <p:spTgt spid="6"/>
+                                        </p:tgtEl>
+                                        <p:attrNameLst>
+                                          <p:attrName>ppt_y</p:attrName>
+                                        </p:attrNameLst>
+                                      </p:cBhvr>
+                                      <p:tavLst>
+                                        <p:tav tm="0">
+                                          <p:val>
+                                            <p:strVal val="1+#ppt_h/2"/>
+                                          </p:val>
+                                        </p:tav>
+                                        <p:tav tm="100000">
+                                          <p:val>
+                                            <p:strVal val="#ppt_y"/>
+                                          </p:val>
+                                        </p:tav>
+                                      </p:tavLst>
+                                    </p:anim>
+                                  </p:childTnLst>
+                                </p:cTn>
+                              </p:par>
+                            </p:childTnLst>
+                          </p:cTn>
+                        </p:par>
+                      </p:childTnLst>
+                    </p:cTn>
+                  </p:par>
+                  <p:par>
+                    <p:cTn id="18" fill="hold">
+                      <p:stCondLst>
+                        <p:cond delay="indefinite"/>
+                      </p:stCondLst>
+                      <p:childTnLst>
+                        <p:par>
+                          <p:cTn id="19" fill="hold">
+                            <p:stCondLst>
+                              <p:cond delay="0"/>
+                            </p:stCondLst>
+                            <p:childTnLst>
+                              <p:par>
+                                <p:cTn id="20" presetID="2" presetClass="entr" presetSubtype="4" fill="hold" grpId="0" nodeType="clickEffect">
+                                  <p:stCondLst>
+                                    <p:cond delay="0"/>
+                                  </p:stCondLst>
+                                  <p:childTnLst>
+                                    <p:set>
+                                      <p:cBhvr>
+                                        <p:cTn id="21" dur="1" fill="hold">
+                                          <p:stCondLst>
+                                            <p:cond delay="0"/>
+                                          </p:stCondLst>
+                                        </p:cTn>
+                                        <p:tgtEl>
+                                          <p:spTgt spid="7"/>
+                                        </p:tgtEl>
+                                        <p:attrNameLst>
+                                          <p:attrName>style.visibility</p:attrName>
+                                        </p:attrNameLst>
+                                      </p:cBhvr>
+                                      <p:to>
+                                        <p:strVal val="visible"/>
+                                      </p:to>
+                                    </p:set>
+                                    <p:anim calcmode="lin" valueType="num">
+                                      <p:cBhvr additive="base">
+                                        <p:cTn id="22" dur="500" fill="hold"/>
+                                        <p:tgtEl>
+                                          <p:spTgt spid="7"/>
+                                        </p:tgtEl>
+                                        <p:attrNameLst>
+                                          <p:attrName>ppt_x</p:attrName>
+                                        </p:attrNameLst>
+                                      </p:cBhvr>
+                                      <p:tavLst>
+                                        <p:tav tm="0">
+                                          <p:val>
+                                            <p:strVal val="#ppt_x"/>
+                                          </p:val>
+                                        </p:tav>
+                                        <p:tav tm="100000">
+                                          <p:val>
+                                            <p:strVal val="#ppt_x"/>
+                                          </p:val>
+                                        </p:tav>
+                                      </p:tavLst>
+                                    </p:anim>
+                                    <p:anim calcmode="lin" valueType="num">
+                                      <p:cBhvr additive="base">
+                                        <p:cTn id="23" dur="500" fill="hold"/>
+                                        <p:tgtEl>
+                                          <p:spTgt spid="7"/>
+                                        </p:tgtEl>
+                                        <p:attrNameLst>
+                                          <p:attrName>ppt_y</p:attrName>
+                                        </p:attrNameLst>
+                                      </p:cBhvr>
+                                      <p:tavLst>
+                                        <p:tav tm="0">
+                                          <p:val>
+                                            <p:strVal val="1+#ppt_h/2"/>
+                                          </p:val>
+                                        </p:tav>
+                                        <p:tav tm="100000">
+                                          <p:val>
+                                            <p:strVal val="#ppt_y"/>
+                                          </p:val>
+                                        </p:tav>
+                                      </p:tavLst>
+                                    </p:anim>
+                                  </p:childTnLst>
+                                </p:cTn>
+                              </p:par>
+                              <p:par>
+                                <p:cTn id="24" presetID="2" presetClass="entr" presetSubtype="4" fill="hold" nodeType="withEffect">
+                                  <p:stCondLst>
+                                    <p:cond delay="0"/>
+                                  </p:stCondLst>
+                                  <p:childTnLst>
+                                    <p:set>
+                                      <p:cBhvr>
+                                        <p:cTn id="25" dur="1" fill="hold">
+                                          <p:stCondLst>
+                                            <p:cond delay="0"/>
+                                          </p:stCondLst>
+                                        </p:cTn>
+                                        <p:tgtEl>
+                                          <p:spTgt spid="5"/>
+                                        </p:tgtEl>
+                                        <p:attrNameLst>
+                                          <p:attrName>style.visibility</p:attrName>
+                                        </p:attrNameLst>
+                                      </p:cBhvr>
+                                      <p:to>
+                                        <p:strVal val="visible"/>
+                                      </p:to>
+                                    </p:set>
+                                    <p:anim calcmode="lin" valueType="num">
+                                      <p:cBhvr additive="base">
+                                        <p:cTn id="26" dur="500" fill="hold"/>
+                                        <p:tgtEl>
+                                          <p:spTgt spid="5"/>
+                                        </p:tgtEl>
+                                        <p:attrNameLst>
+                                          <p:attrName>ppt_x</p:attrName>
+                                        </p:attrNameLst>
+                                      </p:cBhvr>
+                                      <p:tavLst>
+                                        <p:tav tm="0">
+                                          <p:val>
+                                            <p:strVal val="#ppt_x"/>
+                                          </p:val>
+                                        </p:tav>
+                                        <p:tav tm="100000">
+                                          <p:val>
+                                            <p:strVal val="#ppt_x"/>
+                                          </p:val>
+                                        </p:tav>
+                                      </p:tavLst>
+                                    </p:anim>
+                                    <p:anim calcmode="lin" valueType="num">
+                                      <p:cBhvr additive="base">
+                                        <p:cTn id="27" dur="500" fill="hold"/>
+                                        <p:tgtEl>
+                                          <p:spTgt spid="5"/>
+                                        </p:tgtEl>
+                                        <p:attrNameLst>
+                                          <p:attrName>ppt_y</p:attrName>
+                                        </p:attrNameLst>
+                                      </p:cBhvr>
+                                      <p:tavLst>
+                                        <p:tav tm="0">
+                                          <p:val>
+                                            <p:strVal val="1+#ppt_h/2"/>
+                                          </p:val>
+                                        </p:tav>
+                                        <p:tav tm="100000">
+                                          <p:val>
+                                            <p:strVal val="#ppt_y"/>
+                                          </p:val>
+                                        </p:tav>
+                                      </p:tavLst>
+                                    </p:anim>
+                                  </p:childTnLst>
+                                </p:cTn>
+                              </p:par>
+                            </p:childTnLst>
+                          </p:cTn>
+                        </p:par>
+                      </p:childTnLst>
+                    </p:cTn>
+                  </p:par>
+                </p:childTnLst>
+              </p:cTn>
+              <p:prevCondLst>
+                <p:cond evt="onPrev" delay="0">
+                  <p:tgtEl>
+                    <p:sldTgt/>
+                  </p:tgtEl>
+                </p:cond>
+              </p:prevCondLst>
+              <p:nextCondLst>
+                <p:cond evt="onNext" delay="0">
+                  <p:tgtEl>
+                    <p:sldTgt/>
+                  </p:tgtEl>
+                </p:cond>
+              </p:nextCondLst>
+            </p:seq>
+          </p:childTnLst>
+        </p:cTn>
       </p:par>
     </p:tnLst>
+    <p:bldLst>
+      <p:bldP spid="6" grpId="0"/>
+      <p:bldP spid="7" grpId="0"/>
+    </p:bldLst>
   </p:timing>
 </p:sld>
 </file>
@@ -27763,7 +29072,7 @@
           <p:nvPr>
             <p:extLst>
               <p:ext uri="{D42A27DB-BD31-4B8C-83A1-F6EECF244321}">
-                <p14:modId xmlns:p14="http://schemas.microsoft.com/office/powerpoint/2010/main" xmlns="" val="3745458434"/>
+                <p14:modId xmlns="" xmlns:p14="http://schemas.microsoft.com/office/powerpoint/2010/main" val="3745458434"/>
               </p:ext>
             </p:extLst>
           </p:nvPr>
@@ -27975,7 +29284,7 @@
     </p:spTree>
     <p:extLst>
       <p:ext uri="{BB962C8B-B14F-4D97-AF65-F5344CB8AC3E}">
-        <p14:creationId xmlns:p14="http://schemas.microsoft.com/office/powerpoint/2010/main" xmlns="" val="2476603813"/>
+        <p14:creationId xmlns="" xmlns:p14="http://schemas.microsoft.com/office/powerpoint/2010/main" val="2476603813"/>
       </p:ext>
     </p:extLst>
   </p:cSld>
@@ -28047,10 +29356,274 @@
           </a:p>
         </p:txBody>
       </p:sp>
+      <p:sp>
+        <p:nvSpPr>
+          <p:cNvPr id="3" name="Content Placeholder 3"/>
+          <p:cNvSpPr txBox="1">
+            <a:spLocks/>
+          </p:cNvSpPr>
+          <p:nvPr/>
+        </p:nvSpPr>
+        <p:spPr>
+          <a:xfrm>
+            <a:off x="357158" y="1857364"/>
+            <a:ext cx="8429684" cy="4714908"/>
+          </a:xfrm>
+          <a:prstGeom prst="rect">
+            <a:avLst/>
+          </a:prstGeom>
+        </p:spPr>
+        <p:txBody>
+          <a:bodyPr tIns="0"/>
+          <a:lstStyle>
+            <a:lvl1pPr marL="274320" indent="-274320" algn="l" rtl="0" eaLnBrk="1" latinLnBrk="0" hangingPunct="1">
+              <a:spcBef>
+                <a:spcPct val="20000"/>
+              </a:spcBef>
+              <a:buClrTx/>
+              <a:buSzPct val="95000"/>
+              <a:buFont typeface="Wingdings" pitchFamily="2" charset="2"/>
+              <a:buChar char="v"/>
+              <a:defRPr kumimoji="0" sz="2800" kern="1200">
+                <a:solidFill>
+                  <a:schemeClr val="tx1"/>
+                </a:solidFill>
+                <a:latin typeface="+mn-lt"/>
+                <a:ea typeface="+mn-ea"/>
+                <a:cs typeface="+mn-cs"/>
+              </a:defRPr>
+            </a:lvl1pPr>
+            <a:lvl2pPr marL="640080" indent="-246888" algn="l" rtl="0" eaLnBrk="1" latinLnBrk="0" hangingPunct="1">
+              <a:spcBef>
+                <a:spcPct val="20000"/>
+              </a:spcBef>
+              <a:buClrTx/>
+              <a:buSzPct val="85000"/>
+              <a:buFont typeface="Courier New" pitchFamily="49" charset="0"/>
+              <a:buChar char="o"/>
+              <a:defRPr kumimoji="0" sz="2600" kern="1200">
+                <a:solidFill>
+                  <a:schemeClr val="tx1"/>
+                </a:solidFill>
+                <a:latin typeface="+mn-lt"/>
+                <a:ea typeface="+mn-ea"/>
+                <a:cs typeface="+mn-cs"/>
+              </a:defRPr>
+            </a:lvl2pPr>
+            <a:lvl3pPr marL="914400" indent="-246888" algn="l" rtl="0" eaLnBrk="1" latinLnBrk="0" hangingPunct="1">
+              <a:spcBef>
+                <a:spcPct val="20000"/>
+              </a:spcBef>
+              <a:buClrTx/>
+              <a:buSzPct val="70000"/>
+              <a:buFont typeface="Wingdings 2"/>
+              <a:buChar char=""/>
+              <a:defRPr kumimoji="0" sz="2400" kern="1200">
+                <a:solidFill>
+                  <a:schemeClr val="tx1"/>
+                </a:solidFill>
+                <a:latin typeface="+mn-lt"/>
+                <a:ea typeface="+mn-ea"/>
+                <a:cs typeface="+mn-cs"/>
+              </a:defRPr>
+            </a:lvl3pPr>
+            <a:lvl4pPr marL="1188720" indent="-210312" algn="l" rtl="0" eaLnBrk="1" latinLnBrk="0" hangingPunct="1">
+              <a:spcBef>
+                <a:spcPct val="20000"/>
+              </a:spcBef>
+              <a:buClrTx/>
+              <a:buSzPct val="65000"/>
+              <a:buFont typeface="Wingdings 2"/>
+              <a:buChar char=""/>
+              <a:defRPr kumimoji="0" sz="2000" kern="1200">
+                <a:solidFill>
+                  <a:schemeClr val="tx1"/>
+                </a:solidFill>
+                <a:latin typeface="+mn-lt"/>
+                <a:ea typeface="+mn-ea"/>
+                <a:cs typeface="+mn-cs"/>
+              </a:defRPr>
+            </a:lvl4pPr>
+            <a:lvl5pPr marL="1463040" indent="-210312" algn="l" rtl="0" eaLnBrk="1" latinLnBrk="0" hangingPunct="1">
+              <a:spcBef>
+                <a:spcPct val="20000"/>
+              </a:spcBef>
+              <a:buClrTx/>
+              <a:buSzPct val="65000"/>
+              <a:buFont typeface="Wingdings 2"/>
+              <a:buChar char=""/>
+              <a:defRPr kumimoji="0" sz="1800" kern="1200">
+                <a:solidFill>
+                  <a:schemeClr val="tx1"/>
+                </a:solidFill>
+                <a:latin typeface="+mn-lt"/>
+                <a:ea typeface="+mn-ea"/>
+                <a:cs typeface="+mn-cs"/>
+              </a:defRPr>
+            </a:lvl5pPr>
+            <a:lvl6pPr marL="1737360" indent="-210312" algn="l" rtl="0" eaLnBrk="1" latinLnBrk="0" hangingPunct="1">
+              <a:spcBef>
+                <a:spcPct val="20000"/>
+              </a:spcBef>
+              <a:buClr>
+                <a:schemeClr val="accent5"/>
+              </a:buClr>
+              <a:buSzPct val="80000"/>
+              <a:buFont typeface="Wingdings 2"/>
+              <a:buChar char=""/>
+              <a:defRPr kumimoji="0" sz="1800" kern="1200">
+                <a:solidFill>
+                  <a:schemeClr val="tx1"/>
+                </a:solidFill>
+                <a:latin typeface="+mn-lt"/>
+                <a:ea typeface="+mn-ea"/>
+                <a:cs typeface="+mn-cs"/>
+              </a:defRPr>
+            </a:lvl6pPr>
+            <a:lvl7pPr marL="1920240" indent="-182880" algn="l" rtl="0" eaLnBrk="1" latinLnBrk="0" hangingPunct="1">
+              <a:spcBef>
+                <a:spcPct val="20000"/>
+              </a:spcBef>
+              <a:buClr>
+                <a:schemeClr val="accent6"/>
+              </a:buClr>
+              <a:buSzPct val="80000"/>
+              <a:buFont typeface="Wingdings 2"/>
+              <a:buChar char=""/>
+              <a:defRPr kumimoji="0" sz="1600" kern="1200" baseline="0">
+                <a:solidFill>
+                  <a:schemeClr val="tx1"/>
+                </a:solidFill>
+                <a:latin typeface="+mn-lt"/>
+                <a:ea typeface="+mn-ea"/>
+                <a:cs typeface="+mn-cs"/>
+              </a:defRPr>
+            </a:lvl7pPr>
+            <a:lvl8pPr marL="2194560" indent="-182880" algn="l" rtl="0" eaLnBrk="1" latinLnBrk="0" hangingPunct="1">
+              <a:spcBef>
+                <a:spcPct val="20000"/>
+              </a:spcBef>
+              <a:buClr>
+                <a:schemeClr val="tx2"/>
+              </a:buClr>
+              <a:buChar char="•"/>
+              <a:defRPr kumimoji="0" sz="1600" kern="1200">
+                <a:solidFill>
+                  <a:schemeClr val="tx1"/>
+                </a:solidFill>
+                <a:latin typeface="+mn-lt"/>
+                <a:ea typeface="+mn-ea"/>
+                <a:cs typeface="+mn-cs"/>
+              </a:defRPr>
+            </a:lvl8pPr>
+            <a:lvl9pPr marL="2468880" indent="-182880" algn="l" rtl="0" eaLnBrk="1" latinLnBrk="0" hangingPunct="1">
+              <a:spcBef>
+                <a:spcPct val="20000"/>
+              </a:spcBef>
+              <a:buClr>
+                <a:schemeClr val="tx2"/>
+              </a:buClr>
+              <a:buFontTx/>
+              <a:buChar char="•"/>
+              <a:defRPr kumimoji="0" sz="1400" kern="1200" baseline="0">
+                <a:solidFill>
+                  <a:schemeClr val="tx1"/>
+                </a:solidFill>
+                <a:latin typeface="+mn-lt"/>
+                <a:ea typeface="+mn-ea"/>
+                <a:cs typeface="+mn-cs"/>
+              </a:defRPr>
+            </a:lvl9pPr>
+          </a:lstStyle>
+          <a:p>
+            <a:r>
+              <a:rPr lang="it-IT" b="1" dirty="0" smtClean="0">
+                <a:solidFill>
+                  <a:srgbClr val="FF0000"/>
+                </a:solidFill>
+              </a:rPr>
+              <a:t>Contro: </a:t>
+            </a:r>
+            <a:endParaRPr lang="it-IT" b="1" dirty="0" smtClean="0">
+              <a:solidFill>
+                <a:srgbClr val="FF0000"/>
+              </a:solidFill>
+            </a:endParaRPr>
+          </a:p>
+          <a:p>
+            <a:pPr lvl="1"/>
+            <a:r>
+              <a:rPr lang="it-IT" sz="2200" dirty="0" smtClean="0">
+                <a:latin typeface="Arial" pitchFamily="34" charset="0"/>
+                <a:cs typeface="Arial" pitchFamily="34" charset="0"/>
+              </a:rPr>
+              <a:t>Necessario tempo per :</a:t>
+            </a:r>
+          </a:p>
+          <a:p>
+            <a:pPr lvl="2"/>
+            <a:r>
+              <a:rPr lang="it-IT" sz="1800" dirty="0" smtClean="0">
+                <a:latin typeface="Arial" pitchFamily="34" charset="0"/>
+                <a:cs typeface="Arial" pitchFamily="34" charset="0"/>
+              </a:rPr>
+              <a:t>Apprendere JUnit</a:t>
+            </a:r>
+          </a:p>
+          <a:p>
+            <a:pPr lvl="2"/>
+            <a:r>
+              <a:rPr lang="it-IT" sz="1800" dirty="0" smtClean="0">
+                <a:latin typeface="Arial" pitchFamily="34" charset="0"/>
+                <a:cs typeface="Arial" pitchFamily="34" charset="0"/>
+              </a:rPr>
+              <a:t>Realizzazione Test Case</a:t>
+            </a:r>
+          </a:p>
+          <a:p>
+            <a:pPr lvl="1"/>
+            <a:r>
+              <a:rPr lang="it-IT" sz="2000" dirty="0" smtClean="0">
+                <a:latin typeface="Arial" pitchFamily="34" charset="0"/>
+                <a:cs typeface="Arial" pitchFamily="34" charset="0"/>
+              </a:rPr>
+              <a:t>Poco tempo a disposizione</a:t>
+            </a:r>
+            <a:endParaRPr lang="it-IT" sz="2000" dirty="0" smtClean="0">
+              <a:latin typeface="Arial" pitchFamily="34" charset="0"/>
+              <a:cs typeface="Arial" pitchFamily="34" charset="0"/>
+            </a:endParaRPr>
+          </a:p>
+          <a:p>
+            <a:pPr lvl="1">
+              <a:buNone/>
+            </a:pPr>
+            <a:endParaRPr lang="it-IT" dirty="0" smtClean="0"/>
+          </a:p>
+          <a:p>
+            <a:r>
+              <a:rPr lang="it-IT" b="1" dirty="0" smtClean="0">
+                <a:solidFill>
+                  <a:srgbClr val="00B050"/>
+                </a:solidFill>
+              </a:rPr>
+              <a:t>Pro:</a:t>
+            </a:r>
+          </a:p>
+          <a:p>
+            <a:pPr lvl="1"/>
+            <a:r>
+              <a:rPr lang="it-IT" dirty="0" smtClean="0"/>
+              <a:t>Revisione mirata del sottosistema Questionari</a:t>
+            </a:r>
+            <a:endParaRPr lang="it-IT" dirty="0" smtClean="0"/>
+          </a:p>
+        </p:txBody>
+      </p:sp>
     </p:spTree>
     <p:extLst>
       <p:ext uri="{BB962C8B-B14F-4D97-AF65-F5344CB8AC3E}">
-        <p14:creationId xmlns:p14="http://schemas.microsoft.com/office/powerpoint/2010/main" xmlns="" val="3060381138"/>
+        <p14:creationId xmlns="" xmlns:p14="http://schemas.microsoft.com/office/powerpoint/2010/main" val="3060381138"/>
       </p:ext>
     </p:extLst>
   </p:cSld>
@@ -28060,9 +29633,666 @@
   <p:timing>
     <p:tnLst>
       <p:par>
-        <p:cTn id="1" dur="indefinite" restart="never" nodeType="tmRoot"/>
+        <p:cTn id="1" dur="indefinite" restart="never" nodeType="tmRoot">
+          <p:childTnLst>
+            <p:seq concurrent="1" nextAc="seek">
+              <p:cTn id="2" dur="indefinite" nodeType="mainSeq">
+                <p:childTnLst>
+                  <p:par>
+                    <p:cTn id="3" fill="hold">
+                      <p:stCondLst>
+                        <p:cond delay="indefinite"/>
+                      </p:stCondLst>
+                      <p:childTnLst>
+                        <p:par>
+                          <p:cTn id="4" fill="hold">
+                            <p:stCondLst>
+                              <p:cond delay="0"/>
+                            </p:stCondLst>
+                            <p:childTnLst>
+                              <p:par>
+                                <p:cTn id="5" presetID="2" presetClass="entr" presetSubtype="4" fill="hold" grpId="0" nodeType="clickEffect">
+                                  <p:stCondLst>
+                                    <p:cond delay="0"/>
+                                  </p:stCondLst>
+                                  <p:childTnLst>
+                                    <p:set>
+                                      <p:cBhvr>
+                                        <p:cTn id="6" dur="1" fill="hold">
+                                          <p:stCondLst>
+                                            <p:cond delay="0"/>
+                                          </p:stCondLst>
+                                        </p:cTn>
+                                        <p:tgtEl>
+                                          <p:spTgt spid="3">
+                                            <p:txEl>
+                                              <p:pRg st="0" end="0"/>
+                                            </p:txEl>
+                                          </p:spTgt>
+                                        </p:tgtEl>
+                                        <p:attrNameLst>
+                                          <p:attrName>style.visibility</p:attrName>
+                                        </p:attrNameLst>
+                                      </p:cBhvr>
+                                      <p:to>
+                                        <p:strVal val="visible"/>
+                                      </p:to>
+                                    </p:set>
+                                    <p:anim calcmode="lin" valueType="num">
+                                      <p:cBhvr additive="base">
+                                        <p:cTn id="7" dur="500" fill="hold"/>
+                                        <p:tgtEl>
+                                          <p:spTgt spid="3">
+                                            <p:txEl>
+                                              <p:pRg st="0" end="0"/>
+                                            </p:txEl>
+                                          </p:spTgt>
+                                        </p:tgtEl>
+                                        <p:attrNameLst>
+                                          <p:attrName>ppt_x</p:attrName>
+                                        </p:attrNameLst>
+                                      </p:cBhvr>
+                                      <p:tavLst>
+                                        <p:tav tm="0">
+                                          <p:val>
+                                            <p:strVal val="#ppt_x"/>
+                                          </p:val>
+                                        </p:tav>
+                                        <p:tav tm="100000">
+                                          <p:val>
+                                            <p:strVal val="#ppt_x"/>
+                                          </p:val>
+                                        </p:tav>
+                                      </p:tavLst>
+                                    </p:anim>
+                                    <p:anim calcmode="lin" valueType="num">
+                                      <p:cBhvr additive="base">
+                                        <p:cTn id="8" dur="500" fill="hold"/>
+                                        <p:tgtEl>
+                                          <p:spTgt spid="3">
+                                            <p:txEl>
+                                              <p:pRg st="0" end="0"/>
+                                            </p:txEl>
+                                          </p:spTgt>
+                                        </p:tgtEl>
+                                        <p:attrNameLst>
+                                          <p:attrName>ppt_y</p:attrName>
+                                        </p:attrNameLst>
+                                      </p:cBhvr>
+                                      <p:tavLst>
+                                        <p:tav tm="0">
+                                          <p:val>
+                                            <p:strVal val="1+#ppt_h/2"/>
+                                          </p:val>
+                                        </p:tav>
+                                        <p:tav tm="100000">
+                                          <p:val>
+                                            <p:strVal val="#ppt_y"/>
+                                          </p:val>
+                                        </p:tav>
+                                      </p:tavLst>
+                                    </p:anim>
+                                  </p:childTnLst>
+                                </p:cTn>
+                              </p:par>
+                              <p:par>
+                                <p:cTn id="9" presetID="2" presetClass="entr" presetSubtype="4" fill="hold" grpId="0" nodeType="withEffect">
+                                  <p:stCondLst>
+                                    <p:cond delay="0"/>
+                                  </p:stCondLst>
+                                  <p:childTnLst>
+                                    <p:set>
+                                      <p:cBhvr>
+                                        <p:cTn id="10" dur="1" fill="hold">
+                                          <p:stCondLst>
+                                            <p:cond delay="0"/>
+                                          </p:stCondLst>
+                                        </p:cTn>
+                                        <p:tgtEl>
+                                          <p:spTgt spid="3">
+                                            <p:txEl>
+                                              <p:pRg st="1" end="1"/>
+                                            </p:txEl>
+                                          </p:spTgt>
+                                        </p:tgtEl>
+                                        <p:attrNameLst>
+                                          <p:attrName>style.visibility</p:attrName>
+                                        </p:attrNameLst>
+                                      </p:cBhvr>
+                                      <p:to>
+                                        <p:strVal val="visible"/>
+                                      </p:to>
+                                    </p:set>
+                                    <p:anim calcmode="lin" valueType="num">
+                                      <p:cBhvr additive="base">
+                                        <p:cTn id="11" dur="500" fill="hold"/>
+                                        <p:tgtEl>
+                                          <p:spTgt spid="3">
+                                            <p:txEl>
+                                              <p:pRg st="1" end="1"/>
+                                            </p:txEl>
+                                          </p:spTgt>
+                                        </p:tgtEl>
+                                        <p:attrNameLst>
+                                          <p:attrName>ppt_x</p:attrName>
+                                        </p:attrNameLst>
+                                      </p:cBhvr>
+                                      <p:tavLst>
+                                        <p:tav tm="0">
+                                          <p:val>
+                                            <p:strVal val="#ppt_x"/>
+                                          </p:val>
+                                        </p:tav>
+                                        <p:tav tm="100000">
+                                          <p:val>
+                                            <p:strVal val="#ppt_x"/>
+                                          </p:val>
+                                        </p:tav>
+                                      </p:tavLst>
+                                    </p:anim>
+                                    <p:anim calcmode="lin" valueType="num">
+                                      <p:cBhvr additive="base">
+                                        <p:cTn id="12" dur="500" fill="hold"/>
+                                        <p:tgtEl>
+                                          <p:spTgt spid="3">
+                                            <p:txEl>
+                                              <p:pRg st="1" end="1"/>
+                                            </p:txEl>
+                                          </p:spTgt>
+                                        </p:tgtEl>
+                                        <p:attrNameLst>
+                                          <p:attrName>ppt_y</p:attrName>
+                                        </p:attrNameLst>
+                                      </p:cBhvr>
+                                      <p:tavLst>
+                                        <p:tav tm="0">
+                                          <p:val>
+                                            <p:strVal val="1+#ppt_h/2"/>
+                                          </p:val>
+                                        </p:tav>
+                                        <p:tav tm="100000">
+                                          <p:val>
+                                            <p:strVal val="#ppt_y"/>
+                                          </p:val>
+                                        </p:tav>
+                                      </p:tavLst>
+                                    </p:anim>
+                                  </p:childTnLst>
+                                </p:cTn>
+                              </p:par>
+                              <p:par>
+                                <p:cTn id="13" presetID="2" presetClass="entr" presetSubtype="4" fill="hold" grpId="0" nodeType="withEffect">
+                                  <p:stCondLst>
+                                    <p:cond delay="0"/>
+                                  </p:stCondLst>
+                                  <p:childTnLst>
+                                    <p:set>
+                                      <p:cBhvr>
+                                        <p:cTn id="14" dur="1" fill="hold">
+                                          <p:stCondLst>
+                                            <p:cond delay="0"/>
+                                          </p:stCondLst>
+                                        </p:cTn>
+                                        <p:tgtEl>
+                                          <p:spTgt spid="3">
+                                            <p:txEl>
+                                              <p:pRg st="2" end="2"/>
+                                            </p:txEl>
+                                          </p:spTgt>
+                                        </p:tgtEl>
+                                        <p:attrNameLst>
+                                          <p:attrName>style.visibility</p:attrName>
+                                        </p:attrNameLst>
+                                      </p:cBhvr>
+                                      <p:to>
+                                        <p:strVal val="visible"/>
+                                      </p:to>
+                                    </p:set>
+                                    <p:anim calcmode="lin" valueType="num">
+                                      <p:cBhvr additive="base">
+                                        <p:cTn id="15" dur="500" fill="hold"/>
+                                        <p:tgtEl>
+                                          <p:spTgt spid="3">
+                                            <p:txEl>
+                                              <p:pRg st="2" end="2"/>
+                                            </p:txEl>
+                                          </p:spTgt>
+                                        </p:tgtEl>
+                                        <p:attrNameLst>
+                                          <p:attrName>ppt_x</p:attrName>
+                                        </p:attrNameLst>
+                                      </p:cBhvr>
+                                      <p:tavLst>
+                                        <p:tav tm="0">
+                                          <p:val>
+                                            <p:strVal val="#ppt_x"/>
+                                          </p:val>
+                                        </p:tav>
+                                        <p:tav tm="100000">
+                                          <p:val>
+                                            <p:strVal val="#ppt_x"/>
+                                          </p:val>
+                                        </p:tav>
+                                      </p:tavLst>
+                                    </p:anim>
+                                    <p:anim calcmode="lin" valueType="num">
+                                      <p:cBhvr additive="base">
+                                        <p:cTn id="16" dur="500" fill="hold"/>
+                                        <p:tgtEl>
+                                          <p:spTgt spid="3">
+                                            <p:txEl>
+                                              <p:pRg st="2" end="2"/>
+                                            </p:txEl>
+                                          </p:spTgt>
+                                        </p:tgtEl>
+                                        <p:attrNameLst>
+                                          <p:attrName>ppt_y</p:attrName>
+                                        </p:attrNameLst>
+                                      </p:cBhvr>
+                                      <p:tavLst>
+                                        <p:tav tm="0">
+                                          <p:val>
+                                            <p:strVal val="1+#ppt_h/2"/>
+                                          </p:val>
+                                        </p:tav>
+                                        <p:tav tm="100000">
+                                          <p:val>
+                                            <p:strVal val="#ppt_y"/>
+                                          </p:val>
+                                        </p:tav>
+                                      </p:tavLst>
+                                    </p:anim>
+                                  </p:childTnLst>
+                                </p:cTn>
+                              </p:par>
+                              <p:par>
+                                <p:cTn id="17" presetID="2" presetClass="entr" presetSubtype="4" fill="hold" grpId="0" nodeType="withEffect">
+                                  <p:stCondLst>
+                                    <p:cond delay="0"/>
+                                  </p:stCondLst>
+                                  <p:childTnLst>
+                                    <p:set>
+                                      <p:cBhvr>
+                                        <p:cTn id="18" dur="1" fill="hold">
+                                          <p:stCondLst>
+                                            <p:cond delay="0"/>
+                                          </p:stCondLst>
+                                        </p:cTn>
+                                        <p:tgtEl>
+                                          <p:spTgt spid="3">
+                                            <p:txEl>
+                                              <p:pRg st="3" end="3"/>
+                                            </p:txEl>
+                                          </p:spTgt>
+                                        </p:tgtEl>
+                                        <p:attrNameLst>
+                                          <p:attrName>style.visibility</p:attrName>
+                                        </p:attrNameLst>
+                                      </p:cBhvr>
+                                      <p:to>
+                                        <p:strVal val="visible"/>
+                                      </p:to>
+                                    </p:set>
+                                    <p:anim calcmode="lin" valueType="num">
+                                      <p:cBhvr additive="base">
+                                        <p:cTn id="19" dur="500" fill="hold"/>
+                                        <p:tgtEl>
+                                          <p:spTgt spid="3">
+                                            <p:txEl>
+                                              <p:pRg st="3" end="3"/>
+                                            </p:txEl>
+                                          </p:spTgt>
+                                        </p:tgtEl>
+                                        <p:attrNameLst>
+                                          <p:attrName>ppt_x</p:attrName>
+                                        </p:attrNameLst>
+                                      </p:cBhvr>
+                                      <p:tavLst>
+                                        <p:tav tm="0">
+                                          <p:val>
+                                            <p:strVal val="#ppt_x"/>
+                                          </p:val>
+                                        </p:tav>
+                                        <p:tav tm="100000">
+                                          <p:val>
+                                            <p:strVal val="#ppt_x"/>
+                                          </p:val>
+                                        </p:tav>
+                                      </p:tavLst>
+                                    </p:anim>
+                                    <p:anim calcmode="lin" valueType="num">
+                                      <p:cBhvr additive="base">
+                                        <p:cTn id="20" dur="500" fill="hold"/>
+                                        <p:tgtEl>
+                                          <p:spTgt spid="3">
+                                            <p:txEl>
+                                              <p:pRg st="3" end="3"/>
+                                            </p:txEl>
+                                          </p:spTgt>
+                                        </p:tgtEl>
+                                        <p:attrNameLst>
+                                          <p:attrName>ppt_y</p:attrName>
+                                        </p:attrNameLst>
+                                      </p:cBhvr>
+                                      <p:tavLst>
+                                        <p:tav tm="0">
+                                          <p:val>
+                                            <p:strVal val="1+#ppt_h/2"/>
+                                          </p:val>
+                                        </p:tav>
+                                        <p:tav tm="100000">
+                                          <p:val>
+                                            <p:strVal val="#ppt_y"/>
+                                          </p:val>
+                                        </p:tav>
+                                      </p:tavLst>
+                                    </p:anim>
+                                  </p:childTnLst>
+                                </p:cTn>
+                              </p:par>
+                              <p:par>
+                                <p:cTn id="21" presetID="2" presetClass="entr" presetSubtype="4" fill="hold" grpId="0" nodeType="withEffect">
+                                  <p:stCondLst>
+                                    <p:cond delay="0"/>
+                                  </p:stCondLst>
+                                  <p:childTnLst>
+                                    <p:set>
+                                      <p:cBhvr>
+                                        <p:cTn id="22" dur="1" fill="hold">
+                                          <p:stCondLst>
+                                            <p:cond delay="0"/>
+                                          </p:stCondLst>
+                                        </p:cTn>
+                                        <p:tgtEl>
+                                          <p:spTgt spid="3">
+                                            <p:txEl>
+                                              <p:pRg st="4" end="4"/>
+                                            </p:txEl>
+                                          </p:spTgt>
+                                        </p:tgtEl>
+                                        <p:attrNameLst>
+                                          <p:attrName>style.visibility</p:attrName>
+                                        </p:attrNameLst>
+                                      </p:cBhvr>
+                                      <p:to>
+                                        <p:strVal val="visible"/>
+                                      </p:to>
+                                    </p:set>
+                                    <p:anim calcmode="lin" valueType="num">
+                                      <p:cBhvr additive="base">
+                                        <p:cTn id="23" dur="500" fill="hold"/>
+                                        <p:tgtEl>
+                                          <p:spTgt spid="3">
+                                            <p:txEl>
+                                              <p:pRg st="4" end="4"/>
+                                            </p:txEl>
+                                          </p:spTgt>
+                                        </p:tgtEl>
+                                        <p:attrNameLst>
+                                          <p:attrName>ppt_x</p:attrName>
+                                        </p:attrNameLst>
+                                      </p:cBhvr>
+                                      <p:tavLst>
+                                        <p:tav tm="0">
+                                          <p:val>
+                                            <p:strVal val="#ppt_x"/>
+                                          </p:val>
+                                        </p:tav>
+                                        <p:tav tm="100000">
+                                          <p:val>
+                                            <p:strVal val="#ppt_x"/>
+                                          </p:val>
+                                        </p:tav>
+                                      </p:tavLst>
+                                    </p:anim>
+                                    <p:anim calcmode="lin" valueType="num">
+                                      <p:cBhvr additive="base">
+                                        <p:cTn id="24" dur="500" fill="hold"/>
+                                        <p:tgtEl>
+                                          <p:spTgt spid="3">
+                                            <p:txEl>
+                                              <p:pRg st="4" end="4"/>
+                                            </p:txEl>
+                                          </p:spTgt>
+                                        </p:tgtEl>
+                                        <p:attrNameLst>
+                                          <p:attrName>ppt_y</p:attrName>
+                                        </p:attrNameLst>
+                                      </p:cBhvr>
+                                      <p:tavLst>
+                                        <p:tav tm="0">
+                                          <p:val>
+                                            <p:strVal val="1+#ppt_h/2"/>
+                                          </p:val>
+                                        </p:tav>
+                                        <p:tav tm="100000">
+                                          <p:val>
+                                            <p:strVal val="#ppt_y"/>
+                                          </p:val>
+                                        </p:tav>
+                                      </p:tavLst>
+                                    </p:anim>
+                                  </p:childTnLst>
+                                </p:cTn>
+                              </p:par>
+                            </p:childTnLst>
+                          </p:cTn>
+                        </p:par>
+                      </p:childTnLst>
+                    </p:cTn>
+                  </p:par>
+                  <p:par>
+                    <p:cTn id="25" fill="hold">
+                      <p:stCondLst>
+                        <p:cond delay="indefinite"/>
+                      </p:stCondLst>
+                      <p:childTnLst>
+                        <p:par>
+                          <p:cTn id="26" fill="hold">
+                            <p:stCondLst>
+                              <p:cond delay="0"/>
+                            </p:stCondLst>
+                            <p:childTnLst>
+                              <p:par>
+                                <p:cTn id="27" presetID="2" presetClass="entr" presetSubtype="4" fill="hold" grpId="0" nodeType="clickEffect">
+                                  <p:stCondLst>
+                                    <p:cond delay="0"/>
+                                  </p:stCondLst>
+                                  <p:childTnLst>
+                                    <p:set>
+                                      <p:cBhvr>
+                                        <p:cTn id="28" dur="1" fill="hold">
+                                          <p:stCondLst>
+                                            <p:cond delay="0"/>
+                                          </p:stCondLst>
+                                        </p:cTn>
+                                        <p:tgtEl>
+                                          <p:spTgt spid="3">
+                                            <p:txEl>
+                                              <p:pRg st="6" end="6"/>
+                                            </p:txEl>
+                                          </p:spTgt>
+                                        </p:tgtEl>
+                                        <p:attrNameLst>
+                                          <p:attrName>style.visibility</p:attrName>
+                                        </p:attrNameLst>
+                                      </p:cBhvr>
+                                      <p:to>
+                                        <p:strVal val="visible"/>
+                                      </p:to>
+                                    </p:set>
+                                    <p:anim calcmode="lin" valueType="num">
+                                      <p:cBhvr additive="base">
+                                        <p:cTn id="29" dur="500" fill="hold"/>
+                                        <p:tgtEl>
+                                          <p:spTgt spid="3">
+                                            <p:txEl>
+                                              <p:pRg st="6" end="6"/>
+                                            </p:txEl>
+                                          </p:spTgt>
+                                        </p:tgtEl>
+                                        <p:attrNameLst>
+                                          <p:attrName>ppt_x</p:attrName>
+                                        </p:attrNameLst>
+                                      </p:cBhvr>
+                                      <p:tavLst>
+                                        <p:tav tm="0">
+                                          <p:val>
+                                            <p:strVal val="#ppt_x"/>
+                                          </p:val>
+                                        </p:tav>
+                                        <p:tav tm="100000">
+                                          <p:val>
+                                            <p:strVal val="#ppt_x"/>
+                                          </p:val>
+                                        </p:tav>
+                                      </p:tavLst>
+                                    </p:anim>
+                                    <p:anim calcmode="lin" valueType="num">
+                                      <p:cBhvr additive="base">
+                                        <p:cTn id="30" dur="500" fill="hold"/>
+                                        <p:tgtEl>
+                                          <p:spTgt spid="3">
+                                            <p:txEl>
+                                              <p:pRg st="6" end="6"/>
+                                            </p:txEl>
+                                          </p:spTgt>
+                                        </p:tgtEl>
+                                        <p:attrNameLst>
+                                          <p:attrName>ppt_y</p:attrName>
+                                        </p:attrNameLst>
+                                      </p:cBhvr>
+                                      <p:tavLst>
+                                        <p:tav tm="0">
+                                          <p:val>
+                                            <p:strVal val="1+#ppt_h/2"/>
+                                          </p:val>
+                                        </p:tav>
+                                        <p:tav tm="100000">
+                                          <p:val>
+                                            <p:strVal val="#ppt_y"/>
+                                          </p:val>
+                                        </p:tav>
+                                      </p:tavLst>
+                                    </p:anim>
+                                  </p:childTnLst>
+                                </p:cTn>
+                              </p:par>
+                              <p:par>
+                                <p:cTn id="31" presetID="2" presetClass="entr" presetSubtype="4" fill="hold" grpId="0" nodeType="withEffect">
+                                  <p:stCondLst>
+                                    <p:cond delay="0"/>
+                                  </p:stCondLst>
+                                  <p:childTnLst>
+                                    <p:set>
+                                      <p:cBhvr>
+                                        <p:cTn id="32" dur="1" fill="hold">
+                                          <p:stCondLst>
+                                            <p:cond delay="0"/>
+                                          </p:stCondLst>
+                                        </p:cTn>
+                                        <p:tgtEl>
+                                          <p:spTgt spid="3">
+                                            <p:txEl>
+                                              <p:pRg st="7" end="7"/>
+                                            </p:txEl>
+                                          </p:spTgt>
+                                        </p:tgtEl>
+                                        <p:attrNameLst>
+                                          <p:attrName>style.visibility</p:attrName>
+                                        </p:attrNameLst>
+                                      </p:cBhvr>
+                                      <p:to>
+                                        <p:strVal val="visible"/>
+                                      </p:to>
+                                    </p:set>
+                                    <p:anim calcmode="lin" valueType="num">
+                                      <p:cBhvr additive="base">
+                                        <p:cTn id="33" dur="500" fill="hold"/>
+                                        <p:tgtEl>
+                                          <p:spTgt spid="3">
+                                            <p:txEl>
+                                              <p:pRg st="7" end="7"/>
+                                            </p:txEl>
+                                          </p:spTgt>
+                                        </p:tgtEl>
+                                        <p:attrNameLst>
+                                          <p:attrName>ppt_x</p:attrName>
+                                        </p:attrNameLst>
+                                      </p:cBhvr>
+                                      <p:tavLst>
+                                        <p:tav tm="0">
+                                          <p:val>
+                                            <p:strVal val="#ppt_x"/>
+                                          </p:val>
+                                        </p:tav>
+                                        <p:tav tm="100000">
+                                          <p:val>
+                                            <p:strVal val="#ppt_x"/>
+                                          </p:val>
+                                        </p:tav>
+                                      </p:tavLst>
+                                    </p:anim>
+                                    <p:anim calcmode="lin" valueType="num">
+                                      <p:cBhvr additive="base">
+                                        <p:cTn id="34" dur="500" fill="hold"/>
+                                        <p:tgtEl>
+                                          <p:spTgt spid="3">
+                                            <p:txEl>
+                                              <p:pRg st="7" end="7"/>
+                                            </p:txEl>
+                                          </p:spTgt>
+                                        </p:tgtEl>
+                                        <p:attrNameLst>
+                                          <p:attrName>ppt_y</p:attrName>
+                                        </p:attrNameLst>
+                                      </p:cBhvr>
+                                      <p:tavLst>
+                                        <p:tav tm="0">
+                                          <p:val>
+                                            <p:strVal val="1+#ppt_h/2"/>
+                                          </p:val>
+                                        </p:tav>
+                                        <p:tav tm="100000">
+                                          <p:val>
+                                            <p:strVal val="#ppt_y"/>
+                                          </p:val>
+                                        </p:tav>
+                                      </p:tavLst>
+                                    </p:anim>
+                                  </p:childTnLst>
+                                </p:cTn>
+                              </p:par>
+                            </p:childTnLst>
+                          </p:cTn>
+                        </p:par>
+                      </p:childTnLst>
+                    </p:cTn>
+                  </p:par>
+                </p:childTnLst>
+              </p:cTn>
+              <p:prevCondLst>
+                <p:cond evt="onPrev" delay="0">
+                  <p:tgtEl>
+                    <p:sldTgt/>
+                  </p:tgtEl>
+                </p:cond>
+              </p:prevCondLst>
+              <p:nextCondLst>
+                <p:cond evt="onNext" delay="0">
+                  <p:tgtEl>
+                    <p:sldTgt/>
+                  </p:tgtEl>
+                </p:cond>
+              </p:nextCondLst>
+            </p:seq>
+          </p:childTnLst>
+        </p:cTn>
       </p:par>
     </p:tnLst>
+    <p:bldLst>
+      <p:bldP spid="3" grpId="0" build="p"/>
+    </p:bldLst>
   </p:timing>
 </p:sld>
 </file>
@@ -28320,8 +30550,8 @@
         </p:nvSpPr>
         <p:spPr>
           <a:xfrm>
-            <a:off x="214282" y="1928802"/>
-            <a:ext cx="5715040" cy="492443"/>
+            <a:off x="714348" y="1928802"/>
+            <a:ext cx="5715040" cy="2400657"/>
           </a:xfrm>
           <a:prstGeom prst="rect">
             <a:avLst/>
@@ -28334,11 +30564,18 @@
           </a:bodyPr>
           <a:lstStyle/>
           <a:p>
-            <a:r>
-              <a:rPr lang="it-IT" sz="2600" b="1" dirty="0" smtClean="0"/>
-              <a:t>Cosa è andato per il verso giusto </a:t>
-            </a:r>
-            <a:endParaRPr lang="it-IT" sz="2600" b="1" dirty="0"/>
+            <a:endParaRPr lang="it-IT" sz="5000" i="1" dirty="0" smtClean="0"/>
+          </a:p>
+          <a:p>
+            <a:r>
+              <a:rPr lang="it-IT" sz="5000" i="1" dirty="0" smtClean="0"/>
+              <a:t>Cosa </a:t>
+            </a:r>
+            <a:r>
+              <a:rPr lang="it-IT" sz="5000" i="1" dirty="0" smtClean="0"/>
+              <a:t>è andato per il verso giusto </a:t>
+            </a:r>
+            <a:endParaRPr lang="it-IT" sz="5000" i="1" dirty="0"/>
           </a:p>
         </p:txBody>
       </p:sp>
@@ -28359,8 +30596,8 @@
         </p:blipFill>
         <p:spPr bwMode="auto">
           <a:xfrm>
-            <a:off x="6234956" y="1349675"/>
-            <a:ext cx="2143140" cy="2143140"/>
+            <a:off x="5929322" y="3143248"/>
+            <a:ext cx="2500330" cy="2500330"/>
           </a:xfrm>
           <a:prstGeom prst="rect">
             <a:avLst/>
@@ -28575,7 +30812,7 @@
           <a:blip r:embed="rId3">
             <a:extLst>
               <a:ext uri="{28A0092B-C50C-407E-A947-70E740481C1C}">
-                <a14:useLocalDpi xmlns:a14="http://schemas.microsoft.com/office/drawing/2010/main" xmlns="" val="0"/>
+                <a14:useLocalDpi xmlns="" xmlns:a14="http://schemas.microsoft.com/office/drawing/2010/main" val="0"/>
               </a:ext>
             </a:extLst>
           </a:blip>
@@ -28595,7 +30832,7 @@
           <a:noFill/>
           <a:extLst>
             <a:ext uri="{909E8E84-426E-40DD-AFC4-6F175D3DCCD1}">
-              <a14:hiddenFill xmlns:a14="http://schemas.microsoft.com/office/drawing/2010/main" xmlns="">
+              <a14:hiddenFill xmlns="" xmlns:a14="http://schemas.microsoft.com/office/drawing/2010/main">
                 <a:solidFill>
                   <a:srgbClr val="FFFFFF"/>
                 </a:solidFill>
@@ -28745,7 +30982,7 @@
     </p:spTree>
     <p:extLst>
       <p:ext uri="{BB962C8B-B14F-4D97-AF65-F5344CB8AC3E}">
-        <p14:creationId xmlns:p14="http://schemas.microsoft.com/office/powerpoint/2010/main" xmlns="" val="1739081068"/>
+        <p14:creationId xmlns="" xmlns:p14="http://schemas.microsoft.com/office/powerpoint/2010/main" val="1739081068"/>
       </p:ext>
     </p:extLst>
   </p:cSld>
@@ -29158,36 +31395,6 @@
           </a:p>
         </p:txBody>
       </p:sp>
-      <p:sp>
-        <p:nvSpPr>
-          <p:cNvPr id="4" name="TextBox 3"/>
-          <p:cNvSpPr txBox="1"/>
-          <p:nvPr/>
-        </p:nvSpPr>
-        <p:spPr>
-          <a:xfrm>
-            <a:off x="214282" y="1928802"/>
-            <a:ext cx="5715040" cy="492443"/>
-          </a:xfrm>
-          <a:prstGeom prst="rect">
-            <a:avLst/>
-          </a:prstGeom>
-          <a:noFill/>
-        </p:spPr>
-        <p:txBody>
-          <a:bodyPr wrap="square" rtlCol="0">
-            <a:spAutoFit/>
-          </a:bodyPr>
-          <a:lstStyle/>
-          <a:p>
-            <a:r>
-              <a:rPr lang="it-IT" sz="2600" b="1" dirty="0" smtClean="0"/>
-              <a:t>Cosa è andato per il verso sbagliato </a:t>
-            </a:r>
-            <a:endParaRPr lang="it-IT" sz="2600" b="1" dirty="0"/>
-          </a:p>
-        </p:txBody>
-      </p:sp>
       <p:pic>
         <p:nvPicPr>
           <p:cNvPr id="10242" name="Picture 2" descr="D:\Tony\Omini\omini_doctor.jpg"/>
@@ -29205,8 +31412,8 @@
         </p:blipFill>
         <p:spPr bwMode="auto">
           <a:xfrm>
-            <a:off x="5715008" y="1390033"/>
-            <a:ext cx="2643206" cy="1652003"/>
+            <a:off x="5572132" y="3500438"/>
+            <a:ext cx="2971822" cy="1857388"/>
           </a:xfrm>
           <a:prstGeom prst="rect">
             <a:avLst/>
@@ -29219,6 +31426,47 @@
           </a:effectLst>
         </p:spPr>
       </p:pic>
+      <p:sp>
+        <p:nvSpPr>
+          <p:cNvPr id="6" name="TextBox 5"/>
+          <p:cNvSpPr txBox="1"/>
+          <p:nvPr/>
+        </p:nvSpPr>
+        <p:spPr>
+          <a:xfrm>
+            <a:off x="714348" y="1928802"/>
+            <a:ext cx="5715040" cy="2400657"/>
+          </a:xfrm>
+          <a:prstGeom prst="rect">
+            <a:avLst/>
+          </a:prstGeom>
+          <a:noFill/>
+        </p:spPr>
+        <p:txBody>
+          <a:bodyPr wrap="square" rtlCol="0">
+            <a:spAutoFit/>
+          </a:bodyPr>
+          <a:lstStyle/>
+          <a:p>
+            <a:endParaRPr lang="it-IT" sz="5000" i="1" dirty="0" smtClean="0"/>
+          </a:p>
+          <a:p>
+            <a:r>
+              <a:rPr lang="it-IT" sz="5000" i="1" dirty="0" smtClean="0"/>
+              <a:t>Cosa </a:t>
+            </a:r>
+            <a:r>
+              <a:rPr lang="it-IT" sz="5000" i="1" dirty="0" smtClean="0"/>
+              <a:t>è andato per il verso </a:t>
+            </a:r>
+            <a:r>
+              <a:rPr lang="it-IT" sz="5000" i="1" dirty="0" smtClean="0"/>
+              <a:t>sbagliato</a:t>
+            </a:r>
+            <a:endParaRPr lang="it-IT" sz="5000" i="1" dirty="0"/>
+          </a:p>
+        </p:txBody>
+      </p:sp>
     </p:spTree>
   </p:cSld>
   <p:clrMapOvr>
@@ -29317,21 +31565,39 @@
                                   </p:childTnLst>
                                 </p:cTn>
                               </p:par>
+                            </p:childTnLst>
+                          </p:cTn>
+                        </p:par>
+                      </p:childTnLst>
+                    </p:cTn>
+                  </p:par>
+                  <p:par>
+                    <p:cTn id="9" fill="hold">
+                      <p:stCondLst>
+                        <p:cond delay="indefinite"/>
+                      </p:stCondLst>
+                      <p:childTnLst>
+                        <p:par>
+                          <p:cTn id="10" fill="hold">
+                            <p:stCondLst>
+                              <p:cond delay="0"/>
+                            </p:stCondLst>
+                            <p:childTnLst>
                               <p:par>
-                                <p:cTn id="9" presetID="2" presetClass="entr" presetSubtype="4" fill="hold" grpId="0" nodeType="withEffect">
+                                <p:cTn id="11" presetID="22" presetClass="entr" presetSubtype="4" fill="hold" grpId="0" nodeType="clickEffect">
                                   <p:stCondLst>
                                     <p:cond delay="0"/>
                                   </p:stCondLst>
                                   <p:childTnLst>
                                     <p:set>
                                       <p:cBhvr>
-                                        <p:cTn id="10" dur="1" fill="hold">
+                                        <p:cTn id="12" dur="1" fill="hold">
                                           <p:stCondLst>
                                             <p:cond delay="0"/>
                                           </p:stCondLst>
                                         </p:cTn>
                                         <p:tgtEl>
-                                          <p:spTgt spid="4"/>
+                                          <p:spTgt spid="6"/>
                                         </p:tgtEl>
                                         <p:attrNameLst>
                                           <p:attrName>style.visibility</p:attrName>
@@ -29341,52 +31607,14 @@
                                         <p:strVal val="visible"/>
                                       </p:to>
                                     </p:set>
-                                    <p:anim calcmode="lin" valueType="num">
-                                      <p:cBhvr additive="base">
-                                        <p:cTn id="11" dur="500" fill="hold"/>
+                                    <p:animEffect transition="in" filter="wipe(down)">
+                                      <p:cBhvr>
+                                        <p:cTn id="13" dur="500"/>
                                         <p:tgtEl>
-                                          <p:spTgt spid="4"/>
+                                          <p:spTgt spid="6"/>
                                         </p:tgtEl>
-                                        <p:attrNameLst>
-                                          <p:attrName>ppt_x</p:attrName>
-                                        </p:attrNameLst>
                                       </p:cBhvr>
-                                      <p:tavLst>
-                                        <p:tav tm="0">
-                                          <p:val>
-                                            <p:strVal val="#ppt_x"/>
-                                          </p:val>
-                                        </p:tav>
-                                        <p:tav tm="100000">
-                                          <p:val>
-                                            <p:strVal val="#ppt_x"/>
-                                          </p:val>
-                                        </p:tav>
-                                      </p:tavLst>
-                                    </p:anim>
-                                    <p:anim calcmode="lin" valueType="num">
-                                      <p:cBhvr additive="base">
-                                        <p:cTn id="12" dur="500" fill="hold"/>
-                                        <p:tgtEl>
-                                          <p:spTgt spid="4"/>
-                                        </p:tgtEl>
-                                        <p:attrNameLst>
-                                          <p:attrName>ppt_y</p:attrName>
-                                        </p:attrNameLst>
-                                      </p:cBhvr>
-                                      <p:tavLst>
-                                        <p:tav tm="0">
-                                          <p:val>
-                                            <p:strVal val="1+#ppt_h/2"/>
-                                          </p:val>
-                                        </p:tav>
-                                        <p:tav tm="100000">
-                                          <p:val>
-                                            <p:strVal val="#ppt_y"/>
-                                          </p:val>
-                                        </p:tav>
-                                      </p:tavLst>
-                                    </p:anim>
+                                    </p:animEffect>
                                   </p:childTnLst>
                                 </p:cTn>
                               </p:par>
@@ -29418,7 +31646,7 @@
       </p:par>
     </p:tnLst>
     <p:bldLst>
-      <p:bldP spid="4" grpId="0"/>
+      <p:bldP spid="6" grpId="0"/>
     </p:bldLst>
   </p:timing>
 </p:sld>
@@ -29677,8 +31905,8 @@
         </p:nvSpPr>
         <p:spPr>
           <a:xfrm>
-            <a:off x="357158" y="1714488"/>
-            <a:ext cx="5715040" cy="892552"/>
+            <a:off x="714348" y="2143116"/>
+            <a:ext cx="6000792" cy="2400657"/>
           </a:xfrm>
           <a:prstGeom prst="rect">
             <a:avLst/>
@@ -29692,10 +31920,10 @@
           <a:lstStyle/>
           <a:p>
             <a:r>
-              <a:rPr lang="it-IT" sz="2600" b="1" dirty="0" smtClean="0"/>
+              <a:rPr lang="it-IT" sz="5000" i="1" dirty="0" smtClean="0"/>
               <a:t>Cosa faremo nel prossimo progetto che non abbiamo fatto:</a:t>
             </a:r>
-            <a:endParaRPr lang="it-IT" sz="2600" b="1" dirty="0"/>
+            <a:endParaRPr lang="it-IT" sz="5000" i="1" dirty="0"/>
           </a:p>
         </p:txBody>
       </p:sp>
@@ -29716,8 +31944,8 @@
         </p:blipFill>
         <p:spPr bwMode="auto">
           <a:xfrm>
-            <a:off x="6643702" y="887539"/>
-            <a:ext cx="1785950" cy="2345187"/>
+            <a:off x="6429388" y="2786058"/>
+            <a:ext cx="2057964" cy="2702377"/>
           </a:xfrm>
           <a:prstGeom prst="rect">
             <a:avLst/>
@@ -30112,8 +32340,8 @@
         </p:nvSpPr>
         <p:spPr>
           <a:xfrm>
-            <a:off x="357158" y="1714488"/>
-            <a:ext cx="5715040" cy="892552"/>
+            <a:off x="1000100" y="1571612"/>
+            <a:ext cx="5715040" cy="2400657"/>
           </a:xfrm>
           <a:prstGeom prst="rect">
             <a:avLst/>
@@ -30127,10 +32355,10 @@
           <a:lstStyle/>
           <a:p>
             <a:r>
-              <a:rPr lang="it-IT" sz="2600" b="1" dirty="0" smtClean="0"/>
+              <a:rPr lang="it-IT" sz="5000" i="1" dirty="0" smtClean="0"/>
               <a:t>Quanto reputiamo buono il nostro sottosistema:</a:t>
             </a:r>
-            <a:endParaRPr lang="it-IT" sz="2600" b="1" dirty="0"/>
+            <a:endParaRPr lang="it-IT" sz="5000" i="1" dirty="0"/>
           </a:p>
         </p:txBody>
       </p:sp>
@@ -30151,8 +32379,39 @@
         </p:blipFill>
         <p:spPr bwMode="auto">
           <a:xfrm>
-            <a:off x="6215074" y="857232"/>
-            <a:ext cx="2214578" cy="2214578"/>
+            <a:off x="5572132" y="3143248"/>
+            <a:ext cx="2857520" cy="2857520"/>
+          </a:xfrm>
+          <a:prstGeom prst="rect">
+            <a:avLst/>
+          </a:prstGeom>
+          <a:ln>
+            <a:noFill/>
+          </a:ln>
+          <a:effectLst>
+            <a:softEdge rad="112500"/>
+          </a:effectLst>
+        </p:spPr>
+      </p:pic>
+      <p:pic>
+        <p:nvPicPr>
+          <p:cNvPr id="1026" name="Picture 2" descr="D:\Tony\Unisa\IS\PROGETTO\logo\logo1.png"/>
+          <p:cNvPicPr>
+            <a:picLocks noChangeAspect="1" noChangeArrowheads="1"/>
+          </p:cNvPicPr>
+          <p:nvPr/>
+        </p:nvPicPr>
+        <p:blipFill>
+          <a:blip r:embed="rId4" cstate="print"/>
+          <a:srcRect/>
+          <a:stretch>
+            <a:fillRect/>
+          </a:stretch>
+        </p:blipFill>
+        <p:spPr bwMode="auto">
+          <a:xfrm rot="21096249">
+            <a:off x="1142976" y="4500570"/>
+            <a:ext cx="3243282" cy="2040063"/>
           </a:xfrm>
           <a:prstGeom prst="rect">
             <a:avLst/>
@@ -30191,7 +32450,7 @@
                             </p:stCondLst>
                             <p:childTnLst>
                               <p:par>
-                                <p:cTn id="5" presetID="10" presetClass="entr" presetSubtype="0" fill="hold" nodeType="clickEffect">
+                                <p:cTn id="5" presetID="2" presetClass="entr" presetSubtype="4" fill="hold" grpId="0" nodeType="clickEffect">
                                   <p:stCondLst>
                                     <p:cond delay="0"/>
                                   </p:stCondLst>
@@ -30199,59 +32458,6 @@
                                     <p:set>
                                       <p:cBhvr>
                                         <p:cTn id="6" dur="1" fill="hold">
-                                          <p:stCondLst>
-                                            <p:cond delay="0"/>
-                                          </p:stCondLst>
-                                        </p:cTn>
-                                        <p:tgtEl>
-                                          <p:spTgt spid="8194"/>
-                                        </p:tgtEl>
-                                        <p:attrNameLst>
-                                          <p:attrName>style.visibility</p:attrName>
-                                        </p:attrNameLst>
-                                      </p:cBhvr>
-                                      <p:to>
-                                        <p:strVal val="visible"/>
-                                      </p:to>
-                                    </p:set>
-                                    <p:animEffect transition="in" filter="fade">
-                                      <p:cBhvr>
-                                        <p:cTn id="7" dur="500"/>
-                                        <p:tgtEl>
-                                          <p:spTgt spid="8194"/>
-                                        </p:tgtEl>
-                                      </p:cBhvr>
-                                    </p:animEffect>
-                                  </p:childTnLst>
-                                </p:cTn>
-                              </p:par>
-                            </p:childTnLst>
-                          </p:cTn>
-                        </p:par>
-                      </p:childTnLst>
-                    </p:cTn>
-                  </p:par>
-                  <p:par>
-                    <p:cTn id="8" fill="hold">
-                      <p:stCondLst>
-                        <p:cond delay="indefinite"/>
-                      </p:stCondLst>
-                      <p:childTnLst>
-                        <p:par>
-                          <p:cTn id="9" fill="hold">
-                            <p:stCondLst>
-                              <p:cond delay="0"/>
-                            </p:stCondLst>
-                            <p:childTnLst>
-                              <p:par>
-                                <p:cTn id="10" presetID="2" presetClass="entr" presetSubtype="4" fill="hold" grpId="0" nodeType="clickEffect">
-                                  <p:stCondLst>
-                                    <p:cond delay="0"/>
-                                  </p:stCondLst>
-                                  <p:childTnLst>
-                                    <p:set>
-                                      <p:cBhvr>
-                                        <p:cTn id="11" dur="1" fill="hold">
                                           <p:stCondLst>
                                             <p:cond delay="0"/>
                                           </p:stCondLst>
@@ -30273,7 +32479,7 @@
                                     </p:set>
                                     <p:anim calcmode="lin" valueType="num">
                                       <p:cBhvr additive="base">
-                                        <p:cTn id="12" dur="500" fill="hold"/>
+                                        <p:cTn id="7" dur="500" fill="hold"/>
                                         <p:tgtEl>
                                           <p:spTgt spid="4">
                                             <p:txEl>
@@ -30300,7 +32506,7 @@
                                     </p:anim>
                                     <p:anim calcmode="lin" valueType="num">
                                       <p:cBhvr additive="base">
-                                        <p:cTn id="13" dur="500" fill="hold"/>
+                                        <p:cTn id="8" dur="500" fill="hold"/>
                                         <p:tgtEl>
                                           <p:spTgt spid="4">
                                             <p:txEl>
@@ -30325,6 +32531,112 @@
                                         </p:tav>
                                       </p:tavLst>
                                     </p:anim>
+                                  </p:childTnLst>
+                                </p:cTn>
+                              </p:par>
+                            </p:childTnLst>
+                          </p:cTn>
+                        </p:par>
+                      </p:childTnLst>
+                    </p:cTn>
+                  </p:par>
+                  <p:par>
+                    <p:cTn id="9" fill="hold">
+                      <p:stCondLst>
+                        <p:cond delay="indefinite"/>
+                      </p:stCondLst>
+                      <p:childTnLst>
+                        <p:par>
+                          <p:cTn id="10" fill="hold">
+                            <p:stCondLst>
+                              <p:cond delay="0"/>
+                            </p:stCondLst>
+                            <p:childTnLst>
+                              <p:par>
+                                <p:cTn id="11" presetID="10" presetClass="entr" presetSubtype="0" fill="hold" nodeType="clickEffect">
+                                  <p:stCondLst>
+                                    <p:cond delay="0"/>
+                                  </p:stCondLst>
+                                  <p:childTnLst>
+                                    <p:set>
+                                      <p:cBhvr>
+                                        <p:cTn id="12" dur="1" fill="hold">
+                                          <p:stCondLst>
+                                            <p:cond delay="0"/>
+                                          </p:stCondLst>
+                                        </p:cTn>
+                                        <p:tgtEl>
+                                          <p:spTgt spid="8194"/>
+                                        </p:tgtEl>
+                                        <p:attrNameLst>
+                                          <p:attrName>style.visibility</p:attrName>
+                                        </p:attrNameLst>
+                                      </p:cBhvr>
+                                      <p:to>
+                                        <p:strVal val="visible"/>
+                                      </p:to>
+                                    </p:set>
+                                    <p:animEffect transition="in" filter="fade">
+                                      <p:cBhvr>
+                                        <p:cTn id="13" dur="500"/>
+                                        <p:tgtEl>
+                                          <p:spTgt spid="8194"/>
+                                        </p:tgtEl>
+                                      </p:cBhvr>
+                                    </p:animEffect>
+                                  </p:childTnLst>
+                                </p:cTn>
+                              </p:par>
+                            </p:childTnLst>
+                          </p:cTn>
+                        </p:par>
+                      </p:childTnLst>
+                    </p:cTn>
+                  </p:par>
+                  <p:par>
+                    <p:cTn id="14" fill="hold">
+                      <p:stCondLst>
+                        <p:cond delay="indefinite"/>
+                      </p:stCondLst>
+                      <p:childTnLst>
+                        <p:par>
+                          <p:cTn id="15" fill="hold">
+                            <p:stCondLst>
+                              <p:cond delay="0"/>
+                            </p:stCondLst>
+                            <p:childTnLst>
+                              <p:par>
+                                <p:cTn id="16" presetID="10" presetClass="entr" presetSubtype="0" fill="hold" nodeType="clickEffect">
+                                  <p:stCondLst>
+                                    <p:cond delay="0"/>
+                                  </p:stCondLst>
+                                  <p:childTnLst>
+                                    <p:set>
+                                      <p:cBhvr>
+                                        <p:cTn id="17" dur="1" fill="hold">
+                                          <p:stCondLst>
+                                            <p:cond delay="0"/>
+                                          </p:stCondLst>
+                                        </p:cTn>
+                                        <p:tgtEl>
+                                          <p:spTgt spid="1026"/>
+                                        </p:tgtEl>
+                                        <p:attrNameLst>
+                                          <p:attrName>style.visibility</p:attrName>
+                                        </p:attrNameLst>
+                                      </p:cBhvr>
+                                      <p:to>
+                                        <p:strVal val="visible"/>
+                                      </p:to>
+                                    </p:set>
+                                    <p:animEffect transition="in" filter="fade">
+                                      <p:cBhvr>
+                                        <p:cTn id="18" dur="500"/>
+                                        <p:tgtEl>
+                                          <p:spTgt spid="1026"/>
+                                        </p:tgtEl>
+                                      </p:cBhvr>
+                                    </p:animEffect>
                                   </p:childTnLst>
                                 </p:cTn>
                               </p:par>
@@ -30452,7 +32764,7 @@
     </p:spTree>
     <p:extLst>
       <p:ext uri="{BB962C8B-B14F-4D97-AF65-F5344CB8AC3E}">
-        <p14:creationId xmlns:p14="http://schemas.microsoft.com/office/powerpoint/2010/main" xmlns="" val="2532338835"/>
+        <p14:creationId xmlns="" xmlns:p14="http://schemas.microsoft.com/office/powerpoint/2010/main" val="2532338835"/>
       </p:ext>
     </p:extLst>
   </p:cSld>
@@ -30460,7 +32772,7 @@
     <a:masterClrMapping/>
   </p:clrMapOvr>
   <mc:AlternateContent xmlns:mc="http://schemas.openxmlformats.org/markup-compatibility/2006">
-    <mc:Choice xmlns:p14="http://schemas.microsoft.com/office/powerpoint/2010/main" xmlns="" Requires="p14">
+    <mc:Choice xmlns="" xmlns:p14="http://schemas.microsoft.com/office/powerpoint/2010/main" Requires="p14">
       <p:transition spd="slow" p14:dur="2000"/>
     </mc:Choice>
     <mc:Fallback>
@@ -30550,7 +32862,7 @@
           <p:nvPr>
             <p:extLst>
               <p:ext uri="{D42A27DB-BD31-4B8C-83A1-F6EECF244321}">
-                <p14:modId xmlns:p14="http://schemas.microsoft.com/office/powerpoint/2010/main" xmlns="" val="4285816619"/>
+                <p14:modId xmlns="" xmlns:p14="http://schemas.microsoft.com/office/powerpoint/2010/main" val="4285816619"/>
               </p:ext>
             </p:extLst>
           </p:nvPr>
@@ -31280,7 +33592,7 @@
           <p:nvPr>
             <p:extLst>
               <p:ext uri="{D42A27DB-BD31-4B8C-83A1-F6EECF244321}">
-                <p14:modId xmlns:p14="http://schemas.microsoft.com/office/powerpoint/2010/main" xmlns="" val="4159081582"/>
+                <p14:modId xmlns="" xmlns:p14="http://schemas.microsoft.com/office/powerpoint/2010/main" val="4159081582"/>
               </p:ext>
             </p:extLst>
           </p:nvPr>
@@ -32119,7 +34431,7 @@
     </p:spTree>
     <p:extLst>
       <p:ext uri="{BB962C8B-B14F-4D97-AF65-F5344CB8AC3E}">
-        <p14:creationId xmlns:p14="http://schemas.microsoft.com/office/powerpoint/2010/main" xmlns="" val="1173458281"/>
+        <p14:creationId xmlns="" xmlns:p14="http://schemas.microsoft.com/office/powerpoint/2010/main" val="1173458281"/>
       </p:ext>
     </p:extLst>
   </p:cSld>
@@ -33377,7 +35689,7 @@
     </p:spTree>
     <p:extLst>
       <p:ext uri="{BB962C8B-B14F-4D97-AF65-F5344CB8AC3E}">
-        <p14:creationId xmlns:p14="http://schemas.microsoft.com/office/powerpoint/2010/main" xmlns="" val="2769124218"/>
+        <p14:creationId xmlns="" xmlns:p14="http://schemas.microsoft.com/office/powerpoint/2010/main" val="2769124218"/>
       </p:ext>
     </p:extLst>
   </p:cSld>

</xml_diff>

<commit_message>
[WR 3] aggiunto demo
</commit_message>
<xml_diff>
--- a/Presentazione/Atsilo3/Atsilo_H_PresentazioneFinale.pptx
+++ b/Presentazione/Atsilo3/Atsilo_H_PresentazioneFinale.pptx
@@ -5,7 +5,7 @@
     <p:sldMasterId id="2147483684" r:id="rId1"/>
   </p:sldMasterIdLst>
   <p:notesMasterIdLst>
-    <p:notesMasterId r:id="rId45"/>
+    <p:notesMasterId r:id="rId46"/>
   </p:notesMasterIdLst>
   <p:sldIdLst>
     <p:sldId id="256" r:id="rId2"/>
@@ -38,19 +38,20 @@
     <p:sldId id="317" r:id="rId29"/>
     <p:sldId id="291" r:id="rId30"/>
     <p:sldId id="265" r:id="rId31"/>
-    <p:sldId id="268" r:id="rId32"/>
-    <p:sldId id="267" r:id="rId33"/>
-    <p:sldId id="320" r:id="rId34"/>
-    <p:sldId id="321" r:id="rId35"/>
-    <p:sldId id="323" r:id="rId36"/>
-    <p:sldId id="324" r:id="rId37"/>
-    <p:sldId id="325" r:id="rId38"/>
-    <p:sldId id="326" r:id="rId39"/>
-    <p:sldId id="322" r:id="rId40"/>
-    <p:sldId id="292" r:id="rId41"/>
-    <p:sldId id="293" r:id="rId42"/>
-    <p:sldId id="294" r:id="rId43"/>
-    <p:sldId id="295" r:id="rId44"/>
+    <p:sldId id="328" r:id="rId32"/>
+    <p:sldId id="329" r:id="rId33"/>
+    <p:sldId id="267" r:id="rId34"/>
+    <p:sldId id="320" r:id="rId35"/>
+    <p:sldId id="321" r:id="rId36"/>
+    <p:sldId id="323" r:id="rId37"/>
+    <p:sldId id="324" r:id="rId38"/>
+    <p:sldId id="325" r:id="rId39"/>
+    <p:sldId id="326" r:id="rId40"/>
+    <p:sldId id="322" r:id="rId41"/>
+    <p:sldId id="292" r:id="rId42"/>
+    <p:sldId id="293" r:id="rId43"/>
+    <p:sldId id="294" r:id="rId44"/>
+    <p:sldId id="295" r:id="rId45"/>
   </p:sldIdLst>
   <p:sldSz cx="9144000" cy="6858000" type="screen4x3"/>
   <p:notesSz cx="6858000" cy="9144000"/>
@@ -235,7 +236,7 @@
             <a:fld id="{38D78F4D-402C-46E0-A4BB-DF91EA86B14C}" type="datetimeFigureOut">
               <a:rPr lang="it-IT" smtClean="0"/>
               <a:pPr/>
-              <a:t>31/12/2012</a:t>
+              <a:t>01/01/2013</a:t>
             </a:fld>
             <a:endParaRPr lang="it-IT"/>
           </a:p>
@@ -404,7 +405,7 @@
     </p:spTree>
     <p:extLst>
       <p:ext uri="{BB962C8B-B14F-4D97-AF65-F5344CB8AC3E}">
-        <p14:creationId xmlns:p14="http://schemas.microsoft.com/office/powerpoint/2010/main" xmlns="" val="2126419590"/>
+        <p14:creationId xmlns="" xmlns:p14="http://schemas.microsoft.com/office/powerpoint/2010/main" val="2126419590"/>
       </p:ext>
     </p:extLst>
   </p:cSld>
@@ -601,7 +602,7 @@
     </p:spTree>
     <p:extLst>
       <p:ext uri="{BB962C8B-B14F-4D97-AF65-F5344CB8AC3E}">
-        <p14:creationId xmlns:p14="http://schemas.microsoft.com/office/powerpoint/2010/main" xmlns="" val="963420841"/>
+        <p14:creationId xmlns="" xmlns:p14="http://schemas.microsoft.com/office/powerpoint/2010/main" val="963420841"/>
       </p:ext>
     </p:extLst>
   </p:cSld>
@@ -708,7 +709,7 @@
     </p:spTree>
     <p:extLst>
       <p:ext uri="{BB962C8B-B14F-4D97-AF65-F5344CB8AC3E}">
-        <p14:creationId xmlns:p14="http://schemas.microsoft.com/office/powerpoint/2010/main" xmlns="" val="3361965342"/>
+        <p14:creationId xmlns="" xmlns:p14="http://schemas.microsoft.com/office/powerpoint/2010/main" val="3361965342"/>
       </p:ext>
     </p:extLst>
   </p:cSld>
@@ -851,7 +852,7 @@
     </p:spTree>
     <p:extLst>
       <p:ext uri="{BB962C8B-B14F-4D97-AF65-F5344CB8AC3E}">
-        <p14:creationId xmlns:p14="http://schemas.microsoft.com/office/powerpoint/2010/main" xmlns="" val="3314347345"/>
+        <p14:creationId xmlns="" xmlns:p14="http://schemas.microsoft.com/office/powerpoint/2010/main" val="3314347345"/>
       </p:ext>
     </p:extLst>
   </p:cSld>
@@ -988,7 +989,7 @@
     </p:spTree>
     <p:extLst>
       <p:ext uri="{BB962C8B-B14F-4D97-AF65-F5344CB8AC3E}">
-        <p14:creationId xmlns:p14="http://schemas.microsoft.com/office/powerpoint/2010/main" xmlns="" val="2265654022"/>
+        <p14:creationId xmlns="" xmlns:p14="http://schemas.microsoft.com/office/powerpoint/2010/main" val="2265654022"/>
       </p:ext>
     </p:extLst>
   </p:cSld>
@@ -1125,7 +1126,7 @@
     </p:spTree>
     <p:extLst>
       <p:ext uri="{BB962C8B-B14F-4D97-AF65-F5344CB8AC3E}">
-        <p14:creationId xmlns:p14="http://schemas.microsoft.com/office/powerpoint/2010/main" xmlns="" val="71143455"/>
+        <p14:creationId xmlns="" xmlns:p14="http://schemas.microsoft.com/office/powerpoint/2010/main" val="71143455"/>
       </p:ext>
     </p:extLst>
   </p:cSld>
@@ -1224,7 +1225,7 @@
     </p:spTree>
     <p:extLst>
       <p:ext uri="{BB962C8B-B14F-4D97-AF65-F5344CB8AC3E}">
-        <p14:creationId xmlns:p14="http://schemas.microsoft.com/office/powerpoint/2010/main" xmlns="" val="113696966"/>
+        <p14:creationId xmlns="" xmlns:p14="http://schemas.microsoft.com/office/powerpoint/2010/main" val="113696966"/>
       </p:ext>
     </p:extLst>
   </p:cSld>
@@ -1349,7 +1350,7 @@
     </p:spTree>
     <p:extLst>
       <p:ext uri="{BB962C8B-B14F-4D97-AF65-F5344CB8AC3E}">
-        <p14:creationId xmlns:p14="http://schemas.microsoft.com/office/powerpoint/2010/main" xmlns="" val="1063702567"/>
+        <p14:creationId xmlns="" xmlns:p14="http://schemas.microsoft.com/office/powerpoint/2010/main" val="1063702567"/>
       </p:ext>
     </p:extLst>
   </p:cSld>
@@ -1454,7 +1455,7 @@
     </p:spTree>
     <p:extLst>
       <p:ext uri="{BB962C8B-B14F-4D97-AF65-F5344CB8AC3E}">
-        <p14:creationId xmlns:p14="http://schemas.microsoft.com/office/powerpoint/2010/main" xmlns="" val="122959592"/>
+        <p14:creationId xmlns="" xmlns:p14="http://schemas.microsoft.com/office/powerpoint/2010/main" val="122959592"/>
       </p:ext>
     </p:extLst>
   </p:cSld>
@@ -1569,7 +1570,7 @@
     </p:spTree>
     <p:extLst>
       <p:ext uri="{BB962C8B-B14F-4D97-AF65-F5344CB8AC3E}">
-        <p14:creationId xmlns:p14="http://schemas.microsoft.com/office/powerpoint/2010/main" xmlns="" val="780286428"/>
+        <p14:creationId xmlns="" xmlns:p14="http://schemas.microsoft.com/office/powerpoint/2010/main" val="780286428"/>
       </p:ext>
     </p:extLst>
   </p:cSld>
@@ -1670,7 +1671,7 @@
     </p:spTree>
     <p:extLst>
       <p:ext uri="{BB962C8B-B14F-4D97-AF65-F5344CB8AC3E}">
-        <p14:creationId xmlns:p14="http://schemas.microsoft.com/office/powerpoint/2010/main" xmlns="" val="2418012031"/>
+        <p14:creationId xmlns="" xmlns:p14="http://schemas.microsoft.com/office/powerpoint/2010/main" val="2418012031"/>
       </p:ext>
     </p:extLst>
   </p:cSld>
@@ -1771,7 +1772,7 @@
     </p:spTree>
     <p:extLst>
       <p:ext uri="{BB962C8B-B14F-4D97-AF65-F5344CB8AC3E}">
-        <p14:creationId xmlns:p14="http://schemas.microsoft.com/office/powerpoint/2010/main" xmlns="" val="778008281"/>
+        <p14:creationId xmlns="" xmlns:p14="http://schemas.microsoft.com/office/powerpoint/2010/main" val="778008281"/>
       </p:ext>
     </p:extLst>
   </p:cSld>
@@ -1882,7 +1883,7 @@
     </p:spTree>
     <p:extLst>
       <p:ext uri="{BB962C8B-B14F-4D97-AF65-F5344CB8AC3E}">
-        <p14:creationId xmlns:p14="http://schemas.microsoft.com/office/powerpoint/2010/main" xmlns="" val="2781517378"/>
+        <p14:creationId xmlns="" xmlns:p14="http://schemas.microsoft.com/office/powerpoint/2010/main" val="2781517378"/>
       </p:ext>
     </p:extLst>
   </p:cSld>
@@ -1975,7 +1976,7 @@
     </p:spTree>
     <p:extLst>
       <p:ext uri="{BB962C8B-B14F-4D97-AF65-F5344CB8AC3E}">
-        <p14:creationId xmlns:p14="http://schemas.microsoft.com/office/powerpoint/2010/main" xmlns="" val="1377757052"/>
+        <p14:creationId xmlns="" xmlns:p14="http://schemas.microsoft.com/office/powerpoint/2010/main" val="1377757052"/>
       </p:ext>
     </p:extLst>
   </p:cSld>
@@ -2079,7 +2080,7 @@
     </p:spTree>
     <p:extLst>
       <p:ext uri="{BB962C8B-B14F-4D97-AF65-F5344CB8AC3E}">
-        <p14:creationId xmlns:p14="http://schemas.microsoft.com/office/powerpoint/2010/main" xmlns="" val="1394194668"/>
+        <p14:creationId xmlns="" xmlns:p14="http://schemas.microsoft.com/office/powerpoint/2010/main" val="1394194668"/>
       </p:ext>
     </p:extLst>
   </p:cSld>
@@ -2234,7 +2235,7 @@
     </p:spTree>
     <p:extLst>
       <p:ext uri="{BB962C8B-B14F-4D97-AF65-F5344CB8AC3E}">
-        <p14:creationId xmlns:p14="http://schemas.microsoft.com/office/powerpoint/2010/main" xmlns="" val="2972088584"/>
+        <p14:creationId xmlns="" xmlns:p14="http://schemas.microsoft.com/office/powerpoint/2010/main" val="2972088584"/>
       </p:ext>
     </p:extLst>
   </p:cSld>
@@ -2343,7 +2344,7 @@
     </p:spTree>
     <p:extLst>
       <p:ext uri="{BB962C8B-B14F-4D97-AF65-F5344CB8AC3E}">
-        <p14:creationId xmlns:p14="http://schemas.microsoft.com/office/powerpoint/2010/main" xmlns="" val="1417320036"/>
+        <p14:creationId xmlns="" xmlns:p14="http://schemas.microsoft.com/office/powerpoint/2010/main" val="1417320036"/>
       </p:ext>
     </p:extLst>
   </p:cSld>
@@ -2452,7 +2453,7 @@
     </p:spTree>
     <p:extLst>
       <p:ext uri="{BB962C8B-B14F-4D97-AF65-F5344CB8AC3E}">
-        <p14:creationId xmlns:p14="http://schemas.microsoft.com/office/powerpoint/2010/main" xmlns="" val="2176874561"/>
+        <p14:creationId xmlns="" xmlns:p14="http://schemas.microsoft.com/office/powerpoint/2010/main" val="2176874561"/>
       </p:ext>
     </p:extLst>
   </p:cSld>
@@ -2553,7 +2554,7 @@
     </p:spTree>
     <p:extLst>
       <p:ext uri="{BB962C8B-B14F-4D97-AF65-F5344CB8AC3E}">
-        <p14:creationId xmlns:p14="http://schemas.microsoft.com/office/powerpoint/2010/main" xmlns="" val="2428745919"/>
+        <p14:creationId xmlns="" xmlns:p14="http://schemas.microsoft.com/office/powerpoint/2010/main" val="2428745919"/>
       </p:ext>
     </p:extLst>
   </p:cSld>
@@ -2650,7 +2651,7 @@
     </p:spTree>
     <p:extLst>
       <p:ext uri="{BB962C8B-B14F-4D97-AF65-F5344CB8AC3E}">
-        <p14:creationId xmlns:p14="http://schemas.microsoft.com/office/powerpoint/2010/main" xmlns="" val="899854441"/>
+        <p14:creationId xmlns="" xmlns:p14="http://schemas.microsoft.com/office/powerpoint/2010/main" val="899854441"/>
       </p:ext>
     </p:extLst>
   </p:cSld>
@@ -2806,7 +2807,7 @@
     </p:spTree>
     <p:extLst>
       <p:ext uri="{BB962C8B-B14F-4D97-AF65-F5344CB8AC3E}">
-        <p14:creationId xmlns:p14="http://schemas.microsoft.com/office/powerpoint/2010/main" xmlns="" val="1218324987"/>
+        <p14:creationId xmlns="" xmlns:p14="http://schemas.microsoft.com/office/powerpoint/2010/main" val="1218324987"/>
       </p:ext>
     </p:extLst>
   </p:cSld>
@@ -2899,7 +2900,7 @@
     </p:spTree>
     <p:extLst>
       <p:ext uri="{BB962C8B-B14F-4D97-AF65-F5344CB8AC3E}">
-        <p14:creationId xmlns:p14="http://schemas.microsoft.com/office/powerpoint/2010/main" xmlns="" val="3928439017"/>
+        <p14:creationId xmlns="" xmlns:p14="http://schemas.microsoft.com/office/powerpoint/2010/main" val="3928439017"/>
       </p:ext>
     </p:extLst>
   </p:cSld>
@@ -2955,7 +2956,11 @@
           <a:p>
             <a:r>
               <a:rPr lang="it-IT" dirty="0" smtClean="0"/>
-              <a:t>Inserire la demo della compilazione</a:t>
+              <a:t>Cercare</a:t>
+            </a:r>
+            <a:r>
+              <a:rPr lang="it-IT" baseline="0" dirty="0" smtClean="0"/>
+              <a:t> di dire «abbiamo indicato gli obiettivi prima ora abbiamo cercato di applicarli, nel giro di 14 giorni»</a:t>
             </a:r>
             <a:endParaRPr lang="it-IT" dirty="0"/>
           </a:p>
@@ -2988,7 +2993,7 @@
     </p:spTree>
     <p:extLst>
       <p:ext uri="{BB962C8B-B14F-4D97-AF65-F5344CB8AC3E}">
-        <p14:creationId xmlns:p14="http://schemas.microsoft.com/office/powerpoint/2010/main" xmlns="" val="4040687285"/>
+        <p14:creationId xmlns="" xmlns:p14="http://schemas.microsoft.com/office/powerpoint/2010/main" val="3928439017"/>
       </p:ext>
     </p:extLst>
   </p:cSld>
@@ -3087,7 +3092,7 @@
     </p:spTree>
     <p:extLst>
       <p:ext uri="{BB962C8B-B14F-4D97-AF65-F5344CB8AC3E}">
-        <p14:creationId xmlns:p14="http://schemas.microsoft.com/office/powerpoint/2010/main" xmlns="" val="1025718114"/>
+        <p14:creationId xmlns="" xmlns:p14="http://schemas.microsoft.com/office/powerpoint/2010/main" val="1025718114"/>
       </p:ext>
     </p:extLst>
   </p:cSld>
@@ -3143,83 +3148,12 @@
           <a:p>
             <a:r>
               <a:rPr lang="it-IT" dirty="0" smtClean="0"/>
-              <a:t>Motivo dell’elevata complessità:</a:t>
-            </a:r>
-          </a:p>
-          <a:p>
-            <a:pPr marL="171450" indent="-171450">
-              <a:buFontTx/>
-              <a:buChar char="-"/>
-            </a:pPr>
-            <a:r>
-              <a:rPr lang="it-IT" dirty="0" smtClean="0"/>
-              <a:t>Mancanza di tempo per suddividere le responsabilità in </a:t>
-            </a:r>
-            <a:r>
-              <a:rPr lang="it-IT" dirty="0" err="1" smtClean="0"/>
-              <a:t>piu</a:t>
-            </a:r>
-            <a:r>
-              <a:rPr lang="it-IT" dirty="0" smtClean="0"/>
-              <a:t> classi</a:t>
-            </a:r>
-          </a:p>
-          <a:p>
-            <a:pPr marL="0" indent="0">
-              <a:buFontTx/>
-              <a:buNone/>
-            </a:pPr>
-            <a:r>
-              <a:rPr lang="it-IT" dirty="0" smtClean="0"/>
-              <a:t>Motivo</a:t>
+              <a:t>Cercare</a:t>
             </a:r>
             <a:r>
               <a:rPr lang="it-IT" baseline="0" dirty="0" smtClean="0"/>
-              <a:t> della mancanza di commenti</a:t>
-            </a:r>
-          </a:p>
-          <a:p>
-            <a:pPr marL="171450" indent="-171450">
-              <a:buFontTx/>
-              <a:buChar char="-"/>
-            </a:pPr>
-            <a:r>
-              <a:rPr lang="it-IT" baseline="0" dirty="0" smtClean="0"/>
-              <a:t>Poco tempo</a:t>
-            </a:r>
-          </a:p>
-          <a:p>
-            <a:pPr marL="0" indent="0">
-              <a:buFontTx/>
-              <a:buNone/>
-            </a:pPr>
-            <a:r>
-              <a:rPr lang="it-IT" dirty="0" smtClean="0"/>
-              <a:t>Motivo della mancanza di eccezioni</a:t>
-            </a:r>
-          </a:p>
-          <a:p>
-            <a:pPr marL="171450" indent="-171450">
-              <a:buFontTx/>
-              <a:buChar char="-"/>
-            </a:pPr>
-            <a:r>
-              <a:rPr lang="it-IT" dirty="0" smtClean="0"/>
-              <a:t>Poco tempo</a:t>
-            </a:r>
-          </a:p>
-          <a:p>
-            <a:pPr marL="171450" indent="-171450">
-              <a:buFontTx/>
-              <a:buChar char="-"/>
-            </a:pPr>
-            <a:endParaRPr lang="it-IT" dirty="0" smtClean="0"/>
-          </a:p>
-          <a:p>
-            <a:pPr marL="0" indent="0">
-              <a:buFontTx/>
-              <a:buNone/>
-            </a:pPr>
+              <a:t> di dire «abbiamo indicato gli obiettivi prima ora abbiamo cercato di applicarli, nel giro di 14 giorni»</a:t>
+            </a:r>
             <a:endParaRPr lang="it-IT" dirty="0"/>
           </a:p>
         </p:txBody>
@@ -3251,7 +3185,7 @@
     </p:spTree>
     <p:extLst>
       <p:ext uri="{BB962C8B-B14F-4D97-AF65-F5344CB8AC3E}">
-        <p14:creationId xmlns:p14="http://schemas.microsoft.com/office/powerpoint/2010/main" xmlns="" val="1047033234"/>
+        <p14:creationId xmlns="" xmlns:p14="http://schemas.microsoft.com/office/powerpoint/2010/main" val="3928439017"/>
       </p:ext>
     </p:extLst>
   </p:cSld>
@@ -3307,8 +3241,83 @@
           <a:p>
             <a:r>
               <a:rPr lang="it-IT" dirty="0" smtClean="0"/>
-              <a:t>Mettere anche dei pregi</a:t>
-            </a:r>
+              <a:t>Motivo dell’elevata complessità:</a:t>
+            </a:r>
+          </a:p>
+          <a:p>
+            <a:pPr marL="171450" indent="-171450">
+              <a:buFontTx/>
+              <a:buChar char="-"/>
+            </a:pPr>
+            <a:r>
+              <a:rPr lang="it-IT" dirty="0" smtClean="0"/>
+              <a:t>Mancanza di tempo per suddividere le responsabilità in </a:t>
+            </a:r>
+            <a:r>
+              <a:rPr lang="it-IT" dirty="0" err="1" smtClean="0"/>
+              <a:t>piu</a:t>
+            </a:r>
+            <a:r>
+              <a:rPr lang="it-IT" dirty="0" smtClean="0"/>
+              <a:t> classi</a:t>
+            </a:r>
+          </a:p>
+          <a:p>
+            <a:pPr marL="0" indent="0">
+              <a:buFontTx/>
+              <a:buNone/>
+            </a:pPr>
+            <a:r>
+              <a:rPr lang="it-IT" dirty="0" smtClean="0"/>
+              <a:t>Motivo</a:t>
+            </a:r>
+            <a:r>
+              <a:rPr lang="it-IT" baseline="0" dirty="0" smtClean="0"/>
+              <a:t> della mancanza di commenti</a:t>
+            </a:r>
+          </a:p>
+          <a:p>
+            <a:pPr marL="171450" indent="-171450">
+              <a:buFontTx/>
+              <a:buChar char="-"/>
+            </a:pPr>
+            <a:r>
+              <a:rPr lang="it-IT" baseline="0" dirty="0" smtClean="0"/>
+              <a:t>Poco tempo</a:t>
+            </a:r>
+          </a:p>
+          <a:p>
+            <a:pPr marL="0" indent="0">
+              <a:buFontTx/>
+              <a:buNone/>
+            </a:pPr>
+            <a:r>
+              <a:rPr lang="it-IT" dirty="0" smtClean="0"/>
+              <a:t>Motivo della mancanza di eccezioni</a:t>
+            </a:r>
+          </a:p>
+          <a:p>
+            <a:pPr marL="171450" indent="-171450">
+              <a:buFontTx/>
+              <a:buChar char="-"/>
+            </a:pPr>
+            <a:r>
+              <a:rPr lang="it-IT" dirty="0" smtClean="0"/>
+              <a:t>Poco tempo</a:t>
+            </a:r>
+          </a:p>
+          <a:p>
+            <a:pPr marL="171450" indent="-171450">
+              <a:buFontTx/>
+              <a:buChar char="-"/>
+            </a:pPr>
+            <a:endParaRPr lang="it-IT" dirty="0" smtClean="0"/>
+          </a:p>
+          <a:p>
+            <a:pPr marL="0" indent="0">
+              <a:buFontTx/>
+              <a:buNone/>
+            </a:pPr>
             <a:endParaRPr lang="it-IT" dirty="0"/>
           </a:p>
         </p:txBody>
@@ -3340,7 +3349,7 @@
     </p:spTree>
     <p:extLst>
       <p:ext uri="{BB962C8B-B14F-4D97-AF65-F5344CB8AC3E}">
-        <p14:creationId xmlns:p14="http://schemas.microsoft.com/office/powerpoint/2010/main" xmlns="" val="1047033234"/>
+        <p14:creationId xmlns="" xmlns:p14="http://schemas.microsoft.com/office/powerpoint/2010/main" val="1047033234"/>
       </p:ext>
     </p:extLst>
   </p:cSld>
@@ -3394,6 +3403,10 @@
           <a:bodyPr/>
           <a:lstStyle/>
           <a:p>
+            <a:r>
+              <a:rPr lang="it-IT" dirty="0" smtClean="0"/>
+              <a:t>Mettere anche dei pregi</a:t>
+            </a:r>
             <a:endParaRPr lang="it-IT" dirty="0"/>
           </a:p>
         </p:txBody>
@@ -3416,7 +3429,7 @@
             <a:fld id="{D70604CA-7593-4640-8FA1-5523937B8510}" type="slidenum">
               <a:rPr lang="it-IT" smtClean="0"/>
               <a:pPr/>
-              <a:t>38</a:t>
+              <a:t>34</a:t>
             </a:fld>
             <a:endParaRPr lang="it-IT"/>
           </a:p>
@@ -3425,7 +3438,7 @@
     </p:spTree>
     <p:extLst>
       <p:ext uri="{BB962C8B-B14F-4D97-AF65-F5344CB8AC3E}">
-        <p14:creationId xmlns:p14="http://schemas.microsoft.com/office/powerpoint/2010/main" xmlns="" val="742716072"/>
+        <p14:creationId xmlns="" xmlns:p14="http://schemas.microsoft.com/office/powerpoint/2010/main" val="1047033234"/>
       </p:ext>
     </p:extLst>
   </p:cSld>
@@ -3479,10 +3492,6 @@
           <a:bodyPr/>
           <a:lstStyle/>
           <a:p>
-            <a:r>
-              <a:rPr lang="it-IT" dirty="0" smtClean="0"/>
-              <a:t>Non obbligatoria</a:t>
-            </a:r>
             <a:endParaRPr lang="it-IT" dirty="0"/>
           </a:p>
         </p:txBody>
@@ -3514,7 +3523,7 @@
     </p:spTree>
     <p:extLst>
       <p:ext uri="{BB962C8B-B14F-4D97-AF65-F5344CB8AC3E}">
-        <p14:creationId xmlns:p14="http://schemas.microsoft.com/office/powerpoint/2010/main" xmlns="" val="1425725903"/>
+        <p14:creationId xmlns="" xmlns:p14="http://schemas.microsoft.com/office/powerpoint/2010/main" val="742716072"/>
       </p:ext>
     </p:extLst>
   </p:cSld>
@@ -3568,30 +3577,10 @@
           <a:bodyPr/>
           <a:lstStyle/>
           <a:p>
-            <a:pPr marL="0" marR="0" indent="0" algn="l" defTabSz="914400" rtl="0" eaLnBrk="1" fontAlgn="auto" latinLnBrk="0" hangingPunct="1">
-              <a:lnSpc>
-                <a:spcPct val="100000"/>
-              </a:lnSpc>
-              <a:spcBef>
-                <a:spcPts val="0"/>
-              </a:spcBef>
-              <a:spcAft>
-                <a:spcPts val="0"/>
-              </a:spcAft>
-              <a:buClrTx/>
-              <a:buSzTx/>
-              <a:buFontTx/>
-              <a:buNone/>
-              <a:tabLst/>
-              <a:defRPr/>
-            </a:pPr>
-            <a:r>
-              <a:rPr lang="it-IT" baseline="0" dirty="0" smtClean="0"/>
-              <a:t>------ POSSIBILITA DI RIPETEZIONE CON ALTRI TEAM ------</a:t>
-            </a:r>
-            <a:endParaRPr lang="it-IT" dirty="0" smtClean="0"/>
-          </a:p>
-          <a:p>
+            <a:r>
+              <a:rPr lang="it-IT" dirty="0" smtClean="0"/>
+              <a:t>Non obbligatoria</a:t>
+            </a:r>
             <a:endParaRPr lang="it-IT" dirty="0"/>
           </a:p>
         </p:txBody>
@@ -3623,7 +3612,7 @@
     </p:spTree>
     <p:extLst>
       <p:ext uri="{BB962C8B-B14F-4D97-AF65-F5344CB8AC3E}">
-        <p14:creationId xmlns:p14="http://schemas.microsoft.com/office/powerpoint/2010/main" xmlns="" val="880674728"/>
+        <p14:creationId xmlns="" xmlns:p14="http://schemas.microsoft.com/office/powerpoint/2010/main" val="1425725903"/>
       </p:ext>
     </p:extLst>
   </p:cSld>
@@ -3732,7 +3721,7 @@
     </p:spTree>
     <p:extLst>
       <p:ext uri="{BB962C8B-B14F-4D97-AF65-F5344CB8AC3E}">
-        <p14:creationId xmlns:p14="http://schemas.microsoft.com/office/powerpoint/2010/main" xmlns="" val="346945336"/>
+        <p14:creationId xmlns="" xmlns:p14="http://schemas.microsoft.com/office/powerpoint/2010/main" val="880674728"/>
       </p:ext>
     </p:extLst>
   </p:cSld>
@@ -3841,7 +3830,7 @@
     </p:spTree>
     <p:extLst>
       <p:ext uri="{BB962C8B-B14F-4D97-AF65-F5344CB8AC3E}">
-        <p14:creationId xmlns:p14="http://schemas.microsoft.com/office/powerpoint/2010/main" xmlns="" val="1778546328"/>
+        <p14:creationId xmlns="" xmlns:p14="http://schemas.microsoft.com/office/powerpoint/2010/main" val="346945336"/>
       </p:ext>
     </p:extLst>
   </p:cSld>
@@ -3950,7 +3939,116 @@
     </p:spTree>
     <p:extLst>
       <p:ext uri="{BB962C8B-B14F-4D97-AF65-F5344CB8AC3E}">
-        <p14:creationId xmlns:p14="http://schemas.microsoft.com/office/powerpoint/2010/main" xmlns="" val="604861763"/>
+        <p14:creationId xmlns="" xmlns:p14="http://schemas.microsoft.com/office/powerpoint/2010/main" val="1778546328"/>
+      </p:ext>
+    </p:extLst>
+  </p:cSld>
+  <p:clrMapOvr>
+    <a:masterClrMapping/>
+  </p:clrMapOvr>
+</p:notes>
+</file>
+
+<file path=ppt/notesSlides/notesSlide38.xml><?xml version="1.0" encoding="utf-8"?>
+<p:notes xmlns:a="http://schemas.openxmlformats.org/drawingml/2006/main" xmlns:r="http://schemas.openxmlformats.org/officeDocument/2006/relationships" xmlns:p="http://schemas.openxmlformats.org/presentationml/2006/main">
+  <p:cSld>
+    <p:spTree>
+      <p:nvGrpSpPr>
+        <p:cNvPr id="1" name=""/>
+        <p:cNvGrpSpPr/>
+        <p:nvPr/>
+      </p:nvGrpSpPr>
+      <p:grpSpPr>
+        <a:xfrm>
+          <a:off x="0" y="0"/>
+          <a:ext cx="0" cy="0"/>
+          <a:chOff x="0" y="0"/>
+          <a:chExt cx="0" cy="0"/>
+        </a:xfrm>
+      </p:grpSpPr>
+      <p:sp>
+        <p:nvSpPr>
+          <p:cNvPr id="2" name="Segnaposto immagine diapositiva 1"/>
+          <p:cNvSpPr>
+            <a:spLocks noGrp="1" noRot="1" noChangeAspect="1"/>
+          </p:cNvSpPr>
+          <p:nvPr>
+            <p:ph type="sldImg"/>
+          </p:nvPr>
+        </p:nvSpPr>
+        <p:spPr/>
+      </p:sp>
+      <p:sp>
+        <p:nvSpPr>
+          <p:cNvPr id="3" name="Segnaposto note 2"/>
+          <p:cNvSpPr>
+            <a:spLocks noGrp="1"/>
+          </p:cNvSpPr>
+          <p:nvPr>
+            <p:ph type="body" idx="1"/>
+          </p:nvPr>
+        </p:nvSpPr>
+        <p:spPr/>
+        <p:txBody>
+          <a:bodyPr/>
+          <a:lstStyle/>
+          <a:p>
+            <a:pPr marL="0" marR="0" indent="0" algn="l" defTabSz="914400" rtl="0" eaLnBrk="1" fontAlgn="auto" latinLnBrk="0" hangingPunct="1">
+              <a:lnSpc>
+                <a:spcPct val="100000"/>
+              </a:lnSpc>
+              <a:spcBef>
+                <a:spcPts val="0"/>
+              </a:spcBef>
+              <a:spcAft>
+                <a:spcPts val="0"/>
+              </a:spcAft>
+              <a:buClrTx/>
+              <a:buSzTx/>
+              <a:buFontTx/>
+              <a:buNone/>
+              <a:tabLst/>
+              <a:defRPr/>
+            </a:pPr>
+            <a:r>
+              <a:rPr lang="it-IT" baseline="0" dirty="0" smtClean="0"/>
+              <a:t>------ POSSIBILITA DI RIPETEZIONE CON ALTRI TEAM ------</a:t>
+            </a:r>
+            <a:endParaRPr lang="it-IT" dirty="0" smtClean="0"/>
+          </a:p>
+          <a:p>
+            <a:endParaRPr lang="it-IT" dirty="0"/>
+          </a:p>
+        </p:txBody>
+      </p:sp>
+      <p:sp>
+        <p:nvSpPr>
+          <p:cNvPr id="4" name="Segnaposto numero diapositiva 3"/>
+          <p:cNvSpPr>
+            <a:spLocks noGrp="1"/>
+          </p:cNvSpPr>
+          <p:nvPr>
+            <p:ph type="sldNum" sz="quarter" idx="10"/>
+          </p:nvPr>
+        </p:nvSpPr>
+        <p:spPr/>
+        <p:txBody>
+          <a:bodyPr/>
+          <a:lstStyle/>
+          <a:p>
+            <a:fld id="{D70604CA-7593-4640-8FA1-5523937B8510}" type="slidenum">
+              <a:rPr lang="it-IT" smtClean="0"/>
+              <a:pPr/>
+              <a:t>44</a:t>
+            </a:fld>
+            <a:endParaRPr lang="it-IT"/>
+          </a:p>
+        </p:txBody>
+      </p:sp>
+    </p:spTree>
+    <p:extLst>
+      <p:ext uri="{BB962C8B-B14F-4D97-AF65-F5344CB8AC3E}">
+        <p14:creationId xmlns="" xmlns:p14="http://schemas.microsoft.com/office/powerpoint/2010/main" val="604861763"/>
       </p:ext>
     </p:extLst>
   </p:cSld>
@@ -4039,7 +4137,7 @@
     </p:spTree>
     <p:extLst>
       <p:ext uri="{BB962C8B-B14F-4D97-AF65-F5344CB8AC3E}">
-        <p14:creationId xmlns:p14="http://schemas.microsoft.com/office/powerpoint/2010/main" xmlns="" val="1357369038"/>
+        <p14:creationId xmlns="" xmlns:p14="http://schemas.microsoft.com/office/powerpoint/2010/main" val="1357369038"/>
       </p:ext>
     </p:extLst>
   </p:cSld>
@@ -4153,7 +4251,7 @@
     </p:spTree>
     <p:extLst>
       <p:ext uri="{BB962C8B-B14F-4D97-AF65-F5344CB8AC3E}">
-        <p14:creationId xmlns:p14="http://schemas.microsoft.com/office/powerpoint/2010/main" xmlns="" val="3780346060"/>
+        <p14:creationId xmlns="" xmlns:p14="http://schemas.microsoft.com/office/powerpoint/2010/main" val="3780346060"/>
       </p:ext>
     </p:extLst>
   </p:cSld>
@@ -4258,7 +4356,7 @@
     </p:spTree>
     <p:extLst>
       <p:ext uri="{BB962C8B-B14F-4D97-AF65-F5344CB8AC3E}">
-        <p14:creationId xmlns:p14="http://schemas.microsoft.com/office/powerpoint/2010/main" xmlns="" val="41796055"/>
+        <p14:creationId xmlns="" xmlns:p14="http://schemas.microsoft.com/office/powerpoint/2010/main" val="41796055"/>
       </p:ext>
     </p:extLst>
   </p:cSld>
@@ -4381,7 +4479,7 @@
     </p:spTree>
     <p:extLst>
       <p:ext uri="{BB962C8B-B14F-4D97-AF65-F5344CB8AC3E}">
-        <p14:creationId xmlns:p14="http://schemas.microsoft.com/office/powerpoint/2010/main" xmlns="" val="555626785"/>
+        <p14:creationId xmlns="" xmlns:p14="http://schemas.microsoft.com/office/powerpoint/2010/main" val="555626785"/>
       </p:ext>
     </p:extLst>
   </p:cSld>
@@ -4474,7 +4572,7 @@
     </p:spTree>
     <p:extLst>
       <p:ext uri="{BB962C8B-B14F-4D97-AF65-F5344CB8AC3E}">
-        <p14:creationId xmlns:p14="http://schemas.microsoft.com/office/powerpoint/2010/main" xmlns="" val="855395126"/>
+        <p14:creationId xmlns="" xmlns:p14="http://schemas.microsoft.com/office/powerpoint/2010/main" val="855395126"/>
       </p:ext>
     </p:extLst>
   </p:cSld>
@@ -4587,7 +4685,7 @@
     </p:spTree>
     <p:extLst>
       <p:ext uri="{BB962C8B-B14F-4D97-AF65-F5344CB8AC3E}">
-        <p14:creationId xmlns:p14="http://schemas.microsoft.com/office/powerpoint/2010/main" xmlns="" val="802928497"/>
+        <p14:creationId xmlns="" xmlns:p14="http://schemas.microsoft.com/office/powerpoint/2010/main" val="802928497"/>
       </p:ext>
     </p:extLst>
   </p:cSld>
@@ -4763,7 +4861,7 @@
             <a:fld id="{63CABBC0-75E4-43BB-A6A6-84C2A96BDB82}" type="datetimeFigureOut">
               <a:rPr lang="it-IT" smtClean="0"/>
               <a:pPr/>
-              <a:t>31/12/2012</a:t>
+              <a:t>01/01/2013</a:t>
             </a:fld>
             <a:endParaRPr lang="it-IT"/>
           </a:p>
@@ -4945,7 +5043,7 @@
             <a:fld id="{63CABBC0-75E4-43BB-A6A6-84C2A96BDB82}" type="datetimeFigureOut">
               <a:rPr lang="it-IT" smtClean="0"/>
               <a:pPr/>
-              <a:t>31/12/2012</a:t>
+              <a:t>01/01/2013</a:t>
             </a:fld>
             <a:endParaRPr lang="it-IT"/>
           </a:p>
@@ -5137,7 +5235,7 @@
             <a:fld id="{63CABBC0-75E4-43BB-A6A6-84C2A96BDB82}" type="datetimeFigureOut">
               <a:rPr lang="it-IT" smtClean="0"/>
               <a:pPr/>
-              <a:t>31/12/2012</a:t>
+              <a:t>01/01/2013</a:t>
             </a:fld>
             <a:endParaRPr lang="it-IT"/>
           </a:p>
@@ -5319,7 +5417,7 @@
             <a:fld id="{63CABBC0-75E4-43BB-A6A6-84C2A96BDB82}" type="datetimeFigureOut">
               <a:rPr lang="it-IT" smtClean="0"/>
               <a:pPr/>
-              <a:t>31/12/2012</a:t>
+              <a:t>01/01/2013</a:t>
             </a:fld>
             <a:endParaRPr lang="it-IT"/>
           </a:p>
@@ -5562,7 +5660,7 @@
             <a:fld id="{63CABBC0-75E4-43BB-A6A6-84C2A96BDB82}" type="datetimeFigureOut">
               <a:rPr lang="it-IT" smtClean="0"/>
               <a:pPr/>
-              <a:t>31/12/2012</a:t>
+              <a:t>01/01/2013</a:t>
             </a:fld>
             <a:endParaRPr lang="it-IT"/>
           </a:p>
@@ -5843,7 +5941,7 @@
             <a:fld id="{63CABBC0-75E4-43BB-A6A6-84C2A96BDB82}" type="datetimeFigureOut">
               <a:rPr lang="it-IT" smtClean="0"/>
               <a:pPr/>
-              <a:t>31/12/2012</a:t>
+              <a:t>01/01/2013</a:t>
             </a:fld>
             <a:endParaRPr lang="it-IT"/>
           </a:p>
@@ -6234,7 +6332,7 @@
             <a:fld id="{63CABBC0-75E4-43BB-A6A6-84C2A96BDB82}" type="datetimeFigureOut">
               <a:rPr lang="it-IT" smtClean="0"/>
               <a:pPr/>
-              <a:t>31/12/2012</a:t>
+              <a:t>01/01/2013</a:t>
             </a:fld>
             <a:endParaRPr lang="it-IT"/>
           </a:p>
@@ -6393,7 +6491,7 @@
             <a:fld id="{63CABBC0-75E4-43BB-A6A6-84C2A96BDB82}" type="datetimeFigureOut">
               <a:rPr lang="it-IT" smtClean="0"/>
               <a:pPr/>
-              <a:t>31/12/2012</a:t>
+              <a:t>01/01/2013</a:t>
             </a:fld>
             <a:endParaRPr lang="it-IT"/>
           </a:p>
@@ -6492,7 +6590,7 @@
             <a:fld id="{63CABBC0-75E4-43BB-A6A6-84C2A96BDB82}" type="datetimeFigureOut">
               <a:rPr lang="it-IT" smtClean="0"/>
               <a:pPr/>
-              <a:t>31/12/2012</a:t>
+              <a:t>01/01/2013</a:t>
             </a:fld>
             <a:endParaRPr lang="it-IT"/>
           </a:p>
@@ -6762,7 +6860,7 @@
             <a:fld id="{63CABBC0-75E4-43BB-A6A6-84C2A96BDB82}" type="datetimeFigureOut">
               <a:rPr lang="it-IT" smtClean="0"/>
               <a:pPr/>
-              <a:t>31/12/2012</a:t>
+              <a:t>01/01/2013</a:t>
             </a:fld>
             <a:endParaRPr lang="it-IT"/>
           </a:p>
@@ -7059,7 +7157,7 @@
             <a:fld id="{63CABBC0-75E4-43BB-A6A6-84C2A96BDB82}" type="datetimeFigureOut">
               <a:rPr lang="it-IT" smtClean="0"/>
               <a:pPr/>
-              <a:t>31/12/2012</a:t>
+              <a:t>01/01/2013</a:t>
             </a:fld>
             <a:endParaRPr lang="it-IT"/>
           </a:p>
@@ -7839,7 +7937,7 @@
             <a:fld id="{63CABBC0-75E4-43BB-A6A6-84C2A96BDB82}" type="datetimeFigureOut">
               <a:rPr lang="it-IT" smtClean="0"/>
               <a:pPr/>
-              <a:t>31/12/2012</a:t>
+              <a:t>01/01/2013</a:t>
             </a:fld>
             <a:endParaRPr lang="it-IT"/>
           </a:p>
@@ -8525,7 +8623,7 @@
           <a:blip r:embed="rId2">
             <a:extLst>
               <a:ext uri="{28A0092B-C50C-407E-A947-70E740481C1C}">
-                <a14:useLocalDpi xmlns:a14="http://schemas.microsoft.com/office/drawing/2010/main" xmlns="" val="0"/>
+                <a14:useLocalDpi xmlns="" xmlns:a14="http://schemas.microsoft.com/office/drawing/2010/main" val="0"/>
               </a:ext>
             </a:extLst>
           </a:blip>
@@ -8549,14 +8647,14 @@
           <a:effectLst/>
           <a:extLst>
             <a:ext uri="{909E8E84-426E-40DD-AFC4-6F175D3DCCD1}">
-              <a14:hiddenFill xmlns:a14="http://schemas.microsoft.com/office/drawing/2010/main" xmlns="">
+              <a14:hiddenFill xmlns="" xmlns:a14="http://schemas.microsoft.com/office/drawing/2010/main">
                 <a:solidFill>
                   <a:schemeClr val="accent1"/>
                 </a:solidFill>
               </a14:hiddenFill>
             </a:ext>
             <a:ext uri="{91240B29-F687-4F45-9708-019B960494DF}">
-              <a14:hiddenLine xmlns:a14="http://schemas.microsoft.com/office/drawing/2010/main" xmlns="" w="9525">
+              <a14:hiddenLine xmlns="" xmlns:a14="http://schemas.microsoft.com/office/drawing/2010/main" w="9525">
                 <a:solidFill>
                   <a:schemeClr val="tx1"/>
                 </a:solidFill>
@@ -8566,7 +8664,7 @@
               </a14:hiddenLine>
             </a:ext>
             <a:ext uri="{AF507438-7753-43E0-B8FC-AC1667EBCBE1}">
-              <a14:hiddenEffects xmlns:a14="http://schemas.microsoft.com/office/drawing/2010/main" xmlns="">
+              <a14:hiddenEffects xmlns="" xmlns:a14="http://schemas.microsoft.com/office/drawing/2010/main">
                 <a:effectLst>
                   <a:outerShdw dist="35921" dir="2700000" algn="ctr" rotWithShape="0">
                     <a:schemeClr val="bg2"/>
@@ -8586,7 +8684,7 @@
           <p:nvPr>
             <p:extLst>
               <p:ext uri="{D42A27DB-BD31-4B8C-83A1-F6EECF244321}">
-                <p14:modId xmlns:p14="http://schemas.microsoft.com/office/powerpoint/2010/main" xmlns="" val="669990601"/>
+                <p14:modId xmlns="" xmlns:p14="http://schemas.microsoft.com/office/powerpoint/2010/main" val="669990601"/>
               </p:ext>
             </p:extLst>
           </p:nvPr>
@@ -8763,7 +8861,7 @@
           <p:nvPr>
             <p:extLst>
               <p:ext uri="{D42A27DB-BD31-4B8C-83A1-F6EECF244321}">
-                <p14:modId xmlns:p14="http://schemas.microsoft.com/office/powerpoint/2010/main" xmlns="" val="1867475245"/>
+                <p14:modId xmlns="" xmlns:p14="http://schemas.microsoft.com/office/powerpoint/2010/main" val="1867475245"/>
               </p:ext>
             </p:extLst>
           </p:nvPr>
@@ -8894,7 +8992,7 @@
     </p:spTree>
     <p:extLst>
       <p:ext uri="{BB962C8B-B14F-4D97-AF65-F5344CB8AC3E}">
-        <p14:creationId xmlns:p14="http://schemas.microsoft.com/office/powerpoint/2010/main" xmlns="" val="4165334171"/>
+        <p14:creationId xmlns="" xmlns:p14="http://schemas.microsoft.com/office/powerpoint/2010/main" val="4165334171"/>
       </p:ext>
     </p:extLst>
   </p:cSld>
@@ -9190,7 +9288,7 @@
     </p:spTree>
     <p:extLst>
       <p:ext uri="{BB962C8B-B14F-4D97-AF65-F5344CB8AC3E}">
-        <p14:creationId xmlns:p14="http://schemas.microsoft.com/office/powerpoint/2010/main" xmlns="" val="155874689"/>
+        <p14:creationId xmlns="" xmlns:p14="http://schemas.microsoft.com/office/powerpoint/2010/main" val="155874689"/>
       </p:ext>
     </p:extLst>
   </p:cSld>
@@ -9198,7 +9296,7 @@
     <a:masterClrMapping/>
   </p:clrMapOvr>
   <mc:AlternateContent xmlns:mc="http://schemas.openxmlformats.org/markup-compatibility/2006">
-    <mc:Choice xmlns:p14="http://schemas.microsoft.com/office/powerpoint/2010/main" xmlns="" Requires="p14">
+    <mc:Choice xmlns="" xmlns:p14="http://schemas.microsoft.com/office/powerpoint/2010/main" Requires="p14">
       <p:transition spd="slow" p14:dur="2000"/>
     </mc:Choice>
     <mc:Fallback>
@@ -9704,7 +9802,7 @@
     </p:spTree>
     <p:extLst>
       <p:ext uri="{BB962C8B-B14F-4D97-AF65-F5344CB8AC3E}">
-        <p14:creationId xmlns:p14="http://schemas.microsoft.com/office/powerpoint/2010/main" xmlns="" val="155874689"/>
+        <p14:creationId xmlns="" xmlns:p14="http://schemas.microsoft.com/office/powerpoint/2010/main" val="155874689"/>
       </p:ext>
     </p:extLst>
   </p:cSld>
@@ -9712,7 +9810,7 @@
     <a:masterClrMapping/>
   </p:clrMapOvr>
   <mc:AlternateContent xmlns:mc="http://schemas.openxmlformats.org/markup-compatibility/2006">
-    <mc:Choice xmlns:p14="http://schemas.microsoft.com/office/powerpoint/2010/main" xmlns="" Requires="p14">
+    <mc:Choice xmlns="" xmlns:p14="http://schemas.microsoft.com/office/powerpoint/2010/main" Requires="p14">
       <p:transition spd="slow" p14:dur="2000"/>
     </mc:Choice>
     <mc:Fallback>
@@ -10209,7 +10307,7 @@
     </p:spTree>
     <p:extLst>
       <p:ext uri="{BB962C8B-B14F-4D97-AF65-F5344CB8AC3E}">
-        <p14:creationId xmlns:p14="http://schemas.microsoft.com/office/powerpoint/2010/main" xmlns="" val="155874689"/>
+        <p14:creationId xmlns="" xmlns:p14="http://schemas.microsoft.com/office/powerpoint/2010/main" val="155874689"/>
       </p:ext>
     </p:extLst>
   </p:cSld>
@@ -10217,7 +10315,7 @@
     <a:masterClrMapping/>
   </p:clrMapOvr>
   <mc:AlternateContent xmlns:mc="http://schemas.openxmlformats.org/markup-compatibility/2006">
-    <mc:Choice xmlns:p14="http://schemas.microsoft.com/office/powerpoint/2010/main" xmlns="" Requires="p14">
+    <mc:Choice xmlns="" xmlns:p14="http://schemas.microsoft.com/office/powerpoint/2010/main" Requires="p14">
       <p:transition spd="slow" p14:dur="2000"/>
     </mc:Choice>
     <mc:Fallback>
@@ -12315,7 +12413,6 @@
               <a:rPr lang="it-IT" sz="2200" dirty="0" smtClean="0"/>
               <a:t>Obiettivo:</a:t>
             </a:r>
-            <a:endParaRPr lang="it-IT" sz="2200" dirty="0" smtClean="0"/>
           </a:p>
           <a:p>
             <a:pPr marL="742950" lvl="1" indent="-285750">
@@ -12395,7 +12492,7 @@
           <a:blip r:embed="rId3">
             <a:extLst>
               <a:ext uri="{28A0092B-C50C-407E-A947-70E740481C1C}">
-                <a14:useLocalDpi xmlns:a14="http://schemas.microsoft.com/office/drawing/2010/main" xmlns="" val="0"/>
+                <a14:useLocalDpi xmlns="" xmlns:a14="http://schemas.microsoft.com/office/drawing/2010/main" val="0"/>
               </a:ext>
             </a:extLst>
           </a:blip>
@@ -12415,7 +12512,7 @@
           <a:noFill/>
           <a:extLst>
             <a:ext uri="{909E8E84-426E-40DD-AFC4-6F175D3DCCD1}">
-              <a14:hiddenFill xmlns:a14="http://schemas.microsoft.com/office/drawing/2010/main" xmlns="">
+              <a14:hiddenFill xmlns="" xmlns:a14="http://schemas.microsoft.com/office/drawing/2010/main">
                 <a:solidFill>
                   <a:srgbClr val="FFFFFF"/>
                 </a:solidFill>
@@ -12436,7 +12533,7 @@
           <a:blip r:embed="rId4">
             <a:extLst>
               <a:ext uri="{28A0092B-C50C-407E-A947-70E740481C1C}">
-                <a14:useLocalDpi xmlns:a14="http://schemas.microsoft.com/office/drawing/2010/main" xmlns="" val="0"/>
+                <a14:useLocalDpi xmlns="" xmlns:a14="http://schemas.microsoft.com/office/drawing/2010/main" val="0"/>
               </a:ext>
             </a:extLst>
           </a:blip>
@@ -12456,7 +12553,7 @@
           <a:noFill/>
           <a:extLst>
             <a:ext uri="{909E8E84-426E-40DD-AFC4-6F175D3DCCD1}">
-              <a14:hiddenFill xmlns:a14="http://schemas.microsoft.com/office/drawing/2010/main" xmlns="">
+              <a14:hiddenFill xmlns="" xmlns:a14="http://schemas.microsoft.com/office/drawing/2010/main">
                 <a:solidFill>
                   <a:srgbClr val="FFFFFF"/>
                 </a:solidFill>
@@ -12502,7 +12599,7 @@
     </p:spTree>
     <p:extLst>
       <p:ext uri="{BB962C8B-B14F-4D97-AF65-F5344CB8AC3E}">
-        <p14:creationId xmlns:p14="http://schemas.microsoft.com/office/powerpoint/2010/main" xmlns="" val="1277526579"/>
+        <p14:creationId xmlns="" xmlns:p14="http://schemas.microsoft.com/office/powerpoint/2010/main" val="1277526579"/>
       </p:ext>
     </p:extLst>
   </p:cSld>
@@ -12814,7 +12911,7 @@
           <a:blip r:embed="rId3">
             <a:extLst>
               <a:ext uri="{28A0092B-C50C-407E-A947-70E740481C1C}">
-                <a14:useLocalDpi xmlns:a14="http://schemas.microsoft.com/office/drawing/2010/main" xmlns="" val="0"/>
+                <a14:useLocalDpi xmlns="" xmlns:a14="http://schemas.microsoft.com/office/drawing/2010/main" val="0"/>
               </a:ext>
             </a:extLst>
           </a:blip>
@@ -12834,7 +12931,7 @@
           <a:noFill/>
           <a:extLst>
             <a:ext uri="{909E8E84-426E-40DD-AFC4-6F175D3DCCD1}">
-              <a14:hiddenFill xmlns:a14="http://schemas.microsoft.com/office/drawing/2010/main" xmlns="">
+              <a14:hiddenFill xmlns="" xmlns:a14="http://schemas.microsoft.com/office/drawing/2010/main">
                 <a:solidFill>
                   <a:srgbClr val="FFFFFF"/>
                 </a:solidFill>
@@ -12855,7 +12952,7 @@
           <a:blip r:embed="rId4" cstate="print">
             <a:extLst>
               <a:ext uri="{28A0092B-C50C-407E-A947-70E740481C1C}">
-                <a14:useLocalDpi xmlns:a14="http://schemas.microsoft.com/office/drawing/2010/main" xmlns="" val="0"/>
+                <a14:useLocalDpi xmlns="" xmlns:a14="http://schemas.microsoft.com/office/drawing/2010/main" val="0"/>
               </a:ext>
             </a:extLst>
           </a:blip>
@@ -12875,7 +12972,7 @@
           <a:noFill/>
           <a:extLst>
             <a:ext uri="{909E8E84-426E-40DD-AFC4-6F175D3DCCD1}">
-              <a14:hiddenFill xmlns:a14="http://schemas.microsoft.com/office/drawing/2010/main" xmlns="">
+              <a14:hiddenFill xmlns="" xmlns:a14="http://schemas.microsoft.com/office/drawing/2010/main">
                 <a:solidFill>
                   <a:srgbClr val="FFFFFF"/>
                 </a:solidFill>
@@ -12896,7 +12993,7 @@
           <a:blip r:embed="rId5">
             <a:extLst>
               <a:ext uri="{28A0092B-C50C-407E-A947-70E740481C1C}">
-                <a14:useLocalDpi xmlns:a14="http://schemas.microsoft.com/office/drawing/2010/main" xmlns="" val="0"/>
+                <a14:useLocalDpi xmlns="" xmlns:a14="http://schemas.microsoft.com/office/drawing/2010/main" val="0"/>
               </a:ext>
             </a:extLst>
           </a:blip>
@@ -12916,7 +13013,7 @@
           <a:noFill/>
           <a:extLst>
             <a:ext uri="{909E8E84-426E-40DD-AFC4-6F175D3DCCD1}">
-              <a14:hiddenFill xmlns:a14="http://schemas.microsoft.com/office/drawing/2010/main" xmlns="">
+              <a14:hiddenFill xmlns="" xmlns:a14="http://schemas.microsoft.com/office/drawing/2010/main">
                 <a:solidFill>
                   <a:srgbClr val="FFFFFF"/>
                 </a:solidFill>
@@ -13018,7 +13115,7 @@
     </p:spTree>
     <p:extLst>
       <p:ext uri="{BB962C8B-B14F-4D97-AF65-F5344CB8AC3E}">
-        <p14:creationId xmlns:p14="http://schemas.microsoft.com/office/powerpoint/2010/main" xmlns="" val="418107373"/>
+        <p14:creationId xmlns="" xmlns:p14="http://schemas.microsoft.com/office/powerpoint/2010/main" val="418107373"/>
       </p:ext>
     </p:extLst>
   </p:cSld>
@@ -13484,7 +13581,7 @@
           <a:blip r:embed="rId4">
             <a:extLst>
               <a:ext uri="{28A0092B-C50C-407E-A947-70E740481C1C}">
-                <a14:useLocalDpi xmlns:a14="http://schemas.microsoft.com/office/drawing/2010/main" xmlns="" val="0"/>
+                <a14:useLocalDpi xmlns="" xmlns:a14="http://schemas.microsoft.com/office/drawing/2010/main" val="0"/>
               </a:ext>
             </a:extLst>
           </a:blip>
@@ -13504,7 +13601,7 @@
           <a:noFill/>
           <a:extLst>
             <a:ext uri="{909E8E84-426E-40DD-AFC4-6F175D3DCCD1}">
-              <a14:hiddenFill xmlns:a14="http://schemas.microsoft.com/office/drawing/2010/main" xmlns="">
+              <a14:hiddenFill xmlns="" xmlns:a14="http://schemas.microsoft.com/office/drawing/2010/main">
                 <a:solidFill>
                   <a:srgbClr val="FFFFFF"/>
                 </a:solidFill>
@@ -13951,7 +14048,7 @@
     </p:spTree>
     <p:extLst>
       <p:ext uri="{BB962C8B-B14F-4D97-AF65-F5344CB8AC3E}">
-        <p14:creationId xmlns:p14="http://schemas.microsoft.com/office/powerpoint/2010/main" xmlns="" val="2879521852"/>
+        <p14:creationId xmlns="" xmlns:p14="http://schemas.microsoft.com/office/powerpoint/2010/main" val="2879521852"/>
       </p:ext>
     </p:extLst>
   </p:cSld>
@@ -13959,7 +14056,7 @@
     <a:masterClrMapping/>
   </p:clrMapOvr>
   <mc:AlternateContent xmlns:mc="http://schemas.openxmlformats.org/markup-compatibility/2006">
-    <mc:Choice xmlns:p14="http://schemas.microsoft.com/office/powerpoint/2010/main" xmlns="" Requires="p14">
+    <mc:Choice xmlns="" xmlns:p14="http://schemas.microsoft.com/office/powerpoint/2010/main" Requires="p14">
       <p:transition spd="slow" p14:dur="2000"/>
     </mc:Choice>
     <mc:Fallback>
@@ -14282,7 +14379,7 @@
           <a:blip r:embed="rId3">
             <a:extLst>
               <a:ext uri="{28A0092B-C50C-407E-A947-70E740481C1C}">
-                <a14:useLocalDpi xmlns:a14="http://schemas.microsoft.com/office/drawing/2010/main" xmlns="" val="0"/>
+                <a14:useLocalDpi xmlns="" xmlns:a14="http://schemas.microsoft.com/office/drawing/2010/main" val="0"/>
               </a:ext>
             </a:extLst>
           </a:blip>
@@ -14302,7 +14399,7 @@
           <a:noFill/>
           <a:extLst>
             <a:ext uri="{909E8E84-426E-40DD-AFC4-6F175D3DCCD1}">
-              <a14:hiddenFill xmlns:a14="http://schemas.microsoft.com/office/drawing/2010/main" xmlns="">
+              <a14:hiddenFill xmlns="" xmlns:a14="http://schemas.microsoft.com/office/drawing/2010/main">
                 <a:solidFill>
                   <a:srgbClr val="FFFFFF"/>
                 </a:solidFill>
@@ -14823,7 +14920,7 @@
     </p:spTree>
     <p:extLst>
       <p:ext uri="{BB962C8B-B14F-4D97-AF65-F5344CB8AC3E}">
-        <p14:creationId xmlns:p14="http://schemas.microsoft.com/office/powerpoint/2010/main" xmlns="" val="202613363"/>
+        <p14:creationId xmlns="" xmlns:p14="http://schemas.microsoft.com/office/powerpoint/2010/main" val="202613363"/>
       </p:ext>
     </p:extLst>
   </p:cSld>
@@ -14831,7 +14928,7 @@
     <a:masterClrMapping/>
   </p:clrMapOvr>
   <mc:AlternateContent xmlns:mc="http://schemas.openxmlformats.org/markup-compatibility/2006">
-    <mc:Choice xmlns:p14="http://schemas.microsoft.com/office/powerpoint/2010/main" xmlns="" Requires="p14">
+    <mc:Choice xmlns="" xmlns:p14="http://schemas.microsoft.com/office/powerpoint/2010/main" Requires="p14">
       <p:transition spd="slow" p14:dur="2000"/>
     </mc:Choice>
     <mc:Fallback>
@@ -15156,7 +15253,7 @@
           <a:blip r:embed="rId3">
             <a:extLst>
               <a:ext uri="{28A0092B-C50C-407E-A947-70E740481C1C}">
-                <a14:useLocalDpi xmlns:a14="http://schemas.microsoft.com/office/drawing/2010/main" xmlns="" val="0"/>
+                <a14:useLocalDpi xmlns="" xmlns:a14="http://schemas.microsoft.com/office/drawing/2010/main" val="0"/>
               </a:ext>
             </a:extLst>
           </a:blip>
@@ -15176,7 +15273,7 @@
           <a:noFill/>
           <a:extLst>
             <a:ext uri="{909E8E84-426E-40DD-AFC4-6F175D3DCCD1}">
-              <a14:hiddenFill xmlns:a14="http://schemas.microsoft.com/office/drawing/2010/main" xmlns="">
+              <a14:hiddenFill xmlns="" xmlns:a14="http://schemas.microsoft.com/office/drawing/2010/main">
                 <a:solidFill>
                   <a:srgbClr val="FFFFFF"/>
                 </a:solidFill>
@@ -15197,7 +15294,7 @@
           <a:blip r:embed="rId4">
             <a:extLst>
               <a:ext uri="{28A0092B-C50C-407E-A947-70E740481C1C}">
-                <a14:useLocalDpi xmlns:a14="http://schemas.microsoft.com/office/drawing/2010/main" xmlns="" val="0"/>
+                <a14:useLocalDpi xmlns="" xmlns:a14="http://schemas.microsoft.com/office/drawing/2010/main" val="0"/>
               </a:ext>
             </a:extLst>
           </a:blip>
@@ -15217,7 +15314,7 @@
           <a:noFill/>
           <a:extLst>
             <a:ext uri="{909E8E84-426E-40DD-AFC4-6F175D3DCCD1}">
-              <a14:hiddenFill xmlns:a14="http://schemas.microsoft.com/office/drawing/2010/main" xmlns="">
+              <a14:hiddenFill xmlns="" xmlns:a14="http://schemas.microsoft.com/office/drawing/2010/main">
                 <a:solidFill>
                   <a:srgbClr val="FFFFFF"/>
                 </a:solidFill>
@@ -15541,7 +15638,7 @@
     </p:spTree>
     <p:extLst>
       <p:ext uri="{BB962C8B-B14F-4D97-AF65-F5344CB8AC3E}">
-        <p14:creationId xmlns:p14="http://schemas.microsoft.com/office/powerpoint/2010/main" xmlns="" val="1197112555"/>
+        <p14:creationId xmlns="" xmlns:p14="http://schemas.microsoft.com/office/powerpoint/2010/main" val="1197112555"/>
       </p:ext>
     </p:extLst>
   </p:cSld>
@@ -15549,7 +15646,7 @@
     <a:masterClrMapping/>
   </p:clrMapOvr>
   <mc:AlternateContent xmlns:mc="http://schemas.openxmlformats.org/markup-compatibility/2006">
-    <mc:Choice xmlns:p14="http://schemas.microsoft.com/office/powerpoint/2010/main" xmlns="" Requires="p14">
+    <mc:Choice xmlns="" xmlns:p14="http://schemas.microsoft.com/office/powerpoint/2010/main" Requires="p14">
       <p:transition spd="slow" p14:dur="2000"/>
     </mc:Choice>
     <mc:Fallback>
@@ -16636,7 +16733,7 @@
     </p:spTree>
     <p:extLst>
       <p:ext uri="{BB962C8B-B14F-4D97-AF65-F5344CB8AC3E}">
-        <p14:creationId xmlns:p14="http://schemas.microsoft.com/office/powerpoint/2010/main" xmlns="" val="155874689"/>
+        <p14:creationId xmlns="" xmlns:p14="http://schemas.microsoft.com/office/powerpoint/2010/main" val="155874689"/>
       </p:ext>
     </p:extLst>
   </p:cSld>
@@ -16644,7 +16741,7 @@
     <a:masterClrMapping/>
   </p:clrMapOvr>
   <mc:AlternateContent xmlns:mc="http://schemas.openxmlformats.org/markup-compatibility/2006">
-    <mc:Choice xmlns:p14="http://schemas.microsoft.com/office/powerpoint/2010/main" xmlns="" Requires="p14">
+    <mc:Choice xmlns="" xmlns:p14="http://schemas.microsoft.com/office/powerpoint/2010/main" Requires="p14">
       <p:transition spd="slow" p14:dur="2000"/>
     </mc:Choice>
     <mc:Fallback>
@@ -17008,7 +17105,7 @@
           <a:blip r:embed="rId3">
             <a:extLst>
               <a:ext uri="{28A0092B-C50C-407E-A947-70E740481C1C}">
-                <a14:useLocalDpi xmlns:a14="http://schemas.microsoft.com/office/drawing/2010/main" xmlns="" val="0"/>
+                <a14:useLocalDpi xmlns="" xmlns:a14="http://schemas.microsoft.com/office/drawing/2010/main" val="0"/>
               </a:ext>
             </a:extLst>
           </a:blip>
@@ -17028,7 +17125,7 @@
           <a:noFill/>
           <a:extLst>
             <a:ext uri="{909E8E84-426E-40DD-AFC4-6F175D3DCCD1}">
-              <a14:hiddenFill xmlns:a14="http://schemas.microsoft.com/office/drawing/2010/main" xmlns="">
+              <a14:hiddenFill xmlns="" xmlns:a14="http://schemas.microsoft.com/office/drawing/2010/main">
                 <a:solidFill>
                   <a:srgbClr val="FFFFFF"/>
                 </a:solidFill>
@@ -17049,7 +17146,7 @@
           <a:blip r:embed="rId4">
             <a:extLst>
               <a:ext uri="{28A0092B-C50C-407E-A947-70E740481C1C}">
-                <a14:useLocalDpi xmlns:a14="http://schemas.microsoft.com/office/drawing/2010/main" xmlns="" val="0"/>
+                <a14:useLocalDpi xmlns="" xmlns:a14="http://schemas.microsoft.com/office/drawing/2010/main" val="0"/>
               </a:ext>
             </a:extLst>
           </a:blip>
@@ -17078,7 +17175,7 @@
           </a:effectLst>
           <a:extLst>
             <a:ext uri="{909E8E84-426E-40DD-AFC4-6F175D3DCCD1}">
-              <a14:hiddenFill xmlns:a14="http://schemas.microsoft.com/office/drawing/2010/main" xmlns="">
+              <a14:hiddenFill xmlns="" xmlns:a14="http://schemas.microsoft.com/office/drawing/2010/main">
                 <a:solidFill>
                   <a:srgbClr val="FFFFFF"/>
                 </a:solidFill>
@@ -17116,7 +17213,7 @@
     </p:spTree>
     <p:extLst>
       <p:ext uri="{BB962C8B-B14F-4D97-AF65-F5344CB8AC3E}">
-        <p14:creationId xmlns:p14="http://schemas.microsoft.com/office/powerpoint/2010/main" xmlns="" val="700353664"/>
+        <p14:creationId xmlns="" xmlns:p14="http://schemas.microsoft.com/office/powerpoint/2010/main" val="700353664"/>
       </p:ext>
     </p:extLst>
   </p:cSld>
@@ -17124,7 +17221,7 @@
     <a:masterClrMapping/>
   </p:clrMapOvr>
   <mc:AlternateContent xmlns:mc="http://schemas.openxmlformats.org/markup-compatibility/2006">
-    <mc:Choice xmlns:p14="http://schemas.microsoft.com/office/powerpoint/2010/main" xmlns="" Requires="p14">
+    <mc:Choice xmlns="" xmlns:p14="http://schemas.microsoft.com/office/powerpoint/2010/main" Requires="p14">
       <p:transition spd="slow" p14:dur="2000"/>
     </mc:Choice>
     <mc:Fallback>
@@ -17983,7 +18080,7 @@
           <a:blip r:embed="rId3">
             <a:extLst>
               <a:ext uri="{28A0092B-C50C-407E-A947-70E740481C1C}">
-                <a14:useLocalDpi xmlns:a14="http://schemas.microsoft.com/office/drawing/2010/main" xmlns="" val="0"/>
+                <a14:useLocalDpi xmlns="" xmlns:a14="http://schemas.microsoft.com/office/drawing/2010/main" val="0"/>
               </a:ext>
             </a:extLst>
           </a:blip>
@@ -18008,7 +18105,7 @@
           </a:effectLst>
           <a:extLst>
             <a:ext uri="{909E8E84-426E-40DD-AFC4-6F175D3DCCD1}">
-              <a14:hiddenFill xmlns:a14="http://schemas.microsoft.com/office/drawing/2010/main" xmlns="">
+              <a14:hiddenFill xmlns="" xmlns:a14="http://schemas.microsoft.com/office/drawing/2010/main">
                 <a:solidFill>
                   <a:srgbClr val="FFFFFF"/>
                 </a:solidFill>
@@ -18029,7 +18126,7 @@
           <a:blip r:embed="rId4">
             <a:extLst>
               <a:ext uri="{28A0092B-C50C-407E-A947-70E740481C1C}">
-                <a14:useLocalDpi xmlns:a14="http://schemas.microsoft.com/office/drawing/2010/main" xmlns="" val="0"/>
+                <a14:useLocalDpi xmlns="" xmlns:a14="http://schemas.microsoft.com/office/drawing/2010/main" val="0"/>
               </a:ext>
             </a:extLst>
           </a:blip>
@@ -18049,7 +18146,7 @@
           <a:noFill/>
           <a:extLst>
             <a:ext uri="{909E8E84-426E-40DD-AFC4-6F175D3DCCD1}">
-              <a14:hiddenFill xmlns:a14="http://schemas.microsoft.com/office/drawing/2010/main" xmlns="">
+              <a14:hiddenFill xmlns="" xmlns:a14="http://schemas.microsoft.com/office/drawing/2010/main">
                 <a:solidFill>
                   <a:srgbClr val="FFFFFF"/>
                 </a:solidFill>
@@ -18095,7 +18192,7 @@
     </p:spTree>
     <p:extLst>
       <p:ext uri="{BB962C8B-B14F-4D97-AF65-F5344CB8AC3E}">
-        <p14:creationId xmlns:p14="http://schemas.microsoft.com/office/powerpoint/2010/main" xmlns="" val="2947224754"/>
+        <p14:creationId xmlns="" xmlns:p14="http://schemas.microsoft.com/office/powerpoint/2010/main" val="2947224754"/>
       </p:ext>
     </p:extLst>
   </p:cSld>
@@ -18412,7 +18509,7 @@
           <a:blip r:embed="rId3">
             <a:extLst>
               <a:ext uri="{28A0092B-C50C-407E-A947-70E740481C1C}">
-                <a14:useLocalDpi xmlns:a14="http://schemas.microsoft.com/office/drawing/2010/main" xmlns="" val="0"/>
+                <a14:useLocalDpi xmlns="" xmlns:a14="http://schemas.microsoft.com/office/drawing/2010/main" val="0"/>
               </a:ext>
             </a:extLst>
           </a:blip>
@@ -18432,7 +18529,7 @@
           <a:noFill/>
           <a:extLst>
             <a:ext uri="{909E8E84-426E-40DD-AFC4-6F175D3DCCD1}">
-              <a14:hiddenFill xmlns:a14="http://schemas.microsoft.com/office/drawing/2010/main" xmlns="">
+              <a14:hiddenFill xmlns="" xmlns:a14="http://schemas.microsoft.com/office/drawing/2010/main">
                 <a:solidFill>
                   <a:srgbClr val="FFFFFF"/>
                 </a:solidFill>
@@ -18987,7 +19084,7 @@
     </p:spTree>
     <p:extLst>
       <p:ext uri="{BB962C8B-B14F-4D97-AF65-F5344CB8AC3E}">
-        <p14:creationId xmlns:p14="http://schemas.microsoft.com/office/powerpoint/2010/main" xmlns="" val="1111877724"/>
+        <p14:creationId xmlns="" xmlns:p14="http://schemas.microsoft.com/office/powerpoint/2010/main" val="1111877724"/>
       </p:ext>
     </p:extLst>
   </p:cSld>
@@ -18995,7 +19092,7 @@
     <a:masterClrMapping/>
   </p:clrMapOvr>
   <mc:AlternateContent xmlns:mc="http://schemas.openxmlformats.org/markup-compatibility/2006">
-    <mc:Choice xmlns:p14="http://schemas.microsoft.com/office/powerpoint/2010/main" xmlns="" Requires="p14">
+    <mc:Choice xmlns="" xmlns:p14="http://schemas.microsoft.com/office/powerpoint/2010/main" Requires="p14">
       <p:transition spd="slow" p14:dur="2000"/>
     </mc:Choice>
     <mc:Fallback>
@@ -19377,7 +19474,7 @@
           <p:nvPr>
             <p:extLst>
               <p:ext uri="{D42A27DB-BD31-4B8C-83A1-F6EECF244321}">
-                <p14:modId xmlns:p14="http://schemas.microsoft.com/office/powerpoint/2010/main" xmlns="" val="2643884637"/>
+                <p14:modId xmlns="" xmlns:p14="http://schemas.microsoft.com/office/powerpoint/2010/main" val="2643884637"/>
               </p:ext>
             </p:extLst>
           </p:nvPr>
@@ -19818,14 +19915,14 @@
           <a:effectLst/>
           <a:extLst>
             <a:ext uri="{909E8E84-426E-40DD-AFC4-6F175D3DCCD1}">
-              <a14:hiddenFill xmlns:a14="http://schemas.microsoft.com/office/drawing/2010/main" xmlns="">
+              <a14:hiddenFill xmlns="" xmlns:a14="http://schemas.microsoft.com/office/drawing/2010/main">
                 <a:solidFill>
                   <a:schemeClr val="accent1"/>
                 </a:solidFill>
               </a14:hiddenFill>
             </a:ext>
             <a:ext uri="{91240B29-F687-4F45-9708-019B960494DF}">
-              <a14:hiddenLine xmlns:a14="http://schemas.microsoft.com/office/drawing/2010/main" xmlns="" w="9525">
+              <a14:hiddenLine xmlns="" xmlns:a14="http://schemas.microsoft.com/office/drawing/2010/main" w="9525">
                 <a:solidFill>
                   <a:schemeClr val="tx1"/>
                 </a:solidFill>
@@ -19835,7 +19932,7 @@
               </a14:hiddenLine>
             </a:ext>
             <a:ext uri="{AF507438-7753-43E0-B8FC-AC1667EBCBE1}">
-              <a14:hiddenEffects xmlns:a14="http://schemas.microsoft.com/office/drawing/2010/main" xmlns="">
+              <a14:hiddenEffects xmlns="" xmlns:a14="http://schemas.microsoft.com/office/drawing/2010/main">
                 <a:effectLst>
                   <a:outerShdw dist="35921" dir="2700000" algn="ctr" rotWithShape="0">
                     <a:schemeClr val="bg2"/>
@@ -19916,7 +20013,7 @@
     </p:spTree>
     <p:extLst>
       <p:ext uri="{BB962C8B-B14F-4D97-AF65-F5344CB8AC3E}">
-        <p14:creationId xmlns:p14="http://schemas.microsoft.com/office/powerpoint/2010/main" xmlns="" val="503117530"/>
+        <p14:creationId xmlns="" xmlns:p14="http://schemas.microsoft.com/office/powerpoint/2010/main" val="503117530"/>
       </p:ext>
     </p:extLst>
   </p:cSld>
@@ -20001,7 +20098,7 @@
           <p:nvPr>
             <p:extLst>
               <p:ext uri="{D42A27DB-BD31-4B8C-83A1-F6EECF244321}">
-                <p14:modId xmlns:p14="http://schemas.microsoft.com/office/powerpoint/2010/main" xmlns="" val="722892891"/>
+                <p14:modId xmlns="" xmlns:p14="http://schemas.microsoft.com/office/powerpoint/2010/main" val="722892891"/>
               </p:ext>
             </p:extLst>
           </p:nvPr>
@@ -20983,7 +21080,7 @@
     </p:spTree>
     <p:extLst>
       <p:ext uri="{BB962C8B-B14F-4D97-AF65-F5344CB8AC3E}">
-        <p14:creationId xmlns:p14="http://schemas.microsoft.com/office/powerpoint/2010/main" xmlns="" val="2473970557"/>
+        <p14:creationId xmlns="" xmlns:p14="http://schemas.microsoft.com/office/powerpoint/2010/main" val="2473970557"/>
       </p:ext>
     </p:extLst>
   </p:cSld>
@@ -21029,7 +21126,7 @@
           <a:blip r:embed="rId3">
             <a:extLst>
               <a:ext uri="{28A0092B-C50C-407E-A947-70E740481C1C}">
-                <a14:useLocalDpi xmlns:a14="http://schemas.microsoft.com/office/drawing/2010/main" xmlns="" val="0"/>
+                <a14:useLocalDpi xmlns="" xmlns:a14="http://schemas.microsoft.com/office/drawing/2010/main" val="0"/>
               </a:ext>
             </a:extLst>
           </a:blip>
@@ -21072,7 +21169,7 @@
           </a:sp3d>
           <a:extLst>
             <a:ext uri="{909E8E84-426E-40DD-AFC4-6F175D3DCCD1}">
-              <a14:hiddenFill xmlns:a14="http://schemas.microsoft.com/office/drawing/2010/main" xmlns="">
+              <a14:hiddenFill xmlns="" xmlns:a14="http://schemas.microsoft.com/office/drawing/2010/main">
                 <a:solidFill>
                   <a:srgbClr val="FFFFFF"/>
                 </a:solidFill>
@@ -21602,7 +21699,7 @@
           <a:blip r:embed="rId3">
             <a:extLst>
               <a:ext uri="{28A0092B-C50C-407E-A947-70E740481C1C}">
-                <a14:useLocalDpi xmlns:a14="http://schemas.microsoft.com/office/drawing/2010/main" xmlns="" val="0"/>
+                <a14:useLocalDpi xmlns="" xmlns:a14="http://schemas.microsoft.com/office/drawing/2010/main" val="0"/>
               </a:ext>
             </a:extLst>
           </a:blip>
@@ -21626,14 +21723,14 @@
           <a:effectLst/>
           <a:extLst>
             <a:ext uri="{909E8E84-426E-40DD-AFC4-6F175D3DCCD1}">
-              <a14:hiddenFill xmlns:a14="http://schemas.microsoft.com/office/drawing/2010/main" xmlns="">
+              <a14:hiddenFill xmlns="" xmlns:a14="http://schemas.microsoft.com/office/drawing/2010/main">
                 <a:solidFill>
                   <a:schemeClr val="accent1"/>
                 </a:solidFill>
               </a14:hiddenFill>
             </a:ext>
             <a:ext uri="{91240B29-F687-4F45-9708-019B960494DF}">
-              <a14:hiddenLine xmlns:a14="http://schemas.microsoft.com/office/drawing/2010/main" xmlns="" w="9525">
+              <a14:hiddenLine xmlns="" xmlns:a14="http://schemas.microsoft.com/office/drawing/2010/main" w="9525">
                 <a:solidFill>
                   <a:schemeClr val="tx1"/>
                 </a:solidFill>
@@ -21643,7 +21740,7 @@
               </a14:hiddenLine>
             </a:ext>
             <a:ext uri="{AF507438-7753-43E0-B8FC-AC1667EBCBE1}">
-              <a14:hiddenEffects xmlns:a14="http://schemas.microsoft.com/office/drawing/2010/main" xmlns="">
+              <a14:hiddenEffects xmlns="" xmlns:a14="http://schemas.microsoft.com/office/drawing/2010/main">
                 <a:effectLst>
                   <a:outerShdw dist="35921" dir="2700000" algn="ctr" rotWithShape="0">
                     <a:schemeClr val="bg2"/>
@@ -21744,14 +21841,14 @@
           <a:effectLst/>
           <a:extLst>
             <a:ext uri="{909E8E84-426E-40DD-AFC4-6F175D3DCCD1}">
-              <a14:hiddenFill xmlns:a14="http://schemas.microsoft.com/office/drawing/2010/main" xmlns="">
+              <a14:hiddenFill xmlns="" xmlns:a14="http://schemas.microsoft.com/office/drawing/2010/main">
                 <a:solidFill>
                   <a:schemeClr val="accent1"/>
                 </a:solidFill>
               </a14:hiddenFill>
             </a:ext>
             <a:ext uri="{91240B29-F687-4F45-9708-019B960494DF}">
-              <a14:hiddenLine xmlns:a14="http://schemas.microsoft.com/office/drawing/2010/main" xmlns="" w="9525">
+              <a14:hiddenLine xmlns="" xmlns:a14="http://schemas.microsoft.com/office/drawing/2010/main" w="9525">
                 <a:solidFill>
                   <a:schemeClr val="tx1"/>
                 </a:solidFill>
@@ -21761,7 +21858,7 @@
               </a14:hiddenLine>
             </a:ext>
             <a:ext uri="{AF507438-7753-43E0-B8FC-AC1667EBCBE1}">
-              <a14:hiddenEffects xmlns:a14="http://schemas.microsoft.com/office/drawing/2010/main" xmlns="">
+              <a14:hiddenEffects xmlns="" xmlns:a14="http://schemas.microsoft.com/office/drawing/2010/main">
                 <a:effectLst>
                   <a:outerShdw dist="35921" dir="2700000" algn="ctr" rotWithShape="0">
                     <a:schemeClr val="bg2"/>
@@ -22209,7 +22306,7 @@
     </p:spTree>
     <p:extLst>
       <p:ext uri="{BB962C8B-B14F-4D97-AF65-F5344CB8AC3E}">
-        <p14:creationId xmlns:p14="http://schemas.microsoft.com/office/powerpoint/2010/main" xmlns="" val="3312797979"/>
+        <p14:creationId xmlns="" xmlns:p14="http://schemas.microsoft.com/office/powerpoint/2010/main" val="3312797979"/>
       </p:ext>
     </p:extLst>
   </p:cSld>
@@ -23352,7 +23449,7 @@
           <p:nvPr>
             <p:extLst>
               <p:ext uri="{D42A27DB-BD31-4B8C-83A1-F6EECF244321}">
-                <p14:modId xmlns:p14="http://schemas.microsoft.com/office/powerpoint/2010/main" xmlns="" val="3382119601"/>
+                <p14:modId xmlns="" xmlns:p14="http://schemas.microsoft.com/office/powerpoint/2010/main" val="3382119601"/>
               </p:ext>
             </p:extLst>
           </p:nvPr>
@@ -24129,7 +24226,7 @@
     </p:spTree>
     <p:extLst>
       <p:ext uri="{BB962C8B-B14F-4D97-AF65-F5344CB8AC3E}">
-        <p14:creationId xmlns:p14="http://schemas.microsoft.com/office/powerpoint/2010/main" xmlns="" val="155874689"/>
+        <p14:creationId xmlns="" xmlns:p14="http://schemas.microsoft.com/office/powerpoint/2010/main" val="155874689"/>
       </p:ext>
     </p:extLst>
   </p:cSld>
@@ -24137,7 +24234,7 @@
     <a:masterClrMapping/>
   </p:clrMapOvr>
   <mc:AlternateContent xmlns:mc="http://schemas.openxmlformats.org/markup-compatibility/2006">
-    <mc:Choice xmlns:p14="http://schemas.microsoft.com/office/powerpoint/2010/main" xmlns="" Requires="p14">
+    <mc:Choice xmlns="" xmlns:p14="http://schemas.microsoft.com/office/powerpoint/2010/main" Requires="p14">
       <p:transition spd="slow" p14:dur="2000"/>
     </mc:Choice>
     <mc:Fallback>
@@ -24702,8 +24799,8 @@
         </p:nvSpPr>
         <p:spPr>
           <a:xfrm>
-            <a:off x="642910" y="428604"/>
-            <a:ext cx="7715304" cy="1107996"/>
+            <a:off x="1928794" y="428604"/>
+            <a:ext cx="5214974" cy="1107996"/>
           </a:xfrm>
           <a:prstGeom prst="rect">
             <a:avLst/>
@@ -24721,7 +24818,7 @@
               <a:rPr lang="it-IT" sz="4800" b="1" dirty="0" smtClean="0">
                 <a:latin typeface="+mj-lt"/>
               </a:rPr>
-              <a:t>DEMO</a:t>
+              <a:t>Demo</a:t>
             </a:r>
             <a:endParaRPr lang="it-IT" sz="2800" b="1" dirty="0" smtClean="0">
               <a:latin typeface="+mj-lt"/>
@@ -24735,11 +24832,50 @@
           </a:p>
         </p:txBody>
       </p:sp>
+      <p:pic>
+        <p:nvPicPr>
+          <p:cNvPr id="2050" name="Picture 2" descr="D:\Tony\Omini\omini-ingranaggi.jpg"/>
+          <p:cNvPicPr>
+            <a:picLocks noChangeAspect="1" noChangeArrowheads="1"/>
+          </p:cNvPicPr>
+          <p:nvPr/>
+        </p:nvPicPr>
+        <p:blipFill>
+          <a:blip r:embed="rId3"/>
+          <a:srcRect/>
+          <a:stretch>
+            <a:fillRect/>
+          </a:stretch>
+        </p:blipFill>
+        <p:spPr bwMode="auto">
+          <a:xfrm>
+            <a:off x="1785918" y="1428736"/>
+            <a:ext cx="5080000" cy="3810000"/>
+          </a:xfrm>
+          <a:prstGeom prst="rect">
+            <a:avLst/>
+          </a:prstGeom>
+          <a:noFill/>
+        </p:spPr>
+      </p:pic>
     </p:spTree>
+    <p:extLst>
+      <p:ext uri="{BB962C8B-B14F-4D97-AF65-F5344CB8AC3E}">
+        <p14:creationId xmlns="" xmlns:p14="http://schemas.microsoft.com/office/powerpoint/2010/main" val="155874689"/>
+      </p:ext>
+    </p:extLst>
   </p:cSld>
   <p:clrMapOvr>
     <a:masterClrMapping/>
   </p:clrMapOvr>
+  <mc:AlternateContent xmlns:mc="http://schemas.openxmlformats.org/markup-compatibility/2006">
+    <mc:Choice xmlns="" xmlns:p14="http://schemas.microsoft.com/office/powerpoint/2010/main" Requires="p14">
+      <p:transition spd="slow" p14:dur="2000"/>
+    </mc:Choice>
+    <mc:Fallback>
+      <p:transition spd="slow"/>
+    </mc:Fallback>
+  </mc:AlternateContent>
   <p:timing>
     <p:tnLst>
       <p:par>
@@ -24751,6 +24887,263 @@
 </file>
 
 <file path=ppt/slides/slide32.xml><?xml version="1.0" encoding="utf-8"?>
+<p:sld xmlns:a="http://schemas.openxmlformats.org/drawingml/2006/main" xmlns:r="http://schemas.openxmlformats.org/officeDocument/2006/relationships" xmlns:p="http://schemas.openxmlformats.org/presentationml/2006/main">
+  <p:cSld>
+    <p:spTree>
+      <p:nvGrpSpPr>
+        <p:cNvPr id="1" name=""/>
+        <p:cNvGrpSpPr/>
+        <p:nvPr/>
+      </p:nvGrpSpPr>
+      <p:grpSpPr>
+        <a:xfrm>
+          <a:off x="0" y="0"/>
+          <a:ext cx="0" cy="0"/>
+          <a:chOff x="0" y="0"/>
+          <a:chExt cx="0" cy="0"/>
+        </a:xfrm>
+      </p:grpSpPr>
+      <p:sp>
+        <p:nvSpPr>
+          <p:cNvPr id="2" name="CasellaDiTesto 1"/>
+          <p:cNvSpPr txBox="1"/>
+          <p:nvPr/>
+        </p:nvSpPr>
+        <p:spPr>
+          <a:xfrm>
+            <a:off x="1928794" y="428604"/>
+            <a:ext cx="5214974" cy="1107996"/>
+          </a:xfrm>
+          <a:prstGeom prst="rect">
+            <a:avLst/>
+          </a:prstGeom>
+          <a:noFill/>
+        </p:spPr>
+        <p:txBody>
+          <a:bodyPr wrap="square" rtlCol="0">
+            <a:spAutoFit/>
+          </a:bodyPr>
+          <a:lstStyle/>
+          <a:p>
+            <a:pPr algn="ctr"/>
+            <a:r>
+              <a:rPr lang="it-IT" sz="4800" b="1" dirty="0" smtClean="0">
+                <a:latin typeface="+mj-lt"/>
+              </a:rPr>
+              <a:t>Demo</a:t>
+            </a:r>
+            <a:endParaRPr lang="it-IT" sz="2800" b="1" dirty="0" smtClean="0">
+              <a:latin typeface="+mj-lt"/>
+            </a:endParaRPr>
+          </a:p>
+          <a:p>
+            <a:pPr algn="ctr"/>
+            <a:endParaRPr lang="it-IT" dirty="0">
+              <a:latin typeface="+mj-lt"/>
+            </a:endParaRPr>
+          </a:p>
+        </p:txBody>
+      </p:sp>
+      <p:pic>
+        <p:nvPicPr>
+          <p:cNvPr id="4" name="demo.avi">
+            <a:hlinkClick r:id="" action="ppaction://media"/>
+          </p:cNvPr>
+          <p:cNvPicPr>
+            <a:picLocks noRot="1" noChangeAspect="1"/>
+          </p:cNvPicPr>
+          <p:nvPr>
+            <a:videoFile r:link="rId1"/>
+          </p:nvPr>
+        </p:nvPicPr>
+        <p:blipFill>
+          <a:blip r:embed="rId4"/>
+          <a:stretch>
+            <a:fillRect/>
+          </a:stretch>
+        </p:blipFill>
+        <p:spPr>
+          <a:xfrm>
+            <a:off x="-1922463" y="-228600"/>
+            <a:ext cx="12992101" cy="7315200"/>
+          </a:xfrm>
+          <a:prstGeom prst="rect">
+            <a:avLst/>
+          </a:prstGeom>
+        </p:spPr>
+      </p:pic>
+    </p:spTree>
+    <p:extLst>
+      <p:ext uri="{BB962C8B-B14F-4D97-AF65-F5344CB8AC3E}">
+        <p14:creationId xmlns="" xmlns:p14="http://schemas.microsoft.com/office/powerpoint/2010/main" val="155874689"/>
+      </p:ext>
+    </p:extLst>
+  </p:cSld>
+  <p:clrMapOvr>
+    <a:masterClrMapping/>
+  </p:clrMapOvr>
+  <mc:AlternateContent xmlns:mc="http://schemas.openxmlformats.org/markup-compatibility/2006">
+    <mc:Choice xmlns="" xmlns:p14="http://schemas.microsoft.com/office/powerpoint/2010/main" Requires="p14">
+      <p:transition spd="slow" p14:dur="2000"/>
+    </mc:Choice>
+    <mc:Fallback>
+      <p:transition spd="slow"/>
+    </mc:Fallback>
+  </mc:AlternateContent>
+  <p:timing>
+    <p:tnLst>
+      <p:par>
+        <p:cTn id="1" dur="indefinite" restart="never" nodeType="tmRoot">
+          <p:childTnLst>
+            <p:seq concurrent="1" nextAc="seek">
+              <p:cTn id="2" dur="indefinite" nodeType="mainSeq">
+                <p:childTnLst>
+                  <p:par>
+                    <p:cTn id="3" fill="hold">
+                      <p:stCondLst>
+                        <p:cond delay="indefinite"/>
+                        <p:cond evt="onBegin" delay="0">
+                          <p:tn val="2"/>
+                        </p:cond>
+                      </p:stCondLst>
+                      <p:childTnLst>
+                        <p:par>
+                          <p:cTn id="4" fill="hold">
+                            <p:stCondLst>
+                              <p:cond delay="0"/>
+                            </p:stCondLst>
+                            <p:childTnLst>
+                              <p:par>
+                                <p:cTn id="5" presetID="1" presetClass="mediacall" presetSubtype="0" fill="hold" nodeType="afterEffect">
+                                  <p:stCondLst>
+                                    <p:cond delay="0"/>
+                                  </p:stCondLst>
+                                  <p:childTnLst>
+                                    <p:cmd type="call" cmd="playFrom(0.0)">
+                                      <p:cBhvr>
+                                        <p:cTn id="6" dur="30415" fill="hold"/>
+                                        <p:tgtEl>
+                                          <p:spTgt spid="4"/>
+                                        </p:tgtEl>
+                                      </p:cBhvr>
+                                    </p:cmd>
+                                  </p:childTnLst>
+                                </p:cTn>
+                              </p:par>
+                            </p:childTnLst>
+                          </p:cTn>
+                        </p:par>
+                      </p:childTnLst>
+                    </p:cTn>
+                  </p:par>
+                </p:childTnLst>
+              </p:cTn>
+              <p:prevCondLst>
+                <p:cond evt="onPrev" delay="0">
+                  <p:tgtEl>
+                    <p:sldTgt/>
+                  </p:tgtEl>
+                </p:cond>
+              </p:prevCondLst>
+              <p:nextCondLst>
+                <p:cond evt="onNext" delay="0">
+                  <p:tgtEl>
+                    <p:sldTgt/>
+                  </p:tgtEl>
+                </p:cond>
+              </p:nextCondLst>
+            </p:seq>
+            <p:video>
+              <p:cMediaNode>
+                <p:cTn id="7" fill="hold" display="0">
+                  <p:stCondLst>
+                    <p:cond delay="indefinite"/>
+                  </p:stCondLst>
+                  <p:endCondLst>
+                    <p:cond evt="onNext" delay="0">
+                      <p:tgtEl>
+                        <p:sldTgt/>
+                      </p:tgtEl>
+                    </p:cond>
+                    <p:cond evt="onPrev" delay="0">
+                      <p:tgtEl>
+                        <p:sldTgt/>
+                      </p:tgtEl>
+                    </p:cond>
+                  </p:endCondLst>
+                </p:cTn>
+                <p:tgtEl>
+                  <p:spTgt spid="4"/>
+                </p:tgtEl>
+              </p:cMediaNode>
+            </p:video>
+            <p:seq concurrent="1" nextAc="seek">
+              <p:cTn id="8" restart="whenNotActive" fill="hold" evtFilter="cancelBubble" nodeType="interactiveSeq">
+                <p:stCondLst>
+                  <p:cond evt="onClick" delay="0">
+                    <p:tgtEl>
+                      <p:spTgt spid="4"/>
+                    </p:tgtEl>
+                  </p:cond>
+                </p:stCondLst>
+                <p:endSync evt="end" delay="0">
+                  <p:rtn val="all"/>
+                </p:endSync>
+                <p:childTnLst>
+                  <p:par>
+                    <p:cTn id="9" fill="hold">
+                      <p:stCondLst>
+                        <p:cond delay="0"/>
+                      </p:stCondLst>
+                      <p:childTnLst>
+                        <p:par>
+                          <p:cTn id="10" fill="hold">
+                            <p:stCondLst>
+                              <p:cond delay="0"/>
+                            </p:stCondLst>
+                            <p:childTnLst>
+                              <p:par>
+                                <p:cTn id="11" presetID="2" presetClass="mediacall" presetSubtype="0" fill="hold" nodeType="clickEffect">
+                                  <p:stCondLst>
+                                    <p:cond delay="0"/>
+                                  </p:stCondLst>
+                                  <p:childTnLst>
+                                    <p:cmd type="call" cmd="togglePause">
+                                      <p:cBhvr>
+                                        <p:cTn id="12" dur="1" fill="hold"/>
+                                        <p:tgtEl>
+                                          <p:spTgt spid="4"/>
+                                        </p:tgtEl>
+                                      </p:cBhvr>
+                                    </p:cmd>
+                                  </p:childTnLst>
+                                </p:cTn>
+                              </p:par>
+                            </p:childTnLst>
+                          </p:cTn>
+                        </p:par>
+                      </p:childTnLst>
+                    </p:cTn>
+                  </p:par>
+                </p:childTnLst>
+              </p:cTn>
+              <p:nextCondLst>
+                <p:cond evt="onClick" delay="0">
+                  <p:tgtEl>
+                    <p:spTgt spid="4"/>
+                  </p:tgtEl>
+                </p:cond>
+              </p:nextCondLst>
+            </p:seq>
+          </p:childTnLst>
+        </p:cTn>
+      </p:par>
+    </p:tnLst>
+  </p:timing>
+</p:sld>
+</file>
+
+<file path=ppt/slides/slide33.xml><?xml version="1.0" encoding="utf-8"?>
 <p:sld xmlns:a="http://schemas.openxmlformats.org/drawingml/2006/main" xmlns:r="http://schemas.openxmlformats.org/officeDocument/2006/relationships" xmlns:p="http://schemas.openxmlformats.org/presentationml/2006/main">
   <p:cSld>
     <p:spTree>
@@ -25553,7 +25946,7 @@
 </p:sld>
 </file>
 
-<file path=ppt/slides/slide33.xml><?xml version="1.0" encoding="utf-8"?>
+<file path=ppt/slides/slide34.xml><?xml version="1.0" encoding="utf-8"?>
 <p:sld xmlns:a="http://schemas.openxmlformats.org/drawingml/2006/main" xmlns:r="http://schemas.openxmlformats.org/officeDocument/2006/relationships" xmlns:p="http://schemas.openxmlformats.org/presentationml/2006/main">
   <p:cSld>
     <p:spTree>
@@ -26456,7 +26849,7 @@
 </p:sld>
 </file>
 
-<file path=ppt/slides/slide34.xml><?xml version="1.0" encoding="utf-8"?>
+<file path=ppt/slides/slide35.xml><?xml version="1.0" encoding="utf-8"?>
 <p:sld xmlns:a="http://schemas.openxmlformats.org/drawingml/2006/main" xmlns:r="http://schemas.openxmlformats.org/officeDocument/2006/relationships" xmlns:p="http://schemas.openxmlformats.org/presentationml/2006/main">
   <p:cSld>
     <p:spTree>
@@ -27096,7 +27489,7 @@
     </p:spTree>
     <p:extLst>
       <p:ext uri="{BB962C8B-B14F-4D97-AF65-F5344CB8AC3E}">
-        <p14:creationId xmlns:p14="http://schemas.microsoft.com/office/powerpoint/2010/main" xmlns="" val="134615909"/>
+        <p14:creationId xmlns="" xmlns:p14="http://schemas.microsoft.com/office/powerpoint/2010/main" val="134615909"/>
       </p:ext>
     </p:extLst>
   </p:cSld>
@@ -27794,7 +28187,7 @@
 </p:sld>
 </file>
 
-<file path=ppt/slides/slide35.xml><?xml version="1.0" encoding="utf-8"?>
+<file path=ppt/slides/slide36.xml><?xml version="1.0" encoding="utf-8"?>
 <p:sld xmlns:a="http://schemas.openxmlformats.org/drawingml/2006/main" xmlns:r="http://schemas.openxmlformats.org/officeDocument/2006/relationships" xmlns:p="http://schemas.openxmlformats.org/presentationml/2006/main">
   <p:cSld>
     <p:spTree>
@@ -27870,7 +28263,7 @@
           <p:nvPr>
             <p:extLst>
               <p:ext uri="{D42A27DB-BD31-4B8C-83A1-F6EECF244321}">
-                <p14:modId xmlns:p14="http://schemas.microsoft.com/office/powerpoint/2010/main" xmlns="" val="1603526078"/>
+                <p14:modId xmlns="" xmlns:p14="http://schemas.microsoft.com/office/powerpoint/2010/main" val="1603526078"/>
               </p:ext>
             </p:extLst>
           </p:nvPr>
@@ -28016,7 +28409,7 @@
     </p:spTree>
     <p:extLst>
       <p:ext uri="{BB962C8B-B14F-4D97-AF65-F5344CB8AC3E}">
-        <p14:creationId xmlns:p14="http://schemas.microsoft.com/office/powerpoint/2010/main" xmlns="" val="1428921569"/>
+        <p14:creationId xmlns="" xmlns:p14="http://schemas.microsoft.com/office/powerpoint/2010/main" val="1428921569"/>
       </p:ext>
     </p:extLst>
   </p:cSld>
@@ -28033,7 +28426,7 @@
 </p:sld>
 </file>
 
-<file path=ppt/slides/slide36.xml><?xml version="1.0" encoding="utf-8"?>
+<file path=ppt/slides/slide37.xml><?xml version="1.0" encoding="utf-8"?>
 <p:sld xmlns:a="http://schemas.openxmlformats.org/drawingml/2006/main" xmlns:r="http://schemas.openxmlformats.org/officeDocument/2006/relationships" xmlns:p="http://schemas.openxmlformats.org/presentationml/2006/main">
   <p:cSld>
     <p:spTree>
@@ -28109,7 +28502,7 @@
           <p:nvPr>
             <p:extLst>
               <p:ext uri="{D42A27DB-BD31-4B8C-83A1-F6EECF244321}">
-                <p14:modId xmlns:p14="http://schemas.microsoft.com/office/powerpoint/2010/main" xmlns="" val="3377787449"/>
+                <p14:modId xmlns="" xmlns:p14="http://schemas.microsoft.com/office/powerpoint/2010/main" val="3377787449"/>
               </p:ext>
             </p:extLst>
           </p:nvPr>
@@ -28321,7 +28714,7 @@
     </p:spTree>
     <p:extLst>
       <p:ext uri="{BB962C8B-B14F-4D97-AF65-F5344CB8AC3E}">
-        <p14:creationId xmlns:p14="http://schemas.microsoft.com/office/powerpoint/2010/main" xmlns="" val="521228686"/>
+        <p14:creationId xmlns="" xmlns:p14="http://schemas.microsoft.com/office/powerpoint/2010/main" val="521228686"/>
       </p:ext>
     </p:extLst>
   </p:cSld>
@@ -28338,7 +28731,7 @@
 </p:sld>
 </file>
 
-<file path=ppt/slides/slide37.xml><?xml version="1.0" encoding="utf-8"?>
+<file path=ppt/slides/slide38.xml><?xml version="1.0" encoding="utf-8"?>
 <p:sld xmlns:a="http://schemas.openxmlformats.org/drawingml/2006/main" xmlns:r="http://schemas.openxmlformats.org/officeDocument/2006/relationships" xmlns:p="http://schemas.openxmlformats.org/presentationml/2006/main">
   <p:cSld>
     <p:spTree>
@@ -28408,7 +28801,7 @@
           <a:blip r:embed="rId2">
             <a:extLst>
               <a:ext uri="{28A0092B-C50C-407E-A947-70E740481C1C}">
-                <a14:useLocalDpi xmlns:a14="http://schemas.microsoft.com/office/drawing/2010/main" xmlns="" val="0"/>
+                <a14:useLocalDpi xmlns="" xmlns:a14="http://schemas.microsoft.com/office/drawing/2010/main" val="0"/>
               </a:ext>
             </a:extLst>
           </a:blip>
@@ -28428,7 +28821,7 @@
           <a:noFill/>
           <a:extLst>
             <a:ext uri="{909E8E84-426E-40DD-AFC4-6F175D3DCCD1}">
-              <a14:hiddenFill xmlns:a14="http://schemas.microsoft.com/office/drawing/2010/main" xmlns="">
+              <a14:hiddenFill xmlns="" xmlns:a14="http://schemas.microsoft.com/office/drawing/2010/main">
                 <a:solidFill>
                   <a:srgbClr val="FFFFFF"/>
                 </a:solidFill>
@@ -28610,7 +29003,7 @@
     </p:spTree>
     <p:extLst>
       <p:ext uri="{BB962C8B-B14F-4D97-AF65-F5344CB8AC3E}">
-        <p14:creationId xmlns:p14="http://schemas.microsoft.com/office/powerpoint/2010/main" xmlns="" val="2138116938"/>
+        <p14:creationId xmlns="" xmlns:p14="http://schemas.microsoft.com/office/powerpoint/2010/main" val="2138116938"/>
       </p:ext>
     </p:extLst>
   </p:cSld>
@@ -29035,7 +29428,7 @@
 </p:sld>
 </file>
 
-<file path=ppt/slides/slide38.xml><?xml version="1.0" encoding="utf-8"?>
+<file path=ppt/slides/slide39.xml><?xml version="1.0" encoding="utf-8"?>
 <p:sld xmlns:a="http://schemas.openxmlformats.org/drawingml/2006/main" xmlns:r="http://schemas.openxmlformats.org/officeDocument/2006/relationships" xmlns:p="http://schemas.openxmlformats.org/presentationml/2006/main">
   <p:cSld>
     <p:spTree>
@@ -29120,7 +29513,7 @@
           <p:nvPr>
             <p:extLst>
               <p:ext uri="{D42A27DB-BD31-4B8C-83A1-F6EECF244321}">
-                <p14:modId xmlns:p14="http://schemas.microsoft.com/office/powerpoint/2010/main" xmlns="" val="3745458434"/>
+                <p14:modId xmlns="" xmlns:p14="http://schemas.microsoft.com/office/powerpoint/2010/main" val="3745458434"/>
               </p:ext>
             </p:extLst>
           </p:nvPr>
@@ -29332,7 +29725,7 @@
     </p:spTree>
     <p:extLst>
       <p:ext uri="{BB962C8B-B14F-4D97-AF65-F5344CB8AC3E}">
-        <p14:creationId xmlns:p14="http://schemas.microsoft.com/office/powerpoint/2010/main" xmlns="" val="2476603813"/>
+        <p14:creationId xmlns="" xmlns:p14="http://schemas.microsoft.com/office/powerpoint/2010/main" val="2476603813"/>
       </p:ext>
     </p:extLst>
   </p:cSld>
@@ -29349,7 +29742,418 @@
 </p:sld>
 </file>
 
-<file path=ppt/slides/slide39.xml><?xml version="1.0" encoding="utf-8"?>
+<file path=ppt/slides/slide4.xml><?xml version="1.0" encoding="utf-8"?>
+<p:sld xmlns:a="http://schemas.openxmlformats.org/drawingml/2006/main" xmlns:r="http://schemas.openxmlformats.org/officeDocument/2006/relationships" xmlns:p="http://schemas.openxmlformats.org/presentationml/2006/main">
+  <p:cSld>
+    <p:spTree>
+      <p:nvGrpSpPr>
+        <p:cNvPr id="1" name=""/>
+        <p:cNvGrpSpPr/>
+        <p:nvPr/>
+      </p:nvGrpSpPr>
+      <p:grpSpPr>
+        <a:xfrm>
+          <a:off x="0" y="0"/>
+          <a:ext cx="0" cy="0"/>
+          <a:chOff x="0" y="0"/>
+          <a:chExt cx="0" cy="0"/>
+        </a:xfrm>
+      </p:grpSpPr>
+      <p:sp>
+        <p:nvSpPr>
+          <p:cNvPr id="2" name="CasellaDiTesto 1"/>
+          <p:cNvSpPr txBox="1"/>
+          <p:nvPr/>
+        </p:nvSpPr>
+        <p:spPr>
+          <a:xfrm>
+            <a:off x="0" y="428604"/>
+            <a:ext cx="9144000" cy="1046440"/>
+          </a:xfrm>
+          <a:prstGeom prst="rect">
+            <a:avLst/>
+          </a:prstGeom>
+          <a:noFill/>
+        </p:spPr>
+        <p:txBody>
+          <a:bodyPr wrap="square" rtlCol="0">
+            <a:spAutoFit/>
+          </a:bodyPr>
+          <a:lstStyle/>
+          <a:p>
+            <a:pPr algn="ctr"/>
+            <a:r>
+              <a:rPr lang="it-IT" sz="3400" b="1" dirty="0" smtClean="0">
+                <a:latin typeface="+mj-lt"/>
+              </a:rPr>
+              <a:t>Use Case Diagram</a:t>
+            </a:r>
+          </a:p>
+          <a:p>
+            <a:pPr algn="ctr"/>
+            <a:r>
+              <a:rPr lang="it-IT" sz="2800" b="1" dirty="0" smtClean="0">
+                <a:latin typeface="+mj-lt"/>
+              </a:rPr>
+              <a:t>Primo Livello di Astrazione</a:t>
+            </a:r>
+            <a:endParaRPr lang="it-IT" sz="1400" dirty="0">
+              <a:latin typeface="+mj-lt"/>
+            </a:endParaRPr>
+          </a:p>
+        </p:txBody>
+      </p:sp>
+      <p:pic>
+        <p:nvPicPr>
+          <p:cNvPr id="1026" name="Picture 2" descr="C:\linda\uni\esami_da_svolgere\gps\progetto_gps\Atsilo\RAD\Casi d'uso\Atsilo3\UCD_H_Generale.png"/>
+          <p:cNvPicPr>
+            <a:picLocks noChangeAspect="1" noChangeArrowheads="1"/>
+          </p:cNvPicPr>
+          <p:nvPr/>
+        </p:nvPicPr>
+        <p:blipFill>
+          <a:blip r:embed="rId3">
+            <a:extLst>
+              <a:ext uri="{28A0092B-C50C-407E-A947-70E740481C1C}">
+                <a14:useLocalDpi xmlns="" xmlns:a14="http://schemas.microsoft.com/office/drawing/2010/main" val="0"/>
+              </a:ext>
+            </a:extLst>
+          </a:blip>
+          <a:srcRect/>
+          <a:stretch>
+            <a:fillRect/>
+          </a:stretch>
+        </p:blipFill>
+        <p:spPr bwMode="auto">
+          <a:xfrm>
+            <a:off x="827584" y="1628799"/>
+            <a:ext cx="7560840" cy="5229201"/>
+          </a:xfrm>
+          <a:prstGeom prst="rect">
+            <a:avLst/>
+          </a:prstGeom>
+          <a:noFill/>
+          <a:extLst>
+            <a:ext uri="{909E8E84-426E-40DD-AFC4-6F175D3DCCD1}">
+              <a14:hiddenFill xmlns="" xmlns:a14="http://schemas.microsoft.com/office/drawing/2010/main">
+                <a:solidFill>
+                  <a:srgbClr val="FFFFFF"/>
+                </a:solidFill>
+              </a14:hiddenFill>
+            </a:ext>
+          </a:extLst>
+        </p:spPr>
+      </p:pic>
+      <p:sp>
+        <p:nvSpPr>
+          <p:cNvPr id="3" name="Ovale 2"/>
+          <p:cNvSpPr/>
+          <p:nvPr/>
+        </p:nvSpPr>
+        <p:spPr>
+          <a:xfrm>
+            <a:off x="2915816" y="2276872"/>
+            <a:ext cx="1800200" cy="576064"/>
+          </a:xfrm>
+          <a:prstGeom prst="ellipse">
+            <a:avLst/>
+          </a:prstGeom>
+          <a:noFill/>
+          <a:ln w="38100">
+            <a:solidFill>
+              <a:srgbClr val="002060"/>
+            </a:solidFill>
+          </a:ln>
+        </p:spPr>
+        <p:style>
+          <a:lnRef idx="2">
+            <a:schemeClr val="accent1">
+              <a:shade val="50000"/>
+            </a:schemeClr>
+          </a:lnRef>
+          <a:fillRef idx="1">
+            <a:schemeClr val="accent1"/>
+          </a:fillRef>
+          <a:effectRef idx="0">
+            <a:schemeClr val="accent1"/>
+          </a:effectRef>
+          <a:fontRef idx="minor">
+            <a:schemeClr val="lt1"/>
+          </a:fontRef>
+        </p:style>
+        <p:txBody>
+          <a:bodyPr rtlCol="0" anchor="ctr"/>
+          <a:lstStyle/>
+          <a:p>
+            <a:pPr algn="ctr"/>
+            <a:endParaRPr lang="it-IT"/>
+          </a:p>
+        </p:txBody>
+      </p:sp>
+      <p:sp>
+        <p:nvSpPr>
+          <p:cNvPr id="5" name="Ovale 4"/>
+          <p:cNvSpPr/>
+          <p:nvPr/>
+        </p:nvSpPr>
+        <p:spPr>
+          <a:xfrm>
+            <a:off x="2936900" y="3013472"/>
+            <a:ext cx="2151856" cy="711696"/>
+          </a:xfrm>
+          <a:prstGeom prst="ellipse">
+            <a:avLst/>
+          </a:prstGeom>
+          <a:noFill/>
+          <a:ln w="38100">
+            <a:solidFill>
+              <a:srgbClr val="002060"/>
+            </a:solidFill>
+          </a:ln>
+        </p:spPr>
+        <p:style>
+          <a:lnRef idx="2">
+            <a:schemeClr val="accent1">
+              <a:shade val="50000"/>
+            </a:schemeClr>
+          </a:lnRef>
+          <a:fillRef idx="1">
+            <a:schemeClr val="accent1"/>
+          </a:fillRef>
+          <a:effectRef idx="0">
+            <a:schemeClr val="accent1"/>
+          </a:effectRef>
+          <a:fontRef idx="minor">
+            <a:schemeClr val="lt1"/>
+          </a:fontRef>
+        </p:style>
+        <p:txBody>
+          <a:bodyPr rtlCol="0" anchor="ctr"/>
+          <a:lstStyle/>
+          <a:p>
+            <a:pPr algn="ctr"/>
+            <a:endParaRPr lang="it-IT"/>
+          </a:p>
+        </p:txBody>
+      </p:sp>
+      <p:sp>
+        <p:nvSpPr>
+          <p:cNvPr id="7" name="Ovale 4"/>
+          <p:cNvSpPr/>
+          <p:nvPr/>
+        </p:nvSpPr>
+        <p:spPr>
+          <a:xfrm>
+            <a:off x="2857488" y="3929066"/>
+            <a:ext cx="1928826" cy="711696"/>
+          </a:xfrm>
+          <a:prstGeom prst="ellipse">
+            <a:avLst/>
+          </a:prstGeom>
+          <a:noFill/>
+          <a:ln w="38100">
+            <a:solidFill>
+              <a:srgbClr val="002060"/>
+            </a:solidFill>
+          </a:ln>
+        </p:spPr>
+        <p:style>
+          <a:lnRef idx="2">
+            <a:schemeClr val="accent1">
+              <a:shade val="50000"/>
+            </a:schemeClr>
+          </a:lnRef>
+          <a:fillRef idx="1">
+            <a:schemeClr val="accent1"/>
+          </a:fillRef>
+          <a:effectRef idx="0">
+            <a:schemeClr val="accent1"/>
+          </a:effectRef>
+          <a:fontRef idx="minor">
+            <a:schemeClr val="lt1"/>
+          </a:fontRef>
+        </p:style>
+        <p:txBody>
+          <a:bodyPr rtlCol="0" anchor="ctr"/>
+          <a:lstStyle/>
+          <a:p>
+            <a:pPr algn="ctr"/>
+            <a:endParaRPr lang="it-IT"/>
+          </a:p>
+        </p:txBody>
+      </p:sp>
+    </p:spTree>
+    <p:extLst>
+      <p:ext uri="{BB962C8B-B14F-4D97-AF65-F5344CB8AC3E}">
+        <p14:creationId xmlns="" xmlns:p14="http://schemas.microsoft.com/office/powerpoint/2010/main" val="1739081068"/>
+      </p:ext>
+    </p:extLst>
+  </p:cSld>
+  <p:clrMapOvr>
+    <a:masterClrMapping/>
+  </p:clrMapOvr>
+  <p:timing>
+    <p:tnLst>
+      <p:par>
+        <p:cTn id="1" dur="indefinite" restart="never" nodeType="tmRoot">
+          <p:childTnLst>
+            <p:seq concurrent="1" nextAc="seek">
+              <p:cTn id="2" dur="indefinite" nodeType="mainSeq">
+                <p:childTnLst>
+                  <p:par>
+                    <p:cTn id="3" fill="hold">
+                      <p:stCondLst>
+                        <p:cond delay="indefinite"/>
+                      </p:stCondLst>
+                      <p:childTnLst>
+                        <p:par>
+                          <p:cTn id="4" fill="hold">
+                            <p:stCondLst>
+                              <p:cond delay="0"/>
+                            </p:stCondLst>
+                            <p:childTnLst>
+                              <p:par>
+                                <p:cTn id="5" presetID="10" presetClass="entr" presetSubtype="0" fill="hold" grpId="0" nodeType="clickEffect">
+                                  <p:stCondLst>
+                                    <p:cond delay="0"/>
+                                  </p:stCondLst>
+                                  <p:childTnLst>
+                                    <p:set>
+                                      <p:cBhvr>
+                                        <p:cTn id="6" dur="1" fill="hold">
+                                          <p:stCondLst>
+                                            <p:cond delay="0"/>
+                                          </p:stCondLst>
+                                        </p:cTn>
+                                        <p:tgtEl>
+                                          <p:spTgt spid="3"/>
+                                        </p:tgtEl>
+                                        <p:attrNameLst>
+                                          <p:attrName>style.visibility</p:attrName>
+                                        </p:attrNameLst>
+                                      </p:cBhvr>
+                                      <p:to>
+                                        <p:strVal val="visible"/>
+                                      </p:to>
+                                    </p:set>
+                                    <p:animEffect transition="in" filter="fade">
+                                      <p:cBhvr>
+                                        <p:cTn id="7" dur="500"/>
+                                        <p:tgtEl>
+                                          <p:spTgt spid="3"/>
+                                        </p:tgtEl>
+                                      </p:cBhvr>
+                                    </p:animEffect>
+                                  </p:childTnLst>
+                                </p:cTn>
+                              </p:par>
+                              <p:par>
+                                <p:cTn id="8" presetID="10" presetClass="entr" presetSubtype="0" fill="hold" grpId="0" nodeType="withEffect">
+                                  <p:stCondLst>
+                                    <p:cond delay="0"/>
+                                  </p:stCondLst>
+                                  <p:childTnLst>
+                                    <p:set>
+                                      <p:cBhvr>
+                                        <p:cTn id="9" dur="1" fill="hold">
+                                          <p:stCondLst>
+                                            <p:cond delay="0"/>
+                                          </p:stCondLst>
+                                        </p:cTn>
+                                        <p:tgtEl>
+                                          <p:spTgt spid="5"/>
+                                        </p:tgtEl>
+                                        <p:attrNameLst>
+                                          <p:attrName>style.visibility</p:attrName>
+                                        </p:attrNameLst>
+                                      </p:cBhvr>
+                                      <p:to>
+                                        <p:strVal val="visible"/>
+                                      </p:to>
+                                    </p:set>
+                                    <p:animEffect transition="in" filter="fade">
+                                      <p:cBhvr>
+                                        <p:cTn id="10" dur="500"/>
+                                        <p:tgtEl>
+                                          <p:spTgt spid="5"/>
+                                        </p:tgtEl>
+                                      </p:cBhvr>
+                                    </p:animEffect>
+                                  </p:childTnLst>
+                                </p:cTn>
+                              </p:par>
+                              <p:par>
+                                <p:cTn id="11" presetID="10" presetClass="entr" presetSubtype="0" fill="hold" grpId="0" nodeType="withEffect">
+                                  <p:stCondLst>
+                                    <p:cond delay="0"/>
+                                  </p:stCondLst>
+                                  <p:childTnLst>
+                                    <p:set>
+                                      <p:cBhvr>
+                                        <p:cTn id="12" dur="1" fill="hold">
+                                          <p:stCondLst>
+                                            <p:cond delay="0"/>
+                                          </p:stCondLst>
+                                        </p:cTn>
+                                        <p:tgtEl>
+                                          <p:spTgt spid="7"/>
+                                        </p:tgtEl>
+                                        <p:attrNameLst>
+                                          <p:attrName>style.visibility</p:attrName>
+                                        </p:attrNameLst>
+                                      </p:cBhvr>
+                                      <p:to>
+                                        <p:strVal val="visible"/>
+                                      </p:to>
+                                    </p:set>
+                                    <p:animEffect transition="in" filter="fade">
+                                      <p:cBhvr>
+                                        <p:cTn id="13" dur="500"/>
+                                        <p:tgtEl>
+                                          <p:spTgt spid="7"/>
+                                        </p:tgtEl>
+                                      </p:cBhvr>
+                                    </p:animEffect>
+                                  </p:childTnLst>
+                                </p:cTn>
+                              </p:par>
+                            </p:childTnLst>
+                          </p:cTn>
+                        </p:par>
+                      </p:childTnLst>
+                    </p:cTn>
+                  </p:par>
+                </p:childTnLst>
+              </p:cTn>
+              <p:prevCondLst>
+                <p:cond evt="onPrev" delay="0">
+                  <p:tgtEl>
+                    <p:sldTgt/>
+                  </p:tgtEl>
+                </p:cond>
+              </p:prevCondLst>
+              <p:nextCondLst>
+                <p:cond evt="onNext" delay="0">
+                  <p:tgtEl>
+                    <p:sldTgt/>
+                  </p:tgtEl>
+                </p:cond>
+              </p:nextCondLst>
+            </p:seq>
+          </p:childTnLst>
+        </p:cTn>
+      </p:par>
+    </p:tnLst>
+    <p:bldLst>
+      <p:bldP spid="3" grpId="0" animBg="1"/>
+      <p:bldP spid="5" grpId="0" animBg="1"/>
+      <p:bldP spid="7" grpId="0" animBg="1"/>
+    </p:bldLst>
+  </p:timing>
+</p:sld>
+</file>
+
+<file path=ppt/slides/slide40.xml><?xml version="1.0" encoding="utf-8"?>
 <p:sld xmlns:a="http://schemas.openxmlformats.org/drawingml/2006/main" xmlns:r="http://schemas.openxmlformats.org/officeDocument/2006/relationships" xmlns:p="http://schemas.openxmlformats.org/presentationml/2006/main">
   <p:cSld>
     <p:spTree>
@@ -29661,7 +30465,7 @@
     </p:spTree>
     <p:extLst>
       <p:ext uri="{BB962C8B-B14F-4D97-AF65-F5344CB8AC3E}">
-        <p14:creationId xmlns:p14="http://schemas.microsoft.com/office/powerpoint/2010/main" xmlns="" val="3060381138"/>
+        <p14:creationId xmlns="" xmlns:p14="http://schemas.microsoft.com/office/powerpoint/2010/main" val="3060381138"/>
       </p:ext>
     </p:extLst>
   </p:cSld>
@@ -30335,418 +31139,7 @@
 </p:sld>
 </file>
 
-<file path=ppt/slides/slide4.xml><?xml version="1.0" encoding="utf-8"?>
-<p:sld xmlns:a="http://schemas.openxmlformats.org/drawingml/2006/main" xmlns:r="http://schemas.openxmlformats.org/officeDocument/2006/relationships" xmlns:p="http://schemas.openxmlformats.org/presentationml/2006/main">
-  <p:cSld>
-    <p:spTree>
-      <p:nvGrpSpPr>
-        <p:cNvPr id="1" name=""/>
-        <p:cNvGrpSpPr/>
-        <p:nvPr/>
-      </p:nvGrpSpPr>
-      <p:grpSpPr>
-        <a:xfrm>
-          <a:off x="0" y="0"/>
-          <a:ext cx="0" cy="0"/>
-          <a:chOff x="0" y="0"/>
-          <a:chExt cx="0" cy="0"/>
-        </a:xfrm>
-      </p:grpSpPr>
-      <p:sp>
-        <p:nvSpPr>
-          <p:cNvPr id="2" name="CasellaDiTesto 1"/>
-          <p:cNvSpPr txBox="1"/>
-          <p:nvPr/>
-        </p:nvSpPr>
-        <p:spPr>
-          <a:xfrm>
-            <a:off x="0" y="428604"/>
-            <a:ext cx="9144000" cy="1046440"/>
-          </a:xfrm>
-          <a:prstGeom prst="rect">
-            <a:avLst/>
-          </a:prstGeom>
-          <a:noFill/>
-        </p:spPr>
-        <p:txBody>
-          <a:bodyPr wrap="square" rtlCol="0">
-            <a:spAutoFit/>
-          </a:bodyPr>
-          <a:lstStyle/>
-          <a:p>
-            <a:pPr algn="ctr"/>
-            <a:r>
-              <a:rPr lang="it-IT" sz="3400" b="1" dirty="0" smtClean="0">
-                <a:latin typeface="+mj-lt"/>
-              </a:rPr>
-              <a:t>Use Case Diagram</a:t>
-            </a:r>
-          </a:p>
-          <a:p>
-            <a:pPr algn="ctr"/>
-            <a:r>
-              <a:rPr lang="it-IT" sz="2800" b="1" dirty="0" smtClean="0">
-                <a:latin typeface="+mj-lt"/>
-              </a:rPr>
-              <a:t>Primo Livello di Astrazione</a:t>
-            </a:r>
-            <a:endParaRPr lang="it-IT" sz="1400" dirty="0">
-              <a:latin typeface="+mj-lt"/>
-            </a:endParaRPr>
-          </a:p>
-        </p:txBody>
-      </p:sp>
-      <p:pic>
-        <p:nvPicPr>
-          <p:cNvPr id="1026" name="Picture 2" descr="C:\linda\uni\esami_da_svolgere\gps\progetto_gps\Atsilo\RAD\Casi d'uso\Atsilo3\UCD_H_Generale.png"/>
-          <p:cNvPicPr>
-            <a:picLocks noChangeAspect="1" noChangeArrowheads="1"/>
-          </p:cNvPicPr>
-          <p:nvPr/>
-        </p:nvPicPr>
-        <p:blipFill>
-          <a:blip r:embed="rId3">
-            <a:extLst>
-              <a:ext uri="{28A0092B-C50C-407E-A947-70E740481C1C}">
-                <a14:useLocalDpi xmlns:a14="http://schemas.microsoft.com/office/drawing/2010/main" xmlns="" val="0"/>
-              </a:ext>
-            </a:extLst>
-          </a:blip>
-          <a:srcRect/>
-          <a:stretch>
-            <a:fillRect/>
-          </a:stretch>
-        </p:blipFill>
-        <p:spPr bwMode="auto">
-          <a:xfrm>
-            <a:off x="827584" y="1628799"/>
-            <a:ext cx="7560840" cy="5229201"/>
-          </a:xfrm>
-          <a:prstGeom prst="rect">
-            <a:avLst/>
-          </a:prstGeom>
-          <a:noFill/>
-          <a:extLst>
-            <a:ext uri="{909E8E84-426E-40DD-AFC4-6F175D3DCCD1}">
-              <a14:hiddenFill xmlns:a14="http://schemas.microsoft.com/office/drawing/2010/main" xmlns="">
-                <a:solidFill>
-                  <a:srgbClr val="FFFFFF"/>
-                </a:solidFill>
-              </a14:hiddenFill>
-            </a:ext>
-          </a:extLst>
-        </p:spPr>
-      </p:pic>
-      <p:sp>
-        <p:nvSpPr>
-          <p:cNvPr id="3" name="Ovale 2"/>
-          <p:cNvSpPr/>
-          <p:nvPr/>
-        </p:nvSpPr>
-        <p:spPr>
-          <a:xfrm>
-            <a:off x="2915816" y="2276872"/>
-            <a:ext cx="1800200" cy="576064"/>
-          </a:xfrm>
-          <a:prstGeom prst="ellipse">
-            <a:avLst/>
-          </a:prstGeom>
-          <a:noFill/>
-          <a:ln w="38100">
-            <a:solidFill>
-              <a:srgbClr val="002060"/>
-            </a:solidFill>
-          </a:ln>
-        </p:spPr>
-        <p:style>
-          <a:lnRef idx="2">
-            <a:schemeClr val="accent1">
-              <a:shade val="50000"/>
-            </a:schemeClr>
-          </a:lnRef>
-          <a:fillRef idx="1">
-            <a:schemeClr val="accent1"/>
-          </a:fillRef>
-          <a:effectRef idx="0">
-            <a:schemeClr val="accent1"/>
-          </a:effectRef>
-          <a:fontRef idx="minor">
-            <a:schemeClr val="lt1"/>
-          </a:fontRef>
-        </p:style>
-        <p:txBody>
-          <a:bodyPr rtlCol="0" anchor="ctr"/>
-          <a:lstStyle/>
-          <a:p>
-            <a:pPr algn="ctr"/>
-            <a:endParaRPr lang="it-IT"/>
-          </a:p>
-        </p:txBody>
-      </p:sp>
-      <p:sp>
-        <p:nvSpPr>
-          <p:cNvPr id="5" name="Ovale 4"/>
-          <p:cNvSpPr/>
-          <p:nvPr/>
-        </p:nvSpPr>
-        <p:spPr>
-          <a:xfrm>
-            <a:off x="2936900" y="3013472"/>
-            <a:ext cx="2151856" cy="711696"/>
-          </a:xfrm>
-          <a:prstGeom prst="ellipse">
-            <a:avLst/>
-          </a:prstGeom>
-          <a:noFill/>
-          <a:ln w="38100">
-            <a:solidFill>
-              <a:srgbClr val="002060"/>
-            </a:solidFill>
-          </a:ln>
-        </p:spPr>
-        <p:style>
-          <a:lnRef idx="2">
-            <a:schemeClr val="accent1">
-              <a:shade val="50000"/>
-            </a:schemeClr>
-          </a:lnRef>
-          <a:fillRef idx="1">
-            <a:schemeClr val="accent1"/>
-          </a:fillRef>
-          <a:effectRef idx="0">
-            <a:schemeClr val="accent1"/>
-          </a:effectRef>
-          <a:fontRef idx="minor">
-            <a:schemeClr val="lt1"/>
-          </a:fontRef>
-        </p:style>
-        <p:txBody>
-          <a:bodyPr rtlCol="0" anchor="ctr"/>
-          <a:lstStyle/>
-          <a:p>
-            <a:pPr algn="ctr"/>
-            <a:endParaRPr lang="it-IT"/>
-          </a:p>
-        </p:txBody>
-      </p:sp>
-      <p:sp>
-        <p:nvSpPr>
-          <p:cNvPr id="7" name="Ovale 4"/>
-          <p:cNvSpPr/>
-          <p:nvPr/>
-        </p:nvSpPr>
-        <p:spPr>
-          <a:xfrm>
-            <a:off x="2857488" y="3929066"/>
-            <a:ext cx="1928826" cy="711696"/>
-          </a:xfrm>
-          <a:prstGeom prst="ellipse">
-            <a:avLst/>
-          </a:prstGeom>
-          <a:noFill/>
-          <a:ln w="38100">
-            <a:solidFill>
-              <a:srgbClr val="002060"/>
-            </a:solidFill>
-          </a:ln>
-        </p:spPr>
-        <p:style>
-          <a:lnRef idx="2">
-            <a:schemeClr val="accent1">
-              <a:shade val="50000"/>
-            </a:schemeClr>
-          </a:lnRef>
-          <a:fillRef idx="1">
-            <a:schemeClr val="accent1"/>
-          </a:fillRef>
-          <a:effectRef idx="0">
-            <a:schemeClr val="accent1"/>
-          </a:effectRef>
-          <a:fontRef idx="minor">
-            <a:schemeClr val="lt1"/>
-          </a:fontRef>
-        </p:style>
-        <p:txBody>
-          <a:bodyPr rtlCol="0" anchor="ctr"/>
-          <a:lstStyle/>
-          <a:p>
-            <a:pPr algn="ctr"/>
-            <a:endParaRPr lang="it-IT"/>
-          </a:p>
-        </p:txBody>
-      </p:sp>
-    </p:spTree>
-    <p:extLst>
-      <p:ext uri="{BB962C8B-B14F-4D97-AF65-F5344CB8AC3E}">
-        <p14:creationId xmlns:p14="http://schemas.microsoft.com/office/powerpoint/2010/main" xmlns="" val="1739081068"/>
-      </p:ext>
-    </p:extLst>
-  </p:cSld>
-  <p:clrMapOvr>
-    <a:masterClrMapping/>
-  </p:clrMapOvr>
-  <p:timing>
-    <p:tnLst>
-      <p:par>
-        <p:cTn id="1" dur="indefinite" restart="never" nodeType="tmRoot">
-          <p:childTnLst>
-            <p:seq concurrent="1" nextAc="seek">
-              <p:cTn id="2" dur="indefinite" nodeType="mainSeq">
-                <p:childTnLst>
-                  <p:par>
-                    <p:cTn id="3" fill="hold">
-                      <p:stCondLst>
-                        <p:cond delay="indefinite"/>
-                      </p:stCondLst>
-                      <p:childTnLst>
-                        <p:par>
-                          <p:cTn id="4" fill="hold">
-                            <p:stCondLst>
-                              <p:cond delay="0"/>
-                            </p:stCondLst>
-                            <p:childTnLst>
-                              <p:par>
-                                <p:cTn id="5" presetID="10" presetClass="entr" presetSubtype="0" fill="hold" grpId="0" nodeType="clickEffect">
-                                  <p:stCondLst>
-                                    <p:cond delay="0"/>
-                                  </p:stCondLst>
-                                  <p:childTnLst>
-                                    <p:set>
-                                      <p:cBhvr>
-                                        <p:cTn id="6" dur="1" fill="hold">
-                                          <p:stCondLst>
-                                            <p:cond delay="0"/>
-                                          </p:stCondLst>
-                                        </p:cTn>
-                                        <p:tgtEl>
-                                          <p:spTgt spid="3"/>
-                                        </p:tgtEl>
-                                        <p:attrNameLst>
-                                          <p:attrName>style.visibility</p:attrName>
-                                        </p:attrNameLst>
-                                      </p:cBhvr>
-                                      <p:to>
-                                        <p:strVal val="visible"/>
-                                      </p:to>
-                                    </p:set>
-                                    <p:animEffect transition="in" filter="fade">
-                                      <p:cBhvr>
-                                        <p:cTn id="7" dur="500"/>
-                                        <p:tgtEl>
-                                          <p:spTgt spid="3"/>
-                                        </p:tgtEl>
-                                      </p:cBhvr>
-                                    </p:animEffect>
-                                  </p:childTnLst>
-                                </p:cTn>
-                              </p:par>
-                              <p:par>
-                                <p:cTn id="8" presetID="10" presetClass="entr" presetSubtype="0" fill="hold" grpId="0" nodeType="withEffect">
-                                  <p:stCondLst>
-                                    <p:cond delay="0"/>
-                                  </p:stCondLst>
-                                  <p:childTnLst>
-                                    <p:set>
-                                      <p:cBhvr>
-                                        <p:cTn id="9" dur="1" fill="hold">
-                                          <p:stCondLst>
-                                            <p:cond delay="0"/>
-                                          </p:stCondLst>
-                                        </p:cTn>
-                                        <p:tgtEl>
-                                          <p:spTgt spid="5"/>
-                                        </p:tgtEl>
-                                        <p:attrNameLst>
-                                          <p:attrName>style.visibility</p:attrName>
-                                        </p:attrNameLst>
-                                      </p:cBhvr>
-                                      <p:to>
-                                        <p:strVal val="visible"/>
-                                      </p:to>
-                                    </p:set>
-                                    <p:animEffect transition="in" filter="fade">
-                                      <p:cBhvr>
-                                        <p:cTn id="10" dur="500"/>
-                                        <p:tgtEl>
-                                          <p:spTgt spid="5"/>
-                                        </p:tgtEl>
-                                      </p:cBhvr>
-                                    </p:animEffect>
-                                  </p:childTnLst>
-                                </p:cTn>
-                              </p:par>
-                              <p:par>
-                                <p:cTn id="11" presetID="10" presetClass="entr" presetSubtype="0" fill="hold" grpId="0" nodeType="withEffect">
-                                  <p:stCondLst>
-                                    <p:cond delay="0"/>
-                                  </p:stCondLst>
-                                  <p:childTnLst>
-                                    <p:set>
-                                      <p:cBhvr>
-                                        <p:cTn id="12" dur="1" fill="hold">
-                                          <p:stCondLst>
-                                            <p:cond delay="0"/>
-                                          </p:stCondLst>
-                                        </p:cTn>
-                                        <p:tgtEl>
-                                          <p:spTgt spid="7"/>
-                                        </p:tgtEl>
-                                        <p:attrNameLst>
-                                          <p:attrName>style.visibility</p:attrName>
-                                        </p:attrNameLst>
-                                      </p:cBhvr>
-                                      <p:to>
-                                        <p:strVal val="visible"/>
-                                      </p:to>
-                                    </p:set>
-                                    <p:animEffect transition="in" filter="fade">
-                                      <p:cBhvr>
-                                        <p:cTn id="13" dur="500"/>
-                                        <p:tgtEl>
-                                          <p:spTgt spid="7"/>
-                                        </p:tgtEl>
-                                      </p:cBhvr>
-                                    </p:animEffect>
-                                  </p:childTnLst>
-                                </p:cTn>
-                              </p:par>
-                            </p:childTnLst>
-                          </p:cTn>
-                        </p:par>
-                      </p:childTnLst>
-                    </p:cTn>
-                  </p:par>
-                </p:childTnLst>
-              </p:cTn>
-              <p:prevCondLst>
-                <p:cond evt="onPrev" delay="0">
-                  <p:tgtEl>
-                    <p:sldTgt/>
-                  </p:tgtEl>
-                </p:cond>
-              </p:prevCondLst>
-              <p:nextCondLst>
-                <p:cond evt="onNext" delay="0">
-                  <p:tgtEl>
-                    <p:sldTgt/>
-                  </p:tgtEl>
-                </p:cond>
-              </p:nextCondLst>
-            </p:seq>
-          </p:childTnLst>
-        </p:cTn>
-      </p:par>
-    </p:tnLst>
-    <p:bldLst>
-      <p:bldP spid="3" grpId="0" animBg="1"/>
-      <p:bldP spid="5" grpId="0" animBg="1"/>
-      <p:bldP spid="7" grpId="0" animBg="1"/>
-    </p:bldLst>
-  </p:timing>
-</p:sld>
-</file>
-
-<file path=ppt/slides/slide40.xml><?xml version="1.0" encoding="utf-8"?>
+<file path=ppt/slides/slide41.xml><?xml version="1.0" encoding="utf-8"?>
 <p:sld xmlns:a="http://schemas.openxmlformats.org/drawingml/2006/main" xmlns:r="http://schemas.openxmlformats.org/officeDocument/2006/relationships" xmlns:p="http://schemas.openxmlformats.org/presentationml/2006/main">
   <p:cSld>
     <p:spTree>
@@ -31184,7 +31577,7 @@
 </p:sld>
 </file>
 
-<file path=ppt/slides/slide41.xml><?xml version="1.0" encoding="utf-8"?>
+<file path=ppt/slides/slide42.xml><?xml version="1.0" encoding="utf-8"?>
 <p:sld xmlns:a="http://schemas.openxmlformats.org/drawingml/2006/main" xmlns:r="http://schemas.openxmlformats.org/officeDocument/2006/relationships" xmlns:p="http://schemas.openxmlformats.org/presentationml/2006/main">
   <p:cSld>
     <p:spTree>
@@ -31678,7 +32071,7 @@
 </p:sld>
 </file>
 
-<file path=ppt/slides/slide42.xml><?xml version="1.0" encoding="utf-8"?>
+<file path=ppt/slides/slide43.xml><?xml version="1.0" encoding="utf-8"?>
 <p:sld xmlns:a="http://schemas.openxmlformats.org/drawingml/2006/main" xmlns:r="http://schemas.openxmlformats.org/officeDocument/2006/relationships" xmlns:p="http://schemas.openxmlformats.org/presentationml/2006/main">
   <p:cSld>
     <p:spTree>
@@ -32113,7 +32506,7 @@
 </p:sld>
 </file>
 
-<file path=ppt/slides/slide43.xml><?xml version="1.0" encoding="utf-8"?>
+<file path=ppt/slides/slide44.xml><?xml version="1.0" encoding="utf-8"?>
 <p:sld xmlns:a="http://schemas.openxmlformats.org/drawingml/2006/main" xmlns:r="http://schemas.openxmlformats.org/officeDocument/2006/relationships" xmlns:p="http://schemas.openxmlformats.org/presentationml/2006/main">
   <p:cSld>
     <p:spTree>
@@ -32790,7 +33183,7 @@
     </p:spTree>
     <p:extLst>
       <p:ext uri="{BB962C8B-B14F-4D97-AF65-F5344CB8AC3E}">
-        <p14:creationId xmlns:p14="http://schemas.microsoft.com/office/powerpoint/2010/main" xmlns="" val="2532338835"/>
+        <p14:creationId xmlns="" xmlns:p14="http://schemas.microsoft.com/office/powerpoint/2010/main" val="2532338835"/>
       </p:ext>
     </p:extLst>
   </p:cSld>
@@ -32798,7 +33191,7 @@
     <a:masterClrMapping/>
   </p:clrMapOvr>
   <mc:AlternateContent xmlns:mc="http://schemas.openxmlformats.org/markup-compatibility/2006">
-    <mc:Choice xmlns:p14="http://schemas.microsoft.com/office/powerpoint/2010/main" xmlns="" Requires="p14">
+    <mc:Choice xmlns="" xmlns:p14="http://schemas.microsoft.com/office/powerpoint/2010/main" Requires="p14">
       <p:transition spd="slow" p14:dur="2000"/>
     </mc:Choice>
     <mc:Fallback>
@@ -32888,7 +33281,7 @@
           <p:nvPr>
             <p:extLst>
               <p:ext uri="{D42A27DB-BD31-4B8C-83A1-F6EECF244321}">
-                <p14:modId xmlns:p14="http://schemas.microsoft.com/office/powerpoint/2010/main" xmlns="" val="4285816619"/>
+                <p14:modId xmlns="" xmlns:p14="http://schemas.microsoft.com/office/powerpoint/2010/main" val="4285816619"/>
               </p:ext>
             </p:extLst>
           </p:nvPr>
@@ -33618,7 +34011,7 @@
           <p:nvPr>
             <p:extLst>
               <p:ext uri="{D42A27DB-BD31-4B8C-83A1-F6EECF244321}">
-                <p14:modId xmlns:p14="http://schemas.microsoft.com/office/powerpoint/2010/main" xmlns="" val="4159081582"/>
+                <p14:modId xmlns="" xmlns:p14="http://schemas.microsoft.com/office/powerpoint/2010/main" val="4159081582"/>
               </p:ext>
             </p:extLst>
           </p:nvPr>
@@ -34457,7 +34850,7 @@
     </p:spTree>
     <p:extLst>
       <p:ext uri="{BB962C8B-B14F-4D97-AF65-F5344CB8AC3E}">
-        <p14:creationId xmlns:p14="http://schemas.microsoft.com/office/powerpoint/2010/main" xmlns="" val="1173458281"/>
+        <p14:creationId xmlns="" xmlns:p14="http://schemas.microsoft.com/office/powerpoint/2010/main" val="1173458281"/>
       </p:ext>
     </p:extLst>
   </p:cSld>
@@ -35715,7 +36108,7 @@
     </p:spTree>
     <p:extLst>
       <p:ext uri="{BB962C8B-B14F-4D97-AF65-F5344CB8AC3E}">
-        <p14:creationId xmlns:p14="http://schemas.microsoft.com/office/powerpoint/2010/main" xmlns="" val="2769124218"/>
+        <p14:creationId xmlns="" xmlns:p14="http://schemas.microsoft.com/office/powerpoint/2010/main" val="2769124218"/>
       </p:ext>
     </p:extLst>
   </p:cSld>

</xml_diff>

<commit_message>
[WR 3] piccole revisioni
</commit_message>
<xml_diff>
--- a/Presentazione/Atsilo3/Atsilo_H_PresentazioneFinale.pptx
+++ b/Presentazione/Atsilo3/Atsilo_H_PresentazioneFinale.pptx
@@ -236,7 +236,7 @@
             <a:fld id="{38D78F4D-402C-46E0-A4BB-DF91EA86B14C}" type="datetimeFigureOut">
               <a:rPr lang="it-IT" smtClean="0"/>
               <a:pPr/>
-              <a:t>01/01/2013</a:t>
+              <a:t>02/01/2013</a:t>
             </a:fld>
             <a:endParaRPr lang="it-IT"/>
           </a:p>
@@ -405,7 +405,7 @@
     </p:spTree>
     <p:extLst>
       <p:ext uri="{BB962C8B-B14F-4D97-AF65-F5344CB8AC3E}">
-        <p14:creationId xmlns="" xmlns:p14="http://schemas.microsoft.com/office/powerpoint/2010/main" val="2126419590"/>
+        <p14:creationId xmlns:p14="http://schemas.microsoft.com/office/powerpoint/2010/main" xmlns="" val="2126419590"/>
       </p:ext>
     </p:extLst>
   </p:cSld>
@@ -602,7 +602,7 @@
     </p:spTree>
     <p:extLst>
       <p:ext uri="{BB962C8B-B14F-4D97-AF65-F5344CB8AC3E}">
-        <p14:creationId xmlns="" xmlns:p14="http://schemas.microsoft.com/office/powerpoint/2010/main" val="963420841"/>
+        <p14:creationId xmlns:p14="http://schemas.microsoft.com/office/powerpoint/2010/main" xmlns="" val="963420841"/>
       </p:ext>
     </p:extLst>
   </p:cSld>
@@ -709,7 +709,7 @@
     </p:spTree>
     <p:extLst>
       <p:ext uri="{BB962C8B-B14F-4D97-AF65-F5344CB8AC3E}">
-        <p14:creationId xmlns="" xmlns:p14="http://schemas.microsoft.com/office/powerpoint/2010/main" val="3361965342"/>
+        <p14:creationId xmlns:p14="http://schemas.microsoft.com/office/powerpoint/2010/main" xmlns="" val="3361965342"/>
       </p:ext>
     </p:extLst>
   </p:cSld>
@@ -852,7 +852,7 @@
     </p:spTree>
     <p:extLst>
       <p:ext uri="{BB962C8B-B14F-4D97-AF65-F5344CB8AC3E}">
-        <p14:creationId xmlns="" xmlns:p14="http://schemas.microsoft.com/office/powerpoint/2010/main" val="3314347345"/>
+        <p14:creationId xmlns:p14="http://schemas.microsoft.com/office/powerpoint/2010/main" xmlns="" val="3314347345"/>
       </p:ext>
     </p:extLst>
   </p:cSld>
@@ -989,7 +989,7 @@
     </p:spTree>
     <p:extLst>
       <p:ext uri="{BB962C8B-B14F-4D97-AF65-F5344CB8AC3E}">
-        <p14:creationId xmlns="" xmlns:p14="http://schemas.microsoft.com/office/powerpoint/2010/main" val="2265654022"/>
+        <p14:creationId xmlns:p14="http://schemas.microsoft.com/office/powerpoint/2010/main" xmlns="" val="2265654022"/>
       </p:ext>
     </p:extLst>
   </p:cSld>
@@ -1126,7 +1126,7 @@
     </p:spTree>
     <p:extLst>
       <p:ext uri="{BB962C8B-B14F-4D97-AF65-F5344CB8AC3E}">
-        <p14:creationId xmlns="" xmlns:p14="http://schemas.microsoft.com/office/powerpoint/2010/main" val="71143455"/>
+        <p14:creationId xmlns:p14="http://schemas.microsoft.com/office/powerpoint/2010/main" xmlns="" val="71143455"/>
       </p:ext>
     </p:extLst>
   </p:cSld>
@@ -1225,7 +1225,7 @@
     </p:spTree>
     <p:extLst>
       <p:ext uri="{BB962C8B-B14F-4D97-AF65-F5344CB8AC3E}">
-        <p14:creationId xmlns="" xmlns:p14="http://schemas.microsoft.com/office/powerpoint/2010/main" val="113696966"/>
+        <p14:creationId xmlns:p14="http://schemas.microsoft.com/office/powerpoint/2010/main" xmlns="" val="113696966"/>
       </p:ext>
     </p:extLst>
   </p:cSld>
@@ -1350,7 +1350,7 @@
     </p:spTree>
     <p:extLst>
       <p:ext uri="{BB962C8B-B14F-4D97-AF65-F5344CB8AC3E}">
-        <p14:creationId xmlns="" xmlns:p14="http://schemas.microsoft.com/office/powerpoint/2010/main" val="1063702567"/>
+        <p14:creationId xmlns:p14="http://schemas.microsoft.com/office/powerpoint/2010/main" xmlns="" val="1063702567"/>
       </p:ext>
     </p:extLst>
   </p:cSld>
@@ -1455,7 +1455,7 @@
     </p:spTree>
     <p:extLst>
       <p:ext uri="{BB962C8B-B14F-4D97-AF65-F5344CB8AC3E}">
-        <p14:creationId xmlns="" xmlns:p14="http://schemas.microsoft.com/office/powerpoint/2010/main" val="122959592"/>
+        <p14:creationId xmlns:p14="http://schemas.microsoft.com/office/powerpoint/2010/main" xmlns="" val="122959592"/>
       </p:ext>
     </p:extLst>
   </p:cSld>
@@ -1570,7 +1570,7 @@
     </p:spTree>
     <p:extLst>
       <p:ext uri="{BB962C8B-B14F-4D97-AF65-F5344CB8AC3E}">
-        <p14:creationId xmlns="" xmlns:p14="http://schemas.microsoft.com/office/powerpoint/2010/main" val="780286428"/>
+        <p14:creationId xmlns:p14="http://schemas.microsoft.com/office/powerpoint/2010/main" xmlns="" val="780286428"/>
       </p:ext>
     </p:extLst>
   </p:cSld>
@@ -1671,7 +1671,7 @@
     </p:spTree>
     <p:extLst>
       <p:ext uri="{BB962C8B-B14F-4D97-AF65-F5344CB8AC3E}">
-        <p14:creationId xmlns="" xmlns:p14="http://schemas.microsoft.com/office/powerpoint/2010/main" val="2418012031"/>
+        <p14:creationId xmlns:p14="http://schemas.microsoft.com/office/powerpoint/2010/main" xmlns="" val="2418012031"/>
       </p:ext>
     </p:extLst>
   </p:cSld>
@@ -1772,7 +1772,7 @@
     </p:spTree>
     <p:extLst>
       <p:ext uri="{BB962C8B-B14F-4D97-AF65-F5344CB8AC3E}">
-        <p14:creationId xmlns="" xmlns:p14="http://schemas.microsoft.com/office/powerpoint/2010/main" val="778008281"/>
+        <p14:creationId xmlns:p14="http://schemas.microsoft.com/office/powerpoint/2010/main" xmlns="" val="778008281"/>
       </p:ext>
     </p:extLst>
   </p:cSld>
@@ -1883,7 +1883,7 @@
     </p:spTree>
     <p:extLst>
       <p:ext uri="{BB962C8B-B14F-4D97-AF65-F5344CB8AC3E}">
-        <p14:creationId xmlns="" xmlns:p14="http://schemas.microsoft.com/office/powerpoint/2010/main" val="2781517378"/>
+        <p14:creationId xmlns:p14="http://schemas.microsoft.com/office/powerpoint/2010/main" xmlns="" val="2781517378"/>
       </p:ext>
     </p:extLst>
   </p:cSld>
@@ -1976,7 +1976,7 @@
     </p:spTree>
     <p:extLst>
       <p:ext uri="{BB962C8B-B14F-4D97-AF65-F5344CB8AC3E}">
-        <p14:creationId xmlns="" xmlns:p14="http://schemas.microsoft.com/office/powerpoint/2010/main" val="1377757052"/>
+        <p14:creationId xmlns:p14="http://schemas.microsoft.com/office/powerpoint/2010/main" xmlns="" val="1377757052"/>
       </p:ext>
     </p:extLst>
   </p:cSld>
@@ -2080,7 +2080,7 @@
     </p:spTree>
     <p:extLst>
       <p:ext uri="{BB962C8B-B14F-4D97-AF65-F5344CB8AC3E}">
-        <p14:creationId xmlns="" xmlns:p14="http://schemas.microsoft.com/office/powerpoint/2010/main" val="1394194668"/>
+        <p14:creationId xmlns:p14="http://schemas.microsoft.com/office/powerpoint/2010/main" xmlns="" val="1394194668"/>
       </p:ext>
     </p:extLst>
   </p:cSld>
@@ -2235,7 +2235,7 @@
     </p:spTree>
     <p:extLst>
       <p:ext uri="{BB962C8B-B14F-4D97-AF65-F5344CB8AC3E}">
-        <p14:creationId xmlns="" xmlns:p14="http://schemas.microsoft.com/office/powerpoint/2010/main" val="2972088584"/>
+        <p14:creationId xmlns:p14="http://schemas.microsoft.com/office/powerpoint/2010/main" xmlns="" val="2972088584"/>
       </p:ext>
     </p:extLst>
   </p:cSld>
@@ -2344,7 +2344,7 @@
     </p:spTree>
     <p:extLst>
       <p:ext uri="{BB962C8B-B14F-4D97-AF65-F5344CB8AC3E}">
-        <p14:creationId xmlns="" xmlns:p14="http://schemas.microsoft.com/office/powerpoint/2010/main" val="1417320036"/>
+        <p14:creationId xmlns:p14="http://schemas.microsoft.com/office/powerpoint/2010/main" xmlns="" val="1417320036"/>
       </p:ext>
     </p:extLst>
   </p:cSld>
@@ -2453,7 +2453,7 @@
     </p:spTree>
     <p:extLst>
       <p:ext uri="{BB962C8B-B14F-4D97-AF65-F5344CB8AC3E}">
-        <p14:creationId xmlns="" xmlns:p14="http://schemas.microsoft.com/office/powerpoint/2010/main" val="2176874561"/>
+        <p14:creationId xmlns:p14="http://schemas.microsoft.com/office/powerpoint/2010/main" xmlns="" val="2176874561"/>
       </p:ext>
     </p:extLst>
   </p:cSld>
@@ -2554,7 +2554,7 @@
     </p:spTree>
     <p:extLst>
       <p:ext uri="{BB962C8B-B14F-4D97-AF65-F5344CB8AC3E}">
-        <p14:creationId xmlns="" xmlns:p14="http://schemas.microsoft.com/office/powerpoint/2010/main" val="2428745919"/>
+        <p14:creationId xmlns:p14="http://schemas.microsoft.com/office/powerpoint/2010/main" xmlns="" val="2428745919"/>
       </p:ext>
     </p:extLst>
   </p:cSld>
@@ -2651,7 +2651,7 @@
     </p:spTree>
     <p:extLst>
       <p:ext uri="{BB962C8B-B14F-4D97-AF65-F5344CB8AC3E}">
-        <p14:creationId xmlns="" xmlns:p14="http://schemas.microsoft.com/office/powerpoint/2010/main" val="899854441"/>
+        <p14:creationId xmlns:p14="http://schemas.microsoft.com/office/powerpoint/2010/main" xmlns="" val="899854441"/>
       </p:ext>
     </p:extLst>
   </p:cSld>
@@ -2807,7 +2807,7 @@
     </p:spTree>
     <p:extLst>
       <p:ext uri="{BB962C8B-B14F-4D97-AF65-F5344CB8AC3E}">
-        <p14:creationId xmlns="" xmlns:p14="http://schemas.microsoft.com/office/powerpoint/2010/main" val="1218324987"/>
+        <p14:creationId xmlns:p14="http://schemas.microsoft.com/office/powerpoint/2010/main" xmlns="" val="1218324987"/>
       </p:ext>
     </p:extLst>
   </p:cSld>
@@ -2900,7 +2900,7 @@
     </p:spTree>
     <p:extLst>
       <p:ext uri="{BB962C8B-B14F-4D97-AF65-F5344CB8AC3E}">
-        <p14:creationId xmlns="" xmlns:p14="http://schemas.microsoft.com/office/powerpoint/2010/main" val="3928439017"/>
+        <p14:creationId xmlns:p14="http://schemas.microsoft.com/office/powerpoint/2010/main" xmlns="" val="3928439017"/>
       </p:ext>
     </p:extLst>
   </p:cSld>
@@ -2993,7 +2993,7 @@
     </p:spTree>
     <p:extLst>
       <p:ext uri="{BB962C8B-B14F-4D97-AF65-F5344CB8AC3E}">
-        <p14:creationId xmlns="" xmlns:p14="http://schemas.microsoft.com/office/powerpoint/2010/main" val="3928439017"/>
+        <p14:creationId xmlns:p14="http://schemas.microsoft.com/office/powerpoint/2010/main" xmlns="" val="3928439017"/>
       </p:ext>
     </p:extLst>
   </p:cSld>
@@ -3092,7 +3092,7 @@
     </p:spTree>
     <p:extLst>
       <p:ext uri="{BB962C8B-B14F-4D97-AF65-F5344CB8AC3E}">
-        <p14:creationId xmlns="" xmlns:p14="http://schemas.microsoft.com/office/powerpoint/2010/main" val="1025718114"/>
+        <p14:creationId xmlns:p14="http://schemas.microsoft.com/office/powerpoint/2010/main" xmlns="" val="1025718114"/>
       </p:ext>
     </p:extLst>
   </p:cSld>
@@ -3185,7 +3185,7 @@
     </p:spTree>
     <p:extLst>
       <p:ext uri="{BB962C8B-B14F-4D97-AF65-F5344CB8AC3E}">
-        <p14:creationId xmlns="" xmlns:p14="http://schemas.microsoft.com/office/powerpoint/2010/main" val="3928439017"/>
+        <p14:creationId xmlns:p14="http://schemas.microsoft.com/office/powerpoint/2010/main" xmlns="" val="3928439017"/>
       </p:ext>
     </p:extLst>
   </p:cSld>
@@ -3349,7 +3349,7 @@
     </p:spTree>
     <p:extLst>
       <p:ext uri="{BB962C8B-B14F-4D97-AF65-F5344CB8AC3E}">
-        <p14:creationId xmlns="" xmlns:p14="http://schemas.microsoft.com/office/powerpoint/2010/main" val="1047033234"/>
+        <p14:creationId xmlns:p14="http://schemas.microsoft.com/office/powerpoint/2010/main" xmlns="" val="1047033234"/>
       </p:ext>
     </p:extLst>
   </p:cSld>
@@ -3438,7 +3438,7 @@
     </p:spTree>
     <p:extLst>
       <p:ext uri="{BB962C8B-B14F-4D97-AF65-F5344CB8AC3E}">
-        <p14:creationId xmlns="" xmlns:p14="http://schemas.microsoft.com/office/powerpoint/2010/main" val="1047033234"/>
+        <p14:creationId xmlns:p14="http://schemas.microsoft.com/office/powerpoint/2010/main" xmlns="" val="1047033234"/>
       </p:ext>
     </p:extLst>
   </p:cSld>
@@ -3523,7 +3523,7 @@
     </p:spTree>
     <p:extLst>
       <p:ext uri="{BB962C8B-B14F-4D97-AF65-F5344CB8AC3E}">
-        <p14:creationId xmlns="" xmlns:p14="http://schemas.microsoft.com/office/powerpoint/2010/main" val="742716072"/>
+        <p14:creationId xmlns:p14="http://schemas.microsoft.com/office/powerpoint/2010/main" xmlns="" val="742716072"/>
       </p:ext>
     </p:extLst>
   </p:cSld>
@@ -3612,7 +3612,7 @@
     </p:spTree>
     <p:extLst>
       <p:ext uri="{BB962C8B-B14F-4D97-AF65-F5344CB8AC3E}">
-        <p14:creationId xmlns="" xmlns:p14="http://schemas.microsoft.com/office/powerpoint/2010/main" val="1425725903"/>
+        <p14:creationId xmlns:p14="http://schemas.microsoft.com/office/powerpoint/2010/main" xmlns="" val="1425725903"/>
       </p:ext>
     </p:extLst>
   </p:cSld>
@@ -3721,7 +3721,7 @@
     </p:spTree>
     <p:extLst>
       <p:ext uri="{BB962C8B-B14F-4D97-AF65-F5344CB8AC3E}">
-        <p14:creationId xmlns="" xmlns:p14="http://schemas.microsoft.com/office/powerpoint/2010/main" val="880674728"/>
+        <p14:creationId xmlns:p14="http://schemas.microsoft.com/office/powerpoint/2010/main" xmlns="" val="880674728"/>
       </p:ext>
     </p:extLst>
   </p:cSld>
@@ -3830,7 +3830,7 @@
     </p:spTree>
     <p:extLst>
       <p:ext uri="{BB962C8B-B14F-4D97-AF65-F5344CB8AC3E}">
-        <p14:creationId xmlns="" xmlns:p14="http://schemas.microsoft.com/office/powerpoint/2010/main" val="346945336"/>
+        <p14:creationId xmlns:p14="http://schemas.microsoft.com/office/powerpoint/2010/main" xmlns="" val="346945336"/>
       </p:ext>
     </p:extLst>
   </p:cSld>
@@ -3939,7 +3939,7 @@
     </p:spTree>
     <p:extLst>
       <p:ext uri="{BB962C8B-B14F-4D97-AF65-F5344CB8AC3E}">
-        <p14:creationId xmlns="" xmlns:p14="http://schemas.microsoft.com/office/powerpoint/2010/main" val="1778546328"/>
+        <p14:creationId xmlns:p14="http://schemas.microsoft.com/office/powerpoint/2010/main" xmlns="" val="1778546328"/>
       </p:ext>
     </p:extLst>
   </p:cSld>
@@ -4048,7 +4048,7 @@
     </p:spTree>
     <p:extLst>
       <p:ext uri="{BB962C8B-B14F-4D97-AF65-F5344CB8AC3E}">
-        <p14:creationId xmlns="" xmlns:p14="http://schemas.microsoft.com/office/powerpoint/2010/main" val="604861763"/>
+        <p14:creationId xmlns:p14="http://schemas.microsoft.com/office/powerpoint/2010/main" xmlns="" val="604861763"/>
       </p:ext>
     </p:extLst>
   </p:cSld>
@@ -4137,7 +4137,7 @@
     </p:spTree>
     <p:extLst>
       <p:ext uri="{BB962C8B-B14F-4D97-AF65-F5344CB8AC3E}">
-        <p14:creationId xmlns="" xmlns:p14="http://schemas.microsoft.com/office/powerpoint/2010/main" val="1357369038"/>
+        <p14:creationId xmlns:p14="http://schemas.microsoft.com/office/powerpoint/2010/main" xmlns="" val="1357369038"/>
       </p:ext>
     </p:extLst>
   </p:cSld>
@@ -4251,7 +4251,7 @@
     </p:spTree>
     <p:extLst>
       <p:ext uri="{BB962C8B-B14F-4D97-AF65-F5344CB8AC3E}">
-        <p14:creationId xmlns="" xmlns:p14="http://schemas.microsoft.com/office/powerpoint/2010/main" val="3780346060"/>
+        <p14:creationId xmlns:p14="http://schemas.microsoft.com/office/powerpoint/2010/main" xmlns="" val="3780346060"/>
       </p:ext>
     </p:extLst>
   </p:cSld>
@@ -4356,7 +4356,7 @@
     </p:spTree>
     <p:extLst>
       <p:ext uri="{BB962C8B-B14F-4D97-AF65-F5344CB8AC3E}">
-        <p14:creationId xmlns="" xmlns:p14="http://schemas.microsoft.com/office/powerpoint/2010/main" val="41796055"/>
+        <p14:creationId xmlns:p14="http://schemas.microsoft.com/office/powerpoint/2010/main" xmlns="" val="41796055"/>
       </p:ext>
     </p:extLst>
   </p:cSld>
@@ -4479,7 +4479,7 @@
     </p:spTree>
     <p:extLst>
       <p:ext uri="{BB962C8B-B14F-4D97-AF65-F5344CB8AC3E}">
-        <p14:creationId xmlns="" xmlns:p14="http://schemas.microsoft.com/office/powerpoint/2010/main" val="555626785"/>
+        <p14:creationId xmlns:p14="http://schemas.microsoft.com/office/powerpoint/2010/main" xmlns="" val="555626785"/>
       </p:ext>
     </p:extLst>
   </p:cSld>
@@ -4572,7 +4572,7 @@
     </p:spTree>
     <p:extLst>
       <p:ext uri="{BB962C8B-B14F-4D97-AF65-F5344CB8AC3E}">
-        <p14:creationId xmlns="" xmlns:p14="http://schemas.microsoft.com/office/powerpoint/2010/main" val="855395126"/>
+        <p14:creationId xmlns:p14="http://schemas.microsoft.com/office/powerpoint/2010/main" xmlns="" val="855395126"/>
       </p:ext>
     </p:extLst>
   </p:cSld>
@@ -4685,7 +4685,7 @@
     </p:spTree>
     <p:extLst>
       <p:ext uri="{BB962C8B-B14F-4D97-AF65-F5344CB8AC3E}">
-        <p14:creationId xmlns="" xmlns:p14="http://schemas.microsoft.com/office/powerpoint/2010/main" val="802928497"/>
+        <p14:creationId xmlns:p14="http://schemas.microsoft.com/office/powerpoint/2010/main" xmlns="" val="802928497"/>
       </p:ext>
     </p:extLst>
   </p:cSld>
@@ -4861,7 +4861,7 @@
             <a:fld id="{63CABBC0-75E4-43BB-A6A6-84C2A96BDB82}" type="datetimeFigureOut">
               <a:rPr lang="it-IT" smtClean="0"/>
               <a:pPr/>
-              <a:t>01/01/2013</a:t>
+              <a:t>02/01/2013</a:t>
             </a:fld>
             <a:endParaRPr lang="it-IT"/>
           </a:p>
@@ -5043,7 +5043,7 @@
             <a:fld id="{63CABBC0-75E4-43BB-A6A6-84C2A96BDB82}" type="datetimeFigureOut">
               <a:rPr lang="it-IT" smtClean="0"/>
               <a:pPr/>
-              <a:t>01/01/2013</a:t>
+              <a:t>02/01/2013</a:t>
             </a:fld>
             <a:endParaRPr lang="it-IT"/>
           </a:p>
@@ -5235,7 +5235,7 @@
             <a:fld id="{63CABBC0-75E4-43BB-A6A6-84C2A96BDB82}" type="datetimeFigureOut">
               <a:rPr lang="it-IT" smtClean="0"/>
               <a:pPr/>
-              <a:t>01/01/2013</a:t>
+              <a:t>02/01/2013</a:t>
             </a:fld>
             <a:endParaRPr lang="it-IT"/>
           </a:p>
@@ -5417,7 +5417,7 @@
             <a:fld id="{63CABBC0-75E4-43BB-A6A6-84C2A96BDB82}" type="datetimeFigureOut">
               <a:rPr lang="it-IT" smtClean="0"/>
               <a:pPr/>
-              <a:t>01/01/2013</a:t>
+              <a:t>02/01/2013</a:t>
             </a:fld>
             <a:endParaRPr lang="it-IT"/>
           </a:p>
@@ -5660,7 +5660,7 @@
             <a:fld id="{63CABBC0-75E4-43BB-A6A6-84C2A96BDB82}" type="datetimeFigureOut">
               <a:rPr lang="it-IT" smtClean="0"/>
               <a:pPr/>
-              <a:t>01/01/2013</a:t>
+              <a:t>02/01/2013</a:t>
             </a:fld>
             <a:endParaRPr lang="it-IT"/>
           </a:p>
@@ -5941,7 +5941,7 @@
             <a:fld id="{63CABBC0-75E4-43BB-A6A6-84C2A96BDB82}" type="datetimeFigureOut">
               <a:rPr lang="it-IT" smtClean="0"/>
               <a:pPr/>
-              <a:t>01/01/2013</a:t>
+              <a:t>02/01/2013</a:t>
             </a:fld>
             <a:endParaRPr lang="it-IT"/>
           </a:p>
@@ -6332,7 +6332,7 @@
             <a:fld id="{63CABBC0-75E4-43BB-A6A6-84C2A96BDB82}" type="datetimeFigureOut">
               <a:rPr lang="it-IT" smtClean="0"/>
               <a:pPr/>
-              <a:t>01/01/2013</a:t>
+              <a:t>02/01/2013</a:t>
             </a:fld>
             <a:endParaRPr lang="it-IT"/>
           </a:p>
@@ -6491,7 +6491,7 @@
             <a:fld id="{63CABBC0-75E4-43BB-A6A6-84C2A96BDB82}" type="datetimeFigureOut">
               <a:rPr lang="it-IT" smtClean="0"/>
               <a:pPr/>
-              <a:t>01/01/2013</a:t>
+              <a:t>02/01/2013</a:t>
             </a:fld>
             <a:endParaRPr lang="it-IT"/>
           </a:p>
@@ -6590,7 +6590,7 @@
             <a:fld id="{63CABBC0-75E4-43BB-A6A6-84C2A96BDB82}" type="datetimeFigureOut">
               <a:rPr lang="it-IT" smtClean="0"/>
               <a:pPr/>
-              <a:t>01/01/2013</a:t>
+              <a:t>02/01/2013</a:t>
             </a:fld>
             <a:endParaRPr lang="it-IT"/>
           </a:p>
@@ -6860,7 +6860,7 @@
             <a:fld id="{63CABBC0-75E4-43BB-A6A6-84C2A96BDB82}" type="datetimeFigureOut">
               <a:rPr lang="it-IT" smtClean="0"/>
               <a:pPr/>
-              <a:t>01/01/2013</a:t>
+              <a:t>02/01/2013</a:t>
             </a:fld>
             <a:endParaRPr lang="it-IT"/>
           </a:p>
@@ -7157,7 +7157,7 @@
             <a:fld id="{63CABBC0-75E4-43BB-A6A6-84C2A96BDB82}" type="datetimeFigureOut">
               <a:rPr lang="it-IT" smtClean="0"/>
               <a:pPr/>
-              <a:t>01/01/2013</a:t>
+              <a:t>02/01/2013</a:t>
             </a:fld>
             <a:endParaRPr lang="it-IT"/>
           </a:p>
@@ -7937,7 +7937,7 @@
             <a:fld id="{63CABBC0-75E4-43BB-A6A6-84C2A96BDB82}" type="datetimeFigureOut">
               <a:rPr lang="it-IT" smtClean="0"/>
               <a:pPr/>
-              <a:t>01/01/2013</a:t>
+              <a:t>02/01/2013</a:t>
             </a:fld>
             <a:endParaRPr lang="it-IT"/>
           </a:p>
@@ -8623,7 +8623,7 @@
           <a:blip r:embed="rId2">
             <a:extLst>
               <a:ext uri="{28A0092B-C50C-407E-A947-70E740481C1C}">
-                <a14:useLocalDpi xmlns="" xmlns:a14="http://schemas.microsoft.com/office/drawing/2010/main" val="0"/>
+                <a14:useLocalDpi xmlns:a14="http://schemas.microsoft.com/office/drawing/2010/main" xmlns="" val="0"/>
               </a:ext>
             </a:extLst>
           </a:blip>
@@ -8647,14 +8647,14 @@
           <a:effectLst/>
           <a:extLst>
             <a:ext uri="{909E8E84-426E-40DD-AFC4-6F175D3DCCD1}">
-              <a14:hiddenFill xmlns="" xmlns:a14="http://schemas.microsoft.com/office/drawing/2010/main">
+              <a14:hiddenFill xmlns:a14="http://schemas.microsoft.com/office/drawing/2010/main" xmlns="">
                 <a:solidFill>
                   <a:schemeClr val="accent1"/>
                 </a:solidFill>
               </a14:hiddenFill>
             </a:ext>
             <a:ext uri="{91240B29-F687-4F45-9708-019B960494DF}">
-              <a14:hiddenLine xmlns="" xmlns:a14="http://schemas.microsoft.com/office/drawing/2010/main" w="9525">
+              <a14:hiddenLine xmlns:a14="http://schemas.microsoft.com/office/drawing/2010/main" xmlns="" w="9525">
                 <a:solidFill>
                   <a:schemeClr val="tx1"/>
                 </a:solidFill>
@@ -8664,7 +8664,7 @@
               </a14:hiddenLine>
             </a:ext>
             <a:ext uri="{AF507438-7753-43E0-B8FC-AC1667EBCBE1}">
-              <a14:hiddenEffects xmlns="" xmlns:a14="http://schemas.microsoft.com/office/drawing/2010/main">
+              <a14:hiddenEffects xmlns:a14="http://schemas.microsoft.com/office/drawing/2010/main" xmlns="">
                 <a:effectLst>
                   <a:outerShdw dist="35921" dir="2700000" algn="ctr" rotWithShape="0">
                     <a:schemeClr val="bg2"/>
@@ -8684,7 +8684,7 @@
           <p:nvPr>
             <p:extLst>
               <p:ext uri="{D42A27DB-BD31-4B8C-83A1-F6EECF244321}">
-                <p14:modId xmlns="" xmlns:p14="http://schemas.microsoft.com/office/powerpoint/2010/main" val="669990601"/>
+                <p14:modId xmlns:p14="http://schemas.microsoft.com/office/powerpoint/2010/main" xmlns="" val="669990601"/>
               </p:ext>
             </p:extLst>
           </p:nvPr>
@@ -8861,7 +8861,7 @@
           <p:nvPr>
             <p:extLst>
               <p:ext uri="{D42A27DB-BD31-4B8C-83A1-F6EECF244321}">
-                <p14:modId xmlns="" xmlns:p14="http://schemas.microsoft.com/office/powerpoint/2010/main" val="1867475245"/>
+                <p14:modId xmlns:p14="http://schemas.microsoft.com/office/powerpoint/2010/main" xmlns="" val="1867475245"/>
               </p:ext>
             </p:extLst>
           </p:nvPr>
@@ -8992,7 +8992,7 @@
     </p:spTree>
     <p:extLst>
       <p:ext uri="{BB962C8B-B14F-4D97-AF65-F5344CB8AC3E}">
-        <p14:creationId xmlns="" xmlns:p14="http://schemas.microsoft.com/office/powerpoint/2010/main" val="4165334171"/>
+        <p14:creationId xmlns:p14="http://schemas.microsoft.com/office/powerpoint/2010/main" xmlns="" val="4165334171"/>
       </p:ext>
     </p:extLst>
   </p:cSld>
@@ -9288,7 +9288,7 @@
     </p:spTree>
     <p:extLst>
       <p:ext uri="{BB962C8B-B14F-4D97-AF65-F5344CB8AC3E}">
-        <p14:creationId xmlns="" xmlns:p14="http://schemas.microsoft.com/office/powerpoint/2010/main" val="155874689"/>
+        <p14:creationId xmlns:p14="http://schemas.microsoft.com/office/powerpoint/2010/main" xmlns="" val="155874689"/>
       </p:ext>
     </p:extLst>
   </p:cSld>
@@ -9296,7 +9296,7 @@
     <a:masterClrMapping/>
   </p:clrMapOvr>
   <mc:AlternateContent xmlns:mc="http://schemas.openxmlformats.org/markup-compatibility/2006">
-    <mc:Choice xmlns="" xmlns:p14="http://schemas.microsoft.com/office/powerpoint/2010/main" Requires="p14">
+    <mc:Choice xmlns:p14="http://schemas.microsoft.com/office/powerpoint/2010/main" xmlns="" Requires="p14">
       <p:transition spd="slow" p14:dur="2000"/>
     </mc:Choice>
     <mc:Fallback>
@@ -9802,7 +9802,7 @@
     </p:spTree>
     <p:extLst>
       <p:ext uri="{BB962C8B-B14F-4D97-AF65-F5344CB8AC3E}">
-        <p14:creationId xmlns="" xmlns:p14="http://schemas.microsoft.com/office/powerpoint/2010/main" val="155874689"/>
+        <p14:creationId xmlns:p14="http://schemas.microsoft.com/office/powerpoint/2010/main" xmlns="" val="155874689"/>
       </p:ext>
     </p:extLst>
   </p:cSld>
@@ -9810,7 +9810,7 @@
     <a:masterClrMapping/>
   </p:clrMapOvr>
   <mc:AlternateContent xmlns:mc="http://schemas.openxmlformats.org/markup-compatibility/2006">
-    <mc:Choice xmlns="" xmlns:p14="http://schemas.microsoft.com/office/powerpoint/2010/main" Requires="p14">
+    <mc:Choice xmlns:p14="http://schemas.microsoft.com/office/powerpoint/2010/main" xmlns="" Requires="p14">
       <p:transition spd="slow" p14:dur="2000"/>
     </mc:Choice>
     <mc:Fallback>
@@ -10307,7 +10307,7 @@
     </p:spTree>
     <p:extLst>
       <p:ext uri="{BB962C8B-B14F-4D97-AF65-F5344CB8AC3E}">
-        <p14:creationId xmlns="" xmlns:p14="http://schemas.microsoft.com/office/powerpoint/2010/main" val="155874689"/>
+        <p14:creationId xmlns:p14="http://schemas.microsoft.com/office/powerpoint/2010/main" xmlns="" val="155874689"/>
       </p:ext>
     </p:extLst>
   </p:cSld>
@@ -10315,7 +10315,7 @@
     <a:masterClrMapping/>
   </p:clrMapOvr>
   <mc:AlternateContent xmlns:mc="http://schemas.openxmlformats.org/markup-compatibility/2006">
-    <mc:Choice xmlns="" xmlns:p14="http://schemas.microsoft.com/office/powerpoint/2010/main" Requires="p14">
+    <mc:Choice xmlns:p14="http://schemas.microsoft.com/office/powerpoint/2010/main" xmlns="" Requires="p14">
       <p:transition spd="slow" p14:dur="2000"/>
     </mc:Choice>
     <mc:Fallback>
@@ -12492,7 +12492,7 @@
           <a:blip r:embed="rId3">
             <a:extLst>
               <a:ext uri="{28A0092B-C50C-407E-A947-70E740481C1C}">
-                <a14:useLocalDpi xmlns="" xmlns:a14="http://schemas.microsoft.com/office/drawing/2010/main" val="0"/>
+                <a14:useLocalDpi xmlns:a14="http://schemas.microsoft.com/office/drawing/2010/main" xmlns="" val="0"/>
               </a:ext>
             </a:extLst>
           </a:blip>
@@ -12512,7 +12512,7 @@
           <a:noFill/>
           <a:extLst>
             <a:ext uri="{909E8E84-426E-40DD-AFC4-6F175D3DCCD1}">
-              <a14:hiddenFill xmlns="" xmlns:a14="http://schemas.microsoft.com/office/drawing/2010/main">
+              <a14:hiddenFill xmlns:a14="http://schemas.microsoft.com/office/drawing/2010/main" xmlns="">
                 <a:solidFill>
                   <a:srgbClr val="FFFFFF"/>
                 </a:solidFill>
@@ -12533,7 +12533,7 @@
           <a:blip r:embed="rId4">
             <a:extLst>
               <a:ext uri="{28A0092B-C50C-407E-A947-70E740481C1C}">
-                <a14:useLocalDpi xmlns="" xmlns:a14="http://schemas.microsoft.com/office/drawing/2010/main" val="0"/>
+                <a14:useLocalDpi xmlns:a14="http://schemas.microsoft.com/office/drawing/2010/main" xmlns="" val="0"/>
               </a:ext>
             </a:extLst>
           </a:blip>
@@ -12553,7 +12553,7 @@
           <a:noFill/>
           <a:extLst>
             <a:ext uri="{909E8E84-426E-40DD-AFC4-6F175D3DCCD1}">
-              <a14:hiddenFill xmlns="" xmlns:a14="http://schemas.microsoft.com/office/drawing/2010/main">
+              <a14:hiddenFill xmlns:a14="http://schemas.microsoft.com/office/drawing/2010/main" xmlns="">
                 <a:solidFill>
                   <a:srgbClr val="FFFFFF"/>
                 </a:solidFill>
@@ -12599,7 +12599,7 @@
     </p:spTree>
     <p:extLst>
       <p:ext uri="{BB962C8B-B14F-4D97-AF65-F5344CB8AC3E}">
-        <p14:creationId xmlns="" xmlns:p14="http://schemas.microsoft.com/office/powerpoint/2010/main" val="1277526579"/>
+        <p14:creationId xmlns:p14="http://schemas.microsoft.com/office/powerpoint/2010/main" xmlns="" val="1277526579"/>
       </p:ext>
     </p:extLst>
   </p:cSld>
@@ -12618,9 +12618,6 @@
                     <p:cTn id="3" fill="hold">
                       <p:stCondLst>
                         <p:cond delay="indefinite"/>
-                        <p:cond evt="onBegin" delay="0">
-                          <p:tn val="2"/>
-                        </p:cond>
                       </p:stCondLst>
                       <p:childTnLst>
                         <p:par>
@@ -12630,7 +12627,7 @@
                             </p:stCondLst>
                             <p:childTnLst>
                               <p:par>
-                                <p:cTn id="5" presetID="10" presetClass="entr" presetSubtype="0" fill="hold" grpId="0" nodeType="withEffect">
+                                <p:cTn id="5" presetID="2" presetClass="entr" presetSubtype="4" fill="hold" grpId="0" nodeType="clickEffect">
                                   <p:stCondLst>
                                     <p:cond delay="0"/>
                                   </p:stCondLst>
@@ -12643,7 +12640,11 @@
                                           </p:stCondLst>
                                         </p:cTn>
                                         <p:tgtEl>
-                                          <p:spTgt spid="3"/>
+                                          <p:spTgt spid="3">
+                                            <p:txEl>
+                                              <p:pRg st="0" end="0"/>
+                                            </p:txEl>
+                                          </p:spTgt>
                                         </p:tgtEl>
                                         <p:attrNameLst>
                                           <p:attrName>style.visibility</p:attrName>
@@ -12653,26 +12654,260 @@
                                         <p:strVal val="visible"/>
                                       </p:to>
                                     </p:set>
-                                    <p:animEffect transition="in" filter="fade">
-                                      <p:cBhvr>
-                                        <p:cTn id="7" dur="500"/>
+                                    <p:anim calcmode="lin" valueType="num">
+                                      <p:cBhvr additive="base">
+                                        <p:cTn id="7" dur="500" fill="hold"/>
                                         <p:tgtEl>
-                                          <p:spTgt spid="3"/>
+                                          <p:spTgt spid="3">
+                                            <p:txEl>
+                                              <p:pRg st="0" end="0"/>
+                                            </p:txEl>
+                                          </p:spTgt>
                                         </p:tgtEl>
+                                        <p:attrNameLst>
+                                          <p:attrName>ppt_x</p:attrName>
+                                        </p:attrNameLst>
                                       </p:cBhvr>
-                                    </p:animEffect>
+                                      <p:tavLst>
+                                        <p:tav tm="0">
+                                          <p:val>
+                                            <p:strVal val="#ppt_x"/>
+                                          </p:val>
+                                        </p:tav>
+                                        <p:tav tm="100000">
+                                          <p:val>
+                                            <p:strVal val="#ppt_x"/>
+                                          </p:val>
+                                        </p:tav>
+                                      </p:tavLst>
+                                    </p:anim>
+                                    <p:anim calcmode="lin" valueType="num">
+                                      <p:cBhvr additive="base">
+                                        <p:cTn id="8" dur="500" fill="hold"/>
+                                        <p:tgtEl>
+                                          <p:spTgt spid="3">
+                                            <p:txEl>
+                                              <p:pRg st="0" end="0"/>
+                                            </p:txEl>
+                                          </p:spTgt>
+                                        </p:tgtEl>
+                                        <p:attrNameLst>
+                                          <p:attrName>ppt_y</p:attrName>
+                                        </p:attrNameLst>
+                                      </p:cBhvr>
+                                      <p:tavLst>
+                                        <p:tav tm="0">
+                                          <p:val>
+                                            <p:strVal val="1+#ppt_h/2"/>
+                                          </p:val>
+                                        </p:tav>
+                                        <p:tav tm="100000">
+                                          <p:val>
+                                            <p:strVal val="#ppt_y"/>
+                                          </p:val>
+                                        </p:tav>
+                                      </p:tavLst>
+                                    </p:anim>
                                   </p:childTnLst>
                                 </p:cTn>
                               </p:par>
                               <p:par>
-                                <p:cTn id="8" presetID="22" presetClass="entr" presetSubtype="4" fill="hold" nodeType="withEffect">
+                                <p:cTn id="9" presetID="2" presetClass="entr" presetSubtype="4" fill="hold" grpId="0" nodeType="withEffect">
                                   <p:stCondLst>
                                     <p:cond delay="0"/>
                                   </p:stCondLst>
                                   <p:childTnLst>
                                     <p:set>
                                       <p:cBhvr>
-                                        <p:cTn id="9" dur="1" fill="hold">
+                                        <p:cTn id="10" dur="1" fill="hold">
+                                          <p:stCondLst>
+                                            <p:cond delay="0"/>
+                                          </p:stCondLst>
+                                        </p:cTn>
+                                        <p:tgtEl>
+                                          <p:spTgt spid="3">
+                                            <p:txEl>
+                                              <p:pRg st="1" end="1"/>
+                                            </p:txEl>
+                                          </p:spTgt>
+                                        </p:tgtEl>
+                                        <p:attrNameLst>
+                                          <p:attrName>style.visibility</p:attrName>
+                                        </p:attrNameLst>
+                                      </p:cBhvr>
+                                      <p:to>
+                                        <p:strVal val="visible"/>
+                                      </p:to>
+                                    </p:set>
+                                    <p:anim calcmode="lin" valueType="num">
+                                      <p:cBhvr additive="base">
+                                        <p:cTn id="11" dur="500" fill="hold"/>
+                                        <p:tgtEl>
+                                          <p:spTgt spid="3">
+                                            <p:txEl>
+                                              <p:pRg st="1" end="1"/>
+                                            </p:txEl>
+                                          </p:spTgt>
+                                        </p:tgtEl>
+                                        <p:attrNameLst>
+                                          <p:attrName>ppt_x</p:attrName>
+                                        </p:attrNameLst>
+                                      </p:cBhvr>
+                                      <p:tavLst>
+                                        <p:tav tm="0">
+                                          <p:val>
+                                            <p:strVal val="#ppt_x"/>
+                                          </p:val>
+                                        </p:tav>
+                                        <p:tav tm="100000">
+                                          <p:val>
+                                            <p:strVal val="#ppt_x"/>
+                                          </p:val>
+                                        </p:tav>
+                                      </p:tavLst>
+                                    </p:anim>
+                                    <p:anim calcmode="lin" valueType="num">
+                                      <p:cBhvr additive="base">
+                                        <p:cTn id="12" dur="500" fill="hold"/>
+                                        <p:tgtEl>
+                                          <p:spTgt spid="3">
+                                            <p:txEl>
+                                              <p:pRg st="1" end="1"/>
+                                            </p:txEl>
+                                          </p:spTgt>
+                                        </p:tgtEl>
+                                        <p:attrNameLst>
+                                          <p:attrName>ppt_y</p:attrName>
+                                        </p:attrNameLst>
+                                      </p:cBhvr>
+                                      <p:tavLst>
+                                        <p:tav tm="0">
+                                          <p:val>
+                                            <p:strVal val="1+#ppt_h/2"/>
+                                          </p:val>
+                                        </p:tav>
+                                        <p:tav tm="100000">
+                                          <p:val>
+                                            <p:strVal val="#ppt_y"/>
+                                          </p:val>
+                                        </p:tav>
+                                      </p:tavLst>
+                                    </p:anim>
+                                  </p:childTnLst>
+                                </p:cTn>
+                              </p:par>
+                              <p:par>
+                                <p:cTn id="13" presetID="2" presetClass="entr" presetSubtype="4" fill="hold" grpId="0" nodeType="withEffect">
+                                  <p:stCondLst>
+                                    <p:cond delay="0"/>
+                                  </p:stCondLst>
+                                  <p:childTnLst>
+                                    <p:set>
+                                      <p:cBhvr>
+                                        <p:cTn id="14" dur="1" fill="hold">
+                                          <p:stCondLst>
+                                            <p:cond delay="0"/>
+                                          </p:stCondLst>
+                                        </p:cTn>
+                                        <p:tgtEl>
+                                          <p:spTgt spid="3">
+                                            <p:txEl>
+                                              <p:pRg st="3" end="3"/>
+                                            </p:txEl>
+                                          </p:spTgt>
+                                        </p:tgtEl>
+                                        <p:attrNameLst>
+                                          <p:attrName>style.visibility</p:attrName>
+                                        </p:attrNameLst>
+                                      </p:cBhvr>
+                                      <p:to>
+                                        <p:strVal val="visible"/>
+                                      </p:to>
+                                    </p:set>
+                                    <p:anim calcmode="lin" valueType="num">
+                                      <p:cBhvr additive="base">
+                                        <p:cTn id="15" dur="500" fill="hold"/>
+                                        <p:tgtEl>
+                                          <p:spTgt spid="3">
+                                            <p:txEl>
+                                              <p:pRg st="3" end="3"/>
+                                            </p:txEl>
+                                          </p:spTgt>
+                                        </p:tgtEl>
+                                        <p:attrNameLst>
+                                          <p:attrName>ppt_x</p:attrName>
+                                        </p:attrNameLst>
+                                      </p:cBhvr>
+                                      <p:tavLst>
+                                        <p:tav tm="0">
+                                          <p:val>
+                                            <p:strVal val="#ppt_x"/>
+                                          </p:val>
+                                        </p:tav>
+                                        <p:tav tm="100000">
+                                          <p:val>
+                                            <p:strVal val="#ppt_x"/>
+                                          </p:val>
+                                        </p:tav>
+                                      </p:tavLst>
+                                    </p:anim>
+                                    <p:anim calcmode="lin" valueType="num">
+                                      <p:cBhvr additive="base">
+                                        <p:cTn id="16" dur="500" fill="hold"/>
+                                        <p:tgtEl>
+                                          <p:spTgt spid="3">
+                                            <p:txEl>
+                                              <p:pRg st="3" end="3"/>
+                                            </p:txEl>
+                                          </p:spTgt>
+                                        </p:tgtEl>
+                                        <p:attrNameLst>
+                                          <p:attrName>ppt_y</p:attrName>
+                                        </p:attrNameLst>
+                                      </p:cBhvr>
+                                      <p:tavLst>
+                                        <p:tav tm="0">
+                                          <p:val>
+                                            <p:strVal val="1+#ppt_h/2"/>
+                                          </p:val>
+                                        </p:tav>
+                                        <p:tav tm="100000">
+                                          <p:val>
+                                            <p:strVal val="#ppt_y"/>
+                                          </p:val>
+                                        </p:tav>
+                                      </p:tavLst>
+                                    </p:anim>
+                                  </p:childTnLst>
+                                </p:cTn>
+                              </p:par>
+                            </p:childTnLst>
+                          </p:cTn>
+                        </p:par>
+                      </p:childTnLst>
+                    </p:cTn>
+                  </p:par>
+                  <p:par>
+                    <p:cTn id="17" fill="hold">
+                      <p:stCondLst>
+                        <p:cond delay="indefinite"/>
+                      </p:stCondLst>
+                      <p:childTnLst>
+                        <p:par>
+                          <p:cTn id="18" fill="hold">
+                            <p:stCondLst>
+                              <p:cond delay="0"/>
+                            </p:stCondLst>
+                            <p:childTnLst>
+                              <p:par>
+                                <p:cTn id="19" presetID="10" presetClass="entr" presetSubtype="0" fill="hold" nodeType="clickEffect">
+                                  <p:stCondLst>
+                                    <p:cond delay="0"/>
+                                  </p:stCondLst>
+                                  <p:childTnLst>
+                                    <p:set>
+                                      <p:cBhvr>
+                                        <p:cTn id="20" dur="1" fill="hold">
                                           <p:stCondLst>
                                             <p:cond delay="0"/>
                                           </p:stCondLst>
@@ -12688,9 +12923,9 @@
                                         <p:strVal val="visible"/>
                                       </p:to>
                                     </p:set>
-                                    <p:animEffect transition="in" filter="wipe(down)">
+                                    <p:animEffect transition="in" filter="fade">
                                       <p:cBhvr>
-                                        <p:cTn id="10" dur="500"/>
+                                        <p:cTn id="21" dur="1000"/>
                                         <p:tgtEl>
                                           <p:spTgt spid="1026"/>
                                         </p:tgtEl>
@@ -12700,14 +12935,14 @@
                                 </p:cTn>
                               </p:par>
                               <p:par>
-                                <p:cTn id="11" presetID="22" presetClass="entr" presetSubtype="4" fill="hold" nodeType="withEffect">
+                                <p:cTn id="22" presetID="10" presetClass="entr" presetSubtype="0" fill="hold" nodeType="withEffect">
                                   <p:stCondLst>
                                     <p:cond delay="0"/>
                                   </p:stCondLst>
                                   <p:childTnLst>
                                     <p:set>
                                       <p:cBhvr>
-                                        <p:cTn id="12" dur="1" fill="hold">
+                                        <p:cTn id="23" dur="1" fill="hold">
                                           <p:stCondLst>
                                             <p:cond delay="0"/>
                                           </p:stCondLst>
@@ -12723,9 +12958,9 @@
                                         <p:strVal val="visible"/>
                                       </p:to>
                                     </p:set>
-                                    <p:animEffect transition="in" filter="wipe(down)">
+                                    <p:animEffect transition="in" filter="fade">
                                       <p:cBhvr>
-                                        <p:cTn id="13" dur="500"/>
+                                        <p:cTn id="24" dur="1000"/>
                                         <p:tgtEl>
                                           <p:spTgt spid="6"/>
                                         </p:tgtEl>
@@ -12735,14 +12970,14 @@
                                 </p:cTn>
                               </p:par>
                               <p:par>
-                                <p:cTn id="14" presetID="22" presetClass="entr" presetSubtype="4" fill="hold" nodeType="withEffect">
+                                <p:cTn id="25" presetID="10" presetClass="entr" presetSubtype="0" fill="hold" nodeType="withEffect">
                                   <p:stCondLst>
                                     <p:cond delay="0"/>
                                   </p:stCondLst>
                                   <p:childTnLst>
                                     <p:set>
                                       <p:cBhvr>
-                                        <p:cTn id="15" dur="1" fill="hold">
+                                        <p:cTn id="26" dur="1" fill="hold">
                                           <p:stCondLst>
                                             <p:cond delay="0"/>
                                           </p:stCondLst>
@@ -12758,9 +12993,9 @@
                                         <p:strVal val="visible"/>
                                       </p:to>
                                     </p:set>
-                                    <p:animEffect transition="in" filter="wipe(down)">
+                                    <p:animEffect transition="in" filter="fade">
                                       <p:cBhvr>
-                                        <p:cTn id="16" dur="500"/>
+                                        <p:cTn id="27" dur="1000"/>
                                         <p:tgtEl>
                                           <p:spTgt spid="1027"/>
                                         </p:tgtEl>
@@ -12797,7 +13032,7 @@
       </p:par>
     </p:tnLst>
     <p:bldLst>
-      <p:bldP spid="3" grpId="0"/>
+      <p:bldP spid="3" grpId="0" build="allAtOnce"/>
     </p:bldLst>
   </p:timing>
 </p:sld>
@@ -12911,7 +13146,7 @@
           <a:blip r:embed="rId3">
             <a:extLst>
               <a:ext uri="{28A0092B-C50C-407E-A947-70E740481C1C}">
-                <a14:useLocalDpi xmlns="" xmlns:a14="http://schemas.microsoft.com/office/drawing/2010/main" val="0"/>
+                <a14:useLocalDpi xmlns:a14="http://schemas.microsoft.com/office/drawing/2010/main" xmlns="" val="0"/>
               </a:ext>
             </a:extLst>
           </a:blip>
@@ -12931,7 +13166,7 @@
           <a:noFill/>
           <a:extLst>
             <a:ext uri="{909E8E84-426E-40DD-AFC4-6F175D3DCCD1}">
-              <a14:hiddenFill xmlns="" xmlns:a14="http://schemas.microsoft.com/office/drawing/2010/main">
+              <a14:hiddenFill xmlns:a14="http://schemas.microsoft.com/office/drawing/2010/main" xmlns="">
                 <a:solidFill>
                   <a:srgbClr val="FFFFFF"/>
                 </a:solidFill>
@@ -12952,7 +13187,7 @@
           <a:blip r:embed="rId4" cstate="print">
             <a:extLst>
               <a:ext uri="{28A0092B-C50C-407E-A947-70E740481C1C}">
-                <a14:useLocalDpi xmlns="" xmlns:a14="http://schemas.microsoft.com/office/drawing/2010/main" val="0"/>
+                <a14:useLocalDpi xmlns:a14="http://schemas.microsoft.com/office/drawing/2010/main" xmlns="" val="0"/>
               </a:ext>
             </a:extLst>
           </a:blip>
@@ -12972,7 +13207,7 @@
           <a:noFill/>
           <a:extLst>
             <a:ext uri="{909E8E84-426E-40DD-AFC4-6F175D3DCCD1}">
-              <a14:hiddenFill xmlns="" xmlns:a14="http://schemas.microsoft.com/office/drawing/2010/main">
+              <a14:hiddenFill xmlns:a14="http://schemas.microsoft.com/office/drawing/2010/main" xmlns="">
                 <a:solidFill>
                   <a:srgbClr val="FFFFFF"/>
                 </a:solidFill>
@@ -12993,7 +13228,7 @@
           <a:blip r:embed="rId5">
             <a:extLst>
               <a:ext uri="{28A0092B-C50C-407E-A947-70E740481C1C}">
-                <a14:useLocalDpi xmlns="" xmlns:a14="http://schemas.microsoft.com/office/drawing/2010/main" val="0"/>
+                <a14:useLocalDpi xmlns:a14="http://schemas.microsoft.com/office/drawing/2010/main" xmlns="" val="0"/>
               </a:ext>
             </a:extLst>
           </a:blip>
@@ -13013,7 +13248,7 @@
           <a:noFill/>
           <a:extLst>
             <a:ext uri="{909E8E84-426E-40DD-AFC4-6F175D3DCCD1}">
-              <a14:hiddenFill xmlns="" xmlns:a14="http://schemas.microsoft.com/office/drawing/2010/main">
+              <a14:hiddenFill xmlns:a14="http://schemas.microsoft.com/office/drawing/2010/main" xmlns="">
                 <a:solidFill>
                   <a:srgbClr val="FFFFFF"/>
                 </a:solidFill>
@@ -13115,7 +13350,7 @@
     </p:spTree>
     <p:extLst>
       <p:ext uri="{BB962C8B-B14F-4D97-AF65-F5344CB8AC3E}">
-        <p14:creationId xmlns="" xmlns:p14="http://schemas.microsoft.com/office/powerpoint/2010/main" val="418107373"/>
+        <p14:creationId xmlns:p14="http://schemas.microsoft.com/office/powerpoint/2010/main" xmlns="" val="418107373"/>
       </p:ext>
     </p:extLst>
   </p:cSld>
@@ -13581,7 +13816,7 @@
           <a:blip r:embed="rId4">
             <a:extLst>
               <a:ext uri="{28A0092B-C50C-407E-A947-70E740481C1C}">
-                <a14:useLocalDpi xmlns="" xmlns:a14="http://schemas.microsoft.com/office/drawing/2010/main" val="0"/>
+                <a14:useLocalDpi xmlns:a14="http://schemas.microsoft.com/office/drawing/2010/main" xmlns="" val="0"/>
               </a:ext>
             </a:extLst>
           </a:blip>
@@ -13601,7 +13836,7 @@
           <a:noFill/>
           <a:extLst>
             <a:ext uri="{909E8E84-426E-40DD-AFC4-6F175D3DCCD1}">
-              <a14:hiddenFill xmlns="" xmlns:a14="http://schemas.microsoft.com/office/drawing/2010/main">
+              <a14:hiddenFill xmlns:a14="http://schemas.microsoft.com/office/drawing/2010/main" xmlns="">
                 <a:solidFill>
                   <a:srgbClr val="FFFFFF"/>
                 </a:solidFill>
@@ -14048,7 +14283,7 @@
     </p:spTree>
     <p:extLst>
       <p:ext uri="{BB962C8B-B14F-4D97-AF65-F5344CB8AC3E}">
-        <p14:creationId xmlns="" xmlns:p14="http://schemas.microsoft.com/office/powerpoint/2010/main" val="2879521852"/>
+        <p14:creationId xmlns:p14="http://schemas.microsoft.com/office/powerpoint/2010/main" xmlns="" val="2879521852"/>
       </p:ext>
     </p:extLst>
   </p:cSld>
@@ -14056,7 +14291,7 @@
     <a:masterClrMapping/>
   </p:clrMapOvr>
   <mc:AlternateContent xmlns:mc="http://schemas.openxmlformats.org/markup-compatibility/2006">
-    <mc:Choice xmlns="" xmlns:p14="http://schemas.microsoft.com/office/powerpoint/2010/main" Requires="p14">
+    <mc:Choice xmlns:p14="http://schemas.microsoft.com/office/powerpoint/2010/main" xmlns="" Requires="p14">
       <p:transition spd="slow" p14:dur="2000"/>
     </mc:Choice>
     <mc:Fallback>
@@ -14084,7 +14319,7 @@
                             </p:stCondLst>
                             <p:childTnLst>
                               <p:par>
-                                <p:cTn id="5" presetID="10" presetClass="entr" presetSubtype="0" fill="hold" nodeType="clickEffect">
+                                <p:cTn id="5" presetID="10" presetClass="entr" presetSubtype="0" fill="hold" grpId="0" nodeType="clickEffect">
                                   <p:stCondLst>
                                     <p:cond delay="0"/>
                                   </p:stCondLst>
@@ -14092,6 +14327,165 @@
                                     <p:set>
                                       <p:cBhvr>
                                         <p:cTn id="6" dur="1" fill="hold">
+                                          <p:stCondLst>
+                                            <p:cond delay="0"/>
+                                          </p:stCondLst>
+                                        </p:cTn>
+                                        <p:tgtEl>
+                                          <p:spTgt spid="10"/>
+                                        </p:tgtEl>
+                                        <p:attrNameLst>
+                                          <p:attrName>style.visibility</p:attrName>
+                                        </p:attrNameLst>
+                                      </p:cBhvr>
+                                      <p:to>
+                                        <p:strVal val="visible"/>
+                                      </p:to>
+                                    </p:set>
+                                    <p:animEffect transition="in" filter="fade">
+                                      <p:cBhvr>
+                                        <p:cTn id="7" dur="500"/>
+                                        <p:tgtEl>
+                                          <p:spTgt spid="10"/>
+                                        </p:tgtEl>
+                                      </p:cBhvr>
+                                    </p:animEffect>
+                                  </p:childTnLst>
+                                </p:cTn>
+                              </p:par>
+                              <p:par>
+                                <p:cTn id="8" presetID="10" presetClass="entr" presetSubtype="0" fill="hold" grpId="0" nodeType="withEffect">
+                                  <p:stCondLst>
+                                    <p:cond delay="0"/>
+                                  </p:stCondLst>
+                                  <p:childTnLst>
+                                    <p:set>
+                                      <p:cBhvr>
+                                        <p:cTn id="9" dur="1" fill="hold">
+                                          <p:stCondLst>
+                                            <p:cond delay="0"/>
+                                          </p:stCondLst>
+                                        </p:cTn>
+                                        <p:tgtEl>
+                                          <p:spTgt spid="11"/>
+                                        </p:tgtEl>
+                                        <p:attrNameLst>
+                                          <p:attrName>style.visibility</p:attrName>
+                                        </p:attrNameLst>
+                                      </p:cBhvr>
+                                      <p:to>
+                                        <p:strVal val="visible"/>
+                                      </p:to>
+                                    </p:set>
+                                    <p:animEffect transition="in" filter="fade">
+                                      <p:cBhvr>
+                                        <p:cTn id="10" dur="500"/>
+                                        <p:tgtEl>
+                                          <p:spTgt spid="11"/>
+                                        </p:tgtEl>
+                                      </p:cBhvr>
+                                    </p:animEffect>
+                                  </p:childTnLst>
+                                </p:cTn>
+                              </p:par>
+                              <p:par>
+                                <p:cTn id="11" presetID="10" presetClass="entr" presetSubtype="0" fill="hold" grpId="0" nodeType="withEffect">
+                                  <p:stCondLst>
+                                    <p:cond delay="0"/>
+                                  </p:stCondLst>
+                                  <p:childTnLst>
+                                    <p:set>
+                                      <p:cBhvr>
+                                        <p:cTn id="12" dur="1" fill="hold">
+                                          <p:stCondLst>
+                                            <p:cond delay="0"/>
+                                          </p:stCondLst>
+                                        </p:cTn>
+                                        <p:tgtEl>
+                                          <p:spTgt spid="2"/>
+                                        </p:tgtEl>
+                                        <p:attrNameLst>
+                                          <p:attrName>style.visibility</p:attrName>
+                                        </p:attrNameLst>
+                                      </p:cBhvr>
+                                      <p:to>
+                                        <p:strVal val="visible"/>
+                                      </p:to>
+                                    </p:set>
+                                    <p:animEffect transition="in" filter="fade">
+                                      <p:cBhvr>
+                                        <p:cTn id="13" dur="500"/>
+                                        <p:tgtEl>
+                                          <p:spTgt spid="2"/>
+                                        </p:tgtEl>
+                                      </p:cBhvr>
+                                    </p:animEffect>
+                                  </p:childTnLst>
+                                </p:cTn>
+                              </p:par>
+                              <p:par>
+                                <p:cTn id="14" presetID="6" presetClass="emph" presetSubtype="0" fill="hold" grpId="1" nodeType="withEffect">
+                                  <p:stCondLst>
+                                    <p:cond delay="0"/>
+                                  </p:stCondLst>
+                                  <p:childTnLst>
+                                    <p:animScale>
+                                      <p:cBhvr>
+                                        <p:cTn id="15" dur="2000" fill="hold"/>
+                                        <p:tgtEl>
+                                          <p:spTgt spid="10"/>
+                                        </p:tgtEl>
+                                      </p:cBhvr>
+                                      <p:by x="150000" y="150000"/>
+                                    </p:animScale>
+                                  </p:childTnLst>
+                                </p:cTn>
+                              </p:par>
+                              <p:par>
+                                <p:cTn id="16" presetID="6" presetClass="emph" presetSubtype="0" fill="hold" grpId="1" nodeType="withEffect">
+                                  <p:stCondLst>
+                                    <p:cond delay="0"/>
+                                  </p:stCondLst>
+                                  <p:childTnLst>
+                                    <p:animScale>
+                                      <p:cBhvr>
+                                        <p:cTn id="17" dur="2000" fill="hold"/>
+                                        <p:tgtEl>
+                                          <p:spTgt spid="2"/>
+                                        </p:tgtEl>
+                                      </p:cBhvr>
+                                      <p:by x="150000" y="150000"/>
+                                    </p:animScale>
+                                  </p:childTnLst>
+                                </p:cTn>
+                              </p:par>
+                            </p:childTnLst>
+                          </p:cTn>
+                        </p:par>
+                      </p:childTnLst>
+                    </p:cTn>
+                  </p:par>
+                  <p:par>
+                    <p:cTn id="18" fill="hold">
+                      <p:stCondLst>
+                        <p:cond delay="indefinite"/>
+                      </p:stCondLst>
+                      <p:childTnLst>
+                        <p:par>
+                          <p:cTn id="19" fill="hold">
+                            <p:stCondLst>
+                              <p:cond delay="0"/>
+                            </p:stCondLst>
+                            <p:childTnLst>
+                              <p:par>
+                                <p:cTn id="20" presetID="10" presetClass="entr" presetSubtype="0" fill="hold" nodeType="clickEffect">
+                                  <p:stCondLst>
+                                    <p:cond delay="0"/>
+                                  </p:stCondLst>
+                                  <p:childTnLst>
+                                    <p:set>
+                                      <p:cBhvr>
+                                        <p:cTn id="21" dur="1" fill="hold">
                                           <p:stCondLst>
                                             <p:cond delay="0"/>
                                           </p:stCondLst>
@@ -14109,7 +14503,7 @@
                                     </p:set>
                                     <p:animEffect transition="in" filter="fade">
                                       <p:cBhvr>
-                                        <p:cTn id="7" dur="500"/>
+                                        <p:cTn id="22" dur="500"/>
                                         <p:tgtEl>
                                           <p:spTgt spid="2053"/>
                                         </p:tgtEl>
@@ -14119,14 +14513,14 @@
                                 </p:cTn>
                               </p:par>
                               <p:par>
-                                <p:cTn id="8" presetID="10" presetClass="entr" presetSubtype="0" fill="hold" nodeType="withEffect">
+                                <p:cTn id="23" presetID="10" presetClass="entr" presetSubtype="0" fill="hold" nodeType="withEffect">
                                   <p:stCondLst>
                                     <p:cond delay="0"/>
                                   </p:stCondLst>
                                   <p:childTnLst>
                                     <p:set>
                                       <p:cBhvr>
-                                        <p:cTn id="9" dur="1" fill="hold">
+                                        <p:cTn id="24" dur="1" fill="hold">
                                           <p:stCondLst>
                                             <p:cond delay="0"/>
                                           </p:stCondLst>
@@ -14144,171 +14538,12 @@
                                     </p:set>
                                     <p:animEffect transition="in" filter="fade">
                                       <p:cBhvr>
-                                        <p:cTn id="10" dur="500"/>
+                                        <p:cTn id="25" dur="500"/>
                                         <p:tgtEl>
                                           <p:spTgt spid="1026"/>
                                         </p:tgtEl>
                                       </p:cBhvr>
                                     </p:animEffect>
-                                  </p:childTnLst>
-                                </p:cTn>
-                              </p:par>
-                            </p:childTnLst>
-                          </p:cTn>
-                        </p:par>
-                      </p:childTnLst>
-                    </p:cTn>
-                  </p:par>
-                  <p:par>
-                    <p:cTn id="11" fill="hold">
-                      <p:stCondLst>
-                        <p:cond delay="indefinite"/>
-                      </p:stCondLst>
-                      <p:childTnLst>
-                        <p:par>
-                          <p:cTn id="12" fill="hold">
-                            <p:stCondLst>
-                              <p:cond delay="0"/>
-                            </p:stCondLst>
-                            <p:childTnLst>
-                              <p:par>
-                                <p:cTn id="13" presetID="10" presetClass="entr" presetSubtype="0" fill="hold" grpId="0" nodeType="clickEffect">
-                                  <p:stCondLst>
-                                    <p:cond delay="0"/>
-                                  </p:stCondLst>
-                                  <p:childTnLst>
-                                    <p:set>
-                                      <p:cBhvr>
-                                        <p:cTn id="14" dur="1" fill="hold">
-                                          <p:stCondLst>
-                                            <p:cond delay="0"/>
-                                          </p:stCondLst>
-                                        </p:cTn>
-                                        <p:tgtEl>
-                                          <p:spTgt spid="10"/>
-                                        </p:tgtEl>
-                                        <p:attrNameLst>
-                                          <p:attrName>style.visibility</p:attrName>
-                                        </p:attrNameLst>
-                                      </p:cBhvr>
-                                      <p:to>
-                                        <p:strVal val="visible"/>
-                                      </p:to>
-                                    </p:set>
-                                    <p:animEffect transition="in" filter="fade">
-                                      <p:cBhvr>
-                                        <p:cTn id="15" dur="500"/>
-                                        <p:tgtEl>
-                                          <p:spTgt spid="10"/>
-                                        </p:tgtEl>
-                                      </p:cBhvr>
-                                    </p:animEffect>
-                                  </p:childTnLst>
-                                </p:cTn>
-                              </p:par>
-                              <p:par>
-                                <p:cTn id="16" presetID="10" presetClass="entr" presetSubtype="0" fill="hold" grpId="0" nodeType="withEffect">
-                                  <p:stCondLst>
-                                    <p:cond delay="0"/>
-                                  </p:stCondLst>
-                                  <p:childTnLst>
-                                    <p:set>
-                                      <p:cBhvr>
-                                        <p:cTn id="17" dur="1" fill="hold">
-                                          <p:stCondLst>
-                                            <p:cond delay="0"/>
-                                          </p:stCondLst>
-                                        </p:cTn>
-                                        <p:tgtEl>
-                                          <p:spTgt spid="11"/>
-                                        </p:tgtEl>
-                                        <p:attrNameLst>
-                                          <p:attrName>style.visibility</p:attrName>
-                                        </p:attrNameLst>
-                                      </p:cBhvr>
-                                      <p:to>
-                                        <p:strVal val="visible"/>
-                                      </p:to>
-                                    </p:set>
-                                    <p:animEffect transition="in" filter="fade">
-                                      <p:cBhvr>
-                                        <p:cTn id="18" dur="500"/>
-                                        <p:tgtEl>
-                                          <p:spTgt spid="11"/>
-                                        </p:tgtEl>
-                                      </p:cBhvr>
-                                    </p:animEffect>
-                                  </p:childTnLst>
-                                </p:cTn>
-                              </p:par>
-                              <p:par>
-                                <p:cTn id="19" presetID="10" presetClass="entr" presetSubtype="0" fill="hold" grpId="0" nodeType="withEffect">
-                                  <p:stCondLst>
-                                    <p:cond delay="0"/>
-                                  </p:stCondLst>
-                                  <p:childTnLst>
-                                    <p:set>
-                                      <p:cBhvr>
-                                        <p:cTn id="20" dur="1" fill="hold">
-                                          <p:stCondLst>
-                                            <p:cond delay="0"/>
-                                          </p:stCondLst>
-                                        </p:cTn>
-                                        <p:tgtEl>
-                                          <p:spTgt spid="2"/>
-                                        </p:tgtEl>
-                                        <p:attrNameLst>
-                                          <p:attrName>style.visibility</p:attrName>
-                                        </p:attrNameLst>
-                                      </p:cBhvr>
-                                      <p:to>
-                                        <p:strVal val="visible"/>
-                                      </p:to>
-                                    </p:set>
-                                    <p:animEffect transition="in" filter="fade">
-                                      <p:cBhvr>
-                                        <p:cTn id="21" dur="500"/>
-                                        <p:tgtEl>
-                                          <p:spTgt spid="2"/>
-                                        </p:tgtEl>
-                                      </p:cBhvr>
-                                    </p:animEffect>
-                                  </p:childTnLst>
-                                </p:cTn>
-                              </p:par>
-                              <p:par>
-                                <p:cTn id="22" presetID="6" presetClass="emph" presetSubtype="0" fill="hold" grpId="1" nodeType="withEffect">
-                                  <p:stCondLst>
-                                    <p:cond delay="0"/>
-                                  </p:stCondLst>
-                                  <p:childTnLst>
-                                    <p:animScale>
-                                      <p:cBhvr>
-                                        <p:cTn id="23" dur="2000" fill="hold"/>
-                                        <p:tgtEl>
-                                          <p:spTgt spid="10"/>
-                                        </p:tgtEl>
-                                      </p:cBhvr>
-                                      <p:by x="150000" y="150000"/>
-                                    </p:animScale>
-                                  </p:childTnLst>
-                                </p:cTn>
-                              </p:par>
-                              <p:par>
-                                <p:cTn id="24" presetID="6" presetClass="emph" presetSubtype="0" fill="hold" grpId="1" nodeType="withEffect">
-                                  <p:stCondLst>
-                                    <p:cond delay="0"/>
-                                  </p:stCondLst>
-                                  <p:childTnLst>
-                                    <p:animScale>
-                                      <p:cBhvr>
-                                        <p:cTn id="25" dur="2000" fill="hold"/>
-                                        <p:tgtEl>
-                                          <p:spTgt spid="2"/>
-                                        </p:tgtEl>
-                                      </p:cBhvr>
-                                      <p:by x="150000" y="150000"/>
-                                    </p:animScale>
                                   </p:childTnLst>
                                 </p:cTn>
                               </p:par>
@@ -14379,7 +14614,7 @@
           <a:blip r:embed="rId3">
             <a:extLst>
               <a:ext uri="{28A0092B-C50C-407E-A947-70E740481C1C}">
-                <a14:useLocalDpi xmlns="" xmlns:a14="http://schemas.microsoft.com/office/drawing/2010/main" val="0"/>
+                <a14:useLocalDpi xmlns:a14="http://schemas.microsoft.com/office/drawing/2010/main" xmlns="" val="0"/>
               </a:ext>
             </a:extLst>
           </a:blip>
@@ -14399,7 +14634,7 @@
           <a:noFill/>
           <a:extLst>
             <a:ext uri="{909E8E84-426E-40DD-AFC4-6F175D3DCCD1}">
-              <a14:hiddenFill xmlns="" xmlns:a14="http://schemas.microsoft.com/office/drawing/2010/main">
+              <a14:hiddenFill xmlns:a14="http://schemas.microsoft.com/office/drawing/2010/main" xmlns="">
                 <a:solidFill>
                   <a:srgbClr val="FFFFFF"/>
                 </a:solidFill>
@@ -14920,7 +15155,7 @@
     </p:spTree>
     <p:extLst>
       <p:ext uri="{BB962C8B-B14F-4D97-AF65-F5344CB8AC3E}">
-        <p14:creationId xmlns="" xmlns:p14="http://schemas.microsoft.com/office/powerpoint/2010/main" val="202613363"/>
+        <p14:creationId xmlns:p14="http://schemas.microsoft.com/office/powerpoint/2010/main" xmlns="" val="202613363"/>
       </p:ext>
     </p:extLst>
   </p:cSld>
@@ -14928,7 +15163,7 @@
     <a:masterClrMapping/>
   </p:clrMapOvr>
   <mc:AlternateContent xmlns:mc="http://schemas.openxmlformats.org/markup-compatibility/2006">
-    <mc:Choice xmlns="" xmlns:p14="http://schemas.microsoft.com/office/powerpoint/2010/main" Requires="p14">
+    <mc:Choice xmlns:p14="http://schemas.microsoft.com/office/powerpoint/2010/main" xmlns="" Requires="p14">
       <p:transition spd="slow" p14:dur="2000"/>
     </mc:Choice>
     <mc:Fallback>
@@ -15169,24 +15404,6 @@
                                   </p:childTnLst>
                                 </p:cTn>
                               </p:par>
-                              <p:par>
-                                <p:cTn id="24" presetID="6" presetClass="emph" presetSubtype="0" fill="hold" grpId="1" nodeType="withEffect">
-                                  <p:stCondLst>
-                                    <p:cond delay="0"/>
-                                  </p:stCondLst>
-                                  <p:childTnLst>
-                                    <p:animScale>
-                                      <p:cBhvr>
-                                        <p:cTn id="25" dur="2000" fill="hold"/>
-                                        <p:tgtEl>
-                                          <p:spTgt spid="10"/>
-                                        </p:tgtEl>
-                                      </p:cBhvr>
-                                      <p:by x="150000" y="150000"/>
-                                    </p:animScale>
-                                  </p:childTnLst>
-                                </p:cTn>
-                              </p:par>
                             </p:childTnLst>
                           </p:cTn>
                         </p:par>
@@ -15218,7 +15435,6 @@
       <p:bldP spid="2" grpId="0"/>
       <p:bldP spid="11" grpId="0"/>
       <p:bldP spid="10" grpId="0"/>
-      <p:bldP spid="10" grpId="1"/>
     </p:bldLst>
   </p:timing>
 </p:sld>
@@ -15253,7 +15469,7 @@
           <a:blip r:embed="rId3">
             <a:extLst>
               <a:ext uri="{28A0092B-C50C-407E-A947-70E740481C1C}">
-                <a14:useLocalDpi xmlns="" xmlns:a14="http://schemas.microsoft.com/office/drawing/2010/main" val="0"/>
+                <a14:useLocalDpi xmlns:a14="http://schemas.microsoft.com/office/drawing/2010/main" xmlns="" val="0"/>
               </a:ext>
             </a:extLst>
           </a:blip>
@@ -15273,7 +15489,7 @@
           <a:noFill/>
           <a:extLst>
             <a:ext uri="{909E8E84-426E-40DD-AFC4-6F175D3DCCD1}">
-              <a14:hiddenFill xmlns="" xmlns:a14="http://schemas.microsoft.com/office/drawing/2010/main">
+              <a14:hiddenFill xmlns:a14="http://schemas.microsoft.com/office/drawing/2010/main" xmlns="">
                 <a:solidFill>
                   <a:srgbClr val="FFFFFF"/>
                 </a:solidFill>
@@ -15294,7 +15510,7 @@
           <a:blip r:embed="rId4">
             <a:extLst>
               <a:ext uri="{28A0092B-C50C-407E-A947-70E740481C1C}">
-                <a14:useLocalDpi xmlns="" xmlns:a14="http://schemas.microsoft.com/office/drawing/2010/main" val="0"/>
+                <a14:useLocalDpi xmlns:a14="http://schemas.microsoft.com/office/drawing/2010/main" xmlns="" val="0"/>
               </a:ext>
             </a:extLst>
           </a:blip>
@@ -15314,7 +15530,7 @@
           <a:noFill/>
           <a:extLst>
             <a:ext uri="{909E8E84-426E-40DD-AFC4-6F175D3DCCD1}">
-              <a14:hiddenFill xmlns="" xmlns:a14="http://schemas.microsoft.com/office/drawing/2010/main">
+              <a14:hiddenFill xmlns:a14="http://schemas.microsoft.com/office/drawing/2010/main" xmlns="">
                 <a:solidFill>
                   <a:srgbClr val="FFFFFF"/>
                 </a:solidFill>
@@ -15638,7 +15854,7 @@
     </p:spTree>
     <p:extLst>
       <p:ext uri="{BB962C8B-B14F-4D97-AF65-F5344CB8AC3E}">
-        <p14:creationId xmlns="" xmlns:p14="http://schemas.microsoft.com/office/powerpoint/2010/main" val="1197112555"/>
+        <p14:creationId xmlns:p14="http://schemas.microsoft.com/office/powerpoint/2010/main" xmlns="" val="1197112555"/>
       </p:ext>
     </p:extLst>
   </p:cSld>
@@ -15646,7 +15862,7 @@
     <a:masterClrMapping/>
   </p:clrMapOvr>
   <mc:AlternateContent xmlns:mc="http://schemas.openxmlformats.org/markup-compatibility/2006">
-    <mc:Choice xmlns="" xmlns:p14="http://schemas.microsoft.com/office/powerpoint/2010/main" Requires="p14">
+    <mc:Choice xmlns:p14="http://schemas.microsoft.com/office/powerpoint/2010/main" xmlns="" Requires="p14">
       <p:transition spd="slow" p14:dur="2000"/>
     </mc:Choice>
     <mc:Fallback>
@@ -16733,7 +16949,7 @@
     </p:spTree>
     <p:extLst>
       <p:ext uri="{BB962C8B-B14F-4D97-AF65-F5344CB8AC3E}">
-        <p14:creationId xmlns="" xmlns:p14="http://schemas.microsoft.com/office/powerpoint/2010/main" val="155874689"/>
+        <p14:creationId xmlns:p14="http://schemas.microsoft.com/office/powerpoint/2010/main" xmlns="" val="155874689"/>
       </p:ext>
     </p:extLst>
   </p:cSld>
@@ -16741,7 +16957,7 @@
     <a:masterClrMapping/>
   </p:clrMapOvr>
   <mc:AlternateContent xmlns:mc="http://schemas.openxmlformats.org/markup-compatibility/2006">
-    <mc:Choice xmlns="" xmlns:p14="http://schemas.microsoft.com/office/powerpoint/2010/main" Requires="p14">
+    <mc:Choice xmlns:p14="http://schemas.microsoft.com/office/powerpoint/2010/main" xmlns="" Requires="p14">
       <p:transition spd="slow" p14:dur="2000"/>
     </mc:Choice>
     <mc:Fallback>
@@ -17105,7 +17321,7 @@
           <a:blip r:embed="rId3">
             <a:extLst>
               <a:ext uri="{28A0092B-C50C-407E-A947-70E740481C1C}">
-                <a14:useLocalDpi xmlns="" xmlns:a14="http://schemas.microsoft.com/office/drawing/2010/main" val="0"/>
+                <a14:useLocalDpi xmlns:a14="http://schemas.microsoft.com/office/drawing/2010/main" xmlns="" val="0"/>
               </a:ext>
             </a:extLst>
           </a:blip>
@@ -17125,7 +17341,7 @@
           <a:noFill/>
           <a:extLst>
             <a:ext uri="{909E8E84-426E-40DD-AFC4-6F175D3DCCD1}">
-              <a14:hiddenFill xmlns="" xmlns:a14="http://schemas.microsoft.com/office/drawing/2010/main">
+              <a14:hiddenFill xmlns:a14="http://schemas.microsoft.com/office/drawing/2010/main" xmlns="">
                 <a:solidFill>
                   <a:srgbClr val="FFFFFF"/>
                 </a:solidFill>
@@ -17146,7 +17362,7 @@
           <a:blip r:embed="rId4">
             <a:extLst>
               <a:ext uri="{28A0092B-C50C-407E-A947-70E740481C1C}">
-                <a14:useLocalDpi xmlns="" xmlns:a14="http://schemas.microsoft.com/office/drawing/2010/main" val="0"/>
+                <a14:useLocalDpi xmlns:a14="http://schemas.microsoft.com/office/drawing/2010/main" xmlns="" val="0"/>
               </a:ext>
             </a:extLst>
           </a:blip>
@@ -17175,7 +17391,7 @@
           </a:effectLst>
           <a:extLst>
             <a:ext uri="{909E8E84-426E-40DD-AFC4-6F175D3DCCD1}">
-              <a14:hiddenFill xmlns="" xmlns:a14="http://schemas.microsoft.com/office/drawing/2010/main">
+              <a14:hiddenFill xmlns:a14="http://schemas.microsoft.com/office/drawing/2010/main" xmlns="">
                 <a:solidFill>
                   <a:srgbClr val="FFFFFF"/>
                 </a:solidFill>
@@ -17213,7 +17429,7 @@
     </p:spTree>
     <p:extLst>
       <p:ext uri="{BB962C8B-B14F-4D97-AF65-F5344CB8AC3E}">
-        <p14:creationId xmlns="" xmlns:p14="http://schemas.microsoft.com/office/powerpoint/2010/main" val="700353664"/>
+        <p14:creationId xmlns:p14="http://schemas.microsoft.com/office/powerpoint/2010/main" xmlns="" val="700353664"/>
       </p:ext>
     </p:extLst>
   </p:cSld>
@@ -17221,7 +17437,7 @@
     <a:masterClrMapping/>
   </p:clrMapOvr>
   <mc:AlternateContent xmlns:mc="http://schemas.openxmlformats.org/markup-compatibility/2006">
-    <mc:Choice xmlns="" xmlns:p14="http://schemas.microsoft.com/office/powerpoint/2010/main" Requires="p14">
+    <mc:Choice xmlns:p14="http://schemas.microsoft.com/office/powerpoint/2010/main" xmlns="" Requires="p14">
       <p:transition spd="slow" p14:dur="2000"/>
     </mc:Choice>
     <mc:Fallback>
@@ -17377,178 +17593,6 @@
                                   </p:childTnLst>
                                 </p:cTn>
                               </p:par>
-                              <p:par>
-                                <p:cTn id="14" presetID="22" presetClass="entr" presetSubtype="4" fill="hold" grpId="0" nodeType="withEffect">
-                                  <p:stCondLst>
-                                    <p:cond delay="0"/>
-                                  </p:stCondLst>
-                                  <p:childTnLst>
-                                    <p:set>
-                                      <p:cBhvr>
-                                        <p:cTn id="15" dur="1" fill="hold">
-                                          <p:stCondLst>
-                                            <p:cond delay="0"/>
-                                          </p:stCondLst>
-                                        </p:cTn>
-                                        <p:tgtEl>
-                                          <p:spTgt spid="4">
-                                            <p:txEl>
-                                              <p:pRg st="3" end="3"/>
-                                            </p:txEl>
-                                          </p:spTgt>
-                                        </p:tgtEl>
-                                        <p:attrNameLst>
-                                          <p:attrName>style.visibility</p:attrName>
-                                        </p:attrNameLst>
-                                      </p:cBhvr>
-                                      <p:to>
-                                        <p:strVal val="visible"/>
-                                      </p:to>
-                                    </p:set>
-                                    <p:animEffect transition="in" filter="wipe(down)">
-                                      <p:cBhvr>
-                                        <p:cTn id="16" dur="500"/>
-                                        <p:tgtEl>
-                                          <p:spTgt spid="4">
-                                            <p:txEl>
-                                              <p:pRg st="3" end="3"/>
-                                            </p:txEl>
-                                          </p:spTgt>
-                                        </p:tgtEl>
-                                      </p:cBhvr>
-                                    </p:animEffect>
-                                  </p:childTnLst>
-                                </p:cTn>
-                              </p:par>
-                              <p:par>
-                                <p:cTn id="17" presetID="22" presetClass="entr" presetSubtype="4" fill="hold" grpId="0" nodeType="withEffect">
-                                  <p:stCondLst>
-                                    <p:cond delay="0"/>
-                                  </p:stCondLst>
-                                  <p:childTnLst>
-                                    <p:set>
-                                      <p:cBhvr>
-                                        <p:cTn id="18" dur="1" fill="hold">
-                                          <p:stCondLst>
-                                            <p:cond delay="0"/>
-                                          </p:stCondLst>
-                                        </p:cTn>
-                                        <p:tgtEl>
-                                          <p:spTgt spid="4">
-                                            <p:txEl>
-                                              <p:pRg st="4" end="4"/>
-                                            </p:txEl>
-                                          </p:spTgt>
-                                        </p:tgtEl>
-                                        <p:attrNameLst>
-                                          <p:attrName>style.visibility</p:attrName>
-                                        </p:attrNameLst>
-                                      </p:cBhvr>
-                                      <p:to>
-                                        <p:strVal val="visible"/>
-                                      </p:to>
-                                    </p:set>
-                                    <p:animEffect transition="in" filter="wipe(down)">
-                                      <p:cBhvr>
-                                        <p:cTn id="19" dur="500"/>
-                                        <p:tgtEl>
-                                          <p:spTgt spid="4">
-                                            <p:txEl>
-                                              <p:pRg st="4" end="4"/>
-                                            </p:txEl>
-                                          </p:spTgt>
-                                        </p:tgtEl>
-                                      </p:cBhvr>
-                                    </p:animEffect>
-                                  </p:childTnLst>
-                                </p:cTn>
-                              </p:par>
-                              <p:par>
-                                <p:cTn id="20" presetID="22" presetClass="entr" presetSubtype="4" fill="hold" grpId="0" nodeType="withEffect">
-                                  <p:stCondLst>
-                                    <p:cond delay="0"/>
-                                  </p:stCondLst>
-                                  <p:childTnLst>
-                                    <p:set>
-                                      <p:cBhvr>
-                                        <p:cTn id="21" dur="1" fill="hold">
-                                          <p:stCondLst>
-                                            <p:cond delay="0"/>
-                                          </p:stCondLst>
-                                        </p:cTn>
-                                        <p:tgtEl>
-                                          <p:spTgt spid="4">
-                                            <p:txEl>
-                                              <p:pRg st="5" end="5"/>
-                                            </p:txEl>
-                                          </p:spTgt>
-                                        </p:tgtEl>
-                                        <p:attrNameLst>
-                                          <p:attrName>style.visibility</p:attrName>
-                                        </p:attrNameLst>
-                                      </p:cBhvr>
-                                      <p:to>
-                                        <p:strVal val="visible"/>
-                                      </p:to>
-                                    </p:set>
-                                    <p:animEffect transition="in" filter="wipe(down)">
-                                      <p:cBhvr>
-                                        <p:cTn id="22" dur="500"/>
-                                        <p:tgtEl>
-                                          <p:spTgt spid="4">
-                                            <p:txEl>
-                                              <p:pRg st="5" end="5"/>
-                                            </p:txEl>
-                                          </p:spTgt>
-                                        </p:tgtEl>
-                                      </p:cBhvr>
-                                    </p:animEffect>
-                                  </p:childTnLst>
-                                </p:cTn>
-                              </p:par>
-                              <p:par>
-                                <p:cTn id="23" presetID="22" presetClass="entr" presetSubtype="4" fill="hold" grpId="0" nodeType="withEffect">
-                                  <p:stCondLst>
-                                    <p:cond delay="0"/>
-                                  </p:stCondLst>
-                                  <p:childTnLst>
-                                    <p:set>
-                                      <p:cBhvr>
-                                        <p:cTn id="24" dur="1" fill="hold">
-                                          <p:stCondLst>
-                                            <p:cond delay="0"/>
-                                          </p:stCondLst>
-                                        </p:cTn>
-                                        <p:tgtEl>
-                                          <p:spTgt spid="4">
-                                            <p:txEl>
-                                              <p:pRg st="6" end="6"/>
-                                            </p:txEl>
-                                          </p:spTgt>
-                                        </p:tgtEl>
-                                        <p:attrNameLst>
-                                          <p:attrName>style.visibility</p:attrName>
-                                        </p:attrNameLst>
-                                      </p:cBhvr>
-                                      <p:to>
-                                        <p:strVal val="visible"/>
-                                      </p:to>
-                                    </p:set>
-                                    <p:animEffect transition="in" filter="wipe(down)">
-                                      <p:cBhvr>
-                                        <p:cTn id="25" dur="500"/>
-                                        <p:tgtEl>
-                                          <p:spTgt spid="4">
-                                            <p:txEl>
-                                              <p:pRg st="6" end="6"/>
-                                            </p:txEl>
-                                          </p:spTgt>
-                                        </p:tgtEl>
-                                      </p:cBhvr>
-                                    </p:animEffect>
-                                  </p:childTnLst>
-                                </p:cTn>
-                              </p:par>
                             </p:childTnLst>
                           </p:cTn>
                         </p:par>
@@ -17556,26 +17600,26 @@
                     </p:cTn>
                   </p:par>
                   <p:par>
-                    <p:cTn id="26" fill="hold">
+                    <p:cTn id="14" fill="hold">
                       <p:stCondLst>
                         <p:cond delay="indefinite"/>
                       </p:stCondLst>
                       <p:childTnLst>
                         <p:par>
-                          <p:cTn id="27" fill="hold">
+                          <p:cTn id="15" fill="hold">
                             <p:stCondLst>
                               <p:cond delay="0"/>
                             </p:stCondLst>
                             <p:childTnLst>
                               <p:par>
-                                <p:cTn id="28" presetID="2" presetClass="entr" presetSubtype="4" fill="hold" nodeType="clickEffect">
+                                <p:cTn id="16" presetID="2" presetClass="entr" presetSubtype="4" fill="hold" nodeType="clickEffect">
                                   <p:stCondLst>
                                     <p:cond delay="0"/>
                                   </p:stCondLst>
                                   <p:childTnLst>
                                     <p:set>
                                       <p:cBhvr>
-                                        <p:cTn id="29" dur="1" fill="hold">
+                                        <p:cTn id="17" dur="1" fill="hold">
                                           <p:stCondLst>
                                             <p:cond delay="0"/>
                                           </p:stCondLst>
@@ -17593,7 +17637,7 @@
                                     </p:set>
                                     <p:anim calcmode="lin" valueType="num">
                                       <p:cBhvr additive="base">
-                                        <p:cTn id="30" dur="500" fill="hold"/>
+                                        <p:cTn id="18" dur="500" fill="hold"/>
                                         <p:tgtEl>
                                           <p:spTgt spid="3074"/>
                                         </p:tgtEl>
@@ -17616,7 +17660,7 @@
                                     </p:anim>
                                     <p:anim calcmode="lin" valueType="num">
                                       <p:cBhvr additive="base">
-                                        <p:cTn id="31" dur="500" fill="hold"/>
+                                        <p:cTn id="19" dur="500" fill="hold"/>
                                         <p:tgtEl>
                                           <p:spTgt spid="3074"/>
                                         </p:tgtEl>
@@ -17647,26 +17691,216 @@
                     </p:cTn>
                   </p:par>
                   <p:par>
-                    <p:cTn id="32" fill="hold">
+                    <p:cTn id="20" fill="hold">
                       <p:stCondLst>
                         <p:cond delay="indefinite"/>
                       </p:stCondLst>
                       <p:childTnLst>
                         <p:par>
-                          <p:cTn id="33" fill="hold">
+                          <p:cTn id="21" fill="hold">
                             <p:stCondLst>
                               <p:cond delay="0"/>
                             </p:stCondLst>
                             <p:childTnLst>
                               <p:par>
-                                <p:cTn id="34" presetID="2" presetClass="entr" presetSubtype="4" fill="hold" nodeType="clickEffect">
+                                <p:cTn id="22" presetID="22" presetClass="entr" presetSubtype="4" fill="hold" grpId="0" nodeType="clickEffect">
                                   <p:stCondLst>
                                     <p:cond delay="0"/>
                                   </p:stCondLst>
                                   <p:childTnLst>
                                     <p:set>
                                       <p:cBhvr>
-                                        <p:cTn id="35" dur="1" fill="hold">
+                                        <p:cTn id="23" dur="1" fill="hold">
+                                          <p:stCondLst>
+                                            <p:cond delay="0"/>
+                                          </p:stCondLst>
+                                        </p:cTn>
+                                        <p:tgtEl>
+                                          <p:spTgt spid="4">
+                                            <p:txEl>
+                                              <p:pRg st="3" end="3"/>
+                                            </p:txEl>
+                                          </p:spTgt>
+                                        </p:tgtEl>
+                                        <p:attrNameLst>
+                                          <p:attrName>style.visibility</p:attrName>
+                                        </p:attrNameLst>
+                                      </p:cBhvr>
+                                      <p:to>
+                                        <p:strVal val="visible"/>
+                                      </p:to>
+                                    </p:set>
+                                    <p:animEffect transition="in" filter="wipe(down)">
+                                      <p:cBhvr>
+                                        <p:cTn id="24" dur="500"/>
+                                        <p:tgtEl>
+                                          <p:spTgt spid="4">
+                                            <p:txEl>
+                                              <p:pRg st="3" end="3"/>
+                                            </p:txEl>
+                                          </p:spTgt>
+                                        </p:tgtEl>
+                                      </p:cBhvr>
+                                    </p:animEffect>
+                                  </p:childTnLst>
+                                </p:cTn>
+                              </p:par>
+                              <p:par>
+                                <p:cTn id="25" presetID="22" presetClass="entr" presetSubtype="4" fill="hold" grpId="0" nodeType="withEffect">
+                                  <p:stCondLst>
+                                    <p:cond delay="0"/>
+                                  </p:stCondLst>
+                                  <p:childTnLst>
+                                    <p:set>
+                                      <p:cBhvr>
+                                        <p:cTn id="26" dur="1" fill="hold">
+                                          <p:stCondLst>
+                                            <p:cond delay="0"/>
+                                          </p:stCondLst>
+                                        </p:cTn>
+                                        <p:tgtEl>
+                                          <p:spTgt spid="4">
+                                            <p:txEl>
+                                              <p:pRg st="4" end="4"/>
+                                            </p:txEl>
+                                          </p:spTgt>
+                                        </p:tgtEl>
+                                        <p:attrNameLst>
+                                          <p:attrName>style.visibility</p:attrName>
+                                        </p:attrNameLst>
+                                      </p:cBhvr>
+                                      <p:to>
+                                        <p:strVal val="visible"/>
+                                      </p:to>
+                                    </p:set>
+                                    <p:animEffect transition="in" filter="wipe(down)">
+                                      <p:cBhvr>
+                                        <p:cTn id="27" dur="500"/>
+                                        <p:tgtEl>
+                                          <p:spTgt spid="4">
+                                            <p:txEl>
+                                              <p:pRg st="4" end="4"/>
+                                            </p:txEl>
+                                          </p:spTgt>
+                                        </p:tgtEl>
+                                      </p:cBhvr>
+                                    </p:animEffect>
+                                  </p:childTnLst>
+                                </p:cTn>
+                              </p:par>
+                              <p:par>
+                                <p:cTn id="28" presetID="22" presetClass="entr" presetSubtype="4" fill="hold" grpId="0" nodeType="withEffect">
+                                  <p:stCondLst>
+                                    <p:cond delay="0"/>
+                                  </p:stCondLst>
+                                  <p:childTnLst>
+                                    <p:set>
+                                      <p:cBhvr>
+                                        <p:cTn id="29" dur="1" fill="hold">
+                                          <p:stCondLst>
+                                            <p:cond delay="0"/>
+                                          </p:stCondLst>
+                                        </p:cTn>
+                                        <p:tgtEl>
+                                          <p:spTgt spid="4">
+                                            <p:txEl>
+                                              <p:pRg st="5" end="5"/>
+                                            </p:txEl>
+                                          </p:spTgt>
+                                        </p:tgtEl>
+                                        <p:attrNameLst>
+                                          <p:attrName>style.visibility</p:attrName>
+                                        </p:attrNameLst>
+                                      </p:cBhvr>
+                                      <p:to>
+                                        <p:strVal val="visible"/>
+                                      </p:to>
+                                    </p:set>
+                                    <p:animEffect transition="in" filter="wipe(down)">
+                                      <p:cBhvr>
+                                        <p:cTn id="30" dur="500"/>
+                                        <p:tgtEl>
+                                          <p:spTgt spid="4">
+                                            <p:txEl>
+                                              <p:pRg st="5" end="5"/>
+                                            </p:txEl>
+                                          </p:spTgt>
+                                        </p:tgtEl>
+                                      </p:cBhvr>
+                                    </p:animEffect>
+                                  </p:childTnLst>
+                                </p:cTn>
+                              </p:par>
+                              <p:par>
+                                <p:cTn id="31" presetID="22" presetClass="entr" presetSubtype="4" fill="hold" grpId="0" nodeType="withEffect">
+                                  <p:stCondLst>
+                                    <p:cond delay="0"/>
+                                  </p:stCondLst>
+                                  <p:childTnLst>
+                                    <p:set>
+                                      <p:cBhvr>
+                                        <p:cTn id="32" dur="1" fill="hold">
+                                          <p:stCondLst>
+                                            <p:cond delay="0"/>
+                                          </p:stCondLst>
+                                        </p:cTn>
+                                        <p:tgtEl>
+                                          <p:spTgt spid="4">
+                                            <p:txEl>
+                                              <p:pRg st="6" end="6"/>
+                                            </p:txEl>
+                                          </p:spTgt>
+                                        </p:tgtEl>
+                                        <p:attrNameLst>
+                                          <p:attrName>style.visibility</p:attrName>
+                                        </p:attrNameLst>
+                                      </p:cBhvr>
+                                      <p:to>
+                                        <p:strVal val="visible"/>
+                                      </p:to>
+                                    </p:set>
+                                    <p:animEffect transition="in" filter="wipe(down)">
+                                      <p:cBhvr>
+                                        <p:cTn id="33" dur="500"/>
+                                        <p:tgtEl>
+                                          <p:spTgt spid="4">
+                                            <p:txEl>
+                                              <p:pRg st="6" end="6"/>
+                                            </p:txEl>
+                                          </p:spTgt>
+                                        </p:tgtEl>
+                                      </p:cBhvr>
+                                    </p:animEffect>
+                                  </p:childTnLst>
+                                </p:cTn>
+                              </p:par>
+                            </p:childTnLst>
+                          </p:cTn>
+                        </p:par>
+                      </p:childTnLst>
+                    </p:cTn>
+                  </p:par>
+                  <p:par>
+                    <p:cTn id="34" fill="hold">
+                      <p:stCondLst>
+                        <p:cond delay="indefinite"/>
+                      </p:stCondLst>
+                      <p:childTnLst>
+                        <p:par>
+                          <p:cTn id="35" fill="hold">
+                            <p:stCondLst>
+                              <p:cond delay="0"/>
+                            </p:stCondLst>
+                            <p:childTnLst>
+                              <p:par>
+                                <p:cTn id="36" presetID="2" presetClass="entr" presetSubtype="4" fill="hold" nodeType="clickEffect">
+                                  <p:stCondLst>
+                                    <p:cond delay="0"/>
+                                  </p:stCondLst>
+                                  <p:childTnLst>
+                                    <p:set>
+                                      <p:cBhvr>
+                                        <p:cTn id="37" dur="1" fill="hold">
                                           <p:stCondLst>
                                             <p:cond delay="0"/>
                                           </p:stCondLst>
@@ -17684,7 +17918,7 @@
                                     </p:set>
                                     <p:anim calcmode="lin" valueType="num">
                                       <p:cBhvr additive="base">
-                                        <p:cTn id="36" dur="500" fill="hold"/>
+                                        <p:cTn id="38" dur="500" fill="hold"/>
                                         <p:tgtEl>
                                           <p:spTgt spid="4100"/>
                                         </p:tgtEl>
@@ -17707,7 +17941,7 @@
                                     </p:anim>
                                     <p:anim calcmode="lin" valueType="num">
                                       <p:cBhvr additive="base">
-                                        <p:cTn id="37" dur="500" fill="hold"/>
+                                        <p:cTn id="39" dur="500" fill="hold"/>
                                         <p:tgtEl>
                                           <p:spTgt spid="4100"/>
                                         </p:tgtEl>
@@ -17732,14 +17966,14 @@
                                 </p:cTn>
                               </p:par>
                               <p:par>
-                                <p:cTn id="38" presetID="2" presetClass="entr" presetSubtype="4" fill="hold" nodeType="withEffect">
+                                <p:cTn id="40" presetID="2" presetClass="entr" presetSubtype="4" fill="hold" nodeType="withEffect">
                                   <p:stCondLst>
                                     <p:cond delay="0"/>
                                   </p:stCondLst>
                                   <p:childTnLst>
                                     <p:set>
                                       <p:cBhvr>
-                                        <p:cTn id="39" dur="1" fill="hold">
+                                        <p:cTn id="41" dur="1" fill="hold">
                                           <p:stCondLst>
                                             <p:cond delay="0"/>
                                           </p:stCondLst>
@@ -17757,7 +17991,7 @@
                                     </p:set>
                                     <p:anim calcmode="lin" valueType="num">
                                       <p:cBhvr additive="base">
-                                        <p:cTn id="40" dur="500" fill="hold"/>
+                                        <p:cTn id="42" dur="500" fill="hold"/>
                                         <p:tgtEl>
                                           <p:spTgt spid="4098"/>
                                         </p:tgtEl>
@@ -17780,7 +18014,7 @@
                                     </p:anim>
                                     <p:anim calcmode="lin" valueType="num">
                                       <p:cBhvr additive="base">
-                                        <p:cTn id="41" dur="500" fill="hold"/>
+                                        <p:cTn id="43" dur="500" fill="hold"/>
                                         <p:tgtEl>
                                           <p:spTgt spid="4098"/>
                                         </p:tgtEl>
@@ -17832,7 +18066,7 @@
       </p:par>
     </p:tnLst>
     <p:bldLst>
-      <p:bldP spid="4" grpId="0" build="p"/>
+      <p:bldP spid="4" grpId="0" uiExpand="1" build="p"/>
     </p:bldLst>
   </p:timing>
 </p:sld>
@@ -18080,7 +18314,7 @@
           <a:blip r:embed="rId3">
             <a:extLst>
               <a:ext uri="{28A0092B-C50C-407E-A947-70E740481C1C}">
-                <a14:useLocalDpi xmlns="" xmlns:a14="http://schemas.microsoft.com/office/drawing/2010/main" val="0"/>
+                <a14:useLocalDpi xmlns:a14="http://schemas.microsoft.com/office/drawing/2010/main" xmlns="" val="0"/>
               </a:ext>
             </a:extLst>
           </a:blip>
@@ -18105,7 +18339,7 @@
           </a:effectLst>
           <a:extLst>
             <a:ext uri="{909E8E84-426E-40DD-AFC4-6F175D3DCCD1}">
-              <a14:hiddenFill xmlns="" xmlns:a14="http://schemas.microsoft.com/office/drawing/2010/main">
+              <a14:hiddenFill xmlns:a14="http://schemas.microsoft.com/office/drawing/2010/main" xmlns="">
                 <a:solidFill>
                   <a:srgbClr val="FFFFFF"/>
                 </a:solidFill>
@@ -18126,7 +18360,7 @@
           <a:blip r:embed="rId4">
             <a:extLst>
               <a:ext uri="{28A0092B-C50C-407E-A947-70E740481C1C}">
-                <a14:useLocalDpi xmlns="" xmlns:a14="http://schemas.microsoft.com/office/drawing/2010/main" val="0"/>
+                <a14:useLocalDpi xmlns:a14="http://schemas.microsoft.com/office/drawing/2010/main" xmlns="" val="0"/>
               </a:ext>
             </a:extLst>
           </a:blip>
@@ -18146,7 +18380,7 @@
           <a:noFill/>
           <a:extLst>
             <a:ext uri="{909E8E84-426E-40DD-AFC4-6F175D3DCCD1}">
-              <a14:hiddenFill xmlns="" xmlns:a14="http://schemas.microsoft.com/office/drawing/2010/main">
+              <a14:hiddenFill xmlns:a14="http://schemas.microsoft.com/office/drawing/2010/main" xmlns="">
                 <a:solidFill>
                   <a:srgbClr val="FFFFFF"/>
                 </a:solidFill>
@@ -18192,7 +18426,7 @@
     </p:spTree>
     <p:extLst>
       <p:ext uri="{BB962C8B-B14F-4D97-AF65-F5344CB8AC3E}">
-        <p14:creationId xmlns="" xmlns:p14="http://schemas.microsoft.com/office/powerpoint/2010/main" val="2947224754"/>
+        <p14:creationId xmlns:p14="http://schemas.microsoft.com/office/powerpoint/2010/main" xmlns="" val="2947224754"/>
       </p:ext>
     </p:extLst>
   </p:cSld>
@@ -18509,7 +18743,7 @@
           <a:blip r:embed="rId3">
             <a:extLst>
               <a:ext uri="{28A0092B-C50C-407E-A947-70E740481C1C}">
-                <a14:useLocalDpi xmlns="" xmlns:a14="http://schemas.microsoft.com/office/drawing/2010/main" val="0"/>
+                <a14:useLocalDpi xmlns:a14="http://schemas.microsoft.com/office/drawing/2010/main" xmlns="" val="0"/>
               </a:ext>
             </a:extLst>
           </a:blip>
@@ -18529,7 +18763,7 @@
           <a:noFill/>
           <a:extLst>
             <a:ext uri="{909E8E84-426E-40DD-AFC4-6F175D3DCCD1}">
-              <a14:hiddenFill xmlns="" xmlns:a14="http://schemas.microsoft.com/office/drawing/2010/main">
+              <a14:hiddenFill xmlns:a14="http://schemas.microsoft.com/office/drawing/2010/main" xmlns="">
                 <a:solidFill>
                   <a:srgbClr val="FFFFFF"/>
                 </a:solidFill>
@@ -19084,7 +19318,7 @@
     </p:spTree>
     <p:extLst>
       <p:ext uri="{BB962C8B-B14F-4D97-AF65-F5344CB8AC3E}">
-        <p14:creationId xmlns="" xmlns:p14="http://schemas.microsoft.com/office/powerpoint/2010/main" val="1111877724"/>
+        <p14:creationId xmlns:p14="http://schemas.microsoft.com/office/powerpoint/2010/main" xmlns="" val="1111877724"/>
       </p:ext>
     </p:extLst>
   </p:cSld>
@@ -19092,7 +19326,7 @@
     <a:masterClrMapping/>
   </p:clrMapOvr>
   <mc:AlternateContent xmlns:mc="http://schemas.openxmlformats.org/markup-compatibility/2006">
-    <mc:Choice xmlns="" xmlns:p14="http://schemas.microsoft.com/office/powerpoint/2010/main" Requires="p14">
+    <mc:Choice xmlns:p14="http://schemas.microsoft.com/office/powerpoint/2010/main" xmlns="" Requires="p14">
       <p:transition spd="slow" p14:dur="2000"/>
     </mc:Choice>
     <mc:Fallback>
@@ -19474,7 +19708,7 @@
           <p:nvPr>
             <p:extLst>
               <p:ext uri="{D42A27DB-BD31-4B8C-83A1-F6EECF244321}">
-                <p14:modId xmlns="" xmlns:p14="http://schemas.microsoft.com/office/powerpoint/2010/main" val="2643884637"/>
+                <p14:modId xmlns:p14="http://schemas.microsoft.com/office/powerpoint/2010/main" xmlns="" val="2643884637"/>
               </p:ext>
             </p:extLst>
           </p:nvPr>
@@ -19915,14 +20149,14 @@
           <a:effectLst/>
           <a:extLst>
             <a:ext uri="{909E8E84-426E-40DD-AFC4-6F175D3DCCD1}">
-              <a14:hiddenFill xmlns="" xmlns:a14="http://schemas.microsoft.com/office/drawing/2010/main">
+              <a14:hiddenFill xmlns:a14="http://schemas.microsoft.com/office/drawing/2010/main" xmlns="">
                 <a:solidFill>
                   <a:schemeClr val="accent1"/>
                 </a:solidFill>
               </a14:hiddenFill>
             </a:ext>
             <a:ext uri="{91240B29-F687-4F45-9708-019B960494DF}">
-              <a14:hiddenLine xmlns="" xmlns:a14="http://schemas.microsoft.com/office/drawing/2010/main" w="9525">
+              <a14:hiddenLine xmlns:a14="http://schemas.microsoft.com/office/drawing/2010/main" xmlns="" w="9525">
                 <a:solidFill>
                   <a:schemeClr val="tx1"/>
                 </a:solidFill>
@@ -19932,7 +20166,7 @@
               </a14:hiddenLine>
             </a:ext>
             <a:ext uri="{AF507438-7753-43E0-B8FC-AC1667EBCBE1}">
-              <a14:hiddenEffects xmlns="" xmlns:a14="http://schemas.microsoft.com/office/drawing/2010/main">
+              <a14:hiddenEffects xmlns:a14="http://schemas.microsoft.com/office/drawing/2010/main" xmlns="">
                 <a:effectLst>
                   <a:outerShdw dist="35921" dir="2700000" algn="ctr" rotWithShape="0">
                     <a:schemeClr val="bg2"/>
@@ -20013,7 +20247,7 @@
     </p:spTree>
     <p:extLst>
       <p:ext uri="{BB962C8B-B14F-4D97-AF65-F5344CB8AC3E}">
-        <p14:creationId xmlns="" xmlns:p14="http://schemas.microsoft.com/office/powerpoint/2010/main" val="503117530"/>
+        <p14:creationId xmlns:p14="http://schemas.microsoft.com/office/powerpoint/2010/main" xmlns="" val="503117530"/>
       </p:ext>
     </p:extLst>
   </p:cSld>
@@ -20098,7 +20332,7 @@
           <p:nvPr>
             <p:extLst>
               <p:ext uri="{D42A27DB-BD31-4B8C-83A1-F6EECF244321}">
-                <p14:modId xmlns="" xmlns:p14="http://schemas.microsoft.com/office/powerpoint/2010/main" val="722892891"/>
+                <p14:modId xmlns:p14="http://schemas.microsoft.com/office/powerpoint/2010/main" xmlns="" val="722892891"/>
               </p:ext>
             </p:extLst>
           </p:nvPr>
@@ -21080,7 +21314,7 @@
     </p:spTree>
     <p:extLst>
       <p:ext uri="{BB962C8B-B14F-4D97-AF65-F5344CB8AC3E}">
-        <p14:creationId xmlns="" xmlns:p14="http://schemas.microsoft.com/office/powerpoint/2010/main" val="2473970557"/>
+        <p14:creationId xmlns:p14="http://schemas.microsoft.com/office/powerpoint/2010/main" xmlns="" val="2473970557"/>
       </p:ext>
     </p:extLst>
   </p:cSld>
@@ -21126,7 +21360,7 @@
           <a:blip r:embed="rId3">
             <a:extLst>
               <a:ext uri="{28A0092B-C50C-407E-A947-70E740481C1C}">
-                <a14:useLocalDpi xmlns="" xmlns:a14="http://schemas.microsoft.com/office/drawing/2010/main" val="0"/>
+                <a14:useLocalDpi xmlns:a14="http://schemas.microsoft.com/office/drawing/2010/main" xmlns="" val="0"/>
               </a:ext>
             </a:extLst>
           </a:blip>
@@ -21169,7 +21403,7 @@
           </a:sp3d>
           <a:extLst>
             <a:ext uri="{909E8E84-426E-40DD-AFC4-6F175D3DCCD1}">
-              <a14:hiddenFill xmlns="" xmlns:a14="http://schemas.microsoft.com/office/drawing/2010/main">
+              <a14:hiddenFill xmlns:a14="http://schemas.microsoft.com/office/drawing/2010/main" xmlns="">
                 <a:solidFill>
                   <a:srgbClr val="FFFFFF"/>
                 </a:solidFill>
@@ -21699,7 +21933,7 @@
           <a:blip r:embed="rId3">
             <a:extLst>
               <a:ext uri="{28A0092B-C50C-407E-A947-70E740481C1C}">
-                <a14:useLocalDpi xmlns="" xmlns:a14="http://schemas.microsoft.com/office/drawing/2010/main" val="0"/>
+                <a14:useLocalDpi xmlns:a14="http://schemas.microsoft.com/office/drawing/2010/main" xmlns="" val="0"/>
               </a:ext>
             </a:extLst>
           </a:blip>
@@ -21723,14 +21957,14 @@
           <a:effectLst/>
           <a:extLst>
             <a:ext uri="{909E8E84-426E-40DD-AFC4-6F175D3DCCD1}">
-              <a14:hiddenFill xmlns="" xmlns:a14="http://schemas.microsoft.com/office/drawing/2010/main">
+              <a14:hiddenFill xmlns:a14="http://schemas.microsoft.com/office/drawing/2010/main" xmlns="">
                 <a:solidFill>
                   <a:schemeClr val="accent1"/>
                 </a:solidFill>
               </a14:hiddenFill>
             </a:ext>
             <a:ext uri="{91240B29-F687-4F45-9708-019B960494DF}">
-              <a14:hiddenLine xmlns="" xmlns:a14="http://schemas.microsoft.com/office/drawing/2010/main" w="9525">
+              <a14:hiddenLine xmlns:a14="http://schemas.microsoft.com/office/drawing/2010/main" xmlns="" w="9525">
                 <a:solidFill>
                   <a:schemeClr val="tx1"/>
                 </a:solidFill>
@@ -21740,7 +21974,7 @@
               </a14:hiddenLine>
             </a:ext>
             <a:ext uri="{AF507438-7753-43E0-B8FC-AC1667EBCBE1}">
-              <a14:hiddenEffects xmlns="" xmlns:a14="http://schemas.microsoft.com/office/drawing/2010/main">
+              <a14:hiddenEffects xmlns:a14="http://schemas.microsoft.com/office/drawing/2010/main" xmlns="">
                 <a:effectLst>
                   <a:outerShdw dist="35921" dir="2700000" algn="ctr" rotWithShape="0">
                     <a:schemeClr val="bg2"/>
@@ -21841,14 +22075,14 @@
           <a:effectLst/>
           <a:extLst>
             <a:ext uri="{909E8E84-426E-40DD-AFC4-6F175D3DCCD1}">
-              <a14:hiddenFill xmlns="" xmlns:a14="http://schemas.microsoft.com/office/drawing/2010/main">
+              <a14:hiddenFill xmlns:a14="http://schemas.microsoft.com/office/drawing/2010/main" xmlns="">
                 <a:solidFill>
                   <a:schemeClr val="accent1"/>
                 </a:solidFill>
               </a14:hiddenFill>
             </a:ext>
             <a:ext uri="{91240B29-F687-4F45-9708-019B960494DF}">
-              <a14:hiddenLine xmlns="" xmlns:a14="http://schemas.microsoft.com/office/drawing/2010/main" w="9525">
+              <a14:hiddenLine xmlns:a14="http://schemas.microsoft.com/office/drawing/2010/main" xmlns="" w="9525">
                 <a:solidFill>
                   <a:schemeClr val="tx1"/>
                 </a:solidFill>
@@ -21858,7 +22092,7 @@
               </a14:hiddenLine>
             </a:ext>
             <a:ext uri="{AF507438-7753-43E0-B8FC-AC1667EBCBE1}">
-              <a14:hiddenEffects xmlns="" xmlns:a14="http://schemas.microsoft.com/office/drawing/2010/main">
+              <a14:hiddenEffects xmlns:a14="http://schemas.microsoft.com/office/drawing/2010/main" xmlns="">
                 <a:effectLst>
                   <a:outerShdw dist="35921" dir="2700000" algn="ctr" rotWithShape="0">
                     <a:schemeClr val="bg2"/>
@@ -22306,7 +22540,7 @@
     </p:spTree>
     <p:extLst>
       <p:ext uri="{BB962C8B-B14F-4D97-AF65-F5344CB8AC3E}">
-        <p14:creationId xmlns="" xmlns:p14="http://schemas.microsoft.com/office/powerpoint/2010/main" val="3312797979"/>
+        <p14:creationId xmlns:p14="http://schemas.microsoft.com/office/powerpoint/2010/main" xmlns="" val="3312797979"/>
       </p:ext>
     </p:extLst>
   </p:cSld>
@@ -23449,7 +23683,7 @@
           <p:nvPr>
             <p:extLst>
               <p:ext uri="{D42A27DB-BD31-4B8C-83A1-F6EECF244321}">
-                <p14:modId xmlns="" xmlns:p14="http://schemas.microsoft.com/office/powerpoint/2010/main" val="3382119601"/>
+                <p14:modId xmlns:p14="http://schemas.microsoft.com/office/powerpoint/2010/main" xmlns="" val="3382119601"/>
               </p:ext>
             </p:extLst>
           </p:nvPr>
@@ -24226,7 +24460,7 @@
     </p:spTree>
     <p:extLst>
       <p:ext uri="{BB962C8B-B14F-4D97-AF65-F5344CB8AC3E}">
-        <p14:creationId xmlns="" xmlns:p14="http://schemas.microsoft.com/office/powerpoint/2010/main" val="155874689"/>
+        <p14:creationId xmlns:p14="http://schemas.microsoft.com/office/powerpoint/2010/main" xmlns="" val="155874689"/>
       </p:ext>
     </p:extLst>
   </p:cSld>
@@ -24234,7 +24468,7 @@
     <a:masterClrMapping/>
   </p:clrMapOvr>
   <mc:AlternateContent xmlns:mc="http://schemas.openxmlformats.org/markup-compatibility/2006">
-    <mc:Choice xmlns="" xmlns:p14="http://schemas.microsoft.com/office/powerpoint/2010/main" Requires="p14">
+    <mc:Choice xmlns:p14="http://schemas.microsoft.com/office/powerpoint/2010/main" xmlns="" Requires="p14">
       <p:transition spd="slow" p14:dur="2000"/>
     </mc:Choice>
     <mc:Fallback>
@@ -24861,7 +25095,7 @@
     </p:spTree>
     <p:extLst>
       <p:ext uri="{BB962C8B-B14F-4D97-AF65-F5344CB8AC3E}">
-        <p14:creationId xmlns="" xmlns:p14="http://schemas.microsoft.com/office/powerpoint/2010/main" val="155874689"/>
+        <p14:creationId xmlns:p14="http://schemas.microsoft.com/office/powerpoint/2010/main" xmlns="" val="155874689"/>
       </p:ext>
     </p:extLst>
   </p:cSld>
@@ -24869,7 +25103,7 @@
     <a:masterClrMapping/>
   </p:clrMapOvr>
   <mc:AlternateContent xmlns:mc="http://schemas.openxmlformats.org/markup-compatibility/2006">
-    <mc:Choice xmlns="" xmlns:p14="http://schemas.microsoft.com/office/powerpoint/2010/main" Requires="p14">
+    <mc:Choice xmlns:p14="http://schemas.microsoft.com/office/powerpoint/2010/main" xmlns="" Requires="p14">
       <p:transition spd="slow" p14:dur="2000"/>
     </mc:Choice>
     <mc:Fallback>
@@ -24975,7 +25209,7 @@
     </p:spTree>
     <p:extLst>
       <p:ext uri="{BB962C8B-B14F-4D97-AF65-F5344CB8AC3E}">
-        <p14:creationId xmlns="" xmlns:p14="http://schemas.microsoft.com/office/powerpoint/2010/main" val="155874689"/>
+        <p14:creationId xmlns:p14="http://schemas.microsoft.com/office/powerpoint/2010/main" xmlns="" val="155874689"/>
       </p:ext>
     </p:extLst>
   </p:cSld>
@@ -24983,7 +25217,7 @@
     <a:masterClrMapping/>
   </p:clrMapOvr>
   <mc:AlternateContent xmlns:mc="http://schemas.openxmlformats.org/markup-compatibility/2006">
-    <mc:Choice xmlns="" xmlns:p14="http://schemas.microsoft.com/office/powerpoint/2010/main" Requires="p14">
+    <mc:Choice xmlns:p14="http://schemas.microsoft.com/office/powerpoint/2010/main" xmlns="" Requires="p14">
       <p:transition spd="slow" p14:dur="2000"/>
     </mc:Choice>
     <mc:Fallback>
@@ -27489,7 +27723,7 @@
     </p:spTree>
     <p:extLst>
       <p:ext uri="{BB962C8B-B14F-4D97-AF65-F5344CB8AC3E}">
-        <p14:creationId xmlns="" xmlns:p14="http://schemas.microsoft.com/office/powerpoint/2010/main" val="134615909"/>
+        <p14:creationId xmlns:p14="http://schemas.microsoft.com/office/powerpoint/2010/main" xmlns="" val="134615909"/>
       </p:ext>
     </p:extLst>
   </p:cSld>
@@ -28263,7 +28497,7 @@
           <p:nvPr>
             <p:extLst>
               <p:ext uri="{D42A27DB-BD31-4B8C-83A1-F6EECF244321}">
-                <p14:modId xmlns="" xmlns:p14="http://schemas.microsoft.com/office/powerpoint/2010/main" val="1603526078"/>
+                <p14:modId xmlns:p14="http://schemas.microsoft.com/office/powerpoint/2010/main" xmlns="" val="1603526078"/>
               </p:ext>
             </p:extLst>
           </p:nvPr>
@@ -28409,7 +28643,7 @@
     </p:spTree>
     <p:extLst>
       <p:ext uri="{BB962C8B-B14F-4D97-AF65-F5344CB8AC3E}">
-        <p14:creationId xmlns="" xmlns:p14="http://schemas.microsoft.com/office/powerpoint/2010/main" val="1428921569"/>
+        <p14:creationId xmlns:p14="http://schemas.microsoft.com/office/powerpoint/2010/main" xmlns="" val="1428921569"/>
       </p:ext>
     </p:extLst>
   </p:cSld>
@@ -28502,7 +28736,7 @@
           <p:nvPr>
             <p:extLst>
               <p:ext uri="{D42A27DB-BD31-4B8C-83A1-F6EECF244321}">
-                <p14:modId xmlns="" xmlns:p14="http://schemas.microsoft.com/office/powerpoint/2010/main" val="3377787449"/>
+                <p14:modId xmlns:p14="http://schemas.microsoft.com/office/powerpoint/2010/main" xmlns="" val="3377787449"/>
               </p:ext>
             </p:extLst>
           </p:nvPr>
@@ -28714,7 +28948,7 @@
     </p:spTree>
     <p:extLst>
       <p:ext uri="{BB962C8B-B14F-4D97-AF65-F5344CB8AC3E}">
-        <p14:creationId xmlns="" xmlns:p14="http://schemas.microsoft.com/office/powerpoint/2010/main" val="521228686"/>
+        <p14:creationId xmlns:p14="http://schemas.microsoft.com/office/powerpoint/2010/main" xmlns="" val="521228686"/>
       </p:ext>
     </p:extLst>
   </p:cSld>
@@ -28801,7 +29035,7 @@
           <a:blip r:embed="rId2">
             <a:extLst>
               <a:ext uri="{28A0092B-C50C-407E-A947-70E740481C1C}">
-                <a14:useLocalDpi xmlns="" xmlns:a14="http://schemas.microsoft.com/office/drawing/2010/main" val="0"/>
+                <a14:useLocalDpi xmlns:a14="http://schemas.microsoft.com/office/drawing/2010/main" xmlns="" val="0"/>
               </a:ext>
             </a:extLst>
           </a:blip>
@@ -28821,7 +29055,7 @@
           <a:noFill/>
           <a:extLst>
             <a:ext uri="{909E8E84-426E-40DD-AFC4-6F175D3DCCD1}">
-              <a14:hiddenFill xmlns="" xmlns:a14="http://schemas.microsoft.com/office/drawing/2010/main">
+              <a14:hiddenFill xmlns:a14="http://schemas.microsoft.com/office/drawing/2010/main" xmlns="">
                 <a:solidFill>
                   <a:srgbClr val="FFFFFF"/>
                 </a:solidFill>
@@ -29003,7 +29237,7 @@
     </p:spTree>
     <p:extLst>
       <p:ext uri="{BB962C8B-B14F-4D97-AF65-F5344CB8AC3E}">
-        <p14:creationId xmlns="" xmlns:p14="http://schemas.microsoft.com/office/powerpoint/2010/main" val="2138116938"/>
+        <p14:creationId xmlns:p14="http://schemas.microsoft.com/office/powerpoint/2010/main" xmlns="" val="2138116938"/>
       </p:ext>
     </p:extLst>
   </p:cSld>
@@ -29513,7 +29747,7 @@
           <p:nvPr>
             <p:extLst>
               <p:ext uri="{D42A27DB-BD31-4B8C-83A1-F6EECF244321}">
-                <p14:modId xmlns="" xmlns:p14="http://schemas.microsoft.com/office/powerpoint/2010/main" val="3745458434"/>
+                <p14:modId xmlns:p14="http://schemas.microsoft.com/office/powerpoint/2010/main" xmlns="" val="3745458434"/>
               </p:ext>
             </p:extLst>
           </p:nvPr>
@@ -29725,7 +29959,7 @@
     </p:spTree>
     <p:extLst>
       <p:ext uri="{BB962C8B-B14F-4D97-AF65-F5344CB8AC3E}">
-        <p14:creationId xmlns="" xmlns:p14="http://schemas.microsoft.com/office/powerpoint/2010/main" val="2476603813"/>
+        <p14:creationId xmlns:p14="http://schemas.microsoft.com/office/powerpoint/2010/main" xmlns="" val="2476603813"/>
       </p:ext>
     </p:extLst>
   </p:cSld>
@@ -29815,7 +30049,7 @@
           <a:blip r:embed="rId3">
             <a:extLst>
               <a:ext uri="{28A0092B-C50C-407E-A947-70E740481C1C}">
-                <a14:useLocalDpi xmlns="" xmlns:a14="http://schemas.microsoft.com/office/drawing/2010/main" val="0"/>
+                <a14:useLocalDpi xmlns:a14="http://schemas.microsoft.com/office/drawing/2010/main" xmlns="" val="0"/>
               </a:ext>
             </a:extLst>
           </a:blip>
@@ -29835,7 +30069,7 @@
           <a:noFill/>
           <a:extLst>
             <a:ext uri="{909E8E84-426E-40DD-AFC4-6F175D3DCCD1}">
-              <a14:hiddenFill xmlns="" xmlns:a14="http://schemas.microsoft.com/office/drawing/2010/main">
+              <a14:hiddenFill xmlns:a14="http://schemas.microsoft.com/office/drawing/2010/main" xmlns="">
                 <a:solidFill>
                   <a:srgbClr val="FFFFFF"/>
                 </a:solidFill>
@@ -29985,7 +30219,7 @@
     </p:spTree>
     <p:extLst>
       <p:ext uri="{BB962C8B-B14F-4D97-AF65-F5344CB8AC3E}">
-        <p14:creationId xmlns="" xmlns:p14="http://schemas.microsoft.com/office/powerpoint/2010/main" val="1739081068"/>
+        <p14:creationId xmlns:p14="http://schemas.microsoft.com/office/powerpoint/2010/main" xmlns="" val="1739081068"/>
       </p:ext>
     </p:extLst>
   </p:cSld>
@@ -30465,7 +30699,7 @@
     </p:spTree>
     <p:extLst>
       <p:ext uri="{BB962C8B-B14F-4D97-AF65-F5344CB8AC3E}">
-        <p14:creationId xmlns="" xmlns:p14="http://schemas.microsoft.com/office/powerpoint/2010/main" val="3060381138"/>
+        <p14:creationId xmlns:p14="http://schemas.microsoft.com/office/powerpoint/2010/main" xmlns="" val="3060381138"/>
       </p:ext>
     </p:extLst>
   </p:cSld>
@@ -33183,7 +33417,7 @@
     </p:spTree>
     <p:extLst>
       <p:ext uri="{BB962C8B-B14F-4D97-AF65-F5344CB8AC3E}">
-        <p14:creationId xmlns="" xmlns:p14="http://schemas.microsoft.com/office/powerpoint/2010/main" val="2532338835"/>
+        <p14:creationId xmlns:p14="http://schemas.microsoft.com/office/powerpoint/2010/main" xmlns="" val="2532338835"/>
       </p:ext>
     </p:extLst>
   </p:cSld>
@@ -33191,7 +33425,7 @@
     <a:masterClrMapping/>
   </p:clrMapOvr>
   <mc:AlternateContent xmlns:mc="http://schemas.openxmlformats.org/markup-compatibility/2006">
-    <mc:Choice xmlns="" xmlns:p14="http://schemas.microsoft.com/office/powerpoint/2010/main" Requires="p14">
+    <mc:Choice xmlns:p14="http://schemas.microsoft.com/office/powerpoint/2010/main" xmlns="" Requires="p14">
       <p:transition spd="slow" p14:dur="2000"/>
     </mc:Choice>
     <mc:Fallback>
@@ -33281,7 +33515,7 @@
           <p:nvPr>
             <p:extLst>
               <p:ext uri="{D42A27DB-BD31-4B8C-83A1-F6EECF244321}">
-                <p14:modId xmlns="" xmlns:p14="http://schemas.microsoft.com/office/powerpoint/2010/main" val="4285816619"/>
+                <p14:modId xmlns:p14="http://schemas.microsoft.com/office/powerpoint/2010/main" xmlns="" val="4285816619"/>
               </p:ext>
             </p:extLst>
           </p:nvPr>
@@ -34011,7 +34245,7 @@
           <p:nvPr>
             <p:extLst>
               <p:ext uri="{D42A27DB-BD31-4B8C-83A1-F6EECF244321}">
-                <p14:modId xmlns="" xmlns:p14="http://schemas.microsoft.com/office/powerpoint/2010/main" val="4159081582"/>
+                <p14:modId xmlns:p14="http://schemas.microsoft.com/office/powerpoint/2010/main" xmlns="" val="4159081582"/>
               </p:ext>
             </p:extLst>
           </p:nvPr>
@@ -34850,7 +35084,7 @@
     </p:spTree>
     <p:extLst>
       <p:ext uri="{BB962C8B-B14F-4D97-AF65-F5344CB8AC3E}">
-        <p14:creationId xmlns="" xmlns:p14="http://schemas.microsoft.com/office/powerpoint/2010/main" val="1173458281"/>
+        <p14:creationId xmlns:p14="http://schemas.microsoft.com/office/powerpoint/2010/main" xmlns="" val="1173458281"/>
       </p:ext>
     </p:extLst>
   </p:cSld>
@@ -36108,7 +36342,7 @@
     </p:spTree>
     <p:extLst>
       <p:ext uri="{BB962C8B-B14F-4D97-AF65-F5344CB8AC3E}">
-        <p14:creationId xmlns="" xmlns:p14="http://schemas.microsoft.com/office/powerpoint/2010/main" val="2769124218"/>
+        <p14:creationId xmlns:p14="http://schemas.microsoft.com/office/powerpoint/2010/main" xmlns="" val="2769124218"/>
       </p:ext>
     </p:extLst>
   </p:cSld>

</xml_diff>